<commit_message>
Ajout des possibilités d'évolution du serveur, avec les avantages et inconvénients
</commit_message>
<xml_diff>
--- a/Speak'up API shadowing.pptx
+++ b/Speak'up API shadowing.pptx
@@ -5,7 +5,7 @@
     <p:sldMasterId id="2147483648" r:id="rId11"/>
   </p:sldMasterIdLst>
   <p:notesMasterIdLst>
-    <p:notesMasterId r:id="rId17"/>
+    <p:notesMasterId r:id="rId24"/>
   </p:notesMasterIdLst>
   <p:sldIdLst>
     <p:sldId id="256" r:id="rId12"/>
@@ -13,6 +13,13 @@
     <p:sldId id="259" r:id="rId14"/>
     <p:sldId id="262" r:id="rId15"/>
     <p:sldId id="281" r:id="rId16"/>
+    <p:sldId id="282" r:id="rId17"/>
+    <p:sldId id="283" r:id="rId18"/>
+    <p:sldId id="288" r:id="rId19"/>
+    <p:sldId id="284" r:id="rId20"/>
+    <p:sldId id="285" r:id="rId21"/>
+    <p:sldId id="286" r:id="rId22"/>
+    <p:sldId id="287" r:id="rId23"/>
   </p:sldIdLst>
   <p:sldSz cx="12192000" cy="6858000"/>
   <p:notesSz cx="6858000" cy="9144000"/>
@@ -213,7 +220,7 @@
           <a:p>
             <a:fld id="{B5AD0476-FE6D-4A78-9DC3-98305AD3C12A}" type="datetimeFigureOut">
               <a:rPr lang="fr-FR" smtClean="0"/>
-              <a:t>04/10/2019</a:t>
+              <a:t>22/10/2019</a:t>
             </a:fld>
             <a:endParaRPr lang="fr-FR"/>
           </a:p>
@@ -711,7 +718,15 @@
             </a:r>
             <a:r>
               <a:rPr lang="fr-FR" baseline="0" dirty="0" smtClean="0"/>
-              <a:t> API peuvent être autre chose que des API: un service externe, une application, une requête en base de données…</a:t>
+              <a:t> API dans le sens de Application </a:t>
+            </a:r>
+            <a:r>
+              <a:rPr lang="fr-FR" baseline="0" dirty="0" err="1" smtClean="0"/>
+              <a:t>Programming</a:t>
+            </a:r>
+            <a:r>
+              <a:rPr lang="fr-FR" baseline="0" dirty="0" smtClean="0"/>
+              <a:t> Interface : une librairie, un service externe, une application, une requête en base de données…</a:t>
             </a:r>
           </a:p>
           <a:p>
@@ -761,6 +776,724 @@
     <p:extLst>
       <p:ext uri="{BB962C8B-B14F-4D97-AF65-F5344CB8AC3E}">
         <p14:creationId xmlns:p14="http://schemas.microsoft.com/office/powerpoint/2010/main" val="116553954"/>
+      </p:ext>
+    </p:extLst>
+  </p:cSld>
+  <p:clrMapOvr>
+    <a:masterClrMapping/>
+  </p:clrMapOvr>
+</p:notes>
+</file>
+
+<file path=ppt/notesSlides/notesSlide4.xml><?xml version="1.0" encoding="utf-8"?>
+<p:notes xmlns:a="http://schemas.openxmlformats.org/drawingml/2006/main" xmlns:r="http://schemas.openxmlformats.org/officeDocument/2006/relationships" xmlns:p="http://schemas.openxmlformats.org/presentationml/2006/main">
+  <p:cSld>
+    <p:spTree>
+      <p:nvGrpSpPr>
+        <p:cNvPr id="1" name=""/>
+        <p:cNvGrpSpPr/>
+        <p:nvPr/>
+      </p:nvGrpSpPr>
+      <p:grpSpPr>
+        <a:xfrm>
+          <a:off x="0" y="0"/>
+          <a:ext cx="0" cy="0"/>
+          <a:chOff x="0" y="0"/>
+          <a:chExt cx="0" cy="0"/>
+        </a:xfrm>
+      </p:grpSpPr>
+      <p:sp>
+        <p:nvSpPr>
+          <p:cNvPr id="2" name="Espace réservé de l'image des diapositives 1"/>
+          <p:cNvSpPr>
+            <a:spLocks noGrp="1" noRot="1" noChangeAspect="1"/>
+          </p:cNvSpPr>
+          <p:nvPr>
+            <p:ph type="sldImg"/>
+          </p:nvPr>
+        </p:nvSpPr>
+        <p:spPr/>
+      </p:sp>
+      <p:sp>
+        <p:nvSpPr>
+          <p:cNvPr id="3" name="Espace réservé des notes 2"/>
+          <p:cNvSpPr>
+            <a:spLocks noGrp="1"/>
+          </p:cNvSpPr>
+          <p:nvPr>
+            <p:ph type="body" idx="1"/>
+          </p:nvPr>
+        </p:nvSpPr>
+        <p:spPr/>
+        <p:txBody>
+          <a:bodyPr/>
+          <a:lstStyle/>
+          <a:p>
+            <a:pPr marL="0" indent="0">
+              <a:buFontTx/>
+              <a:buNone/>
+            </a:pPr>
+            <a:r>
+              <a:rPr lang="fr-FR" dirty="0" smtClean="0"/>
+              <a:t>Problèmes :</a:t>
+            </a:r>
+          </a:p>
+          <a:p>
+            <a:pPr marL="171450" indent="-171450">
+              <a:buFontTx/>
+              <a:buChar char="-"/>
+            </a:pPr>
+            <a:r>
+              <a:rPr lang="fr-FR" dirty="0" smtClean="0"/>
+              <a:t>Serveur ancien: X développeurs lui sont passés dessus, chacun à sa façon</a:t>
+            </a:r>
+          </a:p>
+          <a:p>
+            <a:pPr marL="171450" indent="-171450">
+              <a:buFontTx/>
+              <a:buChar char="-"/>
+            </a:pPr>
+            <a:r>
+              <a:rPr lang="fr-FR" dirty="0" smtClean="0"/>
+              <a:t>Langage ésotérique:</a:t>
+            </a:r>
+            <a:r>
+              <a:rPr lang="fr-FR" baseline="0" dirty="0" smtClean="0"/>
+              <a:t> langage spécifique utilisé sans raison, très ancien (Pascal)</a:t>
+            </a:r>
+          </a:p>
+          <a:p>
+            <a:pPr marL="171450" indent="-171450">
+              <a:buFontTx/>
+              <a:buChar char="-"/>
+            </a:pPr>
+            <a:r>
+              <a:rPr lang="fr-FR" baseline="0" dirty="0" smtClean="0"/>
+              <a:t>Par exemple pas de possibilité de </a:t>
+            </a:r>
+            <a:r>
+              <a:rPr lang="fr-FR" baseline="0" dirty="0" err="1" smtClean="0"/>
+              <a:t>multi-threading</a:t>
+            </a:r>
+            <a:r>
+              <a:rPr lang="fr-FR" baseline="0" dirty="0" smtClean="0"/>
+              <a:t>, code optimisé au point de l’</a:t>
+            </a:r>
+            <a:r>
+              <a:rPr lang="fr-FR" baseline="0" dirty="0" err="1" smtClean="0"/>
+              <a:t>obfusquer</a:t>
+            </a:r>
+            <a:r>
+              <a:rPr lang="fr-FR" baseline="0" dirty="0" smtClean="0"/>
+              <a:t>…</a:t>
+            </a:r>
+          </a:p>
+          <a:p>
+            <a:pPr marL="171450" indent="-171450">
+              <a:buFontTx/>
+              <a:buChar char="-"/>
+            </a:pPr>
+            <a:r>
+              <a:rPr lang="fr-FR" baseline="0" dirty="0" smtClean="0"/>
+              <a:t>Parce que parfois, un Xeon  bi-</a:t>
+            </a:r>
+            <a:r>
+              <a:rPr lang="fr-FR" baseline="0" dirty="0" err="1" smtClean="0"/>
+              <a:t>coeur</a:t>
+            </a:r>
+            <a:r>
+              <a:rPr lang="fr-FR" baseline="0" dirty="0" smtClean="0"/>
+              <a:t> avec 8Go de Ram n’est plus suffisant</a:t>
+            </a:r>
+          </a:p>
+          <a:p>
+            <a:pPr marL="171450" indent="-171450">
+              <a:buFontTx/>
+              <a:buChar char="-"/>
+            </a:pPr>
+            <a:endParaRPr lang="fr-FR" baseline="0" dirty="0" smtClean="0"/>
+          </a:p>
+          <a:p>
+            <a:pPr marL="0" indent="0">
+              <a:buFontTx/>
+              <a:buNone/>
+            </a:pPr>
+            <a:r>
+              <a:rPr lang="fr-FR" dirty="0" smtClean="0"/>
+              <a:t>Solutions:</a:t>
+            </a:r>
+          </a:p>
+          <a:p>
+            <a:pPr marL="171450" indent="-171450">
+              <a:buFontTx/>
+              <a:buChar char="-"/>
+            </a:pPr>
+            <a:r>
+              <a:rPr lang="fr-FR" dirty="0" smtClean="0"/>
+              <a:t>Obligation de « casser » : tests extrêmement complexes et long, et souvent aucune </a:t>
+            </a:r>
+            <a:r>
+              <a:rPr lang="fr-FR" dirty="0" err="1" smtClean="0"/>
+              <a:t>spec</a:t>
+            </a:r>
+            <a:r>
+              <a:rPr lang="fr-FR" dirty="0" smtClean="0"/>
+              <a:t>, donc rétro-engineering et aucune certitude que ça</a:t>
+            </a:r>
+            <a:r>
+              <a:rPr lang="fr-FR" baseline="0" dirty="0" smtClean="0"/>
+              <a:t> fonctionne</a:t>
+            </a:r>
+          </a:p>
+          <a:p>
+            <a:pPr marL="171450" marR="0" lvl="0" indent="-171450" algn="l" defTabSz="914400" rtl="0" eaLnBrk="1" fontAlgn="auto" latinLnBrk="0" hangingPunct="1">
+              <a:lnSpc>
+                <a:spcPct val="100000"/>
+              </a:lnSpc>
+              <a:spcBef>
+                <a:spcPts val="0"/>
+              </a:spcBef>
+              <a:spcAft>
+                <a:spcPts val="0"/>
+              </a:spcAft>
+              <a:buClrTx/>
+              <a:buSzTx/>
+              <a:buFontTx/>
+              <a:buChar char="-"/>
+              <a:tabLst/>
+              <a:defRPr/>
+            </a:pPr>
+            <a:r>
+              <a:rPr lang="fr-FR" dirty="0" smtClean="0"/>
+              <a:t>Projet long : toute</a:t>
+            </a:r>
+            <a:r>
+              <a:rPr lang="fr-FR" baseline="0" dirty="0" smtClean="0"/>
+              <a:t> l’équipe est monopolisée sur le projet; aucune évolution n’est possible sur l’existant pendant toute la refonte</a:t>
+            </a:r>
+            <a:endParaRPr lang="fr-FR" dirty="0" smtClean="0"/>
+          </a:p>
+        </p:txBody>
+      </p:sp>
+      <p:sp>
+        <p:nvSpPr>
+          <p:cNvPr id="4" name="Espace réservé du numéro de diapositive 3"/>
+          <p:cNvSpPr>
+            <a:spLocks noGrp="1"/>
+          </p:cNvSpPr>
+          <p:nvPr>
+            <p:ph type="sldNum" sz="quarter" idx="10"/>
+          </p:nvPr>
+        </p:nvSpPr>
+        <p:spPr/>
+        <p:txBody>
+          <a:bodyPr/>
+          <a:lstStyle/>
+          <a:p>
+            <a:fld id="{AA5DF8EF-0F82-44B3-979E-DBC26962337C}" type="slidenum">
+              <a:rPr lang="fr-FR" smtClean="0"/>
+              <a:t>6</a:t>
+            </a:fld>
+            <a:endParaRPr lang="fr-FR"/>
+          </a:p>
+        </p:txBody>
+      </p:sp>
+    </p:spTree>
+    <p:extLst>
+      <p:ext uri="{BB962C8B-B14F-4D97-AF65-F5344CB8AC3E}">
+        <p14:creationId xmlns:p14="http://schemas.microsoft.com/office/powerpoint/2010/main" val="756142715"/>
+      </p:ext>
+    </p:extLst>
+  </p:cSld>
+  <p:clrMapOvr>
+    <a:masterClrMapping/>
+  </p:clrMapOvr>
+</p:notes>
+</file>
+
+<file path=ppt/notesSlides/notesSlide5.xml><?xml version="1.0" encoding="utf-8"?>
+<p:notes xmlns:a="http://schemas.openxmlformats.org/drawingml/2006/main" xmlns:r="http://schemas.openxmlformats.org/officeDocument/2006/relationships" xmlns:p="http://schemas.openxmlformats.org/presentationml/2006/main">
+  <p:cSld>
+    <p:spTree>
+      <p:nvGrpSpPr>
+        <p:cNvPr id="1" name=""/>
+        <p:cNvGrpSpPr/>
+        <p:nvPr/>
+      </p:nvGrpSpPr>
+      <p:grpSpPr>
+        <a:xfrm>
+          <a:off x="0" y="0"/>
+          <a:ext cx="0" cy="0"/>
+          <a:chOff x="0" y="0"/>
+          <a:chExt cx="0" cy="0"/>
+        </a:xfrm>
+      </p:grpSpPr>
+      <p:sp>
+        <p:nvSpPr>
+          <p:cNvPr id="2" name="Espace réservé de l'image des diapositives 1"/>
+          <p:cNvSpPr>
+            <a:spLocks noGrp="1" noRot="1" noChangeAspect="1"/>
+          </p:cNvSpPr>
+          <p:nvPr>
+            <p:ph type="sldImg"/>
+          </p:nvPr>
+        </p:nvSpPr>
+        <p:spPr/>
+      </p:sp>
+      <p:sp>
+        <p:nvSpPr>
+          <p:cNvPr id="3" name="Espace réservé des notes 2"/>
+          <p:cNvSpPr>
+            <a:spLocks noGrp="1"/>
+          </p:cNvSpPr>
+          <p:nvPr>
+            <p:ph type="body" idx="1"/>
+          </p:nvPr>
+        </p:nvSpPr>
+        <p:spPr/>
+        <p:txBody>
+          <a:bodyPr/>
+          <a:lstStyle/>
+          <a:p>
+            <a:pPr marL="171450" indent="-171450">
+              <a:buFontTx/>
+              <a:buChar char="-"/>
+            </a:pPr>
+            <a:r>
+              <a:rPr lang="fr-FR" dirty="0" err="1" smtClean="0"/>
+              <a:t>load-balancing</a:t>
+            </a:r>
+            <a:r>
+              <a:rPr lang="fr-FR" dirty="0" smtClean="0"/>
+              <a:t>: </a:t>
+            </a:r>
+          </a:p>
+          <a:p>
+            <a:pPr marL="628650" lvl="1" indent="-171450">
+              <a:buFontTx/>
+              <a:buChar char="-"/>
+            </a:pPr>
+            <a:r>
+              <a:rPr lang="fr-FR" dirty="0" smtClean="0"/>
+              <a:t>Simple si mise</a:t>
+            </a:r>
+            <a:r>
+              <a:rPr lang="fr-FR" baseline="0" dirty="0" smtClean="0"/>
+              <a:t> en place « simpliste » (style X connexion par serveur)</a:t>
+            </a:r>
+          </a:p>
+          <a:p>
+            <a:pPr marL="628650" lvl="1" indent="-171450">
+              <a:buFontTx/>
+              <a:buChar char="-"/>
+            </a:pPr>
+            <a:r>
+              <a:rPr lang="fr-FR" baseline="0" dirty="0" smtClean="0"/>
+              <a:t>Transparent si les api pointent vers le </a:t>
+            </a:r>
+            <a:r>
+              <a:rPr lang="fr-FR" baseline="0" dirty="0" err="1" smtClean="0"/>
+              <a:t>load</a:t>
+            </a:r>
+            <a:r>
+              <a:rPr lang="fr-FR" baseline="0" dirty="0" smtClean="0"/>
+              <a:t>-balancer</a:t>
+            </a:r>
+          </a:p>
+          <a:p>
+            <a:pPr marL="628650" lvl="1" indent="-171450">
+              <a:buFontTx/>
+              <a:buChar char="-"/>
+            </a:pPr>
+            <a:r>
+              <a:rPr lang="fr-FR" baseline="0" dirty="0" smtClean="0"/>
+              <a:t>Peut être complexe si gestion en fonction de la charge</a:t>
+            </a:r>
+          </a:p>
+          <a:p>
+            <a:pPr marL="628650" lvl="1" indent="-171450">
+              <a:buFontTx/>
+              <a:buChar char="-"/>
+            </a:pPr>
+            <a:r>
+              <a:rPr lang="fr-FR" baseline="0" dirty="0" smtClean="0"/>
+              <a:t>Pb de gestion de connexion (si données en cache sur serveur A, puis </a:t>
+            </a:r>
+            <a:r>
+              <a:rPr lang="fr-FR" baseline="0" dirty="0" err="1" smtClean="0"/>
+              <a:t>reco</a:t>
+            </a:r>
+            <a:r>
+              <a:rPr lang="fr-FR" baseline="0" dirty="0" smtClean="0"/>
+              <a:t> sur serveur B, que se passe-t-il ?)</a:t>
+            </a:r>
+            <a:endParaRPr lang="fr-FR" dirty="0"/>
+          </a:p>
+        </p:txBody>
+      </p:sp>
+      <p:sp>
+        <p:nvSpPr>
+          <p:cNvPr id="4" name="Espace réservé du numéro de diapositive 3"/>
+          <p:cNvSpPr>
+            <a:spLocks noGrp="1"/>
+          </p:cNvSpPr>
+          <p:nvPr>
+            <p:ph type="sldNum" sz="quarter" idx="10"/>
+          </p:nvPr>
+        </p:nvSpPr>
+        <p:spPr/>
+        <p:txBody>
+          <a:bodyPr/>
+          <a:lstStyle/>
+          <a:p>
+            <a:fld id="{AA5DF8EF-0F82-44B3-979E-DBC26962337C}" type="slidenum">
+              <a:rPr lang="fr-FR" smtClean="0"/>
+              <a:t>7</a:t>
+            </a:fld>
+            <a:endParaRPr lang="fr-FR"/>
+          </a:p>
+        </p:txBody>
+      </p:sp>
+    </p:spTree>
+    <p:extLst>
+      <p:ext uri="{BB962C8B-B14F-4D97-AF65-F5344CB8AC3E}">
+        <p14:creationId xmlns:p14="http://schemas.microsoft.com/office/powerpoint/2010/main" val="3030127102"/>
+      </p:ext>
+    </p:extLst>
+  </p:cSld>
+  <p:clrMapOvr>
+    <a:masterClrMapping/>
+  </p:clrMapOvr>
+</p:notes>
+</file>
+
+<file path=ppt/notesSlides/notesSlide6.xml><?xml version="1.0" encoding="utf-8"?>
+<p:notes xmlns:a="http://schemas.openxmlformats.org/drawingml/2006/main" xmlns:r="http://schemas.openxmlformats.org/officeDocument/2006/relationships" xmlns:p="http://schemas.openxmlformats.org/presentationml/2006/main">
+  <p:cSld>
+    <p:spTree>
+      <p:nvGrpSpPr>
+        <p:cNvPr id="1" name=""/>
+        <p:cNvGrpSpPr/>
+        <p:nvPr/>
+      </p:nvGrpSpPr>
+      <p:grpSpPr>
+        <a:xfrm>
+          <a:off x="0" y="0"/>
+          <a:ext cx="0" cy="0"/>
+          <a:chOff x="0" y="0"/>
+          <a:chExt cx="0" cy="0"/>
+        </a:xfrm>
+      </p:grpSpPr>
+      <p:sp>
+        <p:nvSpPr>
+          <p:cNvPr id="2" name="Espace réservé de l'image des diapositives 1"/>
+          <p:cNvSpPr>
+            <a:spLocks noGrp="1" noRot="1" noChangeAspect="1"/>
+          </p:cNvSpPr>
+          <p:nvPr>
+            <p:ph type="sldImg"/>
+          </p:nvPr>
+        </p:nvSpPr>
+        <p:spPr/>
+      </p:sp>
+      <p:sp>
+        <p:nvSpPr>
+          <p:cNvPr id="3" name="Espace réservé des notes 2"/>
+          <p:cNvSpPr>
+            <a:spLocks noGrp="1"/>
+          </p:cNvSpPr>
+          <p:nvPr>
+            <p:ph type="body" idx="1"/>
+          </p:nvPr>
+        </p:nvSpPr>
+        <p:spPr/>
+        <p:txBody>
+          <a:bodyPr/>
+          <a:lstStyle/>
+          <a:p>
+            <a:endParaRPr lang="fr-FR" dirty="0"/>
+          </a:p>
+        </p:txBody>
+      </p:sp>
+      <p:sp>
+        <p:nvSpPr>
+          <p:cNvPr id="4" name="Espace réservé du numéro de diapositive 3"/>
+          <p:cNvSpPr>
+            <a:spLocks noGrp="1"/>
+          </p:cNvSpPr>
+          <p:nvPr>
+            <p:ph type="sldNum" sz="quarter" idx="10"/>
+          </p:nvPr>
+        </p:nvSpPr>
+        <p:spPr/>
+        <p:txBody>
+          <a:bodyPr/>
+          <a:lstStyle/>
+          <a:p>
+            <a:fld id="{AA5DF8EF-0F82-44B3-979E-DBC26962337C}" type="slidenum">
+              <a:rPr lang="fr-FR" smtClean="0"/>
+              <a:t>9</a:t>
+            </a:fld>
+            <a:endParaRPr lang="fr-FR"/>
+          </a:p>
+        </p:txBody>
+      </p:sp>
+    </p:spTree>
+    <p:extLst>
+      <p:ext uri="{BB962C8B-B14F-4D97-AF65-F5344CB8AC3E}">
+        <p14:creationId xmlns:p14="http://schemas.microsoft.com/office/powerpoint/2010/main" val="4070334496"/>
+      </p:ext>
+    </p:extLst>
+  </p:cSld>
+  <p:clrMapOvr>
+    <a:masterClrMapping/>
+  </p:clrMapOvr>
+</p:notes>
+</file>
+
+<file path=ppt/notesSlides/notesSlide7.xml><?xml version="1.0" encoding="utf-8"?>
+<p:notes xmlns:a="http://schemas.openxmlformats.org/drawingml/2006/main" xmlns:r="http://schemas.openxmlformats.org/officeDocument/2006/relationships" xmlns:p="http://schemas.openxmlformats.org/presentationml/2006/main">
+  <p:cSld>
+    <p:spTree>
+      <p:nvGrpSpPr>
+        <p:cNvPr id="1" name=""/>
+        <p:cNvGrpSpPr/>
+        <p:nvPr/>
+      </p:nvGrpSpPr>
+      <p:grpSpPr>
+        <a:xfrm>
+          <a:off x="0" y="0"/>
+          <a:ext cx="0" cy="0"/>
+          <a:chOff x="0" y="0"/>
+          <a:chExt cx="0" cy="0"/>
+        </a:xfrm>
+      </p:grpSpPr>
+      <p:sp>
+        <p:nvSpPr>
+          <p:cNvPr id="2" name="Espace réservé de l'image des diapositives 1"/>
+          <p:cNvSpPr>
+            <a:spLocks noGrp="1" noRot="1" noChangeAspect="1"/>
+          </p:cNvSpPr>
+          <p:nvPr>
+            <p:ph type="sldImg"/>
+          </p:nvPr>
+        </p:nvSpPr>
+        <p:spPr/>
+      </p:sp>
+      <p:sp>
+        <p:nvSpPr>
+          <p:cNvPr id="3" name="Espace réservé des notes 2"/>
+          <p:cNvSpPr>
+            <a:spLocks noGrp="1"/>
+          </p:cNvSpPr>
+          <p:nvPr>
+            <p:ph type="body" idx="1"/>
+          </p:nvPr>
+        </p:nvSpPr>
+        <p:spPr/>
+        <p:txBody>
+          <a:bodyPr/>
+          <a:lstStyle/>
+          <a:p>
+            <a:endParaRPr lang="fr-FR" dirty="0"/>
+          </a:p>
+        </p:txBody>
+      </p:sp>
+      <p:sp>
+        <p:nvSpPr>
+          <p:cNvPr id="4" name="Espace réservé du numéro de diapositive 3"/>
+          <p:cNvSpPr>
+            <a:spLocks noGrp="1"/>
+          </p:cNvSpPr>
+          <p:nvPr>
+            <p:ph type="sldNum" sz="quarter" idx="10"/>
+          </p:nvPr>
+        </p:nvSpPr>
+        <p:spPr/>
+        <p:txBody>
+          <a:bodyPr/>
+          <a:lstStyle/>
+          <a:p>
+            <a:fld id="{AA5DF8EF-0F82-44B3-979E-DBC26962337C}" type="slidenum">
+              <a:rPr lang="fr-FR" smtClean="0"/>
+              <a:t>10</a:t>
+            </a:fld>
+            <a:endParaRPr lang="fr-FR"/>
+          </a:p>
+        </p:txBody>
+      </p:sp>
+    </p:spTree>
+    <p:extLst>
+      <p:ext uri="{BB962C8B-B14F-4D97-AF65-F5344CB8AC3E}">
+        <p14:creationId xmlns:p14="http://schemas.microsoft.com/office/powerpoint/2010/main" val="1604332308"/>
+      </p:ext>
+    </p:extLst>
+  </p:cSld>
+  <p:clrMapOvr>
+    <a:masterClrMapping/>
+  </p:clrMapOvr>
+</p:notes>
+</file>
+
+<file path=ppt/notesSlides/notesSlide8.xml><?xml version="1.0" encoding="utf-8"?>
+<p:notes xmlns:a="http://schemas.openxmlformats.org/drawingml/2006/main" xmlns:r="http://schemas.openxmlformats.org/officeDocument/2006/relationships" xmlns:p="http://schemas.openxmlformats.org/presentationml/2006/main">
+  <p:cSld>
+    <p:spTree>
+      <p:nvGrpSpPr>
+        <p:cNvPr id="1" name=""/>
+        <p:cNvGrpSpPr/>
+        <p:nvPr/>
+      </p:nvGrpSpPr>
+      <p:grpSpPr>
+        <a:xfrm>
+          <a:off x="0" y="0"/>
+          <a:ext cx="0" cy="0"/>
+          <a:chOff x="0" y="0"/>
+          <a:chExt cx="0" cy="0"/>
+        </a:xfrm>
+      </p:grpSpPr>
+      <p:sp>
+        <p:nvSpPr>
+          <p:cNvPr id="2" name="Espace réservé de l'image des diapositives 1"/>
+          <p:cNvSpPr>
+            <a:spLocks noGrp="1" noRot="1" noChangeAspect="1"/>
+          </p:cNvSpPr>
+          <p:nvPr>
+            <p:ph type="sldImg"/>
+          </p:nvPr>
+        </p:nvSpPr>
+        <p:spPr/>
+      </p:sp>
+      <p:sp>
+        <p:nvSpPr>
+          <p:cNvPr id="3" name="Espace réservé des notes 2"/>
+          <p:cNvSpPr>
+            <a:spLocks noGrp="1"/>
+          </p:cNvSpPr>
+          <p:nvPr>
+            <p:ph type="body" idx="1"/>
+          </p:nvPr>
+        </p:nvSpPr>
+        <p:spPr/>
+        <p:txBody>
+          <a:bodyPr/>
+          <a:lstStyle/>
+          <a:p>
+            <a:endParaRPr lang="fr-FR" dirty="0"/>
+          </a:p>
+        </p:txBody>
+      </p:sp>
+      <p:sp>
+        <p:nvSpPr>
+          <p:cNvPr id="4" name="Espace réservé du numéro de diapositive 3"/>
+          <p:cNvSpPr>
+            <a:spLocks noGrp="1"/>
+          </p:cNvSpPr>
+          <p:nvPr>
+            <p:ph type="sldNum" sz="quarter" idx="10"/>
+          </p:nvPr>
+        </p:nvSpPr>
+        <p:spPr/>
+        <p:txBody>
+          <a:bodyPr/>
+          <a:lstStyle/>
+          <a:p>
+            <a:fld id="{AA5DF8EF-0F82-44B3-979E-DBC26962337C}" type="slidenum">
+              <a:rPr lang="fr-FR" smtClean="0"/>
+              <a:t>11</a:t>
+            </a:fld>
+            <a:endParaRPr lang="fr-FR"/>
+          </a:p>
+        </p:txBody>
+      </p:sp>
+    </p:spTree>
+    <p:extLst>
+      <p:ext uri="{BB962C8B-B14F-4D97-AF65-F5344CB8AC3E}">
+        <p14:creationId xmlns:p14="http://schemas.microsoft.com/office/powerpoint/2010/main" val="2637841300"/>
+      </p:ext>
+    </p:extLst>
+  </p:cSld>
+  <p:clrMapOvr>
+    <a:masterClrMapping/>
+  </p:clrMapOvr>
+</p:notes>
+</file>
+
+<file path=ppt/notesSlides/notesSlide9.xml><?xml version="1.0" encoding="utf-8"?>
+<p:notes xmlns:a="http://schemas.openxmlformats.org/drawingml/2006/main" xmlns:r="http://schemas.openxmlformats.org/officeDocument/2006/relationships" xmlns:p="http://schemas.openxmlformats.org/presentationml/2006/main">
+  <p:cSld>
+    <p:spTree>
+      <p:nvGrpSpPr>
+        <p:cNvPr id="1" name=""/>
+        <p:cNvGrpSpPr/>
+        <p:nvPr/>
+      </p:nvGrpSpPr>
+      <p:grpSpPr>
+        <a:xfrm>
+          <a:off x="0" y="0"/>
+          <a:ext cx="0" cy="0"/>
+          <a:chOff x="0" y="0"/>
+          <a:chExt cx="0" cy="0"/>
+        </a:xfrm>
+      </p:grpSpPr>
+      <p:sp>
+        <p:nvSpPr>
+          <p:cNvPr id="2" name="Espace réservé de l'image des diapositives 1"/>
+          <p:cNvSpPr>
+            <a:spLocks noGrp="1" noRot="1" noChangeAspect="1"/>
+          </p:cNvSpPr>
+          <p:nvPr>
+            <p:ph type="sldImg"/>
+          </p:nvPr>
+        </p:nvSpPr>
+        <p:spPr/>
+      </p:sp>
+      <p:sp>
+        <p:nvSpPr>
+          <p:cNvPr id="3" name="Espace réservé des notes 2"/>
+          <p:cNvSpPr>
+            <a:spLocks noGrp="1"/>
+          </p:cNvSpPr>
+          <p:nvPr>
+            <p:ph type="body" idx="1"/>
+          </p:nvPr>
+        </p:nvSpPr>
+        <p:spPr/>
+        <p:txBody>
+          <a:bodyPr/>
+          <a:lstStyle/>
+          <a:p>
+            <a:endParaRPr lang="fr-FR" dirty="0"/>
+          </a:p>
+        </p:txBody>
+      </p:sp>
+      <p:sp>
+        <p:nvSpPr>
+          <p:cNvPr id="4" name="Espace réservé du numéro de diapositive 3"/>
+          <p:cNvSpPr>
+            <a:spLocks noGrp="1"/>
+          </p:cNvSpPr>
+          <p:nvPr>
+            <p:ph type="sldNum" sz="quarter" idx="10"/>
+          </p:nvPr>
+        </p:nvSpPr>
+        <p:spPr/>
+        <p:txBody>
+          <a:bodyPr/>
+          <a:lstStyle/>
+          <a:p>
+            <a:fld id="{AA5DF8EF-0F82-44B3-979E-DBC26962337C}" type="slidenum">
+              <a:rPr lang="fr-FR" smtClean="0"/>
+              <a:t>12</a:t>
+            </a:fld>
+            <a:endParaRPr lang="fr-FR"/>
+          </a:p>
+        </p:txBody>
+      </p:sp>
+    </p:spTree>
+    <p:extLst>
+      <p:ext uri="{BB962C8B-B14F-4D97-AF65-F5344CB8AC3E}">
+        <p14:creationId xmlns:p14="http://schemas.microsoft.com/office/powerpoint/2010/main" val="840657671"/>
       </p:ext>
     </p:extLst>
   </p:cSld>
@@ -792,7 +1525,7 @@
           <p:cNvPr id="2" name="Titre 1">
             <a:extLst>
               <a:ext uri="{FF2B5EF4-FFF2-40B4-BE49-F238E27FC236}">
-                <a16:creationId xmlns:a16="http://schemas.microsoft.com/office/drawing/2014/main" id="{DF4E4E11-DA8D-412D-BBE8-3B751C2A5E3D}"/>
+                <a16:creationId xmlns="" xmlns:a16="http://schemas.microsoft.com/office/drawing/2014/main" id="{DF4E4E11-DA8D-412D-BBE8-3B751C2A5E3D}"/>
               </a:ext>
             </a:extLst>
           </p:cNvPr>
@@ -829,7 +1562,7 @@
           <p:cNvPr id="3" name="Sous-titre 2">
             <a:extLst>
               <a:ext uri="{FF2B5EF4-FFF2-40B4-BE49-F238E27FC236}">
-                <a16:creationId xmlns:a16="http://schemas.microsoft.com/office/drawing/2014/main" id="{AD5D98AA-9305-4C6C-8472-EC101BC2DD0B}"/>
+                <a16:creationId xmlns="" xmlns:a16="http://schemas.microsoft.com/office/drawing/2014/main" id="{AD5D98AA-9305-4C6C-8472-EC101BC2DD0B}"/>
               </a:ext>
             </a:extLst>
           </p:cNvPr>
@@ -899,7 +1632,7 @@
           <p:cNvPr id="4" name="Espace réservé de la date 3">
             <a:extLst>
               <a:ext uri="{FF2B5EF4-FFF2-40B4-BE49-F238E27FC236}">
-                <a16:creationId xmlns:a16="http://schemas.microsoft.com/office/drawing/2014/main" id="{E072392C-ABEC-453D-A10D-B39173FC0ED3}"/>
+                <a16:creationId xmlns="" xmlns:a16="http://schemas.microsoft.com/office/drawing/2014/main" id="{E072392C-ABEC-453D-A10D-B39173FC0ED3}"/>
               </a:ext>
             </a:extLst>
           </p:cNvPr>
@@ -917,7 +1650,7 @@
           <a:p>
             <a:fld id="{2A800B55-2EA3-4651-92C4-339DC2AA9BC2}" type="datetimeFigureOut">
               <a:rPr lang="fr-FR" smtClean="0"/>
-              <a:t>04/10/2019</a:t>
+              <a:t>22/10/2019</a:t>
             </a:fld>
             <a:endParaRPr lang="fr-FR"/>
           </a:p>
@@ -928,7 +1661,7 @@
           <p:cNvPr id="5" name="Espace réservé du pied de page 4">
             <a:extLst>
               <a:ext uri="{FF2B5EF4-FFF2-40B4-BE49-F238E27FC236}">
-                <a16:creationId xmlns:a16="http://schemas.microsoft.com/office/drawing/2014/main" id="{E68FFE94-A36D-4B51-935B-F6E8222CFD2C}"/>
+                <a16:creationId xmlns="" xmlns:a16="http://schemas.microsoft.com/office/drawing/2014/main" id="{E68FFE94-A36D-4B51-935B-F6E8222CFD2C}"/>
               </a:ext>
             </a:extLst>
           </p:cNvPr>
@@ -953,7 +1686,7 @@
           <p:cNvPr id="6" name="Espace réservé du numéro de diapositive 5">
             <a:extLst>
               <a:ext uri="{FF2B5EF4-FFF2-40B4-BE49-F238E27FC236}">
-                <a16:creationId xmlns:a16="http://schemas.microsoft.com/office/drawing/2014/main" id="{3F523C99-C106-42DF-9364-4707B2B24FD7}"/>
+                <a16:creationId xmlns="" xmlns:a16="http://schemas.microsoft.com/office/drawing/2014/main" id="{3F523C99-C106-42DF-9364-4707B2B24FD7}"/>
               </a:ext>
             </a:extLst>
           </p:cNvPr>
@@ -1012,7 +1745,7 @@
           <p:cNvPr id="2" name="Titre 1">
             <a:extLst>
               <a:ext uri="{FF2B5EF4-FFF2-40B4-BE49-F238E27FC236}">
-                <a16:creationId xmlns:a16="http://schemas.microsoft.com/office/drawing/2014/main" id="{E87DAE8B-27DF-4D90-AE74-E0DD532B0817}"/>
+                <a16:creationId xmlns="" xmlns:a16="http://schemas.microsoft.com/office/drawing/2014/main" id="{E87DAE8B-27DF-4D90-AE74-E0DD532B0817}"/>
               </a:ext>
             </a:extLst>
           </p:cNvPr>
@@ -1040,7 +1773,7 @@
           <p:cNvPr id="3" name="Espace réservé du texte vertical 2">
             <a:extLst>
               <a:ext uri="{FF2B5EF4-FFF2-40B4-BE49-F238E27FC236}">
-                <a16:creationId xmlns:a16="http://schemas.microsoft.com/office/drawing/2014/main" id="{549AFFE0-41BC-4C2B-A5FB-AB12D4625A36}"/>
+                <a16:creationId xmlns="" xmlns:a16="http://schemas.microsoft.com/office/drawing/2014/main" id="{549AFFE0-41BC-4C2B-A5FB-AB12D4625A36}"/>
               </a:ext>
             </a:extLst>
           </p:cNvPr>
@@ -1097,7 +1830,7 @@
           <p:cNvPr id="4" name="Espace réservé de la date 3">
             <a:extLst>
               <a:ext uri="{FF2B5EF4-FFF2-40B4-BE49-F238E27FC236}">
-                <a16:creationId xmlns:a16="http://schemas.microsoft.com/office/drawing/2014/main" id="{DB8F340C-A1F3-4050-8F9C-D4DD8DB5B9DC}"/>
+                <a16:creationId xmlns="" xmlns:a16="http://schemas.microsoft.com/office/drawing/2014/main" id="{DB8F340C-A1F3-4050-8F9C-D4DD8DB5B9DC}"/>
               </a:ext>
             </a:extLst>
           </p:cNvPr>
@@ -1115,7 +1848,7 @@
           <a:p>
             <a:fld id="{2A800B55-2EA3-4651-92C4-339DC2AA9BC2}" type="datetimeFigureOut">
               <a:rPr lang="fr-FR" smtClean="0"/>
-              <a:t>04/10/2019</a:t>
+              <a:t>22/10/2019</a:t>
             </a:fld>
             <a:endParaRPr lang="fr-FR"/>
           </a:p>
@@ -1126,7 +1859,7 @@
           <p:cNvPr id="5" name="Espace réservé du pied de page 4">
             <a:extLst>
               <a:ext uri="{FF2B5EF4-FFF2-40B4-BE49-F238E27FC236}">
-                <a16:creationId xmlns:a16="http://schemas.microsoft.com/office/drawing/2014/main" id="{F7F594BC-F10B-4ED2-A3AC-CAE990323AF3}"/>
+                <a16:creationId xmlns="" xmlns:a16="http://schemas.microsoft.com/office/drawing/2014/main" id="{F7F594BC-F10B-4ED2-A3AC-CAE990323AF3}"/>
               </a:ext>
             </a:extLst>
           </p:cNvPr>
@@ -1151,7 +1884,7 @@
           <p:cNvPr id="6" name="Espace réservé du numéro de diapositive 5">
             <a:extLst>
               <a:ext uri="{FF2B5EF4-FFF2-40B4-BE49-F238E27FC236}">
-                <a16:creationId xmlns:a16="http://schemas.microsoft.com/office/drawing/2014/main" id="{365E748B-E1AB-4A6D-9CE4-95E99DBDBB2F}"/>
+                <a16:creationId xmlns="" xmlns:a16="http://schemas.microsoft.com/office/drawing/2014/main" id="{365E748B-E1AB-4A6D-9CE4-95E99DBDBB2F}"/>
               </a:ext>
             </a:extLst>
           </p:cNvPr>
@@ -1210,7 +1943,7 @@
           <p:cNvPr id="2" name="Titre vertical 1">
             <a:extLst>
               <a:ext uri="{FF2B5EF4-FFF2-40B4-BE49-F238E27FC236}">
-                <a16:creationId xmlns:a16="http://schemas.microsoft.com/office/drawing/2014/main" id="{05E7939C-8B37-4734-8F8C-A8414F9F792B}"/>
+                <a16:creationId xmlns="" xmlns:a16="http://schemas.microsoft.com/office/drawing/2014/main" id="{05E7939C-8B37-4734-8F8C-A8414F9F792B}"/>
               </a:ext>
             </a:extLst>
           </p:cNvPr>
@@ -1243,7 +1976,7 @@
           <p:cNvPr id="3" name="Espace réservé du texte vertical 2">
             <a:extLst>
               <a:ext uri="{FF2B5EF4-FFF2-40B4-BE49-F238E27FC236}">
-                <a16:creationId xmlns:a16="http://schemas.microsoft.com/office/drawing/2014/main" id="{AE89D39F-65D8-4603-BF16-AF495D2B9E43}"/>
+                <a16:creationId xmlns="" xmlns:a16="http://schemas.microsoft.com/office/drawing/2014/main" id="{AE89D39F-65D8-4603-BF16-AF495D2B9E43}"/>
               </a:ext>
             </a:extLst>
           </p:cNvPr>
@@ -1305,7 +2038,7 @@
           <p:cNvPr id="4" name="Espace réservé de la date 3">
             <a:extLst>
               <a:ext uri="{FF2B5EF4-FFF2-40B4-BE49-F238E27FC236}">
-                <a16:creationId xmlns:a16="http://schemas.microsoft.com/office/drawing/2014/main" id="{ACF81B5C-12A7-4D4E-8DCC-9D5BB6E73C32}"/>
+                <a16:creationId xmlns="" xmlns:a16="http://schemas.microsoft.com/office/drawing/2014/main" id="{ACF81B5C-12A7-4D4E-8DCC-9D5BB6E73C32}"/>
               </a:ext>
             </a:extLst>
           </p:cNvPr>
@@ -1323,7 +2056,7 @@
           <a:p>
             <a:fld id="{2A800B55-2EA3-4651-92C4-339DC2AA9BC2}" type="datetimeFigureOut">
               <a:rPr lang="fr-FR" smtClean="0"/>
-              <a:t>04/10/2019</a:t>
+              <a:t>22/10/2019</a:t>
             </a:fld>
             <a:endParaRPr lang="fr-FR"/>
           </a:p>
@@ -1334,7 +2067,7 @@
           <p:cNvPr id="5" name="Espace réservé du pied de page 4">
             <a:extLst>
               <a:ext uri="{FF2B5EF4-FFF2-40B4-BE49-F238E27FC236}">
-                <a16:creationId xmlns:a16="http://schemas.microsoft.com/office/drawing/2014/main" id="{450DE91C-436F-49EE-932C-CB3F18D68A54}"/>
+                <a16:creationId xmlns="" xmlns:a16="http://schemas.microsoft.com/office/drawing/2014/main" id="{450DE91C-436F-49EE-932C-CB3F18D68A54}"/>
               </a:ext>
             </a:extLst>
           </p:cNvPr>
@@ -1359,7 +2092,7 @@
           <p:cNvPr id="6" name="Espace réservé du numéro de diapositive 5">
             <a:extLst>
               <a:ext uri="{FF2B5EF4-FFF2-40B4-BE49-F238E27FC236}">
-                <a16:creationId xmlns:a16="http://schemas.microsoft.com/office/drawing/2014/main" id="{E41F61F9-CAF1-4EAC-9F4A-223CD73210E8}"/>
+                <a16:creationId xmlns="" xmlns:a16="http://schemas.microsoft.com/office/drawing/2014/main" id="{E41F61F9-CAF1-4EAC-9F4A-223CD73210E8}"/>
               </a:ext>
             </a:extLst>
           </p:cNvPr>
@@ -1418,7 +2151,7 @@
           <p:cNvPr id="2" name="Titre 1">
             <a:extLst>
               <a:ext uri="{FF2B5EF4-FFF2-40B4-BE49-F238E27FC236}">
-                <a16:creationId xmlns:a16="http://schemas.microsoft.com/office/drawing/2014/main" id="{4D09D08A-FF68-4CD3-93F7-310DF1EB2A99}"/>
+                <a16:creationId xmlns="" xmlns:a16="http://schemas.microsoft.com/office/drawing/2014/main" id="{4D09D08A-FF68-4CD3-93F7-310DF1EB2A99}"/>
               </a:ext>
             </a:extLst>
           </p:cNvPr>
@@ -1446,7 +2179,7 @@
           <p:cNvPr id="3" name="Espace réservé du contenu 2">
             <a:extLst>
               <a:ext uri="{FF2B5EF4-FFF2-40B4-BE49-F238E27FC236}">
-                <a16:creationId xmlns:a16="http://schemas.microsoft.com/office/drawing/2014/main" id="{BFF0FD49-0C64-4BEA-881D-72B1E525A53A}"/>
+                <a16:creationId xmlns="" xmlns:a16="http://schemas.microsoft.com/office/drawing/2014/main" id="{BFF0FD49-0C64-4BEA-881D-72B1E525A53A}"/>
               </a:ext>
             </a:extLst>
           </p:cNvPr>
@@ -1503,7 +2236,7 @@
           <p:cNvPr id="4" name="Espace réservé de la date 3">
             <a:extLst>
               <a:ext uri="{FF2B5EF4-FFF2-40B4-BE49-F238E27FC236}">
-                <a16:creationId xmlns:a16="http://schemas.microsoft.com/office/drawing/2014/main" id="{DE72C803-F81A-43BD-8350-97DD13CB795A}"/>
+                <a16:creationId xmlns="" xmlns:a16="http://schemas.microsoft.com/office/drawing/2014/main" id="{DE72C803-F81A-43BD-8350-97DD13CB795A}"/>
               </a:ext>
             </a:extLst>
           </p:cNvPr>
@@ -1521,7 +2254,7 @@
           <a:p>
             <a:fld id="{2A800B55-2EA3-4651-92C4-339DC2AA9BC2}" type="datetimeFigureOut">
               <a:rPr lang="fr-FR" smtClean="0"/>
-              <a:t>04/10/2019</a:t>
+              <a:t>22/10/2019</a:t>
             </a:fld>
             <a:endParaRPr lang="fr-FR"/>
           </a:p>
@@ -1532,7 +2265,7 @@
           <p:cNvPr id="5" name="Espace réservé du pied de page 4">
             <a:extLst>
               <a:ext uri="{FF2B5EF4-FFF2-40B4-BE49-F238E27FC236}">
-                <a16:creationId xmlns:a16="http://schemas.microsoft.com/office/drawing/2014/main" id="{D8067F39-1428-4172-A1A3-100C8BA529B1}"/>
+                <a16:creationId xmlns="" xmlns:a16="http://schemas.microsoft.com/office/drawing/2014/main" id="{D8067F39-1428-4172-A1A3-100C8BA529B1}"/>
               </a:ext>
             </a:extLst>
           </p:cNvPr>
@@ -1557,7 +2290,7 @@
           <p:cNvPr id="6" name="Espace réservé du numéro de diapositive 5">
             <a:extLst>
               <a:ext uri="{FF2B5EF4-FFF2-40B4-BE49-F238E27FC236}">
-                <a16:creationId xmlns:a16="http://schemas.microsoft.com/office/drawing/2014/main" id="{42ADC425-EB66-4DE7-8FFA-E26E8536459A}"/>
+                <a16:creationId xmlns="" xmlns:a16="http://schemas.microsoft.com/office/drawing/2014/main" id="{42ADC425-EB66-4DE7-8FFA-E26E8536459A}"/>
               </a:ext>
             </a:extLst>
           </p:cNvPr>
@@ -1616,7 +2349,7 @@
           <p:cNvPr id="2" name="Titre 1">
             <a:extLst>
               <a:ext uri="{FF2B5EF4-FFF2-40B4-BE49-F238E27FC236}">
-                <a16:creationId xmlns:a16="http://schemas.microsoft.com/office/drawing/2014/main" id="{0A038BD4-7121-4438-8082-16FB84CEB353}"/>
+                <a16:creationId xmlns="" xmlns:a16="http://schemas.microsoft.com/office/drawing/2014/main" id="{0A038BD4-7121-4438-8082-16FB84CEB353}"/>
               </a:ext>
             </a:extLst>
           </p:cNvPr>
@@ -1653,7 +2386,7 @@
           <p:cNvPr id="3" name="Espace réservé du texte 2">
             <a:extLst>
               <a:ext uri="{FF2B5EF4-FFF2-40B4-BE49-F238E27FC236}">
-                <a16:creationId xmlns:a16="http://schemas.microsoft.com/office/drawing/2014/main" id="{D04C11B5-9A36-434D-A0F4-A6B818107B09}"/>
+                <a16:creationId xmlns="" xmlns:a16="http://schemas.microsoft.com/office/drawing/2014/main" id="{D04C11B5-9A36-434D-A0F4-A6B818107B09}"/>
               </a:ext>
             </a:extLst>
           </p:cNvPr>
@@ -1778,7 +2511,7 @@
           <p:cNvPr id="4" name="Espace réservé de la date 3">
             <a:extLst>
               <a:ext uri="{FF2B5EF4-FFF2-40B4-BE49-F238E27FC236}">
-                <a16:creationId xmlns:a16="http://schemas.microsoft.com/office/drawing/2014/main" id="{341A4AA7-C884-45AA-A680-F02F58BF5B20}"/>
+                <a16:creationId xmlns="" xmlns:a16="http://schemas.microsoft.com/office/drawing/2014/main" id="{341A4AA7-C884-45AA-A680-F02F58BF5B20}"/>
               </a:ext>
             </a:extLst>
           </p:cNvPr>
@@ -1796,7 +2529,7 @@
           <a:p>
             <a:fld id="{2A800B55-2EA3-4651-92C4-339DC2AA9BC2}" type="datetimeFigureOut">
               <a:rPr lang="fr-FR" smtClean="0"/>
-              <a:t>04/10/2019</a:t>
+              <a:t>22/10/2019</a:t>
             </a:fld>
             <a:endParaRPr lang="fr-FR"/>
           </a:p>
@@ -1807,7 +2540,7 @@
           <p:cNvPr id="5" name="Espace réservé du pied de page 4">
             <a:extLst>
               <a:ext uri="{FF2B5EF4-FFF2-40B4-BE49-F238E27FC236}">
-                <a16:creationId xmlns:a16="http://schemas.microsoft.com/office/drawing/2014/main" id="{0AE318B9-A553-4F4C-9F44-0774BAE0734E}"/>
+                <a16:creationId xmlns="" xmlns:a16="http://schemas.microsoft.com/office/drawing/2014/main" id="{0AE318B9-A553-4F4C-9F44-0774BAE0734E}"/>
               </a:ext>
             </a:extLst>
           </p:cNvPr>
@@ -1832,7 +2565,7 @@
           <p:cNvPr id="6" name="Espace réservé du numéro de diapositive 5">
             <a:extLst>
               <a:ext uri="{FF2B5EF4-FFF2-40B4-BE49-F238E27FC236}">
-                <a16:creationId xmlns:a16="http://schemas.microsoft.com/office/drawing/2014/main" id="{875B6979-B7D9-438E-B71F-A5E075D38E72}"/>
+                <a16:creationId xmlns="" xmlns:a16="http://schemas.microsoft.com/office/drawing/2014/main" id="{875B6979-B7D9-438E-B71F-A5E075D38E72}"/>
               </a:ext>
             </a:extLst>
           </p:cNvPr>
@@ -1891,7 +2624,7 @@
           <p:cNvPr id="2" name="Titre 1">
             <a:extLst>
               <a:ext uri="{FF2B5EF4-FFF2-40B4-BE49-F238E27FC236}">
-                <a16:creationId xmlns:a16="http://schemas.microsoft.com/office/drawing/2014/main" id="{10F80595-7C44-431A-BE0A-A901600D98B7}"/>
+                <a16:creationId xmlns="" xmlns:a16="http://schemas.microsoft.com/office/drawing/2014/main" id="{10F80595-7C44-431A-BE0A-A901600D98B7}"/>
               </a:ext>
             </a:extLst>
           </p:cNvPr>
@@ -1919,7 +2652,7 @@
           <p:cNvPr id="3" name="Espace réservé du contenu 2">
             <a:extLst>
               <a:ext uri="{FF2B5EF4-FFF2-40B4-BE49-F238E27FC236}">
-                <a16:creationId xmlns:a16="http://schemas.microsoft.com/office/drawing/2014/main" id="{02094895-672F-4845-B23C-D159A56BDAEF}"/>
+                <a16:creationId xmlns="" xmlns:a16="http://schemas.microsoft.com/office/drawing/2014/main" id="{02094895-672F-4845-B23C-D159A56BDAEF}"/>
               </a:ext>
             </a:extLst>
           </p:cNvPr>
@@ -1981,7 +2714,7 @@
           <p:cNvPr id="4" name="Espace réservé du contenu 3">
             <a:extLst>
               <a:ext uri="{FF2B5EF4-FFF2-40B4-BE49-F238E27FC236}">
-                <a16:creationId xmlns:a16="http://schemas.microsoft.com/office/drawing/2014/main" id="{42ABBCF1-9243-4A4D-9240-DCE832B366BC}"/>
+                <a16:creationId xmlns="" xmlns:a16="http://schemas.microsoft.com/office/drawing/2014/main" id="{42ABBCF1-9243-4A4D-9240-DCE832B366BC}"/>
               </a:ext>
             </a:extLst>
           </p:cNvPr>
@@ -2043,7 +2776,7 @@
           <p:cNvPr id="5" name="Espace réservé de la date 4">
             <a:extLst>
               <a:ext uri="{FF2B5EF4-FFF2-40B4-BE49-F238E27FC236}">
-                <a16:creationId xmlns:a16="http://schemas.microsoft.com/office/drawing/2014/main" id="{1194C6E9-766E-4398-B996-31F6BB51A58D}"/>
+                <a16:creationId xmlns="" xmlns:a16="http://schemas.microsoft.com/office/drawing/2014/main" id="{1194C6E9-766E-4398-B996-31F6BB51A58D}"/>
               </a:ext>
             </a:extLst>
           </p:cNvPr>
@@ -2061,7 +2794,7 @@
           <a:p>
             <a:fld id="{2A800B55-2EA3-4651-92C4-339DC2AA9BC2}" type="datetimeFigureOut">
               <a:rPr lang="fr-FR" smtClean="0"/>
-              <a:t>04/10/2019</a:t>
+              <a:t>22/10/2019</a:t>
             </a:fld>
             <a:endParaRPr lang="fr-FR"/>
           </a:p>
@@ -2072,7 +2805,7 @@
           <p:cNvPr id="6" name="Espace réservé du pied de page 5">
             <a:extLst>
               <a:ext uri="{FF2B5EF4-FFF2-40B4-BE49-F238E27FC236}">
-                <a16:creationId xmlns:a16="http://schemas.microsoft.com/office/drawing/2014/main" id="{2BD377AC-0D08-4B59-968C-29569CF3A508}"/>
+                <a16:creationId xmlns="" xmlns:a16="http://schemas.microsoft.com/office/drawing/2014/main" id="{2BD377AC-0D08-4B59-968C-29569CF3A508}"/>
               </a:ext>
             </a:extLst>
           </p:cNvPr>
@@ -2097,7 +2830,7 @@
           <p:cNvPr id="7" name="Espace réservé du numéro de diapositive 6">
             <a:extLst>
               <a:ext uri="{FF2B5EF4-FFF2-40B4-BE49-F238E27FC236}">
-                <a16:creationId xmlns:a16="http://schemas.microsoft.com/office/drawing/2014/main" id="{81220588-CE53-4903-B21F-653142A94B50}"/>
+                <a16:creationId xmlns="" xmlns:a16="http://schemas.microsoft.com/office/drawing/2014/main" id="{81220588-CE53-4903-B21F-653142A94B50}"/>
               </a:ext>
             </a:extLst>
           </p:cNvPr>
@@ -2156,7 +2889,7 @@
           <p:cNvPr id="2" name="Titre 1">
             <a:extLst>
               <a:ext uri="{FF2B5EF4-FFF2-40B4-BE49-F238E27FC236}">
-                <a16:creationId xmlns:a16="http://schemas.microsoft.com/office/drawing/2014/main" id="{FD939089-6CD6-4866-9B35-4DC2A2CABA23}"/>
+                <a16:creationId xmlns="" xmlns:a16="http://schemas.microsoft.com/office/drawing/2014/main" id="{FD939089-6CD6-4866-9B35-4DC2A2CABA23}"/>
               </a:ext>
             </a:extLst>
           </p:cNvPr>
@@ -2189,7 +2922,7 @@
           <p:cNvPr id="3" name="Espace réservé du texte 2">
             <a:extLst>
               <a:ext uri="{FF2B5EF4-FFF2-40B4-BE49-F238E27FC236}">
-                <a16:creationId xmlns:a16="http://schemas.microsoft.com/office/drawing/2014/main" id="{50405C07-73B1-4D8F-929F-4C92A36959DA}"/>
+                <a16:creationId xmlns="" xmlns:a16="http://schemas.microsoft.com/office/drawing/2014/main" id="{50405C07-73B1-4D8F-929F-4C92A36959DA}"/>
               </a:ext>
             </a:extLst>
           </p:cNvPr>
@@ -2260,7 +2993,7 @@
           <p:cNvPr id="4" name="Espace réservé du contenu 3">
             <a:extLst>
               <a:ext uri="{FF2B5EF4-FFF2-40B4-BE49-F238E27FC236}">
-                <a16:creationId xmlns:a16="http://schemas.microsoft.com/office/drawing/2014/main" id="{3AC8DFC7-4492-46B5-914E-4D705225289C}"/>
+                <a16:creationId xmlns="" xmlns:a16="http://schemas.microsoft.com/office/drawing/2014/main" id="{3AC8DFC7-4492-46B5-914E-4D705225289C}"/>
               </a:ext>
             </a:extLst>
           </p:cNvPr>
@@ -2322,7 +3055,7 @@
           <p:cNvPr id="5" name="Espace réservé du texte 4">
             <a:extLst>
               <a:ext uri="{FF2B5EF4-FFF2-40B4-BE49-F238E27FC236}">
-                <a16:creationId xmlns:a16="http://schemas.microsoft.com/office/drawing/2014/main" id="{CF23CD3B-4ED5-4840-BBAE-151B2DC17935}"/>
+                <a16:creationId xmlns="" xmlns:a16="http://schemas.microsoft.com/office/drawing/2014/main" id="{CF23CD3B-4ED5-4840-BBAE-151B2DC17935}"/>
               </a:ext>
             </a:extLst>
           </p:cNvPr>
@@ -2393,7 +3126,7 @@
           <p:cNvPr id="6" name="Espace réservé du contenu 5">
             <a:extLst>
               <a:ext uri="{FF2B5EF4-FFF2-40B4-BE49-F238E27FC236}">
-                <a16:creationId xmlns:a16="http://schemas.microsoft.com/office/drawing/2014/main" id="{D46734E5-EFE4-44D8-BCC3-E23E9C8D535F}"/>
+                <a16:creationId xmlns="" xmlns:a16="http://schemas.microsoft.com/office/drawing/2014/main" id="{D46734E5-EFE4-44D8-BCC3-E23E9C8D535F}"/>
               </a:ext>
             </a:extLst>
           </p:cNvPr>
@@ -2455,7 +3188,7 @@
           <p:cNvPr id="7" name="Espace réservé de la date 6">
             <a:extLst>
               <a:ext uri="{FF2B5EF4-FFF2-40B4-BE49-F238E27FC236}">
-                <a16:creationId xmlns:a16="http://schemas.microsoft.com/office/drawing/2014/main" id="{A9E2F8BA-7A20-41D3-83D9-90A875844CCB}"/>
+                <a16:creationId xmlns="" xmlns:a16="http://schemas.microsoft.com/office/drawing/2014/main" id="{A9E2F8BA-7A20-41D3-83D9-90A875844CCB}"/>
               </a:ext>
             </a:extLst>
           </p:cNvPr>
@@ -2473,7 +3206,7 @@
           <a:p>
             <a:fld id="{2A800B55-2EA3-4651-92C4-339DC2AA9BC2}" type="datetimeFigureOut">
               <a:rPr lang="fr-FR" smtClean="0"/>
-              <a:t>04/10/2019</a:t>
+              <a:t>22/10/2019</a:t>
             </a:fld>
             <a:endParaRPr lang="fr-FR"/>
           </a:p>
@@ -2484,7 +3217,7 @@
           <p:cNvPr id="8" name="Espace réservé du pied de page 7">
             <a:extLst>
               <a:ext uri="{FF2B5EF4-FFF2-40B4-BE49-F238E27FC236}">
-                <a16:creationId xmlns:a16="http://schemas.microsoft.com/office/drawing/2014/main" id="{ED47B89C-E096-47A1-9AFB-64C4010309DF}"/>
+                <a16:creationId xmlns="" xmlns:a16="http://schemas.microsoft.com/office/drawing/2014/main" id="{ED47B89C-E096-47A1-9AFB-64C4010309DF}"/>
               </a:ext>
             </a:extLst>
           </p:cNvPr>
@@ -2509,7 +3242,7 @@
           <p:cNvPr id="9" name="Espace réservé du numéro de diapositive 8">
             <a:extLst>
               <a:ext uri="{FF2B5EF4-FFF2-40B4-BE49-F238E27FC236}">
-                <a16:creationId xmlns:a16="http://schemas.microsoft.com/office/drawing/2014/main" id="{B19C7C5A-302A-430F-8197-C408A6665253}"/>
+                <a16:creationId xmlns="" xmlns:a16="http://schemas.microsoft.com/office/drawing/2014/main" id="{B19C7C5A-302A-430F-8197-C408A6665253}"/>
               </a:ext>
             </a:extLst>
           </p:cNvPr>
@@ -2568,7 +3301,7 @@
           <p:cNvPr id="2" name="Titre 1">
             <a:extLst>
               <a:ext uri="{FF2B5EF4-FFF2-40B4-BE49-F238E27FC236}">
-                <a16:creationId xmlns:a16="http://schemas.microsoft.com/office/drawing/2014/main" id="{C18F6853-A7C9-4CD8-9D6C-77EAAEDE244A}"/>
+                <a16:creationId xmlns="" xmlns:a16="http://schemas.microsoft.com/office/drawing/2014/main" id="{C18F6853-A7C9-4CD8-9D6C-77EAAEDE244A}"/>
               </a:ext>
             </a:extLst>
           </p:cNvPr>
@@ -2596,7 +3329,7 @@
           <p:cNvPr id="3" name="Espace réservé de la date 2">
             <a:extLst>
               <a:ext uri="{FF2B5EF4-FFF2-40B4-BE49-F238E27FC236}">
-                <a16:creationId xmlns:a16="http://schemas.microsoft.com/office/drawing/2014/main" id="{DB1ED275-A626-4112-ADB2-91A03C9A7837}"/>
+                <a16:creationId xmlns="" xmlns:a16="http://schemas.microsoft.com/office/drawing/2014/main" id="{DB1ED275-A626-4112-ADB2-91A03C9A7837}"/>
               </a:ext>
             </a:extLst>
           </p:cNvPr>
@@ -2614,7 +3347,7 @@
           <a:p>
             <a:fld id="{2A800B55-2EA3-4651-92C4-339DC2AA9BC2}" type="datetimeFigureOut">
               <a:rPr lang="fr-FR" smtClean="0"/>
-              <a:t>04/10/2019</a:t>
+              <a:t>22/10/2019</a:t>
             </a:fld>
             <a:endParaRPr lang="fr-FR"/>
           </a:p>
@@ -2625,7 +3358,7 @@
           <p:cNvPr id="4" name="Espace réservé du pied de page 3">
             <a:extLst>
               <a:ext uri="{FF2B5EF4-FFF2-40B4-BE49-F238E27FC236}">
-                <a16:creationId xmlns:a16="http://schemas.microsoft.com/office/drawing/2014/main" id="{76323347-74E3-494F-B07B-A39112D17431}"/>
+                <a16:creationId xmlns="" xmlns:a16="http://schemas.microsoft.com/office/drawing/2014/main" id="{76323347-74E3-494F-B07B-A39112D17431}"/>
               </a:ext>
             </a:extLst>
           </p:cNvPr>
@@ -2650,7 +3383,7 @@
           <p:cNvPr id="5" name="Espace réservé du numéro de diapositive 4">
             <a:extLst>
               <a:ext uri="{FF2B5EF4-FFF2-40B4-BE49-F238E27FC236}">
-                <a16:creationId xmlns:a16="http://schemas.microsoft.com/office/drawing/2014/main" id="{9D75BD3A-C4C2-4F79-BE02-F7B3DBB7B9B8}"/>
+                <a16:creationId xmlns="" xmlns:a16="http://schemas.microsoft.com/office/drawing/2014/main" id="{9D75BD3A-C4C2-4F79-BE02-F7B3DBB7B9B8}"/>
               </a:ext>
             </a:extLst>
           </p:cNvPr>
@@ -2709,7 +3442,7 @@
           <p:cNvPr id="2" name="Espace réservé de la date 1">
             <a:extLst>
               <a:ext uri="{FF2B5EF4-FFF2-40B4-BE49-F238E27FC236}">
-                <a16:creationId xmlns:a16="http://schemas.microsoft.com/office/drawing/2014/main" id="{C7D2A69A-C447-41E8-AD72-B8E00FFE4D29}"/>
+                <a16:creationId xmlns="" xmlns:a16="http://schemas.microsoft.com/office/drawing/2014/main" id="{C7D2A69A-C447-41E8-AD72-B8E00FFE4D29}"/>
               </a:ext>
             </a:extLst>
           </p:cNvPr>
@@ -2727,7 +3460,7 @@
           <a:p>
             <a:fld id="{2A800B55-2EA3-4651-92C4-339DC2AA9BC2}" type="datetimeFigureOut">
               <a:rPr lang="fr-FR" smtClean="0"/>
-              <a:t>04/10/2019</a:t>
+              <a:t>22/10/2019</a:t>
             </a:fld>
             <a:endParaRPr lang="fr-FR"/>
           </a:p>
@@ -2738,7 +3471,7 @@
           <p:cNvPr id="3" name="Espace réservé du pied de page 2">
             <a:extLst>
               <a:ext uri="{FF2B5EF4-FFF2-40B4-BE49-F238E27FC236}">
-                <a16:creationId xmlns:a16="http://schemas.microsoft.com/office/drawing/2014/main" id="{5A228405-8B7D-4C6E-B1B5-94CE799E8344}"/>
+                <a16:creationId xmlns="" xmlns:a16="http://schemas.microsoft.com/office/drawing/2014/main" id="{5A228405-8B7D-4C6E-B1B5-94CE799E8344}"/>
               </a:ext>
             </a:extLst>
           </p:cNvPr>
@@ -2763,7 +3496,7 @@
           <p:cNvPr id="4" name="Espace réservé du numéro de diapositive 3">
             <a:extLst>
               <a:ext uri="{FF2B5EF4-FFF2-40B4-BE49-F238E27FC236}">
-                <a16:creationId xmlns:a16="http://schemas.microsoft.com/office/drawing/2014/main" id="{60731EE1-EAEE-46BD-B72D-78A9736589E9}"/>
+                <a16:creationId xmlns="" xmlns:a16="http://schemas.microsoft.com/office/drawing/2014/main" id="{60731EE1-EAEE-46BD-B72D-78A9736589E9}"/>
               </a:ext>
             </a:extLst>
           </p:cNvPr>
@@ -2822,7 +3555,7 @@
           <p:cNvPr id="2" name="Titre 1">
             <a:extLst>
               <a:ext uri="{FF2B5EF4-FFF2-40B4-BE49-F238E27FC236}">
-                <a16:creationId xmlns:a16="http://schemas.microsoft.com/office/drawing/2014/main" id="{07A54846-F879-4693-B5CF-51B536C8DBB7}"/>
+                <a16:creationId xmlns="" xmlns:a16="http://schemas.microsoft.com/office/drawing/2014/main" id="{07A54846-F879-4693-B5CF-51B536C8DBB7}"/>
               </a:ext>
             </a:extLst>
           </p:cNvPr>
@@ -2859,7 +3592,7 @@
           <p:cNvPr id="3" name="Espace réservé du contenu 2">
             <a:extLst>
               <a:ext uri="{FF2B5EF4-FFF2-40B4-BE49-F238E27FC236}">
-                <a16:creationId xmlns:a16="http://schemas.microsoft.com/office/drawing/2014/main" id="{119F4288-69AE-48E3-8E6C-4C9C90E79BBB}"/>
+                <a16:creationId xmlns="" xmlns:a16="http://schemas.microsoft.com/office/drawing/2014/main" id="{119F4288-69AE-48E3-8E6C-4C9C90E79BBB}"/>
               </a:ext>
             </a:extLst>
           </p:cNvPr>
@@ -2949,7 +3682,7 @@
           <p:cNvPr id="4" name="Espace réservé du texte 3">
             <a:extLst>
               <a:ext uri="{FF2B5EF4-FFF2-40B4-BE49-F238E27FC236}">
-                <a16:creationId xmlns:a16="http://schemas.microsoft.com/office/drawing/2014/main" id="{DBF9535D-65B7-41E7-9B92-E7930DFFCD2D}"/>
+                <a16:creationId xmlns="" xmlns:a16="http://schemas.microsoft.com/office/drawing/2014/main" id="{DBF9535D-65B7-41E7-9B92-E7930DFFCD2D}"/>
               </a:ext>
             </a:extLst>
           </p:cNvPr>
@@ -3020,7 +3753,7 @@
           <p:cNvPr id="5" name="Espace réservé de la date 4">
             <a:extLst>
               <a:ext uri="{FF2B5EF4-FFF2-40B4-BE49-F238E27FC236}">
-                <a16:creationId xmlns:a16="http://schemas.microsoft.com/office/drawing/2014/main" id="{66DF377B-B49A-490C-A248-FE77552DE03E}"/>
+                <a16:creationId xmlns="" xmlns:a16="http://schemas.microsoft.com/office/drawing/2014/main" id="{66DF377B-B49A-490C-A248-FE77552DE03E}"/>
               </a:ext>
             </a:extLst>
           </p:cNvPr>
@@ -3038,7 +3771,7 @@
           <a:p>
             <a:fld id="{2A800B55-2EA3-4651-92C4-339DC2AA9BC2}" type="datetimeFigureOut">
               <a:rPr lang="fr-FR" smtClean="0"/>
-              <a:t>04/10/2019</a:t>
+              <a:t>22/10/2019</a:t>
             </a:fld>
             <a:endParaRPr lang="fr-FR"/>
           </a:p>
@@ -3049,7 +3782,7 @@
           <p:cNvPr id="6" name="Espace réservé du pied de page 5">
             <a:extLst>
               <a:ext uri="{FF2B5EF4-FFF2-40B4-BE49-F238E27FC236}">
-                <a16:creationId xmlns:a16="http://schemas.microsoft.com/office/drawing/2014/main" id="{C59A076D-C7FB-4980-B551-B9A069EC93DC}"/>
+                <a16:creationId xmlns="" xmlns:a16="http://schemas.microsoft.com/office/drawing/2014/main" id="{C59A076D-C7FB-4980-B551-B9A069EC93DC}"/>
               </a:ext>
             </a:extLst>
           </p:cNvPr>
@@ -3074,7 +3807,7 @@
           <p:cNvPr id="7" name="Espace réservé du numéro de diapositive 6">
             <a:extLst>
               <a:ext uri="{FF2B5EF4-FFF2-40B4-BE49-F238E27FC236}">
-                <a16:creationId xmlns:a16="http://schemas.microsoft.com/office/drawing/2014/main" id="{438B01D0-B4B4-4F25-A0E4-03BB4922A705}"/>
+                <a16:creationId xmlns="" xmlns:a16="http://schemas.microsoft.com/office/drawing/2014/main" id="{438B01D0-B4B4-4F25-A0E4-03BB4922A705}"/>
               </a:ext>
             </a:extLst>
           </p:cNvPr>
@@ -3133,7 +3866,7 @@
           <p:cNvPr id="2" name="Titre 1">
             <a:extLst>
               <a:ext uri="{FF2B5EF4-FFF2-40B4-BE49-F238E27FC236}">
-                <a16:creationId xmlns:a16="http://schemas.microsoft.com/office/drawing/2014/main" id="{26D4B942-4C0A-41F5-AA39-345ED0E6B536}"/>
+                <a16:creationId xmlns="" xmlns:a16="http://schemas.microsoft.com/office/drawing/2014/main" id="{26D4B942-4C0A-41F5-AA39-345ED0E6B536}"/>
               </a:ext>
             </a:extLst>
           </p:cNvPr>
@@ -3170,7 +3903,7 @@
           <p:cNvPr id="3" name="Espace réservé pour une image  2">
             <a:extLst>
               <a:ext uri="{FF2B5EF4-FFF2-40B4-BE49-F238E27FC236}">
-                <a16:creationId xmlns:a16="http://schemas.microsoft.com/office/drawing/2014/main" id="{F17C59DA-7D98-4156-9346-D57842D00184}"/>
+                <a16:creationId xmlns="" xmlns:a16="http://schemas.microsoft.com/office/drawing/2014/main" id="{F17C59DA-7D98-4156-9346-D57842D00184}"/>
               </a:ext>
             </a:extLst>
           </p:cNvPr>
@@ -3237,7 +3970,7 @@
           <p:cNvPr id="4" name="Espace réservé du texte 3">
             <a:extLst>
               <a:ext uri="{FF2B5EF4-FFF2-40B4-BE49-F238E27FC236}">
-                <a16:creationId xmlns:a16="http://schemas.microsoft.com/office/drawing/2014/main" id="{358A1ED1-08F5-4C35-A27E-32DB2D87887A}"/>
+                <a16:creationId xmlns="" xmlns:a16="http://schemas.microsoft.com/office/drawing/2014/main" id="{358A1ED1-08F5-4C35-A27E-32DB2D87887A}"/>
               </a:ext>
             </a:extLst>
           </p:cNvPr>
@@ -3308,7 +4041,7 @@
           <p:cNvPr id="5" name="Espace réservé de la date 4">
             <a:extLst>
               <a:ext uri="{FF2B5EF4-FFF2-40B4-BE49-F238E27FC236}">
-                <a16:creationId xmlns:a16="http://schemas.microsoft.com/office/drawing/2014/main" id="{5188F3B0-4D1A-4D14-83C2-0A63544E08A8}"/>
+                <a16:creationId xmlns="" xmlns:a16="http://schemas.microsoft.com/office/drawing/2014/main" id="{5188F3B0-4D1A-4D14-83C2-0A63544E08A8}"/>
               </a:ext>
             </a:extLst>
           </p:cNvPr>
@@ -3326,7 +4059,7 @@
           <a:p>
             <a:fld id="{2A800B55-2EA3-4651-92C4-339DC2AA9BC2}" type="datetimeFigureOut">
               <a:rPr lang="fr-FR" smtClean="0"/>
-              <a:t>04/10/2019</a:t>
+              <a:t>22/10/2019</a:t>
             </a:fld>
             <a:endParaRPr lang="fr-FR"/>
           </a:p>
@@ -3337,7 +4070,7 @@
           <p:cNvPr id="6" name="Espace réservé du pied de page 5">
             <a:extLst>
               <a:ext uri="{FF2B5EF4-FFF2-40B4-BE49-F238E27FC236}">
-                <a16:creationId xmlns:a16="http://schemas.microsoft.com/office/drawing/2014/main" id="{3C9ED83A-B044-46B9-BCA1-75DC64911149}"/>
+                <a16:creationId xmlns="" xmlns:a16="http://schemas.microsoft.com/office/drawing/2014/main" id="{3C9ED83A-B044-46B9-BCA1-75DC64911149}"/>
               </a:ext>
             </a:extLst>
           </p:cNvPr>
@@ -3362,7 +4095,7 @@
           <p:cNvPr id="7" name="Espace réservé du numéro de diapositive 6">
             <a:extLst>
               <a:ext uri="{FF2B5EF4-FFF2-40B4-BE49-F238E27FC236}">
-                <a16:creationId xmlns:a16="http://schemas.microsoft.com/office/drawing/2014/main" id="{6AA90CDE-E7B6-424D-8248-C8DFE754B69E}"/>
+                <a16:creationId xmlns="" xmlns:a16="http://schemas.microsoft.com/office/drawing/2014/main" id="{6AA90CDE-E7B6-424D-8248-C8DFE754B69E}"/>
               </a:ext>
             </a:extLst>
           </p:cNvPr>
@@ -3426,7 +4159,7 @@
           <p:cNvPr id="2" name="Espace réservé du titre 1">
             <a:extLst>
               <a:ext uri="{FF2B5EF4-FFF2-40B4-BE49-F238E27FC236}">
-                <a16:creationId xmlns:a16="http://schemas.microsoft.com/office/drawing/2014/main" id="{177B3A7E-34DB-41F4-BDAB-166714BE8D81}"/>
+                <a16:creationId xmlns="" xmlns:a16="http://schemas.microsoft.com/office/drawing/2014/main" id="{177B3A7E-34DB-41F4-BDAB-166714BE8D81}"/>
               </a:ext>
             </a:extLst>
           </p:cNvPr>
@@ -3464,7 +4197,7 @@
           <p:cNvPr id="3" name="Espace réservé du texte 2">
             <a:extLst>
               <a:ext uri="{FF2B5EF4-FFF2-40B4-BE49-F238E27FC236}">
-                <a16:creationId xmlns:a16="http://schemas.microsoft.com/office/drawing/2014/main" id="{6FA69278-9D5C-4046-BAFB-5254BDC0F087}"/>
+                <a16:creationId xmlns="" xmlns:a16="http://schemas.microsoft.com/office/drawing/2014/main" id="{6FA69278-9D5C-4046-BAFB-5254BDC0F087}"/>
               </a:ext>
             </a:extLst>
           </p:cNvPr>
@@ -3531,7 +4264,7 @@
           <p:cNvPr id="4" name="Espace réservé de la date 3">
             <a:extLst>
               <a:ext uri="{FF2B5EF4-FFF2-40B4-BE49-F238E27FC236}">
-                <a16:creationId xmlns:a16="http://schemas.microsoft.com/office/drawing/2014/main" id="{52760642-CBE3-4711-B94F-63F0DCD2C630}"/>
+                <a16:creationId xmlns="" xmlns:a16="http://schemas.microsoft.com/office/drawing/2014/main" id="{52760642-CBE3-4711-B94F-63F0DCD2C630}"/>
               </a:ext>
             </a:extLst>
           </p:cNvPr>
@@ -3567,7 +4300,7 @@
           <a:p>
             <a:fld id="{2A800B55-2EA3-4651-92C4-339DC2AA9BC2}" type="datetimeFigureOut">
               <a:rPr lang="fr-FR" smtClean="0"/>
-              <a:t>04/10/2019</a:t>
+              <a:t>22/10/2019</a:t>
             </a:fld>
             <a:endParaRPr lang="fr-FR"/>
           </a:p>
@@ -3578,7 +4311,7 @@
           <p:cNvPr id="5" name="Espace réservé du pied de page 4">
             <a:extLst>
               <a:ext uri="{FF2B5EF4-FFF2-40B4-BE49-F238E27FC236}">
-                <a16:creationId xmlns:a16="http://schemas.microsoft.com/office/drawing/2014/main" id="{3BE13B01-4E78-4C0A-8396-EA65B3B2F989}"/>
+                <a16:creationId xmlns="" xmlns:a16="http://schemas.microsoft.com/office/drawing/2014/main" id="{3BE13B01-4E78-4C0A-8396-EA65B3B2F989}"/>
               </a:ext>
             </a:extLst>
           </p:cNvPr>
@@ -3621,7 +4354,7 @@
           <p:cNvPr id="6" name="Espace réservé du numéro de diapositive 5">
             <a:extLst>
               <a:ext uri="{FF2B5EF4-FFF2-40B4-BE49-F238E27FC236}">
-                <a16:creationId xmlns:a16="http://schemas.microsoft.com/office/drawing/2014/main" id="{FD2E27CE-48E6-47AC-B12A-0FAB76D3BEC0}"/>
+                <a16:creationId xmlns="" xmlns:a16="http://schemas.microsoft.com/office/drawing/2014/main" id="{FD2E27CE-48E6-47AC-B12A-0FAB76D3BEC0}"/>
               </a:ext>
             </a:extLst>
           </p:cNvPr>
@@ -3989,7 +4722,7 @@
           <p:cNvPr id="12" name="Image 11">
             <a:extLst>
               <a:ext uri="{FF2B5EF4-FFF2-40B4-BE49-F238E27FC236}">
-                <a16:creationId xmlns:a16="http://schemas.microsoft.com/office/drawing/2014/main" id="{EACD06AD-1B6B-4ECB-A999-9C82621090FC}"/>
+                <a16:creationId xmlns="" xmlns:a16="http://schemas.microsoft.com/office/drawing/2014/main" id="{EACD06AD-1B6B-4ECB-A999-9C82621090FC}"/>
               </a:ext>
             </a:extLst>
           </p:cNvPr>
@@ -4030,6 +4763,340 @@
   <p:clrMapOvr>
     <a:masterClrMapping/>
   </p:clrMapOvr>
+  <p:timing>
+    <p:tnLst>
+      <p:par>
+        <p:cTn id="1" dur="indefinite" restart="never" nodeType="tmRoot"/>
+      </p:par>
+    </p:tnLst>
+  </p:timing>
+</p:sld>
+</file>
+
+<file path=ppt/slides/slide10.xml><?xml version="1.0" encoding="utf-8"?>
+<p:sld xmlns:a="http://schemas.openxmlformats.org/drawingml/2006/main" xmlns:r="http://schemas.openxmlformats.org/officeDocument/2006/relationships" xmlns:p="http://schemas.openxmlformats.org/presentationml/2006/main">
+  <p:cSld>
+    <p:spTree>
+      <p:nvGrpSpPr>
+        <p:cNvPr id="1" name=""/>
+        <p:cNvGrpSpPr/>
+        <p:nvPr/>
+      </p:nvGrpSpPr>
+      <p:grpSpPr>
+        <a:xfrm>
+          <a:off x="0" y="0"/>
+          <a:ext cx="0" cy="0"/>
+          <a:chOff x="0" y="0"/>
+          <a:chExt cx="0" cy="0"/>
+        </a:xfrm>
+      </p:grpSpPr>
+      <p:pic>
+        <p:nvPicPr>
+          <p:cNvPr id="5" name="Image 4">
+            <a:extLst>
+              <a:ext uri="{FF2B5EF4-FFF2-40B4-BE49-F238E27FC236}">
+                <a16:creationId xmlns="" xmlns:a16="http://schemas.microsoft.com/office/drawing/2014/main" id="{D91F6CE4-A0FB-4282-9B85-47FA5527C736}"/>
+              </a:ext>
+            </a:extLst>
+          </p:cNvPr>
+          <p:cNvPicPr>
+            <a:picLocks noChangeAspect="1"/>
+          </p:cNvPicPr>
+          <p:nvPr/>
+        </p:nvPicPr>
+        <p:blipFill>
+          <a:blip r:embed="rId3" cstate="print">
+            <a:extLst>
+              <a:ext uri="{28A0092B-C50C-407E-A947-70E740481C1C}">
+                <a14:useLocalDpi xmlns:a14="http://schemas.microsoft.com/office/drawing/2010/main" val="0"/>
+              </a:ext>
+            </a:extLst>
+          </a:blip>
+          <a:stretch>
+            <a:fillRect/>
+          </a:stretch>
+        </p:blipFill>
+        <p:spPr>
+          <a:xfrm>
+            <a:off x="293615" y="6291743"/>
+            <a:ext cx="10508871" cy="272654"/>
+          </a:xfrm>
+          <a:prstGeom prst="rect">
+            <a:avLst/>
+          </a:prstGeom>
+        </p:spPr>
+      </p:pic>
+      <p:pic>
+        <p:nvPicPr>
+          <p:cNvPr id="6" name="Image 5">
+            <a:extLst>
+              <a:ext uri="{FF2B5EF4-FFF2-40B4-BE49-F238E27FC236}">
+                <a16:creationId xmlns="" xmlns:a16="http://schemas.microsoft.com/office/drawing/2014/main" id="{B6F51BA5-E830-46D2-B1E2-3A2C10F760E7}"/>
+              </a:ext>
+            </a:extLst>
+          </p:cNvPr>
+          <p:cNvPicPr>
+            <a:picLocks noChangeAspect="1"/>
+          </p:cNvPicPr>
+          <p:nvPr/>
+        </p:nvPicPr>
+        <p:blipFill>
+          <a:blip r:embed="rId4" cstate="print">
+            <a:extLst>
+              <a:ext uri="{28A0092B-C50C-407E-A947-70E740481C1C}">
+                <a14:useLocalDpi xmlns:a14="http://schemas.microsoft.com/office/drawing/2010/main" val="0"/>
+              </a:ext>
+            </a:extLst>
+          </a:blip>
+          <a:stretch>
+            <a:fillRect/>
+          </a:stretch>
+        </p:blipFill>
+        <p:spPr>
+          <a:xfrm>
+            <a:off x="10802486" y="5912350"/>
+            <a:ext cx="1193772" cy="787940"/>
+          </a:xfrm>
+          <a:prstGeom prst="rect">
+            <a:avLst/>
+          </a:prstGeom>
+        </p:spPr>
+      </p:pic>
+    </p:spTree>
+    <p:extLst>
+      <p:ext uri="{BB962C8B-B14F-4D97-AF65-F5344CB8AC3E}">
+        <p14:creationId xmlns:p14="http://schemas.microsoft.com/office/powerpoint/2010/main" val="3806234110"/>
+      </p:ext>
+    </p:extLst>
+  </p:cSld>
+  <p:clrMapOvr>
+    <a:masterClrMapping/>
+  </p:clrMapOvr>
+  <p:timing>
+    <p:tnLst>
+      <p:par>
+        <p:cTn id="1" dur="indefinite" restart="never" nodeType="tmRoot"/>
+      </p:par>
+    </p:tnLst>
+  </p:timing>
+</p:sld>
+</file>
+
+<file path=ppt/slides/slide11.xml><?xml version="1.0" encoding="utf-8"?>
+<p:sld xmlns:a="http://schemas.openxmlformats.org/drawingml/2006/main" xmlns:r="http://schemas.openxmlformats.org/officeDocument/2006/relationships" xmlns:p="http://schemas.openxmlformats.org/presentationml/2006/main">
+  <p:cSld>
+    <p:spTree>
+      <p:nvGrpSpPr>
+        <p:cNvPr id="1" name=""/>
+        <p:cNvGrpSpPr/>
+        <p:nvPr/>
+      </p:nvGrpSpPr>
+      <p:grpSpPr>
+        <a:xfrm>
+          <a:off x="0" y="0"/>
+          <a:ext cx="0" cy="0"/>
+          <a:chOff x="0" y="0"/>
+          <a:chExt cx="0" cy="0"/>
+        </a:xfrm>
+      </p:grpSpPr>
+      <p:pic>
+        <p:nvPicPr>
+          <p:cNvPr id="5" name="Image 4">
+            <a:extLst>
+              <a:ext uri="{FF2B5EF4-FFF2-40B4-BE49-F238E27FC236}">
+                <a16:creationId xmlns="" xmlns:a16="http://schemas.microsoft.com/office/drawing/2014/main" id="{D91F6CE4-A0FB-4282-9B85-47FA5527C736}"/>
+              </a:ext>
+            </a:extLst>
+          </p:cNvPr>
+          <p:cNvPicPr>
+            <a:picLocks noChangeAspect="1"/>
+          </p:cNvPicPr>
+          <p:nvPr/>
+        </p:nvPicPr>
+        <p:blipFill>
+          <a:blip r:embed="rId3" cstate="print">
+            <a:extLst>
+              <a:ext uri="{28A0092B-C50C-407E-A947-70E740481C1C}">
+                <a14:useLocalDpi xmlns:a14="http://schemas.microsoft.com/office/drawing/2010/main" val="0"/>
+              </a:ext>
+            </a:extLst>
+          </a:blip>
+          <a:stretch>
+            <a:fillRect/>
+          </a:stretch>
+        </p:blipFill>
+        <p:spPr>
+          <a:xfrm>
+            <a:off x="293615" y="6291743"/>
+            <a:ext cx="10508871" cy="272654"/>
+          </a:xfrm>
+          <a:prstGeom prst="rect">
+            <a:avLst/>
+          </a:prstGeom>
+        </p:spPr>
+      </p:pic>
+      <p:pic>
+        <p:nvPicPr>
+          <p:cNvPr id="6" name="Image 5">
+            <a:extLst>
+              <a:ext uri="{FF2B5EF4-FFF2-40B4-BE49-F238E27FC236}">
+                <a16:creationId xmlns="" xmlns:a16="http://schemas.microsoft.com/office/drawing/2014/main" id="{B6F51BA5-E830-46D2-B1E2-3A2C10F760E7}"/>
+              </a:ext>
+            </a:extLst>
+          </p:cNvPr>
+          <p:cNvPicPr>
+            <a:picLocks noChangeAspect="1"/>
+          </p:cNvPicPr>
+          <p:nvPr/>
+        </p:nvPicPr>
+        <p:blipFill>
+          <a:blip r:embed="rId4" cstate="print">
+            <a:extLst>
+              <a:ext uri="{28A0092B-C50C-407E-A947-70E740481C1C}">
+                <a14:useLocalDpi xmlns:a14="http://schemas.microsoft.com/office/drawing/2010/main" val="0"/>
+              </a:ext>
+            </a:extLst>
+          </a:blip>
+          <a:stretch>
+            <a:fillRect/>
+          </a:stretch>
+        </p:blipFill>
+        <p:spPr>
+          <a:xfrm>
+            <a:off x="10802486" y="5912350"/>
+            <a:ext cx="1193772" cy="787940"/>
+          </a:xfrm>
+          <a:prstGeom prst="rect">
+            <a:avLst/>
+          </a:prstGeom>
+        </p:spPr>
+      </p:pic>
+    </p:spTree>
+    <p:extLst>
+      <p:ext uri="{BB962C8B-B14F-4D97-AF65-F5344CB8AC3E}">
+        <p14:creationId xmlns:p14="http://schemas.microsoft.com/office/powerpoint/2010/main" val="1284584122"/>
+      </p:ext>
+    </p:extLst>
+  </p:cSld>
+  <p:clrMapOvr>
+    <a:masterClrMapping/>
+  </p:clrMapOvr>
+  <p:timing>
+    <p:tnLst>
+      <p:par>
+        <p:cTn id="1" dur="indefinite" restart="never" nodeType="tmRoot"/>
+      </p:par>
+    </p:tnLst>
+  </p:timing>
+</p:sld>
+</file>
+
+<file path=ppt/slides/slide12.xml><?xml version="1.0" encoding="utf-8"?>
+<p:sld xmlns:a="http://schemas.openxmlformats.org/drawingml/2006/main" xmlns:r="http://schemas.openxmlformats.org/officeDocument/2006/relationships" xmlns:p="http://schemas.openxmlformats.org/presentationml/2006/main">
+  <p:cSld>
+    <p:spTree>
+      <p:nvGrpSpPr>
+        <p:cNvPr id="1" name=""/>
+        <p:cNvGrpSpPr/>
+        <p:nvPr/>
+      </p:nvGrpSpPr>
+      <p:grpSpPr>
+        <a:xfrm>
+          <a:off x="0" y="0"/>
+          <a:ext cx="0" cy="0"/>
+          <a:chOff x="0" y="0"/>
+          <a:chExt cx="0" cy="0"/>
+        </a:xfrm>
+      </p:grpSpPr>
+      <p:pic>
+        <p:nvPicPr>
+          <p:cNvPr id="5" name="Image 4">
+            <a:extLst>
+              <a:ext uri="{FF2B5EF4-FFF2-40B4-BE49-F238E27FC236}">
+                <a16:creationId xmlns="" xmlns:a16="http://schemas.microsoft.com/office/drawing/2014/main" id="{D91F6CE4-A0FB-4282-9B85-47FA5527C736}"/>
+              </a:ext>
+            </a:extLst>
+          </p:cNvPr>
+          <p:cNvPicPr>
+            <a:picLocks noChangeAspect="1"/>
+          </p:cNvPicPr>
+          <p:nvPr/>
+        </p:nvPicPr>
+        <p:blipFill>
+          <a:blip r:embed="rId3" cstate="print">
+            <a:extLst>
+              <a:ext uri="{28A0092B-C50C-407E-A947-70E740481C1C}">
+                <a14:useLocalDpi xmlns:a14="http://schemas.microsoft.com/office/drawing/2010/main" val="0"/>
+              </a:ext>
+            </a:extLst>
+          </a:blip>
+          <a:stretch>
+            <a:fillRect/>
+          </a:stretch>
+        </p:blipFill>
+        <p:spPr>
+          <a:xfrm>
+            <a:off x="293615" y="6291743"/>
+            <a:ext cx="10508871" cy="272654"/>
+          </a:xfrm>
+          <a:prstGeom prst="rect">
+            <a:avLst/>
+          </a:prstGeom>
+        </p:spPr>
+      </p:pic>
+      <p:pic>
+        <p:nvPicPr>
+          <p:cNvPr id="6" name="Image 5">
+            <a:extLst>
+              <a:ext uri="{FF2B5EF4-FFF2-40B4-BE49-F238E27FC236}">
+                <a16:creationId xmlns="" xmlns:a16="http://schemas.microsoft.com/office/drawing/2014/main" id="{B6F51BA5-E830-46D2-B1E2-3A2C10F760E7}"/>
+              </a:ext>
+            </a:extLst>
+          </p:cNvPr>
+          <p:cNvPicPr>
+            <a:picLocks noChangeAspect="1"/>
+          </p:cNvPicPr>
+          <p:nvPr/>
+        </p:nvPicPr>
+        <p:blipFill>
+          <a:blip r:embed="rId4" cstate="print">
+            <a:extLst>
+              <a:ext uri="{28A0092B-C50C-407E-A947-70E740481C1C}">
+                <a14:useLocalDpi xmlns:a14="http://schemas.microsoft.com/office/drawing/2010/main" val="0"/>
+              </a:ext>
+            </a:extLst>
+          </a:blip>
+          <a:stretch>
+            <a:fillRect/>
+          </a:stretch>
+        </p:blipFill>
+        <p:spPr>
+          <a:xfrm>
+            <a:off x="10802486" y="5912350"/>
+            <a:ext cx="1193772" cy="787940"/>
+          </a:xfrm>
+          <a:prstGeom prst="rect">
+            <a:avLst/>
+          </a:prstGeom>
+        </p:spPr>
+      </p:pic>
+    </p:spTree>
+    <p:extLst>
+      <p:ext uri="{BB962C8B-B14F-4D97-AF65-F5344CB8AC3E}">
+        <p14:creationId xmlns:p14="http://schemas.microsoft.com/office/powerpoint/2010/main" val="573561870"/>
+      </p:ext>
+    </p:extLst>
+  </p:cSld>
+  <p:clrMapOvr>
+    <a:masterClrMapping/>
+  </p:clrMapOvr>
+  <p:timing>
+    <p:tnLst>
+      <p:par>
+        <p:cTn id="1" dur="indefinite" restart="never" nodeType="tmRoot"/>
+      </p:par>
+    </p:tnLst>
+  </p:timing>
 </p:sld>
 </file>
 
@@ -4055,7 +5122,7 @@
           <p:cNvPr id="5" name="Image 4">
             <a:extLst>
               <a:ext uri="{FF2B5EF4-FFF2-40B4-BE49-F238E27FC236}">
-                <a16:creationId xmlns:a16="http://schemas.microsoft.com/office/drawing/2014/main" id="{869AB7E9-B4A7-4FF1-923F-9A6CD3411C6D}"/>
+                <a16:creationId xmlns="" xmlns:a16="http://schemas.microsoft.com/office/drawing/2014/main" id="{869AB7E9-B4A7-4FF1-923F-9A6CD3411C6D}"/>
               </a:ext>
             </a:extLst>
           </p:cNvPr>
@@ -4090,7 +5157,7 @@
           <p:cNvPr id="7" name="Image 6">
             <a:extLst>
               <a:ext uri="{FF2B5EF4-FFF2-40B4-BE49-F238E27FC236}">
-                <a16:creationId xmlns:a16="http://schemas.microsoft.com/office/drawing/2014/main" id="{6B2F7E06-BE2A-4D46-BFEB-8307AE73934A}"/>
+                <a16:creationId xmlns="" xmlns:a16="http://schemas.microsoft.com/office/drawing/2014/main" id="{6B2F7E06-BE2A-4D46-BFEB-8307AE73934A}"/>
               </a:ext>
             </a:extLst>
           </p:cNvPr>
@@ -4126,7 +5193,7 @@
           <p:cNvPr id="9" name="ZoneTexte 8">
             <a:extLst>
               <a:ext uri="{FF2B5EF4-FFF2-40B4-BE49-F238E27FC236}">
-                <a16:creationId xmlns:a16="http://schemas.microsoft.com/office/drawing/2014/main" id="{9E866E0C-6DC9-455A-A1B9-64AE885E7351}"/>
+                <a16:creationId xmlns="" xmlns:a16="http://schemas.microsoft.com/office/drawing/2014/main" id="{9E866E0C-6DC9-455A-A1B9-64AE885E7351}"/>
               </a:ext>
             </a:extLst>
           </p:cNvPr>
@@ -4284,7 +5351,7 @@
           <p:cNvPr id="5" name="Image 4">
             <a:extLst>
               <a:ext uri="{FF2B5EF4-FFF2-40B4-BE49-F238E27FC236}">
-                <a16:creationId xmlns:a16="http://schemas.microsoft.com/office/drawing/2014/main" id="{690B7C91-9E32-4C10-91F3-E4B27602D14A}"/>
+                <a16:creationId xmlns="" xmlns:a16="http://schemas.microsoft.com/office/drawing/2014/main" id="{690B7C91-9E32-4C10-91F3-E4B27602D14A}"/>
               </a:ext>
             </a:extLst>
           </p:cNvPr>
@@ -4320,7 +5387,7 @@
           <p:cNvPr id="8" name="Image 7">
             <a:extLst>
               <a:ext uri="{FF2B5EF4-FFF2-40B4-BE49-F238E27FC236}">
-                <a16:creationId xmlns:a16="http://schemas.microsoft.com/office/drawing/2014/main" id="{1D9FB37C-7CB2-4BE0-9703-03F70A5ED299}"/>
+                <a16:creationId xmlns="" xmlns:a16="http://schemas.microsoft.com/office/drawing/2014/main" id="{1D9FB37C-7CB2-4BE0-9703-03F70A5ED299}"/>
               </a:ext>
             </a:extLst>
           </p:cNvPr>
@@ -4356,7 +5423,7 @@
           <p:cNvPr id="9" name="Image 8">
             <a:extLst>
               <a:ext uri="{FF2B5EF4-FFF2-40B4-BE49-F238E27FC236}">
-                <a16:creationId xmlns:a16="http://schemas.microsoft.com/office/drawing/2014/main" id="{BD329F67-C0D6-41DC-B94E-B2D8C954FEF0}"/>
+                <a16:creationId xmlns="" xmlns:a16="http://schemas.microsoft.com/office/drawing/2014/main" id="{BD329F67-C0D6-41DC-B94E-B2D8C954FEF0}"/>
               </a:ext>
             </a:extLst>
           </p:cNvPr>
@@ -4392,7 +5459,7 @@
           <p:cNvPr id="10" name="ZoneTexte 9">
             <a:extLst>
               <a:ext uri="{FF2B5EF4-FFF2-40B4-BE49-F238E27FC236}">
-                <a16:creationId xmlns:a16="http://schemas.microsoft.com/office/drawing/2014/main" id="{4B58266B-2FBD-4EB9-A3B0-21B55406E0FB}"/>
+                <a16:creationId xmlns="" xmlns:a16="http://schemas.microsoft.com/office/drawing/2014/main" id="{4B58266B-2FBD-4EB9-A3B0-21B55406E0FB}"/>
               </a:ext>
             </a:extLst>
           </p:cNvPr>
@@ -4442,7 +5509,7 @@
           <p:cNvPr id="11" name="Image 10">
             <a:extLst>
               <a:ext uri="{FF2B5EF4-FFF2-40B4-BE49-F238E27FC236}">
-                <a16:creationId xmlns:a16="http://schemas.microsoft.com/office/drawing/2014/main" id="{BC60F5C6-1931-4BB0-BF99-C0ABAE97AA9B}"/>
+                <a16:creationId xmlns="" xmlns:a16="http://schemas.microsoft.com/office/drawing/2014/main" id="{BC60F5C6-1931-4BB0-BF99-C0ABAE97AA9B}"/>
               </a:ext>
             </a:extLst>
           </p:cNvPr>
@@ -4478,7 +5545,7 @@
           <p:cNvPr id="12" name="ZoneTexte 11">
             <a:extLst>
               <a:ext uri="{FF2B5EF4-FFF2-40B4-BE49-F238E27FC236}">
-                <a16:creationId xmlns:a16="http://schemas.microsoft.com/office/drawing/2014/main" id="{8CC0C0A7-D89B-4723-BD88-6897FA5AD072}"/>
+                <a16:creationId xmlns="" xmlns:a16="http://schemas.microsoft.com/office/drawing/2014/main" id="{8CC0C0A7-D89B-4723-BD88-6897FA5AD072}"/>
               </a:ext>
             </a:extLst>
           </p:cNvPr>
@@ -4514,7 +5581,7 @@
           <p:cNvPr id="13" name="ZoneTexte 12">
             <a:extLst>
               <a:ext uri="{FF2B5EF4-FFF2-40B4-BE49-F238E27FC236}">
-                <a16:creationId xmlns:a16="http://schemas.microsoft.com/office/drawing/2014/main" id="{BBBA41C0-E06D-4055-AE08-25A7DD269CC3}"/>
+                <a16:creationId xmlns="" xmlns:a16="http://schemas.microsoft.com/office/drawing/2014/main" id="{BBBA41C0-E06D-4055-AE08-25A7DD269CC3}"/>
               </a:ext>
             </a:extLst>
           </p:cNvPr>
@@ -4563,7 +5630,7 @@
           <p:cNvPr id="18" name="ZoneTexte 17">
             <a:extLst>
               <a:ext uri="{FF2B5EF4-FFF2-40B4-BE49-F238E27FC236}">
-                <a16:creationId xmlns:a16="http://schemas.microsoft.com/office/drawing/2014/main" id="{00F58013-8D63-49F8-9E8B-80F6489B70E2}"/>
+                <a16:creationId xmlns="" xmlns:a16="http://schemas.microsoft.com/office/drawing/2014/main" id="{00F58013-8D63-49F8-9E8B-80F6489B70E2}"/>
               </a:ext>
             </a:extLst>
           </p:cNvPr>
@@ -4618,7 +5685,6 @@
               <a:rPr lang="fr-FR" sz="1600" dirty="0" smtClean="0"/>
               <a:t>problème</a:t>
             </a:r>
-            <a:endParaRPr lang="fr-FR" sz="1600" dirty="0" smtClean="0"/>
           </a:p>
           <a:p>
             <a:pPr marL="285750" indent="-285750">
@@ -4645,7 +5711,7 @@
           <p:cNvPr id="2" name="Rectangle 1">
             <a:extLst>
               <a:ext uri="{FF2B5EF4-FFF2-40B4-BE49-F238E27FC236}">
-                <a16:creationId xmlns:a16="http://schemas.microsoft.com/office/drawing/2014/main" id="{A105FD58-B146-466C-AAC0-7AB232821F68}"/>
+                <a16:creationId xmlns="" xmlns:a16="http://schemas.microsoft.com/office/drawing/2014/main" id="{A105FD58-B146-466C-AAC0-7AB232821F68}"/>
               </a:ext>
             </a:extLst>
           </p:cNvPr>
@@ -4685,7 +5751,7 @@
           <p:cNvPr id="14" name="ZoneTexte 13">
             <a:extLst>
               <a:ext uri="{FF2B5EF4-FFF2-40B4-BE49-F238E27FC236}">
-                <a16:creationId xmlns:a16="http://schemas.microsoft.com/office/drawing/2014/main" id="{00F58013-8D63-49F8-9E8B-80F6489B70E2}"/>
+                <a16:creationId xmlns="" xmlns:a16="http://schemas.microsoft.com/office/drawing/2014/main" id="{00F58013-8D63-49F8-9E8B-80F6489B70E2}"/>
               </a:ext>
             </a:extLst>
           </p:cNvPr>
@@ -4780,7 +5846,7 @@
           <p:cNvPr id="5" name="Image 4">
             <a:extLst>
               <a:ext uri="{FF2B5EF4-FFF2-40B4-BE49-F238E27FC236}">
-                <a16:creationId xmlns:a16="http://schemas.microsoft.com/office/drawing/2014/main" id="{75EBA769-F8CC-4D71-9511-415D7C261511}"/>
+                <a16:creationId xmlns="" xmlns:a16="http://schemas.microsoft.com/office/drawing/2014/main" id="{75EBA769-F8CC-4D71-9511-415D7C261511}"/>
               </a:ext>
             </a:extLst>
           </p:cNvPr>
@@ -4816,7 +5882,7 @@
           <p:cNvPr id="6" name="ZoneTexte 5">
             <a:extLst>
               <a:ext uri="{FF2B5EF4-FFF2-40B4-BE49-F238E27FC236}">
-                <a16:creationId xmlns:a16="http://schemas.microsoft.com/office/drawing/2014/main" id="{945071A7-C8A5-4800-BD76-C6841CE45C5A}"/>
+                <a16:creationId xmlns="" xmlns:a16="http://schemas.microsoft.com/office/drawing/2014/main" id="{945071A7-C8A5-4800-BD76-C6841CE45C5A}"/>
               </a:ext>
             </a:extLst>
           </p:cNvPr>
@@ -4942,7 +6008,7 @@
           <p:cNvPr id="5" name="Image 4">
             <a:extLst>
               <a:ext uri="{FF2B5EF4-FFF2-40B4-BE49-F238E27FC236}">
-                <a16:creationId xmlns:a16="http://schemas.microsoft.com/office/drawing/2014/main" id="{D91F6CE4-A0FB-4282-9B85-47FA5527C736}"/>
+                <a16:creationId xmlns="" xmlns:a16="http://schemas.microsoft.com/office/drawing/2014/main" id="{D91F6CE4-A0FB-4282-9B85-47FA5527C736}"/>
               </a:ext>
             </a:extLst>
           </p:cNvPr>
@@ -4978,7 +6044,7 @@
           <p:cNvPr id="6" name="Image 5">
             <a:extLst>
               <a:ext uri="{FF2B5EF4-FFF2-40B4-BE49-F238E27FC236}">
-                <a16:creationId xmlns:a16="http://schemas.microsoft.com/office/drawing/2014/main" id="{B6F51BA5-E830-46D2-B1E2-3A2C10F760E7}"/>
+                <a16:creationId xmlns="" xmlns:a16="http://schemas.microsoft.com/office/drawing/2014/main" id="{B6F51BA5-E830-46D2-B1E2-3A2C10F760E7}"/>
               </a:ext>
             </a:extLst>
           </p:cNvPr>
@@ -5017,7 +6083,7 @@
         </p:nvSpPr>
         <p:spPr>
           <a:xfrm>
-            <a:off x="6421821" y="346843"/>
+            <a:off x="6421820" y="907952"/>
             <a:ext cx="5574438" cy="3693319"/>
           </a:xfrm>
           <a:prstGeom prst="rect">
@@ -5092,22 +6158,252 @@
             </a:r>
             <a:r>
               <a:rPr lang="fr-FR" dirty="0" smtClean="0"/>
-              <a:t>, qui va donc s’appeler lui-même et rompre le SRP (ce qui n’est pas nécessairement un problème pour les langages non orientés objet). Cela ne change pas grand-chose au problème, mais mérite d’être noté.</a:t>
+              <a:t>, qui va donc s’appeler lui-même et rompre le SRP (ce qui n’est pas nécessairement un problème pour les langages non orientés objet).</a:t>
             </a:r>
             <a:endParaRPr lang="fr-FR" dirty="0"/>
           </a:p>
-        </p:txBody>
-      </p:sp>
-      <p:sp>
-        <p:nvSpPr>
-          <p:cNvPr id="8" name="ZoneTexte 7"/>
+          <a:p>
+            <a:endParaRPr lang="fr-FR" dirty="0" smtClean="0"/>
+          </a:p>
+          <a:p>
+            <a:r>
+              <a:rPr lang="fr-FR" dirty="0" smtClean="0">
+                <a:sym typeface="Wingdings" panose="05000000000000000000" pitchFamily="2" charset="2"/>
+              </a:rPr>
+              <a:t> Serveur monolithique, massif, </a:t>
+            </a:r>
+            <a:r>
+              <a:rPr lang="fr-FR" dirty="0" smtClean="0">
+                <a:sym typeface="Wingdings" panose="05000000000000000000" pitchFamily="2" charset="2"/>
+              </a:rPr>
+              <a:t>fiable</a:t>
+            </a:r>
+            <a:r>
+              <a:rPr lang="fr-FR" smtClean="0">
+                <a:sym typeface="Wingdings" panose="05000000000000000000" pitchFamily="2" charset="2"/>
+              </a:rPr>
+              <a:t>, lourd</a:t>
+            </a:r>
+            <a:endParaRPr lang="fr-FR" dirty="0"/>
+          </a:p>
+        </p:txBody>
+      </p:sp>
+      <p:sp>
+        <p:nvSpPr>
+          <p:cNvPr id="3" name="ZoneTexte 2"/>
           <p:cNvSpPr txBox="1"/>
           <p:nvPr/>
         </p:nvSpPr>
         <p:spPr>
           <a:xfrm>
-            <a:off x="4506686" y="4170728"/>
-            <a:ext cx="7489572" cy="1754326"/>
+            <a:off x="758536" y="581890"/>
+            <a:ext cx="3241964" cy="384721"/>
+          </a:xfrm>
+          <a:prstGeom prst="rect">
+            <a:avLst/>
+          </a:prstGeom>
+          <a:solidFill>
+            <a:schemeClr val="bg1"/>
+          </a:solidFill>
+        </p:spPr>
+        <p:txBody>
+          <a:bodyPr wrap="square" rtlCol="0">
+            <a:spAutoFit/>
+          </a:bodyPr>
+          <a:lstStyle/>
+          <a:p>
+            <a:pPr algn="ctr"/>
+            <a:r>
+              <a:rPr lang="fr-FR" sz="1900" dirty="0" smtClean="0">
+                <a:solidFill>
+                  <a:srgbClr val="0A559E"/>
+                </a:solidFill>
+              </a:rPr>
+              <a:t>Projet </a:t>
+            </a:r>
+            <a:r>
+              <a:rPr lang="fr-FR" sz="1900" dirty="0" err="1" smtClean="0">
+                <a:solidFill>
+                  <a:srgbClr val="0A559E"/>
+                </a:solidFill>
+              </a:rPr>
+              <a:t>Legacy</a:t>
+            </a:r>
+            <a:endParaRPr lang="fr-FR" sz="1900" dirty="0">
+              <a:solidFill>
+                <a:srgbClr val="0A559E"/>
+              </a:solidFill>
+            </a:endParaRPr>
+          </a:p>
+        </p:txBody>
+      </p:sp>
+      <p:sp>
+        <p:nvSpPr>
+          <p:cNvPr id="4" name="Ellipse 3"/>
+          <p:cNvSpPr/>
+          <p:nvPr/>
+        </p:nvSpPr>
+        <p:spPr>
+          <a:xfrm>
+            <a:off x="2878282" y="2358737"/>
+            <a:ext cx="176645" cy="207818"/>
+          </a:xfrm>
+          <a:prstGeom prst="ellipse">
+            <a:avLst/>
+          </a:prstGeom>
+          <a:solidFill>
+            <a:schemeClr val="bg1"/>
+          </a:solidFill>
+          <a:ln>
+            <a:solidFill>
+              <a:schemeClr val="bg1"/>
+            </a:solidFill>
+          </a:ln>
+        </p:spPr>
+        <p:style>
+          <a:lnRef idx="2">
+            <a:schemeClr val="accent1">
+              <a:shade val="50000"/>
+            </a:schemeClr>
+          </a:lnRef>
+          <a:fillRef idx="1">
+            <a:schemeClr val="accent1"/>
+          </a:fillRef>
+          <a:effectRef idx="0">
+            <a:schemeClr val="accent1"/>
+          </a:effectRef>
+          <a:fontRef idx="minor">
+            <a:schemeClr val="lt1"/>
+          </a:fontRef>
+        </p:style>
+        <p:txBody>
+          <a:bodyPr rtlCol="0" anchor="ctr"/>
+          <a:lstStyle/>
+          <a:p>
+            <a:pPr algn="ctr"/>
+            <a:endParaRPr lang="fr-FR"/>
+          </a:p>
+        </p:txBody>
+      </p:sp>
+    </p:spTree>
+    <p:extLst>
+      <p:ext uri="{BB962C8B-B14F-4D97-AF65-F5344CB8AC3E}">
+        <p14:creationId xmlns:p14="http://schemas.microsoft.com/office/powerpoint/2010/main" val="2121006613"/>
+      </p:ext>
+    </p:extLst>
+  </p:cSld>
+  <p:clrMapOvr>
+    <a:masterClrMapping/>
+  </p:clrMapOvr>
+  <p:timing>
+    <p:tnLst>
+      <p:par>
+        <p:cTn id="1" dur="indefinite" restart="never" nodeType="tmRoot"/>
+      </p:par>
+    </p:tnLst>
+  </p:timing>
+</p:sld>
+</file>
+
+<file path=ppt/slides/slide6.xml><?xml version="1.0" encoding="utf-8"?>
+<p:sld xmlns:a="http://schemas.openxmlformats.org/drawingml/2006/main" xmlns:r="http://schemas.openxmlformats.org/officeDocument/2006/relationships" xmlns:p="http://schemas.openxmlformats.org/presentationml/2006/main">
+  <p:cSld>
+    <p:spTree>
+      <p:nvGrpSpPr>
+        <p:cNvPr id="1" name=""/>
+        <p:cNvGrpSpPr/>
+        <p:nvPr/>
+      </p:nvGrpSpPr>
+      <p:grpSpPr>
+        <a:xfrm>
+          <a:off x="0" y="0"/>
+          <a:ext cx="0" cy="0"/>
+          <a:chOff x="0" y="0"/>
+          <a:chExt cx="0" cy="0"/>
+        </a:xfrm>
+      </p:grpSpPr>
+      <p:pic>
+        <p:nvPicPr>
+          <p:cNvPr id="5" name="Image 4">
+            <a:extLst>
+              <a:ext uri="{FF2B5EF4-FFF2-40B4-BE49-F238E27FC236}">
+                <a16:creationId xmlns="" xmlns:a16="http://schemas.microsoft.com/office/drawing/2014/main" id="{D91F6CE4-A0FB-4282-9B85-47FA5527C736}"/>
+              </a:ext>
+            </a:extLst>
+          </p:cNvPr>
+          <p:cNvPicPr>
+            <a:picLocks noChangeAspect="1"/>
+          </p:cNvPicPr>
+          <p:nvPr/>
+        </p:nvPicPr>
+        <p:blipFill>
+          <a:blip r:embed="rId3" cstate="print">
+            <a:extLst>
+              <a:ext uri="{28A0092B-C50C-407E-A947-70E740481C1C}">
+                <a14:useLocalDpi xmlns:a14="http://schemas.microsoft.com/office/drawing/2010/main" val="0"/>
+              </a:ext>
+            </a:extLst>
+          </a:blip>
+          <a:stretch>
+            <a:fillRect/>
+          </a:stretch>
+        </p:blipFill>
+        <p:spPr>
+          <a:xfrm>
+            <a:off x="293615" y="6291743"/>
+            <a:ext cx="10508871" cy="272654"/>
+          </a:xfrm>
+          <a:prstGeom prst="rect">
+            <a:avLst/>
+          </a:prstGeom>
+        </p:spPr>
+      </p:pic>
+      <p:pic>
+        <p:nvPicPr>
+          <p:cNvPr id="6" name="Image 5">
+            <a:extLst>
+              <a:ext uri="{FF2B5EF4-FFF2-40B4-BE49-F238E27FC236}">
+                <a16:creationId xmlns="" xmlns:a16="http://schemas.microsoft.com/office/drawing/2014/main" id="{B6F51BA5-E830-46D2-B1E2-3A2C10F760E7}"/>
+              </a:ext>
+            </a:extLst>
+          </p:cNvPr>
+          <p:cNvPicPr>
+            <a:picLocks noChangeAspect="1"/>
+          </p:cNvPicPr>
+          <p:nvPr/>
+        </p:nvPicPr>
+        <p:blipFill>
+          <a:blip r:embed="rId4" cstate="print">
+            <a:extLst>
+              <a:ext uri="{28A0092B-C50C-407E-A947-70E740481C1C}">
+                <a14:useLocalDpi xmlns:a14="http://schemas.microsoft.com/office/drawing/2010/main" val="0"/>
+              </a:ext>
+            </a:extLst>
+          </a:blip>
+          <a:stretch>
+            <a:fillRect/>
+          </a:stretch>
+        </p:blipFill>
+        <p:spPr>
+          <a:xfrm>
+            <a:off x="10802486" y="5912350"/>
+            <a:ext cx="1193772" cy="787940"/>
+          </a:xfrm>
+          <a:prstGeom prst="rect">
+            <a:avLst/>
+          </a:prstGeom>
+        </p:spPr>
+      </p:pic>
+      <p:sp>
+        <p:nvSpPr>
+          <p:cNvPr id="2" name="ZoneTexte 1"/>
+          <p:cNvSpPr txBox="1"/>
+          <p:nvPr/>
+        </p:nvSpPr>
+        <p:spPr>
+          <a:xfrm>
+            <a:off x="1711423" y="384464"/>
+            <a:ext cx="7673254" cy="1477328"/>
           </a:xfrm>
           <a:prstGeom prst="rect">
             <a:avLst/>
@@ -5115,40 +6411,744 @@
           <a:noFill/>
         </p:spPr>
         <p:txBody>
-          <a:bodyPr wrap="square" rtlCol="0">
+          <a:bodyPr wrap="none" rtlCol="0">
             <a:spAutoFit/>
           </a:bodyPr>
           <a:lstStyle/>
           <a:p>
             <a:r>
-              <a:rPr lang="fr-FR" b="1" u="sng" dirty="0" smtClean="0"/>
-              <a:t>Problème</a:t>
+              <a:rPr lang="fr-FR" u="sng" dirty="0" smtClean="0"/>
+              <a:t>Problème(s)</a:t>
             </a:r>
             <a:r>
               <a:rPr lang="fr-FR" dirty="0" smtClean="0"/>
-              <a:t> : le système est à la limite de ses capacités, avec des problèmes de performance, de fiabilité...</a:t>
-            </a:r>
-          </a:p>
-          <a:p>
+              <a:t> : </a:t>
+            </a:r>
+          </a:p>
+          <a:p>
+            <a:pPr marL="285750" indent="-285750">
+              <a:buFontTx/>
+              <a:buChar char="-"/>
+            </a:pPr>
+            <a:r>
+              <a:rPr lang="fr-FR" dirty="0" smtClean="0"/>
+              <a:t>Code du serveur très ancien, développé de façon anarchique</a:t>
+            </a:r>
+          </a:p>
+          <a:p>
+            <a:pPr marL="285750" indent="-285750">
+              <a:buFontTx/>
+              <a:buChar char="-"/>
+            </a:pPr>
+            <a:r>
+              <a:rPr lang="fr-FR" dirty="0" smtClean="0"/>
+              <a:t>Langage ésotérique, non maintenu, pas de ressource capable de le maintenir</a:t>
+            </a:r>
+          </a:p>
+          <a:p>
+            <a:pPr marL="285750" indent="-285750">
+              <a:buFontTx/>
+              <a:buChar char="-"/>
+            </a:pPr>
+            <a:r>
+              <a:rPr lang="fr-FR" dirty="0" smtClean="0"/>
+              <a:t>Serveur </a:t>
+            </a:r>
+            <a:r>
+              <a:rPr lang="fr-FR" dirty="0" err="1" smtClean="0"/>
+              <a:t>logiciellement</a:t>
+            </a:r>
+            <a:r>
+              <a:rPr lang="fr-FR" dirty="0" smtClean="0"/>
+              <a:t> à la limite de ses capacité</a:t>
+            </a:r>
+          </a:p>
+          <a:p>
+            <a:pPr marL="285750" indent="-285750">
+              <a:buFontTx/>
+              <a:buChar char="-"/>
+            </a:pPr>
+            <a:r>
+              <a:rPr lang="fr-FR" dirty="0" smtClean="0"/>
+              <a:t>Serveur matériellement </a:t>
+            </a:r>
+            <a:r>
+              <a:rPr lang="fr-FR" dirty="0"/>
+              <a:t>à la limite de ses </a:t>
+            </a:r>
+            <a:r>
+              <a:rPr lang="fr-FR" dirty="0" smtClean="0"/>
+              <a:t>capacité</a:t>
+            </a:r>
+            <a:endParaRPr lang="fr-FR" dirty="0"/>
+          </a:p>
+        </p:txBody>
+      </p:sp>
+      <p:sp>
+        <p:nvSpPr>
+          <p:cNvPr id="8" name="ZoneTexte 7"/>
+          <p:cNvSpPr txBox="1"/>
+          <p:nvPr/>
+        </p:nvSpPr>
+        <p:spPr>
+          <a:xfrm>
+            <a:off x="1711423" y="2369127"/>
+            <a:ext cx="7469096" cy="3139321"/>
+          </a:xfrm>
+          <a:prstGeom prst="rect">
+            <a:avLst/>
+          </a:prstGeom>
+          <a:noFill/>
+        </p:spPr>
+        <p:txBody>
+          <a:bodyPr wrap="none" rtlCol="0">
+            <a:spAutoFit/>
+          </a:bodyPr>
+          <a:lstStyle/>
+          <a:p>
+            <a:r>
+              <a:rPr lang="fr-FR" u="sng" dirty="0" smtClean="0"/>
+              <a:t>Solution(s) possibles(s)</a:t>
+            </a:r>
+            <a:r>
+              <a:rPr lang="fr-FR" dirty="0" smtClean="0"/>
+              <a:t> :</a:t>
+            </a:r>
+          </a:p>
+          <a:p>
+            <a:pPr marL="285750" indent="-285750">
+              <a:buFontTx/>
+              <a:buChar char="-"/>
+            </a:pPr>
+            <a:r>
+              <a:rPr lang="fr-FR" dirty="0" smtClean="0"/>
+              <a:t>Refonte one-</a:t>
+            </a:r>
+            <a:r>
+              <a:rPr lang="fr-FR" dirty="0" err="1" smtClean="0"/>
+              <a:t>shot</a:t>
+            </a:r>
+            <a:r>
+              <a:rPr lang="fr-FR" dirty="0" smtClean="0"/>
+              <a:t> du code du serveur</a:t>
+            </a:r>
+          </a:p>
+          <a:p>
+            <a:pPr marL="742950" lvl="1" indent="-285750">
+              <a:buFontTx/>
+              <a:buChar char="-"/>
+            </a:pPr>
+            <a:r>
+              <a:rPr lang="fr-FR" dirty="0" smtClean="0"/>
+              <a:t>Avantages</a:t>
+            </a:r>
+          </a:p>
+          <a:p>
+            <a:pPr marL="1200150" lvl="2" indent="-285750">
+              <a:buFontTx/>
+              <a:buChar char="-"/>
+            </a:pPr>
+            <a:r>
+              <a:rPr lang="fr-FR" dirty="0" smtClean="0"/>
+              <a:t>Mise en place d’une architecture de base et de bonnes pratiques</a:t>
+            </a:r>
+          </a:p>
+          <a:p>
+            <a:pPr marL="1200150" lvl="2" indent="-285750">
+              <a:buFontTx/>
+              <a:buChar char="-"/>
+            </a:pPr>
+            <a:r>
+              <a:rPr lang="fr-FR" dirty="0" smtClean="0"/>
+              <a:t>Les personnes en charge sont impliquées à 100%</a:t>
+            </a:r>
+          </a:p>
+          <a:p>
+            <a:pPr marL="1200150" lvl="2" indent="-285750">
+              <a:buFontTx/>
+              <a:buChar char="-"/>
+            </a:pPr>
+            <a:r>
+              <a:rPr lang="fr-FR" dirty="0" smtClean="0"/>
+              <a:t>Ce qui est fait n’est plus à faire</a:t>
+            </a:r>
+          </a:p>
+          <a:p>
+            <a:pPr marL="742950" lvl="1" indent="-285750">
+              <a:buFontTx/>
+              <a:buChar char="-"/>
+            </a:pPr>
+            <a:r>
+              <a:rPr lang="fr-FR" dirty="0" smtClean="0"/>
+              <a:t>Inconvénients</a:t>
+            </a:r>
+          </a:p>
+          <a:p>
+            <a:pPr marL="1200150" lvl="2" indent="-285750">
+              <a:buFontTx/>
+              <a:buChar char="-"/>
+            </a:pPr>
+            <a:r>
+              <a:rPr lang="fr-FR" dirty="0" smtClean="0"/>
+              <a:t>Obligation de « casser » du code fonctionnel</a:t>
+            </a:r>
+          </a:p>
+          <a:p>
+            <a:pPr marL="1200150" lvl="2" indent="-285750">
+              <a:buFontTx/>
+              <a:buChar char="-"/>
+            </a:pPr>
+            <a:r>
+              <a:rPr lang="fr-FR" dirty="0"/>
+              <a:t>Les personnes en charge sont impliquées à 100%</a:t>
+            </a:r>
             <a:endParaRPr lang="fr-FR" dirty="0" smtClean="0"/>
           </a:p>
           <a:p>
-            <a:r>
-              <a:rPr lang="fr-FR" b="1" u="sng" dirty="0" smtClean="0"/>
-              <a:t>Solution envisagée</a:t>
-            </a:r>
+            <a:pPr marL="1200150" lvl="2" indent="-285750">
+              <a:buFontTx/>
+              <a:buChar char="-"/>
+            </a:pPr>
             <a:r>
               <a:rPr lang="fr-FR" dirty="0" smtClean="0"/>
-              <a:t>: Il est décidé de mettre en place un système de parallélisation du traitement des requêtes (remplacement du bus existant, externalisation des API…)</a:t>
-            </a:r>
-            <a:endParaRPr lang="fr-FR" dirty="0"/>
+              <a:t>Projet long, de plusieurs mois à plusieurs années</a:t>
+            </a:r>
+          </a:p>
+          <a:p>
+            <a:pPr marL="1200150" lvl="2" indent="-285750">
+              <a:buFontTx/>
+              <a:buChar char="-"/>
+            </a:pPr>
+            <a:endParaRPr lang="fr-FR" dirty="0" smtClean="0"/>
           </a:p>
         </p:txBody>
       </p:sp>
     </p:spTree>
     <p:extLst>
       <p:ext uri="{BB962C8B-B14F-4D97-AF65-F5344CB8AC3E}">
-        <p14:creationId xmlns:p14="http://schemas.microsoft.com/office/powerpoint/2010/main" val="2121006613"/>
+        <p14:creationId xmlns:p14="http://schemas.microsoft.com/office/powerpoint/2010/main" val="2433077676"/>
+      </p:ext>
+    </p:extLst>
+  </p:cSld>
+  <p:clrMapOvr>
+    <a:masterClrMapping/>
+  </p:clrMapOvr>
+  <p:timing>
+    <p:tnLst>
+      <p:par>
+        <p:cTn id="1" dur="indefinite" restart="never" nodeType="tmRoot"/>
+      </p:par>
+    </p:tnLst>
+  </p:timing>
+</p:sld>
+</file>
+
+<file path=ppt/slides/slide7.xml><?xml version="1.0" encoding="utf-8"?>
+<p:sld xmlns:a="http://schemas.openxmlformats.org/drawingml/2006/main" xmlns:r="http://schemas.openxmlformats.org/officeDocument/2006/relationships" xmlns:p="http://schemas.openxmlformats.org/presentationml/2006/main">
+  <p:cSld>
+    <p:spTree>
+      <p:nvGrpSpPr>
+        <p:cNvPr id="1" name=""/>
+        <p:cNvGrpSpPr/>
+        <p:nvPr/>
+      </p:nvGrpSpPr>
+      <p:grpSpPr>
+        <a:xfrm>
+          <a:off x="0" y="0"/>
+          <a:ext cx="0" cy="0"/>
+          <a:chOff x="0" y="0"/>
+          <a:chExt cx="0" cy="0"/>
+        </a:xfrm>
+      </p:grpSpPr>
+      <p:pic>
+        <p:nvPicPr>
+          <p:cNvPr id="5" name="Image 4">
+            <a:extLst>
+              <a:ext uri="{FF2B5EF4-FFF2-40B4-BE49-F238E27FC236}">
+                <a16:creationId xmlns="" xmlns:a16="http://schemas.microsoft.com/office/drawing/2014/main" id="{D91F6CE4-A0FB-4282-9B85-47FA5527C736}"/>
+              </a:ext>
+            </a:extLst>
+          </p:cNvPr>
+          <p:cNvPicPr>
+            <a:picLocks noChangeAspect="1"/>
+          </p:cNvPicPr>
+          <p:nvPr/>
+        </p:nvPicPr>
+        <p:blipFill>
+          <a:blip r:embed="rId3" cstate="print">
+            <a:extLst>
+              <a:ext uri="{28A0092B-C50C-407E-A947-70E740481C1C}">
+                <a14:useLocalDpi xmlns:a14="http://schemas.microsoft.com/office/drawing/2010/main" val="0"/>
+              </a:ext>
+            </a:extLst>
+          </a:blip>
+          <a:stretch>
+            <a:fillRect/>
+          </a:stretch>
+        </p:blipFill>
+        <p:spPr>
+          <a:xfrm>
+            <a:off x="293615" y="6291743"/>
+            <a:ext cx="10508871" cy="272654"/>
+          </a:xfrm>
+          <a:prstGeom prst="rect">
+            <a:avLst/>
+          </a:prstGeom>
+        </p:spPr>
+      </p:pic>
+      <p:pic>
+        <p:nvPicPr>
+          <p:cNvPr id="6" name="Image 5">
+            <a:extLst>
+              <a:ext uri="{FF2B5EF4-FFF2-40B4-BE49-F238E27FC236}">
+                <a16:creationId xmlns="" xmlns:a16="http://schemas.microsoft.com/office/drawing/2014/main" id="{B6F51BA5-E830-46D2-B1E2-3A2C10F760E7}"/>
+              </a:ext>
+            </a:extLst>
+          </p:cNvPr>
+          <p:cNvPicPr>
+            <a:picLocks noChangeAspect="1"/>
+          </p:cNvPicPr>
+          <p:nvPr/>
+        </p:nvPicPr>
+        <p:blipFill>
+          <a:blip r:embed="rId4" cstate="print">
+            <a:extLst>
+              <a:ext uri="{28A0092B-C50C-407E-A947-70E740481C1C}">
+                <a14:useLocalDpi xmlns:a14="http://schemas.microsoft.com/office/drawing/2010/main" val="0"/>
+              </a:ext>
+            </a:extLst>
+          </a:blip>
+          <a:stretch>
+            <a:fillRect/>
+          </a:stretch>
+        </p:blipFill>
+        <p:spPr>
+          <a:xfrm>
+            <a:off x="10802486" y="5912350"/>
+            <a:ext cx="1193772" cy="787940"/>
+          </a:xfrm>
+          <a:prstGeom prst="rect">
+            <a:avLst/>
+          </a:prstGeom>
+        </p:spPr>
+      </p:pic>
+      <p:sp>
+        <p:nvSpPr>
+          <p:cNvPr id="2" name="ZoneTexte 1"/>
+          <p:cNvSpPr txBox="1"/>
+          <p:nvPr/>
+        </p:nvSpPr>
+        <p:spPr>
+          <a:xfrm>
+            <a:off x="624811" y="436418"/>
+            <a:ext cx="8528873" cy="2585323"/>
+          </a:xfrm>
+          <a:prstGeom prst="rect">
+            <a:avLst/>
+          </a:prstGeom>
+          <a:noFill/>
+        </p:spPr>
+        <p:txBody>
+          <a:bodyPr wrap="none" rtlCol="0">
+            <a:spAutoFit/>
+          </a:bodyPr>
+          <a:lstStyle/>
+          <a:p>
+            <a:pPr marL="285750" indent="-285750">
+              <a:buFontTx/>
+              <a:buChar char="-"/>
+            </a:pPr>
+            <a:r>
+              <a:rPr lang="fr-FR" dirty="0" smtClean="0"/>
+              <a:t>Ajout </a:t>
+            </a:r>
+            <a:r>
+              <a:rPr lang="fr-FR" dirty="0"/>
+              <a:t>d’une surcouche en amont du serveur pour distribuer la charge (</a:t>
+            </a:r>
+            <a:r>
+              <a:rPr lang="fr-FR" dirty="0" err="1"/>
+              <a:t>load-balancing</a:t>
+            </a:r>
+            <a:r>
+              <a:rPr lang="fr-FR" dirty="0"/>
+              <a:t>)</a:t>
+            </a:r>
+          </a:p>
+          <a:p>
+            <a:pPr marL="742950" lvl="1" indent="-285750">
+              <a:buFontTx/>
+              <a:buChar char="-"/>
+            </a:pPr>
+            <a:r>
+              <a:rPr lang="fr-FR" dirty="0" smtClean="0"/>
+              <a:t>Avantages</a:t>
+            </a:r>
+          </a:p>
+          <a:p>
+            <a:pPr marL="1200150" lvl="2" indent="-285750">
+              <a:buFontTx/>
+              <a:buChar char="-"/>
+            </a:pPr>
+            <a:r>
+              <a:rPr lang="fr-FR" dirty="0" smtClean="0"/>
+              <a:t>Peut être simple à implémenter</a:t>
+            </a:r>
+          </a:p>
+          <a:p>
+            <a:pPr marL="1200150" lvl="2" indent="-285750">
+              <a:buFontTx/>
+              <a:buChar char="-"/>
+            </a:pPr>
+            <a:r>
+              <a:rPr lang="fr-FR" dirty="0" smtClean="0"/>
+              <a:t>Peut être transparent</a:t>
+            </a:r>
+          </a:p>
+          <a:p>
+            <a:pPr marL="1200150" lvl="2" indent="-285750">
+              <a:buFontTx/>
+              <a:buChar char="-"/>
+            </a:pPr>
+            <a:r>
+              <a:rPr lang="fr-FR" dirty="0" smtClean="0"/>
+              <a:t>Il « suffit » de cloner le serveur autant de fois que nécessaire</a:t>
+            </a:r>
+          </a:p>
+          <a:p>
+            <a:pPr marL="742950" lvl="1" indent="-285750">
+              <a:buFontTx/>
+              <a:buChar char="-"/>
+            </a:pPr>
+            <a:r>
+              <a:rPr lang="fr-FR" dirty="0" smtClean="0"/>
+              <a:t>Inconvénients</a:t>
+            </a:r>
+          </a:p>
+          <a:p>
+            <a:pPr marL="1200150" lvl="2" indent="-285750">
+              <a:buFontTx/>
+              <a:buChar char="-"/>
+            </a:pPr>
+            <a:r>
+              <a:rPr lang="fr-FR" dirty="0" smtClean="0"/>
+              <a:t>Peut-être très complexe à implémenter</a:t>
+            </a:r>
+          </a:p>
+          <a:p>
+            <a:pPr marL="1200150" lvl="2" indent="-285750">
+              <a:buFontTx/>
+              <a:buChar char="-"/>
+            </a:pPr>
+            <a:r>
+              <a:rPr lang="fr-FR" dirty="0" smtClean="0"/>
+              <a:t>Le clonage du serveur peut être très problématique (serveur physique)</a:t>
+            </a:r>
+          </a:p>
+          <a:p>
+            <a:pPr marL="1200150" lvl="2" indent="-285750">
+              <a:buFontTx/>
+              <a:buChar char="-"/>
+            </a:pPr>
+            <a:r>
+              <a:rPr lang="fr-FR" dirty="0" smtClean="0"/>
+              <a:t>Il peut être très compliqué de gérer les pertes de connexions</a:t>
+            </a:r>
+            <a:endParaRPr lang="fr-FR" dirty="0"/>
+          </a:p>
+        </p:txBody>
+      </p:sp>
+    </p:spTree>
+    <p:extLst>
+      <p:ext uri="{BB962C8B-B14F-4D97-AF65-F5344CB8AC3E}">
+        <p14:creationId xmlns:p14="http://schemas.microsoft.com/office/powerpoint/2010/main" val="4266618545"/>
+      </p:ext>
+    </p:extLst>
+  </p:cSld>
+  <p:clrMapOvr>
+    <a:masterClrMapping/>
+  </p:clrMapOvr>
+  <p:timing>
+    <p:tnLst>
+      <p:par>
+        <p:cTn id="1" dur="indefinite" restart="never" nodeType="tmRoot"/>
+      </p:par>
+    </p:tnLst>
+  </p:timing>
+</p:sld>
+</file>
+
+<file path=ppt/slides/slide8.xml><?xml version="1.0" encoding="utf-8"?>
+<p:sld xmlns:a="http://schemas.openxmlformats.org/drawingml/2006/main" xmlns:r="http://schemas.openxmlformats.org/officeDocument/2006/relationships" xmlns:p="http://schemas.openxmlformats.org/presentationml/2006/main">
+  <p:cSld>
+    <p:spTree>
+      <p:nvGrpSpPr>
+        <p:cNvPr id="1" name=""/>
+        <p:cNvGrpSpPr/>
+        <p:nvPr/>
+      </p:nvGrpSpPr>
+      <p:grpSpPr>
+        <a:xfrm>
+          <a:off x="0" y="0"/>
+          <a:ext cx="0" cy="0"/>
+          <a:chOff x="0" y="0"/>
+          <a:chExt cx="0" cy="0"/>
+        </a:xfrm>
+      </p:grpSpPr>
+      <p:sp>
+        <p:nvSpPr>
+          <p:cNvPr id="5" name="ZoneTexte 4"/>
+          <p:cNvSpPr txBox="1"/>
+          <p:nvPr/>
+        </p:nvSpPr>
+        <p:spPr>
+          <a:xfrm>
+            <a:off x="1028700" y="415636"/>
+            <a:ext cx="9384813" cy="2862322"/>
+          </a:xfrm>
+          <a:prstGeom prst="rect">
+            <a:avLst/>
+          </a:prstGeom>
+          <a:noFill/>
+        </p:spPr>
+        <p:txBody>
+          <a:bodyPr wrap="none" rtlCol="0">
+            <a:spAutoFit/>
+          </a:bodyPr>
+          <a:lstStyle/>
+          <a:p>
+            <a:pPr marL="285750" indent="-285750">
+              <a:buFontTx/>
+              <a:buChar char="-"/>
+            </a:pPr>
+            <a:r>
+              <a:rPr lang="fr-FR" dirty="0" smtClean="0"/>
+              <a:t>Mise </a:t>
+            </a:r>
+            <a:r>
+              <a:rPr lang="fr-FR" dirty="0"/>
+              <a:t>à jour </a:t>
+            </a:r>
+            <a:r>
+              <a:rPr lang="fr-FR" dirty="0" smtClean="0"/>
+              <a:t>matérielle</a:t>
+            </a:r>
+          </a:p>
+          <a:p>
+            <a:pPr marL="742950" lvl="1" indent="-285750">
+              <a:buFontTx/>
+              <a:buChar char="-"/>
+            </a:pPr>
+            <a:r>
+              <a:rPr lang="fr-FR" dirty="0" smtClean="0"/>
+              <a:t>Avantages</a:t>
+            </a:r>
+            <a:r>
+              <a:rPr lang="fr-FR" dirty="0"/>
+              <a:t/>
+            </a:r>
+            <a:br>
+              <a:rPr lang="fr-FR" dirty="0"/>
+            </a:br>
+            <a:r>
+              <a:rPr lang="fr-FR" dirty="0"/>
+              <a:t>Relativement simple (ajout de ram, upgrade de CPU…), surtout avec une machine </a:t>
+            </a:r>
+            <a:r>
+              <a:rPr lang="fr-FR" dirty="0" smtClean="0"/>
+              <a:t>virtuelle</a:t>
+            </a:r>
+          </a:p>
+          <a:p>
+            <a:pPr marL="742950" lvl="1" indent="-285750">
+              <a:buFontTx/>
+              <a:buChar char="-"/>
+            </a:pPr>
+            <a:r>
+              <a:rPr lang="fr-FR" dirty="0" smtClean="0"/>
+              <a:t>Inconvénients</a:t>
+            </a:r>
+            <a:r>
+              <a:rPr lang="fr-FR" dirty="0"/>
+              <a:t/>
+            </a:r>
+            <a:br>
+              <a:rPr lang="fr-FR" dirty="0"/>
+            </a:br>
+            <a:r>
+              <a:rPr lang="fr-FR" dirty="0"/>
+              <a:t>Souvent cher (notamment en cas de changement de machine physique)</a:t>
+            </a:r>
+            <a:br>
+              <a:rPr lang="fr-FR" dirty="0"/>
+            </a:br>
+            <a:r>
+              <a:rPr lang="fr-FR" dirty="0"/>
+              <a:t>Interruption de service plus ou moins longue</a:t>
+            </a:r>
+            <a:br>
+              <a:rPr lang="fr-FR" dirty="0"/>
+            </a:br>
+            <a:r>
+              <a:rPr lang="fr-FR" dirty="0"/>
+              <a:t>Le serveur peut ne pas fonctionner sur la nouvelle </a:t>
+            </a:r>
+            <a:r>
+              <a:rPr lang="fr-FR" dirty="0" smtClean="0"/>
+              <a:t>machine</a:t>
+            </a:r>
+          </a:p>
+          <a:p>
+            <a:pPr marL="285750" indent="-285750">
+              <a:buFontTx/>
+              <a:buChar char="-"/>
+            </a:pPr>
+            <a:r>
+              <a:rPr lang="fr-FR" dirty="0" smtClean="0"/>
+              <a:t>Api-</a:t>
+            </a:r>
+            <a:r>
+              <a:rPr lang="fr-FR" dirty="0" err="1" smtClean="0"/>
+              <a:t>shadowing</a:t>
+            </a:r>
+            <a:endParaRPr lang="fr-FR" dirty="0" smtClean="0"/>
+          </a:p>
+          <a:p>
+            <a:pPr marL="742950" lvl="1" indent="-285750">
+              <a:buFontTx/>
+              <a:buChar char="-"/>
+            </a:pPr>
+            <a:r>
+              <a:rPr lang="fr-FR" dirty="0" smtClean="0"/>
+              <a:t>Avantages</a:t>
+            </a:r>
+          </a:p>
+          <a:p>
+            <a:pPr marL="742950" lvl="1" indent="-285750">
+              <a:buFontTx/>
+              <a:buChar char="-"/>
+            </a:pPr>
+            <a:r>
+              <a:rPr lang="fr-FR" dirty="0" smtClean="0"/>
+              <a:t>Inconvénients</a:t>
+            </a:r>
+            <a:endParaRPr lang="fr-FR" dirty="0"/>
+          </a:p>
+        </p:txBody>
+      </p:sp>
+    </p:spTree>
+    <p:extLst>
+      <p:ext uri="{BB962C8B-B14F-4D97-AF65-F5344CB8AC3E}">
+        <p14:creationId xmlns:p14="http://schemas.microsoft.com/office/powerpoint/2010/main" val="1649420697"/>
+      </p:ext>
+    </p:extLst>
+  </p:cSld>
+  <p:clrMapOvr>
+    <a:masterClrMapping/>
+  </p:clrMapOvr>
+  <p:timing>
+    <p:tnLst>
+      <p:par>
+        <p:cTn id="1" dur="indefinite" restart="never" nodeType="tmRoot"/>
+      </p:par>
+    </p:tnLst>
+  </p:timing>
+</p:sld>
+</file>
+
+<file path=ppt/slides/slide9.xml><?xml version="1.0" encoding="utf-8"?>
+<p:sld xmlns:a="http://schemas.openxmlformats.org/drawingml/2006/main" xmlns:r="http://schemas.openxmlformats.org/officeDocument/2006/relationships" xmlns:p="http://schemas.openxmlformats.org/presentationml/2006/main">
+  <p:cSld>
+    <p:spTree>
+      <p:nvGrpSpPr>
+        <p:cNvPr id="1" name=""/>
+        <p:cNvGrpSpPr/>
+        <p:nvPr/>
+      </p:nvGrpSpPr>
+      <p:grpSpPr>
+        <a:xfrm>
+          <a:off x="0" y="0"/>
+          <a:ext cx="0" cy="0"/>
+          <a:chOff x="0" y="0"/>
+          <a:chExt cx="0" cy="0"/>
+        </a:xfrm>
+      </p:grpSpPr>
+      <p:pic>
+        <p:nvPicPr>
+          <p:cNvPr id="5" name="Image 4">
+            <a:extLst>
+              <a:ext uri="{FF2B5EF4-FFF2-40B4-BE49-F238E27FC236}">
+                <a16:creationId xmlns="" xmlns:a16="http://schemas.microsoft.com/office/drawing/2014/main" id="{D91F6CE4-A0FB-4282-9B85-47FA5527C736}"/>
+              </a:ext>
+            </a:extLst>
+          </p:cNvPr>
+          <p:cNvPicPr>
+            <a:picLocks noChangeAspect="1"/>
+          </p:cNvPicPr>
+          <p:nvPr/>
+        </p:nvPicPr>
+        <p:blipFill>
+          <a:blip r:embed="rId3" cstate="print">
+            <a:extLst>
+              <a:ext uri="{28A0092B-C50C-407E-A947-70E740481C1C}">
+                <a14:useLocalDpi xmlns:a14="http://schemas.microsoft.com/office/drawing/2010/main" val="0"/>
+              </a:ext>
+            </a:extLst>
+          </a:blip>
+          <a:stretch>
+            <a:fillRect/>
+          </a:stretch>
+        </p:blipFill>
+        <p:spPr>
+          <a:xfrm>
+            <a:off x="293615" y="6291743"/>
+            <a:ext cx="10508871" cy="272654"/>
+          </a:xfrm>
+          <a:prstGeom prst="rect">
+            <a:avLst/>
+          </a:prstGeom>
+        </p:spPr>
+      </p:pic>
+      <p:pic>
+        <p:nvPicPr>
+          <p:cNvPr id="6" name="Image 5">
+            <a:extLst>
+              <a:ext uri="{FF2B5EF4-FFF2-40B4-BE49-F238E27FC236}">
+                <a16:creationId xmlns="" xmlns:a16="http://schemas.microsoft.com/office/drawing/2014/main" id="{B6F51BA5-E830-46D2-B1E2-3A2C10F760E7}"/>
+              </a:ext>
+            </a:extLst>
+          </p:cNvPr>
+          <p:cNvPicPr>
+            <a:picLocks noChangeAspect="1"/>
+          </p:cNvPicPr>
+          <p:nvPr/>
+        </p:nvPicPr>
+        <p:blipFill>
+          <a:blip r:embed="rId4" cstate="print">
+            <a:extLst>
+              <a:ext uri="{28A0092B-C50C-407E-A947-70E740481C1C}">
+                <a14:useLocalDpi xmlns:a14="http://schemas.microsoft.com/office/drawing/2010/main" val="0"/>
+              </a:ext>
+            </a:extLst>
+          </a:blip>
+          <a:stretch>
+            <a:fillRect/>
+          </a:stretch>
+        </p:blipFill>
+        <p:spPr>
+          <a:xfrm>
+            <a:off x="10802486" y="5912350"/>
+            <a:ext cx="1193772" cy="787940"/>
+          </a:xfrm>
+          <a:prstGeom prst="rect">
+            <a:avLst/>
+          </a:prstGeom>
+        </p:spPr>
+      </p:pic>
+    </p:spTree>
+    <p:extLst>
+      <p:ext uri="{BB962C8B-B14F-4D97-AF65-F5344CB8AC3E}">
+        <p14:creationId xmlns:p14="http://schemas.microsoft.com/office/powerpoint/2010/main" val="2928623391"/>
       </p:ext>
     </p:extLst>
   </p:cSld>
@@ -5763,19 +7763,19 @@
 
 <file path=customXml/item10.xml><?xml version="1.0" encoding="utf-8"?>
 <Control xmlns="http://schemas.microsoft.com/VisualStudio/2011/storyboarding/control">
-  <Id Name="System.Storyboarding.WindowsApps.SearchBar" Revision="1" Stencil="System.Storyboarding.WindowsApps" StencilVersion="0.1"/>
+  <Id Name="System.Storyboarding.WindowsDesktop.DialogBox" Revision="1" Stencil="System.Storyboarding.WindowsDesktop" StencilVersion="0.1"/>
 </Control>
 </file>
 
 <file path=customXml/item2.xml><?xml version="1.0" encoding="utf-8"?>
 <Control xmlns="http://schemas.microsoft.com/VisualStudio/2011/storyboarding/control">
-  <Id Name="System.Storyboarding.WindowsPhoneIcons.Search" Revision="1" Stencil="System.Storyboarding.WindowsPhoneIcons" StencilVersion="0.1"/>
+  <Id Name="System.Storyboarding.WindowsDesktop.AlertDialog" Revision="1" Stencil="System.Storyboarding.WindowsDesktop" StencilVersion="0.1"/>
 </Control>
 </file>
 
 <file path=customXml/item3.xml><?xml version="1.0" encoding="utf-8"?>
 <Control xmlns="http://schemas.microsoft.com/VisualStudio/2011/storyboarding/control">
-  <Id Name="System.Storyboarding.WindowsDesktop.DialogBox" Revision="1" Stencil="System.Storyboarding.WindowsDesktop" StencilVersion="0.1"/>
+  <Id Name="System.Storyboarding.Common.Breadcrumb" Revision="1" Stencil="System.Storyboarding.Common" StencilVersion="0.1"/>
 </Control>
 </file>
 
@@ -5787,13 +7787,13 @@
 
 <file path=customXml/item5.xml><?xml version="1.0" encoding="utf-8"?>
 <Control xmlns="http://schemas.microsoft.com/VisualStudio/2011/storyboarding/control">
-  <Id Name="System.Storyboarding.Backgrounds.WebBrowser" Revision="1" Stencil="System.Storyboarding.Backgrounds" StencilVersion="0.1"/>
+  <Id Name="System.Storyboarding.WindowsPhoneIcons.Search" Revision="1" Stencil="System.Storyboarding.WindowsPhoneIcons" StencilVersion="0.1"/>
 </Control>
 </file>
 
 <file path=customXml/item6.xml><?xml version="1.0" encoding="utf-8"?>
 <Control xmlns="http://schemas.microsoft.com/VisualStudio/2011/storyboarding/control">
-  <Id Name="System.Storyboarding.WindowsDesktop.AlertDialog" Revision="1" Stencil="System.Storyboarding.WindowsDesktop" StencilVersion="0.1"/>
+  <Id Name="System.Storyboarding.WindowsApps.SearchBar" Revision="1" Stencil="System.Storyboarding.WindowsApps" StencilVersion="0.1"/>
 </Control>
 </file>
 
@@ -5811,11 +7811,27 @@
 
 <file path=customXml/item9.xml><?xml version="1.0" encoding="utf-8"?>
 <Control xmlns="http://schemas.microsoft.com/VisualStudio/2011/storyboarding/control">
-  <Id Name="System.Storyboarding.Common.Breadcrumb" Revision="1" Stencil="System.Storyboarding.Common" StencilVersion="0.1"/>
+  <Id Name="System.Storyboarding.Backgrounds.WebBrowser" Revision="1" Stencil="System.Storyboarding.Backgrounds" StencilVersion="0.1"/>
 </Control>
 </file>
 
 <file path=customXml/itemProps1.xml><?xml version="1.0" encoding="utf-8"?>
+<ds:datastoreItem xmlns:ds="http://schemas.openxmlformats.org/officeDocument/2006/customXml" ds:itemID="{82FCB0D1-8EB6-4B2D-98E5-C2C86E67B90F}">
+  <ds:schemaRefs>
+    <ds:schemaRef ds:uri="http://schemas.microsoft.com/VisualStudio/2011/storyboarding/control"/>
+  </ds:schemaRefs>
+</ds:datastoreItem>
+</file>
+
+<file path=customXml/itemProps10.xml><?xml version="1.0" encoding="utf-8"?>
+<ds:datastoreItem xmlns:ds="http://schemas.openxmlformats.org/officeDocument/2006/customXml" ds:itemID="{C315F13A-AC62-4724-879E-14987FCB1CE6}">
+  <ds:schemaRefs>
+    <ds:schemaRef ds:uri="http://schemas.microsoft.com/VisualStudio/2011/storyboarding/control"/>
+  </ds:schemaRefs>
+</ds:datastoreItem>
+</file>
+
+<file path=customXml/itemProps2.xml><?xml version="1.0" encoding="utf-8"?>
 <ds:datastoreItem xmlns:ds="http://schemas.openxmlformats.org/officeDocument/2006/customXml" ds:itemID="{EBBE763A-B3D5-488A-9F72-453E09C2E102}">
   <ds:schemaRefs>
     <ds:schemaRef ds:uri="http://schemas.microsoft.com/VisualStudio/2011/storyboarding/control"/>
@@ -5823,24 +7839,8 @@
 </ds:datastoreItem>
 </file>
 
-<file path=customXml/itemProps10.xml><?xml version="1.0" encoding="utf-8"?>
-<ds:datastoreItem xmlns:ds="http://schemas.openxmlformats.org/officeDocument/2006/customXml" ds:itemID="{9EDA62CD-3E8D-466C-A802-D575A138582C}">
-  <ds:schemaRefs>
-    <ds:schemaRef ds:uri="http://schemas.microsoft.com/VisualStudio/2011/storyboarding/control"/>
-  </ds:schemaRefs>
-</ds:datastoreItem>
-</file>
-
-<file path=customXml/itemProps2.xml><?xml version="1.0" encoding="utf-8"?>
-<ds:datastoreItem xmlns:ds="http://schemas.openxmlformats.org/officeDocument/2006/customXml" ds:itemID="{120A3C96-CD27-497D-A0EF-E96445F10DC2}">
-  <ds:schemaRefs>
-    <ds:schemaRef ds:uri="http://schemas.microsoft.com/VisualStudio/2011/storyboarding/control"/>
-  </ds:schemaRefs>
-</ds:datastoreItem>
-</file>
-
 <file path=customXml/itemProps3.xml><?xml version="1.0" encoding="utf-8"?>
-<ds:datastoreItem xmlns:ds="http://schemas.openxmlformats.org/officeDocument/2006/customXml" ds:itemID="{1CAF7CC1-4F40-417B-9F2E-8DAFAC288198}">
+<ds:datastoreItem xmlns:ds="http://schemas.openxmlformats.org/officeDocument/2006/customXml" ds:itemID="{9A48F3C4-45B4-4BFF-BBD6-E5D8E1BB578C}">
   <ds:schemaRefs>
     <ds:schemaRef ds:uri="http://schemas.microsoft.com/VisualStudio/2011/storyboarding/control"/>
   </ds:schemaRefs>
@@ -5856,7 +7856,7 @@
 </file>
 
 <file path=customXml/itemProps5.xml><?xml version="1.0" encoding="utf-8"?>
-<ds:datastoreItem xmlns:ds="http://schemas.openxmlformats.org/officeDocument/2006/customXml" ds:itemID="{B480E993-63B5-4C2F-BB8F-99D7AE1386B6}">
+<ds:datastoreItem xmlns:ds="http://schemas.openxmlformats.org/officeDocument/2006/customXml" ds:itemID="{120A3C96-CD27-497D-A0EF-E96445F10DC2}">
   <ds:schemaRefs>
     <ds:schemaRef ds:uri="http://schemas.microsoft.com/VisualStudio/2011/storyboarding/control"/>
   </ds:schemaRefs>
@@ -5864,7 +7864,7 @@
 </file>
 
 <file path=customXml/itemProps6.xml><?xml version="1.0" encoding="utf-8"?>
-<ds:datastoreItem xmlns:ds="http://schemas.openxmlformats.org/officeDocument/2006/customXml" ds:itemID="{82FCB0D1-8EB6-4B2D-98E5-C2C86E67B90F}">
+<ds:datastoreItem xmlns:ds="http://schemas.openxmlformats.org/officeDocument/2006/customXml" ds:itemID="{9EDA62CD-3E8D-466C-A802-D575A138582C}">
   <ds:schemaRefs>
     <ds:schemaRef ds:uri="http://schemas.microsoft.com/VisualStudio/2011/storyboarding/control"/>
   </ds:schemaRefs>
@@ -5880,7 +7880,7 @@
 </file>
 
 <file path=customXml/itemProps8.xml><?xml version="1.0" encoding="utf-8"?>
-<ds:datastoreItem xmlns:ds="http://schemas.openxmlformats.org/officeDocument/2006/customXml" ds:itemID="{C315F13A-AC62-4724-879E-14987FCB1CE6}">
+<ds:datastoreItem xmlns:ds="http://schemas.openxmlformats.org/officeDocument/2006/customXml" ds:itemID="{1CAF7CC1-4F40-417B-9F2E-8DAFAC288198}">
   <ds:schemaRefs>
     <ds:schemaRef ds:uri="http://schemas.microsoft.com/VisualStudio/2011/storyboarding/control"/>
   </ds:schemaRefs>
@@ -5888,7 +7888,7 @@
 </file>
 
 <file path=customXml/itemProps9.xml><?xml version="1.0" encoding="utf-8"?>
-<ds:datastoreItem xmlns:ds="http://schemas.openxmlformats.org/officeDocument/2006/customXml" ds:itemID="{9A48F3C4-45B4-4BFF-BBD6-E5D8E1BB578C}">
+<ds:datastoreItem xmlns:ds="http://schemas.openxmlformats.org/officeDocument/2006/customXml" ds:itemID="{B480E993-63B5-4C2F-BB8F-99D7AE1386B6}">
   <ds:schemaRefs>
     <ds:schemaRef ds:uri="http://schemas.microsoft.com/VisualStudio/2011/storyboarding/control"/>
   </ds:schemaRefs>

</xml_diff>

<commit_message>
Début du chapitre sur l'api shadowing
</commit_message>
<xml_diff>
--- a/Speak'up API shadowing.pptx
+++ b/Speak'up API shadowing.pptx
@@ -14,8 +14,8 @@
     <p:sldId id="262" r:id="rId15"/>
     <p:sldId id="281" r:id="rId16"/>
     <p:sldId id="282" r:id="rId17"/>
-    <p:sldId id="283" r:id="rId18"/>
-    <p:sldId id="288" r:id="rId19"/>
+    <p:sldId id="289" r:id="rId18"/>
+    <p:sldId id="290" r:id="rId19"/>
     <p:sldId id="284" r:id="rId20"/>
     <p:sldId id="285" r:id="rId21"/>
     <p:sldId id="286" r:id="rId22"/>
@@ -220,7 +220,7 @@
           <a:p>
             <a:fld id="{B5AD0476-FE6D-4A78-9DC3-98305AD3C12A}" type="datetimeFigureOut">
               <a:rPr lang="fr-FR" smtClean="0"/>
-              <a:t>22/10/2019</a:t>
+              <a:t>23/10/2019</a:t>
             </a:fld>
             <a:endParaRPr lang="fr-FR"/>
           </a:p>
@@ -1042,7 +1042,7 @@
       </p:sp>
       <p:sp>
         <p:nvSpPr>
-          <p:cNvPr id="3" name="Espace réservé des notes 2"/>
+          <p:cNvPr id="3" name="Espace réservé des commentaires 2"/>
           <p:cNvSpPr>
             <a:spLocks noGrp="1"/>
           </p:cNvSpPr>
@@ -1055,78 +1055,6 @@
           <a:bodyPr/>
           <a:lstStyle/>
           <a:p>
-            <a:pPr marL="171450" indent="-171450">
-              <a:buFontTx/>
-              <a:buChar char="-"/>
-            </a:pPr>
-            <a:r>
-              <a:rPr lang="fr-FR" dirty="0" err="1" smtClean="0"/>
-              <a:t>load-balancing</a:t>
-            </a:r>
-            <a:r>
-              <a:rPr lang="fr-FR" dirty="0" smtClean="0"/>
-              <a:t>: </a:t>
-            </a:r>
-          </a:p>
-          <a:p>
-            <a:pPr marL="628650" lvl="1" indent="-171450">
-              <a:buFontTx/>
-              <a:buChar char="-"/>
-            </a:pPr>
-            <a:r>
-              <a:rPr lang="fr-FR" dirty="0" smtClean="0"/>
-              <a:t>Simple si mise</a:t>
-            </a:r>
-            <a:r>
-              <a:rPr lang="fr-FR" baseline="0" dirty="0" smtClean="0"/>
-              <a:t> en place « simpliste » (style X connexion par serveur)</a:t>
-            </a:r>
-          </a:p>
-          <a:p>
-            <a:pPr marL="628650" lvl="1" indent="-171450">
-              <a:buFontTx/>
-              <a:buChar char="-"/>
-            </a:pPr>
-            <a:r>
-              <a:rPr lang="fr-FR" baseline="0" dirty="0" smtClean="0"/>
-              <a:t>Transparent si les api pointent vers le </a:t>
-            </a:r>
-            <a:r>
-              <a:rPr lang="fr-FR" baseline="0" dirty="0" err="1" smtClean="0"/>
-              <a:t>load</a:t>
-            </a:r>
-            <a:r>
-              <a:rPr lang="fr-FR" baseline="0" dirty="0" smtClean="0"/>
-              <a:t>-balancer</a:t>
-            </a:r>
-          </a:p>
-          <a:p>
-            <a:pPr marL="628650" lvl="1" indent="-171450">
-              <a:buFontTx/>
-              <a:buChar char="-"/>
-            </a:pPr>
-            <a:r>
-              <a:rPr lang="fr-FR" baseline="0" dirty="0" smtClean="0"/>
-              <a:t>Peut être complexe si gestion en fonction de la charge</a:t>
-            </a:r>
-          </a:p>
-          <a:p>
-            <a:pPr marL="628650" lvl="1" indent="-171450">
-              <a:buFontTx/>
-              <a:buChar char="-"/>
-            </a:pPr>
-            <a:r>
-              <a:rPr lang="fr-FR" baseline="0" dirty="0" smtClean="0"/>
-              <a:t>Pb de gestion de connexion (si données en cache sur serveur A, puis </a:t>
-            </a:r>
-            <a:r>
-              <a:rPr lang="fr-FR" baseline="0" dirty="0" err="1" smtClean="0"/>
-              <a:t>reco</a:t>
-            </a:r>
-            <a:r>
-              <a:rPr lang="fr-FR" baseline="0" dirty="0" smtClean="0"/>
-              <a:t> sur serveur B, que se passe-t-il ?)</a:t>
-            </a:r>
             <a:endParaRPr lang="fr-FR" dirty="0"/>
           </a:p>
         </p:txBody>
@@ -1148,7 +1076,7 @@
           <a:p>
             <a:fld id="{AA5DF8EF-0F82-44B3-979E-DBC26962337C}" type="slidenum">
               <a:rPr lang="fr-FR" smtClean="0"/>
-              <a:t>7</a:t>
+              <a:t>8</a:t>
             </a:fld>
             <a:endParaRPr lang="fr-FR"/>
           </a:p>
@@ -1157,7 +1085,7 @@
     </p:spTree>
     <p:extLst>
       <p:ext uri="{BB962C8B-B14F-4D97-AF65-F5344CB8AC3E}">
-        <p14:creationId xmlns:p14="http://schemas.microsoft.com/office/powerpoint/2010/main" val="3030127102"/>
+        <p14:creationId xmlns:p14="http://schemas.microsoft.com/office/powerpoint/2010/main" val="72042757"/>
       </p:ext>
     </p:extLst>
   </p:cSld>
@@ -1650,7 +1578,7 @@
           <a:p>
             <a:fld id="{2A800B55-2EA3-4651-92C4-339DC2AA9BC2}" type="datetimeFigureOut">
               <a:rPr lang="fr-FR" smtClean="0"/>
-              <a:t>22/10/2019</a:t>
+              <a:t>23/10/2019</a:t>
             </a:fld>
             <a:endParaRPr lang="fr-FR"/>
           </a:p>
@@ -1848,7 +1776,7 @@
           <a:p>
             <a:fld id="{2A800B55-2EA3-4651-92C4-339DC2AA9BC2}" type="datetimeFigureOut">
               <a:rPr lang="fr-FR" smtClean="0"/>
-              <a:t>22/10/2019</a:t>
+              <a:t>23/10/2019</a:t>
             </a:fld>
             <a:endParaRPr lang="fr-FR"/>
           </a:p>
@@ -2056,7 +1984,7 @@
           <a:p>
             <a:fld id="{2A800B55-2EA3-4651-92C4-339DC2AA9BC2}" type="datetimeFigureOut">
               <a:rPr lang="fr-FR" smtClean="0"/>
-              <a:t>22/10/2019</a:t>
+              <a:t>23/10/2019</a:t>
             </a:fld>
             <a:endParaRPr lang="fr-FR"/>
           </a:p>
@@ -2254,7 +2182,7 @@
           <a:p>
             <a:fld id="{2A800B55-2EA3-4651-92C4-339DC2AA9BC2}" type="datetimeFigureOut">
               <a:rPr lang="fr-FR" smtClean="0"/>
-              <a:t>22/10/2019</a:t>
+              <a:t>23/10/2019</a:t>
             </a:fld>
             <a:endParaRPr lang="fr-FR"/>
           </a:p>
@@ -2529,7 +2457,7 @@
           <a:p>
             <a:fld id="{2A800B55-2EA3-4651-92C4-339DC2AA9BC2}" type="datetimeFigureOut">
               <a:rPr lang="fr-FR" smtClean="0"/>
-              <a:t>22/10/2019</a:t>
+              <a:t>23/10/2019</a:t>
             </a:fld>
             <a:endParaRPr lang="fr-FR"/>
           </a:p>
@@ -2794,7 +2722,7 @@
           <a:p>
             <a:fld id="{2A800B55-2EA3-4651-92C4-339DC2AA9BC2}" type="datetimeFigureOut">
               <a:rPr lang="fr-FR" smtClean="0"/>
-              <a:t>22/10/2019</a:t>
+              <a:t>23/10/2019</a:t>
             </a:fld>
             <a:endParaRPr lang="fr-FR"/>
           </a:p>
@@ -3206,7 +3134,7 @@
           <a:p>
             <a:fld id="{2A800B55-2EA3-4651-92C4-339DC2AA9BC2}" type="datetimeFigureOut">
               <a:rPr lang="fr-FR" smtClean="0"/>
-              <a:t>22/10/2019</a:t>
+              <a:t>23/10/2019</a:t>
             </a:fld>
             <a:endParaRPr lang="fr-FR"/>
           </a:p>
@@ -3347,7 +3275,7 @@
           <a:p>
             <a:fld id="{2A800B55-2EA3-4651-92C4-339DC2AA9BC2}" type="datetimeFigureOut">
               <a:rPr lang="fr-FR" smtClean="0"/>
-              <a:t>22/10/2019</a:t>
+              <a:t>23/10/2019</a:t>
             </a:fld>
             <a:endParaRPr lang="fr-FR"/>
           </a:p>
@@ -3460,7 +3388,7 @@
           <a:p>
             <a:fld id="{2A800B55-2EA3-4651-92C4-339DC2AA9BC2}" type="datetimeFigureOut">
               <a:rPr lang="fr-FR" smtClean="0"/>
-              <a:t>22/10/2019</a:t>
+              <a:t>23/10/2019</a:t>
             </a:fld>
             <a:endParaRPr lang="fr-FR"/>
           </a:p>
@@ -3771,7 +3699,7 @@
           <a:p>
             <a:fld id="{2A800B55-2EA3-4651-92C4-339DC2AA9BC2}" type="datetimeFigureOut">
               <a:rPr lang="fr-FR" smtClean="0"/>
-              <a:t>22/10/2019</a:t>
+              <a:t>23/10/2019</a:t>
             </a:fld>
             <a:endParaRPr lang="fr-FR"/>
           </a:p>
@@ -4059,7 +3987,7 @@
           <a:p>
             <a:fld id="{2A800B55-2EA3-4651-92C4-339DC2AA9BC2}" type="datetimeFigureOut">
               <a:rPr lang="fr-FR" smtClean="0"/>
-              <a:t>22/10/2019</a:t>
+              <a:t>23/10/2019</a:t>
             </a:fld>
             <a:endParaRPr lang="fr-FR"/>
           </a:p>
@@ -4300,7 +4228,7 @@
           <a:p>
             <a:fld id="{2A800B55-2EA3-4651-92C4-339DC2AA9BC2}" type="datetimeFigureOut">
               <a:rPr lang="fr-FR" smtClean="0"/>
-              <a:t>22/10/2019</a:t>
+              <a:t>23/10/2019</a:t>
             </a:fld>
             <a:endParaRPr lang="fr-FR"/>
           </a:p>
@@ -6170,13 +6098,7 @@
               <a:rPr lang="fr-FR" dirty="0" smtClean="0">
                 <a:sym typeface="Wingdings" panose="05000000000000000000" pitchFamily="2" charset="2"/>
               </a:rPr>
-              <a:t> Serveur monolithique, massif, </a:t>
-            </a:r>
-            <a:r>
-              <a:rPr lang="fr-FR" dirty="0" smtClean="0">
-                <a:sym typeface="Wingdings" panose="05000000000000000000" pitchFamily="2" charset="2"/>
-              </a:rPr>
-              <a:t>fiable</a:t>
+              <a:t> Serveur monolithique, massif, fiable</a:t>
             </a:r>
             <a:r>
               <a:rPr lang="fr-FR" smtClean="0">
@@ -6411,7 +6333,7 @@
           <a:noFill/>
         </p:spPr>
         <p:txBody>
-          <a:bodyPr wrap="none" rtlCol="0">
+          <a:bodyPr wrap="square" rtlCol="0">
             <a:spAutoFit/>
           </a:bodyPr>
           <a:lstStyle/>
@@ -6481,145 +6403,6 @@
               <a:t>capacité</a:t>
             </a:r>
             <a:endParaRPr lang="fr-FR" dirty="0"/>
-          </a:p>
-        </p:txBody>
-      </p:sp>
-      <p:sp>
-        <p:nvSpPr>
-          <p:cNvPr id="8" name="ZoneTexte 7"/>
-          <p:cNvSpPr txBox="1"/>
-          <p:nvPr/>
-        </p:nvSpPr>
-        <p:spPr>
-          <a:xfrm>
-            <a:off x="1711423" y="2369127"/>
-            <a:ext cx="7469096" cy="3139321"/>
-          </a:xfrm>
-          <a:prstGeom prst="rect">
-            <a:avLst/>
-          </a:prstGeom>
-          <a:noFill/>
-        </p:spPr>
-        <p:txBody>
-          <a:bodyPr wrap="none" rtlCol="0">
-            <a:spAutoFit/>
-          </a:bodyPr>
-          <a:lstStyle/>
-          <a:p>
-            <a:r>
-              <a:rPr lang="fr-FR" u="sng" dirty="0" smtClean="0"/>
-              <a:t>Solution(s) possibles(s)</a:t>
-            </a:r>
-            <a:r>
-              <a:rPr lang="fr-FR" dirty="0" smtClean="0"/>
-              <a:t> :</a:t>
-            </a:r>
-          </a:p>
-          <a:p>
-            <a:pPr marL="285750" indent="-285750">
-              <a:buFontTx/>
-              <a:buChar char="-"/>
-            </a:pPr>
-            <a:r>
-              <a:rPr lang="fr-FR" dirty="0" smtClean="0"/>
-              <a:t>Refonte one-</a:t>
-            </a:r>
-            <a:r>
-              <a:rPr lang="fr-FR" dirty="0" err="1" smtClean="0"/>
-              <a:t>shot</a:t>
-            </a:r>
-            <a:r>
-              <a:rPr lang="fr-FR" dirty="0" smtClean="0"/>
-              <a:t> du code du serveur</a:t>
-            </a:r>
-          </a:p>
-          <a:p>
-            <a:pPr marL="742950" lvl="1" indent="-285750">
-              <a:buFontTx/>
-              <a:buChar char="-"/>
-            </a:pPr>
-            <a:r>
-              <a:rPr lang="fr-FR" dirty="0" smtClean="0"/>
-              <a:t>Avantages</a:t>
-            </a:r>
-          </a:p>
-          <a:p>
-            <a:pPr marL="1200150" lvl="2" indent="-285750">
-              <a:buFontTx/>
-              <a:buChar char="-"/>
-            </a:pPr>
-            <a:r>
-              <a:rPr lang="fr-FR" dirty="0" smtClean="0"/>
-              <a:t>Mise en place d’une architecture de base et de bonnes pratiques</a:t>
-            </a:r>
-          </a:p>
-          <a:p>
-            <a:pPr marL="1200150" lvl="2" indent="-285750">
-              <a:buFontTx/>
-              <a:buChar char="-"/>
-            </a:pPr>
-            <a:r>
-              <a:rPr lang="fr-FR" dirty="0" smtClean="0"/>
-              <a:t>Les personnes en charge sont impliquées à 100%</a:t>
-            </a:r>
-          </a:p>
-          <a:p>
-            <a:pPr marL="1200150" lvl="2" indent="-285750">
-              <a:buFontTx/>
-              <a:buChar char="-"/>
-            </a:pPr>
-            <a:r>
-              <a:rPr lang="fr-FR" dirty="0" smtClean="0"/>
-              <a:t>Ce qui est fait n’est plus à faire</a:t>
-            </a:r>
-          </a:p>
-          <a:p>
-            <a:pPr marL="742950" lvl="1" indent="-285750">
-              <a:buFontTx/>
-              <a:buChar char="-"/>
-            </a:pPr>
-            <a:r>
-              <a:rPr lang="fr-FR" dirty="0" smtClean="0"/>
-              <a:t>Inconvénients</a:t>
-            </a:r>
-          </a:p>
-          <a:p>
-            <a:pPr marL="1200150" lvl="2" indent="-285750">
-              <a:buFontTx/>
-              <a:buChar char="-"/>
-            </a:pPr>
-            <a:r>
-              <a:rPr lang="fr-FR" dirty="0" smtClean="0"/>
-              <a:t>Obligation de « casser » du code fonctionnel</a:t>
-            </a:r>
-          </a:p>
-          <a:p>
-            <a:pPr marL="1200150" lvl="2" indent="-285750">
-              <a:buFontTx/>
-              <a:buChar char="-"/>
-            </a:pPr>
-            <a:r>
-              <a:rPr lang="fr-FR" dirty="0"/>
-              <a:t>Les personnes en charge sont impliquées à 100%</a:t>
-            </a:r>
-            <a:endParaRPr lang="fr-FR" dirty="0" smtClean="0"/>
-          </a:p>
-          <a:p>
-            <a:pPr marL="1200150" lvl="2" indent="-285750">
-              <a:buFontTx/>
-              <a:buChar char="-"/>
-            </a:pPr>
-            <a:r>
-              <a:rPr lang="fr-FR" dirty="0" smtClean="0"/>
-              <a:t>Projet long, de plusieurs mois à plusieurs années</a:t>
-            </a:r>
-          </a:p>
-          <a:p>
-            <a:pPr marL="1200150" lvl="2" indent="-285750">
-              <a:buFontTx/>
-              <a:buChar char="-"/>
-            </a:pPr>
-            <a:endParaRPr lang="fr-FR" dirty="0" smtClean="0"/>
           </a:p>
         </p:txBody>
       </p:sp>
@@ -6660,6 +6443,724 @@
           <a:chExt cx="0" cy="0"/>
         </a:xfrm>
       </p:grpSpPr>
+      <p:graphicFrame>
+        <p:nvGraphicFramePr>
+          <p:cNvPr id="4" name="Tableau 3"/>
+          <p:cNvGraphicFramePr>
+            <a:graphicFrameLocks noGrp="1"/>
+          </p:cNvGraphicFramePr>
+          <p:nvPr>
+            <p:extLst>
+              <p:ext uri="{D42A27DB-BD31-4B8C-83A1-F6EECF244321}">
+                <p14:modId xmlns:p14="http://schemas.microsoft.com/office/powerpoint/2010/main" val="3588927719"/>
+              </p:ext>
+            </p:extLst>
+          </p:nvPr>
+        </p:nvGraphicFramePr>
+        <p:xfrm>
+          <a:off x="293615" y="279002"/>
+          <a:ext cx="11702643" cy="6309360"/>
+        </p:xfrm>
+        <a:graphic>
+          <a:graphicData uri="http://schemas.openxmlformats.org/drawingml/2006/table">
+            <a:tbl>
+              <a:tblPr firstRow="1" bandRow="1">
+                <a:tableStyleId>{5C22544A-7EE6-4342-B048-85BDC9FD1C3A}</a:tableStyleId>
+              </a:tblPr>
+              <a:tblGrid>
+                <a:gridCol w="2636621"/>
+                <a:gridCol w="4343400"/>
+                <a:gridCol w="4722622"/>
+              </a:tblGrid>
+              <a:tr h="328424">
+                <a:tc>
+                  <a:txBody>
+                    <a:bodyPr/>
+                    <a:lstStyle/>
+                    <a:p>
+                      <a:pPr algn="ctr"/>
+                      <a:r>
+                        <a:rPr lang="fr-FR" sz="1600" kern="1200" dirty="0" smtClean="0">
+                          <a:solidFill>
+                            <a:schemeClr val="bg1"/>
+                          </a:solidFill>
+                          <a:latin typeface="+mn-lt"/>
+                          <a:ea typeface="+mn-ea"/>
+                          <a:cs typeface="+mn-cs"/>
+                        </a:rPr>
+                        <a:t>Solutions</a:t>
+                      </a:r>
+                      <a:endParaRPr lang="fr-FR" sz="1600" kern="1200" dirty="0">
+                        <a:solidFill>
+                          <a:schemeClr val="bg1"/>
+                        </a:solidFill>
+                        <a:latin typeface="+mn-lt"/>
+                        <a:ea typeface="+mn-ea"/>
+                        <a:cs typeface="+mn-cs"/>
+                      </a:endParaRPr>
+                    </a:p>
+                  </a:txBody>
+                  <a:tcPr/>
+                </a:tc>
+                <a:tc>
+                  <a:txBody>
+                    <a:bodyPr/>
+                    <a:lstStyle/>
+                    <a:p>
+                      <a:pPr algn="ctr"/>
+                      <a:r>
+                        <a:rPr lang="fr-FR" sz="1600" kern="1200" dirty="0" smtClean="0">
+                          <a:solidFill>
+                            <a:schemeClr val="bg1"/>
+                          </a:solidFill>
+                          <a:latin typeface="+mn-lt"/>
+                          <a:ea typeface="+mn-ea"/>
+                          <a:cs typeface="+mn-cs"/>
+                        </a:rPr>
+                        <a:t>Avantages</a:t>
+                      </a:r>
+                      <a:endParaRPr lang="fr-FR" sz="1600" kern="1200" dirty="0">
+                        <a:solidFill>
+                          <a:schemeClr val="bg1"/>
+                        </a:solidFill>
+                        <a:latin typeface="+mn-lt"/>
+                        <a:ea typeface="+mn-ea"/>
+                        <a:cs typeface="+mn-cs"/>
+                      </a:endParaRPr>
+                    </a:p>
+                  </a:txBody>
+                  <a:tcPr/>
+                </a:tc>
+                <a:tc>
+                  <a:txBody>
+                    <a:bodyPr/>
+                    <a:lstStyle/>
+                    <a:p>
+                      <a:pPr algn="ctr"/>
+                      <a:r>
+                        <a:rPr lang="fr-FR" sz="1600" kern="1200" dirty="0" smtClean="0">
+                          <a:solidFill>
+                            <a:schemeClr val="bg1"/>
+                          </a:solidFill>
+                          <a:latin typeface="+mn-lt"/>
+                          <a:ea typeface="+mn-ea"/>
+                          <a:cs typeface="+mn-cs"/>
+                        </a:rPr>
+                        <a:t>Inconvénients</a:t>
+                      </a:r>
+                      <a:endParaRPr lang="fr-FR" sz="1600" kern="1200" dirty="0">
+                        <a:solidFill>
+                          <a:schemeClr val="bg1"/>
+                        </a:solidFill>
+                        <a:latin typeface="+mn-lt"/>
+                        <a:ea typeface="+mn-ea"/>
+                        <a:cs typeface="+mn-cs"/>
+                      </a:endParaRPr>
+                    </a:p>
+                  </a:txBody>
+                  <a:tcPr/>
+                </a:tc>
+              </a:tr>
+              <a:tr h="1247069">
+                <a:tc>
+                  <a:txBody>
+                    <a:bodyPr/>
+                    <a:lstStyle/>
+                    <a:p>
+                      <a:pPr marL="0" marR="0" lvl="0" indent="0" algn="l" defTabSz="914400" rtl="0" eaLnBrk="1" fontAlgn="auto" latinLnBrk="0" hangingPunct="1">
+                        <a:lnSpc>
+                          <a:spcPct val="100000"/>
+                        </a:lnSpc>
+                        <a:spcBef>
+                          <a:spcPts val="0"/>
+                        </a:spcBef>
+                        <a:spcAft>
+                          <a:spcPts val="0"/>
+                        </a:spcAft>
+                        <a:buClrTx/>
+                        <a:buSzTx/>
+                        <a:buFontTx/>
+                        <a:buNone/>
+                        <a:tabLst/>
+                        <a:defRPr/>
+                      </a:pPr>
+                      <a:r>
+                        <a:rPr lang="fr-FR" sz="1600" dirty="0" smtClean="0"/>
+                        <a:t>Refonte one-</a:t>
+                      </a:r>
+                      <a:r>
+                        <a:rPr lang="fr-FR" sz="1600" dirty="0" err="1" smtClean="0"/>
+                        <a:t>shot</a:t>
+                      </a:r>
+                      <a:r>
+                        <a:rPr lang="fr-FR" sz="1600" dirty="0" smtClean="0"/>
+                        <a:t> du code</a:t>
+                      </a:r>
+                      <a:endParaRPr lang="fr-FR" sz="1600" dirty="0"/>
+                    </a:p>
+                  </a:txBody>
+                  <a:tcPr/>
+                </a:tc>
+                <a:tc>
+                  <a:txBody>
+                    <a:bodyPr/>
+                    <a:lstStyle/>
+                    <a:p>
+                      <a:pPr marL="285750" lvl="0" indent="-285750">
+                        <a:buFontTx/>
+                        <a:buChar char="-"/>
+                      </a:pPr>
+                      <a:r>
+                        <a:rPr lang="fr-FR" sz="1600" dirty="0" smtClean="0"/>
+                        <a:t>Mise en place d’une architecture de base et de bonnes pratiques</a:t>
+                      </a:r>
+                    </a:p>
+                    <a:p>
+                      <a:pPr marL="285750" lvl="0" indent="-285750">
+                        <a:buFontTx/>
+                        <a:buChar char="-"/>
+                      </a:pPr>
+                      <a:r>
+                        <a:rPr lang="fr-FR" sz="1600" dirty="0" smtClean="0"/>
+                        <a:t>Les personnes en charge sont impliquées à 100%</a:t>
+                      </a:r>
+                    </a:p>
+                    <a:p>
+                      <a:pPr marL="285750" lvl="0" indent="-285750">
+                        <a:buFontTx/>
+                        <a:buChar char="-"/>
+                      </a:pPr>
+                      <a:r>
+                        <a:rPr lang="fr-FR" sz="1600" dirty="0" smtClean="0"/>
+                        <a:t>Ce qui est fait n’est plus à faire</a:t>
+                      </a:r>
+                      <a:endParaRPr lang="fr-FR" sz="1600" dirty="0"/>
+                    </a:p>
+                  </a:txBody>
+                  <a:tcPr/>
+                </a:tc>
+                <a:tc>
+                  <a:txBody>
+                    <a:bodyPr/>
+                    <a:lstStyle/>
+                    <a:p>
+                      <a:pPr marL="285750" lvl="0" indent="-285750">
+                        <a:buFontTx/>
+                        <a:buChar char="-"/>
+                      </a:pPr>
+                      <a:r>
+                        <a:rPr lang="fr-FR" sz="1600" dirty="0" smtClean="0"/>
+                        <a:t>Obligation de « casser » du code fonctionnel</a:t>
+                      </a:r>
+                    </a:p>
+                    <a:p>
+                      <a:pPr marL="285750" lvl="0" indent="-285750">
+                        <a:buFontTx/>
+                        <a:buChar char="-"/>
+                      </a:pPr>
+                      <a:r>
+                        <a:rPr lang="fr-FR" sz="1600" dirty="0" smtClean="0"/>
+                        <a:t>Les personnes en charge sont impliquées à 100%</a:t>
+                      </a:r>
+                    </a:p>
+                    <a:p>
+                      <a:pPr marL="285750" lvl="0" indent="-285750">
+                        <a:buFontTx/>
+                        <a:buChar char="-"/>
+                      </a:pPr>
+                      <a:r>
+                        <a:rPr lang="fr-FR" sz="1600" dirty="0" smtClean="0"/>
+                        <a:t>Projet long, de plusieurs mois à plusieurs </a:t>
+                      </a:r>
+                      <a:r>
+                        <a:rPr lang="fr-FR" sz="1600" dirty="0" smtClean="0"/>
+                        <a:t>années</a:t>
+                      </a:r>
+                    </a:p>
+                    <a:p>
+                      <a:pPr marL="285750" lvl="0" indent="-285750">
+                        <a:buFontTx/>
+                        <a:buChar char="-"/>
+                      </a:pPr>
+                      <a:r>
+                        <a:rPr lang="fr-FR" sz="1600" dirty="0" smtClean="0"/>
+                        <a:t>Aucune</a:t>
+                      </a:r>
+                      <a:r>
+                        <a:rPr lang="fr-FR" sz="1600" baseline="0" dirty="0" smtClean="0"/>
+                        <a:t> garantie que tout soit iso</a:t>
+                      </a:r>
+                      <a:endParaRPr lang="fr-FR" sz="1600" dirty="0"/>
+                    </a:p>
+                  </a:txBody>
+                  <a:tcPr/>
+                </a:tc>
+              </a:tr>
+              <a:tr h="1711095">
+                <a:tc>
+                  <a:txBody>
+                    <a:bodyPr/>
+                    <a:lstStyle/>
+                    <a:p>
+                      <a:r>
+                        <a:rPr lang="fr-FR" sz="1600" dirty="0" err="1" smtClean="0"/>
+                        <a:t>Load-balancing</a:t>
+                      </a:r>
+                      <a:r>
+                        <a:rPr lang="fr-FR" sz="1600" dirty="0" smtClean="0"/>
+                        <a:t> en amont du serveur</a:t>
+                      </a:r>
+                      <a:endParaRPr lang="fr-FR" sz="1600" dirty="0"/>
+                    </a:p>
+                  </a:txBody>
+                  <a:tcPr/>
+                </a:tc>
+                <a:tc>
+                  <a:txBody>
+                    <a:bodyPr/>
+                    <a:lstStyle/>
+                    <a:p>
+                      <a:pPr marL="285750" lvl="0" indent="-285750">
+                        <a:buFontTx/>
+                        <a:buChar char="-"/>
+                      </a:pPr>
+                      <a:r>
+                        <a:rPr lang="fr-FR" sz="1600" dirty="0" smtClean="0"/>
+                        <a:t>Peut être simple à implémenter</a:t>
+                      </a:r>
+                    </a:p>
+                    <a:p>
+                      <a:pPr marL="285750" lvl="0" indent="-285750">
+                        <a:buFontTx/>
+                        <a:buChar char="-"/>
+                      </a:pPr>
+                      <a:r>
+                        <a:rPr lang="fr-FR" sz="1600" dirty="0" smtClean="0"/>
+                        <a:t>Peut être transparent</a:t>
+                      </a:r>
+                    </a:p>
+                    <a:p>
+                      <a:pPr marL="285750" lvl="0" indent="-285750">
+                        <a:buFontTx/>
+                        <a:buChar char="-"/>
+                      </a:pPr>
+                      <a:r>
+                        <a:rPr lang="fr-FR" sz="1600" dirty="0" smtClean="0"/>
+                        <a:t>Il « suffit » de cloner le serveur autant de fois que </a:t>
+                      </a:r>
+                      <a:r>
+                        <a:rPr lang="fr-FR" sz="1600" dirty="0" smtClean="0"/>
+                        <a:t>nécessaire (machine virtuelle)</a:t>
+                      </a:r>
+                      <a:endParaRPr lang="fr-FR" sz="1600" dirty="0"/>
+                    </a:p>
+                  </a:txBody>
+                  <a:tcPr/>
+                </a:tc>
+                <a:tc>
+                  <a:txBody>
+                    <a:bodyPr/>
+                    <a:lstStyle/>
+                    <a:p>
+                      <a:pPr marL="285750" lvl="0" indent="-285750">
+                        <a:buFontTx/>
+                        <a:buChar char="-"/>
+                      </a:pPr>
+                      <a:r>
+                        <a:rPr lang="fr-FR" sz="1600" dirty="0" smtClean="0"/>
+                        <a:t>Peut-être très complexe à implémenter</a:t>
+                      </a:r>
+                    </a:p>
+                    <a:p>
+                      <a:pPr marL="285750" lvl="0" indent="-285750">
+                        <a:buFontTx/>
+                        <a:buChar char="-"/>
+                      </a:pPr>
+                      <a:r>
+                        <a:rPr lang="fr-FR" sz="1600" dirty="0" smtClean="0"/>
+                        <a:t>Le clonage du serveur peut être très problématique (serveur physique)</a:t>
+                      </a:r>
+                    </a:p>
+                    <a:p>
+                      <a:pPr marL="285750" lvl="0" indent="-285750">
+                        <a:buFontTx/>
+                        <a:buChar char="-"/>
+                      </a:pPr>
+                      <a:r>
+                        <a:rPr lang="fr-FR" sz="1600" dirty="0" smtClean="0"/>
+                        <a:t>Il peut être très compliqué de gérer les pertes de </a:t>
+                      </a:r>
+                      <a:r>
+                        <a:rPr lang="fr-FR" sz="1600" dirty="0" smtClean="0"/>
+                        <a:t>connexions</a:t>
+                      </a:r>
+                    </a:p>
+                    <a:p>
+                      <a:pPr marL="285750" lvl="0" indent="-285750">
+                        <a:buFontTx/>
+                        <a:buChar char="-"/>
+                      </a:pPr>
+                      <a:r>
+                        <a:rPr lang="fr-FR" sz="1600" dirty="0" smtClean="0"/>
+                        <a:t>Implique de mettre à jour</a:t>
+                      </a:r>
+                      <a:r>
+                        <a:rPr lang="fr-FR" sz="1600" baseline="0" dirty="0" smtClean="0"/>
+                        <a:t> toutes les instances</a:t>
+                      </a:r>
+                    </a:p>
+                    <a:p>
+                      <a:pPr marL="285750" marR="0" lvl="0" indent="-285750" algn="l" defTabSz="914400" rtl="0" eaLnBrk="1" fontAlgn="auto" latinLnBrk="0" hangingPunct="1">
+                        <a:lnSpc>
+                          <a:spcPct val="100000"/>
+                        </a:lnSpc>
+                        <a:spcBef>
+                          <a:spcPts val="0"/>
+                        </a:spcBef>
+                        <a:spcAft>
+                          <a:spcPts val="0"/>
+                        </a:spcAft>
+                        <a:buClrTx/>
+                        <a:buSzTx/>
+                        <a:buFontTx/>
+                        <a:buChar char="-"/>
+                        <a:tabLst/>
+                        <a:defRPr/>
+                      </a:pPr>
+                      <a:r>
+                        <a:rPr lang="fr-FR" sz="1600" baseline="0" dirty="0" smtClean="0"/>
+                        <a:t>Obligation de modifier les clients</a:t>
+                      </a:r>
+                    </a:p>
+                  </a:txBody>
+                  <a:tcPr/>
+                </a:tc>
+              </a:tr>
+              <a:tr h="1247069">
+                <a:tc>
+                  <a:txBody>
+                    <a:bodyPr/>
+                    <a:lstStyle/>
+                    <a:p>
+                      <a:pPr marL="0" marR="0" lvl="0" indent="0" algn="l" defTabSz="914400" rtl="0" eaLnBrk="1" fontAlgn="auto" latinLnBrk="0" hangingPunct="1">
+                        <a:lnSpc>
+                          <a:spcPct val="100000"/>
+                        </a:lnSpc>
+                        <a:spcBef>
+                          <a:spcPts val="0"/>
+                        </a:spcBef>
+                        <a:spcAft>
+                          <a:spcPts val="0"/>
+                        </a:spcAft>
+                        <a:buClrTx/>
+                        <a:buSzTx/>
+                        <a:buFontTx/>
+                        <a:buNone/>
+                        <a:tabLst/>
+                        <a:defRPr/>
+                      </a:pPr>
+                      <a:r>
+                        <a:rPr lang="fr-FR" sz="1600" dirty="0" smtClean="0"/>
+                        <a:t>Mise à jour matérielle</a:t>
+                      </a:r>
+                    </a:p>
+                    <a:p>
+                      <a:endParaRPr lang="fr-FR" sz="1600" dirty="0"/>
+                    </a:p>
+                  </a:txBody>
+                  <a:tcPr/>
+                </a:tc>
+                <a:tc>
+                  <a:txBody>
+                    <a:bodyPr/>
+                    <a:lstStyle/>
+                    <a:p>
+                      <a:pPr marL="285750" marR="0" lvl="0" indent="-285750" algn="l" defTabSz="914400" rtl="0" eaLnBrk="1" fontAlgn="auto" latinLnBrk="0" hangingPunct="1">
+                        <a:lnSpc>
+                          <a:spcPct val="100000"/>
+                        </a:lnSpc>
+                        <a:spcBef>
+                          <a:spcPts val="0"/>
+                        </a:spcBef>
+                        <a:spcAft>
+                          <a:spcPts val="0"/>
+                        </a:spcAft>
+                        <a:buClrTx/>
+                        <a:buSzTx/>
+                        <a:buFontTx/>
+                        <a:buChar char="-"/>
+                        <a:tabLst/>
+                        <a:defRPr/>
+                      </a:pPr>
+                      <a:r>
+                        <a:rPr lang="fr-FR" sz="1600" dirty="0" smtClean="0"/>
+                        <a:t>Relativement simple (ajout de ram, upgrade de CPU</a:t>
+                      </a:r>
+                      <a:r>
+                        <a:rPr lang="fr-FR" sz="1600" dirty="0" smtClean="0"/>
+                        <a:t>…) (machine virtuelle)</a:t>
+                      </a:r>
+                      <a:endParaRPr lang="fr-FR" sz="1600" dirty="0"/>
+                    </a:p>
+                  </a:txBody>
+                  <a:tcPr/>
+                </a:tc>
+                <a:tc>
+                  <a:txBody>
+                    <a:bodyPr/>
+                    <a:lstStyle/>
+                    <a:p>
+                      <a:pPr marL="285750" marR="0" lvl="0" indent="-285750" algn="l" defTabSz="914400" rtl="0" eaLnBrk="1" fontAlgn="auto" latinLnBrk="0" hangingPunct="1">
+                        <a:lnSpc>
+                          <a:spcPct val="100000"/>
+                        </a:lnSpc>
+                        <a:spcBef>
+                          <a:spcPts val="0"/>
+                        </a:spcBef>
+                        <a:spcAft>
+                          <a:spcPts val="0"/>
+                        </a:spcAft>
+                        <a:buClrTx/>
+                        <a:buSzTx/>
+                        <a:buFontTx/>
+                        <a:buChar char="-"/>
+                        <a:tabLst/>
+                        <a:defRPr/>
+                      </a:pPr>
+                      <a:r>
+                        <a:rPr lang="fr-FR" sz="1600" dirty="0" smtClean="0"/>
+                        <a:t>Souvent cher </a:t>
+                      </a:r>
+                      <a:r>
+                        <a:rPr lang="fr-FR" sz="1600" dirty="0" smtClean="0"/>
+                        <a:t>(machine </a:t>
+                      </a:r>
+                      <a:r>
+                        <a:rPr lang="fr-FR" sz="1600" dirty="0" smtClean="0"/>
+                        <a:t>physique</a:t>
+                      </a:r>
+                      <a:r>
+                        <a:rPr lang="fr-FR" sz="1600" dirty="0" smtClean="0"/>
+                        <a:t>)</a:t>
+                      </a:r>
+                    </a:p>
+                    <a:p>
+                      <a:pPr marL="285750" marR="0" lvl="0" indent="-285750" algn="l" defTabSz="914400" rtl="0" eaLnBrk="1" fontAlgn="auto" latinLnBrk="0" hangingPunct="1">
+                        <a:lnSpc>
+                          <a:spcPct val="100000"/>
+                        </a:lnSpc>
+                        <a:spcBef>
+                          <a:spcPts val="0"/>
+                        </a:spcBef>
+                        <a:spcAft>
+                          <a:spcPts val="0"/>
+                        </a:spcAft>
+                        <a:buClrTx/>
+                        <a:buSzTx/>
+                        <a:buFontTx/>
+                        <a:buChar char="-"/>
+                        <a:tabLst/>
+                        <a:defRPr/>
+                      </a:pPr>
+                      <a:r>
+                        <a:rPr lang="fr-FR" sz="1600" dirty="0" smtClean="0"/>
+                        <a:t>Parfois impossible (AS400)</a:t>
+                      </a:r>
+                      <a:endParaRPr lang="fr-FR" sz="1600" dirty="0" smtClean="0"/>
+                    </a:p>
+                    <a:p>
+                      <a:pPr marL="285750" marR="0" lvl="0" indent="-285750" algn="l" defTabSz="914400" rtl="0" eaLnBrk="1" fontAlgn="auto" latinLnBrk="0" hangingPunct="1">
+                        <a:lnSpc>
+                          <a:spcPct val="100000"/>
+                        </a:lnSpc>
+                        <a:spcBef>
+                          <a:spcPts val="0"/>
+                        </a:spcBef>
+                        <a:spcAft>
+                          <a:spcPts val="0"/>
+                        </a:spcAft>
+                        <a:buClrTx/>
+                        <a:buSzTx/>
+                        <a:buFontTx/>
+                        <a:buChar char="-"/>
+                        <a:tabLst/>
+                        <a:defRPr/>
+                      </a:pPr>
+                      <a:r>
+                        <a:rPr lang="fr-FR" sz="1600" dirty="0" smtClean="0"/>
+                        <a:t>Interruption de service plus ou moins longue</a:t>
+                      </a:r>
+                    </a:p>
+                    <a:p>
+                      <a:pPr marL="285750" marR="0" lvl="0" indent="-285750" algn="l" defTabSz="914400" rtl="0" eaLnBrk="1" fontAlgn="auto" latinLnBrk="0" hangingPunct="1">
+                        <a:lnSpc>
+                          <a:spcPct val="100000"/>
+                        </a:lnSpc>
+                        <a:spcBef>
+                          <a:spcPts val="0"/>
+                        </a:spcBef>
+                        <a:spcAft>
+                          <a:spcPts val="0"/>
+                        </a:spcAft>
+                        <a:buClrTx/>
+                        <a:buSzTx/>
+                        <a:buFontTx/>
+                        <a:buChar char="-"/>
+                        <a:tabLst/>
+                        <a:defRPr/>
+                      </a:pPr>
+                      <a:r>
+                        <a:rPr lang="fr-FR" sz="1600" dirty="0" smtClean="0"/>
+                        <a:t>Le serveur peut ne pas fonctionner sur la nouvelle machine</a:t>
+                      </a:r>
+                    </a:p>
+                  </a:txBody>
+                  <a:tcPr/>
+                </a:tc>
+              </a:tr>
+              <a:tr h="1479082">
+                <a:tc>
+                  <a:txBody>
+                    <a:bodyPr/>
+                    <a:lstStyle/>
+                    <a:p>
+                      <a:pPr marL="0" marR="0" lvl="0" indent="0" algn="l" defTabSz="914400" rtl="0" eaLnBrk="1" fontAlgn="auto" latinLnBrk="0" hangingPunct="1">
+                        <a:lnSpc>
+                          <a:spcPct val="100000"/>
+                        </a:lnSpc>
+                        <a:spcBef>
+                          <a:spcPts val="0"/>
+                        </a:spcBef>
+                        <a:spcAft>
+                          <a:spcPts val="0"/>
+                        </a:spcAft>
+                        <a:buClrTx/>
+                        <a:buSzTx/>
+                        <a:buFontTx/>
+                        <a:buNone/>
+                        <a:tabLst/>
+                        <a:defRPr/>
+                      </a:pPr>
+                      <a:r>
+                        <a:rPr lang="fr-FR" sz="1600" dirty="0" smtClean="0"/>
+                        <a:t>Api-</a:t>
+                      </a:r>
+                      <a:r>
+                        <a:rPr lang="fr-FR" sz="1600" dirty="0" err="1" smtClean="0"/>
+                        <a:t>shadowing</a:t>
+                      </a:r>
+                      <a:endParaRPr lang="fr-FR" sz="1600" dirty="0" smtClean="0"/>
+                    </a:p>
+                  </a:txBody>
+                  <a:tcPr/>
+                </a:tc>
+                <a:tc>
+                  <a:txBody>
+                    <a:bodyPr/>
+                    <a:lstStyle/>
+                    <a:p>
+                      <a:pPr marL="285750" indent="-285750">
+                        <a:buFontTx/>
+                        <a:buChar char="-"/>
+                      </a:pPr>
+                      <a:r>
+                        <a:rPr lang="fr-FR" sz="1600" dirty="0" smtClean="0"/>
+                        <a:t>Permet une mise</a:t>
+                      </a:r>
+                      <a:r>
+                        <a:rPr lang="fr-FR" sz="1600" baseline="0" dirty="0" smtClean="0"/>
+                        <a:t> en place progressive</a:t>
+                      </a:r>
+                    </a:p>
+                    <a:p>
+                      <a:pPr marL="285750" indent="-285750">
+                        <a:buFontTx/>
+                        <a:buChar char="-"/>
+                      </a:pPr>
+                      <a:r>
+                        <a:rPr lang="fr-FR" sz="1600" dirty="0" smtClean="0"/>
+                        <a:t>Fonctionnellement transparent </a:t>
+                      </a:r>
+                      <a:r>
+                        <a:rPr lang="fr-FR" sz="1600" dirty="0" smtClean="0"/>
+                        <a:t>pour l’utilisateur</a:t>
+                      </a:r>
+                    </a:p>
+                    <a:p>
+                      <a:pPr marL="285750" indent="-285750">
+                        <a:buFontTx/>
+                        <a:buChar char="-"/>
+                      </a:pPr>
+                      <a:r>
+                        <a:rPr lang="fr-FR" sz="1600" dirty="0" smtClean="0"/>
+                        <a:t>Réduit les risques</a:t>
+                      </a:r>
+                      <a:r>
+                        <a:rPr lang="fr-FR" sz="1600" baseline="0" dirty="0" smtClean="0"/>
+                        <a:t> de refonte du serveur</a:t>
+                      </a:r>
+                    </a:p>
+                    <a:p>
+                      <a:pPr marL="285750" indent="-285750">
+                        <a:buFontTx/>
+                        <a:buChar char="-"/>
+                      </a:pPr>
+                      <a:r>
+                        <a:rPr lang="fr-FR" sz="1600" baseline="0" dirty="0" smtClean="0"/>
+                        <a:t>Facilement évolutif</a:t>
+                      </a:r>
+                    </a:p>
+                    <a:p>
+                      <a:pPr marL="285750" indent="-285750">
+                        <a:buFontTx/>
+                        <a:buChar char="-"/>
+                      </a:pPr>
+                      <a:endParaRPr lang="fr-FR" sz="1600" dirty="0"/>
+                    </a:p>
+                  </a:txBody>
+                  <a:tcPr/>
+                </a:tc>
+                <a:tc>
+                  <a:txBody>
+                    <a:bodyPr/>
+                    <a:lstStyle/>
+                    <a:p>
+                      <a:pPr marL="285750" indent="-285750">
+                        <a:buFontTx/>
+                        <a:buChar char="-"/>
+                      </a:pPr>
+                      <a:r>
+                        <a:rPr lang="fr-FR" sz="1600" dirty="0" smtClean="0"/>
+                        <a:t>La</a:t>
+                      </a:r>
+                      <a:r>
+                        <a:rPr lang="fr-FR" sz="1600" baseline="0" dirty="0" smtClean="0"/>
+                        <a:t> mise en place d’un POC est critique et obligatoire</a:t>
+                      </a:r>
+                    </a:p>
+                    <a:p>
+                      <a:pPr marL="285750" indent="-285750">
+                        <a:buFontTx/>
+                        <a:buChar char="-"/>
+                      </a:pPr>
+                      <a:r>
+                        <a:rPr lang="fr-FR" sz="1600" baseline="0" dirty="0" smtClean="0"/>
+                        <a:t>Obligation de modifier les </a:t>
+                      </a:r>
+                      <a:r>
+                        <a:rPr lang="fr-FR" sz="1600" baseline="0" dirty="0" smtClean="0"/>
+                        <a:t>clients</a:t>
+                      </a:r>
+                      <a:endParaRPr lang="fr-FR" sz="1600" baseline="0" dirty="0" smtClean="0"/>
+                    </a:p>
+                  </a:txBody>
+                  <a:tcPr/>
+                </a:tc>
+              </a:tr>
+            </a:tbl>
+          </a:graphicData>
+        </a:graphic>
+      </p:graphicFrame>
       <p:pic>
         <p:nvPicPr>
           <p:cNvPr id="5" name="Image 4">
@@ -6675,7 +7176,7 @@
           <p:nvPr/>
         </p:nvPicPr>
         <p:blipFill>
-          <a:blip r:embed="rId3" cstate="print">
+          <a:blip r:embed="rId2" cstate="print">
             <a:extLst>
               <a:ext uri="{28A0092B-C50C-407E-A947-70E740481C1C}">
                 <a14:useLocalDpi xmlns:a14="http://schemas.microsoft.com/office/drawing/2010/main" val="0"/>
@@ -6711,7 +7212,7 @@
           <p:nvPr/>
         </p:nvPicPr>
         <p:blipFill>
-          <a:blip r:embed="rId4" cstate="print">
+          <a:blip r:embed="rId3" cstate="print">
             <a:extLst>
               <a:ext uri="{28A0092B-C50C-407E-A947-70E740481C1C}">
                 <a14:useLocalDpi xmlns:a14="http://schemas.microsoft.com/office/drawing/2010/main" val="0"/>
@@ -6732,149 +7233,16 @@
           </a:prstGeom>
         </p:spPr>
       </p:pic>
-      <p:sp>
-        <p:nvSpPr>
-          <p:cNvPr id="2" name="ZoneTexte 1"/>
-          <p:cNvSpPr txBox="1"/>
-          <p:nvPr/>
-        </p:nvSpPr>
-        <p:spPr>
-          <a:xfrm>
-            <a:off x="624811" y="436418"/>
-            <a:ext cx="8528873" cy="2585323"/>
-          </a:xfrm>
-          <a:prstGeom prst="rect">
-            <a:avLst/>
-          </a:prstGeom>
-          <a:noFill/>
-        </p:spPr>
-        <p:txBody>
-          <a:bodyPr wrap="none" rtlCol="0">
-            <a:spAutoFit/>
-          </a:bodyPr>
-          <a:lstStyle/>
-          <a:p>
-            <a:pPr marL="285750" indent="-285750">
-              <a:buFontTx/>
-              <a:buChar char="-"/>
-            </a:pPr>
-            <a:r>
-              <a:rPr lang="fr-FR" dirty="0" smtClean="0"/>
-              <a:t>Ajout </a:t>
-            </a:r>
-            <a:r>
-              <a:rPr lang="fr-FR" dirty="0"/>
-              <a:t>d’une surcouche en amont du serveur pour distribuer la charge (</a:t>
-            </a:r>
-            <a:r>
-              <a:rPr lang="fr-FR" dirty="0" err="1"/>
-              <a:t>load-balancing</a:t>
-            </a:r>
-            <a:r>
-              <a:rPr lang="fr-FR" dirty="0"/>
-              <a:t>)</a:t>
-            </a:r>
-          </a:p>
-          <a:p>
-            <a:pPr marL="742950" lvl="1" indent="-285750">
-              <a:buFontTx/>
-              <a:buChar char="-"/>
-            </a:pPr>
-            <a:r>
-              <a:rPr lang="fr-FR" dirty="0" smtClean="0"/>
-              <a:t>Avantages</a:t>
-            </a:r>
-          </a:p>
-          <a:p>
-            <a:pPr marL="1200150" lvl="2" indent="-285750">
-              <a:buFontTx/>
-              <a:buChar char="-"/>
-            </a:pPr>
-            <a:r>
-              <a:rPr lang="fr-FR" dirty="0" smtClean="0"/>
-              <a:t>Peut être simple à implémenter</a:t>
-            </a:r>
-          </a:p>
-          <a:p>
-            <a:pPr marL="1200150" lvl="2" indent="-285750">
-              <a:buFontTx/>
-              <a:buChar char="-"/>
-            </a:pPr>
-            <a:r>
-              <a:rPr lang="fr-FR" dirty="0" smtClean="0"/>
-              <a:t>Peut être transparent</a:t>
-            </a:r>
-          </a:p>
-          <a:p>
-            <a:pPr marL="1200150" lvl="2" indent="-285750">
-              <a:buFontTx/>
-              <a:buChar char="-"/>
-            </a:pPr>
-            <a:r>
-              <a:rPr lang="fr-FR" dirty="0" smtClean="0"/>
-              <a:t>Il « suffit » de cloner le serveur autant de fois que nécessaire</a:t>
-            </a:r>
-          </a:p>
-          <a:p>
-            <a:pPr marL="742950" lvl="1" indent="-285750">
-              <a:buFontTx/>
-              <a:buChar char="-"/>
-            </a:pPr>
-            <a:r>
-              <a:rPr lang="fr-FR" dirty="0" smtClean="0"/>
-              <a:t>Inconvénients</a:t>
-            </a:r>
-          </a:p>
-          <a:p>
-            <a:pPr marL="1200150" lvl="2" indent="-285750">
-              <a:buFontTx/>
-              <a:buChar char="-"/>
-            </a:pPr>
-            <a:r>
-              <a:rPr lang="fr-FR" dirty="0" smtClean="0"/>
-              <a:t>Peut-être très complexe à implémenter</a:t>
-            </a:r>
-          </a:p>
-          <a:p>
-            <a:pPr marL="1200150" lvl="2" indent="-285750">
-              <a:buFontTx/>
-              <a:buChar char="-"/>
-            </a:pPr>
-            <a:r>
-              <a:rPr lang="fr-FR" dirty="0" smtClean="0"/>
-              <a:t>Le clonage du serveur peut être très problématique (serveur physique)</a:t>
-            </a:r>
-          </a:p>
-          <a:p>
-            <a:pPr marL="1200150" lvl="2" indent="-285750">
-              <a:buFontTx/>
-              <a:buChar char="-"/>
-            </a:pPr>
-            <a:r>
-              <a:rPr lang="fr-FR" dirty="0" smtClean="0"/>
-              <a:t>Il peut être très compliqué de gérer les pertes de connexions</a:t>
-            </a:r>
-            <a:endParaRPr lang="fr-FR" dirty="0"/>
-          </a:p>
-        </p:txBody>
-      </p:sp>
     </p:spTree>
     <p:extLst>
       <p:ext uri="{BB962C8B-B14F-4D97-AF65-F5344CB8AC3E}">
-        <p14:creationId xmlns:p14="http://schemas.microsoft.com/office/powerpoint/2010/main" val="4266618545"/>
+        <p14:creationId xmlns:p14="http://schemas.microsoft.com/office/powerpoint/2010/main" val="51110540"/>
       </p:ext>
     </p:extLst>
   </p:cSld>
   <p:clrMapOvr>
     <a:masterClrMapping/>
   </p:clrMapOvr>
-  <p:timing>
-    <p:tnLst>
-      <p:par>
-        <p:cTn id="1" dur="indefinite" restart="never" nodeType="tmRoot"/>
-      </p:par>
-    </p:tnLst>
-  </p:timing>
 </p:sld>
 </file>
 
@@ -6895,16 +7263,58 @@
           <a:chExt cx="0" cy="0"/>
         </a:xfrm>
       </p:grpSpPr>
-      <p:sp>
-        <p:nvSpPr>
-          <p:cNvPr id="5" name="ZoneTexte 4"/>
+      <p:pic>
+        <p:nvPicPr>
+          <p:cNvPr id="5" name="Image 4">
+            <a:extLst>
+              <a:ext uri="{FF2B5EF4-FFF2-40B4-BE49-F238E27FC236}">
+                <a16:creationId xmlns="" xmlns:a16="http://schemas.microsoft.com/office/drawing/2014/main" id="{75EBA769-F8CC-4D71-9511-415D7C261511}"/>
+              </a:ext>
+            </a:extLst>
+          </p:cNvPr>
+          <p:cNvPicPr>
+            <a:picLocks noChangeAspect="1"/>
+          </p:cNvPicPr>
+          <p:nvPr/>
+        </p:nvPicPr>
+        <p:blipFill>
+          <a:blip r:embed="rId3">
+            <a:extLst>
+              <a:ext uri="{28A0092B-C50C-407E-A947-70E740481C1C}">
+                <a14:useLocalDpi xmlns:a14="http://schemas.microsoft.com/office/drawing/2010/main" val="0"/>
+              </a:ext>
+            </a:extLst>
+          </a:blip>
+          <a:stretch>
+            <a:fillRect/>
+          </a:stretch>
+        </p:blipFill>
+        <p:spPr>
+          <a:xfrm>
+            <a:off x="0" y="0"/>
+            <a:ext cx="12192000" cy="6858000"/>
+          </a:xfrm>
+          <a:prstGeom prst="rect">
+            <a:avLst/>
+          </a:prstGeom>
+        </p:spPr>
+      </p:pic>
+      <p:sp>
+        <p:nvSpPr>
+          <p:cNvPr id="6" name="ZoneTexte 5">
+            <a:extLst>
+              <a:ext uri="{FF2B5EF4-FFF2-40B4-BE49-F238E27FC236}">
+                <a16:creationId xmlns="" xmlns:a16="http://schemas.microsoft.com/office/drawing/2014/main" id="{945071A7-C8A5-4800-BD76-C6841CE45C5A}"/>
+              </a:ext>
+            </a:extLst>
+          </p:cNvPr>
           <p:cNvSpPr txBox="1"/>
           <p:nvPr/>
         </p:nvSpPr>
         <p:spPr>
           <a:xfrm>
-            <a:off x="1028700" y="415636"/>
-            <a:ext cx="9384813" cy="2862322"/>
+            <a:off x="4202707" y="2721114"/>
+            <a:ext cx="3786614" cy="707886"/>
           </a:xfrm>
           <a:prstGeom prst="rect">
             <a:avLst/>
@@ -6917,129 +7327,44 @@
           </a:bodyPr>
           <a:lstStyle/>
           <a:p>
-            <a:pPr marL="285750" indent="-285750">
-              <a:buFontTx/>
-              <a:buChar char="-"/>
-            </a:pPr>
-            <a:r>
-              <a:rPr lang="fr-FR" dirty="0" smtClean="0"/>
-              <a:t>Mise </a:t>
-            </a:r>
-            <a:r>
-              <a:rPr lang="fr-FR" dirty="0"/>
-              <a:t>à jour </a:t>
-            </a:r>
-            <a:r>
-              <a:rPr lang="fr-FR" dirty="0" smtClean="0"/>
-              <a:t>matérielle</a:t>
-            </a:r>
-          </a:p>
-          <a:p>
-            <a:pPr marL="742950" lvl="1" indent="-285750">
-              <a:buFontTx/>
-              <a:buChar char="-"/>
-            </a:pPr>
-            <a:r>
-              <a:rPr lang="fr-FR" dirty="0" smtClean="0"/>
-              <a:t>Avantages</a:t>
-            </a:r>
-            <a:r>
-              <a:rPr lang="fr-FR" dirty="0"/>
-              <a:t/>
-            </a:r>
-            <a:br>
-              <a:rPr lang="fr-FR" dirty="0"/>
-            </a:br>
-            <a:r>
-              <a:rPr lang="fr-FR" dirty="0"/>
-              <a:t>Relativement simple (ajout de ram, upgrade de CPU…), surtout avec une machine </a:t>
-            </a:r>
-            <a:r>
-              <a:rPr lang="fr-FR" dirty="0" smtClean="0"/>
-              <a:t>virtuelle</a:t>
-            </a:r>
-          </a:p>
-          <a:p>
-            <a:pPr marL="742950" lvl="1" indent="-285750">
-              <a:buFontTx/>
-              <a:buChar char="-"/>
-            </a:pPr>
-            <a:r>
-              <a:rPr lang="fr-FR" dirty="0" smtClean="0"/>
-              <a:t>Inconvénients</a:t>
-            </a:r>
-            <a:r>
-              <a:rPr lang="fr-FR" dirty="0"/>
-              <a:t/>
-            </a:r>
-            <a:br>
-              <a:rPr lang="fr-FR" dirty="0"/>
-            </a:br>
-            <a:r>
-              <a:rPr lang="fr-FR" dirty="0"/>
-              <a:t>Souvent cher (notamment en cas de changement de machine physique)</a:t>
-            </a:r>
-            <a:br>
-              <a:rPr lang="fr-FR" dirty="0"/>
-            </a:br>
-            <a:r>
-              <a:rPr lang="fr-FR" dirty="0"/>
-              <a:t>Interruption de service plus ou moins longue</a:t>
-            </a:r>
-            <a:br>
-              <a:rPr lang="fr-FR" dirty="0"/>
-            </a:br>
-            <a:r>
-              <a:rPr lang="fr-FR" dirty="0"/>
-              <a:t>Le serveur peut ne pas fonctionner sur la nouvelle </a:t>
-            </a:r>
-            <a:r>
-              <a:rPr lang="fr-FR" dirty="0" smtClean="0"/>
-              <a:t>machine</a:t>
-            </a:r>
-          </a:p>
-          <a:p>
-            <a:pPr marL="285750" indent="-285750">
-              <a:buFontTx/>
-              <a:buChar char="-"/>
-            </a:pPr>
-            <a:r>
-              <a:rPr lang="fr-FR" dirty="0" smtClean="0"/>
-              <a:t>Api-</a:t>
-            </a:r>
-            <a:r>
-              <a:rPr lang="fr-FR" dirty="0" err="1" smtClean="0"/>
-              <a:t>shadowing</a:t>
-            </a:r>
-            <a:endParaRPr lang="fr-FR" dirty="0" smtClean="0"/>
-          </a:p>
-          <a:p>
-            <a:pPr marL="742950" lvl="1" indent="-285750">
-              <a:buFontTx/>
-              <a:buChar char="-"/>
-            </a:pPr>
-            <a:r>
-              <a:rPr lang="fr-FR" dirty="0" smtClean="0"/>
-              <a:t>Avantages</a:t>
-            </a:r>
-          </a:p>
-          <a:p>
-            <a:pPr marL="742950" lvl="1" indent="-285750">
-              <a:buFontTx/>
-              <a:buChar char="-"/>
-            </a:pPr>
-            <a:r>
-              <a:rPr lang="fr-FR" dirty="0" smtClean="0"/>
-              <a:t>Inconvénients</a:t>
-            </a:r>
-            <a:endParaRPr lang="fr-FR" dirty="0"/>
+            <a:pPr algn="ctr"/>
+            <a:r>
+              <a:rPr lang="fr-FR" sz="4000" dirty="0" smtClean="0">
+                <a:solidFill>
+                  <a:schemeClr val="bg1"/>
+                </a:solidFill>
+                <a:latin typeface="Lato Black" panose="020F0502020204030203" pitchFamily="34" charset="0"/>
+                <a:ea typeface="Lato Black" panose="020F0502020204030203" pitchFamily="34" charset="0"/>
+                <a:cs typeface="Lato Black" panose="020F0502020204030203" pitchFamily="34" charset="0"/>
+              </a:rPr>
+              <a:t>API-</a:t>
+            </a:r>
+            <a:r>
+              <a:rPr lang="fr-FR" sz="4000" dirty="0" err="1" smtClean="0">
+                <a:solidFill>
+                  <a:schemeClr val="bg1"/>
+                </a:solidFill>
+                <a:latin typeface="Lato Black" panose="020F0502020204030203" pitchFamily="34" charset="0"/>
+                <a:ea typeface="Lato Black" panose="020F0502020204030203" pitchFamily="34" charset="0"/>
+                <a:cs typeface="Lato Black" panose="020F0502020204030203" pitchFamily="34" charset="0"/>
+              </a:rPr>
+              <a:t>Shadowing</a:t>
+            </a:r>
+            <a:endParaRPr lang="fr-FR" sz="4000" dirty="0">
+              <a:solidFill>
+                <a:schemeClr val="bg1"/>
+              </a:solidFill>
+              <a:latin typeface="Lato Black" panose="020F0502020204030203" pitchFamily="34" charset="0"/>
+              <a:ea typeface="Lato Black" panose="020F0502020204030203" pitchFamily="34" charset="0"/>
+              <a:cs typeface="Lato Black" panose="020F0502020204030203" pitchFamily="34" charset="0"/>
+            </a:endParaRPr>
           </a:p>
         </p:txBody>
       </p:sp>
     </p:spTree>
     <p:extLst>
       <p:ext uri="{BB962C8B-B14F-4D97-AF65-F5344CB8AC3E}">
-        <p14:creationId xmlns:p14="http://schemas.microsoft.com/office/powerpoint/2010/main" val="1649420697"/>
+        <p14:creationId xmlns:p14="http://schemas.microsoft.com/office/powerpoint/2010/main" val="4230473361"/>
       </p:ext>
     </p:extLst>
   </p:cSld>
@@ -7145,6 +7470,127 @@
           </a:prstGeom>
         </p:spPr>
       </p:pic>
+      <p:pic>
+        <p:nvPicPr>
+          <p:cNvPr id="4" name="Image 3"/>
+          <p:cNvPicPr>
+            <a:picLocks noChangeAspect="1"/>
+          </p:cNvPicPr>
+          <p:nvPr/>
+        </p:nvPicPr>
+        <p:blipFill>
+          <a:blip r:embed="rId5"/>
+          <a:stretch>
+            <a:fillRect/>
+          </a:stretch>
+        </p:blipFill>
+        <p:spPr>
+          <a:xfrm>
+            <a:off x="564602" y="405634"/>
+            <a:ext cx="5429250" cy="5353050"/>
+          </a:xfrm>
+          <a:prstGeom prst="rect">
+            <a:avLst/>
+          </a:prstGeom>
+        </p:spPr>
+      </p:pic>
+      <p:sp>
+        <p:nvSpPr>
+          <p:cNvPr id="7" name="ZoneTexte 6"/>
+          <p:cNvSpPr txBox="1"/>
+          <p:nvPr/>
+        </p:nvSpPr>
+        <p:spPr>
+          <a:xfrm>
+            <a:off x="758536" y="581890"/>
+            <a:ext cx="3241964" cy="384721"/>
+          </a:xfrm>
+          <a:prstGeom prst="rect">
+            <a:avLst/>
+          </a:prstGeom>
+          <a:solidFill>
+            <a:schemeClr val="bg1"/>
+          </a:solidFill>
+        </p:spPr>
+        <p:txBody>
+          <a:bodyPr wrap="square" rtlCol="0">
+            <a:spAutoFit/>
+          </a:bodyPr>
+          <a:lstStyle/>
+          <a:p>
+            <a:pPr algn="ctr"/>
+            <a:r>
+              <a:rPr lang="fr-FR" sz="1900" dirty="0" smtClean="0">
+                <a:solidFill>
+                  <a:srgbClr val="0A559E"/>
+                </a:solidFill>
+              </a:rPr>
+              <a:t>Projet </a:t>
+            </a:r>
+            <a:r>
+              <a:rPr lang="fr-FR" sz="1900" dirty="0" err="1" smtClean="0">
+                <a:solidFill>
+                  <a:srgbClr val="0A559E"/>
+                </a:solidFill>
+              </a:rPr>
+              <a:t>Legacy</a:t>
+            </a:r>
+            <a:endParaRPr lang="fr-FR" sz="1900" dirty="0">
+              <a:solidFill>
+                <a:srgbClr val="0A559E"/>
+              </a:solidFill>
+            </a:endParaRPr>
+          </a:p>
+        </p:txBody>
+      </p:sp>
+      <p:sp>
+        <p:nvSpPr>
+          <p:cNvPr id="8" name="Ellipse 7"/>
+          <p:cNvSpPr/>
+          <p:nvPr/>
+        </p:nvSpPr>
+        <p:spPr>
+          <a:xfrm>
+            <a:off x="2878282" y="2358737"/>
+            <a:ext cx="176645" cy="207818"/>
+          </a:xfrm>
+          <a:prstGeom prst="ellipse">
+            <a:avLst/>
+          </a:prstGeom>
+          <a:solidFill>
+            <a:schemeClr val="bg1"/>
+          </a:solidFill>
+          <a:ln>
+            <a:solidFill>
+              <a:schemeClr val="bg1"/>
+            </a:solidFill>
+          </a:ln>
+        </p:spPr>
+        <p:style>
+          <a:lnRef idx="2">
+            <a:schemeClr val="accent1">
+              <a:shade val="50000"/>
+            </a:schemeClr>
+          </a:lnRef>
+          <a:fillRef idx="1">
+            <a:schemeClr val="accent1"/>
+          </a:fillRef>
+          <a:effectRef idx="0">
+            <a:schemeClr val="accent1"/>
+          </a:effectRef>
+          <a:fontRef idx="minor">
+            <a:schemeClr val="lt1"/>
+          </a:fontRef>
+        </p:style>
+        <p:txBody>
+          <a:bodyPr rtlCol="0" anchor="ctr"/>
+          <a:lstStyle/>
+          <a:p>
+            <a:pPr algn="ctr"/>
+            <a:endParaRPr lang="fr-FR"/>
+          </a:p>
+        </p:txBody>
+      </p:sp>
     </p:spTree>
     <p:extLst>
       <p:ext uri="{BB962C8B-B14F-4D97-AF65-F5344CB8AC3E}">
@@ -7763,25 +8209,25 @@
 
 <file path=customXml/item10.xml><?xml version="1.0" encoding="utf-8"?>
 <Control xmlns="http://schemas.microsoft.com/VisualStudio/2011/storyboarding/control">
-  <Id Name="System.Storyboarding.WindowsDesktop.DialogBox" Revision="1" Stencil="System.Storyboarding.WindowsDesktop" StencilVersion="0.1"/>
+  <Id Name="System.Storyboarding.WindowsDesktop.AlertDialog" Revision="1" Stencil="System.Storyboarding.WindowsDesktop" StencilVersion="0.1"/>
 </Control>
 </file>
 
 <file path=customXml/item2.xml><?xml version="1.0" encoding="utf-8"?>
 <Control xmlns="http://schemas.microsoft.com/VisualStudio/2011/storyboarding/control">
-  <Id Name="System.Storyboarding.WindowsDesktop.AlertDialog" Revision="1" Stencil="System.Storyboarding.WindowsDesktop" StencilVersion="0.1"/>
+  <Id Name="System.Storyboarding.Backgrounds.DesktopTaskbar" Revision="1" Stencil="System.Storyboarding.Backgrounds" StencilVersion="0.1"/>
 </Control>
 </file>
 
 <file path=customXml/item3.xml><?xml version="1.0" encoding="utf-8"?>
 <Control xmlns="http://schemas.microsoft.com/VisualStudio/2011/storyboarding/control">
-  <Id Name="System.Storyboarding.Common.Breadcrumb" Revision="1" Stencil="System.Storyboarding.Common" StencilVersion="0.1"/>
+  <Id Name="System.Storyboarding.WindowsDesktop.DialogBox" Revision="1" Stencil="System.Storyboarding.WindowsDesktop" StencilVersion="0.1"/>
 </Control>
 </file>
 
 <file path=customXml/item4.xml><?xml version="1.0" encoding="utf-8"?>
 <Control xmlns="http://schemas.microsoft.com/VisualStudio/2011/storyboarding/control">
-  <Id Name="System.Storyboarding.Backgrounds.DesktopTaskbar" Revision="1" Stencil="System.Storyboarding.Backgrounds" StencilVersion="0.1"/>
+  <Id Name="System.Storyboarding.WindowsDesktop.DialogBox" Revision="1" Stencil="System.Storyboarding.WindowsDesktop" StencilVersion="0.1"/>
 </Control>
 </file>
 
@@ -7793,7 +8239,7 @@
 
 <file path=customXml/item6.xml><?xml version="1.0" encoding="utf-8"?>
 <Control xmlns="http://schemas.microsoft.com/VisualStudio/2011/storyboarding/control">
-  <Id Name="System.Storyboarding.WindowsApps.SearchBar" Revision="1" Stencil="System.Storyboarding.WindowsApps" StencilVersion="0.1"/>
+  <Id Name="System.Storyboarding.Common.Breadcrumb" Revision="1" Stencil="System.Storyboarding.Common" StencilVersion="0.1"/>
 </Control>
 </file>
 
@@ -7805,7 +8251,7 @@
 
 <file path=customXml/item8.xml><?xml version="1.0" encoding="utf-8"?>
 <Control xmlns="http://schemas.microsoft.com/VisualStudio/2011/storyboarding/control">
-  <Id Name="System.Storyboarding.WindowsDesktop.DialogBox" Revision="1" Stencil="System.Storyboarding.WindowsDesktop" StencilVersion="0.1"/>
+  <Id Name="System.Storyboarding.WindowsApps.SearchBar" Revision="1" Stencil="System.Storyboarding.WindowsApps" StencilVersion="0.1"/>
 </Control>
 </file>
 
@@ -7816,6 +8262,14 @@
 </file>
 
 <file path=customXml/itemProps1.xml><?xml version="1.0" encoding="utf-8"?>
+<ds:datastoreItem xmlns:ds="http://schemas.openxmlformats.org/officeDocument/2006/customXml" ds:itemID="{EBBE763A-B3D5-488A-9F72-453E09C2E102}">
+  <ds:schemaRefs>
+    <ds:schemaRef ds:uri="http://schemas.microsoft.com/VisualStudio/2011/storyboarding/control"/>
+  </ds:schemaRefs>
+</ds:datastoreItem>
+</file>
+
+<file path=customXml/itemProps10.xml><?xml version="1.0" encoding="utf-8"?>
 <ds:datastoreItem xmlns:ds="http://schemas.openxmlformats.org/officeDocument/2006/customXml" ds:itemID="{82FCB0D1-8EB6-4B2D-98E5-C2C86E67B90F}">
   <ds:schemaRefs>
     <ds:schemaRef ds:uri="http://schemas.microsoft.com/VisualStudio/2011/storyboarding/control"/>
@@ -7823,7 +8277,15 @@
 </ds:datastoreItem>
 </file>
 
-<file path=customXml/itemProps10.xml><?xml version="1.0" encoding="utf-8"?>
+<file path=customXml/itemProps2.xml><?xml version="1.0" encoding="utf-8"?>
+<ds:datastoreItem xmlns:ds="http://schemas.openxmlformats.org/officeDocument/2006/customXml" ds:itemID="{35683EA7-E414-44F3-BF5F-7C617915B318}">
+  <ds:schemaRefs>
+    <ds:schemaRef ds:uri="http://schemas.microsoft.com/VisualStudio/2011/storyboarding/control"/>
+  </ds:schemaRefs>
+</ds:datastoreItem>
+</file>
+
+<file path=customXml/itemProps3.xml><?xml version="1.0" encoding="utf-8"?>
 <ds:datastoreItem xmlns:ds="http://schemas.openxmlformats.org/officeDocument/2006/customXml" ds:itemID="{C315F13A-AC62-4724-879E-14987FCB1CE6}">
   <ds:schemaRefs>
     <ds:schemaRef ds:uri="http://schemas.microsoft.com/VisualStudio/2011/storyboarding/control"/>
@@ -7831,24 +8293,8 @@
 </ds:datastoreItem>
 </file>
 
-<file path=customXml/itemProps2.xml><?xml version="1.0" encoding="utf-8"?>
-<ds:datastoreItem xmlns:ds="http://schemas.openxmlformats.org/officeDocument/2006/customXml" ds:itemID="{EBBE763A-B3D5-488A-9F72-453E09C2E102}">
-  <ds:schemaRefs>
-    <ds:schemaRef ds:uri="http://schemas.microsoft.com/VisualStudio/2011/storyboarding/control"/>
-  </ds:schemaRefs>
-</ds:datastoreItem>
-</file>
-
-<file path=customXml/itemProps3.xml><?xml version="1.0" encoding="utf-8"?>
-<ds:datastoreItem xmlns:ds="http://schemas.openxmlformats.org/officeDocument/2006/customXml" ds:itemID="{9A48F3C4-45B4-4BFF-BBD6-E5D8E1BB578C}">
-  <ds:schemaRefs>
-    <ds:schemaRef ds:uri="http://schemas.microsoft.com/VisualStudio/2011/storyboarding/control"/>
-  </ds:schemaRefs>
-</ds:datastoreItem>
-</file>
-
 <file path=customXml/itemProps4.xml><?xml version="1.0" encoding="utf-8"?>
-<ds:datastoreItem xmlns:ds="http://schemas.openxmlformats.org/officeDocument/2006/customXml" ds:itemID="{35683EA7-E414-44F3-BF5F-7C617915B318}">
+<ds:datastoreItem xmlns:ds="http://schemas.openxmlformats.org/officeDocument/2006/customXml" ds:itemID="{2005D821-4CB3-4A25-B341-C5F92CEC57AD}">
   <ds:schemaRefs>
     <ds:schemaRef ds:uri="http://schemas.microsoft.com/VisualStudio/2011/storyboarding/control"/>
   </ds:schemaRefs>
@@ -7864,7 +8310,7 @@
 </file>
 
 <file path=customXml/itemProps6.xml><?xml version="1.0" encoding="utf-8"?>
-<ds:datastoreItem xmlns:ds="http://schemas.openxmlformats.org/officeDocument/2006/customXml" ds:itemID="{9EDA62CD-3E8D-466C-A802-D575A138582C}">
+<ds:datastoreItem xmlns:ds="http://schemas.openxmlformats.org/officeDocument/2006/customXml" ds:itemID="{9A48F3C4-45B4-4BFF-BBD6-E5D8E1BB578C}">
   <ds:schemaRefs>
     <ds:schemaRef ds:uri="http://schemas.microsoft.com/VisualStudio/2011/storyboarding/control"/>
   </ds:schemaRefs>
@@ -7872,7 +8318,7 @@
 </file>
 
 <file path=customXml/itemProps7.xml><?xml version="1.0" encoding="utf-8"?>
-<ds:datastoreItem xmlns:ds="http://schemas.openxmlformats.org/officeDocument/2006/customXml" ds:itemID="{2005D821-4CB3-4A25-B341-C5F92CEC57AD}">
+<ds:datastoreItem xmlns:ds="http://schemas.openxmlformats.org/officeDocument/2006/customXml" ds:itemID="{1CAF7CC1-4F40-417B-9F2E-8DAFAC288198}">
   <ds:schemaRefs>
     <ds:schemaRef ds:uri="http://schemas.microsoft.com/VisualStudio/2011/storyboarding/control"/>
   </ds:schemaRefs>
@@ -7880,7 +8326,7 @@
 </file>
 
 <file path=customXml/itemProps8.xml><?xml version="1.0" encoding="utf-8"?>
-<ds:datastoreItem xmlns:ds="http://schemas.openxmlformats.org/officeDocument/2006/customXml" ds:itemID="{1CAF7CC1-4F40-417B-9F2E-8DAFAC288198}">
+<ds:datastoreItem xmlns:ds="http://schemas.openxmlformats.org/officeDocument/2006/customXml" ds:itemID="{9EDA62CD-3E8D-466C-A802-D575A138582C}">
   <ds:schemaRefs>
     <ds:schemaRef ds:uri="http://schemas.microsoft.com/VisualStudio/2011/storyboarding/control"/>
   </ds:schemaRefs>

</xml_diff>

<commit_message>
Ajout d'images pour la définition de l'api-shadowing
</commit_message>
<xml_diff>
--- a/Speak'up API shadowing.pptx
+++ b/Speak'up API shadowing.pptx
@@ -5,7 +5,7 @@
     <p:sldMasterId id="2147483648" r:id="rId11"/>
   </p:sldMasterIdLst>
   <p:notesMasterIdLst>
-    <p:notesMasterId r:id="rId24"/>
+    <p:notesMasterId r:id="rId22"/>
   </p:notesMasterIdLst>
   <p:sldIdLst>
     <p:sldId id="256" r:id="rId12"/>
@@ -13,13 +13,11 @@
     <p:sldId id="259" r:id="rId14"/>
     <p:sldId id="262" r:id="rId15"/>
     <p:sldId id="281" r:id="rId16"/>
-    <p:sldId id="282" r:id="rId17"/>
-    <p:sldId id="289" r:id="rId18"/>
-    <p:sldId id="290" r:id="rId19"/>
-    <p:sldId id="284" r:id="rId20"/>
-    <p:sldId id="285" r:id="rId21"/>
-    <p:sldId id="286" r:id="rId22"/>
-    <p:sldId id="287" r:id="rId23"/>
+    <p:sldId id="285" r:id="rId17"/>
+    <p:sldId id="290" r:id="rId18"/>
+    <p:sldId id="284" r:id="rId19"/>
+    <p:sldId id="286" r:id="rId20"/>
+    <p:sldId id="287" r:id="rId21"/>
   </p:sldIdLst>
   <p:sldSz cx="12192000" cy="6858000"/>
   <p:notesSz cx="6858000" cy="9144000"/>
@@ -220,7 +218,7 @@
           <a:p>
             <a:fld id="{B5AD0476-FE6D-4A78-9DC3-98305AD3C12A}" type="datetimeFigureOut">
               <a:rPr lang="fr-FR" smtClean="0"/>
-              <a:t>23/10/2019</a:t>
+              <a:t>29/10/2019</a:t>
             </a:fld>
             <a:endParaRPr lang="fr-FR"/>
           </a:p>
@@ -701,11 +699,7 @@
           <a:p>
             <a:r>
               <a:rPr lang="fr-FR" dirty="0" smtClean="0"/>
-              <a:t>Ce</a:t>
-            </a:r>
-            <a:r>
-              <a:rPr lang="fr-FR" baseline="0" dirty="0" smtClean="0"/>
-              <a:t> projet n’est qu’un exemple générique : le bus d’entrée peut être n’importe quel service qui permet de gérer des entrées/sorties (bus système, serveur web…),</a:t>
+              <a:t>En plus de servir de passe-plat entre le monde extérieur et les service, le serveur Scala formatait les requêtes à sa façon.</a:t>
             </a:r>
           </a:p>
           <a:p>
@@ -734,18 +728,55 @@
           </a:p>
           <a:p>
             <a:r>
-              <a:rPr lang="fr-FR" baseline="0" dirty="0" smtClean="0"/>
-              <a:t>(2) La aussi, la solution est donnée à titre d’exemple; il peut s’agir d’une solution totalement différente: asynchronisme, cloud-</a:t>
-            </a:r>
-            <a:r>
-              <a:rPr lang="fr-FR" baseline="0" dirty="0" err="1" smtClean="0"/>
-              <a:t>computing</a:t>
-            </a:r>
-            <a:r>
-              <a:rPr lang="fr-FR" baseline="0" dirty="0" smtClean="0"/>
-              <a:t>, réécriture de l’application…</a:t>
-            </a:r>
-            <a:endParaRPr lang="fr-FR" dirty="0"/>
+              <a:rPr lang="fr-FR" dirty="0" smtClean="0">
+                <a:sym typeface="Wingdings" panose="05000000000000000000" pitchFamily="2" charset="2"/>
+              </a:rPr>
+              <a:t>« peu maintenable »  surtout car il n’y avait pas de ressource en interne</a:t>
+            </a:r>
+          </a:p>
+          <a:p>
+            <a:pPr marL="0" marR="0" lvl="0" indent="0" algn="l" defTabSz="914400" rtl="0" eaLnBrk="1" fontAlgn="auto" latinLnBrk="0" hangingPunct="1">
+              <a:lnSpc>
+                <a:spcPct val="100000"/>
+              </a:lnSpc>
+              <a:spcBef>
+                <a:spcPts val="0"/>
+              </a:spcBef>
+              <a:spcAft>
+                <a:spcPts val="0"/>
+              </a:spcAft>
+              <a:buClrTx/>
+              <a:buSzTx/>
+              <a:buFontTx/>
+              <a:buNone/>
+              <a:tabLst/>
+              <a:defRPr/>
+            </a:pPr>
+            <a:r>
+              <a:rPr lang="fr-FR" dirty="0" smtClean="0">
+                <a:sym typeface="Wingdings" panose="05000000000000000000" pitchFamily="2" charset="2"/>
+              </a:rPr>
+              <a:t>« projet</a:t>
+            </a:r>
+            <a:r>
+              <a:rPr lang="fr-FR" baseline="0" dirty="0" smtClean="0">
+                <a:sym typeface="Wingdings" panose="05000000000000000000" pitchFamily="2" charset="2"/>
+              </a:rPr>
+              <a:t> « </a:t>
+            </a:r>
+            <a:r>
+              <a:rPr lang="fr-FR" dirty="0" smtClean="0">
+                <a:sym typeface="Wingdings" panose="05000000000000000000" pitchFamily="2" charset="2"/>
+              </a:rPr>
+              <a:t>hors-norme » » le</a:t>
+            </a:r>
+            <a:r>
+              <a:rPr lang="fr-FR" baseline="0" dirty="0" smtClean="0">
+                <a:sym typeface="Wingdings" panose="05000000000000000000" pitchFamily="2" charset="2"/>
+              </a:rPr>
+              <a:t> choix du scala a été fait par un architecte, les raisons de ce choix sont inconnues</a:t>
+            </a:r>
+            <a:endParaRPr lang="fr-FR" dirty="0" smtClean="0"/>
           </a:p>
         </p:txBody>
       </p:sp>
@@ -829,149 +860,7 @@
           <a:bodyPr/>
           <a:lstStyle/>
           <a:p>
-            <a:pPr marL="0" indent="0">
-              <a:buFontTx/>
-              <a:buNone/>
-            </a:pPr>
-            <a:r>
-              <a:rPr lang="fr-FR" dirty="0" smtClean="0"/>
-              <a:t>Problèmes :</a:t>
-            </a:r>
-          </a:p>
-          <a:p>
-            <a:pPr marL="171450" indent="-171450">
-              <a:buFontTx/>
-              <a:buChar char="-"/>
-            </a:pPr>
-            <a:r>
-              <a:rPr lang="fr-FR" dirty="0" smtClean="0"/>
-              <a:t>Serveur ancien: X développeurs lui sont passés dessus, chacun à sa façon</a:t>
-            </a:r>
-          </a:p>
-          <a:p>
-            <a:pPr marL="171450" indent="-171450">
-              <a:buFontTx/>
-              <a:buChar char="-"/>
-            </a:pPr>
-            <a:r>
-              <a:rPr lang="fr-FR" dirty="0" smtClean="0"/>
-              <a:t>Langage ésotérique:</a:t>
-            </a:r>
-            <a:r>
-              <a:rPr lang="fr-FR" baseline="0" dirty="0" smtClean="0"/>
-              <a:t> langage spécifique utilisé sans raison, très ancien (Pascal)</a:t>
-            </a:r>
-          </a:p>
-          <a:p>
-            <a:pPr marL="171450" indent="-171450">
-              <a:buFontTx/>
-              <a:buChar char="-"/>
-            </a:pPr>
-            <a:r>
-              <a:rPr lang="fr-FR" baseline="0" dirty="0" smtClean="0"/>
-              <a:t>Par exemple pas de possibilité de </a:t>
-            </a:r>
-            <a:r>
-              <a:rPr lang="fr-FR" baseline="0" dirty="0" err="1" smtClean="0"/>
-              <a:t>multi-threading</a:t>
-            </a:r>
-            <a:r>
-              <a:rPr lang="fr-FR" baseline="0" dirty="0" smtClean="0"/>
-              <a:t>, code optimisé au point de l’</a:t>
-            </a:r>
-            <a:r>
-              <a:rPr lang="fr-FR" baseline="0" dirty="0" err="1" smtClean="0"/>
-              <a:t>obfusquer</a:t>
-            </a:r>
-            <a:r>
-              <a:rPr lang="fr-FR" baseline="0" dirty="0" smtClean="0"/>
-              <a:t>…</a:t>
-            </a:r>
-          </a:p>
-          <a:p>
-            <a:pPr marL="171450" indent="-171450">
-              <a:buFontTx/>
-              <a:buChar char="-"/>
-            </a:pPr>
-            <a:r>
-              <a:rPr lang="fr-FR" baseline="0" dirty="0" smtClean="0"/>
-              <a:t>Parce que parfois, un Xeon  bi-</a:t>
-            </a:r>
-            <a:r>
-              <a:rPr lang="fr-FR" baseline="0" dirty="0" err="1" smtClean="0"/>
-              <a:t>coeur</a:t>
-            </a:r>
-            <a:r>
-              <a:rPr lang="fr-FR" baseline="0" dirty="0" smtClean="0"/>
-              <a:t> avec 8Go de Ram n’est plus suffisant</a:t>
-            </a:r>
-          </a:p>
-          <a:p>
-            <a:pPr marL="171450" indent="-171450">
-              <a:buFontTx/>
-              <a:buChar char="-"/>
-            </a:pPr>
-            <a:endParaRPr lang="fr-FR" baseline="0" dirty="0" smtClean="0"/>
-          </a:p>
-          <a:p>
-            <a:pPr marL="0" indent="0">
-              <a:buFontTx/>
-              <a:buNone/>
-            </a:pPr>
-            <a:r>
-              <a:rPr lang="fr-FR" dirty="0" smtClean="0"/>
-              <a:t>Solutions:</a:t>
-            </a:r>
-          </a:p>
-          <a:p>
-            <a:pPr marL="171450" indent="-171450">
-              <a:buFontTx/>
-              <a:buChar char="-"/>
-            </a:pPr>
-            <a:r>
-              <a:rPr lang="fr-FR" dirty="0" smtClean="0"/>
-              <a:t>Obligation de « casser » : tests extrêmement complexes et long, et souvent aucune </a:t>
-            </a:r>
-            <a:r>
-              <a:rPr lang="fr-FR" dirty="0" err="1" smtClean="0"/>
-              <a:t>spec</a:t>
-            </a:r>
-            <a:r>
-              <a:rPr lang="fr-FR" dirty="0" smtClean="0"/>
-              <a:t>, donc rétro-engineering et aucune certitude que ça</a:t>
-            </a:r>
-            <a:r>
-              <a:rPr lang="fr-FR" baseline="0" dirty="0" smtClean="0"/>
-              <a:t> fonctionne</a:t>
-            </a:r>
-          </a:p>
-          <a:p>
-            <a:pPr marL="171450" marR="0" lvl="0" indent="-171450" algn="l" defTabSz="914400" rtl="0" eaLnBrk="1" fontAlgn="auto" latinLnBrk="0" hangingPunct="1">
-              <a:lnSpc>
-                <a:spcPct val="100000"/>
-              </a:lnSpc>
-              <a:spcBef>
-                <a:spcPts val="0"/>
-              </a:spcBef>
-              <a:spcAft>
-                <a:spcPts val="0"/>
-              </a:spcAft>
-              <a:buClrTx/>
-              <a:buSzTx/>
-              <a:buFontTx/>
-              <a:buChar char="-"/>
-              <a:tabLst/>
-              <a:defRPr/>
-            </a:pPr>
-            <a:r>
-              <a:rPr lang="fr-FR" dirty="0" smtClean="0"/>
-              <a:t>Projet long : toute</a:t>
-            </a:r>
-            <a:r>
-              <a:rPr lang="fr-FR" baseline="0" dirty="0" smtClean="0"/>
-              <a:t> l’équipe est monopolisée sur le projet; aucune évolution n’est possible sur l’existant pendant toute la refonte</a:t>
-            </a:r>
-            <a:endParaRPr lang="fr-FR" dirty="0" smtClean="0"/>
+            <a:endParaRPr lang="fr-FR" dirty="0"/>
           </a:p>
         </p:txBody>
       </p:sp>
@@ -1001,7 +890,7 @@
     </p:spTree>
     <p:extLst>
       <p:ext uri="{BB962C8B-B14F-4D97-AF65-F5344CB8AC3E}">
-        <p14:creationId xmlns:p14="http://schemas.microsoft.com/office/powerpoint/2010/main" val="756142715"/>
+        <p14:creationId xmlns:p14="http://schemas.microsoft.com/office/powerpoint/2010/main" val="1604332308"/>
       </p:ext>
     </p:extLst>
   </p:cSld>
@@ -1076,7 +965,7 @@
           <a:p>
             <a:fld id="{AA5DF8EF-0F82-44B3-979E-DBC26962337C}" type="slidenum">
               <a:rPr lang="fr-FR" smtClean="0"/>
-              <a:t>8</a:t>
+              <a:t>7</a:t>
             </a:fld>
             <a:endParaRPr lang="fr-FR"/>
           </a:p>
@@ -1139,7 +1028,311 @@
           <a:bodyPr/>
           <a:lstStyle/>
           <a:p>
-            <a:endParaRPr lang="fr-FR" dirty="0"/>
+            <a:r>
+              <a:rPr lang="fr-FR" dirty="0" smtClean="0"/>
+              <a:t>Inconvénients:</a:t>
+            </a:r>
+          </a:p>
+          <a:p>
+            <a:pPr marL="285750" indent="-285750">
+              <a:buFontTx/>
+              <a:buChar char="-"/>
+            </a:pPr>
+            <a:r>
+              <a:rPr lang="fr-FR" dirty="0" smtClean="0"/>
+              <a:t>La mise en place d’un POC est critique et obligatoire</a:t>
+            </a:r>
+          </a:p>
+          <a:p>
+            <a:pPr marL="742950" lvl="1" indent="-285750">
+              <a:buFontTx/>
+              <a:buChar char="-"/>
+            </a:pPr>
+            <a:r>
+              <a:rPr lang="fr-FR" dirty="0" smtClean="0"/>
+              <a:t>Il a fallut prouver,</a:t>
+            </a:r>
+            <a:r>
+              <a:rPr lang="fr-FR" baseline="0" dirty="0" smtClean="0"/>
+              <a:t> déjà, que ça fonctionnait: POC « Hello world » dans un premier temps.</a:t>
+            </a:r>
+          </a:p>
+          <a:p>
+            <a:pPr marL="742950" lvl="1" indent="-285750">
+              <a:buFontTx/>
+              <a:buChar char="-"/>
+            </a:pPr>
+            <a:r>
+              <a:rPr lang="fr-FR" baseline="0" dirty="0" smtClean="0"/>
+              <a:t>Ensuite, mise en place du mode passe-plat pour une route (authentification)</a:t>
+            </a:r>
+          </a:p>
+          <a:p>
+            <a:pPr marL="742950" lvl="1" indent="-285750">
+              <a:buFontTx/>
+              <a:buChar char="-"/>
+            </a:pPr>
+            <a:r>
+              <a:rPr lang="fr-FR" baseline="0" dirty="0" smtClean="0"/>
+              <a:t>Finalement, mise en place du mode « direct » pour la récupération des villes</a:t>
+            </a:r>
+          </a:p>
+          <a:p>
+            <a:pPr marL="1200150" lvl="2" indent="-285750">
+              <a:buFont typeface="Wingdings" panose="05000000000000000000" pitchFamily="2" charset="2"/>
+              <a:buChar char="Ø"/>
+            </a:pPr>
+            <a:r>
+              <a:rPr lang="fr-FR" baseline="0" dirty="0" smtClean="0">
+                <a:sym typeface="Wingdings" panose="05000000000000000000" pitchFamily="2" charset="2"/>
+              </a:rPr>
+              <a:t>La récupération des villes impliquant une authentification, implémentation d’un cache dans le serveur d’api </a:t>
+            </a:r>
+            <a:r>
+              <a:rPr lang="fr-FR" baseline="0" dirty="0" err="1" smtClean="0">
+                <a:sym typeface="Wingdings" panose="05000000000000000000" pitchFamily="2" charset="2"/>
+              </a:rPr>
+              <a:t>shadowing</a:t>
+            </a:r>
+            <a:r>
+              <a:rPr lang="fr-FR" baseline="0" dirty="0" smtClean="0">
+                <a:sym typeface="Wingdings" panose="05000000000000000000" pitchFamily="2" charset="2"/>
+              </a:rPr>
+              <a:t> (mode jeton public / privé)  mise en place de fonctionnalités métier dans le serveur</a:t>
+            </a:r>
+            <a:endParaRPr lang="fr-FR" dirty="0" smtClean="0"/>
+          </a:p>
+          <a:p>
+            <a:pPr marL="285750" indent="-285750">
+              <a:buFontTx/>
+              <a:buChar char="-"/>
+            </a:pPr>
+            <a:r>
+              <a:rPr lang="fr-FR" dirty="0" smtClean="0"/>
+              <a:t>Obligation de modifier les clients</a:t>
+            </a:r>
+          </a:p>
+          <a:p>
+            <a:pPr marL="742950" lvl="1" indent="-285750">
+              <a:buFontTx/>
+              <a:buChar char="-"/>
+            </a:pPr>
+            <a:r>
+              <a:rPr lang="fr-FR" dirty="0" smtClean="0"/>
+              <a:t>Le</a:t>
+            </a:r>
+            <a:r>
+              <a:rPr lang="fr-FR" baseline="0" dirty="0" smtClean="0"/>
+              <a:t> module d’API </a:t>
+            </a:r>
+            <a:r>
+              <a:rPr lang="fr-FR" baseline="0" dirty="0" err="1" smtClean="0"/>
+              <a:t>shadowing</a:t>
+            </a:r>
+            <a:r>
+              <a:rPr lang="fr-FR" baseline="0" dirty="0" smtClean="0"/>
+              <a:t> était déployé sur un site dédié, avec une URL dédiée. Il a fallut modifier un projet en court de </a:t>
+            </a:r>
+            <a:r>
+              <a:rPr lang="fr-FR" baseline="0" dirty="0" err="1" smtClean="0"/>
+              <a:t>dev</a:t>
+            </a:r>
+            <a:r>
+              <a:rPr lang="fr-FR" baseline="0" dirty="0" smtClean="0"/>
+              <a:t>, afin qu’il ne passe plus par Apache / Scala.</a:t>
+            </a:r>
+            <a:endParaRPr lang="fr-FR" dirty="0" smtClean="0"/>
+          </a:p>
+          <a:p>
+            <a:endParaRPr lang="fr-FR" dirty="0" smtClean="0"/>
+          </a:p>
+          <a:p>
+            <a:endParaRPr lang="fr-FR" dirty="0" smtClean="0"/>
+          </a:p>
+          <a:p>
+            <a:endParaRPr lang="fr-FR" dirty="0" smtClean="0"/>
+          </a:p>
+          <a:p>
+            <a:r>
+              <a:rPr lang="fr-FR" dirty="0" smtClean="0"/>
+              <a:t>Avantages:</a:t>
+            </a:r>
+          </a:p>
+          <a:p>
+            <a:pPr marL="285750" indent="-285750">
+              <a:buFontTx/>
+              <a:buChar char="-"/>
+            </a:pPr>
+            <a:r>
+              <a:rPr lang="fr-FR" dirty="0" smtClean="0"/>
+              <a:t>Permet une mise en place progressive</a:t>
+            </a:r>
+          </a:p>
+          <a:p>
+            <a:pPr marL="742950" lvl="1" indent="-285750">
+              <a:buFontTx/>
+              <a:buChar char="-"/>
+            </a:pPr>
+            <a:r>
+              <a:rPr lang="fr-FR" dirty="0" smtClean="0"/>
+              <a:t>Après</a:t>
+            </a:r>
+            <a:r>
+              <a:rPr lang="fr-FR" baseline="0" dirty="0" smtClean="0"/>
+              <a:t> le </a:t>
+            </a:r>
+            <a:r>
+              <a:rPr lang="fr-FR" baseline="0" dirty="0" err="1" smtClean="0"/>
+              <a:t>poc</a:t>
+            </a:r>
+            <a:r>
+              <a:rPr lang="fr-FR" baseline="0" dirty="0" smtClean="0"/>
+              <a:t>, fonctionnement en mode « passe-plat » vers Apache</a:t>
+            </a:r>
+          </a:p>
+          <a:p>
+            <a:pPr marL="742950" lvl="1" indent="-285750">
+              <a:buFontTx/>
+              <a:buChar char="-"/>
+            </a:pPr>
+            <a:r>
+              <a:rPr lang="fr-FR" baseline="0" dirty="0" smtClean="0"/>
+              <a:t>Petit à petit, les requêtes étaient redirigées directement vers les API correspondantes (soit celles d’origine, soit une version réécrite)</a:t>
+            </a:r>
+          </a:p>
+          <a:p>
+            <a:pPr marL="742950" lvl="1" indent="-285750">
+              <a:buFontTx/>
+              <a:buChar char="-"/>
+            </a:pPr>
+            <a:r>
+              <a:rPr lang="fr-FR" baseline="0" dirty="0" smtClean="0"/>
+              <a:t>A permis une révision complète des appels</a:t>
+            </a:r>
+          </a:p>
+          <a:p>
+            <a:pPr marL="1200150" lvl="2" indent="-285750">
+              <a:buFontTx/>
+              <a:buChar char="-"/>
+            </a:pPr>
+            <a:r>
+              <a:rPr lang="fr-FR" baseline="0" dirty="0" smtClean="0"/>
+              <a:t>Découpage des appels</a:t>
+            </a:r>
+          </a:p>
+          <a:p>
+            <a:pPr marL="1200150" lvl="2" indent="-285750">
+              <a:buFontTx/>
+              <a:buChar char="-"/>
+            </a:pPr>
+            <a:r>
+              <a:rPr lang="fr-FR" dirty="0" smtClean="0"/>
+              <a:t>Suppression</a:t>
+            </a:r>
+            <a:r>
+              <a:rPr lang="fr-FR" baseline="0" dirty="0" smtClean="0"/>
+              <a:t> des données inutiles des réponses</a:t>
+            </a:r>
+            <a:endParaRPr lang="fr-FR" dirty="0" smtClean="0"/>
+          </a:p>
+          <a:p>
+            <a:pPr marL="285750" indent="-285750">
+              <a:buFontTx/>
+              <a:buChar char="-"/>
+            </a:pPr>
+            <a:r>
+              <a:rPr lang="fr-FR" dirty="0" smtClean="0"/>
+              <a:t>Fonctionnellement transparent pour l’utilisateur</a:t>
+            </a:r>
+          </a:p>
+          <a:p>
+            <a:pPr marL="742950" lvl="1" indent="-285750">
+              <a:buFontTx/>
+              <a:buChar char="-"/>
+            </a:pPr>
+            <a:r>
+              <a:rPr lang="fr-FR" dirty="0" smtClean="0"/>
+              <a:t>Le </a:t>
+            </a:r>
+            <a:r>
+              <a:rPr lang="fr-FR" baseline="0" dirty="0" smtClean="0"/>
+              <a:t>moment venu, le mode passe-plat peut être déconnecté pour utiliser directement l’API (authentification avec vérification de concordance entre ancien et nouveau serveur coté front dans un premier temps, puis utilisation du nouveau serveur uniquement)</a:t>
+            </a:r>
+            <a:endParaRPr lang="fr-FR" dirty="0" smtClean="0"/>
+          </a:p>
+          <a:p>
+            <a:pPr marL="285750" indent="-285750">
+              <a:buFontTx/>
+              <a:buChar char="-"/>
+            </a:pPr>
+            <a:r>
+              <a:rPr lang="fr-FR" dirty="0" smtClean="0"/>
+              <a:t>Réduit les risques de refonte du serveur</a:t>
+            </a:r>
+          </a:p>
+          <a:p>
+            <a:pPr marL="742950" lvl="1" indent="-285750">
+              <a:buFontTx/>
+              <a:buChar char="-"/>
+            </a:pPr>
+            <a:r>
+              <a:rPr lang="fr-FR" dirty="0" smtClean="0"/>
+              <a:t>La refonte s’est</a:t>
+            </a:r>
+            <a:r>
+              <a:rPr lang="fr-FR" baseline="0" dirty="0" smtClean="0"/>
+              <a:t> faite petit à petit, en passant du mode passe-plat au mode « direct » route par route</a:t>
+            </a:r>
+            <a:endParaRPr lang="fr-FR" dirty="0" smtClean="0"/>
+          </a:p>
+          <a:p>
+            <a:pPr marL="285750" indent="-285750">
+              <a:buFontTx/>
+              <a:buChar char="-"/>
+            </a:pPr>
+            <a:r>
+              <a:rPr lang="fr-FR" dirty="0" smtClean="0"/>
+              <a:t>Facilement évolutif</a:t>
+            </a:r>
+          </a:p>
+          <a:p>
+            <a:pPr marL="742950" lvl="1" indent="-285750">
+              <a:buFontTx/>
+              <a:buChar char="-"/>
+            </a:pPr>
+            <a:r>
+              <a:rPr lang="fr-FR" dirty="0" smtClean="0"/>
+              <a:t>Ecrit</a:t>
+            </a:r>
+            <a:r>
+              <a:rPr lang="fr-FR" baseline="0" dirty="0" smtClean="0"/>
+              <a:t> en .Net </a:t>
+            </a:r>
+            <a:r>
+              <a:rPr lang="fr-FR" baseline="0" dirty="0" err="1" smtClean="0"/>
+              <a:t>Core</a:t>
+            </a:r>
+            <a:r>
+              <a:rPr lang="fr-FR" baseline="0" dirty="0" smtClean="0"/>
+              <a:t>, </a:t>
+            </a:r>
+            <a:r>
+              <a:rPr lang="fr-FR" baseline="0" dirty="0" err="1" smtClean="0"/>
+              <a:t>SignalR</a:t>
+            </a:r>
+            <a:r>
+              <a:rPr lang="fr-FR" baseline="0" dirty="0" smtClean="0"/>
+              <a:t>, l’ajout de routes </a:t>
+            </a:r>
+            <a:r>
+              <a:rPr lang="fr-FR" baseline="0" smtClean="0"/>
+              <a:t>est extrêmement </a:t>
+            </a:r>
+            <a:r>
+              <a:rPr lang="fr-FR" baseline="0" dirty="0" smtClean="0"/>
+              <a:t>simple</a:t>
+            </a:r>
+            <a:endParaRPr lang="fr-FR" dirty="0" smtClean="0"/>
           </a:p>
         </p:txBody>
       </p:sp>
@@ -1160,7 +1353,7 @@
           <a:p>
             <a:fld id="{AA5DF8EF-0F82-44B3-979E-DBC26962337C}" type="slidenum">
               <a:rPr lang="fr-FR" smtClean="0"/>
-              <a:t>9</a:t>
+              <a:t>8</a:t>
             </a:fld>
             <a:endParaRPr lang="fr-FR"/>
           </a:p>
@@ -1244,7 +1437,7 @@
           <a:p>
             <a:fld id="{AA5DF8EF-0F82-44B3-979E-DBC26962337C}" type="slidenum">
               <a:rPr lang="fr-FR" smtClean="0"/>
-              <a:t>10</a:t>
+              <a:t>9</a:t>
             </a:fld>
             <a:endParaRPr lang="fr-FR"/>
           </a:p>
@@ -1253,7 +1446,7 @@
     </p:spTree>
     <p:extLst>
       <p:ext uri="{BB962C8B-B14F-4D97-AF65-F5344CB8AC3E}">
-        <p14:creationId xmlns:p14="http://schemas.microsoft.com/office/powerpoint/2010/main" val="1604332308"/>
+        <p14:creationId xmlns:p14="http://schemas.microsoft.com/office/powerpoint/2010/main" val="2637841300"/>
       </p:ext>
     </p:extLst>
   </p:cSld>
@@ -1328,91 +1521,7 @@
           <a:p>
             <a:fld id="{AA5DF8EF-0F82-44B3-979E-DBC26962337C}" type="slidenum">
               <a:rPr lang="fr-FR" smtClean="0"/>
-              <a:t>11</a:t>
-            </a:fld>
-            <a:endParaRPr lang="fr-FR"/>
-          </a:p>
-        </p:txBody>
-      </p:sp>
-    </p:spTree>
-    <p:extLst>
-      <p:ext uri="{BB962C8B-B14F-4D97-AF65-F5344CB8AC3E}">
-        <p14:creationId xmlns:p14="http://schemas.microsoft.com/office/powerpoint/2010/main" val="2637841300"/>
-      </p:ext>
-    </p:extLst>
-  </p:cSld>
-  <p:clrMapOvr>
-    <a:masterClrMapping/>
-  </p:clrMapOvr>
-</p:notes>
-</file>
-
-<file path=ppt/notesSlides/notesSlide9.xml><?xml version="1.0" encoding="utf-8"?>
-<p:notes xmlns:a="http://schemas.openxmlformats.org/drawingml/2006/main" xmlns:r="http://schemas.openxmlformats.org/officeDocument/2006/relationships" xmlns:p="http://schemas.openxmlformats.org/presentationml/2006/main">
-  <p:cSld>
-    <p:spTree>
-      <p:nvGrpSpPr>
-        <p:cNvPr id="1" name=""/>
-        <p:cNvGrpSpPr/>
-        <p:nvPr/>
-      </p:nvGrpSpPr>
-      <p:grpSpPr>
-        <a:xfrm>
-          <a:off x="0" y="0"/>
-          <a:ext cx="0" cy="0"/>
-          <a:chOff x="0" y="0"/>
-          <a:chExt cx="0" cy="0"/>
-        </a:xfrm>
-      </p:grpSpPr>
-      <p:sp>
-        <p:nvSpPr>
-          <p:cNvPr id="2" name="Espace réservé de l'image des diapositives 1"/>
-          <p:cNvSpPr>
-            <a:spLocks noGrp="1" noRot="1" noChangeAspect="1"/>
-          </p:cNvSpPr>
-          <p:nvPr>
-            <p:ph type="sldImg"/>
-          </p:nvPr>
-        </p:nvSpPr>
-        <p:spPr/>
-      </p:sp>
-      <p:sp>
-        <p:nvSpPr>
-          <p:cNvPr id="3" name="Espace réservé des notes 2"/>
-          <p:cNvSpPr>
-            <a:spLocks noGrp="1"/>
-          </p:cNvSpPr>
-          <p:nvPr>
-            <p:ph type="body" idx="1"/>
-          </p:nvPr>
-        </p:nvSpPr>
-        <p:spPr/>
-        <p:txBody>
-          <a:bodyPr/>
-          <a:lstStyle/>
-          <a:p>
-            <a:endParaRPr lang="fr-FR" dirty="0"/>
-          </a:p>
-        </p:txBody>
-      </p:sp>
-      <p:sp>
-        <p:nvSpPr>
-          <p:cNvPr id="4" name="Espace réservé du numéro de diapositive 3"/>
-          <p:cNvSpPr>
-            <a:spLocks noGrp="1"/>
-          </p:cNvSpPr>
-          <p:nvPr>
-            <p:ph type="sldNum" sz="quarter" idx="10"/>
-          </p:nvPr>
-        </p:nvSpPr>
-        <p:spPr/>
-        <p:txBody>
-          <a:bodyPr/>
-          <a:lstStyle/>
-          <a:p>
-            <a:fld id="{AA5DF8EF-0F82-44B3-979E-DBC26962337C}" type="slidenum">
-              <a:rPr lang="fr-FR" smtClean="0"/>
-              <a:t>12</a:t>
+              <a:t>10</a:t>
             </a:fld>
             <a:endParaRPr lang="fr-FR"/>
           </a:p>
@@ -1453,7 +1562,7 @@
           <p:cNvPr id="2" name="Titre 1">
             <a:extLst>
               <a:ext uri="{FF2B5EF4-FFF2-40B4-BE49-F238E27FC236}">
-                <a16:creationId xmlns="" xmlns:a16="http://schemas.microsoft.com/office/drawing/2014/main" id="{DF4E4E11-DA8D-412D-BBE8-3B751C2A5E3D}"/>
+                <a16:creationId xmlns:a16="http://schemas.microsoft.com/office/drawing/2014/main" id="{DF4E4E11-DA8D-412D-BBE8-3B751C2A5E3D}"/>
               </a:ext>
             </a:extLst>
           </p:cNvPr>
@@ -1490,7 +1599,7 @@
           <p:cNvPr id="3" name="Sous-titre 2">
             <a:extLst>
               <a:ext uri="{FF2B5EF4-FFF2-40B4-BE49-F238E27FC236}">
-                <a16:creationId xmlns="" xmlns:a16="http://schemas.microsoft.com/office/drawing/2014/main" id="{AD5D98AA-9305-4C6C-8472-EC101BC2DD0B}"/>
+                <a16:creationId xmlns:a16="http://schemas.microsoft.com/office/drawing/2014/main" id="{AD5D98AA-9305-4C6C-8472-EC101BC2DD0B}"/>
               </a:ext>
             </a:extLst>
           </p:cNvPr>
@@ -1560,7 +1669,7 @@
           <p:cNvPr id="4" name="Espace réservé de la date 3">
             <a:extLst>
               <a:ext uri="{FF2B5EF4-FFF2-40B4-BE49-F238E27FC236}">
-                <a16:creationId xmlns="" xmlns:a16="http://schemas.microsoft.com/office/drawing/2014/main" id="{E072392C-ABEC-453D-A10D-B39173FC0ED3}"/>
+                <a16:creationId xmlns:a16="http://schemas.microsoft.com/office/drawing/2014/main" id="{E072392C-ABEC-453D-A10D-B39173FC0ED3}"/>
               </a:ext>
             </a:extLst>
           </p:cNvPr>
@@ -1578,7 +1687,7 @@
           <a:p>
             <a:fld id="{2A800B55-2EA3-4651-92C4-339DC2AA9BC2}" type="datetimeFigureOut">
               <a:rPr lang="fr-FR" smtClean="0"/>
-              <a:t>23/10/2019</a:t>
+              <a:t>29/10/2019</a:t>
             </a:fld>
             <a:endParaRPr lang="fr-FR"/>
           </a:p>
@@ -1589,7 +1698,7 @@
           <p:cNvPr id="5" name="Espace réservé du pied de page 4">
             <a:extLst>
               <a:ext uri="{FF2B5EF4-FFF2-40B4-BE49-F238E27FC236}">
-                <a16:creationId xmlns="" xmlns:a16="http://schemas.microsoft.com/office/drawing/2014/main" id="{E68FFE94-A36D-4B51-935B-F6E8222CFD2C}"/>
+                <a16:creationId xmlns:a16="http://schemas.microsoft.com/office/drawing/2014/main" id="{E68FFE94-A36D-4B51-935B-F6E8222CFD2C}"/>
               </a:ext>
             </a:extLst>
           </p:cNvPr>
@@ -1614,7 +1723,7 @@
           <p:cNvPr id="6" name="Espace réservé du numéro de diapositive 5">
             <a:extLst>
               <a:ext uri="{FF2B5EF4-FFF2-40B4-BE49-F238E27FC236}">
-                <a16:creationId xmlns="" xmlns:a16="http://schemas.microsoft.com/office/drawing/2014/main" id="{3F523C99-C106-42DF-9364-4707B2B24FD7}"/>
+                <a16:creationId xmlns:a16="http://schemas.microsoft.com/office/drawing/2014/main" id="{3F523C99-C106-42DF-9364-4707B2B24FD7}"/>
               </a:ext>
             </a:extLst>
           </p:cNvPr>
@@ -1673,7 +1782,7 @@
           <p:cNvPr id="2" name="Titre 1">
             <a:extLst>
               <a:ext uri="{FF2B5EF4-FFF2-40B4-BE49-F238E27FC236}">
-                <a16:creationId xmlns="" xmlns:a16="http://schemas.microsoft.com/office/drawing/2014/main" id="{E87DAE8B-27DF-4D90-AE74-E0DD532B0817}"/>
+                <a16:creationId xmlns:a16="http://schemas.microsoft.com/office/drawing/2014/main" id="{E87DAE8B-27DF-4D90-AE74-E0DD532B0817}"/>
               </a:ext>
             </a:extLst>
           </p:cNvPr>
@@ -1701,7 +1810,7 @@
           <p:cNvPr id="3" name="Espace réservé du texte vertical 2">
             <a:extLst>
               <a:ext uri="{FF2B5EF4-FFF2-40B4-BE49-F238E27FC236}">
-                <a16:creationId xmlns="" xmlns:a16="http://schemas.microsoft.com/office/drawing/2014/main" id="{549AFFE0-41BC-4C2B-A5FB-AB12D4625A36}"/>
+                <a16:creationId xmlns:a16="http://schemas.microsoft.com/office/drawing/2014/main" id="{549AFFE0-41BC-4C2B-A5FB-AB12D4625A36}"/>
               </a:ext>
             </a:extLst>
           </p:cNvPr>
@@ -1758,7 +1867,7 @@
           <p:cNvPr id="4" name="Espace réservé de la date 3">
             <a:extLst>
               <a:ext uri="{FF2B5EF4-FFF2-40B4-BE49-F238E27FC236}">
-                <a16:creationId xmlns="" xmlns:a16="http://schemas.microsoft.com/office/drawing/2014/main" id="{DB8F340C-A1F3-4050-8F9C-D4DD8DB5B9DC}"/>
+                <a16:creationId xmlns:a16="http://schemas.microsoft.com/office/drawing/2014/main" id="{DB8F340C-A1F3-4050-8F9C-D4DD8DB5B9DC}"/>
               </a:ext>
             </a:extLst>
           </p:cNvPr>
@@ -1776,7 +1885,7 @@
           <a:p>
             <a:fld id="{2A800B55-2EA3-4651-92C4-339DC2AA9BC2}" type="datetimeFigureOut">
               <a:rPr lang="fr-FR" smtClean="0"/>
-              <a:t>23/10/2019</a:t>
+              <a:t>29/10/2019</a:t>
             </a:fld>
             <a:endParaRPr lang="fr-FR"/>
           </a:p>
@@ -1787,7 +1896,7 @@
           <p:cNvPr id="5" name="Espace réservé du pied de page 4">
             <a:extLst>
               <a:ext uri="{FF2B5EF4-FFF2-40B4-BE49-F238E27FC236}">
-                <a16:creationId xmlns="" xmlns:a16="http://schemas.microsoft.com/office/drawing/2014/main" id="{F7F594BC-F10B-4ED2-A3AC-CAE990323AF3}"/>
+                <a16:creationId xmlns:a16="http://schemas.microsoft.com/office/drawing/2014/main" id="{F7F594BC-F10B-4ED2-A3AC-CAE990323AF3}"/>
               </a:ext>
             </a:extLst>
           </p:cNvPr>
@@ -1812,7 +1921,7 @@
           <p:cNvPr id="6" name="Espace réservé du numéro de diapositive 5">
             <a:extLst>
               <a:ext uri="{FF2B5EF4-FFF2-40B4-BE49-F238E27FC236}">
-                <a16:creationId xmlns="" xmlns:a16="http://schemas.microsoft.com/office/drawing/2014/main" id="{365E748B-E1AB-4A6D-9CE4-95E99DBDBB2F}"/>
+                <a16:creationId xmlns:a16="http://schemas.microsoft.com/office/drawing/2014/main" id="{365E748B-E1AB-4A6D-9CE4-95E99DBDBB2F}"/>
               </a:ext>
             </a:extLst>
           </p:cNvPr>
@@ -1871,7 +1980,7 @@
           <p:cNvPr id="2" name="Titre vertical 1">
             <a:extLst>
               <a:ext uri="{FF2B5EF4-FFF2-40B4-BE49-F238E27FC236}">
-                <a16:creationId xmlns="" xmlns:a16="http://schemas.microsoft.com/office/drawing/2014/main" id="{05E7939C-8B37-4734-8F8C-A8414F9F792B}"/>
+                <a16:creationId xmlns:a16="http://schemas.microsoft.com/office/drawing/2014/main" id="{05E7939C-8B37-4734-8F8C-A8414F9F792B}"/>
               </a:ext>
             </a:extLst>
           </p:cNvPr>
@@ -1904,7 +2013,7 @@
           <p:cNvPr id="3" name="Espace réservé du texte vertical 2">
             <a:extLst>
               <a:ext uri="{FF2B5EF4-FFF2-40B4-BE49-F238E27FC236}">
-                <a16:creationId xmlns="" xmlns:a16="http://schemas.microsoft.com/office/drawing/2014/main" id="{AE89D39F-65D8-4603-BF16-AF495D2B9E43}"/>
+                <a16:creationId xmlns:a16="http://schemas.microsoft.com/office/drawing/2014/main" id="{AE89D39F-65D8-4603-BF16-AF495D2B9E43}"/>
               </a:ext>
             </a:extLst>
           </p:cNvPr>
@@ -1966,7 +2075,7 @@
           <p:cNvPr id="4" name="Espace réservé de la date 3">
             <a:extLst>
               <a:ext uri="{FF2B5EF4-FFF2-40B4-BE49-F238E27FC236}">
-                <a16:creationId xmlns="" xmlns:a16="http://schemas.microsoft.com/office/drawing/2014/main" id="{ACF81B5C-12A7-4D4E-8DCC-9D5BB6E73C32}"/>
+                <a16:creationId xmlns:a16="http://schemas.microsoft.com/office/drawing/2014/main" id="{ACF81B5C-12A7-4D4E-8DCC-9D5BB6E73C32}"/>
               </a:ext>
             </a:extLst>
           </p:cNvPr>
@@ -1984,7 +2093,7 @@
           <a:p>
             <a:fld id="{2A800B55-2EA3-4651-92C4-339DC2AA9BC2}" type="datetimeFigureOut">
               <a:rPr lang="fr-FR" smtClean="0"/>
-              <a:t>23/10/2019</a:t>
+              <a:t>29/10/2019</a:t>
             </a:fld>
             <a:endParaRPr lang="fr-FR"/>
           </a:p>
@@ -1995,7 +2104,7 @@
           <p:cNvPr id="5" name="Espace réservé du pied de page 4">
             <a:extLst>
               <a:ext uri="{FF2B5EF4-FFF2-40B4-BE49-F238E27FC236}">
-                <a16:creationId xmlns="" xmlns:a16="http://schemas.microsoft.com/office/drawing/2014/main" id="{450DE91C-436F-49EE-932C-CB3F18D68A54}"/>
+                <a16:creationId xmlns:a16="http://schemas.microsoft.com/office/drawing/2014/main" id="{450DE91C-436F-49EE-932C-CB3F18D68A54}"/>
               </a:ext>
             </a:extLst>
           </p:cNvPr>
@@ -2020,7 +2129,7 @@
           <p:cNvPr id="6" name="Espace réservé du numéro de diapositive 5">
             <a:extLst>
               <a:ext uri="{FF2B5EF4-FFF2-40B4-BE49-F238E27FC236}">
-                <a16:creationId xmlns="" xmlns:a16="http://schemas.microsoft.com/office/drawing/2014/main" id="{E41F61F9-CAF1-4EAC-9F4A-223CD73210E8}"/>
+                <a16:creationId xmlns:a16="http://schemas.microsoft.com/office/drawing/2014/main" id="{E41F61F9-CAF1-4EAC-9F4A-223CD73210E8}"/>
               </a:ext>
             </a:extLst>
           </p:cNvPr>
@@ -2079,7 +2188,7 @@
           <p:cNvPr id="2" name="Titre 1">
             <a:extLst>
               <a:ext uri="{FF2B5EF4-FFF2-40B4-BE49-F238E27FC236}">
-                <a16:creationId xmlns="" xmlns:a16="http://schemas.microsoft.com/office/drawing/2014/main" id="{4D09D08A-FF68-4CD3-93F7-310DF1EB2A99}"/>
+                <a16:creationId xmlns:a16="http://schemas.microsoft.com/office/drawing/2014/main" id="{4D09D08A-FF68-4CD3-93F7-310DF1EB2A99}"/>
               </a:ext>
             </a:extLst>
           </p:cNvPr>
@@ -2107,7 +2216,7 @@
           <p:cNvPr id="3" name="Espace réservé du contenu 2">
             <a:extLst>
               <a:ext uri="{FF2B5EF4-FFF2-40B4-BE49-F238E27FC236}">
-                <a16:creationId xmlns="" xmlns:a16="http://schemas.microsoft.com/office/drawing/2014/main" id="{BFF0FD49-0C64-4BEA-881D-72B1E525A53A}"/>
+                <a16:creationId xmlns:a16="http://schemas.microsoft.com/office/drawing/2014/main" id="{BFF0FD49-0C64-4BEA-881D-72B1E525A53A}"/>
               </a:ext>
             </a:extLst>
           </p:cNvPr>
@@ -2164,7 +2273,7 @@
           <p:cNvPr id="4" name="Espace réservé de la date 3">
             <a:extLst>
               <a:ext uri="{FF2B5EF4-FFF2-40B4-BE49-F238E27FC236}">
-                <a16:creationId xmlns="" xmlns:a16="http://schemas.microsoft.com/office/drawing/2014/main" id="{DE72C803-F81A-43BD-8350-97DD13CB795A}"/>
+                <a16:creationId xmlns:a16="http://schemas.microsoft.com/office/drawing/2014/main" id="{DE72C803-F81A-43BD-8350-97DD13CB795A}"/>
               </a:ext>
             </a:extLst>
           </p:cNvPr>
@@ -2182,7 +2291,7 @@
           <a:p>
             <a:fld id="{2A800B55-2EA3-4651-92C4-339DC2AA9BC2}" type="datetimeFigureOut">
               <a:rPr lang="fr-FR" smtClean="0"/>
-              <a:t>23/10/2019</a:t>
+              <a:t>29/10/2019</a:t>
             </a:fld>
             <a:endParaRPr lang="fr-FR"/>
           </a:p>
@@ -2193,7 +2302,7 @@
           <p:cNvPr id="5" name="Espace réservé du pied de page 4">
             <a:extLst>
               <a:ext uri="{FF2B5EF4-FFF2-40B4-BE49-F238E27FC236}">
-                <a16:creationId xmlns="" xmlns:a16="http://schemas.microsoft.com/office/drawing/2014/main" id="{D8067F39-1428-4172-A1A3-100C8BA529B1}"/>
+                <a16:creationId xmlns:a16="http://schemas.microsoft.com/office/drawing/2014/main" id="{D8067F39-1428-4172-A1A3-100C8BA529B1}"/>
               </a:ext>
             </a:extLst>
           </p:cNvPr>
@@ -2218,7 +2327,7 @@
           <p:cNvPr id="6" name="Espace réservé du numéro de diapositive 5">
             <a:extLst>
               <a:ext uri="{FF2B5EF4-FFF2-40B4-BE49-F238E27FC236}">
-                <a16:creationId xmlns="" xmlns:a16="http://schemas.microsoft.com/office/drawing/2014/main" id="{42ADC425-EB66-4DE7-8FFA-E26E8536459A}"/>
+                <a16:creationId xmlns:a16="http://schemas.microsoft.com/office/drawing/2014/main" id="{42ADC425-EB66-4DE7-8FFA-E26E8536459A}"/>
               </a:ext>
             </a:extLst>
           </p:cNvPr>
@@ -2277,7 +2386,7 @@
           <p:cNvPr id="2" name="Titre 1">
             <a:extLst>
               <a:ext uri="{FF2B5EF4-FFF2-40B4-BE49-F238E27FC236}">
-                <a16:creationId xmlns="" xmlns:a16="http://schemas.microsoft.com/office/drawing/2014/main" id="{0A038BD4-7121-4438-8082-16FB84CEB353}"/>
+                <a16:creationId xmlns:a16="http://schemas.microsoft.com/office/drawing/2014/main" id="{0A038BD4-7121-4438-8082-16FB84CEB353}"/>
               </a:ext>
             </a:extLst>
           </p:cNvPr>
@@ -2314,7 +2423,7 @@
           <p:cNvPr id="3" name="Espace réservé du texte 2">
             <a:extLst>
               <a:ext uri="{FF2B5EF4-FFF2-40B4-BE49-F238E27FC236}">
-                <a16:creationId xmlns="" xmlns:a16="http://schemas.microsoft.com/office/drawing/2014/main" id="{D04C11B5-9A36-434D-A0F4-A6B818107B09}"/>
+                <a16:creationId xmlns:a16="http://schemas.microsoft.com/office/drawing/2014/main" id="{D04C11B5-9A36-434D-A0F4-A6B818107B09}"/>
               </a:ext>
             </a:extLst>
           </p:cNvPr>
@@ -2439,7 +2548,7 @@
           <p:cNvPr id="4" name="Espace réservé de la date 3">
             <a:extLst>
               <a:ext uri="{FF2B5EF4-FFF2-40B4-BE49-F238E27FC236}">
-                <a16:creationId xmlns="" xmlns:a16="http://schemas.microsoft.com/office/drawing/2014/main" id="{341A4AA7-C884-45AA-A680-F02F58BF5B20}"/>
+                <a16:creationId xmlns:a16="http://schemas.microsoft.com/office/drawing/2014/main" id="{341A4AA7-C884-45AA-A680-F02F58BF5B20}"/>
               </a:ext>
             </a:extLst>
           </p:cNvPr>
@@ -2457,7 +2566,7 @@
           <a:p>
             <a:fld id="{2A800B55-2EA3-4651-92C4-339DC2AA9BC2}" type="datetimeFigureOut">
               <a:rPr lang="fr-FR" smtClean="0"/>
-              <a:t>23/10/2019</a:t>
+              <a:t>29/10/2019</a:t>
             </a:fld>
             <a:endParaRPr lang="fr-FR"/>
           </a:p>
@@ -2468,7 +2577,7 @@
           <p:cNvPr id="5" name="Espace réservé du pied de page 4">
             <a:extLst>
               <a:ext uri="{FF2B5EF4-FFF2-40B4-BE49-F238E27FC236}">
-                <a16:creationId xmlns="" xmlns:a16="http://schemas.microsoft.com/office/drawing/2014/main" id="{0AE318B9-A553-4F4C-9F44-0774BAE0734E}"/>
+                <a16:creationId xmlns:a16="http://schemas.microsoft.com/office/drawing/2014/main" id="{0AE318B9-A553-4F4C-9F44-0774BAE0734E}"/>
               </a:ext>
             </a:extLst>
           </p:cNvPr>
@@ -2493,7 +2602,7 @@
           <p:cNvPr id="6" name="Espace réservé du numéro de diapositive 5">
             <a:extLst>
               <a:ext uri="{FF2B5EF4-FFF2-40B4-BE49-F238E27FC236}">
-                <a16:creationId xmlns="" xmlns:a16="http://schemas.microsoft.com/office/drawing/2014/main" id="{875B6979-B7D9-438E-B71F-A5E075D38E72}"/>
+                <a16:creationId xmlns:a16="http://schemas.microsoft.com/office/drawing/2014/main" id="{875B6979-B7D9-438E-B71F-A5E075D38E72}"/>
               </a:ext>
             </a:extLst>
           </p:cNvPr>
@@ -2552,7 +2661,7 @@
           <p:cNvPr id="2" name="Titre 1">
             <a:extLst>
               <a:ext uri="{FF2B5EF4-FFF2-40B4-BE49-F238E27FC236}">
-                <a16:creationId xmlns="" xmlns:a16="http://schemas.microsoft.com/office/drawing/2014/main" id="{10F80595-7C44-431A-BE0A-A901600D98B7}"/>
+                <a16:creationId xmlns:a16="http://schemas.microsoft.com/office/drawing/2014/main" id="{10F80595-7C44-431A-BE0A-A901600D98B7}"/>
               </a:ext>
             </a:extLst>
           </p:cNvPr>
@@ -2580,7 +2689,7 @@
           <p:cNvPr id="3" name="Espace réservé du contenu 2">
             <a:extLst>
               <a:ext uri="{FF2B5EF4-FFF2-40B4-BE49-F238E27FC236}">
-                <a16:creationId xmlns="" xmlns:a16="http://schemas.microsoft.com/office/drawing/2014/main" id="{02094895-672F-4845-B23C-D159A56BDAEF}"/>
+                <a16:creationId xmlns:a16="http://schemas.microsoft.com/office/drawing/2014/main" id="{02094895-672F-4845-B23C-D159A56BDAEF}"/>
               </a:ext>
             </a:extLst>
           </p:cNvPr>
@@ -2642,7 +2751,7 @@
           <p:cNvPr id="4" name="Espace réservé du contenu 3">
             <a:extLst>
               <a:ext uri="{FF2B5EF4-FFF2-40B4-BE49-F238E27FC236}">
-                <a16:creationId xmlns="" xmlns:a16="http://schemas.microsoft.com/office/drawing/2014/main" id="{42ABBCF1-9243-4A4D-9240-DCE832B366BC}"/>
+                <a16:creationId xmlns:a16="http://schemas.microsoft.com/office/drawing/2014/main" id="{42ABBCF1-9243-4A4D-9240-DCE832B366BC}"/>
               </a:ext>
             </a:extLst>
           </p:cNvPr>
@@ -2704,7 +2813,7 @@
           <p:cNvPr id="5" name="Espace réservé de la date 4">
             <a:extLst>
               <a:ext uri="{FF2B5EF4-FFF2-40B4-BE49-F238E27FC236}">
-                <a16:creationId xmlns="" xmlns:a16="http://schemas.microsoft.com/office/drawing/2014/main" id="{1194C6E9-766E-4398-B996-31F6BB51A58D}"/>
+                <a16:creationId xmlns:a16="http://schemas.microsoft.com/office/drawing/2014/main" id="{1194C6E9-766E-4398-B996-31F6BB51A58D}"/>
               </a:ext>
             </a:extLst>
           </p:cNvPr>
@@ -2722,7 +2831,7 @@
           <a:p>
             <a:fld id="{2A800B55-2EA3-4651-92C4-339DC2AA9BC2}" type="datetimeFigureOut">
               <a:rPr lang="fr-FR" smtClean="0"/>
-              <a:t>23/10/2019</a:t>
+              <a:t>29/10/2019</a:t>
             </a:fld>
             <a:endParaRPr lang="fr-FR"/>
           </a:p>
@@ -2733,7 +2842,7 @@
           <p:cNvPr id="6" name="Espace réservé du pied de page 5">
             <a:extLst>
               <a:ext uri="{FF2B5EF4-FFF2-40B4-BE49-F238E27FC236}">
-                <a16:creationId xmlns="" xmlns:a16="http://schemas.microsoft.com/office/drawing/2014/main" id="{2BD377AC-0D08-4B59-968C-29569CF3A508}"/>
+                <a16:creationId xmlns:a16="http://schemas.microsoft.com/office/drawing/2014/main" id="{2BD377AC-0D08-4B59-968C-29569CF3A508}"/>
               </a:ext>
             </a:extLst>
           </p:cNvPr>
@@ -2758,7 +2867,7 @@
           <p:cNvPr id="7" name="Espace réservé du numéro de diapositive 6">
             <a:extLst>
               <a:ext uri="{FF2B5EF4-FFF2-40B4-BE49-F238E27FC236}">
-                <a16:creationId xmlns="" xmlns:a16="http://schemas.microsoft.com/office/drawing/2014/main" id="{81220588-CE53-4903-B21F-653142A94B50}"/>
+                <a16:creationId xmlns:a16="http://schemas.microsoft.com/office/drawing/2014/main" id="{81220588-CE53-4903-B21F-653142A94B50}"/>
               </a:ext>
             </a:extLst>
           </p:cNvPr>
@@ -2817,7 +2926,7 @@
           <p:cNvPr id="2" name="Titre 1">
             <a:extLst>
               <a:ext uri="{FF2B5EF4-FFF2-40B4-BE49-F238E27FC236}">
-                <a16:creationId xmlns="" xmlns:a16="http://schemas.microsoft.com/office/drawing/2014/main" id="{FD939089-6CD6-4866-9B35-4DC2A2CABA23}"/>
+                <a16:creationId xmlns:a16="http://schemas.microsoft.com/office/drawing/2014/main" id="{FD939089-6CD6-4866-9B35-4DC2A2CABA23}"/>
               </a:ext>
             </a:extLst>
           </p:cNvPr>
@@ -2850,7 +2959,7 @@
           <p:cNvPr id="3" name="Espace réservé du texte 2">
             <a:extLst>
               <a:ext uri="{FF2B5EF4-FFF2-40B4-BE49-F238E27FC236}">
-                <a16:creationId xmlns="" xmlns:a16="http://schemas.microsoft.com/office/drawing/2014/main" id="{50405C07-73B1-4D8F-929F-4C92A36959DA}"/>
+                <a16:creationId xmlns:a16="http://schemas.microsoft.com/office/drawing/2014/main" id="{50405C07-73B1-4D8F-929F-4C92A36959DA}"/>
               </a:ext>
             </a:extLst>
           </p:cNvPr>
@@ -2921,7 +3030,7 @@
           <p:cNvPr id="4" name="Espace réservé du contenu 3">
             <a:extLst>
               <a:ext uri="{FF2B5EF4-FFF2-40B4-BE49-F238E27FC236}">
-                <a16:creationId xmlns="" xmlns:a16="http://schemas.microsoft.com/office/drawing/2014/main" id="{3AC8DFC7-4492-46B5-914E-4D705225289C}"/>
+                <a16:creationId xmlns:a16="http://schemas.microsoft.com/office/drawing/2014/main" id="{3AC8DFC7-4492-46B5-914E-4D705225289C}"/>
               </a:ext>
             </a:extLst>
           </p:cNvPr>
@@ -2983,7 +3092,7 @@
           <p:cNvPr id="5" name="Espace réservé du texte 4">
             <a:extLst>
               <a:ext uri="{FF2B5EF4-FFF2-40B4-BE49-F238E27FC236}">
-                <a16:creationId xmlns="" xmlns:a16="http://schemas.microsoft.com/office/drawing/2014/main" id="{CF23CD3B-4ED5-4840-BBAE-151B2DC17935}"/>
+                <a16:creationId xmlns:a16="http://schemas.microsoft.com/office/drawing/2014/main" id="{CF23CD3B-4ED5-4840-BBAE-151B2DC17935}"/>
               </a:ext>
             </a:extLst>
           </p:cNvPr>
@@ -3054,7 +3163,7 @@
           <p:cNvPr id="6" name="Espace réservé du contenu 5">
             <a:extLst>
               <a:ext uri="{FF2B5EF4-FFF2-40B4-BE49-F238E27FC236}">
-                <a16:creationId xmlns="" xmlns:a16="http://schemas.microsoft.com/office/drawing/2014/main" id="{D46734E5-EFE4-44D8-BCC3-E23E9C8D535F}"/>
+                <a16:creationId xmlns:a16="http://schemas.microsoft.com/office/drawing/2014/main" id="{D46734E5-EFE4-44D8-BCC3-E23E9C8D535F}"/>
               </a:ext>
             </a:extLst>
           </p:cNvPr>
@@ -3116,7 +3225,7 @@
           <p:cNvPr id="7" name="Espace réservé de la date 6">
             <a:extLst>
               <a:ext uri="{FF2B5EF4-FFF2-40B4-BE49-F238E27FC236}">
-                <a16:creationId xmlns="" xmlns:a16="http://schemas.microsoft.com/office/drawing/2014/main" id="{A9E2F8BA-7A20-41D3-83D9-90A875844CCB}"/>
+                <a16:creationId xmlns:a16="http://schemas.microsoft.com/office/drawing/2014/main" id="{A9E2F8BA-7A20-41D3-83D9-90A875844CCB}"/>
               </a:ext>
             </a:extLst>
           </p:cNvPr>
@@ -3134,7 +3243,7 @@
           <a:p>
             <a:fld id="{2A800B55-2EA3-4651-92C4-339DC2AA9BC2}" type="datetimeFigureOut">
               <a:rPr lang="fr-FR" smtClean="0"/>
-              <a:t>23/10/2019</a:t>
+              <a:t>29/10/2019</a:t>
             </a:fld>
             <a:endParaRPr lang="fr-FR"/>
           </a:p>
@@ -3145,7 +3254,7 @@
           <p:cNvPr id="8" name="Espace réservé du pied de page 7">
             <a:extLst>
               <a:ext uri="{FF2B5EF4-FFF2-40B4-BE49-F238E27FC236}">
-                <a16:creationId xmlns="" xmlns:a16="http://schemas.microsoft.com/office/drawing/2014/main" id="{ED47B89C-E096-47A1-9AFB-64C4010309DF}"/>
+                <a16:creationId xmlns:a16="http://schemas.microsoft.com/office/drawing/2014/main" id="{ED47B89C-E096-47A1-9AFB-64C4010309DF}"/>
               </a:ext>
             </a:extLst>
           </p:cNvPr>
@@ -3170,7 +3279,7 @@
           <p:cNvPr id="9" name="Espace réservé du numéro de diapositive 8">
             <a:extLst>
               <a:ext uri="{FF2B5EF4-FFF2-40B4-BE49-F238E27FC236}">
-                <a16:creationId xmlns="" xmlns:a16="http://schemas.microsoft.com/office/drawing/2014/main" id="{B19C7C5A-302A-430F-8197-C408A6665253}"/>
+                <a16:creationId xmlns:a16="http://schemas.microsoft.com/office/drawing/2014/main" id="{B19C7C5A-302A-430F-8197-C408A6665253}"/>
               </a:ext>
             </a:extLst>
           </p:cNvPr>
@@ -3229,7 +3338,7 @@
           <p:cNvPr id="2" name="Titre 1">
             <a:extLst>
               <a:ext uri="{FF2B5EF4-FFF2-40B4-BE49-F238E27FC236}">
-                <a16:creationId xmlns="" xmlns:a16="http://schemas.microsoft.com/office/drawing/2014/main" id="{C18F6853-A7C9-4CD8-9D6C-77EAAEDE244A}"/>
+                <a16:creationId xmlns:a16="http://schemas.microsoft.com/office/drawing/2014/main" id="{C18F6853-A7C9-4CD8-9D6C-77EAAEDE244A}"/>
               </a:ext>
             </a:extLst>
           </p:cNvPr>
@@ -3257,7 +3366,7 @@
           <p:cNvPr id="3" name="Espace réservé de la date 2">
             <a:extLst>
               <a:ext uri="{FF2B5EF4-FFF2-40B4-BE49-F238E27FC236}">
-                <a16:creationId xmlns="" xmlns:a16="http://schemas.microsoft.com/office/drawing/2014/main" id="{DB1ED275-A626-4112-ADB2-91A03C9A7837}"/>
+                <a16:creationId xmlns:a16="http://schemas.microsoft.com/office/drawing/2014/main" id="{DB1ED275-A626-4112-ADB2-91A03C9A7837}"/>
               </a:ext>
             </a:extLst>
           </p:cNvPr>
@@ -3275,7 +3384,7 @@
           <a:p>
             <a:fld id="{2A800B55-2EA3-4651-92C4-339DC2AA9BC2}" type="datetimeFigureOut">
               <a:rPr lang="fr-FR" smtClean="0"/>
-              <a:t>23/10/2019</a:t>
+              <a:t>29/10/2019</a:t>
             </a:fld>
             <a:endParaRPr lang="fr-FR"/>
           </a:p>
@@ -3286,7 +3395,7 @@
           <p:cNvPr id="4" name="Espace réservé du pied de page 3">
             <a:extLst>
               <a:ext uri="{FF2B5EF4-FFF2-40B4-BE49-F238E27FC236}">
-                <a16:creationId xmlns="" xmlns:a16="http://schemas.microsoft.com/office/drawing/2014/main" id="{76323347-74E3-494F-B07B-A39112D17431}"/>
+                <a16:creationId xmlns:a16="http://schemas.microsoft.com/office/drawing/2014/main" id="{76323347-74E3-494F-B07B-A39112D17431}"/>
               </a:ext>
             </a:extLst>
           </p:cNvPr>
@@ -3311,7 +3420,7 @@
           <p:cNvPr id="5" name="Espace réservé du numéro de diapositive 4">
             <a:extLst>
               <a:ext uri="{FF2B5EF4-FFF2-40B4-BE49-F238E27FC236}">
-                <a16:creationId xmlns="" xmlns:a16="http://schemas.microsoft.com/office/drawing/2014/main" id="{9D75BD3A-C4C2-4F79-BE02-F7B3DBB7B9B8}"/>
+                <a16:creationId xmlns:a16="http://schemas.microsoft.com/office/drawing/2014/main" id="{9D75BD3A-C4C2-4F79-BE02-F7B3DBB7B9B8}"/>
               </a:ext>
             </a:extLst>
           </p:cNvPr>
@@ -3370,7 +3479,7 @@
           <p:cNvPr id="2" name="Espace réservé de la date 1">
             <a:extLst>
               <a:ext uri="{FF2B5EF4-FFF2-40B4-BE49-F238E27FC236}">
-                <a16:creationId xmlns="" xmlns:a16="http://schemas.microsoft.com/office/drawing/2014/main" id="{C7D2A69A-C447-41E8-AD72-B8E00FFE4D29}"/>
+                <a16:creationId xmlns:a16="http://schemas.microsoft.com/office/drawing/2014/main" id="{C7D2A69A-C447-41E8-AD72-B8E00FFE4D29}"/>
               </a:ext>
             </a:extLst>
           </p:cNvPr>
@@ -3388,7 +3497,7 @@
           <a:p>
             <a:fld id="{2A800B55-2EA3-4651-92C4-339DC2AA9BC2}" type="datetimeFigureOut">
               <a:rPr lang="fr-FR" smtClean="0"/>
-              <a:t>23/10/2019</a:t>
+              <a:t>29/10/2019</a:t>
             </a:fld>
             <a:endParaRPr lang="fr-FR"/>
           </a:p>
@@ -3399,7 +3508,7 @@
           <p:cNvPr id="3" name="Espace réservé du pied de page 2">
             <a:extLst>
               <a:ext uri="{FF2B5EF4-FFF2-40B4-BE49-F238E27FC236}">
-                <a16:creationId xmlns="" xmlns:a16="http://schemas.microsoft.com/office/drawing/2014/main" id="{5A228405-8B7D-4C6E-B1B5-94CE799E8344}"/>
+                <a16:creationId xmlns:a16="http://schemas.microsoft.com/office/drawing/2014/main" id="{5A228405-8B7D-4C6E-B1B5-94CE799E8344}"/>
               </a:ext>
             </a:extLst>
           </p:cNvPr>
@@ -3424,7 +3533,7 @@
           <p:cNvPr id="4" name="Espace réservé du numéro de diapositive 3">
             <a:extLst>
               <a:ext uri="{FF2B5EF4-FFF2-40B4-BE49-F238E27FC236}">
-                <a16:creationId xmlns="" xmlns:a16="http://schemas.microsoft.com/office/drawing/2014/main" id="{60731EE1-EAEE-46BD-B72D-78A9736589E9}"/>
+                <a16:creationId xmlns:a16="http://schemas.microsoft.com/office/drawing/2014/main" id="{60731EE1-EAEE-46BD-B72D-78A9736589E9}"/>
               </a:ext>
             </a:extLst>
           </p:cNvPr>
@@ -3483,7 +3592,7 @@
           <p:cNvPr id="2" name="Titre 1">
             <a:extLst>
               <a:ext uri="{FF2B5EF4-FFF2-40B4-BE49-F238E27FC236}">
-                <a16:creationId xmlns="" xmlns:a16="http://schemas.microsoft.com/office/drawing/2014/main" id="{07A54846-F879-4693-B5CF-51B536C8DBB7}"/>
+                <a16:creationId xmlns:a16="http://schemas.microsoft.com/office/drawing/2014/main" id="{07A54846-F879-4693-B5CF-51B536C8DBB7}"/>
               </a:ext>
             </a:extLst>
           </p:cNvPr>
@@ -3520,7 +3629,7 @@
           <p:cNvPr id="3" name="Espace réservé du contenu 2">
             <a:extLst>
               <a:ext uri="{FF2B5EF4-FFF2-40B4-BE49-F238E27FC236}">
-                <a16:creationId xmlns="" xmlns:a16="http://schemas.microsoft.com/office/drawing/2014/main" id="{119F4288-69AE-48E3-8E6C-4C9C90E79BBB}"/>
+                <a16:creationId xmlns:a16="http://schemas.microsoft.com/office/drawing/2014/main" id="{119F4288-69AE-48E3-8E6C-4C9C90E79BBB}"/>
               </a:ext>
             </a:extLst>
           </p:cNvPr>
@@ -3610,7 +3719,7 @@
           <p:cNvPr id="4" name="Espace réservé du texte 3">
             <a:extLst>
               <a:ext uri="{FF2B5EF4-FFF2-40B4-BE49-F238E27FC236}">
-                <a16:creationId xmlns="" xmlns:a16="http://schemas.microsoft.com/office/drawing/2014/main" id="{DBF9535D-65B7-41E7-9B92-E7930DFFCD2D}"/>
+                <a16:creationId xmlns:a16="http://schemas.microsoft.com/office/drawing/2014/main" id="{DBF9535D-65B7-41E7-9B92-E7930DFFCD2D}"/>
               </a:ext>
             </a:extLst>
           </p:cNvPr>
@@ -3681,7 +3790,7 @@
           <p:cNvPr id="5" name="Espace réservé de la date 4">
             <a:extLst>
               <a:ext uri="{FF2B5EF4-FFF2-40B4-BE49-F238E27FC236}">
-                <a16:creationId xmlns="" xmlns:a16="http://schemas.microsoft.com/office/drawing/2014/main" id="{66DF377B-B49A-490C-A248-FE77552DE03E}"/>
+                <a16:creationId xmlns:a16="http://schemas.microsoft.com/office/drawing/2014/main" id="{66DF377B-B49A-490C-A248-FE77552DE03E}"/>
               </a:ext>
             </a:extLst>
           </p:cNvPr>
@@ -3699,7 +3808,7 @@
           <a:p>
             <a:fld id="{2A800B55-2EA3-4651-92C4-339DC2AA9BC2}" type="datetimeFigureOut">
               <a:rPr lang="fr-FR" smtClean="0"/>
-              <a:t>23/10/2019</a:t>
+              <a:t>29/10/2019</a:t>
             </a:fld>
             <a:endParaRPr lang="fr-FR"/>
           </a:p>
@@ -3710,7 +3819,7 @@
           <p:cNvPr id="6" name="Espace réservé du pied de page 5">
             <a:extLst>
               <a:ext uri="{FF2B5EF4-FFF2-40B4-BE49-F238E27FC236}">
-                <a16:creationId xmlns="" xmlns:a16="http://schemas.microsoft.com/office/drawing/2014/main" id="{C59A076D-C7FB-4980-B551-B9A069EC93DC}"/>
+                <a16:creationId xmlns:a16="http://schemas.microsoft.com/office/drawing/2014/main" id="{C59A076D-C7FB-4980-B551-B9A069EC93DC}"/>
               </a:ext>
             </a:extLst>
           </p:cNvPr>
@@ -3735,7 +3844,7 @@
           <p:cNvPr id="7" name="Espace réservé du numéro de diapositive 6">
             <a:extLst>
               <a:ext uri="{FF2B5EF4-FFF2-40B4-BE49-F238E27FC236}">
-                <a16:creationId xmlns="" xmlns:a16="http://schemas.microsoft.com/office/drawing/2014/main" id="{438B01D0-B4B4-4F25-A0E4-03BB4922A705}"/>
+                <a16:creationId xmlns:a16="http://schemas.microsoft.com/office/drawing/2014/main" id="{438B01D0-B4B4-4F25-A0E4-03BB4922A705}"/>
               </a:ext>
             </a:extLst>
           </p:cNvPr>
@@ -3794,7 +3903,7 @@
           <p:cNvPr id="2" name="Titre 1">
             <a:extLst>
               <a:ext uri="{FF2B5EF4-FFF2-40B4-BE49-F238E27FC236}">
-                <a16:creationId xmlns="" xmlns:a16="http://schemas.microsoft.com/office/drawing/2014/main" id="{26D4B942-4C0A-41F5-AA39-345ED0E6B536}"/>
+                <a16:creationId xmlns:a16="http://schemas.microsoft.com/office/drawing/2014/main" id="{26D4B942-4C0A-41F5-AA39-345ED0E6B536}"/>
               </a:ext>
             </a:extLst>
           </p:cNvPr>
@@ -3831,7 +3940,7 @@
           <p:cNvPr id="3" name="Espace réservé pour une image  2">
             <a:extLst>
               <a:ext uri="{FF2B5EF4-FFF2-40B4-BE49-F238E27FC236}">
-                <a16:creationId xmlns="" xmlns:a16="http://schemas.microsoft.com/office/drawing/2014/main" id="{F17C59DA-7D98-4156-9346-D57842D00184}"/>
+                <a16:creationId xmlns:a16="http://schemas.microsoft.com/office/drawing/2014/main" id="{F17C59DA-7D98-4156-9346-D57842D00184}"/>
               </a:ext>
             </a:extLst>
           </p:cNvPr>
@@ -3898,7 +4007,7 @@
           <p:cNvPr id="4" name="Espace réservé du texte 3">
             <a:extLst>
               <a:ext uri="{FF2B5EF4-FFF2-40B4-BE49-F238E27FC236}">
-                <a16:creationId xmlns="" xmlns:a16="http://schemas.microsoft.com/office/drawing/2014/main" id="{358A1ED1-08F5-4C35-A27E-32DB2D87887A}"/>
+                <a16:creationId xmlns:a16="http://schemas.microsoft.com/office/drawing/2014/main" id="{358A1ED1-08F5-4C35-A27E-32DB2D87887A}"/>
               </a:ext>
             </a:extLst>
           </p:cNvPr>
@@ -3969,7 +4078,7 @@
           <p:cNvPr id="5" name="Espace réservé de la date 4">
             <a:extLst>
               <a:ext uri="{FF2B5EF4-FFF2-40B4-BE49-F238E27FC236}">
-                <a16:creationId xmlns="" xmlns:a16="http://schemas.microsoft.com/office/drawing/2014/main" id="{5188F3B0-4D1A-4D14-83C2-0A63544E08A8}"/>
+                <a16:creationId xmlns:a16="http://schemas.microsoft.com/office/drawing/2014/main" id="{5188F3B0-4D1A-4D14-83C2-0A63544E08A8}"/>
               </a:ext>
             </a:extLst>
           </p:cNvPr>
@@ -3987,7 +4096,7 @@
           <a:p>
             <a:fld id="{2A800B55-2EA3-4651-92C4-339DC2AA9BC2}" type="datetimeFigureOut">
               <a:rPr lang="fr-FR" smtClean="0"/>
-              <a:t>23/10/2019</a:t>
+              <a:t>29/10/2019</a:t>
             </a:fld>
             <a:endParaRPr lang="fr-FR"/>
           </a:p>
@@ -3998,7 +4107,7 @@
           <p:cNvPr id="6" name="Espace réservé du pied de page 5">
             <a:extLst>
               <a:ext uri="{FF2B5EF4-FFF2-40B4-BE49-F238E27FC236}">
-                <a16:creationId xmlns="" xmlns:a16="http://schemas.microsoft.com/office/drawing/2014/main" id="{3C9ED83A-B044-46B9-BCA1-75DC64911149}"/>
+                <a16:creationId xmlns:a16="http://schemas.microsoft.com/office/drawing/2014/main" id="{3C9ED83A-B044-46B9-BCA1-75DC64911149}"/>
               </a:ext>
             </a:extLst>
           </p:cNvPr>
@@ -4023,7 +4132,7 @@
           <p:cNvPr id="7" name="Espace réservé du numéro de diapositive 6">
             <a:extLst>
               <a:ext uri="{FF2B5EF4-FFF2-40B4-BE49-F238E27FC236}">
-                <a16:creationId xmlns="" xmlns:a16="http://schemas.microsoft.com/office/drawing/2014/main" id="{6AA90CDE-E7B6-424D-8248-C8DFE754B69E}"/>
+                <a16:creationId xmlns:a16="http://schemas.microsoft.com/office/drawing/2014/main" id="{6AA90CDE-E7B6-424D-8248-C8DFE754B69E}"/>
               </a:ext>
             </a:extLst>
           </p:cNvPr>
@@ -4087,7 +4196,7 @@
           <p:cNvPr id="2" name="Espace réservé du titre 1">
             <a:extLst>
               <a:ext uri="{FF2B5EF4-FFF2-40B4-BE49-F238E27FC236}">
-                <a16:creationId xmlns="" xmlns:a16="http://schemas.microsoft.com/office/drawing/2014/main" id="{177B3A7E-34DB-41F4-BDAB-166714BE8D81}"/>
+                <a16:creationId xmlns:a16="http://schemas.microsoft.com/office/drawing/2014/main" id="{177B3A7E-34DB-41F4-BDAB-166714BE8D81}"/>
               </a:ext>
             </a:extLst>
           </p:cNvPr>
@@ -4125,7 +4234,7 @@
           <p:cNvPr id="3" name="Espace réservé du texte 2">
             <a:extLst>
               <a:ext uri="{FF2B5EF4-FFF2-40B4-BE49-F238E27FC236}">
-                <a16:creationId xmlns="" xmlns:a16="http://schemas.microsoft.com/office/drawing/2014/main" id="{6FA69278-9D5C-4046-BAFB-5254BDC0F087}"/>
+                <a16:creationId xmlns:a16="http://schemas.microsoft.com/office/drawing/2014/main" id="{6FA69278-9D5C-4046-BAFB-5254BDC0F087}"/>
               </a:ext>
             </a:extLst>
           </p:cNvPr>
@@ -4192,7 +4301,7 @@
           <p:cNvPr id="4" name="Espace réservé de la date 3">
             <a:extLst>
               <a:ext uri="{FF2B5EF4-FFF2-40B4-BE49-F238E27FC236}">
-                <a16:creationId xmlns="" xmlns:a16="http://schemas.microsoft.com/office/drawing/2014/main" id="{52760642-CBE3-4711-B94F-63F0DCD2C630}"/>
+                <a16:creationId xmlns:a16="http://schemas.microsoft.com/office/drawing/2014/main" id="{52760642-CBE3-4711-B94F-63F0DCD2C630}"/>
               </a:ext>
             </a:extLst>
           </p:cNvPr>
@@ -4228,7 +4337,7 @@
           <a:p>
             <a:fld id="{2A800B55-2EA3-4651-92C4-339DC2AA9BC2}" type="datetimeFigureOut">
               <a:rPr lang="fr-FR" smtClean="0"/>
-              <a:t>23/10/2019</a:t>
+              <a:t>29/10/2019</a:t>
             </a:fld>
             <a:endParaRPr lang="fr-FR"/>
           </a:p>
@@ -4239,7 +4348,7 @@
           <p:cNvPr id="5" name="Espace réservé du pied de page 4">
             <a:extLst>
               <a:ext uri="{FF2B5EF4-FFF2-40B4-BE49-F238E27FC236}">
-                <a16:creationId xmlns="" xmlns:a16="http://schemas.microsoft.com/office/drawing/2014/main" id="{3BE13B01-4E78-4C0A-8396-EA65B3B2F989}"/>
+                <a16:creationId xmlns:a16="http://schemas.microsoft.com/office/drawing/2014/main" id="{3BE13B01-4E78-4C0A-8396-EA65B3B2F989}"/>
               </a:ext>
             </a:extLst>
           </p:cNvPr>
@@ -4282,7 +4391,7 @@
           <p:cNvPr id="6" name="Espace réservé du numéro de diapositive 5">
             <a:extLst>
               <a:ext uri="{FF2B5EF4-FFF2-40B4-BE49-F238E27FC236}">
-                <a16:creationId xmlns="" xmlns:a16="http://schemas.microsoft.com/office/drawing/2014/main" id="{FD2E27CE-48E6-47AC-B12A-0FAB76D3BEC0}"/>
+                <a16:creationId xmlns:a16="http://schemas.microsoft.com/office/drawing/2014/main" id="{FD2E27CE-48E6-47AC-B12A-0FAB76D3BEC0}"/>
               </a:ext>
             </a:extLst>
           </p:cNvPr>
@@ -4650,7 +4759,7 @@
           <p:cNvPr id="12" name="Image 11">
             <a:extLst>
               <a:ext uri="{FF2B5EF4-FFF2-40B4-BE49-F238E27FC236}">
-                <a16:creationId xmlns="" xmlns:a16="http://schemas.microsoft.com/office/drawing/2014/main" id="{EACD06AD-1B6B-4ECB-A999-9C82621090FC}"/>
+                <a16:creationId xmlns:a16="http://schemas.microsoft.com/office/drawing/2014/main" id="{EACD06AD-1B6B-4ECB-A999-9C82621090FC}"/>
               </a:ext>
             </a:extLst>
           </p:cNvPr>
@@ -4723,7 +4832,7 @@
           <p:cNvPr id="5" name="Image 4">
             <a:extLst>
               <a:ext uri="{FF2B5EF4-FFF2-40B4-BE49-F238E27FC236}">
-                <a16:creationId xmlns="" xmlns:a16="http://schemas.microsoft.com/office/drawing/2014/main" id="{D91F6CE4-A0FB-4282-9B85-47FA5527C736}"/>
+                <a16:creationId xmlns:a16="http://schemas.microsoft.com/office/drawing/2014/main" id="{D91F6CE4-A0FB-4282-9B85-47FA5527C736}"/>
               </a:ext>
             </a:extLst>
           </p:cNvPr>
@@ -4759,225 +4868,7 @@
           <p:cNvPr id="6" name="Image 5">
             <a:extLst>
               <a:ext uri="{FF2B5EF4-FFF2-40B4-BE49-F238E27FC236}">
-                <a16:creationId xmlns="" xmlns:a16="http://schemas.microsoft.com/office/drawing/2014/main" id="{B6F51BA5-E830-46D2-B1E2-3A2C10F760E7}"/>
-              </a:ext>
-            </a:extLst>
-          </p:cNvPr>
-          <p:cNvPicPr>
-            <a:picLocks noChangeAspect="1"/>
-          </p:cNvPicPr>
-          <p:nvPr/>
-        </p:nvPicPr>
-        <p:blipFill>
-          <a:blip r:embed="rId4" cstate="print">
-            <a:extLst>
-              <a:ext uri="{28A0092B-C50C-407E-A947-70E740481C1C}">
-                <a14:useLocalDpi xmlns:a14="http://schemas.microsoft.com/office/drawing/2010/main" val="0"/>
-              </a:ext>
-            </a:extLst>
-          </a:blip>
-          <a:stretch>
-            <a:fillRect/>
-          </a:stretch>
-        </p:blipFill>
-        <p:spPr>
-          <a:xfrm>
-            <a:off x="10802486" y="5912350"/>
-            <a:ext cx="1193772" cy="787940"/>
-          </a:xfrm>
-          <a:prstGeom prst="rect">
-            <a:avLst/>
-          </a:prstGeom>
-        </p:spPr>
-      </p:pic>
-    </p:spTree>
-    <p:extLst>
-      <p:ext uri="{BB962C8B-B14F-4D97-AF65-F5344CB8AC3E}">
-        <p14:creationId xmlns:p14="http://schemas.microsoft.com/office/powerpoint/2010/main" val="3806234110"/>
-      </p:ext>
-    </p:extLst>
-  </p:cSld>
-  <p:clrMapOvr>
-    <a:masterClrMapping/>
-  </p:clrMapOvr>
-  <p:timing>
-    <p:tnLst>
-      <p:par>
-        <p:cTn id="1" dur="indefinite" restart="never" nodeType="tmRoot"/>
-      </p:par>
-    </p:tnLst>
-  </p:timing>
-</p:sld>
-</file>
-
-<file path=ppt/slides/slide11.xml><?xml version="1.0" encoding="utf-8"?>
-<p:sld xmlns:a="http://schemas.openxmlformats.org/drawingml/2006/main" xmlns:r="http://schemas.openxmlformats.org/officeDocument/2006/relationships" xmlns:p="http://schemas.openxmlformats.org/presentationml/2006/main">
-  <p:cSld>
-    <p:spTree>
-      <p:nvGrpSpPr>
-        <p:cNvPr id="1" name=""/>
-        <p:cNvGrpSpPr/>
-        <p:nvPr/>
-      </p:nvGrpSpPr>
-      <p:grpSpPr>
-        <a:xfrm>
-          <a:off x="0" y="0"/>
-          <a:ext cx="0" cy="0"/>
-          <a:chOff x="0" y="0"/>
-          <a:chExt cx="0" cy="0"/>
-        </a:xfrm>
-      </p:grpSpPr>
-      <p:pic>
-        <p:nvPicPr>
-          <p:cNvPr id="5" name="Image 4">
-            <a:extLst>
-              <a:ext uri="{FF2B5EF4-FFF2-40B4-BE49-F238E27FC236}">
-                <a16:creationId xmlns="" xmlns:a16="http://schemas.microsoft.com/office/drawing/2014/main" id="{D91F6CE4-A0FB-4282-9B85-47FA5527C736}"/>
-              </a:ext>
-            </a:extLst>
-          </p:cNvPr>
-          <p:cNvPicPr>
-            <a:picLocks noChangeAspect="1"/>
-          </p:cNvPicPr>
-          <p:nvPr/>
-        </p:nvPicPr>
-        <p:blipFill>
-          <a:blip r:embed="rId3" cstate="print">
-            <a:extLst>
-              <a:ext uri="{28A0092B-C50C-407E-A947-70E740481C1C}">
-                <a14:useLocalDpi xmlns:a14="http://schemas.microsoft.com/office/drawing/2010/main" val="0"/>
-              </a:ext>
-            </a:extLst>
-          </a:blip>
-          <a:stretch>
-            <a:fillRect/>
-          </a:stretch>
-        </p:blipFill>
-        <p:spPr>
-          <a:xfrm>
-            <a:off x="293615" y="6291743"/>
-            <a:ext cx="10508871" cy="272654"/>
-          </a:xfrm>
-          <a:prstGeom prst="rect">
-            <a:avLst/>
-          </a:prstGeom>
-        </p:spPr>
-      </p:pic>
-      <p:pic>
-        <p:nvPicPr>
-          <p:cNvPr id="6" name="Image 5">
-            <a:extLst>
-              <a:ext uri="{FF2B5EF4-FFF2-40B4-BE49-F238E27FC236}">
-                <a16:creationId xmlns="" xmlns:a16="http://schemas.microsoft.com/office/drawing/2014/main" id="{B6F51BA5-E830-46D2-B1E2-3A2C10F760E7}"/>
-              </a:ext>
-            </a:extLst>
-          </p:cNvPr>
-          <p:cNvPicPr>
-            <a:picLocks noChangeAspect="1"/>
-          </p:cNvPicPr>
-          <p:nvPr/>
-        </p:nvPicPr>
-        <p:blipFill>
-          <a:blip r:embed="rId4" cstate="print">
-            <a:extLst>
-              <a:ext uri="{28A0092B-C50C-407E-A947-70E740481C1C}">
-                <a14:useLocalDpi xmlns:a14="http://schemas.microsoft.com/office/drawing/2010/main" val="0"/>
-              </a:ext>
-            </a:extLst>
-          </a:blip>
-          <a:stretch>
-            <a:fillRect/>
-          </a:stretch>
-        </p:blipFill>
-        <p:spPr>
-          <a:xfrm>
-            <a:off x="10802486" y="5912350"/>
-            <a:ext cx="1193772" cy="787940"/>
-          </a:xfrm>
-          <a:prstGeom prst="rect">
-            <a:avLst/>
-          </a:prstGeom>
-        </p:spPr>
-      </p:pic>
-    </p:spTree>
-    <p:extLst>
-      <p:ext uri="{BB962C8B-B14F-4D97-AF65-F5344CB8AC3E}">
-        <p14:creationId xmlns:p14="http://schemas.microsoft.com/office/powerpoint/2010/main" val="1284584122"/>
-      </p:ext>
-    </p:extLst>
-  </p:cSld>
-  <p:clrMapOvr>
-    <a:masterClrMapping/>
-  </p:clrMapOvr>
-  <p:timing>
-    <p:tnLst>
-      <p:par>
-        <p:cTn id="1" dur="indefinite" restart="never" nodeType="tmRoot"/>
-      </p:par>
-    </p:tnLst>
-  </p:timing>
-</p:sld>
-</file>
-
-<file path=ppt/slides/slide12.xml><?xml version="1.0" encoding="utf-8"?>
-<p:sld xmlns:a="http://schemas.openxmlformats.org/drawingml/2006/main" xmlns:r="http://schemas.openxmlformats.org/officeDocument/2006/relationships" xmlns:p="http://schemas.openxmlformats.org/presentationml/2006/main">
-  <p:cSld>
-    <p:spTree>
-      <p:nvGrpSpPr>
-        <p:cNvPr id="1" name=""/>
-        <p:cNvGrpSpPr/>
-        <p:nvPr/>
-      </p:nvGrpSpPr>
-      <p:grpSpPr>
-        <a:xfrm>
-          <a:off x="0" y="0"/>
-          <a:ext cx="0" cy="0"/>
-          <a:chOff x="0" y="0"/>
-          <a:chExt cx="0" cy="0"/>
-        </a:xfrm>
-      </p:grpSpPr>
-      <p:pic>
-        <p:nvPicPr>
-          <p:cNvPr id="5" name="Image 4">
-            <a:extLst>
-              <a:ext uri="{FF2B5EF4-FFF2-40B4-BE49-F238E27FC236}">
-                <a16:creationId xmlns="" xmlns:a16="http://schemas.microsoft.com/office/drawing/2014/main" id="{D91F6CE4-A0FB-4282-9B85-47FA5527C736}"/>
-              </a:ext>
-            </a:extLst>
-          </p:cNvPr>
-          <p:cNvPicPr>
-            <a:picLocks noChangeAspect="1"/>
-          </p:cNvPicPr>
-          <p:nvPr/>
-        </p:nvPicPr>
-        <p:blipFill>
-          <a:blip r:embed="rId3" cstate="print">
-            <a:extLst>
-              <a:ext uri="{28A0092B-C50C-407E-A947-70E740481C1C}">
-                <a14:useLocalDpi xmlns:a14="http://schemas.microsoft.com/office/drawing/2010/main" val="0"/>
-              </a:ext>
-            </a:extLst>
-          </a:blip>
-          <a:stretch>
-            <a:fillRect/>
-          </a:stretch>
-        </p:blipFill>
-        <p:spPr>
-          <a:xfrm>
-            <a:off x="293615" y="6291743"/>
-            <a:ext cx="10508871" cy="272654"/>
-          </a:xfrm>
-          <a:prstGeom prst="rect">
-            <a:avLst/>
-          </a:prstGeom>
-        </p:spPr>
-      </p:pic>
-      <p:pic>
-        <p:nvPicPr>
-          <p:cNvPr id="6" name="Image 5">
-            <a:extLst>
-              <a:ext uri="{FF2B5EF4-FFF2-40B4-BE49-F238E27FC236}">
-                <a16:creationId xmlns="" xmlns:a16="http://schemas.microsoft.com/office/drawing/2014/main" id="{B6F51BA5-E830-46D2-B1E2-3A2C10F760E7}"/>
+                <a16:creationId xmlns:a16="http://schemas.microsoft.com/office/drawing/2014/main" id="{B6F51BA5-E830-46D2-B1E2-3A2C10F760E7}"/>
               </a:ext>
             </a:extLst>
           </p:cNvPr>
@@ -5050,7 +4941,7 @@
           <p:cNvPr id="5" name="Image 4">
             <a:extLst>
               <a:ext uri="{FF2B5EF4-FFF2-40B4-BE49-F238E27FC236}">
-                <a16:creationId xmlns="" xmlns:a16="http://schemas.microsoft.com/office/drawing/2014/main" id="{869AB7E9-B4A7-4FF1-923F-9A6CD3411C6D}"/>
+                <a16:creationId xmlns:a16="http://schemas.microsoft.com/office/drawing/2014/main" id="{869AB7E9-B4A7-4FF1-923F-9A6CD3411C6D}"/>
               </a:ext>
             </a:extLst>
           </p:cNvPr>
@@ -5085,7 +4976,7 @@
           <p:cNvPr id="7" name="Image 6">
             <a:extLst>
               <a:ext uri="{FF2B5EF4-FFF2-40B4-BE49-F238E27FC236}">
-                <a16:creationId xmlns="" xmlns:a16="http://schemas.microsoft.com/office/drawing/2014/main" id="{6B2F7E06-BE2A-4D46-BFEB-8307AE73934A}"/>
+                <a16:creationId xmlns:a16="http://schemas.microsoft.com/office/drawing/2014/main" id="{6B2F7E06-BE2A-4D46-BFEB-8307AE73934A}"/>
               </a:ext>
             </a:extLst>
           </p:cNvPr>
@@ -5121,7 +5012,7 @@
           <p:cNvPr id="9" name="ZoneTexte 8">
             <a:extLst>
               <a:ext uri="{FF2B5EF4-FFF2-40B4-BE49-F238E27FC236}">
-                <a16:creationId xmlns="" xmlns:a16="http://schemas.microsoft.com/office/drawing/2014/main" id="{9E866E0C-6DC9-455A-A1B9-64AE885E7351}"/>
+                <a16:creationId xmlns:a16="http://schemas.microsoft.com/office/drawing/2014/main" id="{9E866E0C-6DC9-455A-A1B9-64AE885E7351}"/>
               </a:ext>
             </a:extLst>
           </p:cNvPr>
@@ -5279,7 +5170,7 @@
           <p:cNvPr id="5" name="Image 4">
             <a:extLst>
               <a:ext uri="{FF2B5EF4-FFF2-40B4-BE49-F238E27FC236}">
-                <a16:creationId xmlns="" xmlns:a16="http://schemas.microsoft.com/office/drawing/2014/main" id="{690B7C91-9E32-4C10-91F3-E4B27602D14A}"/>
+                <a16:creationId xmlns:a16="http://schemas.microsoft.com/office/drawing/2014/main" id="{690B7C91-9E32-4C10-91F3-E4B27602D14A}"/>
               </a:ext>
             </a:extLst>
           </p:cNvPr>
@@ -5315,7 +5206,7 @@
           <p:cNvPr id="8" name="Image 7">
             <a:extLst>
               <a:ext uri="{FF2B5EF4-FFF2-40B4-BE49-F238E27FC236}">
-                <a16:creationId xmlns="" xmlns:a16="http://schemas.microsoft.com/office/drawing/2014/main" id="{1D9FB37C-7CB2-4BE0-9703-03F70A5ED299}"/>
+                <a16:creationId xmlns:a16="http://schemas.microsoft.com/office/drawing/2014/main" id="{1D9FB37C-7CB2-4BE0-9703-03F70A5ED299}"/>
               </a:ext>
             </a:extLst>
           </p:cNvPr>
@@ -5351,7 +5242,7 @@
           <p:cNvPr id="9" name="Image 8">
             <a:extLst>
               <a:ext uri="{FF2B5EF4-FFF2-40B4-BE49-F238E27FC236}">
-                <a16:creationId xmlns="" xmlns:a16="http://schemas.microsoft.com/office/drawing/2014/main" id="{BD329F67-C0D6-41DC-B94E-B2D8C954FEF0}"/>
+                <a16:creationId xmlns:a16="http://schemas.microsoft.com/office/drawing/2014/main" id="{BD329F67-C0D6-41DC-B94E-B2D8C954FEF0}"/>
               </a:ext>
             </a:extLst>
           </p:cNvPr>
@@ -5387,7 +5278,7 @@
           <p:cNvPr id="10" name="ZoneTexte 9">
             <a:extLst>
               <a:ext uri="{FF2B5EF4-FFF2-40B4-BE49-F238E27FC236}">
-                <a16:creationId xmlns="" xmlns:a16="http://schemas.microsoft.com/office/drawing/2014/main" id="{4B58266B-2FBD-4EB9-A3B0-21B55406E0FB}"/>
+                <a16:creationId xmlns:a16="http://schemas.microsoft.com/office/drawing/2014/main" id="{4B58266B-2FBD-4EB9-A3B0-21B55406E0FB}"/>
               </a:ext>
             </a:extLst>
           </p:cNvPr>
@@ -5437,7 +5328,7 @@
           <p:cNvPr id="11" name="Image 10">
             <a:extLst>
               <a:ext uri="{FF2B5EF4-FFF2-40B4-BE49-F238E27FC236}">
-                <a16:creationId xmlns="" xmlns:a16="http://schemas.microsoft.com/office/drawing/2014/main" id="{BC60F5C6-1931-4BB0-BF99-C0ABAE97AA9B}"/>
+                <a16:creationId xmlns:a16="http://schemas.microsoft.com/office/drawing/2014/main" id="{BC60F5C6-1931-4BB0-BF99-C0ABAE97AA9B}"/>
               </a:ext>
             </a:extLst>
           </p:cNvPr>
@@ -5473,7 +5364,7 @@
           <p:cNvPr id="12" name="ZoneTexte 11">
             <a:extLst>
               <a:ext uri="{FF2B5EF4-FFF2-40B4-BE49-F238E27FC236}">
-                <a16:creationId xmlns="" xmlns:a16="http://schemas.microsoft.com/office/drawing/2014/main" id="{8CC0C0A7-D89B-4723-BD88-6897FA5AD072}"/>
+                <a16:creationId xmlns:a16="http://schemas.microsoft.com/office/drawing/2014/main" id="{8CC0C0A7-D89B-4723-BD88-6897FA5AD072}"/>
               </a:ext>
             </a:extLst>
           </p:cNvPr>
@@ -5509,7 +5400,7 @@
           <p:cNvPr id="13" name="ZoneTexte 12">
             <a:extLst>
               <a:ext uri="{FF2B5EF4-FFF2-40B4-BE49-F238E27FC236}">
-                <a16:creationId xmlns="" xmlns:a16="http://schemas.microsoft.com/office/drawing/2014/main" id="{BBBA41C0-E06D-4055-AE08-25A7DD269CC3}"/>
+                <a16:creationId xmlns:a16="http://schemas.microsoft.com/office/drawing/2014/main" id="{BBBA41C0-E06D-4055-AE08-25A7DD269CC3}"/>
               </a:ext>
             </a:extLst>
           </p:cNvPr>
@@ -5558,7 +5449,7 @@
           <p:cNvPr id="18" name="ZoneTexte 17">
             <a:extLst>
               <a:ext uri="{FF2B5EF4-FFF2-40B4-BE49-F238E27FC236}">
-                <a16:creationId xmlns="" xmlns:a16="http://schemas.microsoft.com/office/drawing/2014/main" id="{00F58013-8D63-49F8-9E8B-80F6489B70E2}"/>
+                <a16:creationId xmlns:a16="http://schemas.microsoft.com/office/drawing/2014/main" id="{00F58013-8D63-49F8-9E8B-80F6489B70E2}"/>
               </a:ext>
             </a:extLst>
           </p:cNvPr>
@@ -5639,7 +5530,7 @@
           <p:cNvPr id="2" name="Rectangle 1">
             <a:extLst>
               <a:ext uri="{FF2B5EF4-FFF2-40B4-BE49-F238E27FC236}">
-                <a16:creationId xmlns="" xmlns:a16="http://schemas.microsoft.com/office/drawing/2014/main" id="{A105FD58-B146-466C-AAC0-7AB232821F68}"/>
+                <a16:creationId xmlns:a16="http://schemas.microsoft.com/office/drawing/2014/main" id="{A105FD58-B146-466C-AAC0-7AB232821F68}"/>
               </a:ext>
             </a:extLst>
           </p:cNvPr>
@@ -5679,7 +5570,7 @@
           <p:cNvPr id="14" name="ZoneTexte 13">
             <a:extLst>
               <a:ext uri="{FF2B5EF4-FFF2-40B4-BE49-F238E27FC236}">
-                <a16:creationId xmlns="" xmlns:a16="http://schemas.microsoft.com/office/drawing/2014/main" id="{00F58013-8D63-49F8-9E8B-80F6489B70E2}"/>
+                <a16:creationId xmlns:a16="http://schemas.microsoft.com/office/drawing/2014/main" id="{00F58013-8D63-49F8-9E8B-80F6489B70E2}"/>
               </a:ext>
             </a:extLst>
           </p:cNvPr>
@@ -5774,7 +5665,7 @@
           <p:cNvPr id="5" name="Image 4">
             <a:extLst>
               <a:ext uri="{FF2B5EF4-FFF2-40B4-BE49-F238E27FC236}">
-                <a16:creationId xmlns="" xmlns:a16="http://schemas.microsoft.com/office/drawing/2014/main" id="{75EBA769-F8CC-4D71-9511-415D7C261511}"/>
+                <a16:creationId xmlns:a16="http://schemas.microsoft.com/office/drawing/2014/main" id="{75EBA769-F8CC-4D71-9511-415D7C261511}"/>
               </a:ext>
             </a:extLst>
           </p:cNvPr>
@@ -5810,7 +5701,7 @@
           <p:cNvPr id="6" name="ZoneTexte 5">
             <a:extLst>
               <a:ext uri="{FF2B5EF4-FFF2-40B4-BE49-F238E27FC236}">
-                <a16:creationId xmlns="" xmlns:a16="http://schemas.microsoft.com/office/drawing/2014/main" id="{945071A7-C8A5-4800-BD76-C6841CE45C5A}"/>
+                <a16:creationId xmlns:a16="http://schemas.microsoft.com/office/drawing/2014/main" id="{945071A7-C8A5-4800-BD76-C6841CE45C5A}"/>
               </a:ext>
             </a:extLst>
           </p:cNvPr>
@@ -5909,22 +5800,34 @@
       </p:grpSpPr>
       <p:pic>
         <p:nvPicPr>
-          <p:cNvPr id="17" name="Image 16"/>
+          <p:cNvPr id="5" name="Image 4">
+            <a:extLst>
+              <a:ext uri="{FF2B5EF4-FFF2-40B4-BE49-F238E27FC236}">
+                <a16:creationId xmlns:a16="http://schemas.microsoft.com/office/drawing/2014/main" id="{D91F6CE4-A0FB-4282-9B85-47FA5527C736}"/>
+              </a:ext>
+            </a:extLst>
+          </p:cNvPr>
           <p:cNvPicPr>
             <a:picLocks noChangeAspect="1"/>
           </p:cNvPicPr>
           <p:nvPr/>
         </p:nvPicPr>
         <p:blipFill>
-          <a:blip r:embed="rId3"/>
+          <a:blip r:embed="rId3" cstate="print">
+            <a:extLst>
+              <a:ext uri="{28A0092B-C50C-407E-A947-70E740481C1C}">
+                <a14:useLocalDpi xmlns:a14="http://schemas.microsoft.com/office/drawing/2010/main" val="0"/>
+              </a:ext>
+            </a:extLst>
+          </a:blip>
           <a:stretch>
             <a:fillRect/>
           </a:stretch>
         </p:blipFill>
         <p:spPr>
           <a:xfrm>
-            <a:off x="564602" y="405634"/>
-            <a:ext cx="5429250" cy="5353050"/>
+            <a:off x="293615" y="6291743"/>
+            <a:ext cx="10508871" cy="272654"/>
           </a:xfrm>
           <a:prstGeom prst="rect">
             <a:avLst/>
@@ -5933,10 +5836,10 @@
       </p:pic>
       <p:pic>
         <p:nvPicPr>
-          <p:cNvPr id="5" name="Image 4">
-            <a:extLst>
-              <a:ext uri="{FF2B5EF4-FFF2-40B4-BE49-F238E27FC236}">
-                <a16:creationId xmlns="" xmlns:a16="http://schemas.microsoft.com/office/drawing/2014/main" id="{D91F6CE4-A0FB-4282-9B85-47FA5527C736}"/>
+          <p:cNvPr id="6" name="Image 5">
+            <a:extLst>
+              <a:ext uri="{FF2B5EF4-FFF2-40B4-BE49-F238E27FC236}">
+                <a16:creationId xmlns:a16="http://schemas.microsoft.com/office/drawing/2014/main" id="{B6F51BA5-E830-46D2-B1E2-3A2C10F760E7}"/>
               </a:ext>
             </a:extLst>
           </p:cNvPr>
@@ -5959,50 +5862,14 @@
         </p:blipFill>
         <p:spPr>
           <a:xfrm>
-            <a:off x="293615" y="6291743"/>
-            <a:ext cx="10508871" cy="272654"/>
+            <a:off x="10802486" y="5912350"/>
+            <a:ext cx="1193772" cy="787940"/>
           </a:xfrm>
           <a:prstGeom prst="rect">
             <a:avLst/>
           </a:prstGeom>
         </p:spPr>
       </p:pic>
-      <p:pic>
-        <p:nvPicPr>
-          <p:cNvPr id="6" name="Image 5">
-            <a:extLst>
-              <a:ext uri="{FF2B5EF4-FFF2-40B4-BE49-F238E27FC236}">
-                <a16:creationId xmlns="" xmlns:a16="http://schemas.microsoft.com/office/drawing/2014/main" id="{B6F51BA5-E830-46D2-B1E2-3A2C10F760E7}"/>
-              </a:ext>
-            </a:extLst>
-          </p:cNvPr>
-          <p:cNvPicPr>
-            <a:picLocks noChangeAspect="1"/>
-          </p:cNvPicPr>
-          <p:nvPr/>
-        </p:nvPicPr>
-        <p:blipFill>
-          <a:blip r:embed="rId5" cstate="print">
-            <a:extLst>
-              <a:ext uri="{28A0092B-C50C-407E-A947-70E740481C1C}">
-                <a14:useLocalDpi xmlns:a14="http://schemas.microsoft.com/office/drawing/2010/main" val="0"/>
-              </a:ext>
-            </a:extLst>
-          </a:blip>
-          <a:stretch>
-            <a:fillRect/>
-          </a:stretch>
-        </p:blipFill>
-        <p:spPr>
-          <a:xfrm>
-            <a:off x="10802486" y="5912350"/>
-            <a:ext cx="1193772" cy="787940"/>
-          </a:xfrm>
-          <a:prstGeom prst="rect">
-            <a:avLst/>
-          </a:prstGeom>
-        </p:spPr>
-      </p:pic>
       <p:sp>
         <p:nvSpPr>
           <p:cNvPr id="7" name="ZoneTexte 6"/>
@@ -6011,8 +5878,8 @@
         </p:nvSpPr>
         <p:spPr>
           <a:xfrm>
-            <a:off x="6421820" y="907952"/>
-            <a:ext cx="5574438" cy="3693319"/>
+            <a:off x="6421820" y="1735710"/>
+            <a:ext cx="5574438" cy="2585323"/>
           </a:xfrm>
           <a:prstGeom prst="rect">
             <a:avLst/>
@@ -6027,7 +5894,7 @@
           <a:p>
             <a:r>
               <a:rPr lang="fr-FR" dirty="0" smtClean="0"/>
-              <a:t>Supposons un projet </a:t>
+              <a:t>Ce projet </a:t>
             </a:r>
             <a:r>
               <a:rPr lang="fr-FR" dirty="0" err="1" smtClean="0"/>
@@ -6035,7 +5902,7 @@
             </a:r>
             <a:r>
               <a:rPr lang="fr-FR" dirty="0" smtClean="0"/>
-              <a:t> organisé de cette façon :</a:t>
+              <a:t> était organisé de cette façon :</a:t>
             </a:r>
           </a:p>
           <a:p>
@@ -6055,17 +5922,7 @@
             </a:pPr>
             <a:r>
               <a:rPr lang="fr-FR" dirty="0" smtClean="0"/>
-              <a:t>Le bus qui les reçoit les distribue aux API métiers correspondantes.</a:t>
-            </a:r>
-          </a:p>
-          <a:p>
-            <a:pPr marL="285750" indent="-285750">
-              <a:buFontTx/>
-              <a:buChar char="-"/>
-            </a:pPr>
-            <a:r>
-              <a:rPr lang="fr-FR" dirty="0" smtClean="0"/>
-              <a:t>Un résultat est retourné au bus, qui retourne le résultat de la requête</a:t>
+              <a:t>Un serveur Apache les transmet à un service Scala, qui les distribue aux API métiers correspondantes.</a:t>
             </a:r>
           </a:p>
           <a:p>
@@ -6078,109 +5935,25 @@
           <a:p>
             <a:r>
               <a:rPr lang="fr-FR" dirty="0" smtClean="0"/>
-              <a:t>Un second cas de figure est probable : le code métier est inclus dans le bus </a:t>
-            </a:r>
-            <a:r>
-              <a:rPr lang="fr-FR" sz="800" dirty="0" smtClean="0"/>
-              <a:t>(ça n’arrive jamais, enfin)</a:t>
-            </a:r>
-            <a:r>
-              <a:rPr lang="fr-FR" dirty="0" smtClean="0"/>
-              <a:t>, qui va donc s’appeler lui-même et rompre le SRP (ce qui n’est pas nécessairement un problème pour les langages non orientés objet).</a:t>
-            </a:r>
-            <a:endParaRPr lang="fr-FR" dirty="0"/>
-          </a:p>
-          <a:p>
-            <a:endParaRPr lang="fr-FR" dirty="0" smtClean="0"/>
-          </a:p>
-          <a:p>
-            <a:r>
-              <a:rPr lang="fr-FR" dirty="0" smtClean="0">
-                <a:sym typeface="Wingdings" panose="05000000000000000000" pitchFamily="2" charset="2"/>
-              </a:rPr>
-              <a:t> Serveur monolithique, massif, fiable</a:t>
-            </a:r>
-            <a:r>
-              <a:rPr lang="fr-FR" smtClean="0">
-                <a:sym typeface="Wingdings" panose="05000000000000000000" pitchFamily="2" charset="2"/>
-              </a:rPr>
-              <a:t>, lourd</a:t>
-            </a:r>
-            <a:endParaRPr lang="fr-FR" dirty="0"/>
-          </a:p>
-        </p:txBody>
-      </p:sp>
-      <p:sp>
-        <p:nvSpPr>
-          <p:cNvPr id="3" name="ZoneTexte 2"/>
-          <p:cNvSpPr txBox="1"/>
+              <a:t>En plus de servir de passe-plat entre le monde extérieur et les service, le serveur Scala formatait les requêtes de retour à sa façon, et retournait systématiquement des données critiques ou inutiles.</a:t>
+            </a:r>
+          </a:p>
+        </p:txBody>
+      </p:sp>
+      <p:sp>
+        <p:nvSpPr>
+          <p:cNvPr id="11" name="Rectangle à coins arrondis 10"/>
+          <p:cNvSpPr/>
           <p:nvPr/>
         </p:nvSpPr>
         <p:spPr>
           <a:xfrm>
-            <a:off x="758536" y="581890"/>
-            <a:ext cx="3241964" cy="384721"/>
-          </a:xfrm>
-          <a:prstGeom prst="rect">
+            <a:off x="299002" y="2121870"/>
+            <a:ext cx="1276959" cy="1813004"/>
+          </a:xfrm>
+          <a:prstGeom prst="roundRect">
             <a:avLst/>
           </a:prstGeom>
-          <a:solidFill>
-            <a:schemeClr val="bg1"/>
-          </a:solidFill>
-        </p:spPr>
-        <p:txBody>
-          <a:bodyPr wrap="square" rtlCol="0">
-            <a:spAutoFit/>
-          </a:bodyPr>
-          <a:lstStyle/>
-          <a:p>
-            <a:pPr algn="ctr"/>
-            <a:r>
-              <a:rPr lang="fr-FR" sz="1900" dirty="0" smtClean="0">
-                <a:solidFill>
-                  <a:srgbClr val="0A559E"/>
-                </a:solidFill>
-              </a:rPr>
-              <a:t>Projet </a:t>
-            </a:r>
-            <a:r>
-              <a:rPr lang="fr-FR" sz="1900" dirty="0" err="1" smtClean="0">
-                <a:solidFill>
-                  <a:srgbClr val="0A559E"/>
-                </a:solidFill>
-              </a:rPr>
-              <a:t>Legacy</a:t>
-            </a:r>
-            <a:endParaRPr lang="fr-FR" sz="1900" dirty="0">
-              <a:solidFill>
-                <a:srgbClr val="0A559E"/>
-              </a:solidFill>
-            </a:endParaRPr>
-          </a:p>
-        </p:txBody>
-      </p:sp>
-      <p:sp>
-        <p:nvSpPr>
-          <p:cNvPr id="4" name="Ellipse 3"/>
-          <p:cNvSpPr/>
-          <p:nvPr/>
-        </p:nvSpPr>
-        <p:spPr>
-          <a:xfrm>
-            <a:off x="2878282" y="2358737"/>
-            <a:ext cx="176645" cy="207818"/>
-          </a:xfrm>
-          <a:prstGeom prst="ellipse">
-            <a:avLst/>
-          </a:prstGeom>
-          <a:solidFill>
-            <a:schemeClr val="bg1"/>
-          </a:solidFill>
-          <a:ln>
-            <a:solidFill>
-              <a:schemeClr val="bg1"/>
-            </a:solidFill>
-          </a:ln>
         </p:spPr>
         <p:style>
           <a:lnRef idx="2">
@@ -6203,10 +5976,1050 @@
           <a:lstStyle/>
           <a:p>
             <a:pPr algn="ctr"/>
+            <a:r>
+              <a:rPr lang="fr-FR" dirty="0" smtClean="0"/>
+              <a:t>Requêtes</a:t>
+            </a:r>
+            <a:endParaRPr lang="fr-FR" dirty="0"/>
+          </a:p>
+        </p:txBody>
+      </p:sp>
+      <p:sp>
+        <p:nvSpPr>
+          <p:cNvPr id="12" name="Rectangle 11"/>
+          <p:cNvSpPr/>
+          <p:nvPr/>
+        </p:nvSpPr>
+        <p:spPr>
+          <a:xfrm>
+            <a:off x="1992693" y="222754"/>
+            <a:ext cx="4128408" cy="5911581"/>
+          </a:xfrm>
+          <a:prstGeom prst="rect">
+            <a:avLst/>
+          </a:prstGeom>
+        </p:spPr>
+        <p:style>
+          <a:lnRef idx="2">
+            <a:schemeClr val="dk1"/>
+          </a:lnRef>
+          <a:fillRef idx="1">
+            <a:schemeClr val="lt1"/>
+          </a:fillRef>
+          <a:effectRef idx="0">
+            <a:schemeClr val="dk1"/>
+          </a:effectRef>
+          <a:fontRef idx="minor">
+            <a:schemeClr val="dk1"/>
+          </a:fontRef>
+        </p:style>
+        <p:txBody>
+          <a:bodyPr rtlCol="0" anchor="ctr"/>
+          <a:lstStyle/>
+          <a:p>
+            <a:pPr algn="ctr"/>
             <a:endParaRPr lang="fr-FR"/>
           </a:p>
         </p:txBody>
       </p:sp>
+      <p:sp>
+        <p:nvSpPr>
+          <p:cNvPr id="14" name="Rectangle à coins arrondis 13"/>
+          <p:cNvSpPr/>
+          <p:nvPr/>
+        </p:nvSpPr>
+        <p:spPr>
+          <a:xfrm>
+            <a:off x="2164557" y="419547"/>
+            <a:ext cx="597918" cy="5647765"/>
+          </a:xfrm>
+          <a:prstGeom prst="roundRect">
+            <a:avLst/>
+          </a:prstGeom>
+        </p:spPr>
+        <p:style>
+          <a:lnRef idx="2">
+            <a:schemeClr val="accent1">
+              <a:shade val="50000"/>
+            </a:schemeClr>
+          </a:lnRef>
+          <a:fillRef idx="1">
+            <a:schemeClr val="accent1"/>
+          </a:fillRef>
+          <a:effectRef idx="0">
+            <a:schemeClr val="accent1"/>
+          </a:effectRef>
+          <a:fontRef idx="minor">
+            <a:schemeClr val="lt1"/>
+          </a:fontRef>
+        </p:style>
+        <p:txBody>
+          <a:bodyPr vert="vert270" rtlCol="0" anchor="ctr">
+            <a:scene3d>
+              <a:camera prst="orthographicFront">
+                <a:rot lat="0" lon="0" rev="0"/>
+              </a:camera>
+              <a:lightRig rig="threePt" dir="t"/>
+            </a:scene3d>
+          </a:bodyPr>
+          <a:lstStyle/>
+          <a:p>
+            <a:pPr algn="ctr"/>
+            <a:r>
+              <a:rPr lang="fr-FR" sz="2100" cap="all" dirty="0" smtClean="0"/>
+              <a:t>Apache</a:t>
+            </a:r>
+            <a:endParaRPr lang="fr-FR" sz="2100" cap="all" dirty="0"/>
+          </a:p>
+        </p:txBody>
+      </p:sp>
+      <p:sp>
+        <p:nvSpPr>
+          <p:cNvPr id="18" name="Rectangle à coins arrondis 17"/>
+          <p:cNvSpPr/>
+          <p:nvPr/>
+        </p:nvSpPr>
+        <p:spPr>
+          <a:xfrm>
+            <a:off x="3286527" y="419547"/>
+            <a:ext cx="597918" cy="5647765"/>
+          </a:xfrm>
+          <a:prstGeom prst="roundRect">
+            <a:avLst/>
+          </a:prstGeom>
+        </p:spPr>
+        <p:style>
+          <a:lnRef idx="2">
+            <a:schemeClr val="accent1">
+              <a:shade val="50000"/>
+            </a:schemeClr>
+          </a:lnRef>
+          <a:fillRef idx="1">
+            <a:schemeClr val="accent1"/>
+          </a:fillRef>
+          <a:effectRef idx="0">
+            <a:schemeClr val="accent1"/>
+          </a:effectRef>
+          <a:fontRef idx="minor">
+            <a:schemeClr val="lt1"/>
+          </a:fontRef>
+        </p:style>
+        <p:txBody>
+          <a:bodyPr vert="vert270" rtlCol="0" anchor="ctr"/>
+          <a:lstStyle/>
+          <a:p>
+            <a:pPr algn="ctr"/>
+            <a:r>
+              <a:rPr lang="fr-FR" sz="2100" cap="all" dirty="0" smtClean="0"/>
+              <a:t>Serveur Scala</a:t>
+            </a:r>
+            <a:endParaRPr lang="fr-FR" sz="2100" dirty="0"/>
+          </a:p>
+        </p:txBody>
+      </p:sp>
+      <p:sp>
+        <p:nvSpPr>
+          <p:cNvPr id="20" name="Rectangle à coins arrondis 19"/>
+          <p:cNvSpPr/>
+          <p:nvPr/>
+        </p:nvSpPr>
+        <p:spPr>
+          <a:xfrm>
+            <a:off x="4879848" y="1677183"/>
+            <a:ext cx="1008060" cy="488405"/>
+          </a:xfrm>
+          <a:prstGeom prst="roundRect">
+            <a:avLst/>
+          </a:prstGeom>
+        </p:spPr>
+        <p:style>
+          <a:lnRef idx="2">
+            <a:schemeClr val="accent1">
+              <a:shade val="50000"/>
+            </a:schemeClr>
+          </a:lnRef>
+          <a:fillRef idx="1">
+            <a:schemeClr val="accent1"/>
+          </a:fillRef>
+          <a:effectRef idx="0">
+            <a:schemeClr val="accent1"/>
+          </a:effectRef>
+          <a:fontRef idx="minor">
+            <a:schemeClr val="lt1"/>
+          </a:fontRef>
+        </p:style>
+        <p:txBody>
+          <a:bodyPr rtlCol="0" anchor="ctr"/>
+          <a:lstStyle/>
+          <a:p>
+            <a:pPr algn="ctr"/>
+            <a:r>
+              <a:rPr lang="fr-FR" dirty="0"/>
+              <a:t>API</a:t>
+            </a:r>
+          </a:p>
+        </p:txBody>
+      </p:sp>
+      <p:sp>
+        <p:nvSpPr>
+          <p:cNvPr id="21" name="Rectangle à coins arrondis 20"/>
+          <p:cNvSpPr/>
+          <p:nvPr/>
+        </p:nvSpPr>
+        <p:spPr>
+          <a:xfrm>
+            <a:off x="4879848" y="2565872"/>
+            <a:ext cx="1008060" cy="488405"/>
+          </a:xfrm>
+          <a:prstGeom prst="roundRect">
+            <a:avLst/>
+          </a:prstGeom>
+        </p:spPr>
+        <p:style>
+          <a:lnRef idx="2">
+            <a:schemeClr val="accent1">
+              <a:shade val="50000"/>
+            </a:schemeClr>
+          </a:lnRef>
+          <a:fillRef idx="1">
+            <a:schemeClr val="accent1"/>
+          </a:fillRef>
+          <a:effectRef idx="0">
+            <a:schemeClr val="accent1"/>
+          </a:effectRef>
+          <a:fontRef idx="minor">
+            <a:schemeClr val="lt1"/>
+          </a:fontRef>
+        </p:style>
+        <p:txBody>
+          <a:bodyPr rtlCol="0" anchor="ctr"/>
+          <a:lstStyle/>
+          <a:p>
+            <a:pPr algn="ctr"/>
+            <a:r>
+              <a:rPr lang="fr-FR"/>
+              <a:t>API</a:t>
+            </a:r>
+            <a:endParaRPr lang="fr-FR" dirty="0"/>
+          </a:p>
+        </p:txBody>
+      </p:sp>
+      <p:sp>
+        <p:nvSpPr>
+          <p:cNvPr id="22" name="Rectangle à coins arrondis 21"/>
+          <p:cNvSpPr/>
+          <p:nvPr/>
+        </p:nvSpPr>
+        <p:spPr>
+          <a:xfrm>
+            <a:off x="4875515" y="3454561"/>
+            <a:ext cx="1008060" cy="488405"/>
+          </a:xfrm>
+          <a:prstGeom prst="roundRect">
+            <a:avLst/>
+          </a:prstGeom>
+        </p:spPr>
+        <p:style>
+          <a:lnRef idx="2">
+            <a:schemeClr val="accent1">
+              <a:shade val="50000"/>
+            </a:schemeClr>
+          </a:lnRef>
+          <a:fillRef idx="1">
+            <a:schemeClr val="accent1"/>
+          </a:fillRef>
+          <a:effectRef idx="0">
+            <a:schemeClr val="accent1"/>
+          </a:effectRef>
+          <a:fontRef idx="minor">
+            <a:schemeClr val="lt1"/>
+          </a:fontRef>
+        </p:style>
+        <p:txBody>
+          <a:bodyPr rtlCol="0" anchor="ctr"/>
+          <a:lstStyle/>
+          <a:p>
+            <a:pPr algn="ctr"/>
+            <a:r>
+              <a:rPr lang="fr-FR"/>
+              <a:t>API</a:t>
+            </a:r>
+            <a:endParaRPr lang="fr-FR" dirty="0"/>
+          </a:p>
+        </p:txBody>
+      </p:sp>
+      <p:sp>
+        <p:nvSpPr>
+          <p:cNvPr id="25" name="Rectangle à coins arrondis 24"/>
+          <p:cNvSpPr/>
+          <p:nvPr/>
+        </p:nvSpPr>
+        <p:spPr>
+          <a:xfrm>
+            <a:off x="4858332" y="788494"/>
+            <a:ext cx="1008060" cy="488405"/>
+          </a:xfrm>
+          <a:prstGeom prst="roundRect">
+            <a:avLst/>
+          </a:prstGeom>
+        </p:spPr>
+        <p:style>
+          <a:lnRef idx="2">
+            <a:schemeClr val="accent1">
+              <a:shade val="50000"/>
+            </a:schemeClr>
+          </a:lnRef>
+          <a:fillRef idx="1">
+            <a:schemeClr val="accent1"/>
+          </a:fillRef>
+          <a:effectRef idx="0">
+            <a:schemeClr val="accent1"/>
+          </a:effectRef>
+          <a:fontRef idx="minor">
+            <a:schemeClr val="lt1"/>
+          </a:fontRef>
+        </p:style>
+        <p:txBody>
+          <a:bodyPr rtlCol="0" anchor="ctr"/>
+          <a:lstStyle/>
+          <a:p>
+            <a:pPr algn="ctr"/>
+            <a:r>
+              <a:rPr lang="fr-FR" dirty="0" smtClean="0"/>
+              <a:t>API</a:t>
+            </a:r>
+            <a:endParaRPr lang="fr-FR" dirty="0"/>
+          </a:p>
+        </p:txBody>
+      </p:sp>
+      <p:sp>
+        <p:nvSpPr>
+          <p:cNvPr id="28" name="Rectangle à coins arrondis 27"/>
+          <p:cNvSpPr/>
+          <p:nvPr/>
+        </p:nvSpPr>
+        <p:spPr>
+          <a:xfrm>
+            <a:off x="4881392" y="4343250"/>
+            <a:ext cx="1008060" cy="488405"/>
+          </a:xfrm>
+          <a:prstGeom prst="roundRect">
+            <a:avLst/>
+          </a:prstGeom>
+        </p:spPr>
+        <p:style>
+          <a:lnRef idx="2">
+            <a:schemeClr val="accent1">
+              <a:shade val="50000"/>
+            </a:schemeClr>
+          </a:lnRef>
+          <a:fillRef idx="1">
+            <a:schemeClr val="accent1"/>
+          </a:fillRef>
+          <a:effectRef idx="0">
+            <a:schemeClr val="accent1"/>
+          </a:effectRef>
+          <a:fontRef idx="minor">
+            <a:schemeClr val="lt1"/>
+          </a:fontRef>
+        </p:style>
+        <p:txBody>
+          <a:bodyPr rtlCol="0" anchor="ctr"/>
+          <a:lstStyle/>
+          <a:p>
+            <a:pPr algn="ctr"/>
+            <a:r>
+              <a:rPr lang="fr-FR"/>
+              <a:t>API</a:t>
+            </a:r>
+            <a:endParaRPr lang="fr-FR" dirty="0"/>
+          </a:p>
+        </p:txBody>
+      </p:sp>
+      <p:sp>
+        <p:nvSpPr>
+          <p:cNvPr id="29" name="Rectangle à coins arrondis 28"/>
+          <p:cNvSpPr/>
+          <p:nvPr/>
+        </p:nvSpPr>
+        <p:spPr>
+          <a:xfrm>
+            <a:off x="4879848" y="5231941"/>
+            <a:ext cx="1008060" cy="488405"/>
+          </a:xfrm>
+          <a:prstGeom prst="roundRect">
+            <a:avLst/>
+          </a:prstGeom>
+        </p:spPr>
+        <p:style>
+          <a:lnRef idx="2">
+            <a:schemeClr val="accent1">
+              <a:shade val="50000"/>
+            </a:schemeClr>
+          </a:lnRef>
+          <a:fillRef idx="1">
+            <a:schemeClr val="accent1"/>
+          </a:fillRef>
+          <a:effectRef idx="0">
+            <a:schemeClr val="accent1"/>
+          </a:effectRef>
+          <a:fontRef idx="minor">
+            <a:schemeClr val="lt1"/>
+          </a:fontRef>
+        </p:style>
+        <p:txBody>
+          <a:bodyPr rtlCol="0" anchor="ctr"/>
+          <a:lstStyle/>
+          <a:p>
+            <a:pPr algn="ctr"/>
+            <a:r>
+              <a:rPr lang="fr-FR"/>
+              <a:t>API</a:t>
+            </a:r>
+            <a:endParaRPr lang="fr-FR" dirty="0"/>
+          </a:p>
+        </p:txBody>
+      </p:sp>
+      <p:cxnSp>
+        <p:nvCxnSpPr>
+          <p:cNvPr id="31" name="Connecteur droit avec flèche 30"/>
+          <p:cNvCxnSpPr/>
+          <p:nvPr/>
+        </p:nvCxnSpPr>
+        <p:spPr>
+          <a:xfrm>
+            <a:off x="1575961" y="2431228"/>
+            <a:ext cx="588596" cy="0"/>
+          </a:xfrm>
+          <a:prstGeom prst="straightConnector1">
+            <a:avLst/>
+          </a:prstGeom>
+          <a:ln w="19050">
+            <a:tailEnd type="triangle"/>
+          </a:ln>
+        </p:spPr>
+        <p:style>
+          <a:lnRef idx="1">
+            <a:schemeClr val="accent1"/>
+          </a:lnRef>
+          <a:fillRef idx="0">
+            <a:schemeClr val="accent1"/>
+          </a:fillRef>
+          <a:effectRef idx="0">
+            <a:schemeClr val="accent1"/>
+          </a:effectRef>
+          <a:fontRef idx="minor">
+            <a:schemeClr val="tx1"/>
+          </a:fontRef>
+        </p:style>
+      </p:cxnSp>
+      <p:cxnSp>
+        <p:nvCxnSpPr>
+          <p:cNvPr id="32" name="Connecteur droit avec flèche 31"/>
+          <p:cNvCxnSpPr/>
+          <p:nvPr/>
+        </p:nvCxnSpPr>
+        <p:spPr>
+          <a:xfrm>
+            <a:off x="1575961" y="2601784"/>
+            <a:ext cx="588596" cy="0"/>
+          </a:xfrm>
+          <a:prstGeom prst="straightConnector1">
+            <a:avLst/>
+          </a:prstGeom>
+          <a:ln w="19050">
+            <a:tailEnd type="triangle"/>
+          </a:ln>
+        </p:spPr>
+        <p:style>
+          <a:lnRef idx="1">
+            <a:schemeClr val="accent1"/>
+          </a:lnRef>
+          <a:fillRef idx="0">
+            <a:schemeClr val="accent1"/>
+          </a:fillRef>
+          <a:effectRef idx="0">
+            <a:schemeClr val="accent1"/>
+          </a:effectRef>
+          <a:fontRef idx="minor">
+            <a:schemeClr val="tx1"/>
+          </a:fontRef>
+        </p:style>
+      </p:cxnSp>
+      <p:cxnSp>
+        <p:nvCxnSpPr>
+          <p:cNvPr id="33" name="Connecteur droit avec flèche 32"/>
+          <p:cNvCxnSpPr/>
+          <p:nvPr/>
+        </p:nvCxnSpPr>
+        <p:spPr>
+          <a:xfrm>
+            <a:off x="1575961" y="2772340"/>
+            <a:ext cx="588596" cy="0"/>
+          </a:xfrm>
+          <a:prstGeom prst="straightConnector1">
+            <a:avLst/>
+          </a:prstGeom>
+          <a:ln w="19050">
+            <a:tailEnd type="triangle"/>
+          </a:ln>
+        </p:spPr>
+        <p:style>
+          <a:lnRef idx="1">
+            <a:schemeClr val="accent1"/>
+          </a:lnRef>
+          <a:fillRef idx="0">
+            <a:schemeClr val="accent1"/>
+          </a:fillRef>
+          <a:effectRef idx="0">
+            <a:schemeClr val="accent1"/>
+          </a:effectRef>
+          <a:fontRef idx="minor">
+            <a:schemeClr val="tx1"/>
+          </a:fontRef>
+        </p:style>
+      </p:cxnSp>
+      <p:cxnSp>
+        <p:nvCxnSpPr>
+          <p:cNvPr id="34" name="Connecteur droit avec flèche 33"/>
+          <p:cNvCxnSpPr/>
+          <p:nvPr/>
+        </p:nvCxnSpPr>
+        <p:spPr>
+          <a:xfrm>
+            <a:off x="1575961" y="2942896"/>
+            <a:ext cx="588596" cy="0"/>
+          </a:xfrm>
+          <a:prstGeom prst="straightConnector1">
+            <a:avLst/>
+          </a:prstGeom>
+          <a:ln w="19050">
+            <a:tailEnd type="triangle"/>
+          </a:ln>
+        </p:spPr>
+        <p:style>
+          <a:lnRef idx="1">
+            <a:schemeClr val="accent1"/>
+          </a:lnRef>
+          <a:fillRef idx="0">
+            <a:schemeClr val="accent1"/>
+          </a:fillRef>
+          <a:effectRef idx="0">
+            <a:schemeClr val="accent1"/>
+          </a:effectRef>
+          <a:fontRef idx="minor">
+            <a:schemeClr val="tx1"/>
+          </a:fontRef>
+        </p:style>
+      </p:cxnSp>
+      <p:cxnSp>
+        <p:nvCxnSpPr>
+          <p:cNvPr id="35" name="Connecteur droit avec flèche 34"/>
+          <p:cNvCxnSpPr/>
+          <p:nvPr/>
+        </p:nvCxnSpPr>
+        <p:spPr>
+          <a:xfrm>
+            <a:off x="1575961" y="3113452"/>
+            <a:ext cx="588596" cy="0"/>
+          </a:xfrm>
+          <a:prstGeom prst="straightConnector1">
+            <a:avLst/>
+          </a:prstGeom>
+          <a:ln w="19050">
+            <a:tailEnd type="triangle"/>
+          </a:ln>
+        </p:spPr>
+        <p:style>
+          <a:lnRef idx="1">
+            <a:schemeClr val="accent1"/>
+          </a:lnRef>
+          <a:fillRef idx="0">
+            <a:schemeClr val="accent1"/>
+          </a:fillRef>
+          <a:effectRef idx="0">
+            <a:schemeClr val="accent1"/>
+          </a:effectRef>
+          <a:fontRef idx="minor">
+            <a:schemeClr val="tx1"/>
+          </a:fontRef>
+        </p:style>
+      </p:cxnSp>
+      <p:cxnSp>
+        <p:nvCxnSpPr>
+          <p:cNvPr id="36" name="Connecteur droit avec flèche 35"/>
+          <p:cNvCxnSpPr/>
+          <p:nvPr/>
+        </p:nvCxnSpPr>
+        <p:spPr>
+          <a:xfrm>
+            <a:off x="1575961" y="3284007"/>
+            <a:ext cx="588596" cy="0"/>
+          </a:xfrm>
+          <a:prstGeom prst="straightConnector1">
+            <a:avLst/>
+          </a:prstGeom>
+          <a:ln w="19050">
+            <a:tailEnd type="triangle"/>
+          </a:ln>
+        </p:spPr>
+        <p:style>
+          <a:lnRef idx="1">
+            <a:schemeClr val="accent1"/>
+          </a:lnRef>
+          <a:fillRef idx="0">
+            <a:schemeClr val="accent1"/>
+          </a:fillRef>
+          <a:effectRef idx="0">
+            <a:schemeClr val="accent1"/>
+          </a:effectRef>
+          <a:fontRef idx="minor">
+            <a:schemeClr val="tx1"/>
+          </a:fontRef>
+        </p:style>
+      </p:cxnSp>
+      <p:cxnSp>
+        <p:nvCxnSpPr>
+          <p:cNvPr id="37" name="Connecteur droit avec flèche 36"/>
+          <p:cNvCxnSpPr/>
+          <p:nvPr/>
+        </p:nvCxnSpPr>
+        <p:spPr>
+          <a:xfrm>
+            <a:off x="1575961" y="3454561"/>
+            <a:ext cx="588596" cy="0"/>
+          </a:xfrm>
+          <a:prstGeom prst="straightConnector1">
+            <a:avLst/>
+          </a:prstGeom>
+          <a:ln w="19050">
+            <a:tailEnd type="triangle"/>
+          </a:ln>
+        </p:spPr>
+        <p:style>
+          <a:lnRef idx="1">
+            <a:schemeClr val="accent1"/>
+          </a:lnRef>
+          <a:fillRef idx="0">
+            <a:schemeClr val="accent1"/>
+          </a:fillRef>
+          <a:effectRef idx="0">
+            <a:schemeClr val="accent1"/>
+          </a:effectRef>
+          <a:fontRef idx="minor">
+            <a:schemeClr val="tx1"/>
+          </a:fontRef>
+        </p:style>
+      </p:cxnSp>
+      <p:cxnSp>
+        <p:nvCxnSpPr>
+          <p:cNvPr id="38" name="Connecteur droit avec flèche 37"/>
+          <p:cNvCxnSpPr>
+            <a:stCxn id="14" idx="3"/>
+            <a:endCxn id="18" idx="1"/>
+          </p:cNvCxnSpPr>
+          <p:nvPr/>
+        </p:nvCxnSpPr>
+        <p:spPr>
+          <a:xfrm>
+            <a:off x="2762475" y="3243430"/>
+            <a:ext cx="524052" cy="0"/>
+          </a:xfrm>
+          <a:prstGeom prst="straightConnector1">
+            <a:avLst/>
+          </a:prstGeom>
+          <a:ln w="19050">
+            <a:tailEnd type="triangle"/>
+          </a:ln>
+        </p:spPr>
+        <p:style>
+          <a:lnRef idx="1">
+            <a:schemeClr val="accent1"/>
+          </a:lnRef>
+          <a:fillRef idx="0">
+            <a:schemeClr val="accent1"/>
+          </a:fillRef>
+          <a:effectRef idx="0">
+            <a:schemeClr val="accent1"/>
+          </a:effectRef>
+          <a:fontRef idx="minor">
+            <a:schemeClr val="tx1"/>
+          </a:fontRef>
+        </p:style>
+      </p:cxnSp>
+      <p:cxnSp>
+        <p:nvCxnSpPr>
+          <p:cNvPr id="43" name="Connecteur droit avec flèche 42"/>
+          <p:cNvCxnSpPr/>
+          <p:nvPr/>
+        </p:nvCxnSpPr>
+        <p:spPr>
+          <a:xfrm>
+            <a:off x="1575961" y="3617718"/>
+            <a:ext cx="588596" cy="0"/>
+          </a:xfrm>
+          <a:prstGeom prst="straightConnector1">
+            <a:avLst/>
+          </a:prstGeom>
+          <a:ln w="19050">
+            <a:tailEnd type="triangle"/>
+          </a:ln>
+        </p:spPr>
+        <p:style>
+          <a:lnRef idx="1">
+            <a:schemeClr val="accent1"/>
+          </a:lnRef>
+          <a:fillRef idx="0">
+            <a:schemeClr val="accent1"/>
+          </a:fillRef>
+          <a:effectRef idx="0">
+            <a:schemeClr val="accent1"/>
+          </a:effectRef>
+          <a:fontRef idx="minor">
+            <a:schemeClr val="tx1"/>
+          </a:fontRef>
+        </p:style>
+      </p:cxnSp>
+      <p:cxnSp>
+        <p:nvCxnSpPr>
+          <p:cNvPr id="44" name="Connecteur droit avec flèche 43"/>
+          <p:cNvCxnSpPr/>
+          <p:nvPr/>
+        </p:nvCxnSpPr>
+        <p:spPr>
+          <a:xfrm flipV="1">
+            <a:off x="3884445" y="1011220"/>
+            <a:ext cx="973887" cy="796065"/>
+          </a:xfrm>
+          <a:prstGeom prst="straightConnector1">
+            <a:avLst/>
+          </a:prstGeom>
+          <a:ln w="19050">
+            <a:tailEnd type="triangle"/>
+          </a:ln>
+        </p:spPr>
+        <p:style>
+          <a:lnRef idx="1">
+            <a:schemeClr val="accent1"/>
+          </a:lnRef>
+          <a:fillRef idx="0">
+            <a:schemeClr val="accent1"/>
+          </a:fillRef>
+          <a:effectRef idx="0">
+            <a:schemeClr val="accent1"/>
+          </a:effectRef>
+          <a:fontRef idx="minor">
+            <a:schemeClr val="tx1"/>
+          </a:fontRef>
+        </p:style>
+      </p:cxnSp>
+      <p:cxnSp>
+        <p:nvCxnSpPr>
+          <p:cNvPr id="49" name="Connecteur droit avec flèche 48"/>
+          <p:cNvCxnSpPr>
+            <a:endCxn id="20" idx="1"/>
+          </p:cNvCxnSpPr>
+          <p:nvPr/>
+        </p:nvCxnSpPr>
+        <p:spPr>
+          <a:xfrm>
+            <a:off x="3905961" y="1807285"/>
+            <a:ext cx="973887" cy="114101"/>
+          </a:xfrm>
+          <a:prstGeom prst="straightConnector1">
+            <a:avLst/>
+          </a:prstGeom>
+          <a:ln w="19050">
+            <a:tailEnd type="triangle"/>
+          </a:ln>
+        </p:spPr>
+        <p:style>
+          <a:lnRef idx="1">
+            <a:schemeClr val="accent1"/>
+          </a:lnRef>
+          <a:fillRef idx="0">
+            <a:schemeClr val="accent1"/>
+          </a:fillRef>
+          <a:effectRef idx="0">
+            <a:schemeClr val="accent1"/>
+          </a:effectRef>
+          <a:fontRef idx="minor">
+            <a:schemeClr val="tx1"/>
+          </a:fontRef>
+        </p:style>
+      </p:cxnSp>
+      <p:cxnSp>
+        <p:nvCxnSpPr>
+          <p:cNvPr id="52" name="Connecteur droit avec flèche 51"/>
+          <p:cNvCxnSpPr>
+            <a:endCxn id="21" idx="1"/>
+          </p:cNvCxnSpPr>
+          <p:nvPr/>
+        </p:nvCxnSpPr>
+        <p:spPr>
+          <a:xfrm>
+            <a:off x="3905961" y="1807285"/>
+            <a:ext cx="973887" cy="1002790"/>
+          </a:xfrm>
+          <a:prstGeom prst="straightConnector1">
+            <a:avLst/>
+          </a:prstGeom>
+          <a:ln w="19050">
+            <a:tailEnd type="triangle"/>
+          </a:ln>
+        </p:spPr>
+        <p:style>
+          <a:lnRef idx="1">
+            <a:schemeClr val="accent1"/>
+          </a:lnRef>
+          <a:fillRef idx="0">
+            <a:schemeClr val="accent1"/>
+          </a:fillRef>
+          <a:effectRef idx="0">
+            <a:schemeClr val="accent1"/>
+          </a:effectRef>
+          <a:fontRef idx="minor">
+            <a:schemeClr val="tx1"/>
+          </a:fontRef>
+        </p:style>
+      </p:cxnSp>
+      <p:cxnSp>
+        <p:nvCxnSpPr>
+          <p:cNvPr id="55" name="Connecteur droit avec flèche 54"/>
+          <p:cNvCxnSpPr/>
+          <p:nvPr/>
+        </p:nvCxnSpPr>
+        <p:spPr>
+          <a:xfrm>
+            <a:off x="3871788" y="2429979"/>
+            <a:ext cx="986544" cy="401888"/>
+          </a:xfrm>
+          <a:prstGeom prst="straightConnector1">
+            <a:avLst/>
+          </a:prstGeom>
+          <a:ln w="19050">
+            <a:tailEnd type="triangle"/>
+          </a:ln>
+        </p:spPr>
+        <p:style>
+          <a:lnRef idx="1">
+            <a:schemeClr val="accent1"/>
+          </a:lnRef>
+          <a:fillRef idx="0">
+            <a:schemeClr val="accent1"/>
+          </a:fillRef>
+          <a:effectRef idx="0">
+            <a:schemeClr val="accent1"/>
+          </a:effectRef>
+          <a:fontRef idx="minor">
+            <a:schemeClr val="tx1"/>
+          </a:fontRef>
+        </p:style>
+      </p:cxnSp>
+      <p:cxnSp>
+        <p:nvCxnSpPr>
+          <p:cNvPr id="58" name="Connecteur droit avec flèche 57"/>
+          <p:cNvCxnSpPr>
+            <a:endCxn id="22" idx="1"/>
+          </p:cNvCxnSpPr>
+          <p:nvPr/>
+        </p:nvCxnSpPr>
+        <p:spPr>
+          <a:xfrm>
+            <a:off x="3871788" y="2451771"/>
+            <a:ext cx="1003727" cy="1246993"/>
+          </a:xfrm>
+          <a:prstGeom prst="straightConnector1">
+            <a:avLst/>
+          </a:prstGeom>
+          <a:ln w="19050">
+            <a:tailEnd type="triangle"/>
+          </a:ln>
+        </p:spPr>
+        <p:style>
+          <a:lnRef idx="1">
+            <a:schemeClr val="accent1"/>
+          </a:lnRef>
+          <a:fillRef idx="0">
+            <a:schemeClr val="accent1"/>
+          </a:fillRef>
+          <a:effectRef idx="0">
+            <a:schemeClr val="accent1"/>
+          </a:effectRef>
+          <a:fontRef idx="minor">
+            <a:schemeClr val="tx1"/>
+          </a:fontRef>
+        </p:style>
+      </p:cxnSp>
+      <p:cxnSp>
+        <p:nvCxnSpPr>
+          <p:cNvPr id="63" name="Connecteur droit avec flèche 62"/>
+          <p:cNvCxnSpPr>
+            <a:endCxn id="29" idx="1"/>
+          </p:cNvCxnSpPr>
+          <p:nvPr/>
+        </p:nvCxnSpPr>
+        <p:spPr>
+          <a:xfrm>
+            <a:off x="3905961" y="4839612"/>
+            <a:ext cx="973887" cy="636532"/>
+          </a:xfrm>
+          <a:prstGeom prst="straightConnector1">
+            <a:avLst/>
+          </a:prstGeom>
+          <a:ln w="19050">
+            <a:tailEnd type="triangle"/>
+          </a:ln>
+        </p:spPr>
+        <p:style>
+          <a:lnRef idx="1">
+            <a:schemeClr val="accent1"/>
+          </a:lnRef>
+          <a:fillRef idx="0">
+            <a:schemeClr val="accent1"/>
+          </a:fillRef>
+          <a:effectRef idx="0">
+            <a:schemeClr val="accent1"/>
+          </a:effectRef>
+          <a:fontRef idx="minor">
+            <a:schemeClr val="tx1"/>
+          </a:fontRef>
+        </p:style>
+      </p:cxnSp>
+      <p:cxnSp>
+        <p:nvCxnSpPr>
+          <p:cNvPr id="66" name="Connecteur droit avec flèche 65"/>
+          <p:cNvCxnSpPr/>
+          <p:nvPr/>
+        </p:nvCxnSpPr>
+        <p:spPr>
+          <a:xfrm flipV="1">
+            <a:off x="3905961" y="4595410"/>
+            <a:ext cx="969554" cy="244202"/>
+          </a:xfrm>
+          <a:prstGeom prst="straightConnector1">
+            <a:avLst/>
+          </a:prstGeom>
+          <a:ln w="19050">
+            <a:tailEnd type="triangle"/>
+          </a:ln>
+        </p:spPr>
+        <p:style>
+          <a:lnRef idx="1">
+            <a:schemeClr val="accent1"/>
+          </a:lnRef>
+          <a:fillRef idx="0">
+            <a:schemeClr val="accent1"/>
+          </a:fillRef>
+          <a:effectRef idx="0">
+            <a:schemeClr val="accent1"/>
+          </a:effectRef>
+          <a:fontRef idx="minor">
+            <a:schemeClr val="tx1"/>
+          </a:fontRef>
+        </p:style>
+      </p:cxnSp>
+      <p:cxnSp>
+        <p:nvCxnSpPr>
+          <p:cNvPr id="69" name="Connecteur droit avec flèche 68"/>
+          <p:cNvCxnSpPr>
+            <a:endCxn id="22" idx="1"/>
+          </p:cNvCxnSpPr>
+          <p:nvPr/>
+        </p:nvCxnSpPr>
+        <p:spPr>
+          <a:xfrm flipV="1">
+            <a:off x="3886611" y="3698764"/>
+            <a:ext cx="988904" cy="1140848"/>
+          </a:xfrm>
+          <a:prstGeom prst="straightConnector1">
+            <a:avLst/>
+          </a:prstGeom>
+          <a:ln w="19050">
+            <a:tailEnd type="triangle"/>
+          </a:ln>
+        </p:spPr>
+        <p:style>
+          <a:lnRef idx="1">
+            <a:schemeClr val="accent1"/>
+          </a:lnRef>
+          <a:fillRef idx="0">
+            <a:schemeClr val="accent1"/>
+          </a:fillRef>
+          <a:effectRef idx="0">
+            <a:schemeClr val="accent1"/>
+          </a:effectRef>
+          <a:fontRef idx="minor">
+            <a:schemeClr val="tx1"/>
+          </a:fontRef>
+        </p:style>
+      </p:cxnSp>
+      <p:cxnSp>
+        <p:nvCxnSpPr>
+          <p:cNvPr id="72" name="Connecteur droit avec flèche 71"/>
+          <p:cNvCxnSpPr/>
+          <p:nvPr/>
+        </p:nvCxnSpPr>
+        <p:spPr>
+          <a:xfrm flipV="1">
+            <a:off x="3902991" y="2831867"/>
+            <a:ext cx="970358" cy="785851"/>
+          </a:xfrm>
+          <a:prstGeom prst="straightConnector1">
+            <a:avLst/>
+          </a:prstGeom>
+          <a:ln w="19050">
+            <a:tailEnd type="triangle"/>
+          </a:ln>
+        </p:spPr>
+        <p:style>
+          <a:lnRef idx="1">
+            <a:schemeClr val="accent1"/>
+          </a:lnRef>
+          <a:fillRef idx="0">
+            <a:schemeClr val="accent1"/>
+          </a:fillRef>
+          <a:effectRef idx="0">
+            <a:schemeClr val="accent1"/>
+          </a:effectRef>
+          <a:fontRef idx="minor">
+            <a:schemeClr val="tx1"/>
+          </a:fontRef>
+        </p:style>
+      </p:cxnSp>
+      <p:cxnSp>
+        <p:nvCxnSpPr>
+          <p:cNvPr id="76" name="Connecteur droit avec flèche 75"/>
+          <p:cNvCxnSpPr/>
+          <p:nvPr/>
+        </p:nvCxnSpPr>
+        <p:spPr>
+          <a:xfrm>
+            <a:off x="3900825" y="3633768"/>
+            <a:ext cx="957507" cy="64995"/>
+          </a:xfrm>
+          <a:prstGeom prst="straightConnector1">
+            <a:avLst/>
+          </a:prstGeom>
+          <a:ln w="19050">
+            <a:tailEnd type="triangle"/>
+          </a:ln>
+        </p:spPr>
+        <p:style>
+          <a:lnRef idx="1">
+            <a:schemeClr val="accent1"/>
+          </a:lnRef>
+          <a:fillRef idx="0">
+            <a:schemeClr val="accent1"/>
+          </a:fillRef>
+          <a:effectRef idx="0">
+            <a:schemeClr val="accent1"/>
+          </a:effectRef>
+          <a:fontRef idx="minor">
+            <a:schemeClr val="tx1"/>
+          </a:fontRef>
+        </p:style>
+      </p:cxnSp>
     </p:spTree>
     <p:extLst>
       <p:ext uri="{BB962C8B-B14F-4D97-AF65-F5344CB8AC3E}">
@@ -6249,7 +7062,7 @@
           <p:cNvPr id="5" name="Image 4">
             <a:extLst>
               <a:ext uri="{FF2B5EF4-FFF2-40B4-BE49-F238E27FC236}">
-                <a16:creationId xmlns="" xmlns:a16="http://schemas.microsoft.com/office/drawing/2014/main" id="{D91F6CE4-A0FB-4282-9B85-47FA5527C736}"/>
+                <a16:creationId xmlns:a16="http://schemas.microsoft.com/office/drawing/2014/main" id="{D91F6CE4-A0FB-4282-9B85-47FA5527C736}"/>
               </a:ext>
             </a:extLst>
           </p:cNvPr>
@@ -6285,7 +7098,7 @@
           <p:cNvPr id="6" name="Image 5">
             <a:extLst>
               <a:ext uri="{FF2B5EF4-FFF2-40B4-BE49-F238E27FC236}">
-                <a16:creationId xmlns="" xmlns:a16="http://schemas.microsoft.com/office/drawing/2014/main" id="{B6F51BA5-E830-46D2-B1E2-3A2C10F760E7}"/>
+                <a16:creationId xmlns:a16="http://schemas.microsoft.com/office/drawing/2014/main" id="{B6F51BA5-E830-46D2-B1E2-3A2C10F760E7}"/>
               </a:ext>
             </a:extLst>
           </p:cNvPr>
@@ -6318,89 +7131,195 @@
       </p:pic>
       <p:sp>
         <p:nvSpPr>
-          <p:cNvPr id="2" name="ZoneTexte 1"/>
-          <p:cNvSpPr txBox="1"/>
+          <p:cNvPr id="2" name="Rectangle 1"/>
+          <p:cNvSpPr/>
           <p:nvPr/>
         </p:nvSpPr>
         <p:spPr>
           <a:xfrm>
-            <a:off x="1711423" y="384464"/>
-            <a:ext cx="7673254" cy="1477328"/>
+            <a:off x="1036318" y="340233"/>
+            <a:ext cx="8717281" cy="1477328"/>
           </a:xfrm>
           <a:prstGeom prst="rect">
             <a:avLst/>
           </a:prstGeom>
-          <a:noFill/>
-        </p:spPr>
-        <p:txBody>
-          <a:bodyPr wrap="square" rtlCol="0">
+        </p:spPr>
+        <p:txBody>
+          <a:bodyPr wrap="square">
             <a:spAutoFit/>
           </a:bodyPr>
           <a:lstStyle/>
           <a:p>
-            <a:r>
-              <a:rPr lang="fr-FR" u="sng" dirty="0" smtClean="0"/>
-              <a:t>Problème(s)</a:t>
-            </a:r>
-            <a:r>
-              <a:rPr lang="fr-FR" dirty="0" smtClean="0"/>
-              <a:t> : </a:t>
-            </a:r>
-          </a:p>
-          <a:p>
             <a:pPr marL="285750" indent="-285750">
-              <a:buFontTx/>
-              <a:buChar char="-"/>
+              <a:buFont typeface="Courier New" panose="02070309020205020404" pitchFamily="49" charset="0"/>
+              <a:buChar char="o"/>
             </a:pPr>
             <a:r>
-              <a:rPr lang="fr-FR" dirty="0" smtClean="0"/>
-              <a:t>Code du serveur très ancien, développé de façon anarchique</a:t>
-            </a:r>
-          </a:p>
+              <a:rPr lang="fr-FR" dirty="0" smtClean="0">
+                <a:sym typeface="Wingdings" panose="05000000000000000000" pitchFamily="2" charset="2"/>
+              </a:rPr>
+              <a:t>Problèmes :</a:t>
+            </a:r>
+          </a:p>
+          <a:p>
+            <a:pPr marL="742950" lvl="1" indent="-285750">
+              <a:buFont typeface="Arial" panose="020B0604020202020204" pitchFamily="34" charset="0"/>
+              <a:buChar char="•"/>
+            </a:pPr>
+            <a:r>
+              <a:rPr lang="fr-FR" dirty="0" smtClean="0">
+                <a:sym typeface="Wingdings" panose="05000000000000000000" pitchFamily="2" charset="2"/>
+              </a:rPr>
+              <a:t>Serveur </a:t>
+            </a:r>
+            <a:r>
+              <a:rPr lang="fr-FR" dirty="0">
+                <a:sym typeface="Wingdings" panose="05000000000000000000" pitchFamily="2" charset="2"/>
+              </a:rPr>
+              <a:t>monolithique</a:t>
+            </a:r>
+          </a:p>
+          <a:p>
+            <a:pPr marL="742950" lvl="1" indent="-285750">
+              <a:buFont typeface="Arial" panose="020B0604020202020204" pitchFamily="34" charset="0"/>
+              <a:buChar char="•"/>
+            </a:pPr>
+            <a:r>
+              <a:rPr lang="fr-FR" dirty="0">
+                <a:sym typeface="Wingdings" panose="05000000000000000000" pitchFamily="2" charset="2"/>
+              </a:rPr>
+              <a:t>Lourd</a:t>
+            </a:r>
+          </a:p>
+          <a:p>
+            <a:pPr marL="742950" lvl="1" indent="-285750">
+              <a:buFont typeface="Arial" panose="020B0604020202020204" pitchFamily="34" charset="0"/>
+              <a:buChar char="•"/>
+            </a:pPr>
+            <a:r>
+              <a:rPr lang="fr-FR" dirty="0">
+                <a:sym typeface="Wingdings" panose="05000000000000000000" pitchFamily="2" charset="2"/>
+              </a:rPr>
+              <a:t>Globalement fiable, mais peu </a:t>
+            </a:r>
+            <a:r>
+              <a:rPr lang="fr-FR" dirty="0" smtClean="0">
+                <a:sym typeface="Wingdings" panose="05000000000000000000" pitchFamily="2" charset="2"/>
+              </a:rPr>
+              <a:t>maintenable, messages d’erreur et logs illisibles</a:t>
+            </a:r>
+            <a:endParaRPr lang="fr-FR" dirty="0">
+              <a:sym typeface="Wingdings" panose="05000000000000000000" pitchFamily="2" charset="2"/>
+            </a:endParaRPr>
+          </a:p>
+          <a:p>
+            <a:pPr marL="742950" lvl="1" indent="-285750">
+              <a:buFont typeface="Arial" panose="020B0604020202020204" pitchFamily="34" charset="0"/>
+              <a:buChar char="•"/>
+            </a:pPr>
+            <a:r>
+              <a:rPr lang="fr-FR" dirty="0">
+                <a:sym typeface="Wingdings" panose="05000000000000000000" pitchFamily="2" charset="2"/>
+              </a:rPr>
+              <a:t>Projet « hors-norme »</a:t>
+            </a:r>
+            <a:endParaRPr lang="fr-FR" dirty="0"/>
+          </a:p>
+        </p:txBody>
+      </p:sp>
+      <p:sp>
+        <p:nvSpPr>
+          <p:cNvPr id="7" name="Rectangle 6"/>
+          <p:cNvSpPr/>
+          <p:nvPr/>
+        </p:nvSpPr>
+        <p:spPr>
+          <a:xfrm>
+            <a:off x="1036319" y="2041734"/>
+            <a:ext cx="6096000" cy="1477328"/>
+          </a:xfrm>
+          <a:prstGeom prst="rect">
+            <a:avLst/>
+          </a:prstGeom>
+        </p:spPr>
+        <p:txBody>
+          <a:bodyPr>
+            <a:spAutoFit/>
+          </a:bodyPr>
+          <a:lstStyle/>
           <a:p>
             <a:pPr marL="285750" indent="-285750">
-              <a:buFontTx/>
-              <a:buChar char="-"/>
+              <a:buFont typeface="Courier New" panose="02070309020205020404" pitchFamily="49" charset="0"/>
+              <a:buChar char="o"/>
             </a:pPr>
             <a:r>
-              <a:rPr lang="fr-FR" dirty="0" smtClean="0"/>
-              <a:t>Langage ésotérique, non maintenu, pas de ressource capable de le maintenir</a:t>
-            </a:r>
-          </a:p>
-          <a:p>
-            <a:pPr marL="285750" indent="-285750">
-              <a:buFontTx/>
-              <a:buChar char="-"/>
+              <a:rPr lang="fr-FR" dirty="0" smtClean="0">
+                <a:sym typeface="Wingdings" panose="05000000000000000000" pitchFamily="2" charset="2"/>
+              </a:rPr>
+              <a:t>But recherché :</a:t>
+            </a:r>
+          </a:p>
+          <a:p>
+            <a:pPr marL="742950" lvl="1" indent="-285750">
+              <a:buFont typeface="Arial" panose="020B0604020202020204" pitchFamily="34" charset="0"/>
+              <a:buChar char="•"/>
             </a:pPr>
             <a:r>
-              <a:rPr lang="fr-FR" dirty="0" smtClean="0"/>
-              <a:t>Serveur </a:t>
-            </a:r>
-            <a:r>
-              <a:rPr lang="fr-FR" dirty="0" err="1" smtClean="0"/>
-              <a:t>logiciellement</a:t>
-            </a:r>
-            <a:r>
-              <a:rPr lang="fr-FR" dirty="0" smtClean="0"/>
-              <a:t> à la limite de ses capacité</a:t>
-            </a:r>
-          </a:p>
-          <a:p>
-            <a:pPr marL="285750" indent="-285750">
-              <a:buFontTx/>
-              <a:buChar char="-"/>
+              <a:rPr lang="fr-FR" dirty="0" smtClean="0">
+                <a:sym typeface="Wingdings" panose="05000000000000000000" pitchFamily="2" charset="2"/>
+              </a:rPr>
+              <a:t>Serveur évolutif</a:t>
+            </a:r>
+            <a:endParaRPr lang="fr-FR" dirty="0">
+              <a:sym typeface="Wingdings" panose="05000000000000000000" pitchFamily="2" charset="2"/>
+            </a:endParaRPr>
+          </a:p>
+          <a:p>
+            <a:pPr marL="742950" lvl="1" indent="-285750">
+              <a:buFont typeface="Arial" panose="020B0604020202020204" pitchFamily="34" charset="0"/>
+              <a:buChar char="•"/>
             </a:pPr>
             <a:r>
-              <a:rPr lang="fr-FR" dirty="0" smtClean="0"/>
-              <a:t>Serveur matériellement </a:t>
-            </a:r>
-            <a:r>
-              <a:rPr lang="fr-FR" dirty="0"/>
-              <a:t>à la limite de ses </a:t>
-            </a:r>
-            <a:r>
-              <a:rPr lang="fr-FR" dirty="0" smtClean="0"/>
-              <a:t>capacité</a:t>
+              <a:rPr lang="fr-FR" dirty="0" smtClean="0">
+                <a:sym typeface="Wingdings" panose="05000000000000000000" pitchFamily="2" charset="2"/>
+              </a:rPr>
+              <a:t>Facilement paramétrable</a:t>
+            </a:r>
+            <a:endParaRPr lang="fr-FR" dirty="0">
+              <a:sym typeface="Wingdings" panose="05000000000000000000" pitchFamily="2" charset="2"/>
+            </a:endParaRPr>
+          </a:p>
+          <a:p>
+            <a:pPr marL="742950" lvl="1" indent="-285750">
+              <a:buFont typeface="Arial" panose="020B0604020202020204" pitchFamily="34" charset="0"/>
+              <a:buChar char="•"/>
+            </a:pPr>
+            <a:r>
+              <a:rPr lang="fr-FR" dirty="0" smtClean="0">
+                <a:sym typeface="Wingdings" panose="05000000000000000000" pitchFamily="2" charset="2"/>
+              </a:rPr>
+              <a:t>Fiable</a:t>
+            </a:r>
+            <a:endParaRPr lang="fr-FR" dirty="0">
+              <a:sym typeface="Wingdings" panose="05000000000000000000" pitchFamily="2" charset="2"/>
+            </a:endParaRPr>
+          </a:p>
+          <a:p>
+            <a:pPr marL="742950" lvl="1" indent="-285750">
+              <a:buFont typeface="Arial" panose="020B0604020202020204" pitchFamily="34" charset="0"/>
+              <a:buChar char="•"/>
+            </a:pPr>
+            <a:r>
+              <a:rPr lang="fr-FR" dirty="0">
+                <a:sym typeface="Wingdings" panose="05000000000000000000" pitchFamily="2" charset="2"/>
+              </a:rPr>
+              <a:t>Projet </a:t>
+            </a:r>
+            <a:r>
+              <a:rPr lang="fr-FR" dirty="0" smtClean="0">
+                <a:sym typeface="Wingdings" panose="05000000000000000000" pitchFamily="2" charset="2"/>
+              </a:rPr>
+              <a:t>dans la « norme »</a:t>
             </a:r>
             <a:endParaRPr lang="fr-FR" dirty="0"/>
           </a:p>
@@ -6409,7 +7328,7 @@
     </p:spTree>
     <p:extLst>
       <p:ext uri="{BB962C8B-B14F-4D97-AF65-F5344CB8AC3E}">
-        <p14:creationId xmlns:p14="http://schemas.microsoft.com/office/powerpoint/2010/main" val="2433077676"/>
+        <p14:creationId xmlns:p14="http://schemas.microsoft.com/office/powerpoint/2010/main" val="3806234110"/>
       </p:ext>
     </p:extLst>
   </p:cSld>
@@ -6443,730 +7362,12 @@
           <a:chExt cx="0" cy="0"/>
         </a:xfrm>
       </p:grpSpPr>
-      <p:graphicFrame>
-        <p:nvGraphicFramePr>
-          <p:cNvPr id="4" name="Tableau 3"/>
-          <p:cNvGraphicFramePr>
-            <a:graphicFrameLocks noGrp="1"/>
-          </p:cNvGraphicFramePr>
-          <p:nvPr>
-            <p:extLst>
-              <p:ext uri="{D42A27DB-BD31-4B8C-83A1-F6EECF244321}">
-                <p14:modId xmlns:p14="http://schemas.microsoft.com/office/powerpoint/2010/main" val="3588927719"/>
-              </p:ext>
-            </p:extLst>
-          </p:nvPr>
-        </p:nvGraphicFramePr>
-        <p:xfrm>
-          <a:off x="293615" y="279002"/>
-          <a:ext cx="11702643" cy="6309360"/>
-        </p:xfrm>
-        <a:graphic>
-          <a:graphicData uri="http://schemas.openxmlformats.org/drawingml/2006/table">
-            <a:tbl>
-              <a:tblPr firstRow="1" bandRow="1">
-                <a:tableStyleId>{5C22544A-7EE6-4342-B048-85BDC9FD1C3A}</a:tableStyleId>
-              </a:tblPr>
-              <a:tblGrid>
-                <a:gridCol w="2636621"/>
-                <a:gridCol w="4343400"/>
-                <a:gridCol w="4722622"/>
-              </a:tblGrid>
-              <a:tr h="328424">
-                <a:tc>
-                  <a:txBody>
-                    <a:bodyPr/>
-                    <a:lstStyle/>
-                    <a:p>
-                      <a:pPr algn="ctr"/>
-                      <a:r>
-                        <a:rPr lang="fr-FR" sz="1600" kern="1200" dirty="0" smtClean="0">
-                          <a:solidFill>
-                            <a:schemeClr val="bg1"/>
-                          </a:solidFill>
-                          <a:latin typeface="+mn-lt"/>
-                          <a:ea typeface="+mn-ea"/>
-                          <a:cs typeface="+mn-cs"/>
-                        </a:rPr>
-                        <a:t>Solutions</a:t>
-                      </a:r>
-                      <a:endParaRPr lang="fr-FR" sz="1600" kern="1200" dirty="0">
-                        <a:solidFill>
-                          <a:schemeClr val="bg1"/>
-                        </a:solidFill>
-                        <a:latin typeface="+mn-lt"/>
-                        <a:ea typeface="+mn-ea"/>
-                        <a:cs typeface="+mn-cs"/>
-                      </a:endParaRPr>
-                    </a:p>
-                  </a:txBody>
-                  <a:tcPr/>
-                </a:tc>
-                <a:tc>
-                  <a:txBody>
-                    <a:bodyPr/>
-                    <a:lstStyle/>
-                    <a:p>
-                      <a:pPr algn="ctr"/>
-                      <a:r>
-                        <a:rPr lang="fr-FR" sz="1600" kern="1200" dirty="0" smtClean="0">
-                          <a:solidFill>
-                            <a:schemeClr val="bg1"/>
-                          </a:solidFill>
-                          <a:latin typeface="+mn-lt"/>
-                          <a:ea typeface="+mn-ea"/>
-                          <a:cs typeface="+mn-cs"/>
-                        </a:rPr>
-                        <a:t>Avantages</a:t>
-                      </a:r>
-                      <a:endParaRPr lang="fr-FR" sz="1600" kern="1200" dirty="0">
-                        <a:solidFill>
-                          <a:schemeClr val="bg1"/>
-                        </a:solidFill>
-                        <a:latin typeface="+mn-lt"/>
-                        <a:ea typeface="+mn-ea"/>
-                        <a:cs typeface="+mn-cs"/>
-                      </a:endParaRPr>
-                    </a:p>
-                  </a:txBody>
-                  <a:tcPr/>
-                </a:tc>
-                <a:tc>
-                  <a:txBody>
-                    <a:bodyPr/>
-                    <a:lstStyle/>
-                    <a:p>
-                      <a:pPr algn="ctr"/>
-                      <a:r>
-                        <a:rPr lang="fr-FR" sz="1600" kern="1200" dirty="0" smtClean="0">
-                          <a:solidFill>
-                            <a:schemeClr val="bg1"/>
-                          </a:solidFill>
-                          <a:latin typeface="+mn-lt"/>
-                          <a:ea typeface="+mn-ea"/>
-                          <a:cs typeface="+mn-cs"/>
-                        </a:rPr>
-                        <a:t>Inconvénients</a:t>
-                      </a:r>
-                      <a:endParaRPr lang="fr-FR" sz="1600" kern="1200" dirty="0">
-                        <a:solidFill>
-                          <a:schemeClr val="bg1"/>
-                        </a:solidFill>
-                        <a:latin typeface="+mn-lt"/>
-                        <a:ea typeface="+mn-ea"/>
-                        <a:cs typeface="+mn-cs"/>
-                      </a:endParaRPr>
-                    </a:p>
-                  </a:txBody>
-                  <a:tcPr/>
-                </a:tc>
-              </a:tr>
-              <a:tr h="1247069">
-                <a:tc>
-                  <a:txBody>
-                    <a:bodyPr/>
-                    <a:lstStyle/>
-                    <a:p>
-                      <a:pPr marL="0" marR="0" lvl="0" indent="0" algn="l" defTabSz="914400" rtl="0" eaLnBrk="1" fontAlgn="auto" latinLnBrk="0" hangingPunct="1">
-                        <a:lnSpc>
-                          <a:spcPct val="100000"/>
-                        </a:lnSpc>
-                        <a:spcBef>
-                          <a:spcPts val="0"/>
-                        </a:spcBef>
-                        <a:spcAft>
-                          <a:spcPts val="0"/>
-                        </a:spcAft>
-                        <a:buClrTx/>
-                        <a:buSzTx/>
-                        <a:buFontTx/>
-                        <a:buNone/>
-                        <a:tabLst/>
-                        <a:defRPr/>
-                      </a:pPr>
-                      <a:r>
-                        <a:rPr lang="fr-FR" sz="1600" dirty="0" smtClean="0"/>
-                        <a:t>Refonte one-</a:t>
-                      </a:r>
-                      <a:r>
-                        <a:rPr lang="fr-FR" sz="1600" dirty="0" err="1" smtClean="0"/>
-                        <a:t>shot</a:t>
-                      </a:r>
-                      <a:r>
-                        <a:rPr lang="fr-FR" sz="1600" dirty="0" smtClean="0"/>
-                        <a:t> du code</a:t>
-                      </a:r>
-                      <a:endParaRPr lang="fr-FR" sz="1600" dirty="0"/>
-                    </a:p>
-                  </a:txBody>
-                  <a:tcPr/>
-                </a:tc>
-                <a:tc>
-                  <a:txBody>
-                    <a:bodyPr/>
-                    <a:lstStyle/>
-                    <a:p>
-                      <a:pPr marL="285750" lvl="0" indent="-285750">
-                        <a:buFontTx/>
-                        <a:buChar char="-"/>
-                      </a:pPr>
-                      <a:r>
-                        <a:rPr lang="fr-FR" sz="1600" dirty="0" smtClean="0"/>
-                        <a:t>Mise en place d’une architecture de base et de bonnes pratiques</a:t>
-                      </a:r>
-                    </a:p>
-                    <a:p>
-                      <a:pPr marL="285750" lvl="0" indent="-285750">
-                        <a:buFontTx/>
-                        <a:buChar char="-"/>
-                      </a:pPr>
-                      <a:r>
-                        <a:rPr lang="fr-FR" sz="1600" dirty="0" smtClean="0"/>
-                        <a:t>Les personnes en charge sont impliquées à 100%</a:t>
-                      </a:r>
-                    </a:p>
-                    <a:p>
-                      <a:pPr marL="285750" lvl="0" indent="-285750">
-                        <a:buFontTx/>
-                        <a:buChar char="-"/>
-                      </a:pPr>
-                      <a:r>
-                        <a:rPr lang="fr-FR" sz="1600" dirty="0" smtClean="0"/>
-                        <a:t>Ce qui est fait n’est plus à faire</a:t>
-                      </a:r>
-                      <a:endParaRPr lang="fr-FR" sz="1600" dirty="0"/>
-                    </a:p>
-                  </a:txBody>
-                  <a:tcPr/>
-                </a:tc>
-                <a:tc>
-                  <a:txBody>
-                    <a:bodyPr/>
-                    <a:lstStyle/>
-                    <a:p>
-                      <a:pPr marL="285750" lvl="0" indent="-285750">
-                        <a:buFontTx/>
-                        <a:buChar char="-"/>
-                      </a:pPr>
-                      <a:r>
-                        <a:rPr lang="fr-FR" sz="1600" dirty="0" smtClean="0"/>
-                        <a:t>Obligation de « casser » du code fonctionnel</a:t>
-                      </a:r>
-                    </a:p>
-                    <a:p>
-                      <a:pPr marL="285750" lvl="0" indent="-285750">
-                        <a:buFontTx/>
-                        <a:buChar char="-"/>
-                      </a:pPr>
-                      <a:r>
-                        <a:rPr lang="fr-FR" sz="1600" dirty="0" smtClean="0"/>
-                        <a:t>Les personnes en charge sont impliquées à 100%</a:t>
-                      </a:r>
-                    </a:p>
-                    <a:p>
-                      <a:pPr marL="285750" lvl="0" indent="-285750">
-                        <a:buFontTx/>
-                        <a:buChar char="-"/>
-                      </a:pPr>
-                      <a:r>
-                        <a:rPr lang="fr-FR" sz="1600" dirty="0" smtClean="0"/>
-                        <a:t>Projet long, de plusieurs mois à plusieurs </a:t>
-                      </a:r>
-                      <a:r>
-                        <a:rPr lang="fr-FR" sz="1600" dirty="0" smtClean="0"/>
-                        <a:t>années</a:t>
-                      </a:r>
-                    </a:p>
-                    <a:p>
-                      <a:pPr marL="285750" lvl="0" indent="-285750">
-                        <a:buFontTx/>
-                        <a:buChar char="-"/>
-                      </a:pPr>
-                      <a:r>
-                        <a:rPr lang="fr-FR" sz="1600" dirty="0" smtClean="0"/>
-                        <a:t>Aucune</a:t>
-                      </a:r>
-                      <a:r>
-                        <a:rPr lang="fr-FR" sz="1600" baseline="0" dirty="0" smtClean="0"/>
-                        <a:t> garantie que tout soit iso</a:t>
-                      </a:r>
-                      <a:endParaRPr lang="fr-FR" sz="1600" dirty="0"/>
-                    </a:p>
-                  </a:txBody>
-                  <a:tcPr/>
-                </a:tc>
-              </a:tr>
-              <a:tr h="1711095">
-                <a:tc>
-                  <a:txBody>
-                    <a:bodyPr/>
-                    <a:lstStyle/>
-                    <a:p>
-                      <a:r>
-                        <a:rPr lang="fr-FR" sz="1600" dirty="0" err="1" smtClean="0"/>
-                        <a:t>Load-balancing</a:t>
-                      </a:r>
-                      <a:r>
-                        <a:rPr lang="fr-FR" sz="1600" dirty="0" smtClean="0"/>
-                        <a:t> en amont du serveur</a:t>
-                      </a:r>
-                      <a:endParaRPr lang="fr-FR" sz="1600" dirty="0"/>
-                    </a:p>
-                  </a:txBody>
-                  <a:tcPr/>
-                </a:tc>
-                <a:tc>
-                  <a:txBody>
-                    <a:bodyPr/>
-                    <a:lstStyle/>
-                    <a:p>
-                      <a:pPr marL="285750" lvl="0" indent="-285750">
-                        <a:buFontTx/>
-                        <a:buChar char="-"/>
-                      </a:pPr>
-                      <a:r>
-                        <a:rPr lang="fr-FR" sz="1600" dirty="0" smtClean="0"/>
-                        <a:t>Peut être simple à implémenter</a:t>
-                      </a:r>
-                    </a:p>
-                    <a:p>
-                      <a:pPr marL="285750" lvl="0" indent="-285750">
-                        <a:buFontTx/>
-                        <a:buChar char="-"/>
-                      </a:pPr>
-                      <a:r>
-                        <a:rPr lang="fr-FR" sz="1600" dirty="0" smtClean="0"/>
-                        <a:t>Peut être transparent</a:t>
-                      </a:r>
-                    </a:p>
-                    <a:p>
-                      <a:pPr marL="285750" lvl="0" indent="-285750">
-                        <a:buFontTx/>
-                        <a:buChar char="-"/>
-                      </a:pPr>
-                      <a:r>
-                        <a:rPr lang="fr-FR" sz="1600" dirty="0" smtClean="0"/>
-                        <a:t>Il « suffit » de cloner le serveur autant de fois que </a:t>
-                      </a:r>
-                      <a:r>
-                        <a:rPr lang="fr-FR" sz="1600" dirty="0" smtClean="0"/>
-                        <a:t>nécessaire (machine virtuelle)</a:t>
-                      </a:r>
-                      <a:endParaRPr lang="fr-FR" sz="1600" dirty="0"/>
-                    </a:p>
-                  </a:txBody>
-                  <a:tcPr/>
-                </a:tc>
-                <a:tc>
-                  <a:txBody>
-                    <a:bodyPr/>
-                    <a:lstStyle/>
-                    <a:p>
-                      <a:pPr marL="285750" lvl="0" indent="-285750">
-                        <a:buFontTx/>
-                        <a:buChar char="-"/>
-                      </a:pPr>
-                      <a:r>
-                        <a:rPr lang="fr-FR" sz="1600" dirty="0" smtClean="0"/>
-                        <a:t>Peut-être très complexe à implémenter</a:t>
-                      </a:r>
-                    </a:p>
-                    <a:p>
-                      <a:pPr marL="285750" lvl="0" indent="-285750">
-                        <a:buFontTx/>
-                        <a:buChar char="-"/>
-                      </a:pPr>
-                      <a:r>
-                        <a:rPr lang="fr-FR" sz="1600" dirty="0" smtClean="0"/>
-                        <a:t>Le clonage du serveur peut être très problématique (serveur physique)</a:t>
-                      </a:r>
-                    </a:p>
-                    <a:p>
-                      <a:pPr marL="285750" lvl="0" indent="-285750">
-                        <a:buFontTx/>
-                        <a:buChar char="-"/>
-                      </a:pPr>
-                      <a:r>
-                        <a:rPr lang="fr-FR" sz="1600" dirty="0" smtClean="0"/>
-                        <a:t>Il peut être très compliqué de gérer les pertes de </a:t>
-                      </a:r>
-                      <a:r>
-                        <a:rPr lang="fr-FR" sz="1600" dirty="0" smtClean="0"/>
-                        <a:t>connexions</a:t>
-                      </a:r>
-                    </a:p>
-                    <a:p>
-                      <a:pPr marL="285750" lvl="0" indent="-285750">
-                        <a:buFontTx/>
-                        <a:buChar char="-"/>
-                      </a:pPr>
-                      <a:r>
-                        <a:rPr lang="fr-FR" sz="1600" dirty="0" smtClean="0"/>
-                        <a:t>Implique de mettre à jour</a:t>
-                      </a:r>
-                      <a:r>
-                        <a:rPr lang="fr-FR" sz="1600" baseline="0" dirty="0" smtClean="0"/>
-                        <a:t> toutes les instances</a:t>
-                      </a:r>
-                    </a:p>
-                    <a:p>
-                      <a:pPr marL="285750" marR="0" lvl="0" indent="-285750" algn="l" defTabSz="914400" rtl="0" eaLnBrk="1" fontAlgn="auto" latinLnBrk="0" hangingPunct="1">
-                        <a:lnSpc>
-                          <a:spcPct val="100000"/>
-                        </a:lnSpc>
-                        <a:spcBef>
-                          <a:spcPts val="0"/>
-                        </a:spcBef>
-                        <a:spcAft>
-                          <a:spcPts val="0"/>
-                        </a:spcAft>
-                        <a:buClrTx/>
-                        <a:buSzTx/>
-                        <a:buFontTx/>
-                        <a:buChar char="-"/>
-                        <a:tabLst/>
-                        <a:defRPr/>
-                      </a:pPr>
-                      <a:r>
-                        <a:rPr lang="fr-FR" sz="1600" baseline="0" dirty="0" smtClean="0"/>
-                        <a:t>Obligation de modifier les clients</a:t>
-                      </a:r>
-                    </a:p>
-                  </a:txBody>
-                  <a:tcPr/>
-                </a:tc>
-              </a:tr>
-              <a:tr h="1247069">
-                <a:tc>
-                  <a:txBody>
-                    <a:bodyPr/>
-                    <a:lstStyle/>
-                    <a:p>
-                      <a:pPr marL="0" marR="0" lvl="0" indent="0" algn="l" defTabSz="914400" rtl="0" eaLnBrk="1" fontAlgn="auto" latinLnBrk="0" hangingPunct="1">
-                        <a:lnSpc>
-                          <a:spcPct val="100000"/>
-                        </a:lnSpc>
-                        <a:spcBef>
-                          <a:spcPts val="0"/>
-                        </a:spcBef>
-                        <a:spcAft>
-                          <a:spcPts val="0"/>
-                        </a:spcAft>
-                        <a:buClrTx/>
-                        <a:buSzTx/>
-                        <a:buFontTx/>
-                        <a:buNone/>
-                        <a:tabLst/>
-                        <a:defRPr/>
-                      </a:pPr>
-                      <a:r>
-                        <a:rPr lang="fr-FR" sz="1600" dirty="0" smtClean="0"/>
-                        <a:t>Mise à jour matérielle</a:t>
-                      </a:r>
-                    </a:p>
-                    <a:p>
-                      <a:endParaRPr lang="fr-FR" sz="1600" dirty="0"/>
-                    </a:p>
-                  </a:txBody>
-                  <a:tcPr/>
-                </a:tc>
-                <a:tc>
-                  <a:txBody>
-                    <a:bodyPr/>
-                    <a:lstStyle/>
-                    <a:p>
-                      <a:pPr marL="285750" marR="0" lvl="0" indent="-285750" algn="l" defTabSz="914400" rtl="0" eaLnBrk="1" fontAlgn="auto" latinLnBrk="0" hangingPunct="1">
-                        <a:lnSpc>
-                          <a:spcPct val="100000"/>
-                        </a:lnSpc>
-                        <a:spcBef>
-                          <a:spcPts val="0"/>
-                        </a:spcBef>
-                        <a:spcAft>
-                          <a:spcPts val="0"/>
-                        </a:spcAft>
-                        <a:buClrTx/>
-                        <a:buSzTx/>
-                        <a:buFontTx/>
-                        <a:buChar char="-"/>
-                        <a:tabLst/>
-                        <a:defRPr/>
-                      </a:pPr>
-                      <a:r>
-                        <a:rPr lang="fr-FR" sz="1600" dirty="0" smtClean="0"/>
-                        <a:t>Relativement simple (ajout de ram, upgrade de CPU</a:t>
-                      </a:r>
-                      <a:r>
-                        <a:rPr lang="fr-FR" sz="1600" dirty="0" smtClean="0"/>
-                        <a:t>…) (machine virtuelle)</a:t>
-                      </a:r>
-                      <a:endParaRPr lang="fr-FR" sz="1600" dirty="0"/>
-                    </a:p>
-                  </a:txBody>
-                  <a:tcPr/>
-                </a:tc>
-                <a:tc>
-                  <a:txBody>
-                    <a:bodyPr/>
-                    <a:lstStyle/>
-                    <a:p>
-                      <a:pPr marL="285750" marR="0" lvl="0" indent="-285750" algn="l" defTabSz="914400" rtl="0" eaLnBrk="1" fontAlgn="auto" latinLnBrk="0" hangingPunct="1">
-                        <a:lnSpc>
-                          <a:spcPct val="100000"/>
-                        </a:lnSpc>
-                        <a:spcBef>
-                          <a:spcPts val="0"/>
-                        </a:spcBef>
-                        <a:spcAft>
-                          <a:spcPts val="0"/>
-                        </a:spcAft>
-                        <a:buClrTx/>
-                        <a:buSzTx/>
-                        <a:buFontTx/>
-                        <a:buChar char="-"/>
-                        <a:tabLst/>
-                        <a:defRPr/>
-                      </a:pPr>
-                      <a:r>
-                        <a:rPr lang="fr-FR" sz="1600" dirty="0" smtClean="0"/>
-                        <a:t>Souvent cher </a:t>
-                      </a:r>
-                      <a:r>
-                        <a:rPr lang="fr-FR" sz="1600" dirty="0" smtClean="0"/>
-                        <a:t>(machine </a:t>
-                      </a:r>
-                      <a:r>
-                        <a:rPr lang="fr-FR" sz="1600" dirty="0" smtClean="0"/>
-                        <a:t>physique</a:t>
-                      </a:r>
-                      <a:r>
-                        <a:rPr lang="fr-FR" sz="1600" dirty="0" smtClean="0"/>
-                        <a:t>)</a:t>
-                      </a:r>
-                    </a:p>
-                    <a:p>
-                      <a:pPr marL="285750" marR="0" lvl="0" indent="-285750" algn="l" defTabSz="914400" rtl="0" eaLnBrk="1" fontAlgn="auto" latinLnBrk="0" hangingPunct="1">
-                        <a:lnSpc>
-                          <a:spcPct val="100000"/>
-                        </a:lnSpc>
-                        <a:spcBef>
-                          <a:spcPts val="0"/>
-                        </a:spcBef>
-                        <a:spcAft>
-                          <a:spcPts val="0"/>
-                        </a:spcAft>
-                        <a:buClrTx/>
-                        <a:buSzTx/>
-                        <a:buFontTx/>
-                        <a:buChar char="-"/>
-                        <a:tabLst/>
-                        <a:defRPr/>
-                      </a:pPr>
-                      <a:r>
-                        <a:rPr lang="fr-FR" sz="1600" dirty="0" smtClean="0"/>
-                        <a:t>Parfois impossible (AS400)</a:t>
-                      </a:r>
-                      <a:endParaRPr lang="fr-FR" sz="1600" dirty="0" smtClean="0"/>
-                    </a:p>
-                    <a:p>
-                      <a:pPr marL="285750" marR="0" lvl="0" indent="-285750" algn="l" defTabSz="914400" rtl="0" eaLnBrk="1" fontAlgn="auto" latinLnBrk="0" hangingPunct="1">
-                        <a:lnSpc>
-                          <a:spcPct val="100000"/>
-                        </a:lnSpc>
-                        <a:spcBef>
-                          <a:spcPts val="0"/>
-                        </a:spcBef>
-                        <a:spcAft>
-                          <a:spcPts val="0"/>
-                        </a:spcAft>
-                        <a:buClrTx/>
-                        <a:buSzTx/>
-                        <a:buFontTx/>
-                        <a:buChar char="-"/>
-                        <a:tabLst/>
-                        <a:defRPr/>
-                      </a:pPr>
-                      <a:r>
-                        <a:rPr lang="fr-FR" sz="1600" dirty="0" smtClean="0"/>
-                        <a:t>Interruption de service plus ou moins longue</a:t>
-                      </a:r>
-                    </a:p>
-                    <a:p>
-                      <a:pPr marL="285750" marR="0" lvl="0" indent="-285750" algn="l" defTabSz="914400" rtl="0" eaLnBrk="1" fontAlgn="auto" latinLnBrk="0" hangingPunct="1">
-                        <a:lnSpc>
-                          <a:spcPct val="100000"/>
-                        </a:lnSpc>
-                        <a:spcBef>
-                          <a:spcPts val="0"/>
-                        </a:spcBef>
-                        <a:spcAft>
-                          <a:spcPts val="0"/>
-                        </a:spcAft>
-                        <a:buClrTx/>
-                        <a:buSzTx/>
-                        <a:buFontTx/>
-                        <a:buChar char="-"/>
-                        <a:tabLst/>
-                        <a:defRPr/>
-                      </a:pPr>
-                      <a:r>
-                        <a:rPr lang="fr-FR" sz="1600" dirty="0" smtClean="0"/>
-                        <a:t>Le serveur peut ne pas fonctionner sur la nouvelle machine</a:t>
-                      </a:r>
-                    </a:p>
-                  </a:txBody>
-                  <a:tcPr/>
-                </a:tc>
-              </a:tr>
-              <a:tr h="1479082">
-                <a:tc>
-                  <a:txBody>
-                    <a:bodyPr/>
-                    <a:lstStyle/>
-                    <a:p>
-                      <a:pPr marL="0" marR="0" lvl="0" indent="0" algn="l" defTabSz="914400" rtl="0" eaLnBrk="1" fontAlgn="auto" latinLnBrk="0" hangingPunct="1">
-                        <a:lnSpc>
-                          <a:spcPct val="100000"/>
-                        </a:lnSpc>
-                        <a:spcBef>
-                          <a:spcPts val="0"/>
-                        </a:spcBef>
-                        <a:spcAft>
-                          <a:spcPts val="0"/>
-                        </a:spcAft>
-                        <a:buClrTx/>
-                        <a:buSzTx/>
-                        <a:buFontTx/>
-                        <a:buNone/>
-                        <a:tabLst/>
-                        <a:defRPr/>
-                      </a:pPr>
-                      <a:r>
-                        <a:rPr lang="fr-FR" sz="1600" dirty="0" smtClean="0"/>
-                        <a:t>Api-</a:t>
-                      </a:r>
-                      <a:r>
-                        <a:rPr lang="fr-FR" sz="1600" dirty="0" err="1" smtClean="0"/>
-                        <a:t>shadowing</a:t>
-                      </a:r>
-                      <a:endParaRPr lang="fr-FR" sz="1600" dirty="0" smtClean="0"/>
-                    </a:p>
-                  </a:txBody>
-                  <a:tcPr/>
-                </a:tc>
-                <a:tc>
-                  <a:txBody>
-                    <a:bodyPr/>
-                    <a:lstStyle/>
-                    <a:p>
-                      <a:pPr marL="285750" indent="-285750">
-                        <a:buFontTx/>
-                        <a:buChar char="-"/>
-                      </a:pPr>
-                      <a:r>
-                        <a:rPr lang="fr-FR" sz="1600" dirty="0" smtClean="0"/>
-                        <a:t>Permet une mise</a:t>
-                      </a:r>
-                      <a:r>
-                        <a:rPr lang="fr-FR" sz="1600" baseline="0" dirty="0" smtClean="0"/>
-                        <a:t> en place progressive</a:t>
-                      </a:r>
-                    </a:p>
-                    <a:p>
-                      <a:pPr marL="285750" indent="-285750">
-                        <a:buFontTx/>
-                        <a:buChar char="-"/>
-                      </a:pPr>
-                      <a:r>
-                        <a:rPr lang="fr-FR" sz="1600" dirty="0" smtClean="0"/>
-                        <a:t>Fonctionnellement transparent </a:t>
-                      </a:r>
-                      <a:r>
-                        <a:rPr lang="fr-FR" sz="1600" dirty="0" smtClean="0"/>
-                        <a:t>pour l’utilisateur</a:t>
-                      </a:r>
-                    </a:p>
-                    <a:p>
-                      <a:pPr marL="285750" indent="-285750">
-                        <a:buFontTx/>
-                        <a:buChar char="-"/>
-                      </a:pPr>
-                      <a:r>
-                        <a:rPr lang="fr-FR" sz="1600" dirty="0" smtClean="0"/>
-                        <a:t>Réduit les risques</a:t>
-                      </a:r>
-                      <a:r>
-                        <a:rPr lang="fr-FR" sz="1600" baseline="0" dirty="0" smtClean="0"/>
-                        <a:t> de refonte du serveur</a:t>
-                      </a:r>
-                    </a:p>
-                    <a:p>
-                      <a:pPr marL="285750" indent="-285750">
-                        <a:buFontTx/>
-                        <a:buChar char="-"/>
-                      </a:pPr>
-                      <a:r>
-                        <a:rPr lang="fr-FR" sz="1600" baseline="0" dirty="0" smtClean="0"/>
-                        <a:t>Facilement évolutif</a:t>
-                      </a:r>
-                    </a:p>
-                    <a:p>
-                      <a:pPr marL="285750" indent="-285750">
-                        <a:buFontTx/>
-                        <a:buChar char="-"/>
-                      </a:pPr>
-                      <a:endParaRPr lang="fr-FR" sz="1600" dirty="0"/>
-                    </a:p>
-                  </a:txBody>
-                  <a:tcPr/>
-                </a:tc>
-                <a:tc>
-                  <a:txBody>
-                    <a:bodyPr/>
-                    <a:lstStyle/>
-                    <a:p>
-                      <a:pPr marL="285750" indent="-285750">
-                        <a:buFontTx/>
-                        <a:buChar char="-"/>
-                      </a:pPr>
-                      <a:r>
-                        <a:rPr lang="fr-FR" sz="1600" dirty="0" smtClean="0"/>
-                        <a:t>La</a:t>
-                      </a:r>
-                      <a:r>
-                        <a:rPr lang="fr-FR" sz="1600" baseline="0" dirty="0" smtClean="0"/>
-                        <a:t> mise en place d’un POC est critique et obligatoire</a:t>
-                      </a:r>
-                    </a:p>
-                    <a:p>
-                      <a:pPr marL="285750" indent="-285750">
-                        <a:buFontTx/>
-                        <a:buChar char="-"/>
-                      </a:pPr>
-                      <a:r>
-                        <a:rPr lang="fr-FR" sz="1600" baseline="0" dirty="0" smtClean="0"/>
-                        <a:t>Obligation de modifier les </a:t>
-                      </a:r>
-                      <a:r>
-                        <a:rPr lang="fr-FR" sz="1600" baseline="0" dirty="0" smtClean="0"/>
-                        <a:t>clients</a:t>
-                      </a:r>
-                      <a:endParaRPr lang="fr-FR" sz="1600" baseline="0" dirty="0" smtClean="0"/>
-                    </a:p>
-                  </a:txBody>
-                  <a:tcPr/>
-                </a:tc>
-              </a:tr>
-            </a:tbl>
-          </a:graphicData>
-        </a:graphic>
-      </p:graphicFrame>
       <p:pic>
         <p:nvPicPr>
           <p:cNvPr id="5" name="Image 4">
             <a:extLst>
               <a:ext uri="{FF2B5EF4-FFF2-40B4-BE49-F238E27FC236}">
-                <a16:creationId xmlns="" xmlns:a16="http://schemas.microsoft.com/office/drawing/2014/main" id="{D91F6CE4-A0FB-4282-9B85-47FA5527C736}"/>
+                <a16:creationId xmlns:a16="http://schemas.microsoft.com/office/drawing/2014/main" id="{75EBA769-F8CC-4D71-9511-415D7C261511}"/>
               </a:ext>
             </a:extLst>
           </p:cNvPr>
@@ -7176,7 +7377,7 @@
           <p:nvPr/>
         </p:nvPicPr>
         <p:blipFill>
-          <a:blip r:embed="rId2" cstate="print">
+          <a:blip r:embed="rId3">
             <a:extLst>
               <a:ext uri="{28A0092B-C50C-407E-A947-70E740481C1C}">
                 <a14:useLocalDpi xmlns:a14="http://schemas.microsoft.com/office/drawing/2010/main" val="0"/>
@@ -7189,60 +7390,93 @@
         </p:blipFill>
         <p:spPr>
           <a:xfrm>
-            <a:off x="293615" y="6291743"/>
-            <a:ext cx="10508871" cy="272654"/>
+            <a:off x="0" y="0"/>
+            <a:ext cx="12192000" cy="6858000"/>
           </a:xfrm>
           <a:prstGeom prst="rect">
             <a:avLst/>
           </a:prstGeom>
         </p:spPr>
       </p:pic>
-      <p:pic>
-        <p:nvPicPr>
-          <p:cNvPr id="6" name="Image 5">
-            <a:extLst>
-              <a:ext uri="{FF2B5EF4-FFF2-40B4-BE49-F238E27FC236}">
-                <a16:creationId xmlns="" xmlns:a16="http://schemas.microsoft.com/office/drawing/2014/main" id="{B6F51BA5-E830-46D2-B1E2-3A2C10F760E7}"/>
-              </a:ext>
-            </a:extLst>
-          </p:cNvPr>
-          <p:cNvPicPr>
-            <a:picLocks noChangeAspect="1"/>
-          </p:cNvPicPr>
+      <p:sp>
+        <p:nvSpPr>
+          <p:cNvPr id="6" name="ZoneTexte 5">
+            <a:extLst>
+              <a:ext uri="{FF2B5EF4-FFF2-40B4-BE49-F238E27FC236}">
+                <a16:creationId xmlns:a16="http://schemas.microsoft.com/office/drawing/2014/main" id="{945071A7-C8A5-4800-BD76-C6841CE45C5A}"/>
+              </a:ext>
+            </a:extLst>
+          </p:cNvPr>
+          <p:cNvSpPr txBox="1"/>
           <p:nvPr/>
-        </p:nvPicPr>
-        <p:blipFill>
-          <a:blip r:embed="rId3" cstate="print">
-            <a:extLst>
-              <a:ext uri="{28A0092B-C50C-407E-A947-70E740481C1C}">
-                <a14:useLocalDpi xmlns:a14="http://schemas.microsoft.com/office/drawing/2010/main" val="0"/>
-              </a:ext>
-            </a:extLst>
-          </a:blip>
-          <a:stretch>
-            <a:fillRect/>
-          </a:stretch>
-        </p:blipFill>
+        </p:nvSpPr>
         <p:spPr>
           <a:xfrm>
-            <a:off x="10802486" y="5912350"/>
-            <a:ext cx="1193772" cy="787940"/>
+            <a:off x="4202707" y="2721114"/>
+            <a:ext cx="3786614" cy="707886"/>
           </a:xfrm>
           <a:prstGeom prst="rect">
             <a:avLst/>
           </a:prstGeom>
-        </p:spPr>
-      </p:pic>
+          <a:noFill/>
+        </p:spPr>
+        <p:txBody>
+          <a:bodyPr wrap="none" rtlCol="0">
+            <a:spAutoFit/>
+          </a:bodyPr>
+          <a:lstStyle/>
+          <a:p>
+            <a:pPr algn="ctr"/>
+            <a:r>
+              <a:rPr lang="fr-FR" sz="4000" dirty="0" smtClean="0">
+                <a:solidFill>
+                  <a:schemeClr val="bg1"/>
+                </a:solidFill>
+                <a:latin typeface="Lato Black" panose="020F0502020204030203" pitchFamily="34" charset="0"/>
+                <a:ea typeface="Lato Black" panose="020F0502020204030203" pitchFamily="34" charset="0"/>
+                <a:cs typeface="Lato Black" panose="020F0502020204030203" pitchFamily="34" charset="0"/>
+              </a:rPr>
+              <a:t>API-</a:t>
+            </a:r>
+            <a:r>
+              <a:rPr lang="fr-FR" sz="4000" dirty="0" err="1" smtClean="0">
+                <a:solidFill>
+                  <a:schemeClr val="bg1"/>
+                </a:solidFill>
+                <a:latin typeface="Lato Black" panose="020F0502020204030203" pitchFamily="34" charset="0"/>
+                <a:ea typeface="Lato Black" panose="020F0502020204030203" pitchFamily="34" charset="0"/>
+                <a:cs typeface="Lato Black" panose="020F0502020204030203" pitchFamily="34" charset="0"/>
+              </a:rPr>
+              <a:t>Shadowing</a:t>
+            </a:r>
+            <a:endParaRPr lang="fr-FR" sz="4000" dirty="0">
+              <a:solidFill>
+                <a:schemeClr val="bg1"/>
+              </a:solidFill>
+              <a:latin typeface="Lato Black" panose="020F0502020204030203" pitchFamily="34" charset="0"/>
+              <a:ea typeface="Lato Black" panose="020F0502020204030203" pitchFamily="34" charset="0"/>
+              <a:cs typeface="Lato Black" panose="020F0502020204030203" pitchFamily="34" charset="0"/>
+            </a:endParaRPr>
+          </a:p>
+        </p:txBody>
+      </p:sp>
     </p:spTree>
     <p:extLst>
       <p:ext uri="{BB962C8B-B14F-4D97-AF65-F5344CB8AC3E}">
-        <p14:creationId xmlns:p14="http://schemas.microsoft.com/office/powerpoint/2010/main" val="51110540"/>
+        <p14:creationId xmlns:p14="http://schemas.microsoft.com/office/powerpoint/2010/main" val="4230473361"/>
       </p:ext>
     </p:extLst>
   </p:cSld>
   <p:clrMapOvr>
     <a:masterClrMapping/>
   </p:clrMapOvr>
+  <p:timing>
+    <p:tnLst>
+      <p:par>
+        <p:cTn id="1" dur="indefinite" restart="never" nodeType="tmRoot"/>
+      </p:par>
+    </p:tnLst>
+  </p:timing>
 </p:sld>
 </file>
 
@@ -7268,7 +7502,7 @@
           <p:cNvPr id="5" name="Image 4">
             <a:extLst>
               <a:ext uri="{FF2B5EF4-FFF2-40B4-BE49-F238E27FC236}">
-                <a16:creationId xmlns="" xmlns:a16="http://schemas.microsoft.com/office/drawing/2014/main" id="{75EBA769-F8CC-4D71-9511-415D7C261511}"/>
+                <a16:creationId xmlns:a16="http://schemas.microsoft.com/office/drawing/2014/main" id="{D91F6CE4-A0FB-4282-9B85-47FA5527C736}"/>
               </a:ext>
             </a:extLst>
           </p:cNvPr>
@@ -7278,7 +7512,7 @@
           <p:nvPr/>
         </p:nvPicPr>
         <p:blipFill>
-          <a:blip r:embed="rId3">
+          <a:blip r:embed="rId3" cstate="print">
             <a:extLst>
               <a:ext uri="{28A0092B-C50C-407E-A947-70E740481C1C}">
                 <a14:useLocalDpi xmlns:a14="http://schemas.microsoft.com/office/drawing/2010/main" val="0"/>
@@ -7291,30 +7525,60 @@
         </p:blipFill>
         <p:spPr>
           <a:xfrm>
-            <a:off x="0" y="0"/>
-            <a:ext cx="12192000" cy="6858000"/>
+            <a:off x="293615" y="6291743"/>
+            <a:ext cx="10508871" cy="272654"/>
           </a:xfrm>
           <a:prstGeom prst="rect">
             <a:avLst/>
           </a:prstGeom>
         </p:spPr>
       </p:pic>
-      <p:sp>
-        <p:nvSpPr>
-          <p:cNvPr id="6" name="ZoneTexte 5">
-            <a:extLst>
-              <a:ext uri="{FF2B5EF4-FFF2-40B4-BE49-F238E27FC236}">
-                <a16:creationId xmlns="" xmlns:a16="http://schemas.microsoft.com/office/drawing/2014/main" id="{945071A7-C8A5-4800-BD76-C6841CE45C5A}"/>
-              </a:ext>
-            </a:extLst>
-          </p:cNvPr>
+      <p:pic>
+        <p:nvPicPr>
+          <p:cNvPr id="6" name="Image 5">
+            <a:extLst>
+              <a:ext uri="{FF2B5EF4-FFF2-40B4-BE49-F238E27FC236}">
+                <a16:creationId xmlns:a16="http://schemas.microsoft.com/office/drawing/2014/main" id="{B6F51BA5-E830-46D2-B1E2-3A2C10F760E7}"/>
+              </a:ext>
+            </a:extLst>
+          </p:cNvPr>
+          <p:cNvPicPr>
+            <a:picLocks noChangeAspect="1"/>
+          </p:cNvPicPr>
+          <p:nvPr/>
+        </p:nvPicPr>
+        <p:blipFill>
+          <a:blip r:embed="rId4" cstate="print">
+            <a:extLst>
+              <a:ext uri="{28A0092B-C50C-407E-A947-70E740481C1C}">
+                <a14:useLocalDpi xmlns:a14="http://schemas.microsoft.com/office/drawing/2010/main" val="0"/>
+              </a:ext>
+            </a:extLst>
+          </a:blip>
+          <a:stretch>
+            <a:fillRect/>
+          </a:stretch>
+        </p:blipFill>
+        <p:spPr>
+          <a:xfrm>
+            <a:off x="10802486" y="5912350"/>
+            <a:ext cx="1193772" cy="787940"/>
+          </a:xfrm>
+          <a:prstGeom prst="rect">
+            <a:avLst/>
+          </a:prstGeom>
+        </p:spPr>
+      </p:pic>
+      <p:sp>
+        <p:nvSpPr>
+          <p:cNvPr id="9" name="ZoneTexte 8"/>
           <p:cNvSpPr txBox="1"/>
           <p:nvPr/>
         </p:nvSpPr>
         <p:spPr>
           <a:xfrm>
-            <a:off x="4202707" y="2721114"/>
-            <a:ext cx="3786614" cy="707886"/>
+            <a:off x="293616" y="2249913"/>
+            <a:ext cx="11702642" cy="646331"/>
           </a:xfrm>
           <a:prstGeom prst="rect">
             <a:avLst/>
@@ -7322,49 +7586,302 @@
           <a:noFill/>
         </p:spPr>
         <p:txBody>
-          <a:bodyPr wrap="none" rtlCol="0">
+          <a:bodyPr wrap="square" rtlCol="0">
             <a:spAutoFit/>
           </a:bodyPr>
           <a:lstStyle/>
           <a:p>
-            <a:pPr algn="ctr"/>
-            <a:r>
-              <a:rPr lang="fr-FR" sz="4000" dirty="0" smtClean="0">
-                <a:solidFill>
-                  <a:schemeClr val="bg1"/>
-                </a:solidFill>
-                <a:latin typeface="Lato Black" panose="020F0502020204030203" pitchFamily="34" charset="0"/>
-                <a:ea typeface="Lato Black" panose="020F0502020204030203" pitchFamily="34" charset="0"/>
-                <a:cs typeface="Lato Black" panose="020F0502020204030203" pitchFamily="34" charset="0"/>
-              </a:rPr>
-              <a:t>API-</a:t>
-            </a:r>
-            <a:r>
-              <a:rPr lang="fr-FR" sz="4000" dirty="0" err="1" smtClean="0">
-                <a:solidFill>
-                  <a:schemeClr val="bg1"/>
-                </a:solidFill>
-                <a:latin typeface="Lato Black" panose="020F0502020204030203" pitchFamily="34" charset="0"/>
-                <a:ea typeface="Lato Black" panose="020F0502020204030203" pitchFamily="34" charset="0"/>
-                <a:cs typeface="Lato Black" panose="020F0502020204030203" pitchFamily="34" charset="0"/>
-              </a:rPr>
-              <a:t>Shadowing</a:t>
-            </a:r>
-            <a:endParaRPr lang="fr-FR" sz="4000" dirty="0">
-              <a:solidFill>
-                <a:schemeClr val="bg1"/>
-              </a:solidFill>
-              <a:latin typeface="Lato Black" panose="020F0502020204030203" pitchFamily="34" charset="0"/>
-              <a:ea typeface="Lato Black" panose="020F0502020204030203" pitchFamily="34" charset="0"/>
-              <a:cs typeface="Lato Black" panose="020F0502020204030203" pitchFamily="34" charset="0"/>
-            </a:endParaRPr>
-          </a:p>
-        </p:txBody>
-      </p:sp>
+            <a:r>
+              <a:rPr lang="fr-FR" dirty="0" smtClean="0"/>
+              <a:t>Pour plus d’informations sur le pattern, cf. la Tech </a:t>
+            </a:r>
+            <a:r>
+              <a:rPr lang="fr-FR" dirty="0" err="1" smtClean="0"/>
+              <a:t>letter</a:t>
+            </a:r>
+            <a:r>
+              <a:rPr lang="fr-FR" dirty="0" smtClean="0"/>
+              <a:t> de juillet-aout 2019, « </a:t>
+            </a:r>
+            <a:r>
+              <a:rPr lang="fr-FR" dirty="0"/>
+              <a:t>Une stratégie de migration d’application </a:t>
+            </a:r>
+            <a:r>
+              <a:rPr lang="fr-FR" dirty="0" err="1" smtClean="0"/>
+              <a:t>legacy</a:t>
+            </a:r>
+            <a:r>
+              <a:rPr lang="fr-FR" dirty="0" smtClean="0"/>
+              <a:t> vers </a:t>
+            </a:r>
+            <a:r>
+              <a:rPr lang="fr-FR" dirty="0"/>
+              <a:t>le </a:t>
+            </a:r>
+            <a:r>
+              <a:rPr lang="fr-FR" dirty="0" smtClean="0"/>
+              <a:t>Cloud »</a:t>
+            </a:r>
+            <a:endParaRPr lang="fr-FR" dirty="0"/>
+          </a:p>
+        </p:txBody>
+      </p:sp>
+      <p:grpSp>
+        <p:nvGrpSpPr>
+          <p:cNvPr id="15" name="Groupe 14"/>
+          <p:cNvGrpSpPr/>
+          <p:nvPr/>
+        </p:nvGrpSpPr>
+        <p:grpSpPr>
+          <a:xfrm>
+            <a:off x="1104961" y="3038820"/>
+            <a:ext cx="9982079" cy="2772769"/>
+            <a:chOff x="380251" y="3329278"/>
+            <a:chExt cx="9982079" cy="2772769"/>
+          </a:xfrm>
+        </p:grpSpPr>
+        <p:pic>
+          <p:nvPicPr>
+            <p:cNvPr id="11" name="Image 10"/>
+            <p:cNvPicPr>
+              <a:picLocks noChangeAspect="1"/>
+            </p:cNvPicPr>
+            <p:nvPr/>
+          </p:nvPicPr>
+          <p:blipFill>
+            <a:blip r:embed="rId5"/>
+            <a:stretch>
+              <a:fillRect/>
+            </a:stretch>
+          </p:blipFill>
+          <p:spPr>
+            <a:xfrm>
+              <a:off x="380251" y="3329279"/>
+              <a:ext cx="2087497" cy="2772768"/>
+            </a:xfrm>
+            <a:prstGeom prst="rect">
+              <a:avLst/>
+            </a:prstGeom>
+          </p:spPr>
+        </p:pic>
+        <p:pic>
+          <p:nvPicPr>
+            <p:cNvPr id="12" name="Image 11"/>
+            <p:cNvPicPr>
+              <a:picLocks noChangeAspect="1"/>
+            </p:cNvPicPr>
+            <p:nvPr/>
+          </p:nvPicPr>
+          <p:blipFill>
+            <a:blip r:embed="rId6"/>
+            <a:stretch>
+              <a:fillRect/>
+            </a:stretch>
+          </p:blipFill>
+          <p:spPr>
+            <a:xfrm>
+              <a:off x="2856113" y="3329279"/>
+              <a:ext cx="2099634" cy="2772768"/>
+            </a:xfrm>
+            <a:prstGeom prst="rect">
+              <a:avLst/>
+            </a:prstGeom>
+          </p:spPr>
+        </p:pic>
+        <p:pic>
+          <p:nvPicPr>
+            <p:cNvPr id="13" name="Image 12"/>
+            <p:cNvPicPr>
+              <a:picLocks noChangeAspect="1"/>
+            </p:cNvPicPr>
+            <p:nvPr/>
+          </p:nvPicPr>
+          <p:blipFill>
+            <a:blip r:embed="rId7"/>
+            <a:stretch>
+              <a:fillRect/>
+            </a:stretch>
+          </p:blipFill>
+          <p:spPr>
+            <a:xfrm>
+              <a:off x="5582850" y="3329278"/>
+              <a:ext cx="2064880" cy="2742727"/>
+            </a:xfrm>
+            <a:prstGeom prst="rect">
+              <a:avLst/>
+            </a:prstGeom>
+          </p:spPr>
+        </p:pic>
+        <p:pic>
+          <p:nvPicPr>
+            <p:cNvPr id="14" name="Image 13"/>
+            <p:cNvPicPr>
+              <a:picLocks noChangeAspect="1"/>
+            </p:cNvPicPr>
+            <p:nvPr/>
+          </p:nvPicPr>
+          <p:blipFill>
+            <a:blip r:embed="rId8"/>
+            <a:stretch>
+              <a:fillRect/>
+            </a:stretch>
+          </p:blipFill>
+          <p:spPr>
+            <a:xfrm>
+              <a:off x="8274833" y="3329278"/>
+              <a:ext cx="2087497" cy="2772769"/>
+            </a:xfrm>
+            <a:prstGeom prst="rect">
+              <a:avLst/>
+            </a:prstGeom>
+          </p:spPr>
+        </p:pic>
+      </p:grpSp>
+      <p:graphicFrame>
+        <p:nvGraphicFramePr>
+          <p:cNvPr id="16" name="Tableau 15"/>
+          <p:cNvGraphicFramePr>
+            <a:graphicFrameLocks noGrp="1"/>
+          </p:cNvGraphicFramePr>
+          <p:nvPr>
+            <p:extLst>
+              <p:ext uri="{D42A27DB-BD31-4B8C-83A1-F6EECF244321}">
+                <p14:modId xmlns:p14="http://schemas.microsoft.com/office/powerpoint/2010/main" val="1656612516"/>
+              </p:ext>
+            </p:extLst>
+          </p:nvPr>
+        </p:nvGraphicFramePr>
+        <p:xfrm>
+          <a:off x="376517" y="470337"/>
+          <a:ext cx="11198710" cy="1463040"/>
+        </p:xfrm>
+        <a:graphic>
+          <a:graphicData uri="http://schemas.openxmlformats.org/drawingml/2006/table">
+            <a:tbl>
+              <a:tblPr firstRow="1" bandRow="1">
+                <a:tableStyleId>{2D5ABB26-0587-4C30-8999-92F81FD0307C}</a:tableStyleId>
+              </a:tblPr>
+              <a:tblGrid>
+                <a:gridCol w="5599355">
+                  <a:extLst>
+                    <a:ext uri="{9D8B030D-6E8A-4147-A177-3AD203B41FA5}">
+                      <a16:colId xmlns:a16="http://schemas.microsoft.com/office/drawing/2014/main" val="2270439664"/>
+                    </a:ext>
+                  </a:extLst>
+                </a:gridCol>
+                <a:gridCol w="5599355">
+                  <a:extLst>
+                    <a:ext uri="{9D8B030D-6E8A-4147-A177-3AD203B41FA5}">
+                      <a16:colId xmlns:a16="http://schemas.microsoft.com/office/drawing/2014/main" val="1483585808"/>
+                    </a:ext>
+                  </a:extLst>
+                </a:gridCol>
+              </a:tblGrid>
+              <a:tr h="370840">
+                <a:tc>
+                  <a:txBody>
+                    <a:bodyPr/>
+                    <a:lstStyle/>
+                    <a:p>
+                      <a:r>
+                        <a:rPr lang="fr-FR" b="1" dirty="0" smtClean="0"/>
+                        <a:t>Avantages :</a:t>
+                      </a:r>
+                    </a:p>
+                    <a:p>
+                      <a:pPr marL="285750" indent="-285750">
+                        <a:buFontTx/>
+                        <a:buChar char="-"/>
+                      </a:pPr>
+                      <a:r>
+                        <a:rPr lang="fr-FR" dirty="0" smtClean="0"/>
+                        <a:t>Permet une mise en place progressive</a:t>
+                      </a:r>
+                    </a:p>
+                    <a:p>
+                      <a:pPr marL="285750" indent="-285750">
+                        <a:buFontTx/>
+                        <a:buChar char="-"/>
+                      </a:pPr>
+                      <a:r>
+                        <a:rPr lang="fr-FR" dirty="0" smtClean="0"/>
+                        <a:t>Fonctionnellement transparent pour l’utilisateur</a:t>
+                      </a:r>
+                    </a:p>
+                    <a:p>
+                      <a:pPr marL="285750" indent="-285750">
+                        <a:buFontTx/>
+                        <a:buChar char="-"/>
+                      </a:pPr>
+                      <a:r>
+                        <a:rPr lang="fr-FR" dirty="0" smtClean="0"/>
+                        <a:t>Réduit les risques de refonte du serveur</a:t>
+                      </a:r>
+                    </a:p>
+                    <a:p>
+                      <a:pPr marL="285750" indent="-285750">
+                        <a:buFontTx/>
+                        <a:buChar char="-"/>
+                      </a:pPr>
+                      <a:r>
+                        <a:rPr lang="fr-FR" dirty="0" smtClean="0"/>
+                        <a:t>Facilement évolutif</a:t>
+                      </a:r>
+                    </a:p>
+                  </a:txBody>
+                  <a:tcPr/>
+                </a:tc>
+                <a:tc>
+                  <a:txBody>
+                    <a:bodyPr/>
+                    <a:lstStyle/>
+                    <a:p>
+                      <a:r>
+                        <a:rPr lang="fr-FR" b="1" dirty="0" smtClean="0"/>
+                        <a:t>Inconvénients :</a:t>
+                      </a:r>
+                    </a:p>
+                    <a:p>
+                      <a:pPr marL="285750" indent="-285750">
+                        <a:buFontTx/>
+                        <a:buChar char="-"/>
+                      </a:pPr>
+                      <a:r>
+                        <a:rPr lang="fr-FR" dirty="0" smtClean="0"/>
+                        <a:t>La mise en place d’un POC est critique et obligatoire</a:t>
+                      </a:r>
+                    </a:p>
+                    <a:p>
+                      <a:pPr marL="285750" indent="-285750">
+                        <a:buFontTx/>
+                        <a:buChar char="-"/>
+                      </a:pPr>
+                      <a:r>
+                        <a:rPr lang="fr-FR" dirty="0" smtClean="0"/>
+                        <a:t>Obligation de modifier les clients</a:t>
+                      </a:r>
+                    </a:p>
+                    <a:p>
+                      <a:endParaRPr lang="fr-FR" dirty="0"/>
+                    </a:p>
+                  </a:txBody>
+                  <a:tcPr/>
+                </a:tc>
+                <a:extLst>
+                  <a:ext uri="{0D108BD9-81ED-4DB2-BD59-A6C34878D82A}">
+                    <a16:rowId xmlns:a16="http://schemas.microsoft.com/office/drawing/2014/main" val="1673280856"/>
+                  </a:ext>
+                </a:extLst>
+              </a:tr>
+            </a:tbl>
+          </a:graphicData>
+        </a:graphic>
+      </p:graphicFrame>
     </p:spTree>
     <p:extLst>
       <p:ext uri="{BB962C8B-B14F-4D97-AF65-F5344CB8AC3E}">
-        <p14:creationId xmlns:p14="http://schemas.microsoft.com/office/powerpoint/2010/main" val="4230473361"/>
+        <p14:creationId xmlns:p14="http://schemas.microsoft.com/office/powerpoint/2010/main" val="2928623391"/>
       </p:ext>
     </p:extLst>
   </p:cSld>
@@ -7403,7 +7920,7 @@
           <p:cNvPr id="5" name="Image 4">
             <a:extLst>
               <a:ext uri="{FF2B5EF4-FFF2-40B4-BE49-F238E27FC236}">
-                <a16:creationId xmlns="" xmlns:a16="http://schemas.microsoft.com/office/drawing/2014/main" id="{D91F6CE4-A0FB-4282-9B85-47FA5527C736}"/>
+                <a16:creationId xmlns:a16="http://schemas.microsoft.com/office/drawing/2014/main" id="{D91F6CE4-A0FB-4282-9B85-47FA5527C736}"/>
               </a:ext>
             </a:extLst>
           </p:cNvPr>
@@ -7439,7 +7956,7 @@
           <p:cNvPr id="6" name="Image 5">
             <a:extLst>
               <a:ext uri="{FF2B5EF4-FFF2-40B4-BE49-F238E27FC236}">
-                <a16:creationId xmlns="" xmlns:a16="http://schemas.microsoft.com/office/drawing/2014/main" id="{B6F51BA5-E830-46D2-B1E2-3A2C10F760E7}"/>
+                <a16:creationId xmlns:a16="http://schemas.microsoft.com/office/drawing/2014/main" id="{B6F51BA5-E830-46D2-B1E2-3A2C10F760E7}"/>
               </a:ext>
             </a:extLst>
           </p:cNvPr>
@@ -7470,131 +7987,10 @@
           </a:prstGeom>
         </p:spPr>
       </p:pic>
-      <p:pic>
-        <p:nvPicPr>
-          <p:cNvPr id="4" name="Image 3"/>
-          <p:cNvPicPr>
-            <a:picLocks noChangeAspect="1"/>
-          </p:cNvPicPr>
-          <p:nvPr/>
-        </p:nvPicPr>
-        <p:blipFill>
-          <a:blip r:embed="rId5"/>
-          <a:stretch>
-            <a:fillRect/>
-          </a:stretch>
-        </p:blipFill>
-        <p:spPr>
-          <a:xfrm>
-            <a:off x="564602" y="405634"/>
-            <a:ext cx="5429250" cy="5353050"/>
-          </a:xfrm>
-          <a:prstGeom prst="rect">
-            <a:avLst/>
-          </a:prstGeom>
-        </p:spPr>
-      </p:pic>
-      <p:sp>
-        <p:nvSpPr>
-          <p:cNvPr id="7" name="ZoneTexte 6"/>
-          <p:cNvSpPr txBox="1"/>
-          <p:nvPr/>
-        </p:nvSpPr>
-        <p:spPr>
-          <a:xfrm>
-            <a:off x="758536" y="581890"/>
-            <a:ext cx="3241964" cy="384721"/>
-          </a:xfrm>
-          <a:prstGeom prst="rect">
-            <a:avLst/>
-          </a:prstGeom>
-          <a:solidFill>
-            <a:schemeClr val="bg1"/>
-          </a:solidFill>
-        </p:spPr>
-        <p:txBody>
-          <a:bodyPr wrap="square" rtlCol="0">
-            <a:spAutoFit/>
-          </a:bodyPr>
-          <a:lstStyle/>
-          <a:p>
-            <a:pPr algn="ctr"/>
-            <a:r>
-              <a:rPr lang="fr-FR" sz="1900" dirty="0" smtClean="0">
-                <a:solidFill>
-                  <a:srgbClr val="0A559E"/>
-                </a:solidFill>
-              </a:rPr>
-              <a:t>Projet </a:t>
-            </a:r>
-            <a:r>
-              <a:rPr lang="fr-FR" sz="1900" dirty="0" err="1" smtClean="0">
-                <a:solidFill>
-                  <a:srgbClr val="0A559E"/>
-                </a:solidFill>
-              </a:rPr>
-              <a:t>Legacy</a:t>
-            </a:r>
-            <a:endParaRPr lang="fr-FR" sz="1900" dirty="0">
-              <a:solidFill>
-                <a:srgbClr val="0A559E"/>
-              </a:solidFill>
-            </a:endParaRPr>
-          </a:p>
-        </p:txBody>
-      </p:sp>
-      <p:sp>
-        <p:nvSpPr>
-          <p:cNvPr id="8" name="Ellipse 7"/>
-          <p:cNvSpPr/>
-          <p:nvPr/>
-        </p:nvSpPr>
-        <p:spPr>
-          <a:xfrm>
-            <a:off x="2878282" y="2358737"/>
-            <a:ext cx="176645" cy="207818"/>
-          </a:xfrm>
-          <a:prstGeom prst="ellipse">
-            <a:avLst/>
-          </a:prstGeom>
-          <a:solidFill>
-            <a:schemeClr val="bg1"/>
-          </a:solidFill>
-          <a:ln>
-            <a:solidFill>
-              <a:schemeClr val="bg1"/>
-            </a:solidFill>
-          </a:ln>
-        </p:spPr>
-        <p:style>
-          <a:lnRef idx="2">
-            <a:schemeClr val="accent1">
-              <a:shade val="50000"/>
-            </a:schemeClr>
-          </a:lnRef>
-          <a:fillRef idx="1">
-            <a:schemeClr val="accent1"/>
-          </a:fillRef>
-          <a:effectRef idx="0">
-            <a:schemeClr val="accent1"/>
-          </a:effectRef>
-          <a:fontRef idx="minor">
-            <a:schemeClr val="lt1"/>
-          </a:fontRef>
-        </p:style>
-        <p:txBody>
-          <a:bodyPr rtlCol="0" anchor="ctr"/>
-          <a:lstStyle/>
-          <a:p>
-            <a:pPr algn="ctr"/>
-            <a:endParaRPr lang="fr-FR"/>
-          </a:p>
-        </p:txBody>
-      </p:sp>
     </p:spTree>
     <p:extLst>
       <p:ext uri="{BB962C8B-B14F-4D97-AF65-F5344CB8AC3E}">
-        <p14:creationId xmlns:p14="http://schemas.microsoft.com/office/powerpoint/2010/main" val="2928623391"/>
+        <p14:creationId xmlns:p14="http://schemas.microsoft.com/office/powerpoint/2010/main" val="1284584122"/>
       </p:ext>
     </p:extLst>
   </p:cSld>
@@ -8209,7 +8605,7 @@
 
 <file path=customXml/item10.xml><?xml version="1.0" encoding="utf-8"?>
 <Control xmlns="http://schemas.microsoft.com/VisualStudio/2011/storyboarding/control">
-  <Id Name="System.Storyboarding.WindowsDesktop.AlertDialog" Revision="1" Stencil="System.Storyboarding.WindowsDesktop" StencilVersion="0.1"/>
+  <Id Name="System.Storyboarding.Backgrounds.WebBrowser" Revision="1" Stencil="System.Storyboarding.Backgrounds" StencilVersion="0.1"/>
 </Control>
 </file>
 
@@ -8227,19 +8623,19 @@
 
 <file path=customXml/item4.xml><?xml version="1.0" encoding="utf-8"?>
 <Control xmlns="http://schemas.microsoft.com/VisualStudio/2011/storyboarding/control">
-  <Id Name="System.Storyboarding.WindowsDesktop.DialogBox" Revision="1" Stencil="System.Storyboarding.WindowsDesktop" StencilVersion="0.1"/>
+  <Id Name="System.Storyboarding.WindowsDesktop.AlertDialog" Revision="1" Stencil="System.Storyboarding.WindowsDesktop" StencilVersion="0.1"/>
 </Control>
 </file>
 
 <file path=customXml/item5.xml><?xml version="1.0" encoding="utf-8"?>
 <Control xmlns="http://schemas.microsoft.com/VisualStudio/2011/storyboarding/control">
-  <Id Name="System.Storyboarding.WindowsPhoneIcons.Search" Revision="1" Stencil="System.Storyboarding.WindowsPhoneIcons" StencilVersion="0.1"/>
+  <Id Name="System.Storyboarding.WindowsDesktop.DialogBox" Revision="1" Stencil="System.Storyboarding.WindowsDesktop" StencilVersion="0.1"/>
 </Control>
 </file>
 
 <file path=customXml/item6.xml><?xml version="1.0" encoding="utf-8"?>
 <Control xmlns="http://schemas.microsoft.com/VisualStudio/2011/storyboarding/control">
-  <Id Name="System.Storyboarding.Common.Breadcrumb" Revision="1" Stencil="System.Storyboarding.Common" StencilVersion="0.1"/>
+  <Id Name="System.Storyboarding.WindowsPhoneIcons.Search" Revision="1" Stencil="System.Storyboarding.WindowsPhoneIcons" StencilVersion="0.1"/>
 </Control>
 </file>
 
@@ -8257,7 +8653,7 @@
 
 <file path=customXml/item9.xml><?xml version="1.0" encoding="utf-8"?>
 <Control xmlns="http://schemas.microsoft.com/VisualStudio/2011/storyboarding/control">
-  <Id Name="System.Storyboarding.Backgrounds.WebBrowser" Revision="1" Stencil="System.Storyboarding.Backgrounds" StencilVersion="0.1"/>
+  <Id Name="System.Storyboarding.Common.Breadcrumb" Revision="1" Stencil="System.Storyboarding.Common" StencilVersion="0.1"/>
 </Control>
 </file>
 
@@ -8270,7 +8666,7 @@
 </file>
 
 <file path=customXml/itemProps10.xml><?xml version="1.0" encoding="utf-8"?>
-<ds:datastoreItem xmlns:ds="http://schemas.openxmlformats.org/officeDocument/2006/customXml" ds:itemID="{82FCB0D1-8EB6-4B2D-98E5-C2C86E67B90F}">
+<ds:datastoreItem xmlns:ds="http://schemas.openxmlformats.org/officeDocument/2006/customXml" ds:itemID="{B480E993-63B5-4C2F-BB8F-99D7AE1386B6}">
   <ds:schemaRefs>
     <ds:schemaRef ds:uri="http://schemas.microsoft.com/VisualStudio/2011/storyboarding/control"/>
   </ds:schemaRefs>
@@ -8286,7 +8682,7 @@
 </file>
 
 <file path=customXml/itemProps3.xml><?xml version="1.0" encoding="utf-8"?>
-<ds:datastoreItem xmlns:ds="http://schemas.openxmlformats.org/officeDocument/2006/customXml" ds:itemID="{C315F13A-AC62-4724-879E-14987FCB1CE6}">
+<ds:datastoreItem xmlns:ds="http://schemas.openxmlformats.org/officeDocument/2006/customXml" ds:itemID="{2005D821-4CB3-4A25-B341-C5F92CEC57AD}">
   <ds:schemaRefs>
     <ds:schemaRef ds:uri="http://schemas.microsoft.com/VisualStudio/2011/storyboarding/control"/>
   </ds:schemaRefs>
@@ -8294,7 +8690,7 @@
 </file>
 
 <file path=customXml/itemProps4.xml><?xml version="1.0" encoding="utf-8"?>
-<ds:datastoreItem xmlns:ds="http://schemas.openxmlformats.org/officeDocument/2006/customXml" ds:itemID="{2005D821-4CB3-4A25-B341-C5F92CEC57AD}">
+<ds:datastoreItem xmlns:ds="http://schemas.openxmlformats.org/officeDocument/2006/customXml" ds:itemID="{82FCB0D1-8EB6-4B2D-98E5-C2C86E67B90F}">
   <ds:schemaRefs>
     <ds:schemaRef ds:uri="http://schemas.microsoft.com/VisualStudio/2011/storyboarding/control"/>
   </ds:schemaRefs>
@@ -8302,6 +8698,14 @@
 </file>
 
 <file path=customXml/itemProps5.xml><?xml version="1.0" encoding="utf-8"?>
+<ds:datastoreItem xmlns:ds="http://schemas.openxmlformats.org/officeDocument/2006/customXml" ds:itemID="{1CAF7CC1-4F40-417B-9F2E-8DAFAC288198}">
+  <ds:schemaRefs>
+    <ds:schemaRef ds:uri="http://schemas.microsoft.com/VisualStudio/2011/storyboarding/control"/>
+  </ds:schemaRefs>
+</ds:datastoreItem>
+</file>
+
+<file path=customXml/itemProps6.xml><?xml version="1.0" encoding="utf-8"?>
 <ds:datastoreItem xmlns:ds="http://schemas.openxmlformats.org/officeDocument/2006/customXml" ds:itemID="{120A3C96-CD27-497D-A0EF-E96445F10DC2}">
   <ds:schemaRefs>
     <ds:schemaRef ds:uri="http://schemas.microsoft.com/VisualStudio/2011/storyboarding/control"/>
@@ -8309,16 +8713,8 @@
 </ds:datastoreItem>
 </file>
 
-<file path=customXml/itemProps6.xml><?xml version="1.0" encoding="utf-8"?>
-<ds:datastoreItem xmlns:ds="http://schemas.openxmlformats.org/officeDocument/2006/customXml" ds:itemID="{9A48F3C4-45B4-4BFF-BBD6-E5D8E1BB578C}">
-  <ds:schemaRefs>
-    <ds:schemaRef ds:uri="http://schemas.microsoft.com/VisualStudio/2011/storyboarding/control"/>
-  </ds:schemaRefs>
-</ds:datastoreItem>
-</file>
-
 <file path=customXml/itemProps7.xml><?xml version="1.0" encoding="utf-8"?>
-<ds:datastoreItem xmlns:ds="http://schemas.openxmlformats.org/officeDocument/2006/customXml" ds:itemID="{1CAF7CC1-4F40-417B-9F2E-8DAFAC288198}">
+<ds:datastoreItem xmlns:ds="http://schemas.openxmlformats.org/officeDocument/2006/customXml" ds:itemID="{C315F13A-AC62-4724-879E-14987FCB1CE6}">
   <ds:schemaRefs>
     <ds:schemaRef ds:uri="http://schemas.microsoft.com/VisualStudio/2011/storyboarding/control"/>
   </ds:schemaRefs>
@@ -8334,7 +8730,7 @@
 </file>
 
 <file path=customXml/itemProps9.xml><?xml version="1.0" encoding="utf-8"?>
-<ds:datastoreItem xmlns:ds="http://schemas.openxmlformats.org/officeDocument/2006/customXml" ds:itemID="{B480E993-63B5-4C2F-BB8F-99D7AE1386B6}">
+<ds:datastoreItem xmlns:ds="http://schemas.openxmlformats.org/officeDocument/2006/customXml" ds:itemID="{9A48F3C4-45B4-4BFF-BBD6-E5D8E1BB578C}">
   <ds:schemaRefs>
     <ds:schemaRef ds:uri="http://schemas.microsoft.com/VisualStudio/2011/storyboarding/control"/>
   </ds:schemaRefs>

</xml_diff>

<commit_message>
Illustration de la mise en place des pocs
</commit_message>
<xml_diff>
--- a/Speak'up API shadowing.pptx
+++ b/Speak'up API shadowing.pptx
@@ -1322,15 +1322,7 @@
             </a:r>
             <a:r>
               <a:rPr lang="fr-FR" baseline="0" dirty="0" smtClean="0"/>
-              <a:t>, l’ajout de routes </a:t>
-            </a:r>
-            <a:r>
-              <a:rPr lang="fr-FR" baseline="0" smtClean="0"/>
-              <a:t>est extrêmement </a:t>
-            </a:r>
-            <a:r>
-              <a:rPr lang="fr-FR" baseline="0" dirty="0" smtClean="0"/>
-              <a:t>simple</a:t>
+              <a:t>, l’ajout de routes est extrêmement simple</a:t>
             </a:r>
             <a:endParaRPr lang="fr-FR" dirty="0" smtClean="0"/>
           </a:p>
@@ -1416,7 +1408,36 @@
           <a:bodyPr/>
           <a:lstStyle/>
           <a:p>
-            <a:endParaRPr lang="fr-FR" dirty="0"/>
+            <a:pPr marL="0" marR="0" lvl="0" indent="0" algn="l" defTabSz="914400" rtl="0" eaLnBrk="1" fontAlgn="auto" latinLnBrk="0" hangingPunct="1">
+              <a:lnSpc>
+                <a:spcPct val="100000"/>
+              </a:lnSpc>
+              <a:spcBef>
+                <a:spcPts val="0"/>
+              </a:spcBef>
+              <a:spcAft>
+                <a:spcPts val="0"/>
+              </a:spcAft>
+              <a:buClrTx/>
+              <a:buSzTx/>
+              <a:buFontTx/>
+              <a:buNone/>
+              <a:tabLst/>
+              <a:defRPr/>
+            </a:pPr>
+            <a:r>
+              <a:rPr lang="fr-FR" b="1" dirty="0" smtClean="0"/>
+              <a:t>Validation de l’architecture :</a:t>
+            </a:r>
+            <a:r>
+              <a:rPr lang="fr-FR" b="1" baseline="0" dirty="0" smtClean="0"/>
+              <a:t> </a:t>
+            </a:r>
+            <a:r>
+              <a:rPr lang="fr-FR" b="0" baseline="0" dirty="0" smtClean="0"/>
+              <a:t>uniquement pour valider la validité de l’architecture</a:t>
+            </a:r>
+            <a:endParaRPr lang="fr-FR" b="1" dirty="0" smtClean="0"/>
           </a:p>
         </p:txBody>
       </p:sp>
@@ -5145,6 +5166,13 @@
   <p:clrMapOvr>
     <a:masterClrMapping/>
   </p:clrMapOvr>
+  <p:timing>
+    <p:tnLst>
+      <p:par>
+        <p:cTn id="1" dur="indefinite" restart="never" nodeType="tmRoot"/>
+      </p:par>
+    </p:tnLst>
+  </p:timing>
 </p:sld>
 </file>
 
@@ -5940,1086 +5968,1101 @@
           </a:p>
         </p:txBody>
       </p:sp>
-      <p:sp>
-        <p:nvSpPr>
-          <p:cNvPr id="11" name="Rectangle à coins arrondis 10"/>
-          <p:cNvSpPr/>
+      <p:grpSp>
+        <p:nvGrpSpPr>
+          <p:cNvPr id="2" name="Groupe 1"/>
+          <p:cNvGrpSpPr/>
           <p:nvPr/>
-        </p:nvSpPr>
-        <p:spPr>
+        </p:nvGrpSpPr>
+        <p:grpSpPr>
           <a:xfrm>
-            <a:off x="299002" y="2121870"/>
-            <a:ext cx="1276959" cy="1813004"/>
+            <a:off x="299002" y="222754"/>
+            <a:ext cx="5822099" cy="5911581"/>
+            <a:chOff x="299002" y="222754"/>
+            <a:chExt cx="5822099" cy="5911581"/>
           </a:xfrm>
-          <a:prstGeom prst="roundRect">
-            <a:avLst/>
-          </a:prstGeom>
-        </p:spPr>
-        <p:style>
-          <a:lnRef idx="2">
-            <a:schemeClr val="accent1">
-              <a:shade val="50000"/>
-            </a:schemeClr>
-          </a:lnRef>
-          <a:fillRef idx="1">
-            <a:schemeClr val="accent1"/>
-          </a:fillRef>
-          <a:effectRef idx="0">
-            <a:schemeClr val="accent1"/>
-          </a:effectRef>
-          <a:fontRef idx="minor">
-            <a:schemeClr val="lt1"/>
-          </a:fontRef>
-        </p:style>
-        <p:txBody>
-          <a:bodyPr rtlCol="0" anchor="ctr"/>
-          <a:lstStyle/>
-          <a:p>
-            <a:pPr algn="ctr"/>
-            <a:r>
-              <a:rPr lang="fr-FR" dirty="0" smtClean="0"/>
-              <a:t>Requêtes</a:t>
-            </a:r>
-            <a:endParaRPr lang="fr-FR" dirty="0"/>
-          </a:p>
-        </p:txBody>
-      </p:sp>
-      <p:sp>
-        <p:nvSpPr>
-          <p:cNvPr id="12" name="Rectangle 11"/>
-          <p:cNvSpPr/>
-          <p:nvPr/>
-        </p:nvSpPr>
-        <p:spPr>
-          <a:xfrm>
-            <a:off x="1992693" y="222754"/>
-            <a:ext cx="4128408" cy="5911581"/>
-          </a:xfrm>
-          <a:prstGeom prst="rect">
-            <a:avLst/>
-          </a:prstGeom>
-        </p:spPr>
-        <p:style>
-          <a:lnRef idx="2">
-            <a:schemeClr val="dk1"/>
-          </a:lnRef>
-          <a:fillRef idx="1">
-            <a:schemeClr val="lt1"/>
-          </a:fillRef>
-          <a:effectRef idx="0">
-            <a:schemeClr val="dk1"/>
-          </a:effectRef>
-          <a:fontRef idx="minor">
-            <a:schemeClr val="dk1"/>
-          </a:fontRef>
-        </p:style>
-        <p:txBody>
-          <a:bodyPr rtlCol="0" anchor="ctr"/>
-          <a:lstStyle/>
-          <a:p>
-            <a:pPr algn="ctr"/>
-            <a:endParaRPr lang="fr-FR"/>
-          </a:p>
-        </p:txBody>
-      </p:sp>
-      <p:sp>
-        <p:nvSpPr>
-          <p:cNvPr id="14" name="Rectangle à coins arrondis 13"/>
-          <p:cNvSpPr/>
-          <p:nvPr/>
-        </p:nvSpPr>
-        <p:spPr>
-          <a:xfrm>
-            <a:off x="2164557" y="419547"/>
-            <a:ext cx="597918" cy="5647765"/>
-          </a:xfrm>
-          <a:prstGeom prst="roundRect">
-            <a:avLst/>
-          </a:prstGeom>
-        </p:spPr>
-        <p:style>
-          <a:lnRef idx="2">
-            <a:schemeClr val="accent1">
-              <a:shade val="50000"/>
-            </a:schemeClr>
-          </a:lnRef>
-          <a:fillRef idx="1">
-            <a:schemeClr val="accent1"/>
-          </a:fillRef>
-          <a:effectRef idx="0">
-            <a:schemeClr val="accent1"/>
-          </a:effectRef>
-          <a:fontRef idx="minor">
-            <a:schemeClr val="lt1"/>
-          </a:fontRef>
-        </p:style>
-        <p:txBody>
-          <a:bodyPr vert="vert270" rtlCol="0" anchor="ctr">
-            <a:scene3d>
-              <a:camera prst="orthographicFront">
-                <a:rot lat="0" lon="0" rev="0"/>
-              </a:camera>
-              <a:lightRig rig="threePt" dir="t"/>
-            </a:scene3d>
-          </a:bodyPr>
-          <a:lstStyle/>
-          <a:p>
-            <a:pPr algn="ctr"/>
-            <a:r>
-              <a:rPr lang="fr-FR" sz="2100" cap="all" dirty="0" smtClean="0"/>
-              <a:t>Apache</a:t>
-            </a:r>
-            <a:endParaRPr lang="fr-FR" sz="2100" cap="all" dirty="0"/>
-          </a:p>
-        </p:txBody>
-      </p:sp>
-      <p:sp>
-        <p:nvSpPr>
-          <p:cNvPr id="18" name="Rectangle à coins arrondis 17"/>
-          <p:cNvSpPr/>
-          <p:nvPr/>
-        </p:nvSpPr>
-        <p:spPr>
-          <a:xfrm>
-            <a:off x="3286527" y="419547"/>
-            <a:ext cx="597918" cy="5647765"/>
-          </a:xfrm>
-          <a:prstGeom prst="roundRect">
-            <a:avLst/>
-          </a:prstGeom>
-        </p:spPr>
-        <p:style>
-          <a:lnRef idx="2">
-            <a:schemeClr val="accent1">
-              <a:shade val="50000"/>
-            </a:schemeClr>
-          </a:lnRef>
-          <a:fillRef idx="1">
-            <a:schemeClr val="accent1"/>
-          </a:fillRef>
-          <a:effectRef idx="0">
-            <a:schemeClr val="accent1"/>
-          </a:effectRef>
-          <a:fontRef idx="minor">
-            <a:schemeClr val="lt1"/>
-          </a:fontRef>
-        </p:style>
-        <p:txBody>
-          <a:bodyPr vert="vert270" rtlCol="0" anchor="ctr"/>
-          <a:lstStyle/>
-          <a:p>
-            <a:pPr algn="ctr"/>
-            <a:r>
-              <a:rPr lang="fr-FR" sz="2100" cap="all" dirty="0" smtClean="0"/>
-              <a:t>Serveur Scala</a:t>
-            </a:r>
-            <a:endParaRPr lang="fr-FR" sz="2100" dirty="0"/>
-          </a:p>
-        </p:txBody>
-      </p:sp>
-      <p:sp>
-        <p:nvSpPr>
-          <p:cNvPr id="20" name="Rectangle à coins arrondis 19"/>
-          <p:cNvSpPr/>
-          <p:nvPr/>
-        </p:nvSpPr>
-        <p:spPr>
-          <a:xfrm>
-            <a:off x="4879848" y="1677183"/>
-            <a:ext cx="1008060" cy="488405"/>
-          </a:xfrm>
-          <a:prstGeom prst="roundRect">
-            <a:avLst/>
-          </a:prstGeom>
-        </p:spPr>
-        <p:style>
-          <a:lnRef idx="2">
-            <a:schemeClr val="accent1">
-              <a:shade val="50000"/>
-            </a:schemeClr>
-          </a:lnRef>
-          <a:fillRef idx="1">
-            <a:schemeClr val="accent1"/>
-          </a:fillRef>
-          <a:effectRef idx="0">
-            <a:schemeClr val="accent1"/>
-          </a:effectRef>
-          <a:fontRef idx="minor">
-            <a:schemeClr val="lt1"/>
-          </a:fontRef>
-        </p:style>
-        <p:txBody>
-          <a:bodyPr rtlCol="0" anchor="ctr"/>
-          <a:lstStyle/>
-          <a:p>
-            <a:pPr algn="ctr"/>
-            <a:r>
-              <a:rPr lang="fr-FR" dirty="0"/>
-              <a:t>API</a:t>
-            </a:r>
-          </a:p>
-        </p:txBody>
-      </p:sp>
-      <p:sp>
-        <p:nvSpPr>
-          <p:cNvPr id="21" name="Rectangle à coins arrondis 20"/>
-          <p:cNvSpPr/>
-          <p:nvPr/>
-        </p:nvSpPr>
-        <p:spPr>
-          <a:xfrm>
-            <a:off x="4879848" y="2565872"/>
-            <a:ext cx="1008060" cy="488405"/>
-          </a:xfrm>
-          <a:prstGeom prst="roundRect">
-            <a:avLst/>
-          </a:prstGeom>
-        </p:spPr>
-        <p:style>
-          <a:lnRef idx="2">
-            <a:schemeClr val="accent1">
-              <a:shade val="50000"/>
-            </a:schemeClr>
-          </a:lnRef>
-          <a:fillRef idx="1">
-            <a:schemeClr val="accent1"/>
-          </a:fillRef>
-          <a:effectRef idx="0">
-            <a:schemeClr val="accent1"/>
-          </a:effectRef>
-          <a:fontRef idx="minor">
-            <a:schemeClr val="lt1"/>
-          </a:fontRef>
-        </p:style>
-        <p:txBody>
-          <a:bodyPr rtlCol="0" anchor="ctr"/>
-          <a:lstStyle/>
-          <a:p>
-            <a:pPr algn="ctr"/>
-            <a:r>
-              <a:rPr lang="fr-FR"/>
-              <a:t>API</a:t>
-            </a:r>
-            <a:endParaRPr lang="fr-FR" dirty="0"/>
-          </a:p>
-        </p:txBody>
-      </p:sp>
-      <p:sp>
-        <p:nvSpPr>
-          <p:cNvPr id="22" name="Rectangle à coins arrondis 21"/>
-          <p:cNvSpPr/>
-          <p:nvPr/>
-        </p:nvSpPr>
-        <p:spPr>
-          <a:xfrm>
-            <a:off x="4875515" y="3454561"/>
-            <a:ext cx="1008060" cy="488405"/>
-          </a:xfrm>
-          <a:prstGeom prst="roundRect">
-            <a:avLst/>
-          </a:prstGeom>
-        </p:spPr>
-        <p:style>
-          <a:lnRef idx="2">
-            <a:schemeClr val="accent1">
-              <a:shade val="50000"/>
-            </a:schemeClr>
-          </a:lnRef>
-          <a:fillRef idx="1">
-            <a:schemeClr val="accent1"/>
-          </a:fillRef>
-          <a:effectRef idx="0">
-            <a:schemeClr val="accent1"/>
-          </a:effectRef>
-          <a:fontRef idx="minor">
-            <a:schemeClr val="lt1"/>
-          </a:fontRef>
-        </p:style>
-        <p:txBody>
-          <a:bodyPr rtlCol="0" anchor="ctr"/>
-          <a:lstStyle/>
-          <a:p>
-            <a:pPr algn="ctr"/>
-            <a:r>
-              <a:rPr lang="fr-FR"/>
-              <a:t>API</a:t>
-            </a:r>
-            <a:endParaRPr lang="fr-FR" dirty="0"/>
-          </a:p>
-        </p:txBody>
-      </p:sp>
-      <p:sp>
-        <p:nvSpPr>
-          <p:cNvPr id="25" name="Rectangle à coins arrondis 24"/>
-          <p:cNvSpPr/>
-          <p:nvPr/>
-        </p:nvSpPr>
-        <p:spPr>
-          <a:xfrm>
-            <a:off x="4858332" y="788494"/>
-            <a:ext cx="1008060" cy="488405"/>
-          </a:xfrm>
-          <a:prstGeom prst="roundRect">
-            <a:avLst/>
-          </a:prstGeom>
-        </p:spPr>
-        <p:style>
-          <a:lnRef idx="2">
-            <a:schemeClr val="accent1">
-              <a:shade val="50000"/>
-            </a:schemeClr>
-          </a:lnRef>
-          <a:fillRef idx="1">
-            <a:schemeClr val="accent1"/>
-          </a:fillRef>
-          <a:effectRef idx="0">
-            <a:schemeClr val="accent1"/>
-          </a:effectRef>
-          <a:fontRef idx="minor">
-            <a:schemeClr val="lt1"/>
-          </a:fontRef>
-        </p:style>
-        <p:txBody>
-          <a:bodyPr rtlCol="0" anchor="ctr"/>
-          <a:lstStyle/>
-          <a:p>
-            <a:pPr algn="ctr"/>
-            <a:r>
-              <a:rPr lang="fr-FR" dirty="0" smtClean="0"/>
-              <a:t>API</a:t>
-            </a:r>
-            <a:endParaRPr lang="fr-FR" dirty="0"/>
-          </a:p>
-        </p:txBody>
-      </p:sp>
-      <p:sp>
-        <p:nvSpPr>
-          <p:cNvPr id="28" name="Rectangle à coins arrondis 27"/>
-          <p:cNvSpPr/>
-          <p:nvPr/>
-        </p:nvSpPr>
-        <p:spPr>
-          <a:xfrm>
-            <a:off x="4881392" y="4343250"/>
-            <a:ext cx="1008060" cy="488405"/>
-          </a:xfrm>
-          <a:prstGeom prst="roundRect">
-            <a:avLst/>
-          </a:prstGeom>
-        </p:spPr>
-        <p:style>
-          <a:lnRef idx="2">
-            <a:schemeClr val="accent1">
-              <a:shade val="50000"/>
-            </a:schemeClr>
-          </a:lnRef>
-          <a:fillRef idx="1">
-            <a:schemeClr val="accent1"/>
-          </a:fillRef>
-          <a:effectRef idx="0">
-            <a:schemeClr val="accent1"/>
-          </a:effectRef>
-          <a:fontRef idx="minor">
-            <a:schemeClr val="lt1"/>
-          </a:fontRef>
-        </p:style>
-        <p:txBody>
-          <a:bodyPr rtlCol="0" anchor="ctr"/>
-          <a:lstStyle/>
-          <a:p>
-            <a:pPr algn="ctr"/>
-            <a:r>
-              <a:rPr lang="fr-FR"/>
-              <a:t>API</a:t>
-            </a:r>
-            <a:endParaRPr lang="fr-FR" dirty="0"/>
-          </a:p>
-        </p:txBody>
-      </p:sp>
-      <p:sp>
-        <p:nvSpPr>
-          <p:cNvPr id="29" name="Rectangle à coins arrondis 28"/>
-          <p:cNvSpPr/>
-          <p:nvPr/>
-        </p:nvSpPr>
-        <p:spPr>
-          <a:xfrm>
-            <a:off x="4879848" y="5231941"/>
-            <a:ext cx="1008060" cy="488405"/>
-          </a:xfrm>
-          <a:prstGeom prst="roundRect">
-            <a:avLst/>
-          </a:prstGeom>
-        </p:spPr>
-        <p:style>
-          <a:lnRef idx="2">
-            <a:schemeClr val="accent1">
-              <a:shade val="50000"/>
-            </a:schemeClr>
-          </a:lnRef>
-          <a:fillRef idx="1">
-            <a:schemeClr val="accent1"/>
-          </a:fillRef>
-          <a:effectRef idx="0">
-            <a:schemeClr val="accent1"/>
-          </a:effectRef>
-          <a:fontRef idx="minor">
-            <a:schemeClr val="lt1"/>
-          </a:fontRef>
-        </p:style>
-        <p:txBody>
-          <a:bodyPr rtlCol="0" anchor="ctr"/>
-          <a:lstStyle/>
-          <a:p>
-            <a:pPr algn="ctr"/>
-            <a:r>
-              <a:rPr lang="fr-FR"/>
-              <a:t>API</a:t>
-            </a:r>
-            <a:endParaRPr lang="fr-FR" dirty="0"/>
-          </a:p>
-        </p:txBody>
-      </p:sp>
-      <p:cxnSp>
-        <p:nvCxnSpPr>
-          <p:cNvPr id="31" name="Connecteur droit avec flèche 30"/>
-          <p:cNvCxnSpPr/>
-          <p:nvPr/>
-        </p:nvCxnSpPr>
-        <p:spPr>
-          <a:xfrm>
-            <a:off x="1575961" y="2431228"/>
-            <a:ext cx="588596" cy="0"/>
-          </a:xfrm>
-          <a:prstGeom prst="straightConnector1">
-            <a:avLst/>
-          </a:prstGeom>
-          <a:ln w="19050">
-            <a:tailEnd type="triangle"/>
-          </a:ln>
-        </p:spPr>
-        <p:style>
-          <a:lnRef idx="1">
-            <a:schemeClr val="accent1"/>
-          </a:lnRef>
-          <a:fillRef idx="0">
-            <a:schemeClr val="accent1"/>
-          </a:fillRef>
-          <a:effectRef idx="0">
-            <a:schemeClr val="accent1"/>
-          </a:effectRef>
-          <a:fontRef idx="minor">
-            <a:schemeClr val="tx1"/>
-          </a:fontRef>
-        </p:style>
-      </p:cxnSp>
-      <p:cxnSp>
-        <p:nvCxnSpPr>
-          <p:cNvPr id="32" name="Connecteur droit avec flèche 31"/>
-          <p:cNvCxnSpPr/>
-          <p:nvPr/>
-        </p:nvCxnSpPr>
-        <p:spPr>
-          <a:xfrm>
-            <a:off x="1575961" y="2601784"/>
-            <a:ext cx="588596" cy="0"/>
-          </a:xfrm>
-          <a:prstGeom prst="straightConnector1">
-            <a:avLst/>
-          </a:prstGeom>
-          <a:ln w="19050">
-            <a:tailEnd type="triangle"/>
-          </a:ln>
-        </p:spPr>
-        <p:style>
-          <a:lnRef idx="1">
-            <a:schemeClr val="accent1"/>
-          </a:lnRef>
-          <a:fillRef idx="0">
-            <a:schemeClr val="accent1"/>
-          </a:fillRef>
-          <a:effectRef idx="0">
-            <a:schemeClr val="accent1"/>
-          </a:effectRef>
-          <a:fontRef idx="minor">
-            <a:schemeClr val="tx1"/>
-          </a:fontRef>
-        </p:style>
-      </p:cxnSp>
-      <p:cxnSp>
-        <p:nvCxnSpPr>
-          <p:cNvPr id="33" name="Connecteur droit avec flèche 32"/>
-          <p:cNvCxnSpPr/>
-          <p:nvPr/>
-        </p:nvCxnSpPr>
-        <p:spPr>
-          <a:xfrm>
-            <a:off x="1575961" y="2772340"/>
-            <a:ext cx="588596" cy="0"/>
-          </a:xfrm>
-          <a:prstGeom prst="straightConnector1">
-            <a:avLst/>
-          </a:prstGeom>
-          <a:ln w="19050">
-            <a:tailEnd type="triangle"/>
-          </a:ln>
-        </p:spPr>
-        <p:style>
-          <a:lnRef idx="1">
-            <a:schemeClr val="accent1"/>
-          </a:lnRef>
-          <a:fillRef idx="0">
-            <a:schemeClr val="accent1"/>
-          </a:fillRef>
-          <a:effectRef idx="0">
-            <a:schemeClr val="accent1"/>
-          </a:effectRef>
-          <a:fontRef idx="minor">
-            <a:schemeClr val="tx1"/>
-          </a:fontRef>
-        </p:style>
-      </p:cxnSp>
-      <p:cxnSp>
-        <p:nvCxnSpPr>
-          <p:cNvPr id="34" name="Connecteur droit avec flèche 33"/>
-          <p:cNvCxnSpPr/>
-          <p:nvPr/>
-        </p:nvCxnSpPr>
-        <p:spPr>
-          <a:xfrm>
-            <a:off x="1575961" y="2942896"/>
-            <a:ext cx="588596" cy="0"/>
-          </a:xfrm>
-          <a:prstGeom prst="straightConnector1">
-            <a:avLst/>
-          </a:prstGeom>
-          <a:ln w="19050">
-            <a:tailEnd type="triangle"/>
-          </a:ln>
-        </p:spPr>
-        <p:style>
-          <a:lnRef idx="1">
-            <a:schemeClr val="accent1"/>
-          </a:lnRef>
-          <a:fillRef idx="0">
-            <a:schemeClr val="accent1"/>
-          </a:fillRef>
-          <a:effectRef idx="0">
-            <a:schemeClr val="accent1"/>
-          </a:effectRef>
-          <a:fontRef idx="minor">
-            <a:schemeClr val="tx1"/>
-          </a:fontRef>
-        </p:style>
-      </p:cxnSp>
-      <p:cxnSp>
-        <p:nvCxnSpPr>
-          <p:cNvPr id="35" name="Connecteur droit avec flèche 34"/>
-          <p:cNvCxnSpPr/>
-          <p:nvPr/>
-        </p:nvCxnSpPr>
-        <p:spPr>
-          <a:xfrm>
-            <a:off x="1575961" y="3113452"/>
-            <a:ext cx="588596" cy="0"/>
-          </a:xfrm>
-          <a:prstGeom prst="straightConnector1">
-            <a:avLst/>
-          </a:prstGeom>
-          <a:ln w="19050">
-            <a:tailEnd type="triangle"/>
-          </a:ln>
-        </p:spPr>
-        <p:style>
-          <a:lnRef idx="1">
-            <a:schemeClr val="accent1"/>
-          </a:lnRef>
-          <a:fillRef idx="0">
-            <a:schemeClr val="accent1"/>
-          </a:fillRef>
-          <a:effectRef idx="0">
-            <a:schemeClr val="accent1"/>
-          </a:effectRef>
-          <a:fontRef idx="minor">
-            <a:schemeClr val="tx1"/>
-          </a:fontRef>
-        </p:style>
-      </p:cxnSp>
-      <p:cxnSp>
-        <p:nvCxnSpPr>
-          <p:cNvPr id="36" name="Connecteur droit avec flèche 35"/>
-          <p:cNvCxnSpPr/>
-          <p:nvPr/>
-        </p:nvCxnSpPr>
-        <p:spPr>
-          <a:xfrm>
-            <a:off x="1575961" y="3284007"/>
-            <a:ext cx="588596" cy="0"/>
-          </a:xfrm>
-          <a:prstGeom prst="straightConnector1">
-            <a:avLst/>
-          </a:prstGeom>
-          <a:ln w="19050">
-            <a:tailEnd type="triangle"/>
-          </a:ln>
-        </p:spPr>
-        <p:style>
-          <a:lnRef idx="1">
-            <a:schemeClr val="accent1"/>
-          </a:lnRef>
-          <a:fillRef idx="0">
-            <a:schemeClr val="accent1"/>
-          </a:fillRef>
-          <a:effectRef idx="0">
-            <a:schemeClr val="accent1"/>
-          </a:effectRef>
-          <a:fontRef idx="minor">
-            <a:schemeClr val="tx1"/>
-          </a:fontRef>
-        </p:style>
-      </p:cxnSp>
-      <p:cxnSp>
-        <p:nvCxnSpPr>
-          <p:cNvPr id="37" name="Connecteur droit avec flèche 36"/>
-          <p:cNvCxnSpPr/>
-          <p:nvPr/>
-        </p:nvCxnSpPr>
-        <p:spPr>
-          <a:xfrm>
-            <a:off x="1575961" y="3454561"/>
-            <a:ext cx="588596" cy="0"/>
-          </a:xfrm>
-          <a:prstGeom prst="straightConnector1">
-            <a:avLst/>
-          </a:prstGeom>
-          <a:ln w="19050">
-            <a:tailEnd type="triangle"/>
-          </a:ln>
-        </p:spPr>
-        <p:style>
-          <a:lnRef idx="1">
-            <a:schemeClr val="accent1"/>
-          </a:lnRef>
-          <a:fillRef idx="0">
-            <a:schemeClr val="accent1"/>
-          </a:fillRef>
-          <a:effectRef idx="0">
-            <a:schemeClr val="accent1"/>
-          </a:effectRef>
-          <a:fontRef idx="minor">
-            <a:schemeClr val="tx1"/>
-          </a:fontRef>
-        </p:style>
-      </p:cxnSp>
-      <p:cxnSp>
-        <p:nvCxnSpPr>
-          <p:cNvPr id="38" name="Connecteur droit avec flèche 37"/>
-          <p:cNvCxnSpPr>
-            <a:stCxn id="14" idx="3"/>
-            <a:endCxn id="18" idx="1"/>
-          </p:cNvCxnSpPr>
-          <p:nvPr/>
-        </p:nvCxnSpPr>
-        <p:spPr>
-          <a:xfrm>
-            <a:off x="2762475" y="3243430"/>
-            <a:ext cx="524052" cy="0"/>
-          </a:xfrm>
-          <a:prstGeom prst="straightConnector1">
-            <a:avLst/>
-          </a:prstGeom>
-          <a:ln w="19050">
-            <a:tailEnd type="triangle"/>
-          </a:ln>
-        </p:spPr>
-        <p:style>
-          <a:lnRef idx="1">
-            <a:schemeClr val="accent1"/>
-          </a:lnRef>
-          <a:fillRef idx="0">
-            <a:schemeClr val="accent1"/>
-          </a:fillRef>
-          <a:effectRef idx="0">
-            <a:schemeClr val="accent1"/>
-          </a:effectRef>
-          <a:fontRef idx="minor">
-            <a:schemeClr val="tx1"/>
-          </a:fontRef>
-        </p:style>
-      </p:cxnSp>
-      <p:cxnSp>
-        <p:nvCxnSpPr>
-          <p:cNvPr id="43" name="Connecteur droit avec flèche 42"/>
-          <p:cNvCxnSpPr/>
-          <p:nvPr/>
-        </p:nvCxnSpPr>
-        <p:spPr>
-          <a:xfrm>
-            <a:off x="1575961" y="3617718"/>
-            <a:ext cx="588596" cy="0"/>
-          </a:xfrm>
-          <a:prstGeom prst="straightConnector1">
-            <a:avLst/>
-          </a:prstGeom>
-          <a:ln w="19050">
-            <a:tailEnd type="triangle"/>
-          </a:ln>
-        </p:spPr>
-        <p:style>
-          <a:lnRef idx="1">
-            <a:schemeClr val="accent1"/>
-          </a:lnRef>
-          <a:fillRef idx="0">
-            <a:schemeClr val="accent1"/>
-          </a:fillRef>
-          <a:effectRef idx="0">
-            <a:schemeClr val="accent1"/>
-          </a:effectRef>
-          <a:fontRef idx="minor">
-            <a:schemeClr val="tx1"/>
-          </a:fontRef>
-        </p:style>
-      </p:cxnSp>
-      <p:cxnSp>
-        <p:nvCxnSpPr>
-          <p:cNvPr id="44" name="Connecteur droit avec flèche 43"/>
-          <p:cNvCxnSpPr/>
-          <p:nvPr/>
-        </p:nvCxnSpPr>
-        <p:spPr>
-          <a:xfrm flipV="1">
-            <a:off x="3884445" y="1011220"/>
-            <a:ext cx="973887" cy="796065"/>
-          </a:xfrm>
-          <a:prstGeom prst="straightConnector1">
-            <a:avLst/>
-          </a:prstGeom>
-          <a:ln w="19050">
-            <a:tailEnd type="triangle"/>
-          </a:ln>
-        </p:spPr>
-        <p:style>
-          <a:lnRef idx="1">
-            <a:schemeClr val="accent1"/>
-          </a:lnRef>
-          <a:fillRef idx="0">
-            <a:schemeClr val="accent1"/>
-          </a:fillRef>
-          <a:effectRef idx="0">
-            <a:schemeClr val="accent1"/>
-          </a:effectRef>
-          <a:fontRef idx="minor">
-            <a:schemeClr val="tx1"/>
-          </a:fontRef>
-        </p:style>
-      </p:cxnSp>
-      <p:cxnSp>
-        <p:nvCxnSpPr>
-          <p:cNvPr id="49" name="Connecteur droit avec flèche 48"/>
-          <p:cNvCxnSpPr>
-            <a:endCxn id="20" idx="1"/>
-          </p:cNvCxnSpPr>
-          <p:nvPr/>
-        </p:nvCxnSpPr>
-        <p:spPr>
-          <a:xfrm>
-            <a:off x="3905961" y="1807285"/>
-            <a:ext cx="973887" cy="114101"/>
-          </a:xfrm>
-          <a:prstGeom prst="straightConnector1">
-            <a:avLst/>
-          </a:prstGeom>
-          <a:ln w="19050">
-            <a:tailEnd type="triangle"/>
-          </a:ln>
-        </p:spPr>
-        <p:style>
-          <a:lnRef idx="1">
-            <a:schemeClr val="accent1"/>
-          </a:lnRef>
-          <a:fillRef idx="0">
-            <a:schemeClr val="accent1"/>
-          </a:fillRef>
-          <a:effectRef idx="0">
-            <a:schemeClr val="accent1"/>
-          </a:effectRef>
-          <a:fontRef idx="minor">
-            <a:schemeClr val="tx1"/>
-          </a:fontRef>
-        </p:style>
-      </p:cxnSp>
-      <p:cxnSp>
-        <p:nvCxnSpPr>
-          <p:cNvPr id="52" name="Connecteur droit avec flèche 51"/>
-          <p:cNvCxnSpPr>
-            <a:endCxn id="21" idx="1"/>
-          </p:cNvCxnSpPr>
-          <p:nvPr/>
-        </p:nvCxnSpPr>
-        <p:spPr>
-          <a:xfrm>
-            <a:off x="3905961" y="1807285"/>
-            <a:ext cx="973887" cy="1002790"/>
-          </a:xfrm>
-          <a:prstGeom prst="straightConnector1">
-            <a:avLst/>
-          </a:prstGeom>
-          <a:ln w="19050">
-            <a:tailEnd type="triangle"/>
-          </a:ln>
-        </p:spPr>
-        <p:style>
-          <a:lnRef idx="1">
-            <a:schemeClr val="accent1"/>
-          </a:lnRef>
-          <a:fillRef idx="0">
-            <a:schemeClr val="accent1"/>
-          </a:fillRef>
-          <a:effectRef idx="0">
-            <a:schemeClr val="accent1"/>
-          </a:effectRef>
-          <a:fontRef idx="minor">
-            <a:schemeClr val="tx1"/>
-          </a:fontRef>
-        </p:style>
-      </p:cxnSp>
-      <p:cxnSp>
-        <p:nvCxnSpPr>
-          <p:cNvPr id="55" name="Connecteur droit avec flèche 54"/>
-          <p:cNvCxnSpPr/>
-          <p:nvPr/>
-        </p:nvCxnSpPr>
-        <p:spPr>
-          <a:xfrm>
-            <a:off x="3871788" y="2429979"/>
-            <a:ext cx="986544" cy="401888"/>
-          </a:xfrm>
-          <a:prstGeom prst="straightConnector1">
-            <a:avLst/>
-          </a:prstGeom>
-          <a:ln w="19050">
-            <a:tailEnd type="triangle"/>
-          </a:ln>
-        </p:spPr>
-        <p:style>
-          <a:lnRef idx="1">
-            <a:schemeClr val="accent1"/>
-          </a:lnRef>
-          <a:fillRef idx="0">
-            <a:schemeClr val="accent1"/>
-          </a:fillRef>
-          <a:effectRef idx="0">
-            <a:schemeClr val="accent1"/>
-          </a:effectRef>
-          <a:fontRef idx="minor">
-            <a:schemeClr val="tx1"/>
-          </a:fontRef>
-        </p:style>
-      </p:cxnSp>
-      <p:cxnSp>
-        <p:nvCxnSpPr>
-          <p:cNvPr id="58" name="Connecteur droit avec flèche 57"/>
-          <p:cNvCxnSpPr>
-            <a:endCxn id="22" idx="1"/>
-          </p:cNvCxnSpPr>
-          <p:nvPr/>
-        </p:nvCxnSpPr>
-        <p:spPr>
-          <a:xfrm>
-            <a:off x="3871788" y="2451771"/>
-            <a:ext cx="1003727" cy="1246993"/>
-          </a:xfrm>
-          <a:prstGeom prst="straightConnector1">
-            <a:avLst/>
-          </a:prstGeom>
-          <a:ln w="19050">
-            <a:tailEnd type="triangle"/>
-          </a:ln>
-        </p:spPr>
-        <p:style>
-          <a:lnRef idx="1">
-            <a:schemeClr val="accent1"/>
-          </a:lnRef>
-          <a:fillRef idx="0">
-            <a:schemeClr val="accent1"/>
-          </a:fillRef>
-          <a:effectRef idx="0">
-            <a:schemeClr val="accent1"/>
-          </a:effectRef>
-          <a:fontRef idx="minor">
-            <a:schemeClr val="tx1"/>
-          </a:fontRef>
-        </p:style>
-      </p:cxnSp>
-      <p:cxnSp>
-        <p:nvCxnSpPr>
-          <p:cNvPr id="63" name="Connecteur droit avec flèche 62"/>
-          <p:cNvCxnSpPr>
-            <a:endCxn id="29" idx="1"/>
-          </p:cNvCxnSpPr>
-          <p:nvPr/>
-        </p:nvCxnSpPr>
-        <p:spPr>
-          <a:xfrm>
-            <a:off x="3905961" y="4839612"/>
-            <a:ext cx="973887" cy="636532"/>
-          </a:xfrm>
-          <a:prstGeom prst="straightConnector1">
-            <a:avLst/>
-          </a:prstGeom>
-          <a:ln w="19050">
-            <a:tailEnd type="triangle"/>
-          </a:ln>
-        </p:spPr>
-        <p:style>
-          <a:lnRef idx="1">
-            <a:schemeClr val="accent1"/>
-          </a:lnRef>
-          <a:fillRef idx="0">
-            <a:schemeClr val="accent1"/>
-          </a:fillRef>
-          <a:effectRef idx="0">
-            <a:schemeClr val="accent1"/>
-          </a:effectRef>
-          <a:fontRef idx="minor">
-            <a:schemeClr val="tx1"/>
-          </a:fontRef>
-        </p:style>
-      </p:cxnSp>
-      <p:cxnSp>
-        <p:nvCxnSpPr>
-          <p:cNvPr id="66" name="Connecteur droit avec flèche 65"/>
-          <p:cNvCxnSpPr/>
-          <p:nvPr/>
-        </p:nvCxnSpPr>
-        <p:spPr>
-          <a:xfrm flipV="1">
-            <a:off x="3905961" y="4595410"/>
-            <a:ext cx="969554" cy="244202"/>
-          </a:xfrm>
-          <a:prstGeom prst="straightConnector1">
-            <a:avLst/>
-          </a:prstGeom>
-          <a:ln w="19050">
-            <a:tailEnd type="triangle"/>
-          </a:ln>
-        </p:spPr>
-        <p:style>
-          <a:lnRef idx="1">
-            <a:schemeClr val="accent1"/>
-          </a:lnRef>
-          <a:fillRef idx="0">
-            <a:schemeClr val="accent1"/>
-          </a:fillRef>
-          <a:effectRef idx="0">
-            <a:schemeClr val="accent1"/>
-          </a:effectRef>
-          <a:fontRef idx="minor">
-            <a:schemeClr val="tx1"/>
-          </a:fontRef>
-        </p:style>
-      </p:cxnSp>
-      <p:cxnSp>
-        <p:nvCxnSpPr>
-          <p:cNvPr id="69" name="Connecteur droit avec flèche 68"/>
-          <p:cNvCxnSpPr>
-            <a:endCxn id="22" idx="1"/>
-          </p:cNvCxnSpPr>
-          <p:nvPr/>
-        </p:nvCxnSpPr>
-        <p:spPr>
-          <a:xfrm flipV="1">
-            <a:off x="3886611" y="3698764"/>
-            <a:ext cx="988904" cy="1140848"/>
-          </a:xfrm>
-          <a:prstGeom prst="straightConnector1">
-            <a:avLst/>
-          </a:prstGeom>
-          <a:ln w="19050">
-            <a:tailEnd type="triangle"/>
-          </a:ln>
-        </p:spPr>
-        <p:style>
-          <a:lnRef idx="1">
-            <a:schemeClr val="accent1"/>
-          </a:lnRef>
-          <a:fillRef idx="0">
-            <a:schemeClr val="accent1"/>
-          </a:fillRef>
-          <a:effectRef idx="0">
-            <a:schemeClr val="accent1"/>
-          </a:effectRef>
-          <a:fontRef idx="minor">
-            <a:schemeClr val="tx1"/>
-          </a:fontRef>
-        </p:style>
-      </p:cxnSp>
-      <p:cxnSp>
-        <p:nvCxnSpPr>
-          <p:cNvPr id="72" name="Connecteur droit avec flèche 71"/>
-          <p:cNvCxnSpPr/>
-          <p:nvPr/>
-        </p:nvCxnSpPr>
-        <p:spPr>
-          <a:xfrm flipV="1">
-            <a:off x="3902991" y="2831867"/>
-            <a:ext cx="970358" cy="785851"/>
-          </a:xfrm>
-          <a:prstGeom prst="straightConnector1">
-            <a:avLst/>
-          </a:prstGeom>
-          <a:ln w="19050">
-            <a:tailEnd type="triangle"/>
-          </a:ln>
-        </p:spPr>
-        <p:style>
-          <a:lnRef idx="1">
-            <a:schemeClr val="accent1"/>
-          </a:lnRef>
-          <a:fillRef idx="0">
-            <a:schemeClr val="accent1"/>
-          </a:fillRef>
-          <a:effectRef idx="0">
-            <a:schemeClr val="accent1"/>
-          </a:effectRef>
-          <a:fontRef idx="minor">
-            <a:schemeClr val="tx1"/>
-          </a:fontRef>
-        </p:style>
-      </p:cxnSp>
-      <p:cxnSp>
-        <p:nvCxnSpPr>
-          <p:cNvPr id="76" name="Connecteur droit avec flèche 75"/>
-          <p:cNvCxnSpPr/>
-          <p:nvPr/>
-        </p:nvCxnSpPr>
-        <p:spPr>
-          <a:xfrm>
-            <a:off x="3900825" y="3633768"/>
-            <a:ext cx="957507" cy="64995"/>
-          </a:xfrm>
-          <a:prstGeom prst="straightConnector1">
-            <a:avLst/>
-          </a:prstGeom>
-          <a:ln w="19050">
-            <a:tailEnd type="triangle"/>
-          </a:ln>
-        </p:spPr>
-        <p:style>
-          <a:lnRef idx="1">
-            <a:schemeClr val="accent1"/>
-          </a:lnRef>
-          <a:fillRef idx="0">
-            <a:schemeClr val="accent1"/>
-          </a:fillRef>
-          <a:effectRef idx="0">
-            <a:schemeClr val="accent1"/>
-          </a:effectRef>
-          <a:fontRef idx="minor">
-            <a:schemeClr val="tx1"/>
-          </a:fontRef>
-        </p:style>
-      </p:cxnSp>
+        </p:grpSpPr>
+        <p:sp>
+          <p:nvSpPr>
+            <p:cNvPr id="11" name="Rectangle à coins arrondis 10"/>
+            <p:cNvSpPr/>
+            <p:nvPr/>
+          </p:nvSpPr>
+          <p:spPr>
+            <a:xfrm>
+              <a:off x="299002" y="2121870"/>
+              <a:ext cx="1276959" cy="1813004"/>
+            </a:xfrm>
+            <a:prstGeom prst="roundRect">
+              <a:avLst/>
+            </a:prstGeom>
+          </p:spPr>
+          <p:style>
+            <a:lnRef idx="2">
+              <a:schemeClr val="accent1">
+                <a:shade val="50000"/>
+              </a:schemeClr>
+            </a:lnRef>
+            <a:fillRef idx="1">
+              <a:schemeClr val="accent1"/>
+            </a:fillRef>
+            <a:effectRef idx="0">
+              <a:schemeClr val="accent1"/>
+            </a:effectRef>
+            <a:fontRef idx="minor">
+              <a:schemeClr val="lt1"/>
+            </a:fontRef>
+          </p:style>
+          <p:txBody>
+            <a:bodyPr rtlCol="0" anchor="ctr"/>
+            <a:lstStyle/>
+            <a:p>
+              <a:pPr algn="ctr"/>
+              <a:r>
+                <a:rPr lang="fr-FR" dirty="0" smtClean="0"/>
+                <a:t>Requêtes</a:t>
+              </a:r>
+              <a:endParaRPr lang="fr-FR" dirty="0"/>
+            </a:p>
+          </p:txBody>
+        </p:sp>
+        <p:sp>
+          <p:nvSpPr>
+            <p:cNvPr id="12" name="Rectangle 11"/>
+            <p:cNvSpPr/>
+            <p:nvPr/>
+          </p:nvSpPr>
+          <p:spPr>
+            <a:xfrm>
+              <a:off x="1992693" y="222754"/>
+              <a:ext cx="4128408" cy="5911581"/>
+            </a:xfrm>
+            <a:prstGeom prst="rect">
+              <a:avLst/>
+            </a:prstGeom>
+          </p:spPr>
+          <p:style>
+            <a:lnRef idx="2">
+              <a:schemeClr val="dk1"/>
+            </a:lnRef>
+            <a:fillRef idx="1">
+              <a:schemeClr val="lt1"/>
+            </a:fillRef>
+            <a:effectRef idx="0">
+              <a:schemeClr val="dk1"/>
+            </a:effectRef>
+            <a:fontRef idx="minor">
+              <a:schemeClr val="dk1"/>
+            </a:fontRef>
+          </p:style>
+          <p:txBody>
+            <a:bodyPr rtlCol="0" anchor="ctr"/>
+            <a:lstStyle/>
+            <a:p>
+              <a:pPr algn="ctr"/>
+              <a:endParaRPr lang="fr-FR"/>
+            </a:p>
+          </p:txBody>
+        </p:sp>
+        <p:sp>
+          <p:nvSpPr>
+            <p:cNvPr id="14" name="Rectangle à coins arrondis 13"/>
+            <p:cNvSpPr/>
+            <p:nvPr/>
+          </p:nvSpPr>
+          <p:spPr>
+            <a:xfrm>
+              <a:off x="2164557" y="419547"/>
+              <a:ext cx="597918" cy="5647765"/>
+            </a:xfrm>
+            <a:prstGeom prst="roundRect">
+              <a:avLst/>
+            </a:prstGeom>
+          </p:spPr>
+          <p:style>
+            <a:lnRef idx="2">
+              <a:schemeClr val="accent1">
+                <a:shade val="50000"/>
+              </a:schemeClr>
+            </a:lnRef>
+            <a:fillRef idx="1">
+              <a:schemeClr val="accent1"/>
+            </a:fillRef>
+            <a:effectRef idx="0">
+              <a:schemeClr val="accent1"/>
+            </a:effectRef>
+            <a:fontRef idx="minor">
+              <a:schemeClr val="lt1"/>
+            </a:fontRef>
+          </p:style>
+          <p:txBody>
+            <a:bodyPr vert="vert270" rtlCol="0" anchor="ctr">
+              <a:scene3d>
+                <a:camera prst="orthographicFront">
+                  <a:rot lat="0" lon="0" rev="0"/>
+                </a:camera>
+                <a:lightRig rig="threePt" dir="t"/>
+              </a:scene3d>
+            </a:bodyPr>
+            <a:lstStyle/>
+            <a:p>
+              <a:pPr algn="ctr"/>
+              <a:r>
+                <a:rPr lang="fr-FR" sz="2100" cap="all" dirty="0" smtClean="0"/>
+                <a:t>Apache</a:t>
+              </a:r>
+              <a:endParaRPr lang="fr-FR" sz="2100" cap="all" dirty="0"/>
+            </a:p>
+          </p:txBody>
+        </p:sp>
+        <p:sp>
+          <p:nvSpPr>
+            <p:cNvPr id="18" name="Rectangle à coins arrondis 17"/>
+            <p:cNvSpPr/>
+            <p:nvPr/>
+          </p:nvSpPr>
+          <p:spPr>
+            <a:xfrm>
+              <a:off x="3286527" y="419547"/>
+              <a:ext cx="597918" cy="5647765"/>
+            </a:xfrm>
+            <a:prstGeom prst="roundRect">
+              <a:avLst/>
+            </a:prstGeom>
+          </p:spPr>
+          <p:style>
+            <a:lnRef idx="2">
+              <a:schemeClr val="accent1">
+                <a:shade val="50000"/>
+              </a:schemeClr>
+            </a:lnRef>
+            <a:fillRef idx="1">
+              <a:schemeClr val="accent1"/>
+            </a:fillRef>
+            <a:effectRef idx="0">
+              <a:schemeClr val="accent1"/>
+            </a:effectRef>
+            <a:fontRef idx="minor">
+              <a:schemeClr val="lt1"/>
+            </a:fontRef>
+          </p:style>
+          <p:txBody>
+            <a:bodyPr vert="vert270" rtlCol="0" anchor="ctr"/>
+            <a:lstStyle/>
+            <a:p>
+              <a:pPr algn="ctr"/>
+              <a:r>
+                <a:rPr lang="fr-FR" sz="2100" cap="all" dirty="0" smtClean="0"/>
+                <a:t>Serveur Scala</a:t>
+              </a:r>
+              <a:endParaRPr lang="fr-FR" sz="2100" dirty="0"/>
+            </a:p>
+          </p:txBody>
+        </p:sp>
+        <p:sp>
+          <p:nvSpPr>
+            <p:cNvPr id="20" name="Rectangle à coins arrondis 19"/>
+            <p:cNvSpPr/>
+            <p:nvPr/>
+          </p:nvSpPr>
+          <p:spPr>
+            <a:xfrm>
+              <a:off x="4879848" y="1677183"/>
+              <a:ext cx="1008060" cy="488405"/>
+            </a:xfrm>
+            <a:prstGeom prst="roundRect">
+              <a:avLst/>
+            </a:prstGeom>
+          </p:spPr>
+          <p:style>
+            <a:lnRef idx="2">
+              <a:schemeClr val="accent1">
+                <a:shade val="50000"/>
+              </a:schemeClr>
+            </a:lnRef>
+            <a:fillRef idx="1">
+              <a:schemeClr val="accent1"/>
+            </a:fillRef>
+            <a:effectRef idx="0">
+              <a:schemeClr val="accent1"/>
+            </a:effectRef>
+            <a:fontRef idx="minor">
+              <a:schemeClr val="lt1"/>
+            </a:fontRef>
+          </p:style>
+          <p:txBody>
+            <a:bodyPr rtlCol="0" anchor="ctr"/>
+            <a:lstStyle/>
+            <a:p>
+              <a:pPr algn="ctr"/>
+              <a:r>
+                <a:rPr lang="fr-FR" dirty="0"/>
+                <a:t>API</a:t>
+              </a:r>
+            </a:p>
+          </p:txBody>
+        </p:sp>
+        <p:sp>
+          <p:nvSpPr>
+            <p:cNvPr id="21" name="Rectangle à coins arrondis 20"/>
+            <p:cNvSpPr/>
+            <p:nvPr/>
+          </p:nvSpPr>
+          <p:spPr>
+            <a:xfrm>
+              <a:off x="4879848" y="2565872"/>
+              <a:ext cx="1008060" cy="488405"/>
+            </a:xfrm>
+            <a:prstGeom prst="roundRect">
+              <a:avLst/>
+            </a:prstGeom>
+          </p:spPr>
+          <p:style>
+            <a:lnRef idx="2">
+              <a:schemeClr val="accent1">
+                <a:shade val="50000"/>
+              </a:schemeClr>
+            </a:lnRef>
+            <a:fillRef idx="1">
+              <a:schemeClr val="accent1"/>
+            </a:fillRef>
+            <a:effectRef idx="0">
+              <a:schemeClr val="accent1"/>
+            </a:effectRef>
+            <a:fontRef idx="minor">
+              <a:schemeClr val="lt1"/>
+            </a:fontRef>
+          </p:style>
+          <p:txBody>
+            <a:bodyPr rtlCol="0" anchor="ctr"/>
+            <a:lstStyle/>
+            <a:p>
+              <a:pPr algn="ctr"/>
+              <a:r>
+                <a:rPr lang="fr-FR"/>
+                <a:t>API</a:t>
+              </a:r>
+              <a:endParaRPr lang="fr-FR" dirty="0"/>
+            </a:p>
+          </p:txBody>
+        </p:sp>
+        <p:sp>
+          <p:nvSpPr>
+            <p:cNvPr id="22" name="Rectangle à coins arrondis 21"/>
+            <p:cNvSpPr/>
+            <p:nvPr/>
+          </p:nvSpPr>
+          <p:spPr>
+            <a:xfrm>
+              <a:off x="4875515" y="3454561"/>
+              <a:ext cx="1008060" cy="488405"/>
+            </a:xfrm>
+            <a:prstGeom prst="roundRect">
+              <a:avLst/>
+            </a:prstGeom>
+          </p:spPr>
+          <p:style>
+            <a:lnRef idx="2">
+              <a:schemeClr val="accent1">
+                <a:shade val="50000"/>
+              </a:schemeClr>
+            </a:lnRef>
+            <a:fillRef idx="1">
+              <a:schemeClr val="accent1"/>
+            </a:fillRef>
+            <a:effectRef idx="0">
+              <a:schemeClr val="accent1"/>
+            </a:effectRef>
+            <a:fontRef idx="minor">
+              <a:schemeClr val="lt1"/>
+            </a:fontRef>
+          </p:style>
+          <p:txBody>
+            <a:bodyPr rtlCol="0" anchor="ctr"/>
+            <a:lstStyle/>
+            <a:p>
+              <a:pPr algn="ctr"/>
+              <a:r>
+                <a:rPr lang="fr-FR"/>
+                <a:t>API</a:t>
+              </a:r>
+              <a:endParaRPr lang="fr-FR" dirty="0"/>
+            </a:p>
+          </p:txBody>
+        </p:sp>
+        <p:sp>
+          <p:nvSpPr>
+            <p:cNvPr id="25" name="Rectangle à coins arrondis 24"/>
+            <p:cNvSpPr/>
+            <p:nvPr/>
+          </p:nvSpPr>
+          <p:spPr>
+            <a:xfrm>
+              <a:off x="4858332" y="788494"/>
+              <a:ext cx="1008060" cy="488405"/>
+            </a:xfrm>
+            <a:prstGeom prst="roundRect">
+              <a:avLst/>
+            </a:prstGeom>
+          </p:spPr>
+          <p:style>
+            <a:lnRef idx="2">
+              <a:schemeClr val="accent1">
+                <a:shade val="50000"/>
+              </a:schemeClr>
+            </a:lnRef>
+            <a:fillRef idx="1">
+              <a:schemeClr val="accent1"/>
+            </a:fillRef>
+            <a:effectRef idx="0">
+              <a:schemeClr val="accent1"/>
+            </a:effectRef>
+            <a:fontRef idx="minor">
+              <a:schemeClr val="lt1"/>
+            </a:fontRef>
+          </p:style>
+          <p:txBody>
+            <a:bodyPr rtlCol="0" anchor="ctr"/>
+            <a:lstStyle/>
+            <a:p>
+              <a:pPr algn="ctr"/>
+              <a:r>
+                <a:rPr lang="fr-FR" dirty="0" smtClean="0"/>
+                <a:t>API</a:t>
+              </a:r>
+              <a:endParaRPr lang="fr-FR" dirty="0"/>
+            </a:p>
+          </p:txBody>
+        </p:sp>
+        <p:sp>
+          <p:nvSpPr>
+            <p:cNvPr id="28" name="Rectangle à coins arrondis 27"/>
+            <p:cNvSpPr/>
+            <p:nvPr/>
+          </p:nvSpPr>
+          <p:spPr>
+            <a:xfrm>
+              <a:off x="4881392" y="4343250"/>
+              <a:ext cx="1008060" cy="488405"/>
+            </a:xfrm>
+            <a:prstGeom prst="roundRect">
+              <a:avLst/>
+            </a:prstGeom>
+          </p:spPr>
+          <p:style>
+            <a:lnRef idx="2">
+              <a:schemeClr val="accent1">
+                <a:shade val="50000"/>
+              </a:schemeClr>
+            </a:lnRef>
+            <a:fillRef idx="1">
+              <a:schemeClr val="accent1"/>
+            </a:fillRef>
+            <a:effectRef idx="0">
+              <a:schemeClr val="accent1"/>
+            </a:effectRef>
+            <a:fontRef idx="minor">
+              <a:schemeClr val="lt1"/>
+            </a:fontRef>
+          </p:style>
+          <p:txBody>
+            <a:bodyPr rtlCol="0" anchor="ctr"/>
+            <a:lstStyle/>
+            <a:p>
+              <a:pPr algn="ctr"/>
+              <a:r>
+                <a:rPr lang="fr-FR"/>
+                <a:t>API</a:t>
+              </a:r>
+              <a:endParaRPr lang="fr-FR" dirty="0"/>
+            </a:p>
+          </p:txBody>
+        </p:sp>
+        <p:sp>
+          <p:nvSpPr>
+            <p:cNvPr id="29" name="Rectangle à coins arrondis 28"/>
+            <p:cNvSpPr/>
+            <p:nvPr/>
+          </p:nvSpPr>
+          <p:spPr>
+            <a:xfrm>
+              <a:off x="4879848" y="5231941"/>
+              <a:ext cx="1008060" cy="488405"/>
+            </a:xfrm>
+            <a:prstGeom prst="roundRect">
+              <a:avLst/>
+            </a:prstGeom>
+          </p:spPr>
+          <p:style>
+            <a:lnRef idx="2">
+              <a:schemeClr val="accent1">
+                <a:shade val="50000"/>
+              </a:schemeClr>
+            </a:lnRef>
+            <a:fillRef idx="1">
+              <a:schemeClr val="accent1"/>
+            </a:fillRef>
+            <a:effectRef idx="0">
+              <a:schemeClr val="accent1"/>
+            </a:effectRef>
+            <a:fontRef idx="minor">
+              <a:schemeClr val="lt1"/>
+            </a:fontRef>
+          </p:style>
+          <p:txBody>
+            <a:bodyPr rtlCol="0" anchor="ctr"/>
+            <a:lstStyle/>
+            <a:p>
+              <a:pPr algn="ctr"/>
+              <a:r>
+                <a:rPr lang="fr-FR"/>
+                <a:t>API</a:t>
+              </a:r>
+              <a:endParaRPr lang="fr-FR" dirty="0"/>
+            </a:p>
+          </p:txBody>
+        </p:sp>
+        <p:cxnSp>
+          <p:nvCxnSpPr>
+            <p:cNvPr id="31" name="Connecteur droit avec flèche 30"/>
+            <p:cNvCxnSpPr/>
+            <p:nvPr/>
+          </p:nvCxnSpPr>
+          <p:spPr>
+            <a:xfrm>
+              <a:off x="1575961" y="2431228"/>
+              <a:ext cx="588596" cy="0"/>
+            </a:xfrm>
+            <a:prstGeom prst="straightConnector1">
+              <a:avLst/>
+            </a:prstGeom>
+            <a:ln w="19050">
+              <a:tailEnd type="triangle"/>
+            </a:ln>
+          </p:spPr>
+          <p:style>
+            <a:lnRef idx="1">
+              <a:schemeClr val="accent1"/>
+            </a:lnRef>
+            <a:fillRef idx="0">
+              <a:schemeClr val="accent1"/>
+            </a:fillRef>
+            <a:effectRef idx="0">
+              <a:schemeClr val="accent1"/>
+            </a:effectRef>
+            <a:fontRef idx="minor">
+              <a:schemeClr val="tx1"/>
+            </a:fontRef>
+          </p:style>
+        </p:cxnSp>
+        <p:cxnSp>
+          <p:nvCxnSpPr>
+            <p:cNvPr id="32" name="Connecteur droit avec flèche 31"/>
+            <p:cNvCxnSpPr/>
+            <p:nvPr/>
+          </p:nvCxnSpPr>
+          <p:spPr>
+            <a:xfrm>
+              <a:off x="1575961" y="2601784"/>
+              <a:ext cx="588596" cy="0"/>
+            </a:xfrm>
+            <a:prstGeom prst="straightConnector1">
+              <a:avLst/>
+            </a:prstGeom>
+            <a:ln w="19050">
+              <a:tailEnd type="triangle"/>
+            </a:ln>
+          </p:spPr>
+          <p:style>
+            <a:lnRef idx="1">
+              <a:schemeClr val="accent1"/>
+            </a:lnRef>
+            <a:fillRef idx="0">
+              <a:schemeClr val="accent1"/>
+            </a:fillRef>
+            <a:effectRef idx="0">
+              <a:schemeClr val="accent1"/>
+            </a:effectRef>
+            <a:fontRef idx="minor">
+              <a:schemeClr val="tx1"/>
+            </a:fontRef>
+          </p:style>
+        </p:cxnSp>
+        <p:cxnSp>
+          <p:nvCxnSpPr>
+            <p:cNvPr id="33" name="Connecteur droit avec flèche 32"/>
+            <p:cNvCxnSpPr/>
+            <p:nvPr/>
+          </p:nvCxnSpPr>
+          <p:spPr>
+            <a:xfrm>
+              <a:off x="1575961" y="2772340"/>
+              <a:ext cx="588596" cy="0"/>
+            </a:xfrm>
+            <a:prstGeom prst="straightConnector1">
+              <a:avLst/>
+            </a:prstGeom>
+            <a:ln w="19050">
+              <a:tailEnd type="triangle"/>
+            </a:ln>
+          </p:spPr>
+          <p:style>
+            <a:lnRef idx="1">
+              <a:schemeClr val="accent1"/>
+            </a:lnRef>
+            <a:fillRef idx="0">
+              <a:schemeClr val="accent1"/>
+            </a:fillRef>
+            <a:effectRef idx="0">
+              <a:schemeClr val="accent1"/>
+            </a:effectRef>
+            <a:fontRef idx="minor">
+              <a:schemeClr val="tx1"/>
+            </a:fontRef>
+          </p:style>
+        </p:cxnSp>
+        <p:cxnSp>
+          <p:nvCxnSpPr>
+            <p:cNvPr id="34" name="Connecteur droit avec flèche 33"/>
+            <p:cNvCxnSpPr/>
+            <p:nvPr/>
+          </p:nvCxnSpPr>
+          <p:spPr>
+            <a:xfrm>
+              <a:off x="1575961" y="2942896"/>
+              <a:ext cx="588596" cy="0"/>
+            </a:xfrm>
+            <a:prstGeom prst="straightConnector1">
+              <a:avLst/>
+            </a:prstGeom>
+            <a:ln w="19050">
+              <a:tailEnd type="triangle"/>
+            </a:ln>
+          </p:spPr>
+          <p:style>
+            <a:lnRef idx="1">
+              <a:schemeClr val="accent1"/>
+            </a:lnRef>
+            <a:fillRef idx="0">
+              <a:schemeClr val="accent1"/>
+            </a:fillRef>
+            <a:effectRef idx="0">
+              <a:schemeClr val="accent1"/>
+            </a:effectRef>
+            <a:fontRef idx="minor">
+              <a:schemeClr val="tx1"/>
+            </a:fontRef>
+          </p:style>
+        </p:cxnSp>
+        <p:cxnSp>
+          <p:nvCxnSpPr>
+            <p:cNvPr id="35" name="Connecteur droit avec flèche 34"/>
+            <p:cNvCxnSpPr/>
+            <p:nvPr/>
+          </p:nvCxnSpPr>
+          <p:spPr>
+            <a:xfrm>
+              <a:off x="1575961" y="3113452"/>
+              <a:ext cx="588596" cy="0"/>
+            </a:xfrm>
+            <a:prstGeom prst="straightConnector1">
+              <a:avLst/>
+            </a:prstGeom>
+            <a:ln w="19050">
+              <a:tailEnd type="triangle"/>
+            </a:ln>
+          </p:spPr>
+          <p:style>
+            <a:lnRef idx="1">
+              <a:schemeClr val="accent1"/>
+            </a:lnRef>
+            <a:fillRef idx="0">
+              <a:schemeClr val="accent1"/>
+            </a:fillRef>
+            <a:effectRef idx="0">
+              <a:schemeClr val="accent1"/>
+            </a:effectRef>
+            <a:fontRef idx="minor">
+              <a:schemeClr val="tx1"/>
+            </a:fontRef>
+          </p:style>
+        </p:cxnSp>
+        <p:cxnSp>
+          <p:nvCxnSpPr>
+            <p:cNvPr id="36" name="Connecteur droit avec flèche 35"/>
+            <p:cNvCxnSpPr/>
+            <p:nvPr/>
+          </p:nvCxnSpPr>
+          <p:spPr>
+            <a:xfrm>
+              <a:off x="1575961" y="3284007"/>
+              <a:ext cx="588596" cy="0"/>
+            </a:xfrm>
+            <a:prstGeom prst="straightConnector1">
+              <a:avLst/>
+            </a:prstGeom>
+            <a:ln w="19050">
+              <a:tailEnd type="triangle"/>
+            </a:ln>
+          </p:spPr>
+          <p:style>
+            <a:lnRef idx="1">
+              <a:schemeClr val="accent1"/>
+            </a:lnRef>
+            <a:fillRef idx="0">
+              <a:schemeClr val="accent1"/>
+            </a:fillRef>
+            <a:effectRef idx="0">
+              <a:schemeClr val="accent1"/>
+            </a:effectRef>
+            <a:fontRef idx="minor">
+              <a:schemeClr val="tx1"/>
+            </a:fontRef>
+          </p:style>
+        </p:cxnSp>
+        <p:cxnSp>
+          <p:nvCxnSpPr>
+            <p:cNvPr id="37" name="Connecteur droit avec flèche 36"/>
+            <p:cNvCxnSpPr/>
+            <p:nvPr/>
+          </p:nvCxnSpPr>
+          <p:spPr>
+            <a:xfrm>
+              <a:off x="1575961" y="3454561"/>
+              <a:ext cx="588596" cy="0"/>
+            </a:xfrm>
+            <a:prstGeom prst="straightConnector1">
+              <a:avLst/>
+            </a:prstGeom>
+            <a:ln w="19050">
+              <a:tailEnd type="triangle"/>
+            </a:ln>
+          </p:spPr>
+          <p:style>
+            <a:lnRef idx="1">
+              <a:schemeClr val="accent1"/>
+            </a:lnRef>
+            <a:fillRef idx="0">
+              <a:schemeClr val="accent1"/>
+            </a:fillRef>
+            <a:effectRef idx="0">
+              <a:schemeClr val="accent1"/>
+            </a:effectRef>
+            <a:fontRef idx="minor">
+              <a:schemeClr val="tx1"/>
+            </a:fontRef>
+          </p:style>
+        </p:cxnSp>
+        <p:cxnSp>
+          <p:nvCxnSpPr>
+            <p:cNvPr id="38" name="Connecteur droit avec flèche 37"/>
+            <p:cNvCxnSpPr>
+              <a:stCxn id="14" idx="3"/>
+              <a:endCxn id="18" idx="1"/>
+            </p:cNvCxnSpPr>
+            <p:nvPr/>
+          </p:nvCxnSpPr>
+          <p:spPr>
+            <a:xfrm>
+              <a:off x="2762475" y="3243430"/>
+              <a:ext cx="524052" cy="0"/>
+            </a:xfrm>
+            <a:prstGeom prst="straightConnector1">
+              <a:avLst/>
+            </a:prstGeom>
+            <a:ln w="19050">
+              <a:tailEnd type="triangle"/>
+            </a:ln>
+          </p:spPr>
+          <p:style>
+            <a:lnRef idx="1">
+              <a:schemeClr val="accent1"/>
+            </a:lnRef>
+            <a:fillRef idx="0">
+              <a:schemeClr val="accent1"/>
+            </a:fillRef>
+            <a:effectRef idx="0">
+              <a:schemeClr val="accent1"/>
+            </a:effectRef>
+            <a:fontRef idx="minor">
+              <a:schemeClr val="tx1"/>
+            </a:fontRef>
+          </p:style>
+        </p:cxnSp>
+        <p:cxnSp>
+          <p:nvCxnSpPr>
+            <p:cNvPr id="43" name="Connecteur droit avec flèche 42"/>
+            <p:cNvCxnSpPr/>
+            <p:nvPr/>
+          </p:nvCxnSpPr>
+          <p:spPr>
+            <a:xfrm>
+              <a:off x="1575961" y="3617718"/>
+              <a:ext cx="588596" cy="0"/>
+            </a:xfrm>
+            <a:prstGeom prst="straightConnector1">
+              <a:avLst/>
+            </a:prstGeom>
+            <a:ln w="19050">
+              <a:tailEnd type="triangle"/>
+            </a:ln>
+          </p:spPr>
+          <p:style>
+            <a:lnRef idx="1">
+              <a:schemeClr val="accent1"/>
+            </a:lnRef>
+            <a:fillRef idx="0">
+              <a:schemeClr val="accent1"/>
+            </a:fillRef>
+            <a:effectRef idx="0">
+              <a:schemeClr val="accent1"/>
+            </a:effectRef>
+            <a:fontRef idx="minor">
+              <a:schemeClr val="tx1"/>
+            </a:fontRef>
+          </p:style>
+        </p:cxnSp>
+        <p:cxnSp>
+          <p:nvCxnSpPr>
+            <p:cNvPr id="44" name="Connecteur droit avec flèche 43"/>
+            <p:cNvCxnSpPr/>
+            <p:nvPr/>
+          </p:nvCxnSpPr>
+          <p:spPr>
+            <a:xfrm flipV="1">
+              <a:off x="3884445" y="1011220"/>
+              <a:ext cx="973887" cy="796065"/>
+            </a:xfrm>
+            <a:prstGeom prst="straightConnector1">
+              <a:avLst/>
+            </a:prstGeom>
+            <a:ln w="19050">
+              <a:tailEnd type="triangle"/>
+            </a:ln>
+          </p:spPr>
+          <p:style>
+            <a:lnRef idx="1">
+              <a:schemeClr val="accent1"/>
+            </a:lnRef>
+            <a:fillRef idx="0">
+              <a:schemeClr val="accent1"/>
+            </a:fillRef>
+            <a:effectRef idx="0">
+              <a:schemeClr val="accent1"/>
+            </a:effectRef>
+            <a:fontRef idx="minor">
+              <a:schemeClr val="tx1"/>
+            </a:fontRef>
+          </p:style>
+        </p:cxnSp>
+        <p:cxnSp>
+          <p:nvCxnSpPr>
+            <p:cNvPr id="49" name="Connecteur droit avec flèche 48"/>
+            <p:cNvCxnSpPr>
+              <a:endCxn id="20" idx="1"/>
+            </p:cNvCxnSpPr>
+            <p:nvPr/>
+          </p:nvCxnSpPr>
+          <p:spPr>
+            <a:xfrm>
+              <a:off x="3905961" y="1807285"/>
+              <a:ext cx="973887" cy="114101"/>
+            </a:xfrm>
+            <a:prstGeom prst="straightConnector1">
+              <a:avLst/>
+            </a:prstGeom>
+            <a:ln w="19050">
+              <a:tailEnd type="triangle"/>
+            </a:ln>
+          </p:spPr>
+          <p:style>
+            <a:lnRef idx="1">
+              <a:schemeClr val="accent1"/>
+            </a:lnRef>
+            <a:fillRef idx="0">
+              <a:schemeClr val="accent1"/>
+            </a:fillRef>
+            <a:effectRef idx="0">
+              <a:schemeClr val="accent1"/>
+            </a:effectRef>
+            <a:fontRef idx="minor">
+              <a:schemeClr val="tx1"/>
+            </a:fontRef>
+          </p:style>
+        </p:cxnSp>
+        <p:cxnSp>
+          <p:nvCxnSpPr>
+            <p:cNvPr id="52" name="Connecteur droit avec flèche 51"/>
+            <p:cNvCxnSpPr>
+              <a:endCxn id="21" idx="1"/>
+            </p:cNvCxnSpPr>
+            <p:nvPr/>
+          </p:nvCxnSpPr>
+          <p:spPr>
+            <a:xfrm>
+              <a:off x="3905961" y="1807285"/>
+              <a:ext cx="973887" cy="1002790"/>
+            </a:xfrm>
+            <a:prstGeom prst="straightConnector1">
+              <a:avLst/>
+            </a:prstGeom>
+            <a:ln w="19050">
+              <a:tailEnd type="triangle"/>
+            </a:ln>
+          </p:spPr>
+          <p:style>
+            <a:lnRef idx="1">
+              <a:schemeClr val="accent1"/>
+            </a:lnRef>
+            <a:fillRef idx="0">
+              <a:schemeClr val="accent1"/>
+            </a:fillRef>
+            <a:effectRef idx="0">
+              <a:schemeClr val="accent1"/>
+            </a:effectRef>
+            <a:fontRef idx="minor">
+              <a:schemeClr val="tx1"/>
+            </a:fontRef>
+          </p:style>
+        </p:cxnSp>
+        <p:cxnSp>
+          <p:nvCxnSpPr>
+            <p:cNvPr id="55" name="Connecteur droit avec flèche 54"/>
+            <p:cNvCxnSpPr/>
+            <p:nvPr/>
+          </p:nvCxnSpPr>
+          <p:spPr>
+            <a:xfrm>
+              <a:off x="3871788" y="2429979"/>
+              <a:ext cx="986544" cy="401888"/>
+            </a:xfrm>
+            <a:prstGeom prst="straightConnector1">
+              <a:avLst/>
+            </a:prstGeom>
+            <a:ln w="19050">
+              <a:tailEnd type="triangle"/>
+            </a:ln>
+          </p:spPr>
+          <p:style>
+            <a:lnRef idx="1">
+              <a:schemeClr val="accent1"/>
+            </a:lnRef>
+            <a:fillRef idx="0">
+              <a:schemeClr val="accent1"/>
+            </a:fillRef>
+            <a:effectRef idx="0">
+              <a:schemeClr val="accent1"/>
+            </a:effectRef>
+            <a:fontRef idx="minor">
+              <a:schemeClr val="tx1"/>
+            </a:fontRef>
+          </p:style>
+        </p:cxnSp>
+        <p:cxnSp>
+          <p:nvCxnSpPr>
+            <p:cNvPr id="58" name="Connecteur droit avec flèche 57"/>
+            <p:cNvCxnSpPr>
+              <a:endCxn id="22" idx="1"/>
+            </p:cNvCxnSpPr>
+            <p:nvPr/>
+          </p:nvCxnSpPr>
+          <p:spPr>
+            <a:xfrm>
+              <a:off x="3871788" y="2451771"/>
+              <a:ext cx="1003727" cy="1246993"/>
+            </a:xfrm>
+            <a:prstGeom prst="straightConnector1">
+              <a:avLst/>
+            </a:prstGeom>
+            <a:ln w="19050">
+              <a:tailEnd type="triangle"/>
+            </a:ln>
+          </p:spPr>
+          <p:style>
+            <a:lnRef idx="1">
+              <a:schemeClr val="accent1"/>
+            </a:lnRef>
+            <a:fillRef idx="0">
+              <a:schemeClr val="accent1"/>
+            </a:fillRef>
+            <a:effectRef idx="0">
+              <a:schemeClr val="accent1"/>
+            </a:effectRef>
+            <a:fontRef idx="minor">
+              <a:schemeClr val="tx1"/>
+            </a:fontRef>
+          </p:style>
+        </p:cxnSp>
+        <p:cxnSp>
+          <p:nvCxnSpPr>
+            <p:cNvPr id="63" name="Connecteur droit avec flèche 62"/>
+            <p:cNvCxnSpPr>
+              <a:endCxn id="29" idx="1"/>
+            </p:cNvCxnSpPr>
+            <p:nvPr/>
+          </p:nvCxnSpPr>
+          <p:spPr>
+            <a:xfrm>
+              <a:off x="3905961" y="4839612"/>
+              <a:ext cx="973887" cy="636532"/>
+            </a:xfrm>
+            <a:prstGeom prst="straightConnector1">
+              <a:avLst/>
+            </a:prstGeom>
+            <a:ln w="19050">
+              <a:tailEnd type="triangle"/>
+            </a:ln>
+          </p:spPr>
+          <p:style>
+            <a:lnRef idx="1">
+              <a:schemeClr val="accent1"/>
+            </a:lnRef>
+            <a:fillRef idx="0">
+              <a:schemeClr val="accent1"/>
+            </a:fillRef>
+            <a:effectRef idx="0">
+              <a:schemeClr val="accent1"/>
+            </a:effectRef>
+            <a:fontRef idx="minor">
+              <a:schemeClr val="tx1"/>
+            </a:fontRef>
+          </p:style>
+        </p:cxnSp>
+        <p:cxnSp>
+          <p:nvCxnSpPr>
+            <p:cNvPr id="66" name="Connecteur droit avec flèche 65"/>
+            <p:cNvCxnSpPr/>
+            <p:nvPr/>
+          </p:nvCxnSpPr>
+          <p:spPr>
+            <a:xfrm flipV="1">
+              <a:off x="3905961" y="4595410"/>
+              <a:ext cx="969554" cy="244202"/>
+            </a:xfrm>
+            <a:prstGeom prst="straightConnector1">
+              <a:avLst/>
+            </a:prstGeom>
+            <a:ln w="19050">
+              <a:tailEnd type="triangle"/>
+            </a:ln>
+          </p:spPr>
+          <p:style>
+            <a:lnRef idx="1">
+              <a:schemeClr val="accent1"/>
+            </a:lnRef>
+            <a:fillRef idx="0">
+              <a:schemeClr val="accent1"/>
+            </a:fillRef>
+            <a:effectRef idx="0">
+              <a:schemeClr val="accent1"/>
+            </a:effectRef>
+            <a:fontRef idx="minor">
+              <a:schemeClr val="tx1"/>
+            </a:fontRef>
+          </p:style>
+        </p:cxnSp>
+        <p:cxnSp>
+          <p:nvCxnSpPr>
+            <p:cNvPr id="69" name="Connecteur droit avec flèche 68"/>
+            <p:cNvCxnSpPr>
+              <a:endCxn id="22" idx="1"/>
+            </p:cNvCxnSpPr>
+            <p:nvPr/>
+          </p:nvCxnSpPr>
+          <p:spPr>
+            <a:xfrm flipV="1">
+              <a:off x="3886611" y="3698764"/>
+              <a:ext cx="988904" cy="1140848"/>
+            </a:xfrm>
+            <a:prstGeom prst="straightConnector1">
+              <a:avLst/>
+            </a:prstGeom>
+            <a:ln w="19050">
+              <a:tailEnd type="triangle"/>
+            </a:ln>
+          </p:spPr>
+          <p:style>
+            <a:lnRef idx="1">
+              <a:schemeClr val="accent1"/>
+            </a:lnRef>
+            <a:fillRef idx="0">
+              <a:schemeClr val="accent1"/>
+            </a:fillRef>
+            <a:effectRef idx="0">
+              <a:schemeClr val="accent1"/>
+            </a:effectRef>
+            <a:fontRef idx="minor">
+              <a:schemeClr val="tx1"/>
+            </a:fontRef>
+          </p:style>
+        </p:cxnSp>
+        <p:cxnSp>
+          <p:nvCxnSpPr>
+            <p:cNvPr id="72" name="Connecteur droit avec flèche 71"/>
+            <p:cNvCxnSpPr/>
+            <p:nvPr/>
+          </p:nvCxnSpPr>
+          <p:spPr>
+            <a:xfrm flipV="1">
+              <a:off x="3902991" y="2831867"/>
+              <a:ext cx="970358" cy="785851"/>
+            </a:xfrm>
+            <a:prstGeom prst="straightConnector1">
+              <a:avLst/>
+            </a:prstGeom>
+            <a:ln w="19050">
+              <a:tailEnd type="triangle"/>
+            </a:ln>
+          </p:spPr>
+          <p:style>
+            <a:lnRef idx="1">
+              <a:schemeClr val="accent1"/>
+            </a:lnRef>
+            <a:fillRef idx="0">
+              <a:schemeClr val="accent1"/>
+            </a:fillRef>
+            <a:effectRef idx="0">
+              <a:schemeClr val="accent1"/>
+            </a:effectRef>
+            <a:fontRef idx="minor">
+              <a:schemeClr val="tx1"/>
+            </a:fontRef>
+          </p:style>
+        </p:cxnSp>
+        <p:cxnSp>
+          <p:nvCxnSpPr>
+            <p:cNvPr id="76" name="Connecteur droit avec flèche 75"/>
+            <p:cNvCxnSpPr/>
+            <p:nvPr/>
+          </p:nvCxnSpPr>
+          <p:spPr>
+            <a:xfrm>
+              <a:off x="3900825" y="3633768"/>
+              <a:ext cx="957507" cy="64995"/>
+            </a:xfrm>
+            <a:prstGeom prst="straightConnector1">
+              <a:avLst/>
+            </a:prstGeom>
+            <a:ln w="19050">
+              <a:tailEnd type="triangle"/>
+            </a:ln>
+          </p:spPr>
+          <p:style>
+            <a:lnRef idx="1">
+              <a:schemeClr val="accent1"/>
+            </a:lnRef>
+            <a:fillRef idx="0">
+              <a:schemeClr val="accent1"/>
+            </a:fillRef>
+            <a:effectRef idx="0">
+              <a:schemeClr val="accent1"/>
+            </a:effectRef>
+            <a:fontRef idx="minor">
+              <a:schemeClr val="tx1"/>
+            </a:fontRef>
+          </p:style>
+        </p:cxnSp>
+      </p:grpSp>
     </p:spTree>
     <p:extLst>
       <p:ext uri="{BB962C8B-B14F-4D97-AF65-F5344CB8AC3E}">
@@ -7987,6 +8030,1354 @@
           </a:prstGeom>
         </p:spPr>
       </p:pic>
+      <p:sp>
+        <p:nvSpPr>
+          <p:cNvPr id="2" name="ZoneTexte 1"/>
+          <p:cNvSpPr txBox="1"/>
+          <p:nvPr/>
+        </p:nvSpPr>
+        <p:spPr>
+          <a:xfrm>
+            <a:off x="293615" y="322730"/>
+            <a:ext cx="11702643" cy="369332"/>
+          </a:xfrm>
+          <a:prstGeom prst="rect">
+            <a:avLst/>
+          </a:prstGeom>
+          <a:noFill/>
+        </p:spPr>
+        <p:txBody>
+          <a:bodyPr wrap="square" rtlCol="0">
+            <a:spAutoFit/>
+          </a:bodyPr>
+          <a:lstStyle/>
+          <a:p>
+            <a:r>
+              <a:rPr lang="fr-FR" dirty="0" smtClean="0"/>
+              <a:t>1</a:t>
+            </a:r>
+            <a:r>
+              <a:rPr lang="fr-FR" baseline="30000" dirty="0" smtClean="0"/>
+              <a:t>ère</a:t>
+            </a:r>
+            <a:r>
+              <a:rPr lang="fr-FR" dirty="0" smtClean="0"/>
+              <a:t> étape: Implémentation des </a:t>
+            </a:r>
+            <a:r>
+              <a:rPr lang="fr-FR" dirty="0" err="1" smtClean="0"/>
+              <a:t>POCs</a:t>
+            </a:r>
+            <a:endParaRPr lang="fr-FR" dirty="0"/>
+          </a:p>
+        </p:txBody>
+      </p:sp>
+      <p:sp>
+        <p:nvSpPr>
+          <p:cNvPr id="78" name="Rectangle à coins arrondis 77"/>
+          <p:cNvSpPr/>
+          <p:nvPr/>
+        </p:nvSpPr>
+        <p:spPr>
+          <a:xfrm>
+            <a:off x="882863" y="1299787"/>
+            <a:ext cx="1432350" cy="4279299"/>
+          </a:xfrm>
+          <a:prstGeom prst="roundRect">
+            <a:avLst/>
+          </a:prstGeom>
+        </p:spPr>
+        <p:style>
+          <a:lnRef idx="2">
+            <a:schemeClr val="accent1">
+              <a:shade val="50000"/>
+            </a:schemeClr>
+          </a:lnRef>
+          <a:fillRef idx="1">
+            <a:schemeClr val="accent1"/>
+          </a:fillRef>
+          <a:effectRef idx="0">
+            <a:schemeClr val="accent1"/>
+          </a:effectRef>
+          <a:fontRef idx="minor">
+            <a:schemeClr val="lt1"/>
+          </a:fontRef>
+        </p:style>
+        <p:txBody>
+          <a:bodyPr rtlCol="0" anchor="ctr" anchorCtr="1"/>
+          <a:lstStyle/>
+          <a:p>
+            <a:pPr algn="ctr"/>
+            <a:r>
+              <a:rPr lang="fr-FR" dirty="0" smtClean="0"/>
+              <a:t>Requêtes</a:t>
+            </a:r>
+            <a:endParaRPr lang="fr-FR" dirty="0"/>
+          </a:p>
+        </p:txBody>
+      </p:sp>
+      <p:sp>
+        <p:nvSpPr>
+          <p:cNvPr id="79" name="Rectangle à coins arrondis 78"/>
+          <p:cNvSpPr/>
+          <p:nvPr/>
+        </p:nvSpPr>
+        <p:spPr>
+          <a:xfrm>
+            <a:off x="4372192" y="1299785"/>
+            <a:ext cx="1221839" cy="4279301"/>
+          </a:xfrm>
+          <a:prstGeom prst="roundRect">
+            <a:avLst/>
+          </a:prstGeom>
+        </p:spPr>
+        <p:style>
+          <a:lnRef idx="2">
+            <a:schemeClr val="accent1">
+              <a:shade val="50000"/>
+            </a:schemeClr>
+          </a:lnRef>
+          <a:fillRef idx="1">
+            <a:schemeClr val="accent1"/>
+          </a:fillRef>
+          <a:effectRef idx="0">
+            <a:schemeClr val="accent1"/>
+          </a:effectRef>
+          <a:fontRef idx="minor">
+            <a:schemeClr val="lt1"/>
+          </a:fontRef>
+        </p:style>
+        <p:txBody>
+          <a:bodyPr vert="horz" rtlCol="0" anchor="ctr" anchorCtr="1">
+            <a:scene3d>
+              <a:camera prst="orthographicFront">
+                <a:rot lat="0" lon="0" rev="0"/>
+              </a:camera>
+              <a:lightRig rig="threePt" dir="t"/>
+            </a:scene3d>
+          </a:bodyPr>
+          <a:lstStyle/>
+          <a:p>
+            <a:pPr algn="ctr"/>
+            <a:r>
+              <a:rPr lang="fr-FR" cap="all" dirty="0" smtClean="0"/>
+              <a:t>IIS</a:t>
+            </a:r>
+            <a:endParaRPr lang="fr-FR" cap="all" dirty="0"/>
+          </a:p>
+        </p:txBody>
+      </p:sp>
+      <p:sp>
+        <p:nvSpPr>
+          <p:cNvPr id="80" name="Rectangle à coins arrondis 79"/>
+          <p:cNvSpPr/>
+          <p:nvPr/>
+        </p:nvSpPr>
+        <p:spPr>
+          <a:xfrm>
+            <a:off x="6737993" y="1301780"/>
+            <a:ext cx="1589361" cy="4277086"/>
+          </a:xfrm>
+          <a:prstGeom prst="roundRect">
+            <a:avLst/>
+          </a:prstGeom>
+        </p:spPr>
+        <p:style>
+          <a:lnRef idx="2">
+            <a:schemeClr val="accent1">
+              <a:shade val="50000"/>
+            </a:schemeClr>
+          </a:lnRef>
+          <a:fillRef idx="1">
+            <a:schemeClr val="accent1"/>
+          </a:fillRef>
+          <a:effectRef idx="0">
+            <a:schemeClr val="accent1"/>
+          </a:effectRef>
+          <a:fontRef idx="minor">
+            <a:schemeClr val="lt1"/>
+          </a:fontRef>
+        </p:style>
+        <p:txBody>
+          <a:bodyPr vert="horz" rtlCol="0" anchor="ctr" anchorCtr="1"/>
+          <a:lstStyle/>
+          <a:p>
+            <a:pPr algn="ctr"/>
+            <a:r>
+              <a:rPr lang="fr-FR" dirty="0" err="1"/>
+              <a:t>SignalR</a:t>
+            </a:r>
+            <a:endParaRPr lang="fr-FR" dirty="0"/>
+          </a:p>
+        </p:txBody>
+      </p:sp>
+      <p:cxnSp>
+        <p:nvCxnSpPr>
+          <p:cNvPr id="81" name="Connecteur droit avec flèche 80"/>
+          <p:cNvCxnSpPr/>
+          <p:nvPr/>
+        </p:nvCxnSpPr>
+        <p:spPr>
+          <a:xfrm flipV="1">
+            <a:off x="2347486" y="1577801"/>
+            <a:ext cx="2016000" cy="2"/>
+          </a:xfrm>
+          <a:prstGeom prst="straightConnector1">
+            <a:avLst/>
+          </a:prstGeom>
+          <a:ln w="19050">
+            <a:solidFill>
+              <a:schemeClr val="accent6">
+                <a:lumMod val="75000"/>
+              </a:schemeClr>
+            </a:solidFill>
+            <a:tailEnd type="triangle"/>
+          </a:ln>
+        </p:spPr>
+        <p:style>
+          <a:lnRef idx="1">
+            <a:schemeClr val="accent1"/>
+          </a:lnRef>
+          <a:fillRef idx="0">
+            <a:schemeClr val="accent1"/>
+          </a:fillRef>
+          <a:effectRef idx="0">
+            <a:schemeClr val="accent1"/>
+          </a:effectRef>
+          <a:fontRef idx="minor">
+            <a:schemeClr val="tx1"/>
+          </a:fontRef>
+        </p:style>
+      </p:cxnSp>
+      <p:cxnSp>
+        <p:nvCxnSpPr>
+          <p:cNvPr id="82" name="Connecteur droit avec flèche 81"/>
+          <p:cNvCxnSpPr/>
+          <p:nvPr/>
+        </p:nvCxnSpPr>
+        <p:spPr>
+          <a:xfrm>
+            <a:off x="5615547" y="1577801"/>
+            <a:ext cx="1122446" cy="997"/>
+          </a:xfrm>
+          <a:prstGeom prst="straightConnector1">
+            <a:avLst/>
+          </a:prstGeom>
+          <a:ln w="19050">
+            <a:solidFill>
+              <a:schemeClr val="accent6">
+                <a:lumMod val="75000"/>
+              </a:schemeClr>
+            </a:solidFill>
+            <a:tailEnd type="triangle"/>
+          </a:ln>
+        </p:spPr>
+        <p:style>
+          <a:lnRef idx="1">
+            <a:schemeClr val="accent1"/>
+          </a:lnRef>
+          <a:fillRef idx="0">
+            <a:schemeClr val="accent1"/>
+          </a:fillRef>
+          <a:effectRef idx="0">
+            <a:schemeClr val="accent1"/>
+          </a:effectRef>
+          <a:fontRef idx="minor">
+            <a:schemeClr val="tx1"/>
+          </a:fontRef>
+        </p:style>
+      </p:cxnSp>
+      <p:sp>
+        <p:nvSpPr>
+          <p:cNvPr id="84" name="ZoneTexte 83"/>
+          <p:cNvSpPr txBox="1"/>
+          <p:nvPr/>
+        </p:nvSpPr>
+        <p:spPr>
+          <a:xfrm>
+            <a:off x="2702796" y="1224455"/>
+            <a:ext cx="1314784" cy="307777"/>
+          </a:xfrm>
+          <a:prstGeom prst="rect">
+            <a:avLst/>
+          </a:prstGeom>
+          <a:noFill/>
+        </p:spPr>
+        <p:txBody>
+          <a:bodyPr wrap="none" rtlCol="0" anchor="ctr" anchorCtr="1">
+            <a:spAutoFit/>
+          </a:bodyPr>
+          <a:lstStyle/>
+          <a:p>
+            <a:r>
+              <a:rPr lang="fr-FR" sz="1400" dirty="0" smtClean="0"/>
+              <a:t>/</a:t>
+            </a:r>
+            <a:r>
+              <a:rPr lang="fr-FR" sz="1400" dirty="0" err="1" smtClean="0"/>
+              <a:t>testNew?p</a:t>
+            </a:r>
+            <a:r>
+              <a:rPr lang="fr-FR" sz="1400" dirty="0" smtClean="0"/>
+              <a:t>=42</a:t>
+            </a:r>
+            <a:endParaRPr lang="fr-FR" sz="1400" dirty="0"/>
+          </a:p>
+        </p:txBody>
+      </p:sp>
+      <p:cxnSp>
+        <p:nvCxnSpPr>
+          <p:cNvPr id="93" name="Connecteur droit avec flèche 92"/>
+          <p:cNvCxnSpPr/>
+          <p:nvPr/>
+        </p:nvCxnSpPr>
+        <p:spPr>
+          <a:xfrm flipH="1" flipV="1">
+            <a:off x="5594031" y="1814474"/>
+            <a:ext cx="1122446" cy="997"/>
+          </a:xfrm>
+          <a:prstGeom prst="straightConnector1">
+            <a:avLst/>
+          </a:prstGeom>
+          <a:ln w="19050">
+            <a:solidFill>
+              <a:schemeClr val="accent6">
+                <a:lumMod val="75000"/>
+              </a:schemeClr>
+            </a:solidFill>
+            <a:tailEnd type="triangle"/>
+          </a:ln>
+        </p:spPr>
+        <p:style>
+          <a:lnRef idx="1">
+            <a:schemeClr val="accent1"/>
+          </a:lnRef>
+          <a:fillRef idx="0">
+            <a:schemeClr val="accent1"/>
+          </a:fillRef>
+          <a:effectRef idx="0">
+            <a:schemeClr val="accent1"/>
+          </a:effectRef>
+          <a:fontRef idx="minor">
+            <a:schemeClr val="tx1"/>
+          </a:fontRef>
+        </p:style>
+      </p:cxnSp>
+      <p:cxnSp>
+        <p:nvCxnSpPr>
+          <p:cNvPr id="97" name="Connecteur droit avec flèche 96"/>
+          <p:cNvCxnSpPr/>
+          <p:nvPr/>
+        </p:nvCxnSpPr>
+        <p:spPr>
+          <a:xfrm flipH="1">
+            <a:off x="2325970" y="1814474"/>
+            <a:ext cx="2016000" cy="0"/>
+          </a:xfrm>
+          <a:prstGeom prst="straightConnector1">
+            <a:avLst/>
+          </a:prstGeom>
+          <a:ln w="19050">
+            <a:solidFill>
+              <a:schemeClr val="accent6">
+                <a:lumMod val="75000"/>
+              </a:schemeClr>
+            </a:solidFill>
+            <a:tailEnd type="triangle"/>
+          </a:ln>
+        </p:spPr>
+        <p:style>
+          <a:lnRef idx="1">
+            <a:schemeClr val="accent1"/>
+          </a:lnRef>
+          <a:fillRef idx="0">
+            <a:schemeClr val="accent1"/>
+          </a:fillRef>
+          <a:effectRef idx="0">
+            <a:schemeClr val="accent1"/>
+          </a:effectRef>
+          <a:fontRef idx="minor">
+            <a:schemeClr val="tx1"/>
+          </a:fontRef>
+        </p:style>
+      </p:cxnSp>
+      <p:sp>
+        <p:nvSpPr>
+          <p:cNvPr id="101" name="ZoneTexte 100"/>
+          <p:cNvSpPr txBox="1"/>
+          <p:nvPr/>
+        </p:nvSpPr>
+        <p:spPr>
+          <a:xfrm>
+            <a:off x="2668428" y="1873883"/>
+            <a:ext cx="1366784" cy="307777"/>
+          </a:xfrm>
+          <a:prstGeom prst="rect">
+            <a:avLst/>
+          </a:prstGeom>
+          <a:noFill/>
+        </p:spPr>
+        <p:txBody>
+          <a:bodyPr wrap="none" rtlCol="0" anchor="ctr" anchorCtr="1">
+            <a:spAutoFit/>
+          </a:bodyPr>
+          <a:lstStyle/>
+          <a:p>
+            <a:r>
+              <a:rPr lang="fr-FR" sz="1400" dirty="0" smtClean="0"/>
+              <a:t>{"</a:t>
+            </a:r>
+            <a:r>
+              <a:rPr lang="fr-FR" sz="1400" dirty="0" err="1" smtClean="0"/>
+              <a:t>answer</a:t>
+            </a:r>
+            <a:r>
+              <a:rPr lang="fr-FR" sz="1400" dirty="0" smtClean="0"/>
+              <a:t>": </a:t>
+            </a:r>
+            <a:r>
+              <a:rPr lang="fr-FR" sz="1400" dirty="0" err="1" smtClean="0"/>
+              <a:t>true</a:t>
+            </a:r>
+            <a:r>
+              <a:rPr lang="fr-FR" sz="1400" dirty="0" smtClean="0"/>
+              <a:t>}</a:t>
+            </a:r>
+            <a:endParaRPr lang="fr-FR" sz="1400" dirty="0"/>
+          </a:p>
+        </p:txBody>
+      </p:sp>
+      <p:sp>
+        <p:nvSpPr>
+          <p:cNvPr id="108" name="Rectangle à coins arrondis 107"/>
+          <p:cNvSpPr/>
+          <p:nvPr/>
+        </p:nvSpPr>
+        <p:spPr>
+          <a:xfrm>
+            <a:off x="9469844" y="2967289"/>
+            <a:ext cx="1072654" cy="579780"/>
+          </a:xfrm>
+          <a:prstGeom prst="roundRect">
+            <a:avLst/>
+          </a:prstGeom>
+        </p:spPr>
+        <p:style>
+          <a:lnRef idx="2">
+            <a:schemeClr val="accent1">
+              <a:shade val="50000"/>
+            </a:schemeClr>
+          </a:lnRef>
+          <a:fillRef idx="1">
+            <a:schemeClr val="accent1"/>
+          </a:fillRef>
+          <a:effectRef idx="0">
+            <a:schemeClr val="accent1"/>
+          </a:effectRef>
+          <a:fontRef idx="minor">
+            <a:schemeClr val="lt1"/>
+          </a:fontRef>
+        </p:style>
+        <p:txBody>
+          <a:bodyPr vert="horz" rtlCol="0" anchor="ctr" anchorCtr="1"/>
+          <a:lstStyle/>
+          <a:p>
+            <a:pPr algn="ctr"/>
+            <a:r>
+              <a:rPr lang="fr-FR" dirty="0" smtClean="0"/>
+              <a:t>Apache</a:t>
+            </a:r>
+            <a:endParaRPr lang="fr-FR" dirty="0"/>
+          </a:p>
+        </p:txBody>
+      </p:sp>
+      <p:grpSp>
+        <p:nvGrpSpPr>
+          <p:cNvPr id="123" name="Groupe 122"/>
+          <p:cNvGrpSpPr/>
+          <p:nvPr/>
+        </p:nvGrpSpPr>
+        <p:grpSpPr>
+          <a:xfrm>
+            <a:off x="7906518" y="1541349"/>
+            <a:ext cx="861716" cy="661583"/>
+            <a:chOff x="8047291" y="1868950"/>
+            <a:chExt cx="454004" cy="454003"/>
+          </a:xfrm>
+        </p:grpSpPr>
+        <p:sp>
+          <p:nvSpPr>
+            <p:cNvPr id="121" name="Arc 120"/>
+            <p:cNvSpPr/>
+            <p:nvPr/>
+          </p:nvSpPr>
+          <p:spPr>
+            <a:xfrm>
+              <a:off x="8090679" y="1868950"/>
+              <a:ext cx="410616" cy="454003"/>
+            </a:xfrm>
+            <a:prstGeom prst="arc">
+              <a:avLst/>
+            </a:prstGeom>
+            <a:ln w="19050">
+              <a:solidFill>
+                <a:schemeClr val="accent6">
+                  <a:lumMod val="75000"/>
+                </a:schemeClr>
+              </a:solidFill>
+              <a:headEnd type="none"/>
+              <a:tailEnd type="none"/>
+            </a:ln>
+          </p:spPr>
+          <p:style>
+            <a:lnRef idx="1">
+              <a:schemeClr val="accent1"/>
+            </a:lnRef>
+            <a:fillRef idx="0">
+              <a:schemeClr val="accent1"/>
+            </a:fillRef>
+            <a:effectRef idx="0">
+              <a:schemeClr val="accent1"/>
+            </a:effectRef>
+            <a:fontRef idx="minor">
+              <a:schemeClr val="tx1"/>
+            </a:fontRef>
+          </p:style>
+          <p:txBody>
+            <a:bodyPr rtlCol="0" anchor="ctr"/>
+            <a:lstStyle/>
+            <a:p>
+              <a:pPr algn="ctr"/>
+              <a:endParaRPr lang="fr-FR"/>
+            </a:p>
+          </p:txBody>
+        </p:sp>
+        <p:sp>
+          <p:nvSpPr>
+            <p:cNvPr id="122" name="Arc 121"/>
+            <p:cNvSpPr/>
+            <p:nvPr/>
+          </p:nvSpPr>
+          <p:spPr>
+            <a:xfrm rot="5400000">
+              <a:off x="8068985" y="1867167"/>
+              <a:ext cx="410616" cy="454003"/>
+            </a:xfrm>
+            <a:prstGeom prst="arc">
+              <a:avLst/>
+            </a:prstGeom>
+            <a:ln w="19050">
+              <a:solidFill>
+                <a:schemeClr val="accent6">
+                  <a:lumMod val="75000"/>
+                </a:schemeClr>
+              </a:solidFill>
+              <a:headEnd type="none"/>
+              <a:tailEnd type="triangle"/>
+            </a:ln>
+          </p:spPr>
+          <p:style>
+            <a:lnRef idx="1">
+              <a:schemeClr val="accent1"/>
+            </a:lnRef>
+            <a:fillRef idx="0">
+              <a:schemeClr val="accent1"/>
+            </a:fillRef>
+            <a:effectRef idx="0">
+              <a:schemeClr val="accent1"/>
+            </a:effectRef>
+            <a:fontRef idx="minor">
+              <a:schemeClr val="tx1"/>
+            </a:fontRef>
+          </p:style>
+          <p:txBody>
+            <a:bodyPr rtlCol="0" anchor="ctr"/>
+            <a:lstStyle/>
+            <a:p>
+              <a:pPr algn="ctr"/>
+              <a:endParaRPr lang="fr-FR"/>
+            </a:p>
+          </p:txBody>
+        </p:sp>
+      </p:grpSp>
+      <p:cxnSp>
+        <p:nvCxnSpPr>
+          <p:cNvPr id="124" name="Connecteur droit avec flèche 123"/>
+          <p:cNvCxnSpPr/>
+          <p:nvPr/>
+        </p:nvCxnSpPr>
+        <p:spPr>
+          <a:xfrm flipV="1">
+            <a:off x="2336728" y="3139484"/>
+            <a:ext cx="2016000" cy="10545"/>
+          </a:xfrm>
+          <a:prstGeom prst="straightConnector1">
+            <a:avLst/>
+          </a:prstGeom>
+          <a:ln w="19050">
+            <a:solidFill>
+              <a:schemeClr val="accent2">
+                <a:lumMod val="75000"/>
+              </a:schemeClr>
+            </a:solidFill>
+            <a:tailEnd type="triangle"/>
+          </a:ln>
+        </p:spPr>
+        <p:style>
+          <a:lnRef idx="1">
+            <a:schemeClr val="accent1"/>
+          </a:lnRef>
+          <a:fillRef idx="0">
+            <a:schemeClr val="accent1"/>
+          </a:fillRef>
+          <a:effectRef idx="0">
+            <a:schemeClr val="accent1"/>
+          </a:effectRef>
+          <a:fontRef idx="minor">
+            <a:schemeClr val="tx1"/>
+          </a:fontRef>
+        </p:style>
+      </p:cxnSp>
+      <p:cxnSp>
+        <p:nvCxnSpPr>
+          <p:cNvPr id="125" name="Connecteur droit avec flèche 124"/>
+          <p:cNvCxnSpPr/>
+          <p:nvPr/>
+        </p:nvCxnSpPr>
+        <p:spPr>
+          <a:xfrm flipH="1">
+            <a:off x="2325970" y="3385703"/>
+            <a:ext cx="2016000" cy="13390"/>
+          </a:xfrm>
+          <a:prstGeom prst="straightConnector1">
+            <a:avLst/>
+          </a:prstGeom>
+          <a:ln w="19050">
+            <a:solidFill>
+              <a:schemeClr val="accent2">
+                <a:lumMod val="75000"/>
+              </a:schemeClr>
+            </a:solidFill>
+            <a:tailEnd type="triangle"/>
+          </a:ln>
+        </p:spPr>
+        <p:style>
+          <a:lnRef idx="1">
+            <a:schemeClr val="accent1"/>
+          </a:lnRef>
+          <a:fillRef idx="0">
+            <a:schemeClr val="accent1"/>
+          </a:fillRef>
+          <a:effectRef idx="0">
+            <a:schemeClr val="accent1"/>
+          </a:effectRef>
+          <a:fontRef idx="minor">
+            <a:schemeClr val="tx1"/>
+          </a:fontRef>
+        </p:style>
+      </p:cxnSp>
+      <p:sp>
+        <p:nvSpPr>
+          <p:cNvPr id="128" name="ZoneTexte 127"/>
+          <p:cNvSpPr txBox="1"/>
+          <p:nvPr/>
+        </p:nvSpPr>
+        <p:spPr>
+          <a:xfrm>
+            <a:off x="2578816" y="2803422"/>
+            <a:ext cx="1523109" cy="307777"/>
+          </a:xfrm>
+          <a:prstGeom prst="rect">
+            <a:avLst/>
+          </a:prstGeom>
+          <a:noFill/>
+        </p:spPr>
+        <p:txBody>
+          <a:bodyPr wrap="none" rtlCol="0" anchor="ctr" anchorCtr="1">
+            <a:spAutoFit/>
+          </a:bodyPr>
+          <a:lstStyle/>
+          <a:p>
+            <a:r>
+              <a:rPr lang="fr-FR" sz="1400" dirty="0" smtClean="0"/>
+              <a:t>/</a:t>
+            </a:r>
+            <a:r>
+              <a:rPr lang="fr-FR" sz="1400" dirty="0" err="1" smtClean="0"/>
+              <a:t>auth?u</a:t>
+            </a:r>
+            <a:r>
+              <a:rPr lang="fr-FR" sz="1400" dirty="0" smtClean="0"/>
+              <a:t>=</a:t>
+            </a:r>
+            <a:r>
+              <a:rPr lang="fr-FR" sz="1400" dirty="0" err="1" smtClean="0"/>
+              <a:t>XX&amp;p</a:t>
+            </a:r>
+            <a:r>
+              <a:rPr lang="fr-FR" sz="1400" dirty="0" smtClean="0"/>
+              <a:t>=YY</a:t>
+            </a:r>
+            <a:endParaRPr lang="fr-FR" sz="1400" dirty="0"/>
+          </a:p>
+        </p:txBody>
+      </p:sp>
+      <p:sp>
+        <p:nvSpPr>
+          <p:cNvPr id="130" name="ZoneTexte 129"/>
+          <p:cNvSpPr txBox="1"/>
+          <p:nvPr/>
+        </p:nvSpPr>
+        <p:spPr>
+          <a:xfrm>
+            <a:off x="2269094" y="3431731"/>
+            <a:ext cx="2113856" cy="307777"/>
+          </a:xfrm>
+          <a:prstGeom prst="rect">
+            <a:avLst/>
+          </a:prstGeom>
+          <a:noFill/>
+        </p:spPr>
+        <p:txBody>
+          <a:bodyPr wrap="square" rtlCol="0" anchor="ctr" anchorCtr="1">
+            <a:spAutoFit/>
+          </a:bodyPr>
+          <a:lstStyle/>
+          <a:p>
+            <a:r>
+              <a:rPr lang="fr-FR" sz="1400" dirty="0" smtClean="0"/>
+              <a:t>&lt;</a:t>
+            </a:r>
+            <a:r>
+              <a:rPr lang="fr-FR" sz="1400" dirty="0" err="1" smtClean="0"/>
+              <a:t>isValid</a:t>
+            </a:r>
+            <a:r>
+              <a:rPr lang="fr-FR" sz="1400" dirty="0" smtClean="0"/>
+              <a:t>&gt;</a:t>
+            </a:r>
+            <a:r>
+              <a:rPr lang="fr-FR" sz="1400" dirty="0" err="1" smtClean="0"/>
+              <a:t>yes</a:t>
+            </a:r>
+            <a:r>
+              <a:rPr lang="fr-FR" sz="1400" dirty="0" smtClean="0"/>
+              <a:t>&lt;/</a:t>
+            </a:r>
+            <a:r>
+              <a:rPr lang="fr-FR" sz="1400" dirty="0" err="1" smtClean="0"/>
+              <a:t>isValid</a:t>
+            </a:r>
+            <a:r>
+              <a:rPr lang="fr-FR" sz="1400" dirty="0" smtClean="0"/>
+              <a:t>&gt;</a:t>
+            </a:r>
+            <a:endParaRPr lang="fr-FR" sz="1400" dirty="0"/>
+          </a:p>
+        </p:txBody>
+      </p:sp>
+      <p:cxnSp>
+        <p:nvCxnSpPr>
+          <p:cNvPr id="135" name="Connecteur droit avec flèche 134"/>
+          <p:cNvCxnSpPr/>
+          <p:nvPr/>
+        </p:nvCxnSpPr>
+        <p:spPr>
+          <a:xfrm>
+            <a:off x="5617020" y="3136637"/>
+            <a:ext cx="1122446" cy="997"/>
+          </a:xfrm>
+          <a:prstGeom prst="straightConnector1">
+            <a:avLst/>
+          </a:prstGeom>
+          <a:ln w="19050">
+            <a:solidFill>
+              <a:schemeClr val="accent2">
+                <a:lumMod val="75000"/>
+              </a:schemeClr>
+            </a:solidFill>
+            <a:tailEnd type="triangle"/>
+          </a:ln>
+        </p:spPr>
+        <p:style>
+          <a:lnRef idx="1">
+            <a:schemeClr val="accent1"/>
+          </a:lnRef>
+          <a:fillRef idx="0">
+            <a:schemeClr val="accent1"/>
+          </a:fillRef>
+          <a:effectRef idx="0">
+            <a:schemeClr val="accent1"/>
+          </a:effectRef>
+          <a:fontRef idx="minor">
+            <a:schemeClr val="tx1"/>
+          </a:fontRef>
+        </p:style>
+      </p:cxnSp>
+      <p:cxnSp>
+        <p:nvCxnSpPr>
+          <p:cNvPr id="136" name="Connecteur droit avec flèche 135"/>
+          <p:cNvCxnSpPr/>
+          <p:nvPr/>
+        </p:nvCxnSpPr>
+        <p:spPr>
+          <a:xfrm flipH="1" flipV="1">
+            <a:off x="5595504" y="3373310"/>
+            <a:ext cx="1122446" cy="997"/>
+          </a:xfrm>
+          <a:prstGeom prst="straightConnector1">
+            <a:avLst/>
+          </a:prstGeom>
+          <a:ln w="19050">
+            <a:solidFill>
+              <a:schemeClr val="accent2">
+                <a:lumMod val="75000"/>
+              </a:schemeClr>
+            </a:solidFill>
+            <a:tailEnd type="triangle"/>
+          </a:ln>
+        </p:spPr>
+        <p:style>
+          <a:lnRef idx="1">
+            <a:schemeClr val="accent1"/>
+          </a:lnRef>
+          <a:fillRef idx="0">
+            <a:schemeClr val="accent1"/>
+          </a:fillRef>
+          <a:effectRef idx="0">
+            <a:schemeClr val="accent1"/>
+          </a:effectRef>
+          <a:fontRef idx="minor">
+            <a:schemeClr val="tx1"/>
+          </a:fontRef>
+        </p:style>
+      </p:cxnSp>
+      <p:cxnSp>
+        <p:nvCxnSpPr>
+          <p:cNvPr id="137" name="Connecteur droit avec flèche 136"/>
+          <p:cNvCxnSpPr/>
+          <p:nvPr/>
+        </p:nvCxnSpPr>
+        <p:spPr>
+          <a:xfrm>
+            <a:off x="8347397" y="3149030"/>
+            <a:ext cx="1122446" cy="997"/>
+          </a:xfrm>
+          <a:prstGeom prst="straightConnector1">
+            <a:avLst/>
+          </a:prstGeom>
+          <a:ln w="19050">
+            <a:solidFill>
+              <a:schemeClr val="accent2">
+                <a:lumMod val="75000"/>
+              </a:schemeClr>
+            </a:solidFill>
+            <a:tailEnd type="triangle"/>
+          </a:ln>
+        </p:spPr>
+        <p:style>
+          <a:lnRef idx="1">
+            <a:schemeClr val="accent1"/>
+          </a:lnRef>
+          <a:fillRef idx="0">
+            <a:schemeClr val="accent1"/>
+          </a:fillRef>
+          <a:effectRef idx="0">
+            <a:schemeClr val="accent1"/>
+          </a:effectRef>
+          <a:fontRef idx="minor">
+            <a:schemeClr val="tx1"/>
+          </a:fontRef>
+        </p:style>
+      </p:cxnSp>
+      <p:cxnSp>
+        <p:nvCxnSpPr>
+          <p:cNvPr id="138" name="Connecteur droit avec flèche 137"/>
+          <p:cNvCxnSpPr/>
+          <p:nvPr/>
+        </p:nvCxnSpPr>
+        <p:spPr>
+          <a:xfrm flipH="1" flipV="1">
+            <a:off x="8325881" y="3385703"/>
+            <a:ext cx="1122446" cy="997"/>
+          </a:xfrm>
+          <a:prstGeom prst="straightConnector1">
+            <a:avLst/>
+          </a:prstGeom>
+          <a:ln w="19050">
+            <a:solidFill>
+              <a:schemeClr val="accent2">
+                <a:lumMod val="75000"/>
+              </a:schemeClr>
+            </a:solidFill>
+            <a:tailEnd type="triangle"/>
+          </a:ln>
+        </p:spPr>
+        <p:style>
+          <a:lnRef idx="1">
+            <a:schemeClr val="accent1"/>
+          </a:lnRef>
+          <a:fillRef idx="0">
+            <a:schemeClr val="accent1"/>
+          </a:fillRef>
+          <a:effectRef idx="0">
+            <a:schemeClr val="accent1"/>
+          </a:effectRef>
+          <a:fontRef idx="minor">
+            <a:schemeClr val="tx1"/>
+          </a:fontRef>
+        </p:style>
+      </p:cxnSp>
+      <p:cxnSp>
+        <p:nvCxnSpPr>
+          <p:cNvPr id="139" name="Connecteur droit avec flèche 138"/>
+          <p:cNvCxnSpPr/>
+          <p:nvPr/>
+        </p:nvCxnSpPr>
+        <p:spPr>
+          <a:xfrm flipV="1">
+            <a:off x="2354409" y="4700084"/>
+            <a:ext cx="2016000" cy="10545"/>
+          </a:xfrm>
+          <a:prstGeom prst="straightConnector1">
+            <a:avLst/>
+          </a:prstGeom>
+          <a:ln w="19050">
+            <a:solidFill>
+              <a:srgbClr val="894590"/>
+            </a:solidFill>
+            <a:tailEnd type="triangle"/>
+          </a:ln>
+        </p:spPr>
+        <p:style>
+          <a:lnRef idx="1">
+            <a:schemeClr val="accent1"/>
+          </a:lnRef>
+          <a:fillRef idx="0">
+            <a:schemeClr val="accent1"/>
+          </a:fillRef>
+          <a:effectRef idx="0">
+            <a:schemeClr val="accent1"/>
+          </a:effectRef>
+          <a:fontRef idx="minor">
+            <a:schemeClr val="tx1"/>
+          </a:fontRef>
+        </p:style>
+      </p:cxnSp>
+      <p:cxnSp>
+        <p:nvCxnSpPr>
+          <p:cNvPr id="140" name="Connecteur droit avec flèche 139"/>
+          <p:cNvCxnSpPr/>
+          <p:nvPr/>
+        </p:nvCxnSpPr>
+        <p:spPr>
+          <a:xfrm flipH="1">
+            <a:off x="2343651" y="4946303"/>
+            <a:ext cx="2016000" cy="13390"/>
+          </a:xfrm>
+          <a:prstGeom prst="straightConnector1">
+            <a:avLst/>
+          </a:prstGeom>
+          <a:ln w="19050">
+            <a:solidFill>
+              <a:srgbClr val="894590"/>
+            </a:solidFill>
+            <a:tailEnd type="triangle"/>
+          </a:ln>
+        </p:spPr>
+        <p:style>
+          <a:lnRef idx="1">
+            <a:schemeClr val="accent1"/>
+          </a:lnRef>
+          <a:fillRef idx="0">
+            <a:schemeClr val="accent1"/>
+          </a:fillRef>
+          <a:effectRef idx="0">
+            <a:schemeClr val="accent1"/>
+          </a:effectRef>
+          <a:fontRef idx="minor">
+            <a:schemeClr val="tx1"/>
+          </a:fontRef>
+        </p:style>
+      </p:cxnSp>
+      <p:sp>
+        <p:nvSpPr>
+          <p:cNvPr id="141" name="ZoneTexte 140"/>
+          <p:cNvSpPr txBox="1"/>
+          <p:nvPr/>
+        </p:nvSpPr>
+        <p:spPr>
+          <a:xfrm>
+            <a:off x="2432337" y="4363198"/>
+            <a:ext cx="1855701" cy="307777"/>
+          </a:xfrm>
+          <a:prstGeom prst="rect">
+            <a:avLst/>
+          </a:prstGeom>
+          <a:noFill/>
+        </p:spPr>
+        <p:txBody>
+          <a:bodyPr wrap="none" rtlCol="0" anchor="ctr" anchorCtr="1">
+            <a:spAutoFit/>
+          </a:bodyPr>
+          <a:lstStyle/>
+          <a:p>
+            <a:r>
+              <a:rPr lang="fr-FR" sz="1400" dirty="0" smtClean="0"/>
+              <a:t>/</a:t>
+            </a:r>
+            <a:r>
+              <a:rPr lang="fr-FR" sz="1400" dirty="0" err="1" smtClean="0"/>
+              <a:t>newAuth?u</a:t>
+            </a:r>
+            <a:r>
+              <a:rPr lang="fr-FR" sz="1400" dirty="0" smtClean="0"/>
+              <a:t>=</a:t>
+            </a:r>
+            <a:r>
+              <a:rPr lang="fr-FR" sz="1400" dirty="0" err="1" smtClean="0"/>
+              <a:t>XX&amp;p</a:t>
+            </a:r>
+            <a:r>
+              <a:rPr lang="fr-FR" sz="1400" dirty="0" smtClean="0"/>
+              <a:t>=YY</a:t>
+            </a:r>
+            <a:endParaRPr lang="fr-FR" sz="1400" dirty="0"/>
+          </a:p>
+        </p:txBody>
+      </p:sp>
+      <p:sp>
+        <p:nvSpPr>
+          <p:cNvPr id="142" name="ZoneTexte 141"/>
+          <p:cNvSpPr txBox="1"/>
+          <p:nvPr/>
+        </p:nvSpPr>
+        <p:spPr>
+          <a:xfrm>
+            <a:off x="2286775" y="4992331"/>
+            <a:ext cx="2113856" cy="307777"/>
+          </a:xfrm>
+          <a:prstGeom prst="rect">
+            <a:avLst/>
+          </a:prstGeom>
+          <a:noFill/>
+        </p:spPr>
+        <p:txBody>
+          <a:bodyPr wrap="square" rtlCol="0" anchor="ctr" anchorCtr="1">
+            <a:spAutoFit/>
+          </a:bodyPr>
+          <a:lstStyle/>
+          <a:p>
+            <a:r>
+              <a:rPr lang="fr-FR" sz="1400" dirty="0" smtClean="0"/>
+              <a:t>{"</a:t>
+            </a:r>
+            <a:r>
+              <a:rPr lang="fr-FR" sz="1400" dirty="0" err="1" smtClean="0"/>
+              <a:t>isValid</a:t>
+            </a:r>
+            <a:r>
+              <a:rPr lang="fr-FR" sz="1400" dirty="0" smtClean="0"/>
+              <a:t>": </a:t>
+            </a:r>
+            <a:r>
+              <a:rPr lang="fr-FR" sz="1400" dirty="0" err="1" smtClean="0"/>
+              <a:t>true</a:t>
+            </a:r>
+            <a:r>
+              <a:rPr lang="fr-FR" sz="1400" dirty="0" smtClean="0"/>
+              <a:t>}</a:t>
+            </a:r>
+            <a:endParaRPr lang="fr-FR" sz="1400" dirty="0"/>
+          </a:p>
+        </p:txBody>
+      </p:sp>
+      <p:cxnSp>
+        <p:nvCxnSpPr>
+          <p:cNvPr id="143" name="Connecteur droit avec flèche 142"/>
+          <p:cNvCxnSpPr/>
+          <p:nvPr/>
+        </p:nvCxnSpPr>
+        <p:spPr>
+          <a:xfrm>
+            <a:off x="5625569" y="4709131"/>
+            <a:ext cx="1122446" cy="997"/>
+          </a:xfrm>
+          <a:prstGeom prst="straightConnector1">
+            <a:avLst/>
+          </a:prstGeom>
+          <a:ln w="19050">
+            <a:solidFill>
+              <a:srgbClr val="894590"/>
+            </a:solidFill>
+            <a:tailEnd type="triangle"/>
+          </a:ln>
+        </p:spPr>
+        <p:style>
+          <a:lnRef idx="1">
+            <a:schemeClr val="accent1"/>
+          </a:lnRef>
+          <a:fillRef idx="0">
+            <a:schemeClr val="accent1"/>
+          </a:fillRef>
+          <a:effectRef idx="0">
+            <a:schemeClr val="accent1"/>
+          </a:effectRef>
+          <a:fontRef idx="minor">
+            <a:schemeClr val="tx1"/>
+          </a:fontRef>
+        </p:style>
+      </p:cxnSp>
+      <p:cxnSp>
+        <p:nvCxnSpPr>
+          <p:cNvPr id="144" name="Connecteur droit avec flèche 143"/>
+          <p:cNvCxnSpPr/>
+          <p:nvPr/>
+        </p:nvCxnSpPr>
+        <p:spPr>
+          <a:xfrm flipH="1" flipV="1">
+            <a:off x="5604053" y="4945804"/>
+            <a:ext cx="1122446" cy="997"/>
+          </a:xfrm>
+          <a:prstGeom prst="straightConnector1">
+            <a:avLst/>
+          </a:prstGeom>
+          <a:ln w="19050">
+            <a:solidFill>
+              <a:srgbClr val="894590"/>
+            </a:solidFill>
+            <a:tailEnd type="triangle"/>
+          </a:ln>
+        </p:spPr>
+        <p:style>
+          <a:lnRef idx="1">
+            <a:schemeClr val="accent1"/>
+          </a:lnRef>
+          <a:fillRef idx="0">
+            <a:schemeClr val="accent1"/>
+          </a:fillRef>
+          <a:effectRef idx="0">
+            <a:schemeClr val="accent1"/>
+          </a:effectRef>
+          <a:fontRef idx="minor">
+            <a:schemeClr val="tx1"/>
+          </a:fontRef>
+        </p:style>
+      </p:cxnSp>
+      <p:sp>
+        <p:nvSpPr>
+          <p:cNvPr id="145" name="Rectangle à coins arrondis 144"/>
+          <p:cNvSpPr/>
+          <p:nvPr/>
+        </p:nvSpPr>
+        <p:spPr>
+          <a:xfrm>
+            <a:off x="9468370" y="4541683"/>
+            <a:ext cx="1072654" cy="579780"/>
+          </a:xfrm>
+          <a:prstGeom prst="roundRect">
+            <a:avLst/>
+          </a:prstGeom>
+        </p:spPr>
+        <p:style>
+          <a:lnRef idx="2">
+            <a:schemeClr val="accent1">
+              <a:shade val="50000"/>
+            </a:schemeClr>
+          </a:lnRef>
+          <a:fillRef idx="1">
+            <a:schemeClr val="accent1"/>
+          </a:fillRef>
+          <a:effectRef idx="0">
+            <a:schemeClr val="accent1"/>
+          </a:effectRef>
+          <a:fontRef idx="minor">
+            <a:schemeClr val="lt1"/>
+          </a:fontRef>
+        </p:style>
+        <p:txBody>
+          <a:bodyPr vert="horz" rtlCol="0" anchor="ctr" anchorCtr="1"/>
+          <a:lstStyle/>
+          <a:p>
+            <a:pPr algn="ctr"/>
+            <a:r>
+              <a:rPr lang="fr-FR" dirty="0" smtClean="0"/>
+              <a:t>API</a:t>
+            </a:r>
+            <a:endParaRPr lang="fr-FR" dirty="0"/>
+          </a:p>
+        </p:txBody>
+      </p:sp>
+      <p:cxnSp>
+        <p:nvCxnSpPr>
+          <p:cNvPr id="146" name="Connecteur droit avec flèche 145"/>
+          <p:cNvCxnSpPr/>
+          <p:nvPr/>
+        </p:nvCxnSpPr>
+        <p:spPr>
+          <a:xfrm>
+            <a:off x="8347397" y="4709131"/>
+            <a:ext cx="1122446" cy="997"/>
+          </a:xfrm>
+          <a:prstGeom prst="straightConnector1">
+            <a:avLst/>
+          </a:prstGeom>
+          <a:ln w="19050">
+            <a:solidFill>
+              <a:srgbClr val="894590"/>
+            </a:solidFill>
+            <a:tailEnd type="triangle"/>
+          </a:ln>
+        </p:spPr>
+        <p:style>
+          <a:lnRef idx="1">
+            <a:schemeClr val="accent1"/>
+          </a:lnRef>
+          <a:fillRef idx="0">
+            <a:schemeClr val="accent1"/>
+          </a:fillRef>
+          <a:effectRef idx="0">
+            <a:schemeClr val="accent1"/>
+          </a:effectRef>
+          <a:fontRef idx="minor">
+            <a:schemeClr val="tx1"/>
+          </a:fontRef>
+        </p:style>
+      </p:cxnSp>
+      <p:cxnSp>
+        <p:nvCxnSpPr>
+          <p:cNvPr id="147" name="Connecteur droit avec flèche 146"/>
+          <p:cNvCxnSpPr/>
+          <p:nvPr/>
+        </p:nvCxnSpPr>
+        <p:spPr>
+          <a:xfrm flipH="1" flipV="1">
+            <a:off x="8325881" y="4945804"/>
+            <a:ext cx="1122446" cy="997"/>
+          </a:xfrm>
+          <a:prstGeom prst="straightConnector1">
+            <a:avLst/>
+          </a:prstGeom>
+          <a:ln w="19050">
+            <a:solidFill>
+              <a:srgbClr val="894590"/>
+            </a:solidFill>
+            <a:tailEnd type="triangle"/>
+          </a:ln>
+        </p:spPr>
+        <p:style>
+          <a:lnRef idx="1">
+            <a:schemeClr val="accent1"/>
+          </a:lnRef>
+          <a:fillRef idx="0">
+            <a:schemeClr val="accent1"/>
+          </a:fillRef>
+          <a:effectRef idx="0">
+            <a:schemeClr val="accent1"/>
+          </a:effectRef>
+          <a:fontRef idx="minor">
+            <a:schemeClr val="tx1"/>
+          </a:fontRef>
+        </p:style>
+      </p:cxnSp>
+      <p:sp>
+        <p:nvSpPr>
+          <p:cNvPr id="148" name="ZoneTexte 147"/>
+          <p:cNvSpPr txBox="1"/>
+          <p:nvPr/>
+        </p:nvSpPr>
+        <p:spPr>
+          <a:xfrm>
+            <a:off x="8416276" y="2803422"/>
+            <a:ext cx="927754" cy="307777"/>
+          </a:xfrm>
+          <a:prstGeom prst="rect">
+            <a:avLst/>
+          </a:prstGeom>
+          <a:noFill/>
+        </p:spPr>
+        <p:txBody>
+          <a:bodyPr wrap="none" rtlCol="0">
+            <a:spAutoFit/>
+          </a:bodyPr>
+          <a:lstStyle/>
+          <a:p>
+            <a:r>
+              <a:rPr lang="fr-FR" sz="1400" dirty="0" smtClean="0"/>
+              <a:t>Passe-plat</a:t>
+            </a:r>
+            <a:endParaRPr lang="fr-FR" sz="1400" dirty="0"/>
+          </a:p>
+        </p:txBody>
+      </p:sp>
+      <p:sp>
+        <p:nvSpPr>
+          <p:cNvPr id="149" name="ZoneTexte 148"/>
+          <p:cNvSpPr txBox="1"/>
+          <p:nvPr/>
+        </p:nvSpPr>
+        <p:spPr>
+          <a:xfrm>
+            <a:off x="8374003" y="4365541"/>
+            <a:ext cx="1071960" cy="307777"/>
+          </a:xfrm>
+          <a:prstGeom prst="rect">
+            <a:avLst/>
+          </a:prstGeom>
+          <a:noFill/>
+        </p:spPr>
+        <p:txBody>
+          <a:bodyPr wrap="none" rtlCol="0">
+            <a:spAutoFit/>
+          </a:bodyPr>
+          <a:lstStyle/>
+          <a:p>
+            <a:r>
+              <a:rPr lang="fr-FR" sz="1400" dirty="0" smtClean="0"/>
+              <a:t>Appel direct</a:t>
+            </a:r>
+            <a:endParaRPr lang="fr-FR" sz="1400" dirty="0"/>
+          </a:p>
+        </p:txBody>
+      </p:sp>
+      <p:sp>
+        <p:nvSpPr>
+          <p:cNvPr id="150" name="ZoneTexte 149"/>
+          <p:cNvSpPr txBox="1"/>
+          <p:nvPr/>
+        </p:nvSpPr>
+        <p:spPr>
+          <a:xfrm>
+            <a:off x="5548051" y="4939526"/>
+            <a:ext cx="1225144" cy="523220"/>
+          </a:xfrm>
+          <a:prstGeom prst="rect">
+            <a:avLst/>
+          </a:prstGeom>
+          <a:noFill/>
+        </p:spPr>
+        <p:txBody>
+          <a:bodyPr wrap="none" rtlCol="0">
+            <a:spAutoFit/>
+          </a:bodyPr>
+          <a:lstStyle/>
+          <a:p>
+            <a:pPr algn="ctr"/>
+            <a:r>
+              <a:rPr lang="fr-FR" sz="1400" dirty="0" smtClean="0"/>
+              <a:t>Formatage</a:t>
+            </a:r>
+          </a:p>
+          <a:p>
+            <a:pPr algn="ctr"/>
+            <a:r>
+              <a:rPr lang="fr-FR" sz="1400" dirty="0" smtClean="0"/>
+              <a:t>Mise en cache</a:t>
+            </a:r>
+            <a:endParaRPr lang="fr-FR" sz="1400" dirty="0"/>
+          </a:p>
+        </p:txBody>
+      </p:sp>
     </p:spTree>
     <p:extLst>
       <p:ext uri="{BB962C8B-B14F-4D97-AF65-F5344CB8AC3E}">

</xml_diff>

<commit_message>
Clarification du schéma de shadowing et ajout d'une capture de web.config
</commit_message>
<xml_diff>
--- a/Speak'up API shadowing.pptx
+++ b/Speak'up API shadowing.pptx
@@ -5,7 +5,7 @@
     <p:sldMasterId id="2147483648" r:id="rId11"/>
   </p:sldMasterIdLst>
   <p:notesMasterIdLst>
-    <p:notesMasterId r:id="rId22"/>
+    <p:notesMasterId r:id="rId24"/>
   </p:notesMasterIdLst>
   <p:sldIdLst>
     <p:sldId id="256" r:id="rId12"/>
@@ -18,6 +18,8 @@
     <p:sldId id="284" r:id="rId19"/>
     <p:sldId id="286" r:id="rId20"/>
     <p:sldId id="287" r:id="rId21"/>
+    <p:sldId id="291" r:id="rId22"/>
+    <p:sldId id="292" r:id="rId23"/>
   </p:sldIdLst>
   <p:sldSz cx="12192000" cy="6858000"/>
   <p:notesSz cx="6858000" cy="9144000"/>
@@ -218,7 +220,7 @@
           <a:p>
             <a:fld id="{B5AD0476-FE6D-4A78-9DC3-98305AD3C12A}" type="datetimeFigureOut">
               <a:rPr lang="fr-FR" smtClean="0"/>
-              <a:t>29/10/2019</a:t>
+              <a:t>31/10/2019</a:t>
             </a:fld>
             <a:endParaRPr lang="fr-FR"/>
           </a:p>
@@ -569,6 +571,116 @@
 </p:notes>
 </file>
 
+<file path=ppt/notesSlides/notesSlide10.xml><?xml version="1.0" encoding="utf-8"?>
+<p:notes xmlns:a="http://schemas.openxmlformats.org/drawingml/2006/main" xmlns:r="http://schemas.openxmlformats.org/officeDocument/2006/relationships" xmlns:p="http://schemas.openxmlformats.org/presentationml/2006/main">
+  <p:cSld>
+    <p:spTree>
+      <p:nvGrpSpPr>
+        <p:cNvPr id="1" name=""/>
+        <p:cNvGrpSpPr/>
+        <p:nvPr/>
+      </p:nvGrpSpPr>
+      <p:grpSpPr>
+        <a:xfrm>
+          <a:off x="0" y="0"/>
+          <a:ext cx="0" cy="0"/>
+          <a:chOff x="0" y="0"/>
+          <a:chExt cx="0" cy="0"/>
+        </a:xfrm>
+      </p:grpSpPr>
+      <p:sp>
+        <p:nvSpPr>
+          <p:cNvPr id="2" name="Espace réservé de l'image des diapositives 1"/>
+          <p:cNvSpPr>
+            <a:spLocks noGrp="1" noRot="1" noChangeAspect="1"/>
+          </p:cNvSpPr>
+          <p:nvPr>
+            <p:ph type="sldImg"/>
+          </p:nvPr>
+        </p:nvSpPr>
+        <p:spPr/>
+      </p:sp>
+      <p:sp>
+        <p:nvSpPr>
+          <p:cNvPr id="3" name="Espace réservé des notes 2"/>
+          <p:cNvSpPr>
+            <a:spLocks noGrp="1"/>
+          </p:cNvSpPr>
+          <p:nvPr>
+            <p:ph type="body" idx="1"/>
+          </p:nvPr>
+        </p:nvSpPr>
+        <p:spPr/>
+        <p:txBody>
+          <a:bodyPr/>
+          <a:lstStyle/>
+          <a:p>
+            <a:r>
+              <a:rPr lang="fr-FR" dirty="0" smtClean="0"/>
+              <a:t>Pas un cours sur url rewriting, quelques</a:t>
+            </a:r>
+            <a:r>
+              <a:rPr lang="fr-FR" baseline="0" dirty="0" smtClean="0"/>
+              <a:t> erreurs possibles</a:t>
+            </a:r>
+            <a:endParaRPr lang="fr-FR" dirty="0" smtClean="0"/>
+          </a:p>
+          <a:p>
+            <a:endParaRPr lang="fr-FR" dirty="0" smtClean="0"/>
+          </a:p>
+          <a:p>
+            <a:r>
+              <a:rPr lang="fr-FR" dirty="0" smtClean="0">
+                <a:sym typeface="Wingdings" panose="05000000000000000000" pitchFamily="2" charset="2"/>
+              </a:rPr>
+              <a:t> Chaque règle avec</a:t>
+            </a:r>
+            <a:r>
+              <a:rPr lang="fr-FR" baseline="0" dirty="0" smtClean="0">
+                <a:sym typeface="Wingdings" panose="05000000000000000000" pitchFamily="2" charset="2"/>
+              </a:rPr>
+              <a:t> un « type="None" » est lié à un contrôleur et une action permettant le traitement de la requête</a:t>
+            </a:r>
+            <a:endParaRPr lang="fr-FR" dirty="0"/>
+          </a:p>
+        </p:txBody>
+      </p:sp>
+      <p:sp>
+        <p:nvSpPr>
+          <p:cNvPr id="4" name="Espace réservé du numéro de diapositive 3"/>
+          <p:cNvSpPr>
+            <a:spLocks noGrp="1"/>
+          </p:cNvSpPr>
+          <p:nvPr>
+            <p:ph type="sldNum" sz="quarter" idx="10"/>
+          </p:nvPr>
+        </p:nvSpPr>
+        <p:spPr/>
+        <p:txBody>
+          <a:bodyPr/>
+          <a:lstStyle/>
+          <a:p>
+            <a:fld id="{AA5DF8EF-0F82-44B3-979E-DBC26962337C}" type="slidenum">
+              <a:rPr lang="fr-FR" smtClean="0"/>
+              <a:t>12</a:t>
+            </a:fld>
+            <a:endParaRPr lang="fr-FR"/>
+          </a:p>
+        </p:txBody>
+      </p:sp>
+    </p:spTree>
+    <p:extLst>
+      <p:ext uri="{BB962C8B-B14F-4D97-AF65-F5344CB8AC3E}">
+        <p14:creationId xmlns:p14="http://schemas.microsoft.com/office/powerpoint/2010/main" val="2585626343"/>
+      </p:ext>
+    </p:extLst>
+  </p:cSld>
+  <p:clrMapOvr>
+    <a:masterClrMapping/>
+  </p:clrMapOvr>
+</p:notes>
+</file>
+
 <file path=ppt/notesSlides/notesSlide2.xml><?xml version="1.0" encoding="utf-8"?>
 <p:notes xmlns:a="http://schemas.openxmlformats.org/drawingml/2006/main" xmlns:r="http://schemas.openxmlformats.org/officeDocument/2006/relationships" xmlns:p="http://schemas.openxmlformats.org/presentationml/2006/main">
   <p:cSld>
@@ -1426,18 +1538,125 @@
               <a:defRPr/>
             </a:pPr>
             <a:r>
-              <a:rPr lang="fr-FR" b="1" dirty="0" smtClean="0"/>
+              <a:rPr lang="fr-FR" b="0" dirty="0" smtClean="0"/>
+              <a:t>Implémentation</a:t>
+            </a:r>
+            <a:r>
+              <a:rPr lang="fr-FR" b="0" baseline="0" dirty="0" smtClean="0"/>
+              <a:t> « à blanc »: déploiement en </a:t>
+            </a:r>
+            <a:r>
+              <a:rPr lang="fr-FR" b="0" baseline="0" dirty="0" err="1" smtClean="0"/>
+              <a:t>prod</a:t>
+            </a:r>
+            <a:r>
+              <a:rPr lang="fr-FR" b="0" baseline="0" dirty="0" smtClean="0"/>
+              <a:t> sur un site de test non accessible au public</a:t>
+            </a:r>
+            <a:endParaRPr lang="fr-FR" b="0" dirty="0" smtClean="0"/>
+          </a:p>
+          <a:p>
+            <a:pPr marL="0" marR="0" lvl="0" indent="0" algn="l" defTabSz="914400" rtl="0" eaLnBrk="1" fontAlgn="auto" latinLnBrk="0" hangingPunct="1">
+              <a:lnSpc>
+                <a:spcPct val="100000"/>
+              </a:lnSpc>
+              <a:spcBef>
+                <a:spcPts val="0"/>
+              </a:spcBef>
+              <a:spcAft>
+                <a:spcPts val="0"/>
+              </a:spcAft>
+              <a:buClrTx/>
+              <a:buSzTx/>
+              <a:buFontTx/>
+              <a:buNone/>
+              <a:tabLst/>
+              <a:defRPr/>
+            </a:pPr>
+            <a:endParaRPr lang="fr-FR" b="0" dirty="0" smtClean="0"/>
+          </a:p>
+          <a:p>
+            <a:pPr marL="171450" marR="0" lvl="0" indent="-171450" algn="l" defTabSz="914400" rtl="0" eaLnBrk="1" fontAlgn="auto" latinLnBrk="0" hangingPunct="1">
+              <a:lnSpc>
+                <a:spcPct val="100000"/>
+              </a:lnSpc>
+              <a:spcBef>
+                <a:spcPts val="0"/>
+              </a:spcBef>
+              <a:spcAft>
+                <a:spcPts val="0"/>
+              </a:spcAft>
+              <a:buClrTx/>
+              <a:buSzTx/>
+              <a:buFontTx/>
+              <a:buChar char="-"/>
+              <a:tabLst/>
+              <a:defRPr/>
+            </a:pPr>
+            <a:r>
+              <a:rPr lang="fr-FR" b="0" dirty="0" smtClean="0"/>
               <a:t>Validation de l’architecture :</a:t>
             </a:r>
             <a:r>
-              <a:rPr lang="fr-FR" b="1" baseline="0" dirty="0" smtClean="0"/>
-              <a:t> </a:t>
-            </a:r>
-            <a:r>
               <a:rPr lang="fr-FR" b="0" baseline="0" dirty="0" smtClean="0"/>
-              <a:t>uniquement pour valider la validité de l’architecture</a:t>
-            </a:r>
-            <a:endParaRPr lang="fr-FR" b="1" dirty="0" smtClean="0"/>
+              <a:t> uniquement pour valider la validité de l’architecture avec une route de test</a:t>
+            </a:r>
+          </a:p>
+          <a:p>
+            <a:pPr marL="171450" marR="0" lvl="0" indent="-171450" algn="l" defTabSz="914400" rtl="0" eaLnBrk="1" fontAlgn="auto" latinLnBrk="0" hangingPunct="1">
+              <a:lnSpc>
+                <a:spcPct val="100000"/>
+              </a:lnSpc>
+              <a:spcBef>
+                <a:spcPts val="0"/>
+              </a:spcBef>
+              <a:spcAft>
+                <a:spcPts val="0"/>
+              </a:spcAft>
+              <a:buClrTx/>
+              <a:buSzTx/>
+              <a:buFontTx/>
+              <a:buChar char="-"/>
+              <a:tabLst/>
+              <a:defRPr/>
+            </a:pPr>
+            <a:r>
+              <a:rPr lang="fr-FR" b="0" baseline="0" dirty="0" smtClean="0"/>
+              <a:t>Implémentation du système de passe-plat pour 100% des </a:t>
+            </a:r>
+            <a:r>
+              <a:rPr lang="fr-FR" b="0" baseline="0" dirty="0" err="1" smtClean="0"/>
+              <a:t>urls</a:t>
+            </a:r>
+            <a:endParaRPr lang="fr-FR" b="0" baseline="0" dirty="0" smtClean="0"/>
+          </a:p>
+          <a:p>
+            <a:pPr marL="171450" marR="0" lvl="0" indent="-171450" algn="l" defTabSz="914400" rtl="0" eaLnBrk="1" fontAlgn="auto" latinLnBrk="0" hangingPunct="1">
+              <a:lnSpc>
+                <a:spcPct val="100000"/>
+              </a:lnSpc>
+              <a:spcBef>
+                <a:spcPts val="0"/>
+              </a:spcBef>
+              <a:spcAft>
+                <a:spcPts val="0"/>
+              </a:spcAft>
+              <a:buClrTx/>
+              <a:buSzTx/>
+              <a:buFontTx/>
+              <a:buChar char="-"/>
+              <a:tabLst/>
+              <a:defRPr/>
+            </a:pPr>
+            <a:r>
+              <a:rPr lang="fr-FR" b="0" dirty="0" err="1" smtClean="0"/>
+              <a:t>Overriding</a:t>
+            </a:r>
+            <a:r>
+              <a:rPr lang="fr-FR" b="0" baseline="0" dirty="0" smtClean="0"/>
+              <a:t> d’une première route sans passe-plat, toutes les autres y restent</a:t>
+            </a:r>
+            <a:endParaRPr lang="fr-FR" b="0" dirty="0" smtClean="0"/>
           </a:p>
         </p:txBody>
       </p:sp>
@@ -1521,6 +1740,32 @@
           <a:bodyPr/>
           <a:lstStyle/>
           <a:p>
+            <a:r>
+              <a:rPr lang="fr-FR" dirty="0" smtClean="0"/>
+              <a:t>Pas un cours sur url rewriting, quelques</a:t>
+            </a:r>
+            <a:r>
+              <a:rPr lang="fr-FR" baseline="0" dirty="0" smtClean="0"/>
+              <a:t> erreurs possibles</a:t>
+            </a:r>
+            <a:endParaRPr lang="fr-FR" dirty="0" smtClean="0"/>
+          </a:p>
+          <a:p>
+            <a:endParaRPr lang="fr-FR" dirty="0" smtClean="0"/>
+          </a:p>
+          <a:p>
+            <a:r>
+              <a:rPr lang="fr-FR" dirty="0" smtClean="0">
+                <a:sym typeface="Wingdings" panose="05000000000000000000" pitchFamily="2" charset="2"/>
+              </a:rPr>
+              <a:t> Chaque règle avec</a:t>
+            </a:r>
+            <a:r>
+              <a:rPr lang="fr-FR" baseline="0" dirty="0" smtClean="0">
+                <a:sym typeface="Wingdings" panose="05000000000000000000" pitchFamily="2" charset="2"/>
+              </a:rPr>
+              <a:t> un « type="None" » est lié à un contrôleur et une action permettant le traitement de la requête</a:t>
+            </a:r>
             <a:endParaRPr lang="fr-FR" dirty="0"/>
           </a:p>
         </p:txBody>
@@ -1552,6 +1797,226 @@
     <p:extLst>
       <p:ext uri="{BB962C8B-B14F-4D97-AF65-F5344CB8AC3E}">
         <p14:creationId xmlns:p14="http://schemas.microsoft.com/office/powerpoint/2010/main" val="840657671"/>
+      </p:ext>
+    </p:extLst>
+  </p:cSld>
+  <p:clrMapOvr>
+    <a:masterClrMapping/>
+  </p:clrMapOvr>
+</p:notes>
+</file>
+
+<file path=ppt/notesSlides/notesSlide9.xml><?xml version="1.0" encoding="utf-8"?>
+<p:notes xmlns:a="http://schemas.openxmlformats.org/drawingml/2006/main" xmlns:r="http://schemas.openxmlformats.org/officeDocument/2006/relationships" xmlns:p="http://schemas.openxmlformats.org/presentationml/2006/main">
+  <p:cSld>
+    <p:spTree>
+      <p:nvGrpSpPr>
+        <p:cNvPr id="1" name=""/>
+        <p:cNvGrpSpPr/>
+        <p:nvPr/>
+      </p:nvGrpSpPr>
+      <p:grpSpPr>
+        <a:xfrm>
+          <a:off x="0" y="0"/>
+          <a:ext cx="0" cy="0"/>
+          <a:chOff x="0" y="0"/>
+          <a:chExt cx="0" cy="0"/>
+        </a:xfrm>
+      </p:grpSpPr>
+      <p:sp>
+        <p:nvSpPr>
+          <p:cNvPr id="2" name="Espace réservé de l'image des diapositives 1"/>
+          <p:cNvSpPr>
+            <a:spLocks noGrp="1" noRot="1" noChangeAspect="1"/>
+          </p:cNvSpPr>
+          <p:nvPr>
+            <p:ph type="sldImg"/>
+          </p:nvPr>
+        </p:nvSpPr>
+        <p:spPr/>
+      </p:sp>
+      <p:sp>
+        <p:nvSpPr>
+          <p:cNvPr id="3" name="Espace réservé des notes 2"/>
+          <p:cNvSpPr>
+            <a:spLocks noGrp="1"/>
+          </p:cNvSpPr>
+          <p:nvPr>
+            <p:ph type="body" idx="1"/>
+          </p:nvPr>
+        </p:nvSpPr>
+        <p:spPr/>
+        <p:txBody>
+          <a:bodyPr/>
+          <a:lstStyle/>
+          <a:p>
+            <a:pPr marL="0" marR="0" lvl="0" indent="0" algn="l" defTabSz="914400" rtl="0" eaLnBrk="1" fontAlgn="auto" latinLnBrk="0" hangingPunct="1">
+              <a:lnSpc>
+                <a:spcPct val="100000"/>
+              </a:lnSpc>
+              <a:spcBef>
+                <a:spcPts val="0"/>
+              </a:spcBef>
+              <a:spcAft>
+                <a:spcPts val="0"/>
+              </a:spcAft>
+              <a:buClrTx/>
+              <a:buSzTx/>
+              <a:buFontTx/>
+              <a:buNone/>
+              <a:tabLst/>
+              <a:defRPr/>
+            </a:pPr>
+            <a:r>
+              <a:rPr lang="fr-FR" b="0" dirty="0" smtClean="0"/>
+              <a:t>Implémentation</a:t>
+            </a:r>
+            <a:r>
+              <a:rPr lang="fr-FR" b="0" baseline="0" dirty="0" smtClean="0"/>
+              <a:t> « à blanc »: déploiement en </a:t>
+            </a:r>
+            <a:r>
+              <a:rPr lang="fr-FR" b="0" baseline="0" dirty="0" err="1" smtClean="0"/>
+              <a:t>prod</a:t>
+            </a:r>
+            <a:r>
+              <a:rPr lang="fr-FR" b="0" baseline="0" dirty="0" smtClean="0"/>
+              <a:t> sur un site de test non accessible au public</a:t>
+            </a:r>
+            <a:endParaRPr lang="fr-FR" b="0" dirty="0" smtClean="0"/>
+          </a:p>
+          <a:p>
+            <a:pPr marL="0" marR="0" lvl="0" indent="0" algn="l" defTabSz="914400" rtl="0" eaLnBrk="1" fontAlgn="auto" latinLnBrk="0" hangingPunct="1">
+              <a:lnSpc>
+                <a:spcPct val="100000"/>
+              </a:lnSpc>
+              <a:spcBef>
+                <a:spcPts val="0"/>
+              </a:spcBef>
+              <a:spcAft>
+                <a:spcPts val="0"/>
+              </a:spcAft>
+              <a:buClrTx/>
+              <a:buSzTx/>
+              <a:buFontTx/>
+              <a:buNone/>
+              <a:tabLst/>
+              <a:defRPr/>
+            </a:pPr>
+            <a:endParaRPr lang="fr-FR" b="0" dirty="0" smtClean="0"/>
+          </a:p>
+          <a:p>
+            <a:pPr marL="171450" marR="0" lvl="0" indent="-171450" algn="l" defTabSz="914400" rtl="0" eaLnBrk="1" fontAlgn="auto" latinLnBrk="0" hangingPunct="1">
+              <a:lnSpc>
+                <a:spcPct val="100000"/>
+              </a:lnSpc>
+              <a:spcBef>
+                <a:spcPts val="0"/>
+              </a:spcBef>
+              <a:spcAft>
+                <a:spcPts val="0"/>
+              </a:spcAft>
+              <a:buClrTx/>
+              <a:buSzTx/>
+              <a:buFontTx/>
+              <a:buChar char="-"/>
+              <a:tabLst/>
+              <a:defRPr/>
+            </a:pPr>
+            <a:r>
+              <a:rPr lang="fr-FR" b="0" dirty="0" smtClean="0"/>
+              <a:t>Validation de l’architecture :</a:t>
+            </a:r>
+            <a:r>
+              <a:rPr lang="fr-FR" b="0" baseline="0" dirty="0" smtClean="0"/>
+              <a:t> uniquement pour valider la validité de l’architecture avec une route de test</a:t>
+            </a:r>
+          </a:p>
+          <a:p>
+            <a:pPr marL="171450" marR="0" lvl="0" indent="-171450" algn="l" defTabSz="914400" rtl="0" eaLnBrk="1" fontAlgn="auto" latinLnBrk="0" hangingPunct="1">
+              <a:lnSpc>
+                <a:spcPct val="100000"/>
+              </a:lnSpc>
+              <a:spcBef>
+                <a:spcPts val="0"/>
+              </a:spcBef>
+              <a:spcAft>
+                <a:spcPts val="0"/>
+              </a:spcAft>
+              <a:buClrTx/>
+              <a:buSzTx/>
+              <a:buFontTx/>
+              <a:buChar char="-"/>
+              <a:tabLst/>
+              <a:defRPr/>
+            </a:pPr>
+            <a:r>
+              <a:rPr lang="fr-FR" b="0" baseline="0" dirty="0" smtClean="0"/>
+              <a:t>Implémentation du système de passe-plat pour 100% des </a:t>
+            </a:r>
+            <a:r>
+              <a:rPr lang="fr-FR" b="0" baseline="0" dirty="0" err="1" smtClean="0"/>
+              <a:t>urls</a:t>
+            </a:r>
+            <a:endParaRPr lang="fr-FR" b="0" baseline="0" dirty="0" smtClean="0"/>
+          </a:p>
+          <a:p>
+            <a:pPr marL="171450" marR="0" lvl="0" indent="-171450" algn="l" defTabSz="914400" rtl="0" eaLnBrk="1" fontAlgn="auto" latinLnBrk="0" hangingPunct="1">
+              <a:lnSpc>
+                <a:spcPct val="100000"/>
+              </a:lnSpc>
+              <a:spcBef>
+                <a:spcPts val="0"/>
+              </a:spcBef>
+              <a:spcAft>
+                <a:spcPts val="0"/>
+              </a:spcAft>
+              <a:buClrTx/>
+              <a:buSzTx/>
+              <a:buFontTx/>
+              <a:buChar char="-"/>
+              <a:tabLst/>
+              <a:defRPr/>
+            </a:pPr>
+            <a:r>
+              <a:rPr lang="fr-FR" b="0" dirty="0" err="1" smtClean="0"/>
+              <a:t>Overriding</a:t>
+            </a:r>
+            <a:r>
+              <a:rPr lang="fr-FR" b="0" baseline="0" dirty="0" smtClean="0"/>
+              <a:t> d’une première route sans passe-plat, toutes les autres y restent</a:t>
+            </a:r>
+            <a:endParaRPr lang="fr-FR" b="0" dirty="0" smtClean="0"/>
+          </a:p>
+        </p:txBody>
+      </p:sp>
+      <p:sp>
+        <p:nvSpPr>
+          <p:cNvPr id="4" name="Espace réservé du numéro de diapositive 3"/>
+          <p:cNvSpPr>
+            <a:spLocks noGrp="1"/>
+          </p:cNvSpPr>
+          <p:nvPr>
+            <p:ph type="sldNum" sz="quarter" idx="10"/>
+          </p:nvPr>
+        </p:nvSpPr>
+        <p:spPr/>
+        <p:txBody>
+          <a:bodyPr/>
+          <a:lstStyle/>
+          <a:p>
+            <a:fld id="{AA5DF8EF-0F82-44B3-979E-DBC26962337C}" type="slidenum">
+              <a:rPr lang="fr-FR" smtClean="0"/>
+              <a:t>11</a:t>
+            </a:fld>
+            <a:endParaRPr lang="fr-FR"/>
+          </a:p>
+        </p:txBody>
+      </p:sp>
+    </p:spTree>
+    <p:extLst>
+      <p:ext uri="{BB962C8B-B14F-4D97-AF65-F5344CB8AC3E}">
+        <p14:creationId xmlns:p14="http://schemas.microsoft.com/office/powerpoint/2010/main" val="2427420668"/>
       </p:ext>
     </p:extLst>
   </p:cSld>
@@ -1708,7 +2173,7 @@
           <a:p>
             <a:fld id="{2A800B55-2EA3-4651-92C4-339DC2AA9BC2}" type="datetimeFigureOut">
               <a:rPr lang="fr-FR" smtClean="0"/>
-              <a:t>29/10/2019</a:t>
+              <a:t>31/10/2019</a:t>
             </a:fld>
             <a:endParaRPr lang="fr-FR"/>
           </a:p>
@@ -1906,7 +2371,7 @@
           <a:p>
             <a:fld id="{2A800B55-2EA3-4651-92C4-339DC2AA9BC2}" type="datetimeFigureOut">
               <a:rPr lang="fr-FR" smtClean="0"/>
-              <a:t>29/10/2019</a:t>
+              <a:t>31/10/2019</a:t>
             </a:fld>
             <a:endParaRPr lang="fr-FR"/>
           </a:p>
@@ -2114,7 +2579,7 @@
           <a:p>
             <a:fld id="{2A800B55-2EA3-4651-92C4-339DC2AA9BC2}" type="datetimeFigureOut">
               <a:rPr lang="fr-FR" smtClean="0"/>
-              <a:t>29/10/2019</a:t>
+              <a:t>31/10/2019</a:t>
             </a:fld>
             <a:endParaRPr lang="fr-FR"/>
           </a:p>
@@ -2312,7 +2777,7 @@
           <a:p>
             <a:fld id="{2A800B55-2EA3-4651-92C4-339DC2AA9BC2}" type="datetimeFigureOut">
               <a:rPr lang="fr-FR" smtClean="0"/>
-              <a:t>29/10/2019</a:t>
+              <a:t>31/10/2019</a:t>
             </a:fld>
             <a:endParaRPr lang="fr-FR"/>
           </a:p>
@@ -2587,7 +3052,7 @@
           <a:p>
             <a:fld id="{2A800B55-2EA3-4651-92C4-339DC2AA9BC2}" type="datetimeFigureOut">
               <a:rPr lang="fr-FR" smtClean="0"/>
-              <a:t>29/10/2019</a:t>
+              <a:t>31/10/2019</a:t>
             </a:fld>
             <a:endParaRPr lang="fr-FR"/>
           </a:p>
@@ -2852,7 +3317,7 @@
           <a:p>
             <a:fld id="{2A800B55-2EA3-4651-92C4-339DC2AA9BC2}" type="datetimeFigureOut">
               <a:rPr lang="fr-FR" smtClean="0"/>
-              <a:t>29/10/2019</a:t>
+              <a:t>31/10/2019</a:t>
             </a:fld>
             <a:endParaRPr lang="fr-FR"/>
           </a:p>
@@ -3264,7 +3729,7 @@
           <a:p>
             <a:fld id="{2A800B55-2EA3-4651-92C4-339DC2AA9BC2}" type="datetimeFigureOut">
               <a:rPr lang="fr-FR" smtClean="0"/>
-              <a:t>29/10/2019</a:t>
+              <a:t>31/10/2019</a:t>
             </a:fld>
             <a:endParaRPr lang="fr-FR"/>
           </a:p>
@@ -3405,7 +3870,7 @@
           <a:p>
             <a:fld id="{2A800B55-2EA3-4651-92C4-339DC2AA9BC2}" type="datetimeFigureOut">
               <a:rPr lang="fr-FR" smtClean="0"/>
-              <a:t>29/10/2019</a:t>
+              <a:t>31/10/2019</a:t>
             </a:fld>
             <a:endParaRPr lang="fr-FR"/>
           </a:p>
@@ -3518,7 +3983,7 @@
           <a:p>
             <a:fld id="{2A800B55-2EA3-4651-92C4-339DC2AA9BC2}" type="datetimeFigureOut">
               <a:rPr lang="fr-FR" smtClean="0"/>
-              <a:t>29/10/2019</a:t>
+              <a:t>31/10/2019</a:t>
             </a:fld>
             <a:endParaRPr lang="fr-FR"/>
           </a:p>
@@ -3829,7 +4294,7 @@
           <a:p>
             <a:fld id="{2A800B55-2EA3-4651-92C4-339DC2AA9BC2}" type="datetimeFigureOut">
               <a:rPr lang="fr-FR" smtClean="0"/>
-              <a:t>29/10/2019</a:t>
+              <a:t>31/10/2019</a:t>
             </a:fld>
             <a:endParaRPr lang="fr-FR"/>
           </a:p>
@@ -4117,7 +4582,7 @@
           <a:p>
             <a:fld id="{2A800B55-2EA3-4651-92C4-339DC2AA9BC2}" type="datetimeFigureOut">
               <a:rPr lang="fr-FR" smtClean="0"/>
-              <a:t>29/10/2019</a:t>
+              <a:t>31/10/2019</a:t>
             </a:fld>
             <a:endParaRPr lang="fr-FR"/>
           </a:p>
@@ -4358,7 +4823,7 @@
           <a:p>
             <a:fld id="{2A800B55-2EA3-4651-92C4-339DC2AA9BC2}" type="datetimeFigureOut">
               <a:rPr lang="fr-FR" smtClean="0"/>
-              <a:t>29/10/2019</a:t>
+              <a:t>31/10/2019</a:t>
             </a:fld>
             <a:endParaRPr lang="fr-FR"/>
           </a:p>
@@ -4920,10 +5385,1636 @@
           </a:prstGeom>
         </p:spPr>
       </p:pic>
+      <p:sp>
+        <p:nvSpPr>
+          <p:cNvPr id="2" name="ZoneTexte 1"/>
+          <p:cNvSpPr txBox="1"/>
+          <p:nvPr/>
+        </p:nvSpPr>
+        <p:spPr>
+          <a:xfrm>
+            <a:off x="4772722" y="666974"/>
+            <a:ext cx="2646558" cy="369332"/>
+          </a:xfrm>
+          <a:prstGeom prst="rect">
+            <a:avLst/>
+          </a:prstGeom>
+          <a:noFill/>
+        </p:spPr>
+        <p:txBody>
+          <a:bodyPr wrap="none" rtlCol="0">
+            <a:spAutoFit/>
+          </a:bodyPr>
+          <a:lstStyle/>
+          <a:p>
+            <a:pPr algn="ctr"/>
+            <a:r>
+              <a:rPr lang="fr-FR" dirty="0" smtClean="0"/>
+              <a:t>Contenu du </a:t>
+            </a:r>
+            <a:r>
+              <a:rPr lang="fr-FR" dirty="0" err="1" smtClean="0"/>
+              <a:t>web.config</a:t>
+            </a:r>
+            <a:r>
+              <a:rPr lang="fr-FR" dirty="0" smtClean="0"/>
+              <a:t> #1</a:t>
+            </a:r>
+            <a:endParaRPr lang="fr-FR" dirty="0"/>
+          </a:p>
+        </p:txBody>
+      </p:sp>
+      <p:pic>
+        <p:nvPicPr>
+          <p:cNvPr id="7" name="Image 6"/>
+          <p:cNvPicPr>
+            <a:picLocks noChangeAspect="1"/>
+          </p:cNvPicPr>
+          <p:nvPr/>
+        </p:nvPicPr>
+        <p:blipFill>
+          <a:blip r:embed="rId5"/>
+          <a:stretch>
+            <a:fillRect/>
+          </a:stretch>
+        </p:blipFill>
+        <p:spPr>
+          <a:xfrm>
+            <a:off x="2241107" y="1469489"/>
+            <a:ext cx="7709785" cy="3707144"/>
+          </a:xfrm>
+          <a:prstGeom prst="rect">
+            <a:avLst/>
+          </a:prstGeom>
+        </p:spPr>
+      </p:pic>
     </p:spTree>
     <p:extLst>
       <p:ext uri="{BB962C8B-B14F-4D97-AF65-F5344CB8AC3E}">
         <p14:creationId xmlns:p14="http://schemas.microsoft.com/office/powerpoint/2010/main" val="573561870"/>
+      </p:ext>
+    </p:extLst>
+  </p:cSld>
+  <p:clrMapOvr>
+    <a:masterClrMapping/>
+  </p:clrMapOvr>
+  <p:timing>
+    <p:tnLst>
+      <p:par>
+        <p:cTn id="1" dur="indefinite" restart="never" nodeType="tmRoot"/>
+      </p:par>
+    </p:tnLst>
+  </p:timing>
+</p:sld>
+</file>
+
+<file path=ppt/slides/slide11.xml><?xml version="1.0" encoding="utf-8"?>
+<p:sld xmlns:a="http://schemas.openxmlformats.org/drawingml/2006/main" xmlns:r="http://schemas.openxmlformats.org/officeDocument/2006/relationships" xmlns:p="http://schemas.openxmlformats.org/presentationml/2006/main">
+  <p:cSld>
+    <p:spTree>
+      <p:nvGrpSpPr>
+        <p:cNvPr id="1" name=""/>
+        <p:cNvGrpSpPr/>
+        <p:nvPr/>
+      </p:nvGrpSpPr>
+      <p:grpSpPr>
+        <a:xfrm>
+          <a:off x="0" y="0"/>
+          <a:ext cx="0" cy="0"/>
+          <a:chOff x="0" y="0"/>
+          <a:chExt cx="0" cy="0"/>
+        </a:xfrm>
+      </p:grpSpPr>
+      <p:pic>
+        <p:nvPicPr>
+          <p:cNvPr id="5" name="Image 4">
+            <a:extLst>
+              <a:ext uri="{FF2B5EF4-FFF2-40B4-BE49-F238E27FC236}">
+                <a16:creationId xmlns:a16="http://schemas.microsoft.com/office/drawing/2014/main" id="{D91F6CE4-A0FB-4282-9B85-47FA5527C736}"/>
+              </a:ext>
+            </a:extLst>
+          </p:cNvPr>
+          <p:cNvPicPr>
+            <a:picLocks noChangeAspect="1"/>
+          </p:cNvPicPr>
+          <p:nvPr/>
+        </p:nvPicPr>
+        <p:blipFill>
+          <a:blip r:embed="rId3" cstate="print">
+            <a:extLst>
+              <a:ext uri="{28A0092B-C50C-407E-A947-70E740481C1C}">
+                <a14:useLocalDpi xmlns:a14="http://schemas.microsoft.com/office/drawing/2010/main" val="0"/>
+              </a:ext>
+            </a:extLst>
+          </a:blip>
+          <a:stretch>
+            <a:fillRect/>
+          </a:stretch>
+        </p:blipFill>
+        <p:spPr>
+          <a:xfrm>
+            <a:off x="293615" y="6291743"/>
+            <a:ext cx="10508871" cy="272654"/>
+          </a:xfrm>
+          <a:prstGeom prst="rect">
+            <a:avLst/>
+          </a:prstGeom>
+        </p:spPr>
+      </p:pic>
+      <p:pic>
+        <p:nvPicPr>
+          <p:cNvPr id="6" name="Image 5">
+            <a:extLst>
+              <a:ext uri="{FF2B5EF4-FFF2-40B4-BE49-F238E27FC236}">
+                <a16:creationId xmlns:a16="http://schemas.microsoft.com/office/drawing/2014/main" id="{B6F51BA5-E830-46D2-B1E2-3A2C10F760E7}"/>
+              </a:ext>
+            </a:extLst>
+          </p:cNvPr>
+          <p:cNvPicPr>
+            <a:picLocks noChangeAspect="1"/>
+          </p:cNvPicPr>
+          <p:nvPr/>
+        </p:nvPicPr>
+        <p:blipFill>
+          <a:blip r:embed="rId4" cstate="print">
+            <a:extLst>
+              <a:ext uri="{28A0092B-C50C-407E-A947-70E740481C1C}">
+                <a14:useLocalDpi xmlns:a14="http://schemas.microsoft.com/office/drawing/2010/main" val="0"/>
+              </a:ext>
+            </a:extLst>
+          </a:blip>
+          <a:stretch>
+            <a:fillRect/>
+          </a:stretch>
+        </p:blipFill>
+        <p:spPr>
+          <a:xfrm>
+            <a:off x="10802486" y="5912350"/>
+            <a:ext cx="1193772" cy="787940"/>
+          </a:xfrm>
+          <a:prstGeom prst="rect">
+            <a:avLst/>
+          </a:prstGeom>
+        </p:spPr>
+      </p:pic>
+      <p:sp>
+        <p:nvSpPr>
+          <p:cNvPr id="2" name="ZoneTexte 1"/>
+          <p:cNvSpPr txBox="1"/>
+          <p:nvPr/>
+        </p:nvSpPr>
+        <p:spPr>
+          <a:xfrm>
+            <a:off x="293615" y="322730"/>
+            <a:ext cx="11702643" cy="369332"/>
+          </a:xfrm>
+          <a:prstGeom prst="rect">
+            <a:avLst/>
+          </a:prstGeom>
+          <a:noFill/>
+        </p:spPr>
+        <p:txBody>
+          <a:bodyPr wrap="square" rtlCol="0">
+            <a:spAutoFit/>
+          </a:bodyPr>
+          <a:lstStyle/>
+          <a:p>
+            <a:r>
+              <a:rPr lang="fr-FR" dirty="0" smtClean="0"/>
+              <a:t>1</a:t>
+            </a:r>
+            <a:r>
+              <a:rPr lang="fr-FR" baseline="30000" dirty="0" smtClean="0"/>
+              <a:t>ère</a:t>
+            </a:r>
+            <a:r>
+              <a:rPr lang="fr-FR" dirty="0" smtClean="0"/>
+              <a:t> étape: Implémentation des </a:t>
+            </a:r>
+            <a:r>
+              <a:rPr lang="fr-FR" dirty="0" err="1" smtClean="0"/>
+              <a:t>POCs</a:t>
+            </a:r>
+            <a:r>
+              <a:rPr lang="fr-FR" dirty="0" smtClean="0"/>
+              <a:t> à blanc</a:t>
+            </a:r>
+            <a:endParaRPr lang="fr-FR" dirty="0"/>
+          </a:p>
+        </p:txBody>
+      </p:sp>
+      <p:sp>
+        <p:nvSpPr>
+          <p:cNvPr id="78" name="Rectangle à coins arrondis 77"/>
+          <p:cNvSpPr/>
+          <p:nvPr/>
+        </p:nvSpPr>
+        <p:spPr>
+          <a:xfrm>
+            <a:off x="882863" y="1299787"/>
+            <a:ext cx="1432350" cy="4279299"/>
+          </a:xfrm>
+          <a:prstGeom prst="roundRect">
+            <a:avLst/>
+          </a:prstGeom>
+        </p:spPr>
+        <p:style>
+          <a:lnRef idx="2">
+            <a:schemeClr val="accent1">
+              <a:shade val="50000"/>
+            </a:schemeClr>
+          </a:lnRef>
+          <a:fillRef idx="1">
+            <a:schemeClr val="accent1"/>
+          </a:fillRef>
+          <a:effectRef idx="0">
+            <a:schemeClr val="accent1"/>
+          </a:effectRef>
+          <a:fontRef idx="minor">
+            <a:schemeClr val="lt1"/>
+          </a:fontRef>
+        </p:style>
+        <p:txBody>
+          <a:bodyPr rtlCol="0" anchor="ctr" anchorCtr="1"/>
+          <a:lstStyle/>
+          <a:p>
+            <a:pPr algn="ctr"/>
+            <a:r>
+              <a:rPr lang="fr-FR" dirty="0" smtClean="0"/>
+              <a:t>Requêtes</a:t>
+            </a:r>
+            <a:endParaRPr lang="fr-FR" dirty="0"/>
+          </a:p>
+        </p:txBody>
+      </p:sp>
+      <p:sp>
+        <p:nvSpPr>
+          <p:cNvPr id="79" name="Rectangle à coins arrondis 78"/>
+          <p:cNvSpPr/>
+          <p:nvPr/>
+        </p:nvSpPr>
+        <p:spPr>
+          <a:xfrm>
+            <a:off x="4372192" y="1299785"/>
+            <a:ext cx="1221839" cy="4279301"/>
+          </a:xfrm>
+          <a:prstGeom prst="roundRect">
+            <a:avLst/>
+          </a:prstGeom>
+        </p:spPr>
+        <p:style>
+          <a:lnRef idx="2">
+            <a:schemeClr val="accent1">
+              <a:shade val="50000"/>
+            </a:schemeClr>
+          </a:lnRef>
+          <a:fillRef idx="1">
+            <a:schemeClr val="accent1"/>
+          </a:fillRef>
+          <a:effectRef idx="0">
+            <a:schemeClr val="accent1"/>
+          </a:effectRef>
+          <a:fontRef idx="minor">
+            <a:schemeClr val="lt1"/>
+          </a:fontRef>
+        </p:style>
+        <p:txBody>
+          <a:bodyPr vert="horz" rtlCol="0" anchor="ctr" anchorCtr="1">
+            <a:scene3d>
+              <a:camera prst="orthographicFront">
+                <a:rot lat="0" lon="0" rev="0"/>
+              </a:camera>
+              <a:lightRig rig="threePt" dir="t"/>
+            </a:scene3d>
+          </a:bodyPr>
+          <a:lstStyle/>
+          <a:p>
+            <a:pPr algn="ctr"/>
+            <a:r>
+              <a:rPr lang="fr-FR" cap="all" dirty="0" smtClean="0"/>
+              <a:t>IIS</a:t>
+            </a:r>
+            <a:endParaRPr lang="fr-FR" cap="all" dirty="0"/>
+          </a:p>
+        </p:txBody>
+      </p:sp>
+      <p:sp>
+        <p:nvSpPr>
+          <p:cNvPr id="80" name="Rectangle à coins arrondis 79"/>
+          <p:cNvSpPr/>
+          <p:nvPr/>
+        </p:nvSpPr>
+        <p:spPr>
+          <a:xfrm>
+            <a:off x="7870153" y="1299785"/>
+            <a:ext cx="1589361" cy="4277086"/>
+          </a:xfrm>
+          <a:prstGeom prst="roundRect">
+            <a:avLst/>
+          </a:prstGeom>
+        </p:spPr>
+        <p:style>
+          <a:lnRef idx="2">
+            <a:schemeClr val="accent1">
+              <a:shade val="50000"/>
+            </a:schemeClr>
+          </a:lnRef>
+          <a:fillRef idx="1">
+            <a:schemeClr val="accent1"/>
+          </a:fillRef>
+          <a:effectRef idx="0">
+            <a:schemeClr val="accent1"/>
+          </a:effectRef>
+          <a:fontRef idx="minor">
+            <a:schemeClr val="lt1"/>
+          </a:fontRef>
+        </p:style>
+        <p:txBody>
+          <a:bodyPr vert="horz" rtlCol="0" anchor="ctr" anchorCtr="1"/>
+          <a:lstStyle/>
+          <a:p>
+            <a:pPr algn="ctr"/>
+            <a:endParaRPr lang="fr-FR" dirty="0" smtClean="0"/>
+          </a:p>
+          <a:p>
+            <a:pPr algn="ctr"/>
+            <a:r>
+              <a:rPr lang="fr-FR" dirty="0" err="1" smtClean="0"/>
+              <a:t>SignalR</a:t>
+            </a:r>
+            <a:endParaRPr lang="fr-FR" dirty="0"/>
+          </a:p>
+        </p:txBody>
+      </p:sp>
+      <p:cxnSp>
+        <p:nvCxnSpPr>
+          <p:cNvPr id="81" name="Connecteur droit avec flèche 80"/>
+          <p:cNvCxnSpPr/>
+          <p:nvPr/>
+        </p:nvCxnSpPr>
+        <p:spPr>
+          <a:xfrm flipV="1">
+            <a:off x="2347486" y="1577801"/>
+            <a:ext cx="2016000" cy="2"/>
+          </a:xfrm>
+          <a:prstGeom prst="straightConnector1">
+            <a:avLst/>
+          </a:prstGeom>
+          <a:ln w="19050">
+            <a:solidFill>
+              <a:schemeClr val="accent6">
+                <a:lumMod val="75000"/>
+              </a:schemeClr>
+            </a:solidFill>
+            <a:tailEnd type="triangle"/>
+          </a:ln>
+        </p:spPr>
+        <p:style>
+          <a:lnRef idx="1">
+            <a:schemeClr val="accent1"/>
+          </a:lnRef>
+          <a:fillRef idx="0">
+            <a:schemeClr val="accent1"/>
+          </a:fillRef>
+          <a:effectRef idx="0">
+            <a:schemeClr val="accent1"/>
+          </a:effectRef>
+          <a:fontRef idx="minor">
+            <a:schemeClr val="tx1"/>
+          </a:fontRef>
+        </p:style>
+      </p:cxnSp>
+      <p:cxnSp>
+        <p:nvCxnSpPr>
+          <p:cNvPr id="82" name="Connecteur droit avec flèche 81"/>
+          <p:cNvCxnSpPr/>
+          <p:nvPr/>
+        </p:nvCxnSpPr>
+        <p:spPr>
+          <a:xfrm flipV="1">
+            <a:off x="5615547" y="1572940"/>
+            <a:ext cx="2304220" cy="4861"/>
+          </a:xfrm>
+          <a:prstGeom prst="straightConnector1">
+            <a:avLst/>
+          </a:prstGeom>
+          <a:ln w="19050">
+            <a:solidFill>
+              <a:schemeClr val="accent6">
+                <a:lumMod val="75000"/>
+              </a:schemeClr>
+            </a:solidFill>
+            <a:tailEnd type="triangle"/>
+          </a:ln>
+        </p:spPr>
+        <p:style>
+          <a:lnRef idx="1">
+            <a:schemeClr val="accent1"/>
+          </a:lnRef>
+          <a:fillRef idx="0">
+            <a:schemeClr val="accent1"/>
+          </a:fillRef>
+          <a:effectRef idx="0">
+            <a:schemeClr val="accent1"/>
+          </a:effectRef>
+          <a:fontRef idx="minor">
+            <a:schemeClr val="tx1"/>
+          </a:fontRef>
+        </p:style>
+      </p:cxnSp>
+      <p:sp>
+        <p:nvSpPr>
+          <p:cNvPr id="84" name="ZoneTexte 83"/>
+          <p:cNvSpPr txBox="1"/>
+          <p:nvPr/>
+        </p:nvSpPr>
+        <p:spPr>
+          <a:xfrm>
+            <a:off x="2390709" y="1310372"/>
+            <a:ext cx="1869551" cy="307777"/>
+          </a:xfrm>
+          <a:prstGeom prst="rect">
+            <a:avLst/>
+          </a:prstGeom>
+          <a:noFill/>
+        </p:spPr>
+        <p:txBody>
+          <a:bodyPr wrap="none" rtlCol="0" anchor="ctr" anchorCtr="1">
+            <a:spAutoFit/>
+          </a:bodyPr>
+          <a:lstStyle/>
+          <a:p>
+            <a:r>
+              <a:rPr lang="fr-FR" sz="1400" dirty="0" smtClean="0"/>
+              <a:t>url.com/</a:t>
+            </a:r>
+            <a:r>
+              <a:rPr lang="fr-FR" sz="1400" dirty="0" err="1" smtClean="0"/>
+              <a:t>testNew?p</a:t>
+            </a:r>
+            <a:r>
+              <a:rPr lang="fr-FR" sz="1400" dirty="0" smtClean="0"/>
+              <a:t>=42</a:t>
+            </a:r>
+            <a:endParaRPr lang="fr-FR" sz="1400" dirty="0"/>
+          </a:p>
+        </p:txBody>
+      </p:sp>
+      <p:cxnSp>
+        <p:nvCxnSpPr>
+          <p:cNvPr id="93" name="Connecteur droit avec flèche 92"/>
+          <p:cNvCxnSpPr/>
+          <p:nvPr/>
+        </p:nvCxnSpPr>
+        <p:spPr>
+          <a:xfrm flipH="1" flipV="1">
+            <a:off x="5594031" y="1814475"/>
+            <a:ext cx="2284561" cy="996"/>
+          </a:xfrm>
+          <a:prstGeom prst="straightConnector1">
+            <a:avLst/>
+          </a:prstGeom>
+          <a:ln w="19050">
+            <a:solidFill>
+              <a:schemeClr val="accent6">
+                <a:lumMod val="75000"/>
+              </a:schemeClr>
+            </a:solidFill>
+            <a:tailEnd type="triangle"/>
+          </a:ln>
+        </p:spPr>
+        <p:style>
+          <a:lnRef idx="1">
+            <a:schemeClr val="accent1"/>
+          </a:lnRef>
+          <a:fillRef idx="0">
+            <a:schemeClr val="accent1"/>
+          </a:fillRef>
+          <a:effectRef idx="0">
+            <a:schemeClr val="accent1"/>
+          </a:effectRef>
+          <a:fontRef idx="minor">
+            <a:schemeClr val="tx1"/>
+          </a:fontRef>
+        </p:style>
+      </p:cxnSp>
+      <p:cxnSp>
+        <p:nvCxnSpPr>
+          <p:cNvPr id="97" name="Connecteur droit avec flèche 96"/>
+          <p:cNvCxnSpPr/>
+          <p:nvPr/>
+        </p:nvCxnSpPr>
+        <p:spPr>
+          <a:xfrm flipH="1">
+            <a:off x="2325970" y="1814474"/>
+            <a:ext cx="2016000" cy="0"/>
+          </a:xfrm>
+          <a:prstGeom prst="straightConnector1">
+            <a:avLst/>
+          </a:prstGeom>
+          <a:ln w="19050">
+            <a:solidFill>
+              <a:schemeClr val="accent6">
+                <a:lumMod val="75000"/>
+              </a:schemeClr>
+            </a:solidFill>
+            <a:tailEnd type="triangle"/>
+          </a:ln>
+        </p:spPr>
+        <p:style>
+          <a:lnRef idx="1">
+            <a:schemeClr val="accent1"/>
+          </a:lnRef>
+          <a:fillRef idx="0">
+            <a:schemeClr val="accent1"/>
+          </a:fillRef>
+          <a:effectRef idx="0">
+            <a:schemeClr val="accent1"/>
+          </a:effectRef>
+          <a:fontRef idx="minor">
+            <a:schemeClr val="tx1"/>
+          </a:fontRef>
+        </p:style>
+      </p:cxnSp>
+      <p:sp>
+        <p:nvSpPr>
+          <p:cNvPr id="101" name="ZoneTexte 100"/>
+          <p:cNvSpPr txBox="1"/>
+          <p:nvPr/>
+        </p:nvSpPr>
+        <p:spPr>
+          <a:xfrm>
+            <a:off x="2668428" y="1873883"/>
+            <a:ext cx="1366784" cy="307777"/>
+          </a:xfrm>
+          <a:prstGeom prst="rect">
+            <a:avLst/>
+          </a:prstGeom>
+          <a:noFill/>
+        </p:spPr>
+        <p:txBody>
+          <a:bodyPr wrap="none" rtlCol="0" anchor="ctr" anchorCtr="1">
+            <a:spAutoFit/>
+          </a:bodyPr>
+          <a:lstStyle/>
+          <a:p>
+            <a:r>
+              <a:rPr lang="fr-FR" sz="1400" dirty="0" smtClean="0"/>
+              <a:t>{"</a:t>
+            </a:r>
+            <a:r>
+              <a:rPr lang="fr-FR" sz="1400" dirty="0" err="1" smtClean="0"/>
+              <a:t>answer</a:t>
+            </a:r>
+            <a:r>
+              <a:rPr lang="fr-FR" sz="1400" dirty="0" smtClean="0"/>
+              <a:t>": </a:t>
+            </a:r>
+            <a:r>
+              <a:rPr lang="fr-FR" sz="1400" dirty="0" err="1" smtClean="0"/>
+              <a:t>true</a:t>
+            </a:r>
+            <a:r>
+              <a:rPr lang="fr-FR" sz="1400" dirty="0" smtClean="0"/>
+              <a:t>}</a:t>
+            </a:r>
+            <a:endParaRPr lang="fr-FR" sz="1400" dirty="0"/>
+          </a:p>
+        </p:txBody>
+      </p:sp>
+      <p:sp>
+        <p:nvSpPr>
+          <p:cNvPr id="108" name="Rectangle à coins arrondis 107"/>
+          <p:cNvSpPr/>
+          <p:nvPr/>
+        </p:nvSpPr>
+        <p:spPr>
+          <a:xfrm>
+            <a:off x="6643127" y="2976670"/>
+            <a:ext cx="1072654" cy="579780"/>
+          </a:xfrm>
+          <a:prstGeom prst="roundRect">
+            <a:avLst/>
+          </a:prstGeom>
+        </p:spPr>
+        <p:style>
+          <a:lnRef idx="2">
+            <a:schemeClr val="accent1">
+              <a:shade val="50000"/>
+            </a:schemeClr>
+          </a:lnRef>
+          <a:fillRef idx="1">
+            <a:schemeClr val="accent1"/>
+          </a:fillRef>
+          <a:effectRef idx="0">
+            <a:schemeClr val="accent1"/>
+          </a:effectRef>
+          <a:fontRef idx="minor">
+            <a:schemeClr val="lt1"/>
+          </a:fontRef>
+        </p:style>
+        <p:txBody>
+          <a:bodyPr vert="horz" rtlCol="0" anchor="ctr" anchorCtr="1"/>
+          <a:lstStyle/>
+          <a:p>
+            <a:pPr algn="ctr"/>
+            <a:r>
+              <a:rPr lang="fr-FR" dirty="0" smtClean="0"/>
+              <a:t>Apache</a:t>
+            </a:r>
+            <a:endParaRPr lang="fr-FR" dirty="0"/>
+          </a:p>
+        </p:txBody>
+      </p:sp>
+      <p:grpSp>
+        <p:nvGrpSpPr>
+          <p:cNvPr id="123" name="Groupe 122"/>
+          <p:cNvGrpSpPr/>
+          <p:nvPr/>
+        </p:nvGrpSpPr>
+        <p:grpSpPr>
+          <a:xfrm>
+            <a:off x="9091826" y="1483682"/>
+            <a:ext cx="861716" cy="661583"/>
+            <a:chOff x="8047291" y="1868950"/>
+            <a:chExt cx="454004" cy="454003"/>
+          </a:xfrm>
+        </p:grpSpPr>
+        <p:sp>
+          <p:nvSpPr>
+            <p:cNvPr id="121" name="Arc 120"/>
+            <p:cNvSpPr/>
+            <p:nvPr/>
+          </p:nvSpPr>
+          <p:spPr>
+            <a:xfrm>
+              <a:off x="8090679" y="1868950"/>
+              <a:ext cx="410616" cy="454003"/>
+            </a:xfrm>
+            <a:prstGeom prst="arc">
+              <a:avLst/>
+            </a:prstGeom>
+            <a:ln w="19050">
+              <a:solidFill>
+                <a:schemeClr val="accent6">
+                  <a:lumMod val="75000"/>
+                </a:schemeClr>
+              </a:solidFill>
+              <a:headEnd type="none"/>
+              <a:tailEnd type="none"/>
+            </a:ln>
+          </p:spPr>
+          <p:style>
+            <a:lnRef idx="1">
+              <a:schemeClr val="accent1"/>
+            </a:lnRef>
+            <a:fillRef idx="0">
+              <a:schemeClr val="accent1"/>
+            </a:fillRef>
+            <a:effectRef idx="0">
+              <a:schemeClr val="accent1"/>
+            </a:effectRef>
+            <a:fontRef idx="minor">
+              <a:schemeClr val="tx1"/>
+            </a:fontRef>
+          </p:style>
+          <p:txBody>
+            <a:bodyPr rtlCol="0" anchor="ctr"/>
+            <a:lstStyle/>
+            <a:p>
+              <a:pPr algn="ctr"/>
+              <a:endParaRPr lang="fr-FR"/>
+            </a:p>
+          </p:txBody>
+        </p:sp>
+        <p:sp>
+          <p:nvSpPr>
+            <p:cNvPr id="122" name="Arc 121"/>
+            <p:cNvSpPr/>
+            <p:nvPr/>
+          </p:nvSpPr>
+          <p:spPr>
+            <a:xfrm rot="5400000">
+              <a:off x="8068985" y="1867167"/>
+              <a:ext cx="410616" cy="454003"/>
+            </a:xfrm>
+            <a:prstGeom prst="arc">
+              <a:avLst/>
+            </a:prstGeom>
+            <a:ln w="19050">
+              <a:solidFill>
+                <a:schemeClr val="accent6">
+                  <a:lumMod val="75000"/>
+                </a:schemeClr>
+              </a:solidFill>
+              <a:headEnd type="none"/>
+              <a:tailEnd type="triangle"/>
+            </a:ln>
+          </p:spPr>
+          <p:style>
+            <a:lnRef idx="1">
+              <a:schemeClr val="accent1"/>
+            </a:lnRef>
+            <a:fillRef idx="0">
+              <a:schemeClr val="accent1"/>
+            </a:fillRef>
+            <a:effectRef idx="0">
+              <a:schemeClr val="accent1"/>
+            </a:effectRef>
+            <a:fontRef idx="minor">
+              <a:schemeClr val="tx1"/>
+            </a:fontRef>
+          </p:style>
+          <p:txBody>
+            <a:bodyPr rtlCol="0" anchor="ctr"/>
+            <a:lstStyle/>
+            <a:p>
+              <a:pPr algn="ctr"/>
+              <a:endParaRPr lang="fr-FR"/>
+            </a:p>
+          </p:txBody>
+        </p:sp>
+      </p:grpSp>
+      <p:cxnSp>
+        <p:nvCxnSpPr>
+          <p:cNvPr id="124" name="Connecteur droit avec flèche 123"/>
+          <p:cNvCxnSpPr/>
+          <p:nvPr/>
+        </p:nvCxnSpPr>
+        <p:spPr>
+          <a:xfrm flipV="1">
+            <a:off x="2336728" y="3139484"/>
+            <a:ext cx="2016000" cy="10545"/>
+          </a:xfrm>
+          <a:prstGeom prst="straightConnector1">
+            <a:avLst/>
+          </a:prstGeom>
+          <a:ln w="19050">
+            <a:solidFill>
+              <a:schemeClr val="accent2">
+                <a:lumMod val="75000"/>
+              </a:schemeClr>
+            </a:solidFill>
+            <a:tailEnd type="triangle"/>
+          </a:ln>
+        </p:spPr>
+        <p:style>
+          <a:lnRef idx="1">
+            <a:schemeClr val="accent1"/>
+          </a:lnRef>
+          <a:fillRef idx="0">
+            <a:schemeClr val="accent1"/>
+          </a:fillRef>
+          <a:effectRef idx="0">
+            <a:schemeClr val="accent1"/>
+          </a:effectRef>
+          <a:fontRef idx="minor">
+            <a:schemeClr val="tx1"/>
+          </a:fontRef>
+        </p:style>
+      </p:cxnSp>
+      <p:cxnSp>
+        <p:nvCxnSpPr>
+          <p:cNvPr id="125" name="Connecteur droit avec flèche 124"/>
+          <p:cNvCxnSpPr/>
+          <p:nvPr/>
+        </p:nvCxnSpPr>
+        <p:spPr>
+          <a:xfrm flipH="1">
+            <a:off x="2325970" y="3385703"/>
+            <a:ext cx="2016000" cy="13390"/>
+          </a:xfrm>
+          <a:prstGeom prst="straightConnector1">
+            <a:avLst/>
+          </a:prstGeom>
+          <a:ln w="19050">
+            <a:solidFill>
+              <a:schemeClr val="accent2">
+                <a:lumMod val="75000"/>
+              </a:schemeClr>
+            </a:solidFill>
+            <a:tailEnd type="triangle"/>
+          </a:ln>
+        </p:spPr>
+        <p:style>
+          <a:lnRef idx="1">
+            <a:schemeClr val="accent1"/>
+          </a:lnRef>
+          <a:fillRef idx="0">
+            <a:schemeClr val="accent1"/>
+          </a:fillRef>
+          <a:effectRef idx="0">
+            <a:schemeClr val="accent1"/>
+          </a:effectRef>
+          <a:fontRef idx="minor">
+            <a:schemeClr val="tx1"/>
+          </a:fontRef>
+        </p:style>
+      </p:cxnSp>
+      <p:sp>
+        <p:nvSpPr>
+          <p:cNvPr id="128" name="ZoneTexte 127"/>
+          <p:cNvSpPr txBox="1"/>
+          <p:nvPr/>
+        </p:nvSpPr>
+        <p:spPr>
+          <a:xfrm>
+            <a:off x="2856506" y="2803422"/>
+            <a:ext cx="898131" cy="307777"/>
+          </a:xfrm>
+          <a:prstGeom prst="rect">
+            <a:avLst/>
+          </a:prstGeom>
+          <a:noFill/>
+        </p:spPr>
+        <p:txBody>
+          <a:bodyPr wrap="none" rtlCol="0" anchor="ctr" anchorCtr="1">
+            <a:spAutoFit/>
+          </a:bodyPr>
+          <a:lstStyle/>
+          <a:p>
+            <a:r>
+              <a:rPr lang="fr-FR" sz="1400" dirty="0"/>
+              <a:t>url.com</a:t>
+            </a:r>
+            <a:r>
+              <a:rPr lang="fr-FR" sz="1400" dirty="0" smtClean="0"/>
+              <a:t>/*</a:t>
+            </a:r>
+            <a:endParaRPr lang="fr-FR" sz="1400" dirty="0"/>
+          </a:p>
+        </p:txBody>
+      </p:sp>
+      <p:sp>
+        <p:nvSpPr>
+          <p:cNvPr id="130" name="ZoneTexte 129"/>
+          <p:cNvSpPr txBox="1"/>
+          <p:nvPr/>
+        </p:nvSpPr>
+        <p:spPr>
+          <a:xfrm>
+            <a:off x="2269094" y="3431731"/>
+            <a:ext cx="2113856" cy="307777"/>
+          </a:xfrm>
+          <a:prstGeom prst="rect">
+            <a:avLst/>
+          </a:prstGeom>
+          <a:noFill/>
+        </p:spPr>
+        <p:txBody>
+          <a:bodyPr wrap="square" rtlCol="0" anchor="ctr" anchorCtr="1">
+            <a:spAutoFit/>
+          </a:bodyPr>
+          <a:lstStyle/>
+          <a:p>
+            <a:r>
+              <a:rPr lang="fr-FR" sz="1400" dirty="0" smtClean="0"/>
+              <a:t>[Résultat standard]</a:t>
+            </a:r>
+            <a:endParaRPr lang="fr-FR" sz="1400" dirty="0"/>
+          </a:p>
+        </p:txBody>
+      </p:sp>
+      <p:cxnSp>
+        <p:nvCxnSpPr>
+          <p:cNvPr id="135" name="Connecteur droit avec flèche 134"/>
+          <p:cNvCxnSpPr/>
+          <p:nvPr/>
+        </p:nvCxnSpPr>
+        <p:spPr>
+          <a:xfrm flipV="1">
+            <a:off x="5617020" y="3131623"/>
+            <a:ext cx="1026107" cy="5014"/>
+          </a:xfrm>
+          <a:prstGeom prst="straightConnector1">
+            <a:avLst/>
+          </a:prstGeom>
+          <a:ln w="19050">
+            <a:solidFill>
+              <a:schemeClr val="accent2">
+                <a:lumMod val="75000"/>
+              </a:schemeClr>
+            </a:solidFill>
+            <a:tailEnd type="triangle"/>
+          </a:ln>
+        </p:spPr>
+        <p:style>
+          <a:lnRef idx="1">
+            <a:schemeClr val="accent1"/>
+          </a:lnRef>
+          <a:fillRef idx="0">
+            <a:schemeClr val="accent1"/>
+          </a:fillRef>
+          <a:effectRef idx="0">
+            <a:schemeClr val="accent1"/>
+          </a:effectRef>
+          <a:fontRef idx="minor">
+            <a:schemeClr val="tx1"/>
+          </a:fontRef>
+        </p:style>
+      </p:cxnSp>
+      <p:cxnSp>
+        <p:nvCxnSpPr>
+          <p:cNvPr id="138" name="Connecteur droit avec flèche 137"/>
+          <p:cNvCxnSpPr/>
+          <p:nvPr/>
+        </p:nvCxnSpPr>
+        <p:spPr>
+          <a:xfrm flipH="1">
+            <a:off x="5594031" y="3373780"/>
+            <a:ext cx="1030752" cy="1108"/>
+          </a:xfrm>
+          <a:prstGeom prst="straightConnector1">
+            <a:avLst/>
+          </a:prstGeom>
+          <a:ln w="19050">
+            <a:solidFill>
+              <a:schemeClr val="accent2">
+                <a:lumMod val="75000"/>
+              </a:schemeClr>
+            </a:solidFill>
+            <a:tailEnd type="triangle"/>
+          </a:ln>
+        </p:spPr>
+        <p:style>
+          <a:lnRef idx="1">
+            <a:schemeClr val="accent1"/>
+          </a:lnRef>
+          <a:fillRef idx="0">
+            <a:schemeClr val="accent1"/>
+          </a:fillRef>
+          <a:effectRef idx="0">
+            <a:schemeClr val="accent1"/>
+          </a:effectRef>
+          <a:fontRef idx="minor">
+            <a:schemeClr val="tx1"/>
+          </a:fontRef>
+        </p:style>
+      </p:cxnSp>
+      <p:cxnSp>
+        <p:nvCxnSpPr>
+          <p:cNvPr id="139" name="Connecteur droit avec flèche 138"/>
+          <p:cNvCxnSpPr/>
+          <p:nvPr/>
+        </p:nvCxnSpPr>
+        <p:spPr>
+          <a:xfrm flipV="1">
+            <a:off x="2354409" y="4700084"/>
+            <a:ext cx="2016000" cy="10545"/>
+          </a:xfrm>
+          <a:prstGeom prst="straightConnector1">
+            <a:avLst/>
+          </a:prstGeom>
+          <a:ln w="19050">
+            <a:solidFill>
+              <a:srgbClr val="894590"/>
+            </a:solidFill>
+            <a:tailEnd type="triangle"/>
+          </a:ln>
+        </p:spPr>
+        <p:style>
+          <a:lnRef idx="1">
+            <a:schemeClr val="accent1"/>
+          </a:lnRef>
+          <a:fillRef idx="0">
+            <a:schemeClr val="accent1"/>
+          </a:fillRef>
+          <a:effectRef idx="0">
+            <a:schemeClr val="accent1"/>
+          </a:effectRef>
+          <a:fontRef idx="minor">
+            <a:schemeClr val="tx1"/>
+          </a:fontRef>
+        </p:style>
+      </p:cxnSp>
+      <p:cxnSp>
+        <p:nvCxnSpPr>
+          <p:cNvPr id="140" name="Connecteur droit avec flèche 139"/>
+          <p:cNvCxnSpPr/>
+          <p:nvPr/>
+        </p:nvCxnSpPr>
+        <p:spPr>
+          <a:xfrm flipH="1">
+            <a:off x="2343651" y="4946303"/>
+            <a:ext cx="2016000" cy="13390"/>
+          </a:xfrm>
+          <a:prstGeom prst="straightConnector1">
+            <a:avLst/>
+          </a:prstGeom>
+          <a:ln w="19050">
+            <a:solidFill>
+              <a:srgbClr val="894590"/>
+            </a:solidFill>
+            <a:tailEnd type="triangle"/>
+          </a:ln>
+        </p:spPr>
+        <p:style>
+          <a:lnRef idx="1">
+            <a:schemeClr val="accent1"/>
+          </a:lnRef>
+          <a:fillRef idx="0">
+            <a:schemeClr val="accent1"/>
+          </a:fillRef>
+          <a:effectRef idx="0">
+            <a:schemeClr val="accent1"/>
+          </a:effectRef>
+          <a:fontRef idx="minor">
+            <a:schemeClr val="tx1"/>
+          </a:fontRef>
+        </p:style>
+      </p:cxnSp>
+      <p:sp>
+        <p:nvSpPr>
+          <p:cNvPr id="141" name="ZoneTexte 140"/>
+          <p:cNvSpPr txBox="1"/>
+          <p:nvPr/>
+        </p:nvSpPr>
+        <p:spPr>
+          <a:xfrm>
+            <a:off x="2281774" y="4364022"/>
+            <a:ext cx="2077877" cy="307777"/>
+          </a:xfrm>
+          <a:prstGeom prst="rect">
+            <a:avLst/>
+          </a:prstGeom>
+          <a:noFill/>
+        </p:spPr>
+        <p:txBody>
+          <a:bodyPr wrap="none" rtlCol="0" anchor="ctr" anchorCtr="1">
+            <a:spAutoFit/>
+          </a:bodyPr>
+          <a:lstStyle/>
+          <a:p>
+            <a:r>
+              <a:rPr lang="fr-FR" sz="1400" dirty="0" smtClean="0"/>
+              <a:t>url.com/</a:t>
+            </a:r>
+            <a:r>
+              <a:rPr lang="fr-FR" sz="1400" dirty="0" err="1" smtClean="0"/>
+              <a:t>auth?u</a:t>
+            </a:r>
+            <a:r>
+              <a:rPr lang="fr-FR" sz="1400" dirty="0" smtClean="0"/>
+              <a:t>=</a:t>
+            </a:r>
+            <a:r>
+              <a:rPr lang="fr-FR" sz="1400" dirty="0" err="1" smtClean="0"/>
+              <a:t>XX&amp;p</a:t>
+            </a:r>
+            <a:r>
+              <a:rPr lang="fr-FR" sz="1400" dirty="0" smtClean="0"/>
+              <a:t>=YY</a:t>
+            </a:r>
+            <a:endParaRPr lang="fr-FR" sz="1400" dirty="0"/>
+          </a:p>
+        </p:txBody>
+      </p:sp>
+      <p:sp>
+        <p:nvSpPr>
+          <p:cNvPr id="142" name="ZoneTexte 141"/>
+          <p:cNvSpPr txBox="1"/>
+          <p:nvPr/>
+        </p:nvSpPr>
+        <p:spPr>
+          <a:xfrm>
+            <a:off x="2286775" y="4992331"/>
+            <a:ext cx="2113856" cy="307777"/>
+          </a:xfrm>
+          <a:prstGeom prst="rect">
+            <a:avLst/>
+          </a:prstGeom>
+          <a:noFill/>
+        </p:spPr>
+        <p:txBody>
+          <a:bodyPr wrap="square" rtlCol="0" anchor="ctr" anchorCtr="1">
+            <a:spAutoFit/>
+          </a:bodyPr>
+          <a:lstStyle/>
+          <a:p>
+            <a:r>
+              <a:rPr lang="fr-FR" sz="1400" dirty="0" smtClean="0"/>
+              <a:t>{"</a:t>
+            </a:r>
+            <a:r>
+              <a:rPr lang="fr-FR" sz="1400" dirty="0" err="1" smtClean="0"/>
+              <a:t>isValid</a:t>
+            </a:r>
+            <a:r>
+              <a:rPr lang="fr-FR" sz="1400" dirty="0" smtClean="0"/>
+              <a:t>": </a:t>
+            </a:r>
+            <a:r>
+              <a:rPr lang="fr-FR" sz="1400" dirty="0" err="1" smtClean="0"/>
+              <a:t>true</a:t>
+            </a:r>
+            <a:r>
+              <a:rPr lang="fr-FR" sz="1400" dirty="0" smtClean="0"/>
+              <a:t>}</a:t>
+            </a:r>
+            <a:endParaRPr lang="fr-FR" sz="1400" dirty="0"/>
+          </a:p>
+        </p:txBody>
+      </p:sp>
+      <p:cxnSp>
+        <p:nvCxnSpPr>
+          <p:cNvPr id="143" name="Connecteur droit avec flèche 142"/>
+          <p:cNvCxnSpPr/>
+          <p:nvPr/>
+        </p:nvCxnSpPr>
+        <p:spPr>
+          <a:xfrm>
+            <a:off x="5625569" y="4709131"/>
+            <a:ext cx="2242636" cy="5059"/>
+          </a:xfrm>
+          <a:prstGeom prst="straightConnector1">
+            <a:avLst/>
+          </a:prstGeom>
+          <a:ln w="19050">
+            <a:solidFill>
+              <a:srgbClr val="894590"/>
+            </a:solidFill>
+            <a:tailEnd type="triangle"/>
+          </a:ln>
+        </p:spPr>
+        <p:style>
+          <a:lnRef idx="1">
+            <a:schemeClr val="accent1"/>
+          </a:lnRef>
+          <a:fillRef idx="0">
+            <a:schemeClr val="accent1"/>
+          </a:fillRef>
+          <a:effectRef idx="0">
+            <a:schemeClr val="accent1"/>
+          </a:effectRef>
+          <a:fontRef idx="minor">
+            <a:schemeClr val="tx1"/>
+          </a:fontRef>
+        </p:style>
+      </p:cxnSp>
+      <p:cxnSp>
+        <p:nvCxnSpPr>
+          <p:cNvPr id="144" name="Connecteur droit avec flèche 143"/>
+          <p:cNvCxnSpPr/>
+          <p:nvPr/>
+        </p:nvCxnSpPr>
+        <p:spPr>
+          <a:xfrm flipH="1">
+            <a:off x="5604053" y="4944386"/>
+            <a:ext cx="2232614" cy="1419"/>
+          </a:xfrm>
+          <a:prstGeom prst="straightConnector1">
+            <a:avLst/>
+          </a:prstGeom>
+          <a:ln w="19050">
+            <a:solidFill>
+              <a:srgbClr val="894590"/>
+            </a:solidFill>
+            <a:tailEnd type="triangle"/>
+          </a:ln>
+        </p:spPr>
+        <p:style>
+          <a:lnRef idx="1">
+            <a:schemeClr val="accent1"/>
+          </a:lnRef>
+          <a:fillRef idx="0">
+            <a:schemeClr val="accent1"/>
+          </a:fillRef>
+          <a:effectRef idx="0">
+            <a:schemeClr val="accent1"/>
+          </a:effectRef>
+          <a:fontRef idx="minor">
+            <a:schemeClr val="tx1"/>
+          </a:fontRef>
+        </p:style>
+      </p:cxnSp>
+      <p:sp>
+        <p:nvSpPr>
+          <p:cNvPr id="145" name="Rectangle à coins arrondis 144"/>
+          <p:cNvSpPr/>
+          <p:nvPr/>
+        </p:nvSpPr>
+        <p:spPr>
+          <a:xfrm>
+            <a:off x="10604552" y="4383476"/>
+            <a:ext cx="1072654" cy="579780"/>
+          </a:xfrm>
+          <a:prstGeom prst="roundRect">
+            <a:avLst/>
+          </a:prstGeom>
+        </p:spPr>
+        <p:style>
+          <a:lnRef idx="2">
+            <a:schemeClr val="accent1">
+              <a:shade val="50000"/>
+            </a:schemeClr>
+          </a:lnRef>
+          <a:fillRef idx="1">
+            <a:schemeClr val="accent1"/>
+          </a:fillRef>
+          <a:effectRef idx="0">
+            <a:schemeClr val="accent1"/>
+          </a:effectRef>
+          <a:fontRef idx="minor">
+            <a:schemeClr val="lt1"/>
+          </a:fontRef>
+        </p:style>
+        <p:txBody>
+          <a:bodyPr vert="horz" rtlCol="0" anchor="ctr" anchorCtr="1"/>
+          <a:lstStyle/>
+          <a:p>
+            <a:pPr algn="ctr"/>
+            <a:r>
+              <a:rPr lang="fr-FR" dirty="0" smtClean="0"/>
+              <a:t>API</a:t>
+            </a:r>
+            <a:endParaRPr lang="fr-FR" dirty="0"/>
+          </a:p>
+        </p:txBody>
+      </p:sp>
+      <p:cxnSp>
+        <p:nvCxnSpPr>
+          <p:cNvPr id="146" name="Connecteur droit avec flèche 145"/>
+          <p:cNvCxnSpPr/>
+          <p:nvPr/>
+        </p:nvCxnSpPr>
+        <p:spPr>
+          <a:xfrm>
+            <a:off x="9477858" y="4547413"/>
+            <a:ext cx="1122446" cy="997"/>
+          </a:xfrm>
+          <a:prstGeom prst="straightConnector1">
+            <a:avLst/>
+          </a:prstGeom>
+          <a:ln w="19050">
+            <a:solidFill>
+              <a:srgbClr val="894590"/>
+            </a:solidFill>
+            <a:tailEnd type="triangle"/>
+          </a:ln>
+        </p:spPr>
+        <p:style>
+          <a:lnRef idx="1">
+            <a:schemeClr val="accent1"/>
+          </a:lnRef>
+          <a:fillRef idx="0">
+            <a:schemeClr val="accent1"/>
+          </a:fillRef>
+          <a:effectRef idx="0">
+            <a:schemeClr val="accent1"/>
+          </a:effectRef>
+          <a:fontRef idx="minor">
+            <a:schemeClr val="tx1"/>
+          </a:fontRef>
+        </p:style>
+      </p:cxnSp>
+      <p:cxnSp>
+        <p:nvCxnSpPr>
+          <p:cNvPr id="147" name="Connecteur droit avec flèche 146"/>
+          <p:cNvCxnSpPr/>
+          <p:nvPr/>
+        </p:nvCxnSpPr>
+        <p:spPr>
+          <a:xfrm flipH="1" flipV="1">
+            <a:off x="9475974" y="4811190"/>
+            <a:ext cx="1122446" cy="997"/>
+          </a:xfrm>
+          <a:prstGeom prst="straightConnector1">
+            <a:avLst/>
+          </a:prstGeom>
+          <a:ln w="19050">
+            <a:solidFill>
+              <a:srgbClr val="894590"/>
+            </a:solidFill>
+            <a:tailEnd type="triangle"/>
+          </a:ln>
+        </p:spPr>
+        <p:style>
+          <a:lnRef idx="1">
+            <a:schemeClr val="accent1"/>
+          </a:lnRef>
+          <a:fillRef idx="0">
+            <a:schemeClr val="accent1"/>
+          </a:fillRef>
+          <a:effectRef idx="0">
+            <a:schemeClr val="accent1"/>
+          </a:effectRef>
+          <a:fontRef idx="minor">
+            <a:schemeClr val="tx1"/>
+          </a:fontRef>
+        </p:style>
+      </p:cxnSp>
+      <p:sp>
+        <p:nvSpPr>
+          <p:cNvPr id="148" name="ZoneTexte 147"/>
+          <p:cNvSpPr txBox="1"/>
+          <p:nvPr/>
+        </p:nvSpPr>
+        <p:spPr>
+          <a:xfrm>
+            <a:off x="5691377" y="2836979"/>
+            <a:ext cx="927754" cy="307777"/>
+          </a:xfrm>
+          <a:prstGeom prst="rect">
+            <a:avLst/>
+          </a:prstGeom>
+          <a:noFill/>
+        </p:spPr>
+        <p:txBody>
+          <a:bodyPr wrap="none" rtlCol="0">
+            <a:spAutoFit/>
+          </a:bodyPr>
+          <a:lstStyle/>
+          <a:p>
+            <a:r>
+              <a:rPr lang="fr-FR" sz="1400" dirty="0" smtClean="0"/>
+              <a:t>Passe-plat</a:t>
+            </a:r>
+            <a:endParaRPr lang="fr-FR" sz="1400" dirty="0"/>
+          </a:p>
+        </p:txBody>
+      </p:sp>
+      <p:sp>
+        <p:nvSpPr>
+          <p:cNvPr id="149" name="ZoneTexte 148"/>
+          <p:cNvSpPr txBox="1"/>
+          <p:nvPr/>
+        </p:nvSpPr>
+        <p:spPr>
+          <a:xfrm>
+            <a:off x="9524096" y="4230927"/>
+            <a:ext cx="1071960" cy="307777"/>
+          </a:xfrm>
+          <a:prstGeom prst="rect">
+            <a:avLst/>
+          </a:prstGeom>
+          <a:noFill/>
+        </p:spPr>
+        <p:txBody>
+          <a:bodyPr wrap="none" rtlCol="0">
+            <a:spAutoFit/>
+          </a:bodyPr>
+          <a:lstStyle/>
+          <a:p>
+            <a:r>
+              <a:rPr lang="fr-FR" sz="1400" dirty="0" smtClean="0"/>
+              <a:t>Appel direct</a:t>
+            </a:r>
+            <a:endParaRPr lang="fr-FR" sz="1400" dirty="0"/>
+          </a:p>
+        </p:txBody>
+      </p:sp>
+      <p:sp>
+        <p:nvSpPr>
+          <p:cNvPr id="150" name="ZoneTexte 149"/>
+          <p:cNvSpPr txBox="1"/>
+          <p:nvPr/>
+        </p:nvSpPr>
+        <p:spPr>
+          <a:xfrm>
+            <a:off x="6082097" y="4979746"/>
+            <a:ext cx="1225144" cy="523220"/>
+          </a:xfrm>
+          <a:prstGeom prst="rect">
+            <a:avLst/>
+          </a:prstGeom>
+          <a:noFill/>
+        </p:spPr>
+        <p:txBody>
+          <a:bodyPr wrap="none" rtlCol="0">
+            <a:spAutoFit/>
+          </a:bodyPr>
+          <a:lstStyle/>
+          <a:p>
+            <a:pPr algn="ctr"/>
+            <a:r>
+              <a:rPr lang="fr-FR" sz="1400" dirty="0" smtClean="0"/>
+              <a:t>Formatage</a:t>
+            </a:r>
+          </a:p>
+          <a:p>
+            <a:pPr algn="ctr"/>
+            <a:r>
+              <a:rPr lang="fr-FR" sz="1400" dirty="0" smtClean="0"/>
+              <a:t>Mise en cache</a:t>
+            </a:r>
+            <a:endParaRPr lang="fr-FR" sz="1400" dirty="0"/>
+          </a:p>
+        </p:txBody>
+      </p:sp>
+      <p:sp>
+        <p:nvSpPr>
+          <p:cNvPr id="38" name="ZoneTexte 37"/>
+          <p:cNvSpPr txBox="1"/>
+          <p:nvPr/>
+        </p:nvSpPr>
+        <p:spPr>
+          <a:xfrm>
+            <a:off x="9487469" y="4802481"/>
+            <a:ext cx="1092607" cy="523220"/>
+          </a:xfrm>
+          <a:prstGeom prst="rect">
+            <a:avLst/>
+          </a:prstGeom>
+          <a:noFill/>
+        </p:spPr>
+        <p:txBody>
+          <a:bodyPr wrap="none" rtlCol="0">
+            <a:spAutoFit/>
+          </a:bodyPr>
+          <a:lstStyle/>
+          <a:p>
+            <a:pPr algn="ctr"/>
+            <a:r>
+              <a:rPr lang="fr-FR" sz="1400" dirty="0" smtClean="0"/>
+              <a:t>Résultat</a:t>
+            </a:r>
+          </a:p>
+          <a:p>
+            <a:pPr algn="ctr"/>
+            <a:r>
+              <a:rPr lang="fr-FR" sz="1400" dirty="0" smtClean="0"/>
+              <a:t>non formaté</a:t>
+            </a:r>
+            <a:endParaRPr lang="fr-FR" sz="1400" dirty="0"/>
+          </a:p>
+        </p:txBody>
+      </p:sp>
+    </p:spTree>
+    <p:extLst>
+      <p:ext uri="{BB962C8B-B14F-4D97-AF65-F5344CB8AC3E}">
+        <p14:creationId xmlns:p14="http://schemas.microsoft.com/office/powerpoint/2010/main" val="849490862"/>
+      </p:ext>
+    </p:extLst>
+  </p:cSld>
+  <p:clrMapOvr>
+    <a:masterClrMapping/>
+  </p:clrMapOvr>
+  <p:timing>
+    <p:tnLst>
+      <p:par>
+        <p:cTn id="1" dur="indefinite" restart="never" nodeType="tmRoot"/>
+      </p:par>
+    </p:tnLst>
+  </p:timing>
+</p:sld>
+</file>
+
+<file path=ppt/slides/slide12.xml><?xml version="1.0" encoding="utf-8"?>
+<p:sld xmlns:a="http://schemas.openxmlformats.org/drawingml/2006/main" xmlns:r="http://schemas.openxmlformats.org/officeDocument/2006/relationships" xmlns:p="http://schemas.openxmlformats.org/presentationml/2006/main">
+  <p:cSld>
+    <p:spTree>
+      <p:nvGrpSpPr>
+        <p:cNvPr id="1" name=""/>
+        <p:cNvGrpSpPr/>
+        <p:nvPr/>
+      </p:nvGrpSpPr>
+      <p:grpSpPr>
+        <a:xfrm>
+          <a:off x="0" y="0"/>
+          <a:ext cx="0" cy="0"/>
+          <a:chOff x="0" y="0"/>
+          <a:chExt cx="0" cy="0"/>
+        </a:xfrm>
+      </p:grpSpPr>
+      <p:pic>
+        <p:nvPicPr>
+          <p:cNvPr id="5" name="Image 4">
+            <a:extLst>
+              <a:ext uri="{FF2B5EF4-FFF2-40B4-BE49-F238E27FC236}">
+                <a16:creationId xmlns:a16="http://schemas.microsoft.com/office/drawing/2014/main" id="{D91F6CE4-A0FB-4282-9B85-47FA5527C736}"/>
+              </a:ext>
+            </a:extLst>
+          </p:cNvPr>
+          <p:cNvPicPr>
+            <a:picLocks noChangeAspect="1"/>
+          </p:cNvPicPr>
+          <p:nvPr/>
+        </p:nvPicPr>
+        <p:blipFill>
+          <a:blip r:embed="rId3" cstate="print">
+            <a:extLst>
+              <a:ext uri="{28A0092B-C50C-407E-A947-70E740481C1C}">
+                <a14:useLocalDpi xmlns:a14="http://schemas.microsoft.com/office/drawing/2010/main" val="0"/>
+              </a:ext>
+            </a:extLst>
+          </a:blip>
+          <a:stretch>
+            <a:fillRect/>
+          </a:stretch>
+        </p:blipFill>
+        <p:spPr>
+          <a:xfrm>
+            <a:off x="293615" y="6291743"/>
+            <a:ext cx="10508871" cy="272654"/>
+          </a:xfrm>
+          <a:prstGeom prst="rect">
+            <a:avLst/>
+          </a:prstGeom>
+        </p:spPr>
+      </p:pic>
+      <p:pic>
+        <p:nvPicPr>
+          <p:cNvPr id="6" name="Image 5">
+            <a:extLst>
+              <a:ext uri="{FF2B5EF4-FFF2-40B4-BE49-F238E27FC236}">
+                <a16:creationId xmlns:a16="http://schemas.microsoft.com/office/drawing/2014/main" id="{B6F51BA5-E830-46D2-B1E2-3A2C10F760E7}"/>
+              </a:ext>
+            </a:extLst>
+          </p:cNvPr>
+          <p:cNvPicPr>
+            <a:picLocks noChangeAspect="1"/>
+          </p:cNvPicPr>
+          <p:nvPr/>
+        </p:nvPicPr>
+        <p:blipFill>
+          <a:blip r:embed="rId4" cstate="print">
+            <a:extLst>
+              <a:ext uri="{28A0092B-C50C-407E-A947-70E740481C1C}">
+                <a14:useLocalDpi xmlns:a14="http://schemas.microsoft.com/office/drawing/2010/main" val="0"/>
+              </a:ext>
+            </a:extLst>
+          </a:blip>
+          <a:stretch>
+            <a:fillRect/>
+          </a:stretch>
+        </p:blipFill>
+        <p:spPr>
+          <a:xfrm>
+            <a:off x="10802486" y="5912350"/>
+            <a:ext cx="1193772" cy="787940"/>
+          </a:xfrm>
+          <a:prstGeom prst="rect">
+            <a:avLst/>
+          </a:prstGeom>
+        </p:spPr>
+      </p:pic>
+      <p:sp>
+        <p:nvSpPr>
+          <p:cNvPr id="2" name="ZoneTexte 1"/>
+          <p:cNvSpPr txBox="1"/>
+          <p:nvPr/>
+        </p:nvSpPr>
+        <p:spPr>
+          <a:xfrm>
+            <a:off x="4772722" y="666974"/>
+            <a:ext cx="2646558" cy="369332"/>
+          </a:xfrm>
+          <a:prstGeom prst="rect">
+            <a:avLst/>
+          </a:prstGeom>
+          <a:noFill/>
+        </p:spPr>
+        <p:txBody>
+          <a:bodyPr wrap="none" rtlCol="0">
+            <a:spAutoFit/>
+          </a:bodyPr>
+          <a:lstStyle/>
+          <a:p>
+            <a:pPr algn="ctr"/>
+            <a:r>
+              <a:rPr lang="fr-FR" dirty="0" smtClean="0"/>
+              <a:t>Contenu du </a:t>
+            </a:r>
+            <a:r>
+              <a:rPr lang="fr-FR" dirty="0" err="1" smtClean="0"/>
+              <a:t>web.config</a:t>
+            </a:r>
+            <a:r>
+              <a:rPr lang="fr-FR" dirty="0" smtClean="0"/>
+              <a:t> #1</a:t>
+            </a:r>
+            <a:endParaRPr lang="fr-FR" dirty="0"/>
+          </a:p>
+        </p:txBody>
+      </p:sp>
+      <p:pic>
+        <p:nvPicPr>
+          <p:cNvPr id="7" name="Image 6"/>
+          <p:cNvPicPr>
+            <a:picLocks noChangeAspect="1"/>
+          </p:cNvPicPr>
+          <p:nvPr/>
+        </p:nvPicPr>
+        <p:blipFill>
+          <a:blip r:embed="rId5"/>
+          <a:stretch>
+            <a:fillRect/>
+          </a:stretch>
+        </p:blipFill>
+        <p:spPr>
+          <a:xfrm>
+            <a:off x="2241107" y="1469489"/>
+            <a:ext cx="7709785" cy="3707144"/>
+          </a:xfrm>
+          <a:prstGeom prst="rect">
+            <a:avLst/>
+          </a:prstGeom>
+        </p:spPr>
+      </p:pic>
+    </p:spTree>
+    <p:extLst>
+      <p:ext uri="{BB962C8B-B14F-4D97-AF65-F5344CB8AC3E}">
+        <p14:creationId xmlns:p14="http://schemas.microsoft.com/office/powerpoint/2010/main" val="2577260793"/>
       </p:ext>
     </p:extLst>
   </p:cSld>
@@ -7368,6 +9459,199 @@
           </a:p>
         </p:txBody>
       </p:sp>
+      <p:sp>
+        <p:nvSpPr>
+          <p:cNvPr id="8" name="Rectangle 7"/>
+          <p:cNvSpPr/>
+          <p:nvPr/>
+        </p:nvSpPr>
+        <p:spPr>
+          <a:xfrm>
+            <a:off x="1036317" y="3743235"/>
+            <a:ext cx="9527691" cy="2031325"/>
+          </a:xfrm>
+          <a:prstGeom prst="rect">
+            <a:avLst/>
+          </a:prstGeom>
+        </p:spPr>
+        <p:txBody>
+          <a:bodyPr wrap="square">
+            <a:spAutoFit/>
+          </a:bodyPr>
+          <a:lstStyle/>
+          <a:p>
+            <a:pPr marL="285750" indent="-285750">
+              <a:buFont typeface="Courier New" panose="02070309020205020404" pitchFamily="49" charset="0"/>
+              <a:buChar char="o"/>
+            </a:pPr>
+            <a:r>
+              <a:rPr lang="fr-FR" dirty="0" smtClean="0">
+                <a:sym typeface="Wingdings" panose="05000000000000000000" pitchFamily="2" charset="2"/>
+              </a:rPr>
+              <a:t>Solution :</a:t>
+            </a:r>
+            <a:endParaRPr lang="fr-FR" dirty="0" smtClean="0">
+              <a:sym typeface="Wingdings" panose="05000000000000000000" pitchFamily="2" charset="2"/>
+            </a:endParaRPr>
+          </a:p>
+          <a:p>
+            <a:pPr marL="742950" lvl="1" indent="-285750">
+              <a:buFont typeface="Arial" panose="020B0604020202020204" pitchFamily="34" charset="0"/>
+              <a:buChar char="•"/>
+            </a:pPr>
+            <a:r>
+              <a:rPr lang="fr-FR" dirty="0" smtClean="0">
+                <a:sym typeface="Wingdings" panose="05000000000000000000" pitchFamily="2" charset="2"/>
+              </a:rPr>
+              <a:t>Remplacement du serveur en Scala par un serveur </a:t>
+            </a:r>
+            <a:r>
+              <a:rPr lang="fr-FR" dirty="0" err="1" smtClean="0">
+                <a:sym typeface="Wingdings" panose="05000000000000000000" pitchFamily="2" charset="2"/>
+              </a:rPr>
+              <a:t>SignalR</a:t>
+            </a:r>
+            <a:r>
+              <a:rPr lang="fr-FR" dirty="0" smtClean="0">
+                <a:sym typeface="Wingdings" panose="05000000000000000000" pitchFamily="2" charset="2"/>
+              </a:rPr>
+              <a:t> en .Net </a:t>
+            </a:r>
+            <a:r>
+              <a:rPr lang="fr-FR" dirty="0" err="1" smtClean="0">
+                <a:sym typeface="Wingdings" panose="05000000000000000000" pitchFamily="2" charset="2"/>
+              </a:rPr>
+              <a:t>Core</a:t>
+            </a:r>
+            <a:endParaRPr lang="fr-FR" dirty="0" smtClean="0">
+              <a:sym typeface="Wingdings" panose="05000000000000000000" pitchFamily="2" charset="2"/>
+            </a:endParaRPr>
+          </a:p>
+          <a:p>
+            <a:pPr marL="1200150" lvl="2" indent="-285750">
+              <a:buFont typeface="Arial" panose="020B0604020202020204" pitchFamily="34" charset="0"/>
+              <a:buChar char="•"/>
+            </a:pPr>
+            <a:r>
+              <a:rPr lang="fr-FR" dirty="0" smtClean="0">
+                <a:sym typeface="Wingdings" panose="05000000000000000000" pitchFamily="2" charset="2"/>
+              </a:rPr>
+              <a:t>Possibilités d’</a:t>
+            </a:r>
+            <a:r>
+              <a:rPr lang="fr-FR" dirty="0" err="1" smtClean="0">
+                <a:sym typeface="Wingdings" panose="05000000000000000000" pitchFamily="2" charset="2"/>
+              </a:rPr>
+              <a:t>upscaling</a:t>
+            </a:r>
+            <a:r>
+              <a:rPr lang="fr-FR" dirty="0" smtClean="0">
+                <a:sym typeface="Wingdings" panose="05000000000000000000" pitchFamily="2" charset="2"/>
+              </a:rPr>
+              <a:t> très simple</a:t>
+            </a:r>
+          </a:p>
+          <a:p>
+            <a:pPr marL="1200150" lvl="2" indent="-285750">
+              <a:buFont typeface="Arial" panose="020B0604020202020204" pitchFamily="34" charset="0"/>
+              <a:buChar char="•"/>
+            </a:pPr>
+            <a:r>
+              <a:rPr lang="fr-FR" dirty="0" smtClean="0">
+                <a:sym typeface="Wingdings" panose="05000000000000000000" pitchFamily="2" charset="2"/>
+              </a:rPr>
+              <a:t>Maintenance simplifiée</a:t>
+            </a:r>
+          </a:p>
+          <a:p>
+            <a:pPr marL="742950" lvl="1" indent="-285750">
+              <a:buFont typeface="Arial" panose="020B0604020202020204" pitchFamily="34" charset="0"/>
+              <a:buChar char="•"/>
+            </a:pPr>
+            <a:r>
+              <a:rPr lang="fr-FR" dirty="0" smtClean="0">
+                <a:sym typeface="Wingdings" panose="05000000000000000000" pitchFamily="2" charset="2"/>
+              </a:rPr>
+              <a:t>Utilisation d’un serveur IIS déjà existant</a:t>
+            </a:r>
+          </a:p>
+          <a:p>
+            <a:pPr marL="1200150" lvl="2" indent="-285750">
+              <a:buFont typeface="Arial" panose="020B0604020202020204" pitchFamily="34" charset="0"/>
+              <a:buChar char="•"/>
+            </a:pPr>
+            <a:r>
+              <a:rPr lang="fr-FR" dirty="0" smtClean="0">
+                <a:sym typeface="Wingdings" panose="05000000000000000000" pitchFamily="2" charset="2"/>
+              </a:rPr>
+              <a:t>Réécriture d’url aisé avec l’</a:t>
+            </a:r>
+            <a:r>
+              <a:rPr lang="fr-FR" dirty="0" err="1" smtClean="0">
+                <a:sym typeface="Wingdings" panose="05000000000000000000" pitchFamily="2" charset="2"/>
+              </a:rPr>
+              <a:t>add</a:t>
+            </a:r>
+            <a:r>
+              <a:rPr lang="fr-FR" dirty="0" err="1">
+                <a:sym typeface="Wingdings" panose="05000000000000000000" pitchFamily="2" charset="2"/>
+              </a:rPr>
+              <a:t>-</a:t>
+            </a:r>
+            <a:r>
+              <a:rPr lang="fr-FR" dirty="0" err="1" smtClean="0">
+                <a:sym typeface="Wingdings" panose="05000000000000000000" pitchFamily="2" charset="2"/>
+              </a:rPr>
+              <a:t>on</a:t>
+            </a:r>
+            <a:r>
+              <a:rPr lang="fr-FR" dirty="0" smtClean="0">
+                <a:sym typeface="Wingdings" panose="05000000000000000000" pitchFamily="2" charset="2"/>
+              </a:rPr>
+              <a:t> URL Rewriting</a:t>
+            </a:r>
+          </a:p>
+          <a:p>
+            <a:pPr marL="1200150" lvl="2" indent="-285750">
+              <a:buFont typeface="Arial" panose="020B0604020202020204" pitchFamily="34" charset="0"/>
+              <a:buChar char="•"/>
+            </a:pPr>
+            <a:r>
+              <a:rPr lang="fr-FR" dirty="0" smtClean="0">
+                <a:sym typeface="Wingdings" panose="05000000000000000000" pitchFamily="2" charset="2"/>
+              </a:rPr>
+              <a:t>Facilité d’implémentation de l’API </a:t>
+            </a:r>
+            <a:r>
+              <a:rPr lang="fr-FR" dirty="0" err="1" smtClean="0">
+                <a:sym typeface="Wingdings" panose="05000000000000000000" pitchFamily="2" charset="2"/>
+              </a:rPr>
+              <a:t>shadowing</a:t>
+            </a:r>
+            <a:r>
+              <a:rPr lang="fr-FR" dirty="0" smtClean="0">
+                <a:sym typeface="Wingdings" panose="05000000000000000000" pitchFamily="2" charset="2"/>
+              </a:rPr>
+              <a:t> via le </a:t>
+            </a:r>
+            <a:r>
+              <a:rPr lang="fr-FR" dirty="0" err="1" smtClean="0">
+                <a:sym typeface="Wingdings" panose="05000000000000000000" pitchFamily="2" charset="2"/>
+              </a:rPr>
+              <a:t>web.config</a:t>
+            </a:r>
+            <a:r>
+              <a:rPr lang="fr-FR" dirty="0" smtClean="0">
+                <a:sym typeface="Wingdings" panose="05000000000000000000" pitchFamily="2" charset="2"/>
+              </a:rPr>
+              <a:t> du site</a:t>
+            </a:r>
+            <a:endParaRPr lang="fr-FR" dirty="0">
+              <a:sym typeface="Wingdings" panose="05000000000000000000" pitchFamily="2" charset="2"/>
+            </a:endParaRPr>
+          </a:p>
+        </p:txBody>
+      </p:sp>
     </p:spTree>
     <p:extLst>
       <p:ext uri="{BB962C8B-B14F-4D97-AF65-F5344CB8AC3E}">
@@ -8068,6 +10352,10 @@
               <a:rPr lang="fr-FR" dirty="0" err="1" smtClean="0"/>
               <a:t>POCs</a:t>
             </a:r>
+            <a:r>
+              <a:rPr lang="fr-FR" dirty="0" smtClean="0"/>
+              <a:t> à blanc</a:t>
+            </a:r>
             <a:endParaRPr lang="fr-FR" dirty="0"/>
           </a:p>
         </p:txBody>
@@ -8175,7 +10463,7 @@
         </p:nvSpPr>
         <p:spPr>
           <a:xfrm>
-            <a:off x="6737993" y="1301780"/>
+            <a:off x="7870153" y="1299785"/>
             <a:ext cx="1589361" cy="4277086"/>
           </a:xfrm>
           <a:prstGeom prst="roundRect">
@@ -8203,8 +10491,12 @@
           <a:lstStyle/>
           <a:p>
             <a:pPr algn="ctr"/>
-            <a:r>
-              <a:rPr lang="fr-FR" dirty="0" err="1"/>
+            <a:endParaRPr lang="fr-FR" dirty="0" smtClean="0"/>
+          </a:p>
+          <a:p>
+            <a:pPr algn="ctr"/>
+            <a:r>
+              <a:rPr lang="fr-FR" dirty="0" err="1" smtClean="0"/>
               <a:t>SignalR</a:t>
             </a:r>
             <a:endParaRPr lang="fr-FR" dirty="0"/>
@@ -8256,9 +10548,9 @@
           <p:nvPr/>
         </p:nvCxnSpPr>
         <p:spPr>
-          <a:xfrm>
-            <a:off x="5615547" y="1577801"/>
-            <a:ext cx="1122446" cy="997"/>
+          <a:xfrm flipV="1">
+            <a:off x="5615547" y="1572940"/>
+            <a:ext cx="2304220" cy="4861"/>
           </a:xfrm>
           <a:prstGeom prst="straightConnector1">
             <a:avLst/>
@@ -8295,8 +10587,8 @@
         </p:nvSpPr>
         <p:spPr>
           <a:xfrm>
-            <a:off x="2702796" y="1224455"/>
-            <a:ext cx="1314784" cy="307777"/>
+            <a:off x="2390709" y="1310372"/>
+            <a:ext cx="1869551" cy="307777"/>
           </a:xfrm>
           <a:prstGeom prst="rect">
             <a:avLst/>
@@ -8311,7 +10603,7 @@
           <a:p>
             <a:r>
               <a:rPr lang="fr-FR" sz="1400" dirty="0" smtClean="0"/>
-              <a:t>/</a:t>
+              <a:t>url.com/</a:t>
             </a:r>
             <a:r>
               <a:rPr lang="fr-FR" sz="1400" dirty="0" err="1" smtClean="0"/>
@@ -8333,8 +10625,8 @@
         </p:nvCxnSpPr>
         <p:spPr>
           <a:xfrm flipH="1" flipV="1">
-            <a:off x="5594031" y="1814474"/>
-            <a:ext cx="1122446" cy="997"/>
+            <a:off x="5594031" y="1814475"/>
+            <a:ext cx="2284561" cy="996"/>
           </a:xfrm>
           <a:prstGeom prst="straightConnector1">
             <a:avLst/>
@@ -8455,7 +10747,7 @@
         </p:nvSpPr>
         <p:spPr>
           <a:xfrm>
-            <a:off x="9469844" y="2967289"/>
+            <a:off x="6643127" y="2976670"/>
             <a:ext cx="1072654" cy="579780"/>
           </a:xfrm>
           <a:prstGeom prst="roundRect">
@@ -8499,7 +10791,7 @@
         </p:nvGrpSpPr>
         <p:grpSpPr>
           <a:xfrm>
-            <a:off x="7906518" y="1541349"/>
+            <a:off x="9091826" y="1483682"/>
             <a:ext cx="861716" cy="661583"/>
             <a:chOff x="8047291" y="1868950"/>
             <a:chExt cx="454004" cy="454003"/>
@@ -8684,8 +10976,8 @@
         </p:nvSpPr>
         <p:spPr>
           <a:xfrm>
-            <a:off x="2578816" y="2803422"/>
-            <a:ext cx="1523109" cy="307777"/>
+            <a:off x="2856506" y="2803422"/>
+            <a:ext cx="898131" cy="307777"/>
           </a:xfrm>
           <a:prstGeom prst="rect">
             <a:avLst/>
@@ -8699,24 +10991,12 @@
           <a:lstStyle/>
           <a:p>
             <a:r>
+              <a:rPr lang="fr-FR" sz="1400" dirty="0"/>
+              <a:t>url.com</a:t>
+            </a:r>
+            <a:r>
               <a:rPr lang="fr-FR" sz="1400" dirty="0" smtClean="0"/>
-              <a:t>/</a:t>
-            </a:r>
-            <a:r>
-              <a:rPr lang="fr-FR" sz="1400" dirty="0" err="1" smtClean="0"/>
-              <a:t>auth?u</a:t>
-            </a:r>
-            <a:r>
-              <a:rPr lang="fr-FR" sz="1400" dirty="0" smtClean="0"/>
-              <a:t>=</a:t>
-            </a:r>
-            <a:r>
-              <a:rPr lang="fr-FR" sz="1400" dirty="0" err="1" smtClean="0"/>
-              <a:t>XX&amp;p</a:t>
-            </a:r>
-            <a:r>
-              <a:rPr lang="fr-FR" sz="1400" dirty="0" smtClean="0"/>
-              <a:t>=YY</a:t>
+              <a:t>/*</a:t>
             </a:r>
             <a:endParaRPr lang="fr-FR" sz="1400" dirty="0"/>
           </a:p>
@@ -8746,31 +11026,7 @@
           <a:p>
             <a:r>
               <a:rPr lang="fr-FR" sz="1400" dirty="0" smtClean="0"/>
-              <a:t>&lt;</a:t>
-            </a:r>
-            <a:r>
-              <a:rPr lang="fr-FR" sz="1400" dirty="0" err="1" smtClean="0"/>
-              <a:t>isValid</a:t>
-            </a:r>
-            <a:r>
-              <a:rPr lang="fr-FR" sz="1400" dirty="0" smtClean="0"/>
-              <a:t>&gt;</a:t>
-            </a:r>
-            <a:r>
-              <a:rPr lang="fr-FR" sz="1400" dirty="0" err="1" smtClean="0"/>
-              <a:t>yes</a:t>
-            </a:r>
-            <a:r>
-              <a:rPr lang="fr-FR" sz="1400" dirty="0" smtClean="0"/>
-              <a:t>&lt;/</a:t>
-            </a:r>
-            <a:r>
-              <a:rPr lang="fr-FR" sz="1400" dirty="0" err="1" smtClean="0"/>
-              <a:t>isValid</a:t>
-            </a:r>
-            <a:r>
-              <a:rPr lang="fr-FR" sz="1400" dirty="0" smtClean="0"/>
-              <a:t>&gt;</a:t>
+              <a:t>[Résultat standard]</a:t>
             </a:r>
             <a:endParaRPr lang="fr-FR" sz="1400" dirty="0"/>
           </a:p>
@@ -8783,85 +11039,9 @@
           <p:nvPr/>
         </p:nvCxnSpPr>
         <p:spPr>
-          <a:xfrm>
-            <a:off x="5617020" y="3136637"/>
-            <a:ext cx="1122446" cy="997"/>
-          </a:xfrm>
-          <a:prstGeom prst="straightConnector1">
-            <a:avLst/>
-          </a:prstGeom>
-          <a:ln w="19050">
-            <a:solidFill>
-              <a:schemeClr val="accent2">
-                <a:lumMod val="75000"/>
-              </a:schemeClr>
-            </a:solidFill>
-            <a:tailEnd type="triangle"/>
-          </a:ln>
-        </p:spPr>
-        <p:style>
-          <a:lnRef idx="1">
-            <a:schemeClr val="accent1"/>
-          </a:lnRef>
-          <a:fillRef idx="0">
-            <a:schemeClr val="accent1"/>
-          </a:fillRef>
-          <a:effectRef idx="0">
-            <a:schemeClr val="accent1"/>
-          </a:effectRef>
-          <a:fontRef idx="minor">
-            <a:schemeClr val="tx1"/>
-          </a:fontRef>
-        </p:style>
-      </p:cxnSp>
-      <p:cxnSp>
-        <p:nvCxnSpPr>
-          <p:cNvPr id="136" name="Connecteur droit avec flèche 135"/>
-          <p:cNvCxnSpPr/>
-          <p:nvPr/>
-        </p:nvCxnSpPr>
-        <p:spPr>
-          <a:xfrm flipH="1" flipV="1">
-            <a:off x="5595504" y="3373310"/>
-            <a:ext cx="1122446" cy="997"/>
-          </a:xfrm>
-          <a:prstGeom prst="straightConnector1">
-            <a:avLst/>
-          </a:prstGeom>
-          <a:ln w="19050">
-            <a:solidFill>
-              <a:schemeClr val="accent2">
-                <a:lumMod val="75000"/>
-              </a:schemeClr>
-            </a:solidFill>
-            <a:tailEnd type="triangle"/>
-          </a:ln>
-        </p:spPr>
-        <p:style>
-          <a:lnRef idx="1">
-            <a:schemeClr val="accent1"/>
-          </a:lnRef>
-          <a:fillRef idx="0">
-            <a:schemeClr val="accent1"/>
-          </a:fillRef>
-          <a:effectRef idx="0">
-            <a:schemeClr val="accent1"/>
-          </a:effectRef>
-          <a:fontRef idx="minor">
-            <a:schemeClr val="tx1"/>
-          </a:fontRef>
-        </p:style>
-      </p:cxnSp>
-      <p:cxnSp>
-        <p:nvCxnSpPr>
-          <p:cNvPr id="137" name="Connecteur droit avec flèche 136"/>
-          <p:cNvCxnSpPr/>
-          <p:nvPr/>
-        </p:nvCxnSpPr>
-        <p:spPr>
-          <a:xfrm>
-            <a:off x="8347397" y="3149030"/>
-            <a:ext cx="1122446" cy="997"/>
+          <a:xfrm flipV="1">
+            <a:off x="5617020" y="3131623"/>
+            <a:ext cx="1026107" cy="5014"/>
           </a:xfrm>
           <a:prstGeom prst="straightConnector1">
             <a:avLst/>
@@ -8897,9 +11077,9 @@
           <p:nvPr/>
         </p:nvCxnSpPr>
         <p:spPr>
-          <a:xfrm flipH="1" flipV="1">
-            <a:off x="8325881" y="3385703"/>
-            <a:ext cx="1122446" cy="997"/>
+          <a:xfrm flipH="1">
+            <a:off x="5594031" y="3373780"/>
+            <a:ext cx="1030752" cy="1108"/>
           </a:xfrm>
           <a:prstGeom prst="straightConnector1">
             <a:avLst/>
@@ -9008,8 +11188,8 @@
         </p:nvSpPr>
         <p:spPr>
           <a:xfrm>
-            <a:off x="2432337" y="4363198"/>
-            <a:ext cx="1855701" cy="307777"/>
+            <a:off x="2281774" y="4364022"/>
+            <a:ext cx="2077877" cy="307777"/>
           </a:xfrm>
           <a:prstGeom prst="rect">
             <a:avLst/>
@@ -9024,11 +11204,11 @@
           <a:p>
             <a:r>
               <a:rPr lang="fr-FR" sz="1400" dirty="0" smtClean="0"/>
-              <a:t>/</a:t>
+              <a:t>url.com/</a:t>
             </a:r>
             <a:r>
               <a:rPr lang="fr-FR" sz="1400" dirty="0" err="1" smtClean="0"/>
-              <a:t>newAuth?u</a:t>
+              <a:t>auth?u</a:t>
             </a:r>
             <a:r>
               <a:rPr lang="fr-FR" sz="1400" dirty="0" smtClean="0"/>
@@ -9101,7 +11281,7 @@
         <p:spPr>
           <a:xfrm>
             <a:off x="5625569" y="4709131"/>
-            <a:ext cx="1122446" cy="997"/>
+            <a:ext cx="2242636" cy="5059"/>
           </a:xfrm>
           <a:prstGeom prst="straightConnector1">
             <a:avLst/>
@@ -9135,9 +11315,9 @@
           <p:nvPr/>
         </p:nvCxnSpPr>
         <p:spPr>
-          <a:xfrm flipH="1" flipV="1">
-            <a:off x="5604053" y="4945804"/>
-            <a:ext cx="1122446" cy="997"/>
+          <a:xfrm flipH="1">
+            <a:off x="5604053" y="4944386"/>
+            <a:ext cx="2232614" cy="1419"/>
           </a:xfrm>
           <a:prstGeom prst="straightConnector1">
             <a:avLst/>
@@ -9172,7 +11352,7 @@
         </p:nvSpPr>
         <p:spPr>
           <a:xfrm>
-            <a:off x="9468370" y="4541683"/>
+            <a:off x="10604552" y="4383476"/>
             <a:ext cx="1072654" cy="579780"/>
           </a:xfrm>
           <a:prstGeom prst="roundRect">
@@ -9216,7 +11396,7 @@
         </p:nvCxnSpPr>
         <p:spPr>
           <a:xfrm>
-            <a:off x="8347397" y="4709131"/>
+            <a:off x="9477858" y="4547413"/>
             <a:ext cx="1122446" cy="997"/>
           </a:xfrm>
           <a:prstGeom prst="straightConnector1">
@@ -9252,7 +11432,7 @@
         </p:nvCxnSpPr>
         <p:spPr>
           <a:xfrm flipH="1" flipV="1">
-            <a:off x="8325881" y="4945804"/>
+            <a:off x="9475974" y="4811190"/>
             <a:ext cx="1122446" cy="997"/>
           </a:xfrm>
           <a:prstGeom prst="straightConnector1">
@@ -9288,7 +11468,7 @@
         </p:nvSpPr>
         <p:spPr>
           <a:xfrm>
-            <a:off x="8416276" y="2803422"/>
+            <a:off x="5691377" y="2836979"/>
             <a:ext cx="927754" cy="307777"/>
           </a:xfrm>
           <a:prstGeom prst="rect">
@@ -9318,7 +11498,7 @@
         </p:nvSpPr>
         <p:spPr>
           <a:xfrm>
-            <a:off x="8374003" y="4365541"/>
+            <a:off x="9524096" y="4230927"/>
             <a:ext cx="1071960" cy="307777"/>
           </a:xfrm>
           <a:prstGeom prst="rect">
@@ -9348,7 +11528,7 @@
         </p:nvSpPr>
         <p:spPr>
           <a:xfrm>
-            <a:off x="5548051" y="4939526"/>
+            <a:off x="6082097" y="4979746"/>
             <a:ext cx="1225144" cy="523220"/>
           </a:xfrm>
           <a:prstGeom prst="rect">
@@ -9373,6 +11553,44 @@
             <a:r>
               <a:rPr lang="fr-FR" sz="1400" dirty="0" smtClean="0"/>
               <a:t>Mise en cache</a:t>
+            </a:r>
+            <a:endParaRPr lang="fr-FR" sz="1400" dirty="0"/>
+          </a:p>
+        </p:txBody>
+      </p:sp>
+      <p:sp>
+        <p:nvSpPr>
+          <p:cNvPr id="38" name="ZoneTexte 37"/>
+          <p:cNvSpPr txBox="1"/>
+          <p:nvPr/>
+        </p:nvSpPr>
+        <p:spPr>
+          <a:xfrm>
+            <a:off x="9487469" y="4802481"/>
+            <a:ext cx="1092607" cy="523220"/>
+          </a:xfrm>
+          <a:prstGeom prst="rect">
+            <a:avLst/>
+          </a:prstGeom>
+          <a:noFill/>
+        </p:spPr>
+        <p:txBody>
+          <a:bodyPr wrap="none" rtlCol="0">
+            <a:spAutoFit/>
+          </a:bodyPr>
+          <a:lstStyle/>
+          <a:p>
+            <a:pPr algn="ctr"/>
+            <a:r>
+              <a:rPr lang="fr-FR" sz="1400" dirty="0" smtClean="0"/>
+              <a:t>Résultat</a:t>
+            </a:r>
+          </a:p>
+          <a:p>
+            <a:pPr algn="ctr"/>
+            <a:r>
+              <a:rPr lang="fr-FR" sz="1400" dirty="0" smtClean="0"/>
+              <a:t>non formaté</a:t>
             </a:r>
             <a:endParaRPr lang="fr-FR" sz="1400" dirty="0"/>
           </a:p>
@@ -9990,49 +12208,49 @@
 
 <file path=customXml/item1.xml><?xml version="1.0" encoding="utf-8"?>
 <Control xmlns="http://schemas.microsoft.com/VisualStudio/2011/storyboarding/control">
-  <Id Name="System.Storyboarding.WindowsDesktop.AlertDialog" Revision="1" Stencil="System.Storyboarding.WindowsDesktop" StencilVersion="0.1"/>
+  <Id Name="System.Storyboarding.Backgrounds.DesktopTaskbar" Revision="1" Stencil="System.Storyboarding.Backgrounds" StencilVersion="0.1"/>
 </Control>
 </file>
 
 <file path=customXml/item10.xml><?xml version="1.0" encoding="utf-8"?>
 <Control xmlns="http://schemas.microsoft.com/VisualStudio/2011/storyboarding/control">
-  <Id Name="System.Storyboarding.Backgrounds.WebBrowser" Revision="1" Stencil="System.Storyboarding.Backgrounds" StencilVersion="0.1"/>
+  <Id Name="System.Storyboarding.WindowsDesktop.DialogBox" Revision="1" Stencil="System.Storyboarding.WindowsDesktop" StencilVersion="0.1"/>
 </Control>
 </file>
 
 <file path=customXml/item2.xml><?xml version="1.0" encoding="utf-8"?>
 <Control xmlns="http://schemas.microsoft.com/VisualStudio/2011/storyboarding/control">
-  <Id Name="System.Storyboarding.Backgrounds.DesktopTaskbar" Revision="1" Stencil="System.Storyboarding.Backgrounds" StencilVersion="0.1"/>
+  <Id Name="System.Storyboarding.WindowsDesktop.AlertDialog" Revision="1" Stencil="System.Storyboarding.WindowsDesktop" StencilVersion="0.1"/>
 </Control>
 </file>
 
 <file path=customXml/item3.xml><?xml version="1.0" encoding="utf-8"?>
 <Control xmlns="http://schemas.microsoft.com/VisualStudio/2011/storyboarding/control">
-  <Id Name="System.Storyboarding.WindowsDesktop.DialogBox" Revision="1" Stencil="System.Storyboarding.WindowsDesktop" StencilVersion="0.1"/>
+  <Id Name="System.Storyboarding.WindowsPhoneIcons.Search" Revision="1" Stencil="System.Storyboarding.WindowsPhoneIcons" StencilVersion="0.1"/>
 </Control>
 </file>
 
 <file path=customXml/item4.xml><?xml version="1.0" encoding="utf-8"?>
 <Control xmlns="http://schemas.microsoft.com/VisualStudio/2011/storyboarding/control">
-  <Id Name="System.Storyboarding.WindowsDesktop.AlertDialog" Revision="1" Stencil="System.Storyboarding.WindowsDesktop" StencilVersion="0.1"/>
+  <Id Name="System.Storyboarding.WindowsDesktop.DialogBox" Revision="1" Stencil="System.Storyboarding.WindowsDesktop" StencilVersion="0.1"/>
 </Control>
 </file>
 
 <file path=customXml/item5.xml><?xml version="1.0" encoding="utf-8"?>
 <Control xmlns="http://schemas.microsoft.com/VisualStudio/2011/storyboarding/control">
-  <Id Name="System.Storyboarding.WindowsDesktop.DialogBox" Revision="1" Stencil="System.Storyboarding.WindowsDesktop" StencilVersion="0.1"/>
+  <Id Name="System.Storyboarding.Backgrounds.WebBrowser" Revision="1" Stencil="System.Storyboarding.Backgrounds" StencilVersion="0.1"/>
 </Control>
 </file>
 
 <file path=customXml/item6.xml><?xml version="1.0" encoding="utf-8"?>
 <Control xmlns="http://schemas.microsoft.com/VisualStudio/2011/storyboarding/control">
-  <Id Name="System.Storyboarding.WindowsPhoneIcons.Search" Revision="1" Stencil="System.Storyboarding.WindowsPhoneIcons" StencilVersion="0.1"/>
+  <Id Name="System.Storyboarding.WindowsDesktop.AlertDialog" Revision="1" Stencil="System.Storyboarding.WindowsDesktop" StencilVersion="0.1"/>
 </Control>
 </file>
 
 <file path=customXml/item7.xml><?xml version="1.0" encoding="utf-8"?>
 <Control xmlns="http://schemas.microsoft.com/VisualStudio/2011/storyboarding/control">
-  <Id Name="System.Storyboarding.WindowsDesktop.DialogBox" Revision="1" Stencil="System.Storyboarding.WindowsDesktop" StencilVersion="0.1"/>
+  <Id Name="System.Storyboarding.Common.Breadcrumb" Revision="1" Stencil="System.Storyboarding.Common" StencilVersion="0.1"/>
 </Control>
 </file>
 
@@ -10044,11 +12262,27 @@
 
 <file path=customXml/item9.xml><?xml version="1.0" encoding="utf-8"?>
 <Control xmlns="http://schemas.microsoft.com/VisualStudio/2011/storyboarding/control">
-  <Id Name="System.Storyboarding.Common.Breadcrumb" Revision="1" Stencil="System.Storyboarding.Common" StencilVersion="0.1"/>
+  <Id Name="System.Storyboarding.WindowsDesktop.DialogBox" Revision="1" Stencil="System.Storyboarding.WindowsDesktop" StencilVersion="0.1"/>
 </Control>
 </file>
 
 <file path=customXml/itemProps1.xml><?xml version="1.0" encoding="utf-8"?>
+<ds:datastoreItem xmlns:ds="http://schemas.openxmlformats.org/officeDocument/2006/customXml" ds:itemID="{35683EA7-E414-44F3-BF5F-7C617915B318}">
+  <ds:schemaRefs>
+    <ds:schemaRef ds:uri="http://schemas.microsoft.com/VisualStudio/2011/storyboarding/control"/>
+  </ds:schemaRefs>
+</ds:datastoreItem>
+</file>
+
+<file path=customXml/itemProps10.xml><?xml version="1.0" encoding="utf-8"?>
+<ds:datastoreItem xmlns:ds="http://schemas.openxmlformats.org/officeDocument/2006/customXml" ds:itemID="{C315F13A-AC62-4724-879E-14987FCB1CE6}">
+  <ds:schemaRefs>
+    <ds:schemaRef ds:uri="http://schemas.microsoft.com/VisualStudio/2011/storyboarding/control"/>
+  </ds:schemaRefs>
+</ds:datastoreItem>
+</file>
+
+<file path=customXml/itemProps2.xml><?xml version="1.0" encoding="utf-8"?>
 <ds:datastoreItem xmlns:ds="http://schemas.openxmlformats.org/officeDocument/2006/customXml" ds:itemID="{EBBE763A-B3D5-488A-9F72-453E09C2E102}">
   <ds:schemaRefs>
     <ds:schemaRef ds:uri="http://schemas.microsoft.com/VisualStudio/2011/storyboarding/control"/>
@@ -10056,7 +12290,23 @@
 </ds:datastoreItem>
 </file>
 
-<file path=customXml/itemProps10.xml><?xml version="1.0" encoding="utf-8"?>
+<file path=customXml/itemProps3.xml><?xml version="1.0" encoding="utf-8"?>
+<ds:datastoreItem xmlns:ds="http://schemas.openxmlformats.org/officeDocument/2006/customXml" ds:itemID="{120A3C96-CD27-497D-A0EF-E96445F10DC2}">
+  <ds:schemaRefs>
+    <ds:schemaRef ds:uri="http://schemas.microsoft.com/VisualStudio/2011/storyboarding/control"/>
+  </ds:schemaRefs>
+</ds:datastoreItem>
+</file>
+
+<file path=customXml/itemProps4.xml><?xml version="1.0" encoding="utf-8"?>
+<ds:datastoreItem xmlns:ds="http://schemas.openxmlformats.org/officeDocument/2006/customXml" ds:itemID="{1CAF7CC1-4F40-417B-9F2E-8DAFAC288198}">
+  <ds:schemaRefs>
+    <ds:schemaRef ds:uri="http://schemas.microsoft.com/VisualStudio/2011/storyboarding/control"/>
+  </ds:schemaRefs>
+</ds:datastoreItem>
+</file>
+
+<file path=customXml/itemProps5.xml><?xml version="1.0" encoding="utf-8"?>
 <ds:datastoreItem xmlns:ds="http://schemas.openxmlformats.org/officeDocument/2006/customXml" ds:itemID="{B480E993-63B5-4C2F-BB8F-99D7AE1386B6}">
   <ds:schemaRefs>
     <ds:schemaRef ds:uri="http://schemas.microsoft.com/VisualStudio/2011/storyboarding/control"/>
@@ -10064,23 +12314,7 @@
 </ds:datastoreItem>
 </file>
 
-<file path=customXml/itemProps2.xml><?xml version="1.0" encoding="utf-8"?>
-<ds:datastoreItem xmlns:ds="http://schemas.openxmlformats.org/officeDocument/2006/customXml" ds:itemID="{35683EA7-E414-44F3-BF5F-7C617915B318}">
-  <ds:schemaRefs>
-    <ds:schemaRef ds:uri="http://schemas.microsoft.com/VisualStudio/2011/storyboarding/control"/>
-  </ds:schemaRefs>
-</ds:datastoreItem>
-</file>
-
-<file path=customXml/itemProps3.xml><?xml version="1.0" encoding="utf-8"?>
-<ds:datastoreItem xmlns:ds="http://schemas.openxmlformats.org/officeDocument/2006/customXml" ds:itemID="{2005D821-4CB3-4A25-B341-C5F92CEC57AD}">
-  <ds:schemaRefs>
-    <ds:schemaRef ds:uri="http://schemas.microsoft.com/VisualStudio/2011/storyboarding/control"/>
-  </ds:schemaRefs>
-</ds:datastoreItem>
-</file>
-
-<file path=customXml/itemProps4.xml><?xml version="1.0" encoding="utf-8"?>
+<file path=customXml/itemProps6.xml><?xml version="1.0" encoding="utf-8"?>
 <ds:datastoreItem xmlns:ds="http://schemas.openxmlformats.org/officeDocument/2006/customXml" ds:itemID="{82FCB0D1-8EB6-4B2D-98E5-C2C86E67B90F}">
   <ds:schemaRefs>
     <ds:schemaRef ds:uri="http://schemas.microsoft.com/VisualStudio/2011/storyboarding/control"/>
@@ -10088,24 +12322,8 @@
 </ds:datastoreItem>
 </file>
 
-<file path=customXml/itemProps5.xml><?xml version="1.0" encoding="utf-8"?>
-<ds:datastoreItem xmlns:ds="http://schemas.openxmlformats.org/officeDocument/2006/customXml" ds:itemID="{1CAF7CC1-4F40-417B-9F2E-8DAFAC288198}">
-  <ds:schemaRefs>
-    <ds:schemaRef ds:uri="http://schemas.microsoft.com/VisualStudio/2011/storyboarding/control"/>
-  </ds:schemaRefs>
-</ds:datastoreItem>
-</file>
-
-<file path=customXml/itemProps6.xml><?xml version="1.0" encoding="utf-8"?>
-<ds:datastoreItem xmlns:ds="http://schemas.openxmlformats.org/officeDocument/2006/customXml" ds:itemID="{120A3C96-CD27-497D-A0EF-E96445F10DC2}">
-  <ds:schemaRefs>
-    <ds:schemaRef ds:uri="http://schemas.microsoft.com/VisualStudio/2011/storyboarding/control"/>
-  </ds:schemaRefs>
-</ds:datastoreItem>
-</file>
-
 <file path=customXml/itemProps7.xml><?xml version="1.0" encoding="utf-8"?>
-<ds:datastoreItem xmlns:ds="http://schemas.openxmlformats.org/officeDocument/2006/customXml" ds:itemID="{C315F13A-AC62-4724-879E-14987FCB1CE6}">
+<ds:datastoreItem xmlns:ds="http://schemas.openxmlformats.org/officeDocument/2006/customXml" ds:itemID="{9A48F3C4-45B4-4BFF-BBD6-E5D8E1BB578C}">
   <ds:schemaRefs>
     <ds:schemaRef ds:uri="http://schemas.microsoft.com/VisualStudio/2011/storyboarding/control"/>
   </ds:schemaRefs>
@@ -10121,7 +12339,7 @@
 </file>
 
 <file path=customXml/itemProps9.xml><?xml version="1.0" encoding="utf-8"?>
-<ds:datastoreItem xmlns:ds="http://schemas.openxmlformats.org/officeDocument/2006/customXml" ds:itemID="{9A48F3C4-45B4-4BFF-BBD6-E5D8E1BB578C}">
+<ds:datastoreItem xmlns:ds="http://schemas.openxmlformats.org/officeDocument/2006/customXml" ds:itemID="{2005D821-4CB3-4A25-B341-C5F92CEC57AD}">
   <ds:schemaRefs>
     <ds:schemaRef ds:uri="http://schemas.microsoft.com/VisualStudio/2011/storyboarding/control"/>
   </ds:schemaRefs>

</xml_diff>

<commit_message>
Ajout de captures d'écran de web.config
</commit_message>
<xml_diff>
--- a/Speak'up API shadowing.pptx
+++ b/Speak'up API shadowing.pptx
@@ -5,7 +5,7 @@
     <p:sldMasterId id="2147483648" r:id="rId11"/>
   </p:sldMasterIdLst>
   <p:notesMasterIdLst>
-    <p:notesMasterId r:id="rId24"/>
+    <p:notesMasterId r:id="rId26"/>
   </p:notesMasterIdLst>
   <p:sldIdLst>
     <p:sldId id="256" r:id="rId12"/>
@@ -20,6 +20,8 @@
     <p:sldId id="287" r:id="rId21"/>
     <p:sldId id="291" r:id="rId22"/>
     <p:sldId id="292" r:id="rId23"/>
+    <p:sldId id="293" r:id="rId24"/>
+    <p:sldId id="294" r:id="rId25"/>
   </p:sldIdLst>
   <p:sldSz cx="12192000" cy="6858000"/>
   <p:notesSz cx="6858000" cy="9144000"/>
@@ -220,7 +222,7 @@
           <a:p>
             <a:fld id="{B5AD0476-FE6D-4A78-9DC3-98305AD3C12A}" type="datetimeFigureOut">
               <a:rPr lang="fr-FR" smtClean="0"/>
-              <a:t>04/11/2019</a:t>
+              <a:t>08/11/2019</a:t>
             </a:fld>
             <a:endParaRPr lang="fr-FR"/>
           </a:p>
@@ -655,6 +657,199 @@
 </p:notes>
 </file>
 
+<file path=ppt/notesSlides/notesSlide11.xml><?xml version="1.0" encoding="utf-8"?>
+<p:notes xmlns:a="http://schemas.openxmlformats.org/drawingml/2006/main" xmlns:r="http://schemas.openxmlformats.org/officeDocument/2006/relationships" xmlns:p="http://schemas.openxmlformats.org/presentationml/2006/main">
+  <p:cSld>
+    <p:spTree>
+      <p:nvGrpSpPr>
+        <p:cNvPr id="1" name=""/>
+        <p:cNvGrpSpPr/>
+        <p:nvPr/>
+      </p:nvGrpSpPr>
+      <p:grpSpPr>
+        <a:xfrm>
+          <a:off x="0" y="0"/>
+          <a:ext cx="0" cy="0"/>
+          <a:chOff x="0" y="0"/>
+          <a:chExt cx="0" cy="0"/>
+        </a:xfrm>
+      </p:grpSpPr>
+      <p:sp>
+        <p:nvSpPr>
+          <p:cNvPr id="2" name="Espace réservé de l'image des diapositives 1"/>
+          <p:cNvSpPr>
+            <a:spLocks noGrp="1" noRot="1" noChangeAspect="1"/>
+          </p:cNvSpPr>
+          <p:nvPr>
+            <p:ph type="sldImg"/>
+          </p:nvPr>
+        </p:nvSpPr>
+        <p:spPr/>
+      </p:sp>
+      <p:sp>
+        <p:nvSpPr>
+          <p:cNvPr id="3" name="Espace réservé des notes 2"/>
+          <p:cNvSpPr>
+            <a:spLocks noGrp="1"/>
+          </p:cNvSpPr>
+          <p:nvPr>
+            <p:ph type="body" idx="1"/>
+          </p:nvPr>
+        </p:nvSpPr>
+        <p:spPr/>
+        <p:txBody>
+          <a:bodyPr/>
+          <a:lstStyle/>
+          <a:p>
+            <a:pPr marL="0" marR="0" lvl="0" indent="0" algn="l" defTabSz="914400" rtl="0" eaLnBrk="1" fontAlgn="auto" latinLnBrk="0" hangingPunct="1">
+              <a:lnSpc>
+                <a:spcPct val="100000"/>
+              </a:lnSpc>
+              <a:spcBef>
+                <a:spcPts val="0"/>
+              </a:spcBef>
+              <a:spcAft>
+                <a:spcPts val="0"/>
+              </a:spcAft>
+              <a:buClrTx/>
+              <a:buSzTx/>
+              <a:buFontTx/>
+              <a:buNone/>
+              <a:tabLst/>
+              <a:defRPr/>
+            </a:pPr>
+            <a:r>
+              <a:rPr lang="fr-FR" b="0" dirty="0" smtClean="0"/>
+              <a:t>Tous les</a:t>
+            </a:r>
+            <a:r>
+              <a:rPr lang="fr-FR" b="0" baseline="0" dirty="0" smtClean="0"/>
+              <a:t> lots fonctionnels ont été implémentés, seuls peuvent subsister quelques services non transférables pour diverses raisons (protocole non supporté, code trop complexe pour être ré-implémenté…)</a:t>
+            </a:r>
+            <a:endParaRPr lang="fr-FR" b="0" dirty="0" smtClean="0"/>
+          </a:p>
+        </p:txBody>
+      </p:sp>
+      <p:sp>
+        <p:nvSpPr>
+          <p:cNvPr id="4" name="Espace réservé du numéro de diapositive 3"/>
+          <p:cNvSpPr>
+            <a:spLocks noGrp="1"/>
+          </p:cNvSpPr>
+          <p:nvPr>
+            <p:ph type="sldNum" sz="quarter" idx="10"/>
+          </p:nvPr>
+        </p:nvSpPr>
+        <p:spPr/>
+        <p:txBody>
+          <a:bodyPr/>
+          <a:lstStyle/>
+          <a:p>
+            <a:fld id="{AA5DF8EF-0F82-44B3-979E-DBC26962337C}" type="slidenum">
+              <a:rPr lang="fr-FR" smtClean="0"/>
+              <a:t>13</a:t>
+            </a:fld>
+            <a:endParaRPr lang="fr-FR"/>
+          </a:p>
+        </p:txBody>
+      </p:sp>
+    </p:spTree>
+    <p:extLst>
+      <p:ext uri="{BB962C8B-B14F-4D97-AF65-F5344CB8AC3E}">
+        <p14:creationId xmlns:p14="http://schemas.microsoft.com/office/powerpoint/2010/main" val="2268666900"/>
+      </p:ext>
+    </p:extLst>
+  </p:cSld>
+  <p:clrMapOvr>
+    <a:masterClrMapping/>
+  </p:clrMapOvr>
+</p:notes>
+</file>
+
+<file path=ppt/notesSlides/notesSlide12.xml><?xml version="1.0" encoding="utf-8"?>
+<p:notes xmlns:a="http://schemas.openxmlformats.org/drawingml/2006/main" xmlns:r="http://schemas.openxmlformats.org/officeDocument/2006/relationships" xmlns:p="http://schemas.openxmlformats.org/presentationml/2006/main">
+  <p:cSld>
+    <p:spTree>
+      <p:nvGrpSpPr>
+        <p:cNvPr id="1" name=""/>
+        <p:cNvGrpSpPr/>
+        <p:nvPr/>
+      </p:nvGrpSpPr>
+      <p:grpSpPr>
+        <a:xfrm>
+          <a:off x="0" y="0"/>
+          <a:ext cx="0" cy="0"/>
+          <a:chOff x="0" y="0"/>
+          <a:chExt cx="0" cy="0"/>
+        </a:xfrm>
+      </p:grpSpPr>
+      <p:sp>
+        <p:nvSpPr>
+          <p:cNvPr id="2" name="Espace réservé de l'image des diapositives 1"/>
+          <p:cNvSpPr>
+            <a:spLocks noGrp="1" noRot="1" noChangeAspect="1"/>
+          </p:cNvSpPr>
+          <p:nvPr>
+            <p:ph type="sldImg"/>
+          </p:nvPr>
+        </p:nvSpPr>
+        <p:spPr/>
+      </p:sp>
+      <p:sp>
+        <p:nvSpPr>
+          <p:cNvPr id="3" name="Espace réservé des notes 2"/>
+          <p:cNvSpPr>
+            <a:spLocks noGrp="1"/>
+          </p:cNvSpPr>
+          <p:nvPr>
+            <p:ph type="body" idx="1"/>
+          </p:nvPr>
+        </p:nvSpPr>
+        <p:spPr/>
+        <p:txBody>
+          <a:bodyPr/>
+          <a:lstStyle/>
+          <a:p>
+            <a:endParaRPr lang="fr-FR" dirty="0"/>
+          </a:p>
+        </p:txBody>
+      </p:sp>
+      <p:sp>
+        <p:nvSpPr>
+          <p:cNvPr id="4" name="Espace réservé du numéro de diapositive 3"/>
+          <p:cNvSpPr>
+            <a:spLocks noGrp="1"/>
+          </p:cNvSpPr>
+          <p:nvPr>
+            <p:ph type="sldNum" sz="quarter" idx="10"/>
+          </p:nvPr>
+        </p:nvSpPr>
+        <p:spPr/>
+        <p:txBody>
+          <a:bodyPr/>
+          <a:lstStyle/>
+          <a:p>
+            <a:fld id="{AA5DF8EF-0F82-44B3-979E-DBC26962337C}" type="slidenum">
+              <a:rPr lang="fr-FR" smtClean="0"/>
+              <a:t>14</a:t>
+            </a:fld>
+            <a:endParaRPr lang="fr-FR"/>
+          </a:p>
+        </p:txBody>
+      </p:sp>
+    </p:spTree>
+    <p:extLst>
+      <p:ext uri="{BB962C8B-B14F-4D97-AF65-F5344CB8AC3E}">
+        <p14:creationId xmlns:p14="http://schemas.microsoft.com/office/powerpoint/2010/main" val="1925992678"/>
+      </p:ext>
+    </p:extLst>
+  </p:cSld>
+  <p:clrMapOvr>
+    <a:masterClrMapping/>
+  </p:clrMapOvr>
+</p:notes>
+</file>
+
 <file path=ppt/notesSlides/notesSlide2.xml><?xml version="1.0" encoding="utf-8"?>
 <p:notes xmlns:a="http://schemas.openxmlformats.org/drawingml/2006/main" xmlns:r="http://schemas.openxmlformats.org/officeDocument/2006/relationships" xmlns:p="http://schemas.openxmlformats.org/presentationml/2006/main">
   <p:cSld>
@@ -798,15 +993,7 @@
             </a:r>
             <a:r>
               <a:rPr lang="fr-FR" baseline="0" dirty="0" smtClean="0"/>
-              <a:t> API </a:t>
-            </a:r>
-            <a:r>
-              <a:rPr lang="fr-FR" baseline="0" dirty="0" smtClean="0"/>
-              <a:t>sont dans </a:t>
-            </a:r>
-            <a:r>
-              <a:rPr lang="fr-FR" baseline="0" dirty="0" smtClean="0"/>
-              <a:t>le sens de Application </a:t>
+              <a:t> API sont dans le sens de Application </a:t>
             </a:r>
             <a:r>
               <a:rPr lang="fr-FR" baseline="0" dirty="0" err="1" smtClean="0"/>
@@ -2266,7 +2453,7 @@
           <a:p>
             <a:fld id="{2A800B55-2EA3-4651-92C4-339DC2AA9BC2}" type="datetimeFigureOut">
               <a:rPr lang="fr-FR" smtClean="0"/>
-              <a:t>04/11/2019</a:t>
+              <a:t>08/11/2019</a:t>
             </a:fld>
             <a:endParaRPr lang="fr-FR"/>
           </a:p>
@@ -2464,7 +2651,7 @@
           <a:p>
             <a:fld id="{2A800B55-2EA3-4651-92C4-339DC2AA9BC2}" type="datetimeFigureOut">
               <a:rPr lang="fr-FR" smtClean="0"/>
-              <a:t>04/11/2019</a:t>
+              <a:t>08/11/2019</a:t>
             </a:fld>
             <a:endParaRPr lang="fr-FR"/>
           </a:p>
@@ -2672,7 +2859,7 @@
           <a:p>
             <a:fld id="{2A800B55-2EA3-4651-92C4-339DC2AA9BC2}" type="datetimeFigureOut">
               <a:rPr lang="fr-FR" smtClean="0"/>
-              <a:t>04/11/2019</a:t>
+              <a:t>08/11/2019</a:t>
             </a:fld>
             <a:endParaRPr lang="fr-FR"/>
           </a:p>
@@ -2870,7 +3057,7 @@
           <a:p>
             <a:fld id="{2A800B55-2EA3-4651-92C4-339DC2AA9BC2}" type="datetimeFigureOut">
               <a:rPr lang="fr-FR" smtClean="0"/>
-              <a:t>04/11/2019</a:t>
+              <a:t>08/11/2019</a:t>
             </a:fld>
             <a:endParaRPr lang="fr-FR"/>
           </a:p>
@@ -3145,7 +3332,7 @@
           <a:p>
             <a:fld id="{2A800B55-2EA3-4651-92C4-339DC2AA9BC2}" type="datetimeFigureOut">
               <a:rPr lang="fr-FR" smtClean="0"/>
-              <a:t>04/11/2019</a:t>
+              <a:t>08/11/2019</a:t>
             </a:fld>
             <a:endParaRPr lang="fr-FR"/>
           </a:p>
@@ -3410,7 +3597,7 @@
           <a:p>
             <a:fld id="{2A800B55-2EA3-4651-92C4-339DC2AA9BC2}" type="datetimeFigureOut">
               <a:rPr lang="fr-FR" smtClean="0"/>
-              <a:t>04/11/2019</a:t>
+              <a:t>08/11/2019</a:t>
             </a:fld>
             <a:endParaRPr lang="fr-FR"/>
           </a:p>
@@ -3822,7 +4009,7 @@
           <a:p>
             <a:fld id="{2A800B55-2EA3-4651-92C4-339DC2AA9BC2}" type="datetimeFigureOut">
               <a:rPr lang="fr-FR" smtClean="0"/>
-              <a:t>04/11/2019</a:t>
+              <a:t>08/11/2019</a:t>
             </a:fld>
             <a:endParaRPr lang="fr-FR"/>
           </a:p>
@@ -3963,7 +4150,7 @@
           <a:p>
             <a:fld id="{2A800B55-2EA3-4651-92C4-339DC2AA9BC2}" type="datetimeFigureOut">
               <a:rPr lang="fr-FR" smtClean="0"/>
-              <a:t>04/11/2019</a:t>
+              <a:t>08/11/2019</a:t>
             </a:fld>
             <a:endParaRPr lang="fr-FR"/>
           </a:p>
@@ -4076,7 +4263,7 @@
           <a:p>
             <a:fld id="{2A800B55-2EA3-4651-92C4-339DC2AA9BC2}" type="datetimeFigureOut">
               <a:rPr lang="fr-FR" smtClean="0"/>
-              <a:t>04/11/2019</a:t>
+              <a:t>08/11/2019</a:t>
             </a:fld>
             <a:endParaRPr lang="fr-FR"/>
           </a:p>
@@ -4387,7 +4574,7 @@
           <a:p>
             <a:fld id="{2A800B55-2EA3-4651-92C4-339DC2AA9BC2}" type="datetimeFigureOut">
               <a:rPr lang="fr-FR" smtClean="0"/>
-              <a:t>04/11/2019</a:t>
+              <a:t>08/11/2019</a:t>
             </a:fld>
             <a:endParaRPr lang="fr-FR"/>
           </a:p>
@@ -4675,7 +4862,7 @@
           <a:p>
             <a:fld id="{2A800B55-2EA3-4651-92C4-339DC2AA9BC2}" type="datetimeFigureOut">
               <a:rPr lang="fr-FR" smtClean="0"/>
-              <a:t>04/11/2019</a:t>
+              <a:t>08/11/2019</a:t>
             </a:fld>
             <a:endParaRPr lang="fr-FR"/>
           </a:p>
@@ -4916,7 +5103,7 @@
           <a:p>
             <a:fld id="{2A800B55-2EA3-4651-92C4-339DC2AA9BC2}" type="datetimeFigureOut">
               <a:rPr lang="fr-FR" smtClean="0"/>
-              <a:t>04/11/2019</a:t>
+              <a:t>08/11/2019</a:t>
             </a:fld>
             <a:endParaRPr lang="fr-FR"/>
           </a:p>
@@ -5924,7 +6111,7 @@
         <p:spPr>
           <a:xfrm>
             <a:off x="2390709" y="1310372"/>
-            <a:ext cx="1841594" cy="307777"/>
+            <a:ext cx="1960921" cy="307777"/>
           </a:xfrm>
           <a:prstGeom prst="rect">
             <a:avLst/>
@@ -5939,7 +6126,11 @@
           <a:p>
             <a:r>
               <a:rPr lang="fr-FR" sz="1400" dirty="0" smtClean="0"/>
-              <a:t>GET "url.com/country"</a:t>
+              <a:t>GET "</a:t>
+            </a:r>
+            <a:r>
+              <a:rPr lang="fr-FR" sz="1400" dirty="0" smtClean="0"/>
+              <a:t>url.com/countries"</a:t>
             </a:r>
             <a:endParaRPr lang="fr-FR" sz="1400" dirty="0"/>
           </a:p>
@@ -6199,7 +6390,6 @@
               <a:rPr lang="fr-FR" sz="1400" dirty="0"/>
               <a:t>['...']}</a:t>
             </a:r>
-            <a:endParaRPr lang="fr-FR" sz="1400" dirty="0"/>
           </a:p>
         </p:txBody>
       </p:sp>
@@ -6875,7 +7065,6 @@
               <a:rPr lang="fr-FR" sz="1400" dirty="0"/>
               <a:t>['...']}</a:t>
             </a:r>
-            <a:endParaRPr lang="fr-FR" sz="1400" dirty="0"/>
           </a:p>
         </p:txBody>
       </p:sp>
@@ -7290,7 +7479,7 @@
         </p:nvSpPr>
         <p:spPr>
           <a:xfrm>
-            <a:off x="4772722" y="666974"/>
+            <a:off x="4772721" y="228747"/>
             <a:ext cx="2646558" cy="369332"/>
           </a:xfrm>
           <a:prstGeom prst="rect">
@@ -7315,11 +7504,2127 @@
             </a:r>
             <a:r>
               <a:rPr lang="fr-FR" dirty="0" smtClean="0"/>
+              <a:t> #2</a:t>
+            </a:r>
+            <a:endParaRPr lang="fr-FR" dirty="0"/>
+          </a:p>
+        </p:txBody>
+      </p:sp>
+      <p:pic>
+        <p:nvPicPr>
+          <p:cNvPr id="4" name="Image 3"/>
+          <p:cNvPicPr>
+            <a:picLocks noChangeAspect="1"/>
+          </p:cNvPicPr>
+          <p:nvPr/>
+        </p:nvPicPr>
+        <p:blipFill>
+          <a:blip r:embed="rId5"/>
+          <a:stretch>
+            <a:fillRect/>
+          </a:stretch>
+        </p:blipFill>
+        <p:spPr>
+          <a:xfrm>
+            <a:off x="1641307" y="772406"/>
+            <a:ext cx="8695616" cy="5119544"/>
+          </a:xfrm>
+          <a:prstGeom prst="rect">
+            <a:avLst/>
+          </a:prstGeom>
+        </p:spPr>
+      </p:pic>
+    </p:spTree>
+    <p:extLst>
+      <p:ext uri="{BB962C8B-B14F-4D97-AF65-F5344CB8AC3E}">
+        <p14:creationId xmlns:p14="http://schemas.microsoft.com/office/powerpoint/2010/main" val="2577260793"/>
+      </p:ext>
+    </p:extLst>
+  </p:cSld>
+  <p:clrMapOvr>
+    <a:masterClrMapping/>
+  </p:clrMapOvr>
+  <p:timing>
+    <p:tnLst>
+      <p:par>
+        <p:cTn id="1" dur="indefinite" restart="never" nodeType="tmRoot"/>
+      </p:par>
+    </p:tnLst>
+  </p:timing>
+</p:sld>
+</file>
+
+<file path=ppt/slides/slide13.xml><?xml version="1.0" encoding="utf-8"?>
+<p:sld xmlns:a="http://schemas.openxmlformats.org/drawingml/2006/main" xmlns:r="http://schemas.openxmlformats.org/officeDocument/2006/relationships" xmlns:p="http://schemas.openxmlformats.org/presentationml/2006/main">
+  <p:cSld>
+    <p:spTree>
+      <p:nvGrpSpPr>
+        <p:cNvPr id="1" name=""/>
+        <p:cNvGrpSpPr/>
+        <p:nvPr/>
+      </p:nvGrpSpPr>
+      <p:grpSpPr>
+        <a:xfrm>
+          <a:off x="0" y="0"/>
+          <a:ext cx="0" cy="0"/>
+          <a:chOff x="0" y="0"/>
+          <a:chExt cx="0" cy="0"/>
+        </a:xfrm>
+      </p:grpSpPr>
+      <p:pic>
+        <p:nvPicPr>
+          <p:cNvPr id="5" name="Image 4">
+            <a:extLst>
+              <a:ext uri="{FF2B5EF4-FFF2-40B4-BE49-F238E27FC236}">
+                <a16:creationId xmlns:a16="http://schemas.microsoft.com/office/drawing/2014/main" id="{D91F6CE4-A0FB-4282-9B85-47FA5527C736}"/>
+              </a:ext>
+            </a:extLst>
+          </p:cNvPr>
+          <p:cNvPicPr>
+            <a:picLocks noChangeAspect="1"/>
+          </p:cNvPicPr>
+          <p:nvPr/>
+        </p:nvPicPr>
+        <p:blipFill>
+          <a:blip r:embed="rId3" cstate="print">
+            <a:extLst>
+              <a:ext uri="{28A0092B-C50C-407E-A947-70E740481C1C}">
+                <a14:useLocalDpi xmlns:a14="http://schemas.microsoft.com/office/drawing/2010/main" val="0"/>
+              </a:ext>
+            </a:extLst>
+          </a:blip>
+          <a:stretch>
+            <a:fillRect/>
+          </a:stretch>
+        </p:blipFill>
+        <p:spPr>
+          <a:xfrm>
+            <a:off x="293615" y="6291743"/>
+            <a:ext cx="10508871" cy="272654"/>
+          </a:xfrm>
+          <a:prstGeom prst="rect">
+            <a:avLst/>
+          </a:prstGeom>
+        </p:spPr>
+      </p:pic>
+      <p:pic>
+        <p:nvPicPr>
+          <p:cNvPr id="6" name="Image 5">
+            <a:extLst>
+              <a:ext uri="{FF2B5EF4-FFF2-40B4-BE49-F238E27FC236}">
+                <a16:creationId xmlns:a16="http://schemas.microsoft.com/office/drawing/2014/main" id="{B6F51BA5-E830-46D2-B1E2-3A2C10F760E7}"/>
+              </a:ext>
+            </a:extLst>
+          </p:cNvPr>
+          <p:cNvPicPr>
+            <a:picLocks noChangeAspect="1"/>
+          </p:cNvPicPr>
+          <p:nvPr/>
+        </p:nvPicPr>
+        <p:blipFill>
+          <a:blip r:embed="rId4" cstate="print">
+            <a:extLst>
+              <a:ext uri="{28A0092B-C50C-407E-A947-70E740481C1C}">
+                <a14:useLocalDpi xmlns:a14="http://schemas.microsoft.com/office/drawing/2010/main" val="0"/>
+              </a:ext>
+            </a:extLst>
+          </a:blip>
+          <a:stretch>
+            <a:fillRect/>
+          </a:stretch>
+        </p:blipFill>
+        <p:spPr>
+          <a:xfrm>
+            <a:off x="10802486" y="5912350"/>
+            <a:ext cx="1193772" cy="787940"/>
+          </a:xfrm>
+          <a:prstGeom prst="rect">
+            <a:avLst/>
+          </a:prstGeom>
+        </p:spPr>
+      </p:pic>
+      <p:sp>
+        <p:nvSpPr>
+          <p:cNvPr id="2" name="ZoneTexte 1"/>
+          <p:cNvSpPr txBox="1"/>
+          <p:nvPr/>
+        </p:nvSpPr>
+        <p:spPr>
+          <a:xfrm>
+            <a:off x="293615" y="322730"/>
+            <a:ext cx="11702643" cy="646331"/>
+          </a:xfrm>
+          <a:prstGeom prst="rect">
+            <a:avLst/>
+          </a:prstGeom>
+          <a:noFill/>
+        </p:spPr>
+        <p:txBody>
+          <a:bodyPr wrap="square" rtlCol="0">
+            <a:spAutoFit/>
+          </a:bodyPr>
+          <a:lstStyle/>
+          <a:p>
+            <a:r>
+              <a:rPr lang="fr-FR" dirty="0" smtClean="0"/>
+              <a:t>Etat final : Implémentation </a:t>
+            </a:r>
+            <a:r>
+              <a:rPr lang="fr-FR" dirty="0" smtClean="0"/>
+              <a:t>terminée</a:t>
+            </a:r>
+          </a:p>
+          <a:p>
+            <a:pPr marL="285750" indent="-285750">
+              <a:buFont typeface="Wingdings" panose="05000000000000000000" pitchFamily="2" charset="2"/>
+              <a:buChar char="Ø"/>
+            </a:pPr>
+            <a:r>
+              <a:rPr lang="fr-FR" dirty="0" smtClean="0"/>
+              <a:t>En plus des </a:t>
+            </a:r>
+            <a:r>
+              <a:rPr lang="fr-FR" dirty="0" err="1" smtClean="0"/>
+              <a:t>urls</a:t>
+            </a:r>
+            <a:r>
+              <a:rPr lang="fr-FR" dirty="0" smtClean="0"/>
+              <a:t> ci-dessus :</a:t>
+            </a:r>
+            <a:endParaRPr lang="fr-FR" dirty="0"/>
+          </a:p>
+        </p:txBody>
+      </p:sp>
+      <p:sp>
+        <p:nvSpPr>
+          <p:cNvPr id="57" name="Rectangle à coins arrondis 56"/>
+          <p:cNvSpPr/>
+          <p:nvPr/>
+        </p:nvSpPr>
+        <p:spPr>
+          <a:xfrm>
+            <a:off x="882863" y="1299787"/>
+            <a:ext cx="1432350" cy="4279299"/>
+          </a:xfrm>
+          <a:prstGeom prst="roundRect">
+            <a:avLst/>
+          </a:prstGeom>
+        </p:spPr>
+        <p:style>
+          <a:lnRef idx="2">
+            <a:schemeClr val="accent1">
+              <a:shade val="50000"/>
+            </a:schemeClr>
+          </a:lnRef>
+          <a:fillRef idx="1">
+            <a:schemeClr val="accent1"/>
+          </a:fillRef>
+          <a:effectRef idx="0">
+            <a:schemeClr val="accent1"/>
+          </a:effectRef>
+          <a:fontRef idx="minor">
+            <a:schemeClr val="lt1"/>
+          </a:fontRef>
+        </p:style>
+        <p:txBody>
+          <a:bodyPr rtlCol="0" anchor="ctr" anchorCtr="1"/>
+          <a:lstStyle/>
+          <a:p>
+            <a:pPr algn="ctr"/>
+            <a:r>
+              <a:rPr lang="fr-FR" dirty="0" smtClean="0"/>
+              <a:t>Requêtes</a:t>
+            </a:r>
+            <a:endParaRPr lang="fr-FR" dirty="0"/>
+          </a:p>
+        </p:txBody>
+      </p:sp>
+      <p:sp>
+        <p:nvSpPr>
+          <p:cNvPr id="58" name="Rectangle à coins arrondis 57"/>
+          <p:cNvSpPr/>
+          <p:nvPr/>
+        </p:nvSpPr>
+        <p:spPr>
+          <a:xfrm>
+            <a:off x="4372192" y="1299785"/>
+            <a:ext cx="1221839" cy="4279301"/>
+          </a:xfrm>
+          <a:prstGeom prst="roundRect">
+            <a:avLst/>
+          </a:prstGeom>
+        </p:spPr>
+        <p:style>
+          <a:lnRef idx="2">
+            <a:schemeClr val="accent1">
+              <a:shade val="50000"/>
+            </a:schemeClr>
+          </a:lnRef>
+          <a:fillRef idx="1">
+            <a:schemeClr val="accent1"/>
+          </a:fillRef>
+          <a:effectRef idx="0">
+            <a:schemeClr val="accent1"/>
+          </a:effectRef>
+          <a:fontRef idx="minor">
+            <a:schemeClr val="lt1"/>
+          </a:fontRef>
+        </p:style>
+        <p:txBody>
+          <a:bodyPr vert="horz" rtlCol="0" anchor="ctr" anchorCtr="1">
+            <a:scene3d>
+              <a:camera prst="orthographicFront">
+                <a:rot lat="0" lon="0" rev="0"/>
+              </a:camera>
+              <a:lightRig rig="threePt" dir="t"/>
+            </a:scene3d>
+          </a:bodyPr>
+          <a:lstStyle/>
+          <a:p>
+            <a:pPr algn="ctr"/>
+            <a:r>
+              <a:rPr lang="fr-FR" cap="all" dirty="0" smtClean="0"/>
+              <a:t>IIS</a:t>
+            </a:r>
+            <a:endParaRPr lang="fr-FR" cap="all" dirty="0"/>
+          </a:p>
+        </p:txBody>
+      </p:sp>
+      <p:sp>
+        <p:nvSpPr>
+          <p:cNvPr id="59" name="Rectangle à coins arrondis 58"/>
+          <p:cNvSpPr/>
+          <p:nvPr/>
+        </p:nvSpPr>
+        <p:spPr>
+          <a:xfrm>
+            <a:off x="7870153" y="1299785"/>
+            <a:ext cx="1589361" cy="4277086"/>
+          </a:xfrm>
+          <a:prstGeom prst="roundRect">
+            <a:avLst/>
+          </a:prstGeom>
+        </p:spPr>
+        <p:style>
+          <a:lnRef idx="2">
+            <a:schemeClr val="accent1">
+              <a:shade val="50000"/>
+            </a:schemeClr>
+          </a:lnRef>
+          <a:fillRef idx="1">
+            <a:schemeClr val="accent1"/>
+          </a:fillRef>
+          <a:effectRef idx="0">
+            <a:schemeClr val="accent1"/>
+          </a:effectRef>
+          <a:fontRef idx="minor">
+            <a:schemeClr val="lt1"/>
+          </a:fontRef>
+        </p:style>
+        <p:txBody>
+          <a:bodyPr vert="horz" rtlCol="0" anchor="ctr" anchorCtr="1"/>
+          <a:lstStyle/>
+          <a:p>
+            <a:pPr algn="ctr"/>
+            <a:endParaRPr lang="fr-FR" dirty="0" smtClean="0"/>
+          </a:p>
+          <a:p>
+            <a:pPr algn="ctr"/>
+            <a:r>
+              <a:rPr lang="fr-FR" dirty="0" err="1" smtClean="0"/>
+              <a:t>SignalR</a:t>
+            </a:r>
+            <a:endParaRPr lang="fr-FR" dirty="0"/>
+          </a:p>
+        </p:txBody>
+      </p:sp>
+      <p:cxnSp>
+        <p:nvCxnSpPr>
+          <p:cNvPr id="60" name="Connecteur droit avec flèche 59"/>
+          <p:cNvCxnSpPr/>
+          <p:nvPr/>
+        </p:nvCxnSpPr>
+        <p:spPr>
+          <a:xfrm flipV="1">
+            <a:off x="2347486" y="1577801"/>
+            <a:ext cx="2016000" cy="2"/>
+          </a:xfrm>
+          <a:prstGeom prst="straightConnector1">
+            <a:avLst/>
+          </a:prstGeom>
+          <a:ln w="19050">
+            <a:solidFill>
+              <a:schemeClr val="accent6">
+                <a:lumMod val="75000"/>
+              </a:schemeClr>
+            </a:solidFill>
+            <a:tailEnd type="triangle"/>
+          </a:ln>
+        </p:spPr>
+        <p:style>
+          <a:lnRef idx="1">
+            <a:schemeClr val="accent1"/>
+          </a:lnRef>
+          <a:fillRef idx="0">
+            <a:schemeClr val="accent1"/>
+          </a:fillRef>
+          <a:effectRef idx="0">
+            <a:schemeClr val="accent1"/>
+          </a:effectRef>
+          <a:fontRef idx="minor">
+            <a:schemeClr val="tx1"/>
+          </a:fontRef>
+        </p:style>
+      </p:cxnSp>
+      <p:cxnSp>
+        <p:nvCxnSpPr>
+          <p:cNvPr id="61" name="Connecteur droit avec flèche 60"/>
+          <p:cNvCxnSpPr/>
+          <p:nvPr/>
+        </p:nvCxnSpPr>
+        <p:spPr>
+          <a:xfrm flipV="1">
+            <a:off x="5615547" y="1572940"/>
+            <a:ext cx="2304220" cy="4861"/>
+          </a:xfrm>
+          <a:prstGeom prst="straightConnector1">
+            <a:avLst/>
+          </a:prstGeom>
+          <a:ln w="19050">
+            <a:solidFill>
+              <a:schemeClr val="accent6">
+                <a:lumMod val="75000"/>
+              </a:schemeClr>
+            </a:solidFill>
+            <a:tailEnd type="triangle"/>
+          </a:ln>
+        </p:spPr>
+        <p:style>
+          <a:lnRef idx="1">
+            <a:schemeClr val="accent1"/>
+          </a:lnRef>
+          <a:fillRef idx="0">
+            <a:schemeClr val="accent1"/>
+          </a:fillRef>
+          <a:effectRef idx="0">
+            <a:schemeClr val="accent1"/>
+          </a:effectRef>
+          <a:fontRef idx="minor">
+            <a:schemeClr val="tx1"/>
+          </a:fontRef>
+        </p:style>
+      </p:cxnSp>
+      <p:sp>
+        <p:nvSpPr>
+          <p:cNvPr id="62" name="ZoneTexte 61"/>
+          <p:cNvSpPr txBox="1"/>
+          <p:nvPr/>
+        </p:nvSpPr>
+        <p:spPr>
+          <a:xfrm>
+            <a:off x="2175555" y="1310372"/>
+            <a:ext cx="2437206" cy="307777"/>
+          </a:xfrm>
+          <a:prstGeom prst="rect">
+            <a:avLst/>
+          </a:prstGeom>
+          <a:noFill/>
+        </p:spPr>
+        <p:txBody>
+          <a:bodyPr wrap="none" rtlCol="0" anchor="ctr" anchorCtr="1">
+            <a:spAutoFit/>
+          </a:bodyPr>
+          <a:lstStyle/>
+          <a:p>
+            <a:r>
+              <a:rPr lang="fr-FR" sz="1400" dirty="0" smtClean="0"/>
+              <a:t>POST "url.com/</a:t>
+            </a:r>
+            <a:r>
+              <a:rPr lang="fr-FR" sz="1400" dirty="0" err="1" smtClean="0"/>
+              <a:t>pseudo?p</a:t>
+            </a:r>
+            <a:r>
+              <a:rPr lang="fr-FR" sz="1400" dirty="0" smtClean="0"/>
+              <a:t>=</a:t>
+            </a:r>
+            <a:r>
+              <a:rPr lang="fr-FR" sz="1400" dirty="0" err="1" smtClean="0"/>
+              <a:t>psd</a:t>
+            </a:r>
+            <a:r>
+              <a:rPr lang="fr-FR" sz="1400" dirty="0" smtClean="0"/>
+              <a:t>"</a:t>
+            </a:r>
+            <a:endParaRPr lang="fr-FR" sz="1400" dirty="0"/>
+          </a:p>
+        </p:txBody>
+      </p:sp>
+      <p:cxnSp>
+        <p:nvCxnSpPr>
+          <p:cNvPr id="63" name="Connecteur droit avec flèche 62"/>
+          <p:cNvCxnSpPr/>
+          <p:nvPr/>
+        </p:nvCxnSpPr>
+        <p:spPr>
+          <a:xfrm flipH="1" flipV="1">
+            <a:off x="5594031" y="1814475"/>
+            <a:ext cx="2284561" cy="996"/>
+          </a:xfrm>
+          <a:prstGeom prst="straightConnector1">
+            <a:avLst/>
+          </a:prstGeom>
+          <a:ln w="19050">
+            <a:solidFill>
+              <a:schemeClr val="accent6">
+                <a:lumMod val="75000"/>
+              </a:schemeClr>
+            </a:solidFill>
+            <a:tailEnd type="triangle"/>
+          </a:ln>
+        </p:spPr>
+        <p:style>
+          <a:lnRef idx="1">
+            <a:schemeClr val="accent1"/>
+          </a:lnRef>
+          <a:fillRef idx="0">
+            <a:schemeClr val="accent1"/>
+          </a:fillRef>
+          <a:effectRef idx="0">
+            <a:schemeClr val="accent1"/>
+          </a:effectRef>
+          <a:fontRef idx="minor">
+            <a:schemeClr val="tx1"/>
+          </a:fontRef>
+        </p:style>
+      </p:cxnSp>
+      <p:cxnSp>
+        <p:nvCxnSpPr>
+          <p:cNvPr id="64" name="Connecteur droit avec flèche 63"/>
+          <p:cNvCxnSpPr/>
+          <p:nvPr/>
+        </p:nvCxnSpPr>
+        <p:spPr>
+          <a:xfrm flipH="1">
+            <a:off x="2325970" y="1814474"/>
+            <a:ext cx="2016000" cy="0"/>
+          </a:xfrm>
+          <a:prstGeom prst="straightConnector1">
+            <a:avLst/>
+          </a:prstGeom>
+          <a:ln w="19050">
+            <a:solidFill>
+              <a:schemeClr val="accent6">
+                <a:lumMod val="75000"/>
+              </a:schemeClr>
+            </a:solidFill>
+            <a:tailEnd type="triangle"/>
+          </a:ln>
+        </p:spPr>
+        <p:style>
+          <a:lnRef idx="1">
+            <a:schemeClr val="accent1"/>
+          </a:lnRef>
+          <a:fillRef idx="0">
+            <a:schemeClr val="accent1"/>
+          </a:fillRef>
+          <a:effectRef idx="0">
+            <a:schemeClr val="accent1"/>
+          </a:effectRef>
+          <a:fontRef idx="minor">
+            <a:schemeClr val="tx1"/>
+          </a:fontRef>
+        </p:style>
+      </p:cxnSp>
+      <p:sp>
+        <p:nvSpPr>
+          <p:cNvPr id="65" name="ZoneTexte 64"/>
+          <p:cNvSpPr txBox="1"/>
+          <p:nvPr/>
+        </p:nvSpPr>
+        <p:spPr>
+          <a:xfrm>
+            <a:off x="2896029" y="1852307"/>
+            <a:ext cx="882806" cy="307777"/>
+          </a:xfrm>
+          <a:prstGeom prst="rect">
+            <a:avLst/>
+          </a:prstGeom>
+          <a:noFill/>
+        </p:spPr>
+        <p:txBody>
+          <a:bodyPr wrap="none" rtlCol="0" anchor="ctr" anchorCtr="1">
+            <a:spAutoFit/>
+          </a:bodyPr>
+          <a:lstStyle/>
+          <a:p>
+            <a:r>
+              <a:rPr lang="fr-FR" sz="1400" dirty="0" smtClean="0"/>
+              <a:t>HTTP 200</a:t>
+            </a:r>
+            <a:endParaRPr lang="fr-FR" sz="1400" dirty="0"/>
+          </a:p>
+        </p:txBody>
+      </p:sp>
+      <p:sp>
+        <p:nvSpPr>
+          <p:cNvPr id="66" name="Rectangle à coins arrondis 65"/>
+          <p:cNvSpPr/>
+          <p:nvPr/>
+        </p:nvSpPr>
+        <p:spPr>
+          <a:xfrm>
+            <a:off x="6643127" y="4730167"/>
+            <a:ext cx="1072654" cy="579780"/>
+          </a:xfrm>
+          <a:prstGeom prst="roundRect">
+            <a:avLst/>
+          </a:prstGeom>
+        </p:spPr>
+        <p:style>
+          <a:lnRef idx="2">
+            <a:schemeClr val="accent1">
+              <a:shade val="50000"/>
+            </a:schemeClr>
+          </a:lnRef>
+          <a:fillRef idx="1">
+            <a:schemeClr val="accent1"/>
+          </a:fillRef>
+          <a:effectRef idx="0">
+            <a:schemeClr val="accent1"/>
+          </a:effectRef>
+          <a:fontRef idx="minor">
+            <a:schemeClr val="lt1"/>
+          </a:fontRef>
+        </p:style>
+        <p:txBody>
+          <a:bodyPr vert="horz" rtlCol="0" anchor="ctr" anchorCtr="1"/>
+          <a:lstStyle/>
+          <a:p>
+            <a:pPr algn="ctr"/>
+            <a:r>
+              <a:rPr lang="fr-FR" dirty="0" smtClean="0"/>
+              <a:t>Apache</a:t>
+            </a:r>
+            <a:endParaRPr lang="fr-FR" dirty="0"/>
+          </a:p>
+        </p:txBody>
+      </p:sp>
+      <p:cxnSp>
+        <p:nvCxnSpPr>
+          <p:cNvPr id="70" name="Connecteur droit avec flèche 69"/>
+          <p:cNvCxnSpPr/>
+          <p:nvPr/>
+        </p:nvCxnSpPr>
+        <p:spPr>
+          <a:xfrm flipV="1">
+            <a:off x="2336728" y="4892981"/>
+            <a:ext cx="2016000" cy="10545"/>
+          </a:xfrm>
+          <a:prstGeom prst="straightConnector1">
+            <a:avLst/>
+          </a:prstGeom>
+          <a:ln w="19050">
+            <a:solidFill>
+              <a:schemeClr val="accent2">
+                <a:lumMod val="75000"/>
+              </a:schemeClr>
+            </a:solidFill>
+            <a:tailEnd type="triangle"/>
+          </a:ln>
+        </p:spPr>
+        <p:style>
+          <a:lnRef idx="1">
+            <a:schemeClr val="accent1"/>
+          </a:lnRef>
+          <a:fillRef idx="0">
+            <a:schemeClr val="accent1"/>
+          </a:fillRef>
+          <a:effectRef idx="0">
+            <a:schemeClr val="accent1"/>
+          </a:effectRef>
+          <a:fontRef idx="minor">
+            <a:schemeClr val="tx1"/>
+          </a:fontRef>
+        </p:style>
+      </p:cxnSp>
+      <p:cxnSp>
+        <p:nvCxnSpPr>
+          <p:cNvPr id="71" name="Connecteur droit avec flèche 70"/>
+          <p:cNvCxnSpPr/>
+          <p:nvPr/>
+        </p:nvCxnSpPr>
+        <p:spPr>
+          <a:xfrm flipH="1">
+            <a:off x="2325970" y="5139200"/>
+            <a:ext cx="2016000" cy="13390"/>
+          </a:xfrm>
+          <a:prstGeom prst="straightConnector1">
+            <a:avLst/>
+          </a:prstGeom>
+          <a:ln w="19050">
+            <a:solidFill>
+              <a:schemeClr val="accent2">
+                <a:lumMod val="75000"/>
+              </a:schemeClr>
+            </a:solidFill>
+            <a:tailEnd type="triangle"/>
+          </a:ln>
+        </p:spPr>
+        <p:style>
+          <a:lnRef idx="1">
+            <a:schemeClr val="accent1"/>
+          </a:lnRef>
+          <a:fillRef idx="0">
+            <a:schemeClr val="accent1"/>
+          </a:fillRef>
+          <a:effectRef idx="0">
+            <a:schemeClr val="accent1"/>
+          </a:effectRef>
+          <a:fontRef idx="minor">
+            <a:schemeClr val="tx1"/>
+          </a:fontRef>
+        </p:style>
+      </p:cxnSp>
+      <p:sp>
+        <p:nvSpPr>
+          <p:cNvPr id="72" name="ZoneTexte 71"/>
+          <p:cNvSpPr txBox="1"/>
+          <p:nvPr/>
+        </p:nvSpPr>
+        <p:spPr>
+          <a:xfrm>
+            <a:off x="2856506" y="4556919"/>
+            <a:ext cx="898131" cy="307777"/>
+          </a:xfrm>
+          <a:prstGeom prst="rect">
+            <a:avLst/>
+          </a:prstGeom>
+          <a:noFill/>
+        </p:spPr>
+        <p:txBody>
+          <a:bodyPr wrap="none" rtlCol="0" anchor="ctr" anchorCtr="1">
+            <a:spAutoFit/>
+          </a:bodyPr>
+          <a:lstStyle/>
+          <a:p>
+            <a:r>
+              <a:rPr lang="fr-FR" sz="1400" dirty="0"/>
+              <a:t>url.com</a:t>
+            </a:r>
+            <a:r>
+              <a:rPr lang="fr-FR" sz="1400" dirty="0" smtClean="0"/>
+              <a:t>/*</a:t>
+            </a:r>
+            <a:endParaRPr lang="fr-FR" sz="1400" dirty="0"/>
+          </a:p>
+        </p:txBody>
+      </p:sp>
+      <p:sp>
+        <p:nvSpPr>
+          <p:cNvPr id="73" name="ZoneTexte 72"/>
+          <p:cNvSpPr txBox="1"/>
+          <p:nvPr/>
+        </p:nvSpPr>
+        <p:spPr>
+          <a:xfrm>
+            <a:off x="2269094" y="5185228"/>
+            <a:ext cx="2113856" cy="307777"/>
+          </a:xfrm>
+          <a:prstGeom prst="rect">
+            <a:avLst/>
+          </a:prstGeom>
+          <a:noFill/>
+        </p:spPr>
+        <p:txBody>
+          <a:bodyPr wrap="square" rtlCol="0" anchor="ctr" anchorCtr="1">
+            <a:spAutoFit/>
+          </a:bodyPr>
+          <a:lstStyle/>
+          <a:p>
+            <a:r>
+              <a:rPr lang="fr-FR" sz="1400" dirty="0" smtClean="0"/>
+              <a:t>[Résultat standard]</a:t>
+            </a:r>
+            <a:endParaRPr lang="fr-FR" sz="1400" dirty="0"/>
+          </a:p>
+        </p:txBody>
+      </p:sp>
+      <p:cxnSp>
+        <p:nvCxnSpPr>
+          <p:cNvPr id="74" name="Connecteur droit avec flèche 73"/>
+          <p:cNvCxnSpPr/>
+          <p:nvPr/>
+        </p:nvCxnSpPr>
+        <p:spPr>
+          <a:xfrm flipV="1">
+            <a:off x="5617020" y="4885120"/>
+            <a:ext cx="1026107" cy="5014"/>
+          </a:xfrm>
+          <a:prstGeom prst="straightConnector1">
+            <a:avLst/>
+          </a:prstGeom>
+          <a:ln w="19050">
+            <a:solidFill>
+              <a:schemeClr val="accent2">
+                <a:lumMod val="75000"/>
+              </a:schemeClr>
+            </a:solidFill>
+            <a:tailEnd type="triangle"/>
+          </a:ln>
+        </p:spPr>
+        <p:style>
+          <a:lnRef idx="1">
+            <a:schemeClr val="accent1"/>
+          </a:lnRef>
+          <a:fillRef idx="0">
+            <a:schemeClr val="accent1"/>
+          </a:fillRef>
+          <a:effectRef idx="0">
+            <a:schemeClr val="accent1"/>
+          </a:effectRef>
+          <a:fontRef idx="minor">
+            <a:schemeClr val="tx1"/>
+          </a:fontRef>
+        </p:style>
+      </p:cxnSp>
+      <p:cxnSp>
+        <p:nvCxnSpPr>
+          <p:cNvPr id="75" name="Connecteur droit avec flèche 74"/>
+          <p:cNvCxnSpPr/>
+          <p:nvPr/>
+        </p:nvCxnSpPr>
+        <p:spPr>
+          <a:xfrm flipH="1">
+            <a:off x="5594031" y="5127277"/>
+            <a:ext cx="1030752" cy="1108"/>
+          </a:xfrm>
+          <a:prstGeom prst="straightConnector1">
+            <a:avLst/>
+          </a:prstGeom>
+          <a:ln w="19050">
+            <a:solidFill>
+              <a:schemeClr val="accent2">
+                <a:lumMod val="75000"/>
+              </a:schemeClr>
+            </a:solidFill>
+            <a:tailEnd type="triangle"/>
+          </a:ln>
+        </p:spPr>
+        <p:style>
+          <a:lnRef idx="1">
+            <a:schemeClr val="accent1"/>
+          </a:lnRef>
+          <a:fillRef idx="0">
+            <a:schemeClr val="accent1"/>
+          </a:fillRef>
+          <a:effectRef idx="0">
+            <a:schemeClr val="accent1"/>
+          </a:effectRef>
+          <a:fontRef idx="minor">
+            <a:schemeClr val="tx1"/>
+          </a:fontRef>
+        </p:style>
+      </p:cxnSp>
+      <p:sp>
+        <p:nvSpPr>
+          <p:cNvPr id="91" name="ZoneTexte 90"/>
+          <p:cNvSpPr txBox="1"/>
+          <p:nvPr/>
+        </p:nvSpPr>
+        <p:spPr>
+          <a:xfrm>
+            <a:off x="5691377" y="4590476"/>
+            <a:ext cx="927754" cy="307777"/>
+          </a:xfrm>
+          <a:prstGeom prst="rect">
+            <a:avLst/>
+          </a:prstGeom>
+          <a:noFill/>
+        </p:spPr>
+        <p:txBody>
+          <a:bodyPr wrap="none" rtlCol="0">
+            <a:spAutoFit/>
+          </a:bodyPr>
+          <a:lstStyle/>
+          <a:p>
+            <a:r>
+              <a:rPr lang="fr-FR" sz="1400" dirty="0" smtClean="0"/>
+              <a:t>Passe-plat</a:t>
+            </a:r>
+            <a:endParaRPr lang="fr-FR" sz="1400" dirty="0"/>
+          </a:p>
+        </p:txBody>
+      </p:sp>
+      <p:sp>
+        <p:nvSpPr>
+          <p:cNvPr id="37" name="Rectangle à coins arrondis 36"/>
+          <p:cNvSpPr/>
+          <p:nvPr/>
+        </p:nvSpPr>
+        <p:spPr>
+          <a:xfrm>
+            <a:off x="10621578" y="1397269"/>
+            <a:ext cx="1072654" cy="579780"/>
+          </a:xfrm>
+          <a:prstGeom prst="roundRect">
+            <a:avLst/>
+          </a:prstGeom>
+        </p:spPr>
+        <p:style>
+          <a:lnRef idx="2">
+            <a:schemeClr val="accent1">
+              <a:shade val="50000"/>
+            </a:schemeClr>
+          </a:lnRef>
+          <a:fillRef idx="1">
+            <a:schemeClr val="accent1"/>
+          </a:fillRef>
+          <a:effectRef idx="0">
+            <a:schemeClr val="accent1"/>
+          </a:effectRef>
+          <a:fontRef idx="minor">
+            <a:schemeClr val="lt1"/>
+          </a:fontRef>
+        </p:style>
+        <p:txBody>
+          <a:bodyPr vert="horz" rtlCol="0" anchor="ctr" anchorCtr="1"/>
+          <a:lstStyle/>
+          <a:p>
+            <a:pPr algn="ctr"/>
+            <a:r>
+              <a:rPr lang="fr-FR" dirty="0" smtClean="0"/>
+              <a:t>API</a:t>
+            </a:r>
+            <a:endParaRPr lang="fr-FR" dirty="0"/>
+          </a:p>
+        </p:txBody>
+      </p:sp>
+      <p:cxnSp>
+        <p:nvCxnSpPr>
+          <p:cNvPr id="38" name="Connecteur droit avec flèche 37"/>
+          <p:cNvCxnSpPr/>
+          <p:nvPr/>
+        </p:nvCxnSpPr>
+        <p:spPr>
+          <a:xfrm>
+            <a:off x="9494884" y="1561206"/>
+            <a:ext cx="1122446" cy="997"/>
+          </a:xfrm>
+          <a:prstGeom prst="straightConnector1">
+            <a:avLst/>
+          </a:prstGeom>
+          <a:ln w="19050">
+            <a:solidFill>
+              <a:schemeClr val="accent6">
+                <a:lumMod val="75000"/>
+              </a:schemeClr>
+            </a:solidFill>
+            <a:tailEnd type="triangle"/>
+          </a:ln>
+        </p:spPr>
+        <p:style>
+          <a:lnRef idx="1">
+            <a:schemeClr val="accent1"/>
+          </a:lnRef>
+          <a:fillRef idx="0">
+            <a:schemeClr val="accent1"/>
+          </a:fillRef>
+          <a:effectRef idx="0">
+            <a:schemeClr val="accent1"/>
+          </a:effectRef>
+          <a:fontRef idx="minor">
+            <a:schemeClr val="tx1"/>
+          </a:fontRef>
+        </p:style>
+      </p:cxnSp>
+      <p:cxnSp>
+        <p:nvCxnSpPr>
+          <p:cNvPr id="39" name="Connecteur droit avec flèche 38"/>
+          <p:cNvCxnSpPr/>
+          <p:nvPr/>
+        </p:nvCxnSpPr>
+        <p:spPr>
+          <a:xfrm flipH="1" flipV="1">
+            <a:off x="9493000" y="1824983"/>
+            <a:ext cx="1122446" cy="997"/>
+          </a:xfrm>
+          <a:prstGeom prst="straightConnector1">
+            <a:avLst/>
+          </a:prstGeom>
+          <a:ln w="19050">
+            <a:solidFill>
+              <a:schemeClr val="accent6">
+                <a:lumMod val="75000"/>
+              </a:schemeClr>
+            </a:solidFill>
+            <a:tailEnd type="triangle"/>
+          </a:ln>
+        </p:spPr>
+        <p:style>
+          <a:lnRef idx="1">
+            <a:schemeClr val="accent1"/>
+          </a:lnRef>
+          <a:fillRef idx="0">
+            <a:schemeClr val="accent1"/>
+          </a:fillRef>
+          <a:effectRef idx="0">
+            <a:schemeClr val="accent1"/>
+          </a:effectRef>
+          <a:fontRef idx="minor">
+            <a:schemeClr val="tx1"/>
+          </a:fontRef>
+        </p:style>
+      </p:cxnSp>
+      <p:sp>
+        <p:nvSpPr>
+          <p:cNvPr id="40" name="ZoneTexte 39"/>
+          <p:cNvSpPr txBox="1"/>
+          <p:nvPr/>
+        </p:nvSpPr>
+        <p:spPr>
+          <a:xfrm>
+            <a:off x="9541122" y="1244720"/>
+            <a:ext cx="1071960" cy="307777"/>
+          </a:xfrm>
+          <a:prstGeom prst="rect">
+            <a:avLst/>
+          </a:prstGeom>
+          <a:noFill/>
+        </p:spPr>
+        <p:txBody>
+          <a:bodyPr wrap="none" rtlCol="0">
+            <a:spAutoFit/>
+          </a:bodyPr>
+          <a:lstStyle/>
+          <a:p>
+            <a:r>
+              <a:rPr lang="fr-FR" sz="1400" dirty="0" smtClean="0"/>
+              <a:t>Appel direct</a:t>
+            </a:r>
+            <a:endParaRPr lang="fr-FR" sz="1400" dirty="0"/>
+          </a:p>
+        </p:txBody>
+      </p:sp>
+      <p:sp>
+        <p:nvSpPr>
+          <p:cNvPr id="41" name="ZoneTexte 40"/>
+          <p:cNvSpPr txBox="1"/>
+          <p:nvPr/>
+        </p:nvSpPr>
+        <p:spPr>
+          <a:xfrm>
+            <a:off x="9504495" y="1816274"/>
+            <a:ext cx="1092607" cy="523220"/>
+          </a:xfrm>
+          <a:prstGeom prst="rect">
+            <a:avLst/>
+          </a:prstGeom>
+          <a:noFill/>
+        </p:spPr>
+        <p:txBody>
+          <a:bodyPr wrap="none" rtlCol="0">
+            <a:spAutoFit/>
+          </a:bodyPr>
+          <a:lstStyle/>
+          <a:p>
+            <a:pPr algn="ctr"/>
+            <a:r>
+              <a:rPr lang="fr-FR" sz="1400" dirty="0" smtClean="0"/>
+              <a:t>Résultat</a:t>
+            </a:r>
+          </a:p>
+          <a:p>
+            <a:pPr algn="ctr"/>
+            <a:r>
+              <a:rPr lang="fr-FR" sz="1400" dirty="0" smtClean="0"/>
+              <a:t>non formaté</a:t>
+            </a:r>
+            <a:endParaRPr lang="fr-FR" sz="1400" dirty="0"/>
+          </a:p>
+        </p:txBody>
+      </p:sp>
+      <p:cxnSp>
+        <p:nvCxnSpPr>
+          <p:cNvPr id="42" name="Connecteur droit avec flèche 41"/>
+          <p:cNvCxnSpPr/>
+          <p:nvPr/>
+        </p:nvCxnSpPr>
+        <p:spPr>
+          <a:xfrm flipV="1">
+            <a:off x="2354409" y="2785218"/>
+            <a:ext cx="2016000" cy="10545"/>
+          </a:xfrm>
+          <a:prstGeom prst="straightConnector1">
+            <a:avLst/>
+          </a:prstGeom>
+          <a:ln w="19050">
+            <a:solidFill>
+              <a:srgbClr val="894590"/>
+            </a:solidFill>
+            <a:tailEnd type="triangle"/>
+          </a:ln>
+        </p:spPr>
+        <p:style>
+          <a:lnRef idx="1">
+            <a:schemeClr val="accent1"/>
+          </a:lnRef>
+          <a:fillRef idx="0">
+            <a:schemeClr val="accent1"/>
+          </a:fillRef>
+          <a:effectRef idx="0">
+            <a:schemeClr val="accent1"/>
+          </a:effectRef>
+          <a:fontRef idx="minor">
+            <a:schemeClr val="tx1"/>
+          </a:fontRef>
+        </p:style>
+      </p:cxnSp>
+      <p:cxnSp>
+        <p:nvCxnSpPr>
+          <p:cNvPr id="43" name="Connecteur droit avec flèche 42"/>
+          <p:cNvCxnSpPr/>
+          <p:nvPr/>
+        </p:nvCxnSpPr>
+        <p:spPr>
+          <a:xfrm flipH="1">
+            <a:off x="2343651" y="3031437"/>
+            <a:ext cx="2016000" cy="13390"/>
+          </a:xfrm>
+          <a:prstGeom prst="straightConnector1">
+            <a:avLst/>
+          </a:prstGeom>
+          <a:ln w="19050">
+            <a:solidFill>
+              <a:srgbClr val="894590"/>
+            </a:solidFill>
+            <a:tailEnd type="triangle"/>
+          </a:ln>
+        </p:spPr>
+        <p:style>
+          <a:lnRef idx="1">
+            <a:schemeClr val="accent1"/>
+          </a:lnRef>
+          <a:fillRef idx="0">
+            <a:schemeClr val="accent1"/>
+          </a:fillRef>
+          <a:effectRef idx="0">
+            <a:schemeClr val="accent1"/>
+          </a:effectRef>
+          <a:fontRef idx="minor">
+            <a:schemeClr val="tx1"/>
+          </a:fontRef>
+        </p:style>
+      </p:cxnSp>
+      <p:sp>
+        <p:nvSpPr>
+          <p:cNvPr id="44" name="ZoneTexte 43"/>
+          <p:cNvSpPr txBox="1"/>
+          <p:nvPr/>
+        </p:nvSpPr>
+        <p:spPr>
+          <a:xfrm>
+            <a:off x="2321917" y="2449156"/>
+            <a:ext cx="1959254" cy="307777"/>
+          </a:xfrm>
+          <a:prstGeom prst="rect">
+            <a:avLst/>
+          </a:prstGeom>
+          <a:noFill/>
+        </p:spPr>
+        <p:txBody>
+          <a:bodyPr wrap="none" rtlCol="0" anchor="ctr" anchorCtr="1">
+            <a:spAutoFit/>
+          </a:bodyPr>
+          <a:lstStyle/>
+          <a:p>
+            <a:r>
+              <a:rPr lang="fr-FR" sz="1400" dirty="0" smtClean="0"/>
+              <a:t>GET url.com/</a:t>
+            </a:r>
+            <a:r>
+              <a:rPr lang="fr-FR" sz="1400" dirty="0" err="1" smtClean="0"/>
+              <a:t>epicUrlOne</a:t>
+            </a:r>
+            <a:endParaRPr lang="fr-FR" sz="1400" dirty="0"/>
+          </a:p>
+        </p:txBody>
+      </p:sp>
+      <p:sp>
+        <p:nvSpPr>
+          <p:cNvPr id="45" name="ZoneTexte 44"/>
+          <p:cNvSpPr txBox="1"/>
+          <p:nvPr/>
+        </p:nvSpPr>
+        <p:spPr>
+          <a:xfrm>
+            <a:off x="2286775" y="3077465"/>
+            <a:ext cx="2113856" cy="307777"/>
+          </a:xfrm>
+          <a:prstGeom prst="rect">
+            <a:avLst/>
+          </a:prstGeom>
+          <a:noFill/>
+        </p:spPr>
+        <p:txBody>
+          <a:bodyPr wrap="square" rtlCol="0" anchor="ctr" anchorCtr="1">
+            <a:spAutoFit/>
+          </a:bodyPr>
+          <a:lstStyle/>
+          <a:p>
+            <a:r>
+              <a:rPr lang="fr-FR" sz="1400" dirty="0"/>
+              <a:t>{"</a:t>
+            </a:r>
+            <a:r>
+              <a:rPr lang="fr-FR" sz="1400" dirty="0" err="1" smtClean="0"/>
+              <a:t>epicResultOne</a:t>
+            </a:r>
+            <a:r>
+              <a:rPr lang="fr-FR" sz="1400" dirty="0" smtClean="0"/>
+              <a:t>": "WTF"}</a:t>
+            </a:r>
+            <a:endParaRPr lang="fr-FR" sz="1400" dirty="0"/>
+          </a:p>
+        </p:txBody>
+      </p:sp>
+      <p:cxnSp>
+        <p:nvCxnSpPr>
+          <p:cNvPr id="46" name="Connecteur droit avec flèche 45"/>
+          <p:cNvCxnSpPr/>
+          <p:nvPr/>
+        </p:nvCxnSpPr>
+        <p:spPr>
+          <a:xfrm>
+            <a:off x="5625569" y="2794265"/>
+            <a:ext cx="2242636" cy="5059"/>
+          </a:xfrm>
+          <a:prstGeom prst="straightConnector1">
+            <a:avLst/>
+          </a:prstGeom>
+          <a:ln w="19050">
+            <a:solidFill>
+              <a:srgbClr val="894590"/>
+            </a:solidFill>
+            <a:tailEnd type="triangle"/>
+          </a:ln>
+        </p:spPr>
+        <p:style>
+          <a:lnRef idx="1">
+            <a:schemeClr val="accent1"/>
+          </a:lnRef>
+          <a:fillRef idx="0">
+            <a:schemeClr val="accent1"/>
+          </a:fillRef>
+          <a:effectRef idx="0">
+            <a:schemeClr val="accent1"/>
+          </a:effectRef>
+          <a:fontRef idx="minor">
+            <a:schemeClr val="tx1"/>
+          </a:fontRef>
+        </p:style>
+      </p:cxnSp>
+      <p:cxnSp>
+        <p:nvCxnSpPr>
+          <p:cNvPr id="47" name="Connecteur droit avec flèche 46"/>
+          <p:cNvCxnSpPr/>
+          <p:nvPr/>
+        </p:nvCxnSpPr>
+        <p:spPr>
+          <a:xfrm flipH="1">
+            <a:off x="5604053" y="3029520"/>
+            <a:ext cx="2232614" cy="1419"/>
+          </a:xfrm>
+          <a:prstGeom prst="straightConnector1">
+            <a:avLst/>
+          </a:prstGeom>
+          <a:ln w="19050">
+            <a:solidFill>
+              <a:srgbClr val="894590"/>
+            </a:solidFill>
+            <a:tailEnd type="triangle"/>
+          </a:ln>
+        </p:spPr>
+        <p:style>
+          <a:lnRef idx="1">
+            <a:schemeClr val="accent1"/>
+          </a:lnRef>
+          <a:fillRef idx="0">
+            <a:schemeClr val="accent1"/>
+          </a:fillRef>
+          <a:effectRef idx="0">
+            <a:schemeClr val="accent1"/>
+          </a:effectRef>
+          <a:fontRef idx="minor">
+            <a:schemeClr val="tx1"/>
+          </a:fontRef>
+        </p:style>
+      </p:cxnSp>
+      <p:sp>
+        <p:nvSpPr>
+          <p:cNvPr id="48" name="Rectangle à coins arrondis 47"/>
+          <p:cNvSpPr/>
+          <p:nvPr/>
+        </p:nvSpPr>
+        <p:spPr>
+          <a:xfrm>
+            <a:off x="10621578" y="2601705"/>
+            <a:ext cx="1072654" cy="579780"/>
+          </a:xfrm>
+          <a:prstGeom prst="roundRect">
+            <a:avLst/>
+          </a:prstGeom>
+        </p:spPr>
+        <p:style>
+          <a:lnRef idx="2">
+            <a:schemeClr val="accent1">
+              <a:shade val="50000"/>
+            </a:schemeClr>
+          </a:lnRef>
+          <a:fillRef idx="1">
+            <a:schemeClr val="accent1"/>
+          </a:fillRef>
+          <a:effectRef idx="0">
+            <a:schemeClr val="accent1"/>
+          </a:effectRef>
+          <a:fontRef idx="minor">
+            <a:schemeClr val="lt1"/>
+          </a:fontRef>
+        </p:style>
+        <p:txBody>
+          <a:bodyPr vert="horz" rtlCol="0" anchor="ctr" anchorCtr="1"/>
+          <a:lstStyle/>
+          <a:p>
+            <a:pPr algn="ctr"/>
+            <a:r>
+              <a:rPr lang="fr-FR" dirty="0" smtClean="0"/>
+              <a:t>API</a:t>
+            </a:r>
+            <a:endParaRPr lang="fr-FR" dirty="0"/>
+          </a:p>
+        </p:txBody>
+      </p:sp>
+      <p:cxnSp>
+        <p:nvCxnSpPr>
+          <p:cNvPr id="49" name="Connecteur droit avec flèche 48"/>
+          <p:cNvCxnSpPr/>
+          <p:nvPr/>
+        </p:nvCxnSpPr>
+        <p:spPr>
+          <a:xfrm>
+            <a:off x="9494884" y="2765642"/>
+            <a:ext cx="1122446" cy="997"/>
+          </a:xfrm>
+          <a:prstGeom prst="straightConnector1">
+            <a:avLst/>
+          </a:prstGeom>
+          <a:ln w="19050">
+            <a:solidFill>
+              <a:srgbClr val="894590"/>
+            </a:solidFill>
+            <a:tailEnd type="triangle"/>
+          </a:ln>
+        </p:spPr>
+        <p:style>
+          <a:lnRef idx="1">
+            <a:schemeClr val="accent1"/>
+          </a:lnRef>
+          <a:fillRef idx="0">
+            <a:schemeClr val="accent1"/>
+          </a:fillRef>
+          <a:effectRef idx="0">
+            <a:schemeClr val="accent1"/>
+          </a:effectRef>
+          <a:fontRef idx="minor">
+            <a:schemeClr val="tx1"/>
+          </a:fontRef>
+        </p:style>
+      </p:cxnSp>
+      <p:cxnSp>
+        <p:nvCxnSpPr>
+          <p:cNvPr id="50" name="Connecteur droit avec flèche 49"/>
+          <p:cNvCxnSpPr/>
+          <p:nvPr/>
+        </p:nvCxnSpPr>
+        <p:spPr>
+          <a:xfrm flipH="1" flipV="1">
+            <a:off x="9493000" y="3029419"/>
+            <a:ext cx="1122446" cy="997"/>
+          </a:xfrm>
+          <a:prstGeom prst="straightConnector1">
+            <a:avLst/>
+          </a:prstGeom>
+          <a:ln w="19050">
+            <a:solidFill>
+              <a:srgbClr val="894590"/>
+            </a:solidFill>
+            <a:tailEnd type="triangle"/>
+          </a:ln>
+        </p:spPr>
+        <p:style>
+          <a:lnRef idx="1">
+            <a:schemeClr val="accent1"/>
+          </a:lnRef>
+          <a:fillRef idx="0">
+            <a:schemeClr val="accent1"/>
+          </a:fillRef>
+          <a:effectRef idx="0">
+            <a:schemeClr val="accent1"/>
+          </a:effectRef>
+          <a:fontRef idx="minor">
+            <a:schemeClr val="tx1"/>
+          </a:fontRef>
+        </p:style>
+      </p:cxnSp>
+      <p:sp>
+        <p:nvSpPr>
+          <p:cNvPr id="51" name="ZoneTexte 50"/>
+          <p:cNvSpPr txBox="1"/>
+          <p:nvPr/>
+        </p:nvSpPr>
+        <p:spPr>
+          <a:xfrm>
+            <a:off x="9541122" y="2449156"/>
+            <a:ext cx="1071960" cy="307777"/>
+          </a:xfrm>
+          <a:prstGeom prst="rect">
+            <a:avLst/>
+          </a:prstGeom>
+          <a:noFill/>
+        </p:spPr>
+        <p:txBody>
+          <a:bodyPr wrap="none" rtlCol="0">
+            <a:spAutoFit/>
+          </a:bodyPr>
+          <a:lstStyle/>
+          <a:p>
+            <a:r>
+              <a:rPr lang="fr-FR" sz="1400" dirty="0" smtClean="0"/>
+              <a:t>Appel direct</a:t>
+            </a:r>
+            <a:endParaRPr lang="fr-FR" sz="1400" dirty="0"/>
+          </a:p>
+        </p:txBody>
+      </p:sp>
+      <p:sp>
+        <p:nvSpPr>
+          <p:cNvPr id="52" name="ZoneTexte 51"/>
+          <p:cNvSpPr txBox="1"/>
+          <p:nvPr/>
+        </p:nvSpPr>
+        <p:spPr>
+          <a:xfrm>
+            <a:off x="6082097" y="3064880"/>
+            <a:ext cx="1225144" cy="523220"/>
+          </a:xfrm>
+          <a:prstGeom prst="rect">
+            <a:avLst/>
+          </a:prstGeom>
+          <a:noFill/>
+        </p:spPr>
+        <p:txBody>
+          <a:bodyPr wrap="none" rtlCol="0">
+            <a:spAutoFit/>
+          </a:bodyPr>
+          <a:lstStyle/>
+          <a:p>
+            <a:pPr algn="ctr"/>
+            <a:r>
+              <a:rPr lang="fr-FR" sz="1400" dirty="0" smtClean="0"/>
+              <a:t>Formatage</a:t>
+            </a:r>
+          </a:p>
+          <a:p>
+            <a:pPr algn="ctr"/>
+            <a:r>
+              <a:rPr lang="fr-FR" sz="1400" dirty="0" smtClean="0"/>
+              <a:t>Mise en cache</a:t>
+            </a:r>
+            <a:endParaRPr lang="fr-FR" sz="1400" dirty="0"/>
+          </a:p>
+        </p:txBody>
+      </p:sp>
+      <p:sp>
+        <p:nvSpPr>
+          <p:cNvPr id="53" name="ZoneTexte 52"/>
+          <p:cNvSpPr txBox="1"/>
+          <p:nvPr/>
+        </p:nvSpPr>
+        <p:spPr>
+          <a:xfrm>
+            <a:off x="9504495" y="3020710"/>
+            <a:ext cx="1092607" cy="523220"/>
+          </a:xfrm>
+          <a:prstGeom prst="rect">
+            <a:avLst/>
+          </a:prstGeom>
+          <a:noFill/>
+        </p:spPr>
+        <p:txBody>
+          <a:bodyPr wrap="none" rtlCol="0">
+            <a:spAutoFit/>
+          </a:bodyPr>
+          <a:lstStyle/>
+          <a:p>
+            <a:pPr algn="ctr"/>
+            <a:r>
+              <a:rPr lang="fr-FR" sz="1400" dirty="0" smtClean="0"/>
+              <a:t>Résultat</a:t>
+            </a:r>
+          </a:p>
+          <a:p>
+            <a:pPr algn="ctr"/>
+            <a:r>
+              <a:rPr lang="fr-FR" sz="1400" dirty="0" smtClean="0"/>
+              <a:t>non formaté</a:t>
+            </a:r>
+            <a:endParaRPr lang="fr-FR" sz="1400" dirty="0"/>
+          </a:p>
+        </p:txBody>
+      </p:sp>
+      <p:cxnSp>
+        <p:nvCxnSpPr>
+          <p:cNvPr id="54" name="Connecteur droit avec flèche 53"/>
+          <p:cNvCxnSpPr/>
+          <p:nvPr/>
+        </p:nvCxnSpPr>
+        <p:spPr>
+          <a:xfrm flipV="1">
+            <a:off x="2356197" y="3862775"/>
+            <a:ext cx="2016000" cy="10545"/>
+          </a:xfrm>
+          <a:prstGeom prst="straightConnector1">
+            <a:avLst/>
+          </a:prstGeom>
+          <a:ln w="19050">
+            <a:solidFill>
+              <a:schemeClr val="accent4">
+                <a:lumMod val="75000"/>
+              </a:schemeClr>
+            </a:solidFill>
+            <a:tailEnd type="triangle"/>
+          </a:ln>
+        </p:spPr>
+        <p:style>
+          <a:lnRef idx="1">
+            <a:schemeClr val="accent1"/>
+          </a:lnRef>
+          <a:fillRef idx="0">
+            <a:schemeClr val="accent1"/>
+          </a:fillRef>
+          <a:effectRef idx="0">
+            <a:schemeClr val="accent1"/>
+          </a:effectRef>
+          <a:fontRef idx="minor">
+            <a:schemeClr val="tx1"/>
+          </a:fontRef>
+        </p:style>
+      </p:cxnSp>
+      <p:cxnSp>
+        <p:nvCxnSpPr>
+          <p:cNvPr id="55" name="Connecteur droit avec flèche 54"/>
+          <p:cNvCxnSpPr/>
+          <p:nvPr/>
+        </p:nvCxnSpPr>
+        <p:spPr>
+          <a:xfrm flipH="1">
+            <a:off x="2345439" y="4108994"/>
+            <a:ext cx="2016000" cy="13390"/>
+          </a:xfrm>
+          <a:prstGeom prst="straightConnector1">
+            <a:avLst/>
+          </a:prstGeom>
+          <a:ln w="19050">
+            <a:solidFill>
+              <a:schemeClr val="accent4">
+                <a:lumMod val="75000"/>
+              </a:schemeClr>
+            </a:solidFill>
+            <a:tailEnd type="triangle"/>
+          </a:ln>
+        </p:spPr>
+        <p:style>
+          <a:lnRef idx="1">
+            <a:schemeClr val="accent1"/>
+          </a:lnRef>
+          <a:fillRef idx="0">
+            <a:schemeClr val="accent1"/>
+          </a:fillRef>
+          <a:effectRef idx="0">
+            <a:schemeClr val="accent1"/>
+          </a:effectRef>
+          <a:fontRef idx="minor">
+            <a:schemeClr val="tx1"/>
+          </a:fontRef>
+        </p:style>
+      </p:cxnSp>
+      <p:sp>
+        <p:nvSpPr>
+          <p:cNvPr id="56" name="ZoneTexte 55"/>
+          <p:cNvSpPr txBox="1"/>
+          <p:nvPr/>
+        </p:nvSpPr>
+        <p:spPr>
+          <a:xfrm>
+            <a:off x="2323705" y="3526713"/>
+            <a:ext cx="1958037" cy="307777"/>
+          </a:xfrm>
+          <a:prstGeom prst="rect">
+            <a:avLst/>
+          </a:prstGeom>
+          <a:noFill/>
+        </p:spPr>
+        <p:txBody>
+          <a:bodyPr wrap="none" rtlCol="0" anchor="ctr" anchorCtr="1">
+            <a:spAutoFit/>
+          </a:bodyPr>
+          <a:lstStyle/>
+          <a:p>
+            <a:r>
+              <a:rPr lang="fr-FR" sz="1400" dirty="0" smtClean="0"/>
+              <a:t>GET url.com/</a:t>
+            </a:r>
+            <a:r>
+              <a:rPr lang="fr-FR" sz="1400" dirty="0" err="1" smtClean="0"/>
+              <a:t>epicUrlTwo</a:t>
+            </a:r>
+            <a:endParaRPr lang="fr-FR" sz="1400" dirty="0"/>
+          </a:p>
+        </p:txBody>
+      </p:sp>
+      <p:sp>
+        <p:nvSpPr>
+          <p:cNvPr id="78" name="ZoneTexte 77"/>
+          <p:cNvSpPr txBox="1"/>
+          <p:nvPr/>
+        </p:nvSpPr>
+        <p:spPr>
+          <a:xfrm>
+            <a:off x="2202499" y="4155022"/>
+            <a:ext cx="2281256" cy="307777"/>
+          </a:xfrm>
+          <a:prstGeom prst="rect">
+            <a:avLst/>
+          </a:prstGeom>
+          <a:noFill/>
+        </p:spPr>
+        <p:txBody>
+          <a:bodyPr wrap="square" rtlCol="0" anchor="ctr" anchorCtr="1">
+            <a:spAutoFit/>
+          </a:bodyPr>
+          <a:lstStyle/>
+          <a:p>
+            <a:r>
+              <a:rPr lang="fr-FR" sz="1400" dirty="0"/>
+              <a:t>{"</a:t>
+            </a:r>
+            <a:r>
+              <a:rPr lang="fr-FR" sz="1400" dirty="0" err="1" smtClean="0"/>
+              <a:t>epicResultTwo</a:t>
+            </a:r>
+            <a:r>
+              <a:rPr lang="fr-FR" sz="1400" dirty="0" smtClean="0"/>
+              <a:t>": "</a:t>
+            </a:r>
+            <a:r>
+              <a:rPr lang="fr-FR" sz="1400" dirty="0" err="1" smtClean="0"/>
+              <a:t>SoFast</a:t>
+            </a:r>
+            <a:r>
+              <a:rPr lang="fr-FR" sz="1400" dirty="0" smtClean="0"/>
+              <a:t>"}</a:t>
+            </a:r>
+            <a:endParaRPr lang="fr-FR" sz="1400" dirty="0"/>
+          </a:p>
+        </p:txBody>
+      </p:sp>
+      <p:cxnSp>
+        <p:nvCxnSpPr>
+          <p:cNvPr id="79" name="Connecteur droit avec flèche 78"/>
+          <p:cNvCxnSpPr/>
+          <p:nvPr/>
+        </p:nvCxnSpPr>
+        <p:spPr>
+          <a:xfrm>
+            <a:off x="5627357" y="3871822"/>
+            <a:ext cx="2242636" cy="5059"/>
+          </a:xfrm>
+          <a:prstGeom prst="straightConnector1">
+            <a:avLst/>
+          </a:prstGeom>
+          <a:ln w="19050">
+            <a:solidFill>
+              <a:schemeClr val="accent4">
+                <a:lumMod val="75000"/>
+              </a:schemeClr>
+            </a:solidFill>
+            <a:tailEnd type="triangle"/>
+          </a:ln>
+        </p:spPr>
+        <p:style>
+          <a:lnRef idx="1">
+            <a:schemeClr val="accent1"/>
+          </a:lnRef>
+          <a:fillRef idx="0">
+            <a:schemeClr val="accent1"/>
+          </a:fillRef>
+          <a:effectRef idx="0">
+            <a:schemeClr val="accent1"/>
+          </a:effectRef>
+          <a:fontRef idx="minor">
+            <a:schemeClr val="tx1"/>
+          </a:fontRef>
+        </p:style>
+      </p:cxnSp>
+      <p:cxnSp>
+        <p:nvCxnSpPr>
+          <p:cNvPr id="80" name="Connecteur droit avec flèche 79"/>
+          <p:cNvCxnSpPr/>
+          <p:nvPr/>
+        </p:nvCxnSpPr>
+        <p:spPr>
+          <a:xfrm flipH="1">
+            <a:off x="5605841" y="4107077"/>
+            <a:ext cx="2232614" cy="1419"/>
+          </a:xfrm>
+          <a:prstGeom prst="straightConnector1">
+            <a:avLst/>
+          </a:prstGeom>
+          <a:ln w="19050">
+            <a:solidFill>
+              <a:schemeClr val="accent4">
+                <a:lumMod val="75000"/>
+              </a:schemeClr>
+            </a:solidFill>
+            <a:tailEnd type="triangle"/>
+          </a:ln>
+        </p:spPr>
+        <p:style>
+          <a:lnRef idx="1">
+            <a:schemeClr val="accent1"/>
+          </a:lnRef>
+          <a:fillRef idx="0">
+            <a:schemeClr val="accent1"/>
+          </a:fillRef>
+          <a:effectRef idx="0">
+            <a:schemeClr val="accent1"/>
+          </a:effectRef>
+          <a:fontRef idx="minor">
+            <a:schemeClr val="tx1"/>
+          </a:fontRef>
+        </p:style>
+      </p:cxnSp>
+      <p:sp>
+        <p:nvSpPr>
+          <p:cNvPr id="81" name="Rectangle à coins arrondis 80"/>
+          <p:cNvSpPr/>
+          <p:nvPr/>
+        </p:nvSpPr>
+        <p:spPr>
+          <a:xfrm>
+            <a:off x="10623366" y="3679262"/>
+            <a:ext cx="1072654" cy="579780"/>
+          </a:xfrm>
+          <a:prstGeom prst="roundRect">
+            <a:avLst/>
+          </a:prstGeom>
+        </p:spPr>
+        <p:style>
+          <a:lnRef idx="2">
+            <a:schemeClr val="accent1">
+              <a:shade val="50000"/>
+            </a:schemeClr>
+          </a:lnRef>
+          <a:fillRef idx="1">
+            <a:schemeClr val="accent1"/>
+          </a:fillRef>
+          <a:effectRef idx="0">
+            <a:schemeClr val="accent1"/>
+          </a:effectRef>
+          <a:fontRef idx="minor">
+            <a:schemeClr val="lt1"/>
+          </a:fontRef>
+        </p:style>
+        <p:txBody>
+          <a:bodyPr vert="horz" rtlCol="0" anchor="ctr" anchorCtr="1"/>
+          <a:lstStyle/>
+          <a:p>
+            <a:pPr algn="ctr"/>
+            <a:r>
+              <a:rPr lang="fr-FR" dirty="0" smtClean="0"/>
+              <a:t>API</a:t>
+            </a:r>
+            <a:endParaRPr lang="fr-FR" dirty="0"/>
+          </a:p>
+        </p:txBody>
+      </p:sp>
+      <p:cxnSp>
+        <p:nvCxnSpPr>
+          <p:cNvPr id="82" name="Connecteur droit avec flèche 81"/>
+          <p:cNvCxnSpPr/>
+          <p:nvPr/>
+        </p:nvCxnSpPr>
+        <p:spPr>
+          <a:xfrm>
+            <a:off x="9496672" y="3843199"/>
+            <a:ext cx="1122446" cy="997"/>
+          </a:xfrm>
+          <a:prstGeom prst="straightConnector1">
+            <a:avLst/>
+          </a:prstGeom>
+          <a:ln w="19050">
+            <a:solidFill>
+              <a:schemeClr val="accent4">
+                <a:lumMod val="75000"/>
+              </a:schemeClr>
+            </a:solidFill>
+            <a:tailEnd type="triangle"/>
+          </a:ln>
+        </p:spPr>
+        <p:style>
+          <a:lnRef idx="1">
+            <a:schemeClr val="accent1"/>
+          </a:lnRef>
+          <a:fillRef idx="0">
+            <a:schemeClr val="accent1"/>
+          </a:fillRef>
+          <a:effectRef idx="0">
+            <a:schemeClr val="accent1"/>
+          </a:effectRef>
+          <a:fontRef idx="minor">
+            <a:schemeClr val="tx1"/>
+          </a:fontRef>
+        </p:style>
+      </p:cxnSp>
+      <p:cxnSp>
+        <p:nvCxnSpPr>
+          <p:cNvPr id="84" name="Connecteur droit avec flèche 83"/>
+          <p:cNvCxnSpPr/>
+          <p:nvPr/>
+        </p:nvCxnSpPr>
+        <p:spPr>
+          <a:xfrm flipH="1" flipV="1">
+            <a:off x="9494788" y="4106976"/>
+            <a:ext cx="1122446" cy="997"/>
+          </a:xfrm>
+          <a:prstGeom prst="straightConnector1">
+            <a:avLst/>
+          </a:prstGeom>
+          <a:ln w="19050">
+            <a:solidFill>
+              <a:schemeClr val="accent4">
+                <a:lumMod val="75000"/>
+              </a:schemeClr>
+            </a:solidFill>
+            <a:tailEnd type="triangle"/>
+          </a:ln>
+        </p:spPr>
+        <p:style>
+          <a:lnRef idx="1">
+            <a:schemeClr val="accent1"/>
+          </a:lnRef>
+          <a:fillRef idx="0">
+            <a:schemeClr val="accent1"/>
+          </a:fillRef>
+          <a:effectRef idx="0">
+            <a:schemeClr val="accent1"/>
+          </a:effectRef>
+          <a:fontRef idx="minor">
+            <a:schemeClr val="tx1"/>
+          </a:fontRef>
+        </p:style>
+      </p:cxnSp>
+      <p:sp>
+        <p:nvSpPr>
+          <p:cNvPr id="93" name="ZoneTexte 92"/>
+          <p:cNvSpPr txBox="1"/>
+          <p:nvPr/>
+        </p:nvSpPr>
+        <p:spPr>
+          <a:xfrm>
+            <a:off x="9542910" y="3526713"/>
+            <a:ext cx="1071960" cy="307777"/>
+          </a:xfrm>
+          <a:prstGeom prst="rect">
+            <a:avLst/>
+          </a:prstGeom>
+          <a:noFill/>
+        </p:spPr>
+        <p:txBody>
+          <a:bodyPr wrap="none" rtlCol="0">
+            <a:spAutoFit/>
+          </a:bodyPr>
+          <a:lstStyle/>
+          <a:p>
+            <a:r>
+              <a:rPr lang="fr-FR" sz="1400" dirty="0" smtClean="0"/>
+              <a:t>Appel direct</a:t>
+            </a:r>
+            <a:endParaRPr lang="fr-FR" sz="1400" dirty="0"/>
+          </a:p>
+        </p:txBody>
+      </p:sp>
+      <p:sp>
+        <p:nvSpPr>
+          <p:cNvPr id="96" name="ZoneTexte 95"/>
+          <p:cNvSpPr txBox="1"/>
+          <p:nvPr/>
+        </p:nvSpPr>
+        <p:spPr>
+          <a:xfrm>
+            <a:off x="6083885" y="4142437"/>
+            <a:ext cx="1225144" cy="523220"/>
+          </a:xfrm>
+          <a:prstGeom prst="rect">
+            <a:avLst/>
+          </a:prstGeom>
+          <a:noFill/>
+        </p:spPr>
+        <p:txBody>
+          <a:bodyPr wrap="none" rtlCol="0">
+            <a:spAutoFit/>
+          </a:bodyPr>
+          <a:lstStyle/>
+          <a:p>
+            <a:pPr algn="ctr"/>
+            <a:r>
+              <a:rPr lang="fr-FR" sz="1400" dirty="0" smtClean="0"/>
+              <a:t>Formatage</a:t>
+            </a:r>
+          </a:p>
+          <a:p>
+            <a:pPr algn="ctr"/>
+            <a:r>
+              <a:rPr lang="fr-FR" sz="1400" dirty="0" smtClean="0"/>
+              <a:t>Mise en cache</a:t>
+            </a:r>
+            <a:endParaRPr lang="fr-FR" sz="1400" dirty="0"/>
+          </a:p>
+        </p:txBody>
+      </p:sp>
+      <p:sp>
+        <p:nvSpPr>
+          <p:cNvPr id="97" name="ZoneTexte 96"/>
+          <p:cNvSpPr txBox="1"/>
+          <p:nvPr/>
+        </p:nvSpPr>
+        <p:spPr>
+          <a:xfrm>
+            <a:off x="9506283" y="4098267"/>
+            <a:ext cx="1092607" cy="523220"/>
+          </a:xfrm>
+          <a:prstGeom prst="rect">
+            <a:avLst/>
+          </a:prstGeom>
+          <a:noFill/>
+        </p:spPr>
+        <p:txBody>
+          <a:bodyPr wrap="none" rtlCol="0">
+            <a:spAutoFit/>
+          </a:bodyPr>
+          <a:lstStyle/>
+          <a:p>
+            <a:pPr algn="ctr"/>
+            <a:r>
+              <a:rPr lang="fr-FR" sz="1400" dirty="0" smtClean="0"/>
+              <a:t>Résultat</a:t>
+            </a:r>
+          </a:p>
+          <a:p>
+            <a:pPr algn="ctr"/>
+            <a:r>
+              <a:rPr lang="fr-FR" sz="1400" dirty="0" smtClean="0"/>
+              <a:t>non formaté</a:t>
+            </a:r>
+            <a:endParaRPr lang="fr-FR" sz="1400" dirty="0"/>
+          </a:p>
+        </p:txBody>
+      </p:sp>
+      <p:sp>
+        <p:nvSpPr>
+          <p:cNvPr id="98" name="ZoneTexte 97"/>
+          <p:cNvSpPr txBox="1"/>
+          <p:nvPr/>
+        </p:nvSpPr>
+        <p:spPr>
+          <a:xfrm>
+            <a:off x="6107788" y="1829190"/>
+            <a:ext cx="1225144" cy="523220"/>
+          </a:xfrm>
+          <a:prstGeom prst="rect">
+            <a:avLst/>
+          </a:prstGeom>
+          <a:noFill/>
+        </p:spPr>
+        <p:txBody>
+          <a:bodyPr wrap="none" rtlCol="0">
+            <a:spAutoFit/>
+          </a:bodyPr>
+          <a:lstStyle/>
+          <a:p>
+            <a:pPr algn="ctr"/>
+            <a:r>
+              <a:rPr lang="fr-FR" sz="1400" dirty="0" smtClean="0"/>
+              <a:t>Formatage</a:t>
+            </a:r>
+          </a:p>
+          <a:p>
+            <a:pPr algn="ctr"/>
+            <a:r>
+              <a:rPr lang="fr-FR" sz="1400" dirty="0" smtClean="0"/>
+              <a:t>Mise en cache</a:t>
+            </a:r>
+            <a:endParaRPr lang="fr-FR" sz="1400" dirty="0"/>
+          </a:p>
+        </p:txBody>
+      </p:sp>
+    </p:spTree>
+    <p:extLst>
+      <p:ext uri="{BB962C8B-B14F-4D97-AF65-F5344CB8AC3E}">
+        <p14:creationId xmlns:p14="http://schemas.microsoft.com/office/powerpoint/2010/main" val="1026572526"/>
+      </p:ext>
+    </p:extLst>
+  </p:cSld>
+  <p:clrMapOvr>
+    <a:masterClrMapping/>
+  </p:clrMapOvr>
+  <p:timing>
+    <p:tnLst>
+      <p:par>
+        <p:cTn id="1" dur="indefinite" restart="never" nodeType="tmRoot"/>
+      </p:par>
+    </p:tnLst>
+  </p:timing>
+</p:sld>
+</file>
+
+<file path=ppt/slides/slide14.xml><?xml version="1.0" encoding="utf-8"?>
+<p:sld xmlns:a="http://schemas.openxmlformats.org/drawingml/2006/main" xmlns:r="http://schemas.openxmlformats.org/officeDocument/2006/relationships" xmlns:p="http://schemas.openxmlformats.org/presentationml/2006/main">
+  <p:cSld>
+    <p:spTree>
+      <p:nvGrpSpPr>
+        <p:cNvPr id="1" name=""/>
+        <p:cNvGrpSpPr/>
+        <p:nvPr/>
+      </p:nvGrpSpPr>
+      <p:grpSpPr>
+        <a:xfrm>
+          <a:off x="0" y="0"/>
+          <a:ext cx="0" cy="0"/>
+          <a:chOff x="0" y="0"/>
+          <a:chExt cx="0" cy="0"/>
+        </a:xfrm>
+      </p:grpSpPr>
+      <p:pic>
+        <p:nvPicPr>
+          <p:cNvPr id="5" name="Image 4">
+            <a:extLst>
+              <a:ext uri="{FF2B5EF4-FFF2-40B4-BE49-F238E27FC236}">
+                <a16:creationId xmlns:a16="http://schemas.microsoft.com/office/drawing/2014/main" id="{D91F6CE4-A0FB-4282-9B85-47FA5527C736}"/>
+              </a:ext>
+            </a:extLst>
+          </p:cNvPr>
+          <p:cNvPicPr>
+            <a:picLocks noChangeAspect="1"/>
+          </p:cNvPicPr>
+          <p:nvPr/>
+        </p:nvPicPr>
+        <p:blipFill>
+          <a:blip r:embed="rId3" cstate="print">
+            <a:extLst>
+              <a:ext uri="{28A0092B-C50C-407E-A947-70E740481C1C}">
+                <a14:useLocalDpi xmlns:a14="http://schemas.microsoft.com/office/drawing/2010/main" val="0"/>
+              </a:ext>
+            </a:extLst>
+          </a:blip>
+          <a:stretch>
+            <a:fillRect/>
+          </a:stretch>
+        </p:blipFill>
+        <p:spPr>
+          <a:xfrm>
+            <a:off x="293615" y="6291743"/>
+            <a:ext cx="10508871" cy="272654"/>
+          </a:xfrm>
+          <a:prstGeom prst="rect">
+            <a:avLst/>
+          </a:prstGeom>
+        </p:spPr>
+      </p:pic>
+      <p:pic>
+        <p:nvPicPr>
+          <p:cNvPr id="6" name="Image 5">
+            <a:extLst>
+              <a:ext uri="{FF2B5EF4-FFF2-40B4-BE49-F238E27FC236}">
+                <a16:creationId xmlns:a16="http://schemas.microsoft.com/office/drawing/2014/main" id="{B6F51BA5-E830-46D2-B1E2-3A2C10F760E7}"/>
+              </a:ext>
+            </a:extLst>
+          </p:cNvPr>
+          <p:cNvPicPr>
+            <a:picLocks noChangeAspect="1"/>
+          </p:cNvPicPr>
+          <p:nvPr/>
+        </p:nvPicPr>
+        <p:blipFill>
+          <a:blip r:embed="rId4" cstate="print">
+            <a:extLst>
+              <a:ext uri="{28A0092B-C50C-407E-A947-70E740481C1C}">
+                <a14:useLocalDpi xmlns:a14="http://schemas.microsoft.com/office/drawing/2010/main" val="0"/>
+              </a:ext>
+            </a:extLst>
+          </a:blip>
+          <a:stretch>
+            <a:fillRect/>
+          </a:stretch>
+        </p:blipFill>
+        <p:spPr>
+          <a:xfrm>
+            <a:off x="10802486" y="5912350"/>
+            <a:ext cx="1193772" cy="787940"/>
+          </a:xfrm>
+          <a:prstGeom prst="rect">
+            <a:avLst/>
+          </a:prstGeom>
+        </p:spPr>
+      </p:pic>
+      <p:sp>
+        <p:nvSpPr>
+          <p:cNvPr id="2" name="ZoneTexte 1"/>
+          <p:cNvSpPr txBox="1"/>
+          <p:nvPr/>
+        </p:nvSpPr>
+        <p:spPr>
+          <a:xfrm>
+            <a:off x="4772722" y="666974"/>
+            <a:ext cx="2646558" cy="369332"/>
+          </a:xfrm>
+          <a:prstGeom prst="rect">
+            <a:avLst/>
+          </a:prstGeom>
+          <a:noFill/>
+        </p:spPr>
+        <p:txBody>
+          <a:bodyPr wrap="none" rtlCol="0">
+            <a:spAutoFit/>
+          </a:bodyPr>
+          <a:lstStyle/>
+          <a:p>
+            <a:pPr algn="ctr"/>
+            <a:r>
+              <a:rPr lang="fr-FR" dirty="0" smtClean="0"/>
+              <a:t>Contenu du </a:t>
+            </a:r>
+            <a:r>
+              <a:rPr lang="fr-FR" dirty="0" err="1" smtClean="0"/>
+              <a:t>web.config</a:t>
+            </a:r>
+            <a:r>
+              <a:rPr lang="fr-FR" dirty="0" smtClean="0"/>
               <a:t> </a:t>
             </a:r>
             <a:r>
               <a:rPr lang="fr-FR" dirty="0" smtClean="0"/>
-              <a:t>#2</a:t>
+              <a:t>#3</a:t>
             </a:r>
             <a:endParaRPr lang="fr-FR" dirty="0"/>
           </a:p>
@@ -7383,7 +9688,7 @@
     </p:spTree>
     <p:extLst>
       <p:ext uri="{BB962C8B-B14F-4D97-AF65-F5344CB8AC3E}">
-        <p14:creationId xmlns:p14="http://schemas.microsoft.com/office/powerpoint/2010/main" val="2577260793"/>
+        <p14:creationId xmlns:p14="http://schemas.microsoft.com/office/powerpoint/2010/main" val="1840344098"/>
       </p:ext>
     </p:extLst>
   </p:cSld>
@@ -8400,13 +10705,8 @@
             </a:pPr>
             <a:r>
               <a:rPr lang="fr-FR" dirty="0" smtClean="0"/>
-              <a:t>Des requêtes </a:t>
-            </a:r>
-            <a:r>
-              <a:rPr lang="fr-FR" dirty="0" smtClean="0"/>
-              <a:t>web sont reçues</a:t>
-            </a:r>
-            <a:endParaRPr lang="fr-FR" dirty="0" smtClean="0"/>
+              <a:t>Des requêtes web sont reçues</a:t>
+            </a:r>
           </a:p>
           <a:p>
             <a:pPr marL="285750" indent="-285750">
@@ -10060,13 +12360,7 @@
               <a:rPr lang="fr-FR" dirty="0" smtClean="0">
                 <a:sym typeface="Wingdings" panose="05000000000000000000" pitchFamily="2" charset="2"/>
               </a:rPr>
-              <a:t> du </a:t>
-            </a:r>
-            <a:r>
-              <a:rPr lang="fr-FR" dirty="0" smtClean="0">
-                <a:sym typeface="Wingdings" panose="05000000000000000000" pitchFamily="2" charset="2"/>
-              </a:rPr>
-              <a:t>site</a:t>
+              <a:t> du site</a:t>
             </a:r>
           </a:p>
         </p:txBody>
@@ -10367,11 +12661,7 @@
             </a:r>
             <a:r>
               <a:rPr lang="fr-FR" dirty="0" smtClean="0"/>
-              <a:t>Cloud </a:t>
-            </a:r>
-            <a:r>
-              <a:rPr lang="fr-FR" dirty="0" smtClean="0"/>
-              <a:t>»,</a:t>
+              <a:t>Cloud »,</a:t>
             </a:r>
             <a:endParaRPr lang="fr-FR" dirty="0"/>
           </a:p>
@@ -12637,7 +14927,7 @@
 
 <file path=customXml/item10.xml><?xml version="1.0" encoding="utf-8"?>
 <Control xmlns="http://schemas.microsoft.com/VisualStudio/2011/storyboarding/control">
-  <Id Name="System.Storyboarding.Common.Breadcrumb" Revision="1" Stencil="System.Storyboarding.Common" StencilVersion="0.1"/>
+  <Id Name="System.Storyboarding.WindowsPhoneIcons.Search" Revision="1" Stencil="System.Storyboarding.WindowsPhoneIcons" StencilVersion="0.1"/>
 </Control>
 </file>
 
@@ -12649,13 +14939,13 @@
 
 <file path=customXml/item3.xml><?xml version="1.0" encoding="utf-8"?>
 <Control xmlns="http://schemas.microsoft.com/VisualStudio/2011/storyboarding/control">
-  <Id Name="System.Storyboarding.WindowsDesktop.AlertDialog" Revision="1" Stencil="System.Storyboarding.WindowsDesktop" StencilVersion="0.1"/>
+  <Id Name="System.Storyboarding.Backgrounds.WebBrowser" Revision="1" Stencil="System.Storyboarding.Backgrounds" StencilVersion="0.1"/>
 </Control>
 </file>
 
 <file path=customXml/item4.xml><?xml version="1.0" encoding="utf-8"?>
 <Control xmlns="http://schemas.microsoft.com/VisualStudio/2011/storyboarding/control">
-  <Id Name="System.Storyboarding.Backgrounds.WebBrowser" Revision="1" Stencil="System.Storyboarding.Backgrounds" StencilVersion="0.1"/>
+  <Id Name="System.Storyboarding.Common.Breadcrumb" Revision="1" Stencil="System.Storyboarding.Common" StencilVersion="0.1"/>
 </Control>
 </file>
 
@@ -12673,7 +14963,7 @@
 
 <file path=customXml/item7.xml><?xml version="1.0" encoding="utf-8"?>
 <Control xmlns="http://schemas.microsoft.com/VisualStudio/2011/storyboarding/control">
-  <Id Name="System.Storyboarding.WindowsDesktop.DialogBox" Revision="1" Stencil="System.Storyboarding.WindowsDesktop" StencilVersion="0.1"/>
+  <Id Name="System.Storyboarding.WindowsDesktop.AlertDialog" Revision="1" Stencil="System.Storyboarding.WindowsDesktop" StencilVersion="0.1"/>
 </Control>
 </file>
 
@@ -12685,7 +14975,7 @@
 
 <file path=customXml/item9.xml><?xml version="1.0" encoding="utf-8"?>
 <Control xmlns="http://schemas.microsoft.com/VisualStudio/2011/storyboarding/control">
-  <Id Name="System.Storyboarding.WindowsPhoneIcons.Search" Revision="1" Stencil="System.Storyboarding.WindowsPhoneIcons" StencilVersion="0.1"/>
+  <Id Name="System.Storyboarding.WindowsDesktop.DialogBox" Revision="1" Stencil="System.Storyboarding.WindowsDesktop" StencilVersion="0.1"/>
 </Control>
 </file>
 
@@ -12698,7 +14988,7 @@
 </file>
 
 <file path=customXml/itemProps10.xml><?xml version="1.0" encoding="utf-8"?>
-<ds:datastoreItem xmlns:ds="http://schemas.openxmlformats.org/officeDocument/2006/customXml" ds:itemID="{9A48F3C4-45B4-4BFF-BBD6-E5D8E1BB578C}">
+<ds:datastoreItem xmlns:ds="http://schemas.openxmlformats.org/officeDocument/2006/customXml" ds:itemID="{120A3C96-CD27-497D-A0EF-E96445F10DC2}">
   <ds:schemaRefs>
     <ds:schemaRef ds:uri="http://schemas.microsoft.com/VisualStudio/2011/storyboarding/control"/>
   </ds:schemaRefs>
@@ -12714,7 +15004,7 @@
 </file>
 
 <file path=customXml/itemProps3.xml><?xml version="1.0" encoding="utf-8"?>
-<ds:datastoreItem xmlns:ds="http://schemas.openxmlformats.org/officeDocument/2006/customXml" ds:itemID="{82FCB0D1-8EB6-4B2D-98E5-C2C86E67B90F}">
+<ds:datastoreItem xmlns:ds="http://schemas.openxmlformats.org/officeDocument/2006/customXml" ds:itemID="{B480E993-63B5-4C2F-BB8F-99D7AE1386B6}">
   <ds:schemaRefs>
     <ds:schemaRef ds:uri="http://schemas.microsoft.com/VisualStudio/2011/storyboarding/control"/>
   </ds:schemaRefs>
@@ -12722,7 +15012,7 @@
 </file>
 
 <file path=customXml/itemProps4.xml><?xml version="1.0" encoding="utf-8"?>
-<ds:datastoreItem xmlns:ds="http://schemas.openxmlformats.org/officeDocument/2006/customXml" ds:itemID="{B480E993-63B5-4C2F-BB8F-99D7AE1386B6}">
+<ds:datastoreItem xmlns:ds="http://schemas.openxmlformats.org/officeDocument/2006/customXml" ds:itemID="{9A48F3C4-45B4-4BFF-BBD6-E5D8E1BB578C}">
   <ds:schemaRefs>
     <ds:schemaRef ds:uri="http://schemas.microsoft.com/VisualStudio/2011/storyboarding/control"/>
   </ds:schemaRefs>
@@ -12730,6 +15020,14 @@
 </file>
 
 <file path=customXml/itemProps5.xml><?xml version="1.0" encoding="utf-8"?>
+<ds:datastoreItem xmlns:ds="http://schemas.openxmlformats.org/officeDocument/2006/customXml" ds:itemID="{2005D821-4CB3-4A25-B341-C5F92CEC57AD}">
+  <ds:schemaRefs>
+    <ds:schemaRef ds:uri="http://schemas.microsoft.com/VisualStudio/2011/storyboarding/control"/>
+  </ds:schemaRefs>
+</ds:datastoreItem>
+</file>
+
+<file path=customXml/itemProps6.xml><?xml version="1.0" encoding="utf-8"?>
 <ds:datastoreItem xmlns:ds="http://schemas.openxmlformats.org/officeDocument/2006/customXml" ds:itemID="{C315F13A-AC62-4724-879E-14987FCB1CE6}">
   <ds:schemaRefs>
     <ds:schemaRef ds:uri="http://schemas.microsoft.com/VisualStudio/2011/storyboarding/control"/>
@@ -12737,16 +15035,8 @@
 </ds:datastoreItem>
 </file>
 
-<file path=customXml/itemProps6.xml><?xml version="1.0" encoding="utf-8"?>
-<ds:datastoreItem xmlns:ds="http://schemas.openxmlformats.org/officeDocument/2006/customXml" ds:itemID="{1CAF7CC1-4F40-417B-9F2E-8DAFAC288198}">
-  <ds:schemaRefs>
-    <ds:schemaRef ds:uri="http://schemas.microsoft.com/VisualStudio/2011/storyboarding/control"/>
-  </ds:schemaRefs>
-</ds:datastoreItem>
-</file>
-
 <file path=customXml/itemProps7.xml><?xml version="1.0" encoding="utf-8"?>
-<ds:datastoreItem xmlns:ds="http://schemas.openxmlformats.org/officeDocument/2006/customXml" ds:itemID="{2005D821-4CB3-4A25-B341-C5F92CEC57AD}">
+<ds:datastoreItem xmlns:ds="http://schemas.openxmlformats.org/officeDocument/2006/customXml" ds:itemID="{82FCB0D1-8EB6-4B2D-98E5-C2C86E67B90F}">
   <ds:schemaRefs>
     <ds:schemaRef ds:uri="http://schemas.microsoft.com/VisualStudio/2011/storyboarding/control"/>
   </ds:schemaRefs>
@@ -12762,7 +15052,7 @@
 </file>
 
 <file path=customXml/itemProps9.xml><?xml version="1.0" encoding="utf-8"?>
-<ds:datastoreItem xmlns:ds="http://schemas.openxmlformats.org/officeDocument/2006/customXml" ds:itemID="{120A3C96-CD27-497D-A0EF-E96445F10DC2}">
+<ds:datastoreItem xmlns:ds="http://schemas.openxmlformats.org/officeDocument/2006/customXml" ds:itemID="{1CAF7CC1-4F40-417B-9F2E-8DAFAC288198}">
   <ds:schemaRefs>
     <ds:schemaRef ds:uri="http://schemas.microsoft.com/VisualStudio/2011/storyboarding/control"/>
   </ds:schemaRefs>

</xml_diff>

<commit_message>
Ajout des dernières captures d'écran/r/nCorrections orthographiques/r/n
</commit_message>
<xml_diff>
--- a/Speak'up API shadowing.pptx
+++ b/Speak'up API shadowing.pptx
@@ -5,7 +5,7 @@
     <p:sldMasterId id="2147483648" r:id="rId11"/>
   </p:sldMasterIdLst>
   <p:notesMasterIdLst>
-    <p:notesMasterId r:id="rId26"/>
+    <p:notesMasterId r:id="rId27"/>
   </p:notesMasterIdLst>
   <p:sldIdLst>
     <p:sldId id="256" r:id="rId12"/>
@@ -22,6 +22,7 @@
     <p:sldId id="292" r:id="rId23"/>
     <p:sldId id="293" r:id="rId24"/>
     <p:sldId id="294" r:id="rId25"/>
+    <p:sldId id="295" r:id="rId26"/>
   </p:sldIdLst>
   <p:sldSz cx="12192000" cy="6858000"/>
   <p:notesSz cx="6858000" cy="9144000"/>
@@ -222,7 +223,7 @@
           <a:p>
             <a:fld id="{B5AD0476-FE6D-4A78-9DC3-98305AD3C12A}" type="datetimeFigureOut">
               <a:rPr lang="fr-FR" smtClean="0"/>
-              <a:t>08/11/2019</a:t>
+              <a:t>12/11/2019</a:t>
             </a:fld>
             <a:endParaRPr lang="fr-FR"/>
           </a:p>
@@ -850,6 +851,90 @@
 </p:notes>
 </file>
 
+<file path=ppt/notesSlides/notesSlide13.xml><?xml version="1.0" encoding="utf-8"?>
+<p:notes xmlns:a="http://schemas.openxmlformats.org/drawingml/2006/main" xmlns:r="http://schemas.openxmlformats.org/officeDocument/2006/relationships" xmlns:p="http://schemas.openxmlformats.org/presentationml/2006/main">
+  <p:cSld>
+    <p:spTree>
+      <p:nvGrpSpPr>
+        <p:cNvPr id="1" name=""/>
+        <p:cNvGrpSpPr/>
+        <p:nvPr/>
+      </p:nvGrpSpPr>
+      <p:grpSpPr>
+        <a:xfrm>
+          <a:off x="0" y="0"/>
+          <a:ext cx="0" cy="0"/>
+          <a:chOff x="0" y="0"/>
+          <a:chExt cx="0" cy="0"/>
+        </a:xfrm>
+      </p:grpSpPr>
+      <p:sp>
+        <p:nvSpPr>
+          <p:cNvPr id="2" name="Espace réservé de l'image des diapositives 1"/>
+          <p:cNvSpPr>
+            <a:spLocks noGrp="1" noRot="1" noChangeAspect="1"/>
+          </p:cNvSpPr>
+          <p:nvPr>
+            <p:ph type="sldImg"/>
+          </p:nvPr>
+        </p:nvSpPr>
+        <p:spPr/>
+      </p:sp>
+      <p:sp>
+        <p:nvSpPr>
+          <p:cNvPr id="3" name="Espace réservé des notes 2"/>
+          <p:cNvSpPr>
+            <a:spLocks noGrp="1"/>
+          </p:cNvSpPr>
+          <p:nvPr>
+            <p:ph type="body" idx="1"/>
+          </p:nvPr>
+        </p:nvSpPr>
+        <p:spPr/>
+        <p:txBody>
+          <a:bodyPr/>
+          <a:lstStyle/>
+          <a:p>
+            <a:endParaRPr lang="fr-FR" dirty="0"/>
+          </a:p>
+        </p:txBody>
+      </p:sp>
+      <p:sp>
+        <p:nvSpPr>
+          <p:cNvPr id="4" name="Espace réservé du numéro de diapositive 3"/>
+          <p:cNvSpPr>
+            <a:spLocks noGrp="1"/>
+          </p:cNvSpPr>
+          <p:nvPr>
+            <p:ph type="sldNum" sz="quarter" idx="10"/>
+          </p:nvPr>
+        </p:nvSpPr>
+        <p:spPr/>
+        <p:txBody>
+          <a:bodyPr/>
+          <a:lstStyle/>
+          <a:p>
+            <a:fld id="{AA5DF8EF-0F82-44B3-979E-DBC26962337C}" type="slidenum">
+              <a:rPr lang="fr-FR" smtClean="0"/>
+              <a:t>15</a:t>
+            </a:fld>
+            <a:endParaRPr lang="fr-FR"/>
+          </a:p>
+        </p:txBody>
+      </p:sp>
+    </p:spTree>
+    <p:extLst>
+      <p:ext uri="{BB962C8B-B14F-4D97-AF65-F5344CB8AC3E}">
+        <p14:creationId xmlns:p14="http://schemas.microsoft.com/office/powerpoint/2010/main" val="2785073974"/>
+      </p:ext>
+    </p:extLst>
+  </p:cSld>
+  <p:clrMapOvr>
+    <a:masterClrMapping/>
+  </p:clrMapOvr>
+</p:notes>
+</file>
+
 <file path=ppt/notesSlides/notesSlide2.xml><?xml version="1.0" encoding="utf-8"?>
 <p:notes xmlns:a="http://schemas.openxmlformats.org/drawingml/2006/main" xmlns:r="http://schemas.openxmlformats.org/officeDocument/2006/relationships" xmlns:p="http://schemas.openxmlformats.org/presentationml/2006/main">
   <p:cSld>
@@ -894,6 +979,14 @@
           <a:bodyPr/>
           <a:lstStyle/>
           <a:p>
+            <a:r>
+              <a:rPr lang="fr-FR" dirty="0" smtClean="0"/>
+              <a:t>As</a:t>
+            </a:r>
+            <a:r>
+              <a:rPr lang="fr-FR" baseline="0" dirty="0" smtClean="0"/>
+              <a:t> </a:t>
+            </a:r>
             <a:endParaRPr lang="fr-FR" dirty="0"/>
           </a:p>
         </p:txBody>
@@ -980,8 +1073,17 @@
           <a:p>
             <a:r>
               <a:rPr lang="fr-FR" dirty="0" smtClean="0"/>
-              <a:t>En plus de servir de passe-plat entre le monde extérieur et les service, le serveur Scala formatait les requêtes à sa façon.</a:t>
-            </a:r>
+              <a:t>En plus de servir de passe-plat entre le monde extérieur et les service, le serveur Scala formatait les requêtes à sa </a:t>
+            </a:r>
+            <a:r>
+              <a:rPr lang="fr-FR" dirty="0" smtClean="0"/>
+              <a:t>façon,</a:t>
+            </a:r>
+            <a:r>
+              <a:rPr lang="fr-FR" baseline="0" dirty="0" smtClean="0"/>
+              <a:t> transformait aplatissait des objets, créait des listes avec des éléments uniques, déplaçait des éléments…</a:t>
+            </a:r>
+            <a:endParaRPr lang="fr-FR" dirty="0" smtClean="0"/>
           </a:p>
           <a:p>
             <a:endParaRPr lang="fr-FR" dirty="0" smtClean="0"/>
@@ -2453,7 +2555,7 @@
           <a:p>
             <a:fld id="{2A800B55-2EA3-4651-92C4-339DC2AA9BC2}" type="datetimeFigureOut">
               <a:rPr lang="fr-FR" smtClean="0"/>
-              <a:t>08/11/2019</a:t>
+              <a:t>12/11/2019</a:t>
             </a:fld>
             <a:endParaRPr lang="fr-FR"/>
           </a:p>
@@ -2651,7 +2753,7 @@
           <a:p>
             <a:fld id="{2A800B55-2EA3-4651-92C4-339DC2AA9BC2}" type="datetimeFigureOut">
               <a:rPr lang="fr-FR" smtClean="0"/>
-              <a:t>08/11/2019</a:t>
+              <a:t>12/11/2019</a:t>
             </a:fld>
             <a:endParaRPr lang="fr-FR"/>
           </a:p>
@@ -2859,7 +2961,7 @@
           <a:p>
             <a:fld id="{2A800B55-2EA3-4651-92C4-339DC2AA9BC2}" type="datetimeFigureOut">
               <a:rPr lang="fr-FR" smtClean="0"/>
-              <a:t>08/11/2019</a:t>
+              <a:t>12/11/2019</a:t>
             </a:fld>
             <a:endParaRPr lang="fr-FR"/>
           </a:p>
@@ -3057,7 +3159,7 @@
           <a:p>
             <a:fld id="{2A800B55-2EA3-4651-92C4-339DC2AA9BC2}" type="datetimeFigureOut">
               <a:rPr lang="fr-FR" smtClean="0"/>
-              <a:t>08/11/2019</a:t>
+              <a:t>12/11/2019</a:t>
             </a:fld>
             <a:endParaRPr lang="fr-FR"/>
           </a:p>
@@ -3332,7 +3434,7 @@
           <a:p>
             <a:fld id="{2A800B55-2EA3-4651-92C4-339DC2AA9BC2}" type="datetimeFigureOut">
               <a:rPr lang="fr-FR" smtClean="0"/>
-              <a:t>08/11/2019</a:t>
+              <a:t>12/11/2019</a:t>
             </a:fld>
             <a:endParaRPr lang="fr-FR"/>
           </a:p>
@@ -3597,7 +3699,7 @@
           <a:p>
             <a:fld id="{2A800B55-2EA3-4651-92C4-339DC2AA9BC2}" type="datetimeFigureOut">
               <a:rPr lang="fr-FR" smtClean="0"/>
-              <a:t>08/11/2019</a:t>
+              <a:t>12/11/2019</a:t>
             </a:fld>
             <a:endParaRPr lang="fr-FR"/>
           </a:p>
@@ -4009,7 +4111,7 @@
           <a:p>
             <a:fld id="{2A800B55-2EA3-4651-92C4-339DC2AA9BC2}" type="datetimeFigureOut">
               <a:rPr lang="fr-FR" smtClean="0"/>
-              <a:t>08/11/2019</a:t>
+              <a:t>12/11/2019</a:t>
             </a:fld>
             <a:endParaRPr lang="fr-FR"/>
           </a:p>
@@ -4150,7 +4252,7 @@
           <a:p>
             <a:fld id="{2A800B55-2EA3-4651-92C4-339DC2AA9BC2}" type="datetimeFigureOut">
               <a:rPr lang="fr-FR" smtClean="0"/>
-              <a:t>08/11/2019</a:t>
+              <a:t>12/11/2019</a:t>
             </a:fld>
             <a:endParaRPr lang="fr-FR"/>
           </a:p>
@@ -4263,7 +4365,7 @@
           <a:p>
             <a:fld id="{2A800B55-2EA3-4651-92C4-339DC2AA9BC2}" type="datetimeFigureOut">
               <a:rPr lang="fr-FR" smtClean="0"/>
-              <a:t>08/11/2019</a:t>
+              <a:t>12/11/2019</a:t>
             </a:fld>
             <a:endParaRPr lang="fr-FR"/>
           </a:p>
@@ -4574,7 +4676,7 @@
           <a:p>
             <a:fld id="{2A800B55-2EA3-4651-92C4-339DC2AA9BC2}" type="datetimeFigureOut">
               <a:rPr lang="fr-FR" smtClean="0"/>
-              <a:t>08/11/2019</a:t>
+              <a:t>12/11/2019</a:t>
             </a:fld>
             <a:endParaRPr lang="fr-FR"/>
           </a:p>
@@ -4862,7 +4964,7 @@
           <a:p>
             <a:fld id="{2A800B55-2EA3-4651-92C4-339DC2AA9BC2}" type="datetimeFigureOut">
               <a:rPr lang="fr-FR" smtClean="0"/>
-              <a:t>08/11/2019</a:t>
+              <a:t>12/11/2019</a:t>
             </a:fld>
             <a:endParaRPr lang="fr-FR"/>
           </a:p>
@@ -5103,7 +5205,7 @@
           <a:p>
             <a:fld id="{2A800B55-2EA3-4651-92C4-339DC2AA9BC2}" type="datetimeFigureOut">
               <a:rPr lang="fr-FR" smtClean="0"/>
-              <a:t>08/11/2019</a:t>
+              <a:t>12/11/2019</a:t>
             </a:fld>
             <a:endParaRPr lang="fr-FR"/>
           </a:p>
@@ -5869,8 +5971,13 @@
             </a:r>
             <a:r>
               <a:rPr lang="fr-FR" dirty="0" smtClean="0"/>
-              <a:t> étape : Implémentation des routes par lot fonctionnel</a:t>
-            </a:r>
+              <a:t> étape : Implémentation des routes par </a:t>
+            </a:r>
+            <a:r>
+              <a:rPr lang="fr-FR" dirty="0" smtClean="0"/>
+              <a:t>lots fonctionnels</a:t>
+            </a:r>
+            <a:endParaRPr lang="fr-FR" dirty="0" smtClean="0"/>
           </a:p>
           <a:p>
             <a:pPr marL="285750" indent="-285750">
@@ -6126,11 +6233,7 @@
           <a:p>
             <a:r>
               <a:rPr lang="fr-FR" sz="1400" dirty="0" smtClean="0"/>
-              <a:t>GET "</a:t>
-            </a:r>
-            <a:r>
-              <a:rPr lang="fr-FR" sz="1400" dirty="0" smtClean="0"/>
-              <a:t>url.com/countries"</a:t>
+              <a:t>GET "url.com/countries"</a:t>
             </a:r>
             <a:endParaRPr lang="fr-FR" sz="1400" dirty="0"/>
           </a:p>
@@ -7667,11 +7770,7 @@
           <a:p>
             <a:r>
               <a:rPr lang="fr-FR" dirty="0" smtClean="0"/>
-              <a:t>Etat final : Implémentation </a:t>
-            </a:r>
-            <a:r>
-              <a:rPr lang="fr-FR" dirty="0" smtClean="0"/>
-              <a:t>terminée</a:t>
+              <a:t>Etat final : Implémentation terminée</a:t>
             </a:r>
           </a:p>
           <a:p>
@@ -9595,7 +9694,7 @@
         </p:nvSpPr>
         <p:spPr>
           <a:xfrm>
-            <a:off x="4772722" y="666974"/>
+            <a:off x="4772722" y="381592"/>
             <a:ext cx="2646558" cy="369332"/>
           </a:xfrm>
           <a:prstGeom prst="rect">
@@ -9620,75 +9719,208 @@
             </a:r>
             <a:r>
               <a:rPr lang="fr-FR" dirty="0" smtClean="0"/>
-              <a:t> </a:t>
-            </a:r>
-            <a:r>
-              <a:rPr lang="fr-FR" dirty="0" smtClean="0"/>
-              <a:t>#3</a:t>
+              <a:t> #3</a:t>
             </a:r>
             <a:endParaRPr lang="fr-FR" dirty="0"/>
           </a:p>
         </p:txBody>
       </p:sp>
-      <p:sp>
-        <p:nvSpPr>
-          <p:cNvPr id="3" name="ZoneTexte 2"/>
-          <p:cNvSpPr txBox="1"/>
-          <p:nvPr/>
-        </p:nvSpPr>
-        <p:spPr>
-          <a:xfrm>
-            <a:off x="824605" y="1727881"/>
-            <a:ext cx="10574767" cy="3600000"/>
+      <p:pic>
+        <p:nvPicPr>
+          <p:cNvPr id="4" name="Image 3"/>
+          <p:cNvPicPr>
+            <a:picLocks noChangeAspect="1"/>
+          </p:cNvPicPr>
+          <p:nvPr/>
+        </p:nvPicPr>
+        <p:blipFill>
+          <a:blip r:embed="rId5"/>
+          <a:stretch>
+            <a:fillRect/>
+          </a:stretch>
+        </p:blipFill>
+        <p:spPr>
+          <a:xfrm>
+            <a:off x="2781497" y="1209054"/>
+            <a:ext cx="6629007" cy="4439893"/>
           </a:xfrm>
           <a:prstGeom prst="rect">
             <a:avLst/>
           </a:prstGeom>
-          <a:gradFill flip="none" rotWithShape="1">
-            <a:gsLst>
-              <a:gs pos="0">
-                <a:schemeClr val="accent2">
-                  <a:lumMod val="0"/>
-                  <a:lumOff val="100000"/>
-                </a:schemeClr>
-              </a:gs>
-              <a:gs pos="35000">
-                <a:schemeClr val="accent2">
-                  <a:lumMod val="0"/>
-                  <a:lumOff val="100000"/>
-                </a:schemeClr>
-              </a:gs>
-              <a:gs pos="100000">
-                <a:schemeClr val="accent2">
-                  <a:lumMod val="100000"/>
-                </a:schemeClr>
-              </a:gs>
-            </a:gsLst>
-            <a:path path="circle">
-              <a:fillToRect l="50000" t="-80000" r="50000" b="180000"/>
-            </a:path>
-            <a:tileRect/>
-          </a:gradFill>
-        </p:spPr>
-        <p:txBody>
-          <a:bodyPr wrap="square" rtlCol="0" anchor="ctr">
-            <a:spAutoFit/>
-          </a:bodyPr>
-          <a:lstStyle/>
-          <a:p>
-            <a:pPr algn="ctr"/>
-            <a:r>
-              <a:rPr lang="fr-FR" sz="5000" dirty="0" smtClean="0"/>
-              <a:t>CAPTURE WEB.CONFIG</a:t>
-            </a:r>
-            <a:endParaRPr lang="fr-FR" sz="5000" dirty="0"/>
-          </a:p>
-        </p:txBody>
-      </p:sp>
+        </p:spPr>
+      </p:pic>
     </p:spTree>
     <p:extLst>
       <p:ext uri="{BB962C8B-B14F-4D97-AF65-F5344CB8AC3E}">
         <p14:creationId xmlns:p14="http://schemas.microsoft.com/office/powerpoint/2010/main" val="1840344098"/>
+      </p:ext>
+    </p:extLst>
+  </p:cSld>
+  <p:clrMapOvr>
+    <a:masterClrMapping/>
+  </p:clrMapOvr>
+  <p:timing>
+    <p:tnLst>
+      <p:par>
+        <p:cTn id="1" dur="indefinite" restart="never" nodeType="tmRoot"/>
+      </p:par>
+    </p:tnLst>
+  </p:timing>
+</p:sld>
+</file>
+
+<file path=ppt/slides/slide15.xml><?xml version="1.0" encoding="utf-8"?>
+<p:sld xmlns:a="http://schemas.openxmlformats.org/drawingml/2006/main" xmlns:r="http://schemas.openxmlformats.org/officeDocument/2006/relationships" xmlns:p="http://schemas.openxmlformats.org/presentationml/2006/main">
+  <p:cSld>
+    <p:spTree>
+      <p:nvGrpSpPr>
+        <p:cNvPr id="1" name=""/>
+        <p:cNvGrpSpPr/>
+        <p:nvPr/>
+      </p:nvGrpSpPr>
+      <p:grpSpPr>
+        <a:xfrm>
+          <a:off x="0" y="0"/>
+          <a:ext cx="0" cy="0"/>
+          <a:chOff x="0" y="0"/>
+          <a:chExt cx="0" cy="0"/>
+        </a:xfrm>
+      </p:grpSpPr>
+      <p:pic>
+        <p:nvPicPr>
+          <p:cNvPr id="5" name="Image 4">
+            <a:extLst>
+              <a:ext uri="{FF2B5EF4-FFF2-40B4-BE49-F238E27FC236}">
+                <a16:creationId xmlns:a16="http://schemas.microsoft.com/office/drawing/2014/main" id="{D91F6CE4-A0FB-4282-9B85-47FA5527C736}"/>
+              </a:ext>
+            </a:extLst>
+          </p:cNvPr>
+          <p:cNvPicPr>
+            <a:picLocks noChangeAspect="1"/>
+          </p:cNvPicPr>
+          <p:nvPr/>
+        </p:nvPicPr>
+        <p:blipFill>
+          <a:blip r:embed="rId3" cstate="print">
+            <a:extLst>
+              <a:ext uri="{28A0092B-C50C-407E-A947-70E740481C1C}">
+                <a14:useLocalDpi xmlns:a14="http://schemas.microsoft.com/office/drawing/2010/main" val="0"/>
+              </a:ext>
+            </a:extLst>
+          </a:blip>
+          <a:stretch>
+            <a:fillRect/>
+          </a:stretch>
+        </p:blipFill>
+        <p:spPr>
+          <a:xfrm>
+            <a:off x="293615" y="6291743"/>
+            <a:ext cx="10508871" cy="272654"/>
+          </a:xfrm>
+          <a:prstGeom prst="rect">
+            <a:avLst/>
+          </a:prstGeom>
+        </p:spPr>
+      </p:pic>
+      <p:pic>
+        <p:nvPicPr>
+          <p:cNvPr id="6" name="Image 5">
+            <a:extLst>
+              <a:ext uri="{FF2B5EF4-FFF2-40B4-BE49-F238E27FC236}">
+                <a16:creationId xmlns:a16="http://schemas.microsoft.com/office/drawing/2014/main" id="{B6F51BA5-E830-46D2-B1E2-3A2C10F760E7}"/>
+              </a:ext>
+            </a:extLst>
+          </p:cNvPr>
+          <p:cNvPicPr>
+            <a:picLocks noChangeAspect="1"/>
+          </p:cNvPicPr>
+          <p:nvPr/>
+        </p:nvPicPr>
+        <p:blipFill>
+          <a:blip r:embed="rId4" cstate="print">
+            <a:extLst>
+              <a:ext uri="{28A0092B-C50C-407E-A947-70E740481C1C}">
+                <a14:useLocalDpi xmlns:a14="http://schemas.microsoft.com/office/drawing/2010/main" val="0"/>
+              </a:ext>
+            </a:extLst>
+          </a:blip>
+          <a:stretch>
+            <a:fillRect/>
+          </a:stretch>
+        </p:blipFill>
+        <p:spPr>
+          <a:xfrm>
+            <a:off x="10802486" y="5912350"/>
+            <a:ext cx="1193772" cy="787940"/>
+          </a:xfrm>
+          <a:prstGeom prst="rect">
+            <a:avLst/>
+          </a:prstGeom>
+        </p:spPr>
+      </p:pic>
+      <p:sp>
+        <p:nvSpPr>
+          <p:cNvPr id="2" name="ZoneTexte 1"/>
+          <p:cNvSpPr txBox="1"/>
+          <p:nvPr/>
+        </p:nvSpPr>
+        <p:spPr>
+          <a:xfrm>
+            <a:off x="5078959" y="306286"/>
+            <a:ext cx="2034083" cy="369332"/>
+          </a:xfrm>
+          <a:prstGeom prst="rect">
+            <a:avLst/>
+          </a:prstGeom>
+          <a:noFill/>
+        </p:spPr>
+        <p:txBody>
+          <a:bodyPr wrap="none" rtlCol="0">
+            <a:spAutoFit/>
+          </a:bodyPr>
+          <a:lstStyle/>
+          <a:p>
+            <a:pPr algn="ctr"/>
+            <a:r>
+              <a:rPr lang="fr-FR" dirty="0" err="1" smtClean="0"/>
+              <a:t>web.config</a:t>
+            </a:r>
+            <a:r>
+              <a:rPr lang="fr-FR" dirty="0" smtClean="0"/>
+              <a:t> complet</a:t>
+            </a:r>
+            <a:endParaRPr lang="fr-FR" dirty="0"/>
+          </a:p>
+        </p:txBody>
+      </p:sp>
+      <p:pic>
+        <p:nvPicPr>
+          <p:cNvPr id="3" name="Image 2"/>
+          <p:cNvPicPr>
+            <a:picLocks noChangeAspect="1"/>
+          </p:cNvPicPr>
+          <p:nvPr/>
+        </p:nvPicPr>
+        <p:blipFill>
+          <a:blip r:embed="rId5"/>
+          <a:stretch>
+            <a:fillRect/>
+          </a:stretch>
+        </p:blipFill>
+        <p:spPr>
+          <a:xfrm>
+            <a:off x="3082748" y="783198"/>
+            <a:ext cx="6026504" cy="5282100"/>
+          </a:xfrm>
+          <a:prstGeom prst="rect">
+            <a:avLst/>
+          </a:prstGeom>
+        </p:spPr>
+      </p:pic>
+    </p:spTree>
+    <p:extLst>
+      <p:ext uri="{BB962C8B-B14F-4D97-AF65-F5344CB8AC3E}">
+        <p14:creationId xmlns:p14="http://schemas.microsoft.com/office/powerpoint/2010/main" val="770616632"/>
       </p:ext>
     </p:extLst>
   </p:cSld>
@@ -10372,8 +10604,8 @@
         </p:nvSpPr>
         <p:spPr>
           <a:xfrm>
-            <a:off x="4846869" y="3764702"/>
-            <a:ext cx="2928174" cy="830997"/>
+            <a:off x="4852762" y="3683425"/>
+            <a:ext cx="2417650" cy="1815882"/>
           </a:xfrm>
           <a:prstGeom prst="rect">
             <a:avLst/>
@@ -10400,18 +10632,58 @@
             </a:endParaRPr>
           </a:p>
           <a:p>
-            <a:r>
-              <a:rPr lang="fr-FR" sz="1600" dirty="0">
-                <a:sym typeface="Wingdings" panose="05000000000000000000" pitchFamily="2" charset="2"/>
-              </a:rPr>
-              <a:t> </a:t>
-            </a:r>
+            <a:pPr marL="285750" indent="-285750">
+              <a:buFont typeface="Wingdings" panose="05000000000000000000" pitchFamily="2" charset="2"/>
+              <a:buChar char="à"/>
+            </a:pPr>
             <a:r>
               <a:rPr lang="fr-FR" sz="1600" dirty="0" smtClean="0">
                 <a:sym typeface="Wingdings" panose="05000000000000000000" pitchFamily="2" charset="2"/>
               </a:rPr>
-              <a:t>Proposition d’implémentation</a:t>
-            </a:r>
+              <a:t>Implémentation</a:t>
+            </a:r>
+          </a:p>
+          <a:p>
+            <a:pPr marL="742950" lvl="1" indent="-285750">
+              <a:buFont typeface="Wingdings" panose="05000000000000000000" pitchFamily="2" charset="2"/>
+              <a:buChar char="à"/>
+            </a:pPr>
+            <a:r>
+              <a:rPr lang="fr-FR" sz="1600" dirty="0" smtClean="0">
+                <a:sym typeface="Wingdings" panose="05000000000000000000" pitchFamily="2" charset="2"/>
+              </a:rPr>
+              <a:t>A blanc</a:t>
+            </a:r>
+          </a:p>
+          <a:p>
+            <a:pPr marL="742950" lvl="1" indent="-285750">
+              <a:buFont typeface="Wingdings" panose="05000000000000000000" pitchFamily="2" charset="2"/>
+              <a:buChar char="à"/>
+            </a:pPr>
+            <a:r>
+              <a:rPr lang="fr-FR" sz="1600" dirty="0" smtClean="0">
+                <a:sym typeface="Wingdings" panose="05000000000000000000" pitchFamily="2" charset="2"/>
+              </a:rPr>
+              <a:t>En cours</a:t>
+            </a:r>
+          </a:p>
+          <a:p>
+            <a:pPr marL="742950" lvl="1" indent="-285750">
+              <a:buFont typeface="Wingdings" panose="05000000000000000000" pitchFamily="2" charset="2"/>
+              <a:buChar char="à"/>
+            </a:pPr>
+            <a:r>
+              <a:rPr lang="fr-FR" sz="1600" dirty="0" smtClean="0">
+                <a:sym typeface="Wingdings" panose="05000000000000000000" pitchFamily="2" charset="2"/>
+              </a:rPr>
+              <a:t>Terminée</a:t>
+            </a:r>
+          </a:p>
+          <a:p>
+            <a:pPr marL="742950" lvl="1" indent="-285750">
+              <a:buFont typeface="Wingdings" panose="05000000000000000000" pitchFamily="2" charset="2"/>
+              <a:buChar char="à"/>
+            </a:pPr>
             <a:endParaRPr lang="fr-FR" sz="1600" dirty="0"/>
           </a:p>
         </p:txBody>
@@ -10672,7 +10944,7 @@
         <p:spPr>
           <a:xfrm>
             <a:off x="6421820" y="1735710"/>
-            <a:ext cx="5574438" cy="2585323"/>
+            <a:ext cx="5574438" cy="3416320"/>
           </a:xfrm>
           <a:prstGeom prst="rect">
             <a:avLst/>
@@ -10728,8 +11000,31 @@
           <a:p>
             <a:r>
               <a:rPr lang="fr-FR" dirty="0" smtClean="0"/>
-              <a:t>En plus de servir de passe-plat entre le monde extérieur et les service, le serveur Scala formatait les requêtes de retour à sa façon, et retournait systématiquement des données critiques ou inutiles.</a:t>
-            </a:r>
+              <a:t>En plus de servir de passe-plat entre le monde extérieur et les service, </a:t>
+            </a:r>
+            <a:r>
+              <a:rPr lang="fr-FR" dirty="0" smtClean="0"/>
+              <a:t>l’ensemble Apache / Scala formatait </a:t>
+            </a:r>
+            <a:r>
+              <a:rPr lang="fr-FR" dirty="0" smtClean="0"/>
+              <a:t>les requêtes de retour à sa façon, et retournait systématiquement des données critiques ou inutiles</a:t>
+            </a:r>
+            <a:r>
+              <a:rPr lang="fr-FR" dirty="0" smtClean="0"/>
+              <a:t>.</a:t>
+            </a:r>
+          </a:p>
+          <a:p>
+            <a:pPr marL="285750" indent="-285750">
+              <a:buFont typeface="Wingdings" panose="05000000000000000000" pitchFamily="2" charset="2"/>
+              <a:buChar char="Ø"/>
+            </a:pPr>
+            <a:r>
+              <a:rPr lang="fr-FR" dirty="0" smtClean="0"/>
+              <a:t>La clé d’authentification et l’intégralité du formulaire étaient systématiquement retournés dans chaque réponses</a:t>
+            </a:r>
+            <a:endParaRPr lang="fr-FR" dirty="0" smtClean="0"/>
           </a:p>
         </p:txBody>
       </p:sp>
@@ -14927,7 +15222,7 @@
 
 <file path=customXml/item10.xml><?xml version="1.0" encoding="utf-8"?>
 <Control xmlns="http://schemas.microsoft.com/VisualStudio/2011/storyboarding/control">
-  <Id Name="System.Storyboarding.WindowsPhoneIcons.Search" Revision="1" Stencil="System.Storyboarding.WindowsPhoneIcons" StencilVersion="0.1"/>
+  <Id Name="System.Storyboarding.WindowsDesktop.DialogBox" Revision="1" Stencil="System.Storyboarding.WindowsDesktop" StencilVersion="0.1"/>
 </Control>
 </file>
 
@@ -14939,19 +15234,19 @@
 
 <file path=customXml/item3.xml><?xml version="1.0" encoding="utf-8"?>
 <Control xmlns="http://schemas.microsoft.com/VisualStudio/2011/storyboarding/control">
-  <Id Name="System.Storyboarding.Backgrounds.WebBrowser" Revision="1" Stencil="System.Storyboarding.Backgrounds" StencilVersion="0.1"/>
+  <Id Name="System.Storyboarding.Common.Breadcrumb" Revision="1" Stencil="System.Storyboarding.Common" StencilVersion="0.1"/>
 </Control>
 </file>
 
 <file path=customXml/item4.xml><?xml version="1.0" encoding="utf-8"?>
 <Control xmlns="http://schemas.microsoft.com/VisualStudio/2011/storyboarding/control">
-  <Id Name="System.Storyboarding.Common.Breadcrumb" Revision="1" Stencil="System.Storyboarding.Common" StencilVersion="0.1"/>
+  <Id Name="System.Storyboarding.WindowsPhoneIcons.Search" Revision="1" Stencil="System.Storyboarding.WindowsPhoneIcons" StencilVersion="0.1"/>
 </Control>
 </file>
 
 <file path=customXml/item5.xml><?xml version="1.0" encoding="utf-8"?>
 <Control xmlns="http://schemas.microsoft.com/VisualStudio/2011/storyboarding/control">
-  <Id Name="System.Storyboarding.WindowsDesktop.DialogBox" Revision="1" Stencil="System.Storyboarding.WindowsDesktop" StencilVersion="0.1"/>
+  <Id Name="System.Storyboarding.WindowsDesktop.AlertDialog" Revision="1" Stencil="System.Storyboarding.WindowsDesktop" StencilVersion="0.1"/>
 </Control>
 </file>
 
@@ -14963,7 +15258,7 @@
 
 <file path=customXml/item7.xml><?xml version="1.0" encoding="utf-8"?>
 <Control xmlns="http://schemas.microsoft.com/VisualStudio/2011/storyboarding/control">
-  <Id Name="System.Storyboarding.WindowsDesktop.AlertDialog" Revision="1" Stencil="System.Storyboarding.WindowsDesktop" StencilVersion="0.1"/>
+  <Id Name="System.Storyboarding.Backgrounds.WebBrowser" Revision="1" Stencil="System.Storyboarding.Backgrounds" StencilVersion="0.1"/>
 </Control>
 </file>
 
@@ -14988,7 +15283,7 @@
 </file>
 
 <file path=customXml/itemProps10.xml><?xml version="1.0" encoding="utf-8"?>
-<ds:datastoreItem xmlns:ds="http://schemas.openxmlformats.org/officeDocument/2006/customXml" ds:itemID="{120A3C96-CD27-497D-A0EF-E96445F10DC2}">
+<ds:datastoreItem xmlns:ds="http://schemas.openxmlformats.org/officeDocument/2006/customXml" ds:itemID="{1CAF7CC1-4F40-417B-9F2E-8DAFAC288198}">
   <ds:schemaRefs>
     <ds:schemaRef ds:uri="http://schemas.microsoft.com/VisualStudio/2011/storyboarding/control"/>
   </ds:schemaRefs>
@@ -15004,7 +15299,7 @@
 </file>
 
 <file path=customXml/itemProps3.xml><?xml version="1.0" encoding="utf-8"?>
-<ds:datastoreItem xmlns:ds="http://schemas.openxmlformats.org/officeDocument/2006/customXml" ds:itemID="{B480E993-63B5-4C2F-BB8F-99D7AE1386B6}">
+<ds:datastoreItem xmlns:ds="http://schemas.openxmlformats.org/officeDocument/2006/customXml" ds:itemID="{9A48F3C4-45B4-4BFF-BBD6-E5D8E1BB578C}">
   <ds:schemaRefs>
     <ds:schemaRef ds:uri="http://schemas.microsoft.com/VisualStudio/2011/storyboarding/control"/>
   </ds:schemaRefs>
@@ -15012,7 +15307,7 @@
 </file>
 
 <file path=customXml/itemProps4.xml><?xml version="1.0" encoding="utf-8"?>
-<ds:datastoreItem xmlns:ds="http://schemas.openxmlformats.org/officeDocument/2006/customXml" ds:itemID="{9A48F3C4-45B4-4BFF-BBD6-E5D8E1BB578C}">
+<ds:datastoreItem xmlns:ds="http://schemas.openxmlformats.org/officeDocument/2006/customXml" ds:itemID="{120A3C96-CD27-497D-A0EF-E96445F10DC2}">
   <ds:schemaRefs>
     <ds:schemaRef ds:uri="http://schemas.microsoft.com/VisualStudio/2011/storyboarding/control"/>
   </ds:schemaRefs>
@@ -15020,6 +15315,14 @@
 </file>
 
 <file path=customXml/itemProps5.xml><?xml version="1.0" encoding="utf-8"?>
+<ds:datastoreItem xmlns:ds="http://schemas.openxmlformats.org/officeDocument/2006/customXml" ds:itemID="{82FCB0D1-8EB6-4B2D-98E5-C2C86E67B90F}">
+  <ds:schemaRefs>
+    <ds:schemaRef ds:uri="http://schemas.microsoft.com/VisualStudio/2011/storyboarding/control"/>
+  </ds:schemaRefs>
+</ds:datastoreItem>
+</file>
+
+<file path=customXml/itemProps6.xml><?xml version="1.0" encoding="utf-8"?>
 <ds:datastoreItem xmlns:ds="http://schemas.openxmlformats.org/officeDocument/2006/customXml" ds:itemID="{2005D821-4CB3-4A25-B341-C5F92CEC57AD}">
   <ds:schemaRefs>
     <ds:schemaRef ds:uri="http://schemas.microsoft.com/VisualStudio/2011/storyboarding/control"/>
@@ -15027,16 +15330,8 @@
 </ds:datastoreItem>
 </file>
 
-<file path=customXml/itemProps6.xml><?xml version="1.0" encoding="utf-8"?>
-<ds:datastoreItem xmlns:ds="http://schemas.openxmlformats.org/officeDocument/2006/customXml" ds:itemID="{C315F13A-AC62-4724-879E-14987FCB1CE6}">
-  <ds:schemaRefs>
-    <ds:schemaRef ds:uri="http://schemas.microsoft.com/VisualStudio/2011/storyboarding/control"/>
-  </ds:schemaRefs>
-</ds:datastoreItem>
-</file>
-
 <file path=customXml/itemProps7.xml><?xml version="1.0" encoding="utf-8"?>
-<ds:datastoreItem xmlns:ds="http://schemas.openxmlformats.org/officeDocument/2006/customXml" ds:itemID="{82FCB0D1-8EB6-4B2D-98E5-C2C86E67B90F}">
+<ds:datastoreItem xmlns:ds="http://schemas.openxmlformats.org/officeDocument/2006/customXml" ds:itemID="{B480E993-63B5-4C2F-BB8F-99D7AE1386B6}">
   <ds:schemaRefs>
     <ds:schemaRef ds:uri="http://schemas.microsoft.com/VisualStudio/2011/storyboarding/control"/>
   </ds:schemaRefs>
@@ -15052,7 +15347,7 @@
 </file>
 
 <file path=customXml/itemProps9.xml><?xml version="1.0" encoding="utf-8"?>
-<ds:datastoreItem xmlns:ds="http://schemas.openxmlformats.org/officeDocument/2006/customXml" ds:itemID="{1CAF7CC1-4F40-417B-9F2E-8DAFAC288198}">
+<ds:datastoreItem xmlns:ds="http://schemas.openxmlformats.org/officeDocument/2006/customXml" ds:itemID="{C315F13A-AC62-4724-879E-14987FCB1CE6}">
   <ds:schemaRefs>
     <ds:schemaRef ds:uri="http://schemas.microsoft.com/VisualStudio/2011/storyboarding/control"/>
   </ds:schemaRefs>

</xml_diff>